<commit_message>
work on tracker section
</commit_message>
<xml_diff>
--- a/KinnairdThesis/Body/Figures/ThesisImages.pptx
+++ b/KinnairdThesis/Body/Figures/ThesisImages.pptx
@@ -7,6 +7,8 @@
   <p:sldIdLst>
     <p:sldId id="256" r:id="rId2"/>
     <p:sldId id="257" r:id="rId3"/>
+    <p:sldId id="258" r:id="rId4"/>
+    <p:sldId id="259" r:id="rId5"/>
   </p:sldIdLst>
   <p:sldSz cx="12192000" cy="6858000"/>
   <p:notesSz cx="6858000" cy="9144000"/>
@@ -135,7 +137,7 @@
           <p:cNvPr id="2" name="Title 1">
             <a:extLst>
               <a:ext uri="{FF2B5EF4-FFF2-40B4-BE49-F238E27FC236}">
-                <a16:creationId xmlns:a16="http://schemas.microsoft.com/office/drawing/2014/main" id="{1B57B3C4-E435-3843-ADF5-0E6600617A31}"/>
+                <a16:creationId xmlns:a16="http://schemas.microsoft.com/office/drawing/2014/main" xmlns="" id="{1B57B3C4-E435-3843-ADF5-0E6600617A31}"/>
               </a:ext>
             </a:extLst>
           </p:cNvPr>
@@ -172,7 +174,7 @@
           <p:cNvPr id="3" name="Subtitle 2">
             <a:extLst>
               <a:ext uri="{FF2B5EF4-FFF2-40B4-BE49-F238E27FC236}">
-                <a16:creationId xmlns:a16="http://schemas.microsoft.com/office/drawing/2014/main" id="{B014CD73-195A-E146-85B8-CBD8E010BCF0}"/>
+                <a16:creationId xmlns:a16="http://schemas.microsoft.com/office/drawing/2014/main" xmlns="" id="{B014CD73-195A-E146-85B8-CBD8E010BCF0}"/>
               </a:ext>
             </a:extLst>
           </p:cNvPr>
@@ -242,7 +244,7 @@
           <p:cNvPr id="4" name="Date Placeholder 3">
             <a:extLst>
               <a:ext uri="{FF2B5EF4-FFF2-40B4-BE49-F238E27FC236}">
-                <a16:creationId xmlns:a16="http://schemas.microsoft.com/office/drawing/2014/main" id="{658C6929-9B51-6044-B476-05C2B4D39479}"/>
+                <a16:creationId xmlns:a16="http://schemas.microsoft.com/office/drawing/2014/main" xmlns="" id="{658C6929-9B51-6044-B476-05C2B4D39479}"/>
               </a:ext>
             </a:extLst>
           </p:cNvPr>
@@ -260,7 +262,7 @@
           <a:p>
             <a:fld id="{45D29F64-CD52-9145-B05C-AB9DB2C6669A}" type="datetimeFigureOut">
               <a:rPr lang="en-US" smtClean="0"/>
-              <a:t>4/11/19</a:t>
+              <a:t>4/23/19</a:t>
             </a:fld>
             <a:endParaRPr lang="en-US"/>
           </a:p>
@@ -271,7 +273,7 @@
           <p:cNvPr id="5" name="Footer Placeholder 4">
             <a:extLst>
               <a:ext uri="{FF2B5EF4-FFF2-40B4-BE49-F238E27FC236}">
-                <a16:creationId xmlns:a16="http://schemas.microsoft.com/office/drawing/2014/main" id="{EC3DA1B3-BF32-604F-9AA7-7B04982FD0E2}"/>
+                <a16:creationId xmlns:a16="http://schemas.microsoft.com/office/drawing/2014/main" xmlns="" id="{EC3DA1B3-BF32-604F-9AA7-7B04982FD0E2}"/>
               </a:ext>
             </a:extLst>
           </p:cNvPr>
@@ -296,7 +298,7 @@
           <p:cNvPr id="6" name="Slide Number Placeholder 5">
             <a:extLst>
               <a:ext uri="{FF2B5EF4-FFF2-40B4-BE49-F238E27FC236}">
-                <a16:creationId xmlns:a16="http://schemas.microsoft.com/office/drawing/2014/main" id="{88F32B42-BB5D-BB48-8764-9F99727CEF04}"/>
+                <a16:creationId xmlns:a16="http://schemas.microsoft.com/office/drawing/2014/main" xmlns="" id="{88F32B42-BB5D-BB48-8764-9F99727CEF04}"/>
               </a:ext>
             </a:extLst>
           </p:cNvPr>
@@ -355,7 +357,7 @@
           <p:cNvPr id="2" name="Title 1">
             <a:extLst>
               <a:ext uri="{FF2B5EF4-FFF2-40B4-BE49-F238E27FC236}">
-                <a16:creationId xmlns:a16="http://schemas.microsoft.com/office/drawing/2014/main" id="{9BBDEE72-3661-8A4F-BB8D-9F356D4CF066}"/>
+                <a16:creationId xmlns:a16="http://schemas.microsoft.com/office/drawing/2014/main" xmlns="" id="{9BBDEE72-3661-8A4F-BB8D-9F356D4CF066}"/>
               </a:ext>
             </a:extLst>
           </p:cNvPr>
@@ -383,7 +385,7 @@
           <p:cNvPr id="3" name="Vertical Text Placeholder 2">
             <a:extLst>
               <a:ext uri="{FF2B5EF4-FFF2-40B4-BE49-F238E27FC236}">
-                <a16:creationId xmlns:a16="http://schemas.microsoft.com/office/drawing/2014/main" id="{E5116906-5D68-0447-AFCD-16E5B4C58A42}"/>
+                <a16:creationId xmlns:a16="http://schemas.microsoft.com/office/drawing/2014/main" xmlns="" id="{E5116906-5D68-0447-AFCD-16E5B4C58A42}"/>
               </a:ext>
             </a:extLst>
           </p:cNvPr>
@@ -440,7 +442,7 @@
           <p:cNvPr id="4" name="Date Placeholder 3">
             <a:extLst>
               <a:ext uri="{FF2B5EF4-FFF2-40B4-BE49-F238E27FC236}">
-                <a16:creationId xmlns:a16="http://schemas.microsoft.com/office/drawing/2014/main" id="{C6E4F998-D16E-004E-A0D2-E7FF3D7E4F68}"/>
+                <a16:creationId xmlns:a16="http://schemas.microsoft.com/office/drawing/2014/main" xmlns="" id="{C6E4F998-D16E-004E-A0D2-E7FF3D7E4F68}"/>
               </a:ext>
             </a:extLst>
           </p:cNvPr>
@@ -458,7 +460,7 @@
           <a:p>
             <a:fld id="{45D29F64-CD52-9145-B05C-AB9DB2C6669A}" type="datetimeFigureOut">
               <a:rPr lang="en-US" smtClean="0"/>
-              <a:t>4/11/19</a:t>
+              <a:t>4/23/19</a:t>
             </a:fld>
             <a:endParaRPr lang="en-US"/>
           </a:p>
@@ -469,7 +471,7 @@
           <p:cNvPr id="5" name="Footer Placeholder 4">
             <a:extLst>
               <a:ext uri="{FF2B5EF4-FFF2-40B4-BE49-F238E27FC236}">
-                <a16:creationId xmlns:a16="http://schemas.microsoft.com/office/drawing/2014/main" id="{7089704E-D200-514A-B5B7-82DAA49671B8}"/>
+                <a16:creationId xmlns:a16="http://schemas.microsoft.com/office/drawing/2014/main" xmlns="" id="{7089704E-D200-514A-B5B7-82DAA49671B8}"/>
               </a:ext>
             </a:extLst>
           </p:cNvPr>
@@ -494,7 +496,7 @@
           <p:cNvPr id="6" name="Slide Number Placeholder 5">
             <a:extLst>
               <a:ext uri="{FF2B5EF4-FFF2-40B4-BE49-F238E27FC236}">
-                <a16:creationId xmlns:a16="http://schemas.microsoft.com/office/drawing/2014/main" id="{0C72463F-D09A-A346-A1F4-2911755D017A}"/>
+                <a16:creationId xmlns:a16="http://schemas.microsoft.com/office/drawing/2014/main" xmlns="" id="{0C72463F-D09A-A346-A1F4-2911755D017A}"/>
               </a:ext>
             </a:extLst>
           </p:cNvPr>
@@ -553,7 +555,7 @@
           <p:cNvPr id="2" name="Vertical Title 1">
             <a:extLst>
               <a:ext uri="{FF2B5EF4-FFF2-40B4-BE49-F238E27FC236}">
-                <a16:creationId xmlns:a16="http://schemas.microsoft.com/office/drawing/2014/main" id="{AB5946E9-397D-C049-A068-F804360E4392}"/>
+                <a16:creationId xmlns:a16="http://schemas.microsoft.com/office/drawing/2014/main" xmlns="" id="{AB5946E9-397D-C049-A068-F804360E4392}"/>
               </a:ext>
             </a:extLst>
           </p:cNvPr>
@@ -586,7 +588,7 @@
           <p:cNvPr id="3" name="Vertical Text Placeholder 2">
             <a:extLst>
               <a:ext uri="{FF2B5EF4-FFF2-40B4-BE49-F238E27FC236}">
-                <a16:creationId xmlns:a16="http://schemas.microsoft.com/office/drawing/2014/main" id="{89793A4A-3706-F84B-8A06-D16899A78EAB}"/>
+                <a16:creationId xmlns:a16="http://schemas.microsoft.com/office/drawing/2014/main" xmlns="" id="{89793A4A-3706-F84B-8A06-D16899A78EAB}"/>
               </a:ext>
             </a:extLst>
           </p:cNvPr>
@@ -648,7 +650,7 @@
           <p:cNvPr id="4" name="Date Placeholder 3">
             <a:extLst>
               <a:ext uri="{FF2B5EF4-FFF2-40B4-BE49-F238E27FC236}">
-                <a16:creationId xmlns:a16="http://schemas.microsoft.com/office/drawing/2014/main" id="{C25651AD-1FC0-704D-A779-A6A4A66E029E}"/>
+                <a16:creationId xmlns:a16="http://schemas.microsoft.com/office/drawing/2014/main" xmlns="" id="{C25651AD-1FC0-704D-A779-A6A4A66E029E}"/>
               </a:ext>
             </a:extLst>
           </p:cNvPr>
@@ -666,7 +668,7 @@
           <a:p>
             <a:fld id="{45D29F64-CD52-9145-B05C-AB9DB2C6669A}" type="datetimeFigureOut">
               <a:rPr lang="en-US" smtClean="0"/>
-              <a:t>4/11/19</a:t>
+              <a:t>4/23/19</a:t>
             </a:fld>
             <a:endParaRPr lang="en-US"/>
           </a:p>
@@ -677,7 +679,7 @@
           <p:cNvPr id="5" name="Footer Placeholder 4">
             <a:extLst>
               <a:ext uri="{FF2B5EF4-FFF2-40B4-BE49-F238E27FC236}">
-                <a16:creationId xmlns:a16="http://schemas.microsoft.com/office/drawing/2014/main" id="{8126BAD6-4443-004B-BAA1-FE8E085C9F8F}"/>
+                <a16:creationId xmlns:a16="http://schemas.microsoft.com/office/drawing/2014/main" xmlns="" id="{8126BAD6-4443-004B-BAA1-FE8E085C9F8F}"/>
               </a:ext>
             </a:extLst>
           </p:cNvPr>
@@ -702,7 +704,7 @@
           <p:cNvPr id="6" name="Slide Number Placeholder 5">
             <a:extLst>
               <a:ext uri="{FF2B5EF4-FFF2-40B4-BE49-F238E27FC236}">
-                <a16:creationId xmlns:a16="http://schemas.microsoft.com/office/drawing/2014/main" id="{14ED176A-F057-8D41-B00B-B444EA48310F}"/>
+                <a16:creationId xmlns:a16="http://schemas.microsoft.com/office/drawing/2014/main" xmlns="" id="{14ED176A-F057-8D41-B00B-B444EA48310F}"/>
               </a:ext>
             </a:extLst>
           </p:cNvPr>
@@ -761,7 +763,7 @@
           <p:cNvPr id="2" name="Title 1">
             <a:extLst>
               <a:ext uri="{FF2B5EF4-FFF2-40B4-BE49-F238E27FC236}">
-                <a16:creationId xmlns:a16="http://schemas.microsoft.com/office/drawing/2014/main" id="{A7D2B129-1333-1F47-BC4B-33786578E7FC}"/>
+                <a16:creationId xmlns:a16="http://schemas.microsoft.com/office/drawing/2014/main" xmlns="" id="{A7D2B129-1333-1F47-BC4B-33786578E7FC}"/>
               </a:ext>
             </a:extLst>
           </p:cNvPr>
@@ -789,7 +791,7 @@
           <p:cNvPr id="3" name="Content Placeholder 2">
             <a:extLst>
               <a:ext uri="{FF2B5EF4-FFF2-40B4-BE49-F238E27FC236}">
-                <a16:creationId xmlns:a16="http://schemas.microsoft.com/office/drawing/2014/main" id="{9ECDE62D-58E9-6849-98E2-AAA0CCAADDA0}"/>
+                <a16:creationId xmlns:a16="http://schemas.microsoft.com/office/drawing/2014/main" xmlns="" id="{9ECDE62D-58E9-6849-98E2-AAA0CCAADDA0}"/>
               </a:ext>
             </a:extLst>
           </p:cNvPr>
@@ -846,7 +848,7 @@
           <p:cNvPr id="4" name="Date Placeholder 3">
             <a:extLst>
               <a:ext uri="{FF2B5EF4-FFF2-40B4-BE49-F238E27FC236}">
-                <a16:creationId xmlns:a16="http://schemas.microsoft.com/office/drawing/2014/main" id="{EFEA11BF-2A45-4444-AEED-3C1B0AFA193B}"/>
+                <a16:creationId xmlns:a16="http://schemas.microsoft.com/office/drawing/2014/main" xmlns="" id="{EFEA11BF-2A45-4444-AEED-3C1B0AFA193B}"/>
               </a:ext>
             </a:extLst>
           </p:cNvPr>
@@ -864,7 +866,7 @@
           <a:p>
             <a:fld id="{45D29F64-CD52-9145-B05C-AB9DB2C6669A}" type="datetimeFigureOut">
               <a:rPr lang="en-US" smtClean="0"/>
-              <a:t>4/11/19</a:t>
+              <a:t>4/23/19</a:t>
             </a:fld>
             <a:endParaRPr lang="en-US"/>
           </a:p>
@@ -875,7 +877,7 @@
           <p:cNvPr id="5" name="Footer Placeholder 4">
             <a:extLst>
               <a:ext uri="{FF2B5EF4-FFF2-40B4-BE49-F238E27FC236}">
-                <a16:creationId xmlns:a16="http://schemas.microsoft.com/office/drawing/2014/main" id="{009B56B8-8A13-414C-BD29-0782690DB1B9}"/>
+                <a16:creationId xmlns:a16="http://schemas.microsoft.com/office/drawing/2014/main" xmlns="" id="{009B56B8-8A13-414C-BD29-0782690DB1B9}"/>
               </a:ext>
             </a:extLst>
           </p:cNvPr>
@@ -900,7 +902,7 @@
           <p:cNvPr id="6" name="Slide Number Placeholder 5">
             <a:extLst>
               <a:ext uri="{FF2B5EF4-FFF2-40B4-BE49-F238E27FC236}">
-                <a16:creationId xmlns:a16="http://schemas.microsoft.com/office/drawing/2014/main" id="{C4272DC2-C101-6D47-BF16-05E39FF23B46}"/>
+                <a16:creationId xmlns:a16="http://schemas.microsoft.com/office/drawing/2014/main" xmlns="" id="{C4272DC2-C101-6D47-BF16-05E39FF23B46}"/>
               </a:ext>
             </a:extLst>
           </p:cNvPr>
@@ -959,7 +961,7 @@
           <p:cNvPr id="2" name="Title 1">
             <a:extLst>
               <a:ext uri="{FF2B5EF4-FFF2-40B4-BE49-F238E27FC236}">
-                <a16:creationId xmlns:a16="http://schemas.microsoft.com/office/drawing/2014/main" id="{BAC22880-4B93-754D-9213-68DE4C171F7F}"/>
+                <a16:creationId xmlns:a16="http://schemas.microsoft.com/office/drawing/2014/main" xmlns="" id="{BAC22880-4B93-754D-9213-68DE4C171F7F}"/>
               </a:ext>
             </a:extLst>
           </p:cNvPr>
@@ -996,7 +998,7 @@
           <p:cNvPr id="3" name="Text Placeholder 2">
             <a:extLst>
               <a:ext uri="{FF2B5EF4-FFF2-40B4-BE49-F238E27FC236}">
-                <a16:creationId xmlns:a16="http://schemas.microsoft.com/office/drawing/2014/main" id="{6B11070C-81F8-0A4F-A81D-8C3C228925A3}"/>
+                <a16:creationId xmlns:a16="http://schemas.microsoft.com/office/drawing/2014/main" xmlns="" id="{6B11070C-81F8-0A4F-A81D-8C3C228925A3}"/>
               </a:ext>
             </a:extLst>
           </p:cNvPr>
@@ -1121,7 +1123,7 @@
           <p:cNvPr id="4" name="Date Placeholder 3">
             <a:extLst>
               <a:ext uri="{FF2B5EF4-FFF2-40B4-BE49-F238E27FC236}">
-                <a16:creationId xmlns:a16="http://schemas.microsoft.com/office/drawing/2014/main" id="{23C53577-1831-364C-B339-4121968BB6DA}"/>
+                <a16:creationId xmlns:a16="http://schemas.microsoft.com/office/drawing/2014/main" xmlns="" id="{23C53577-1831-364C-B339-4121968BB6DA}"/>
               </a:ext>
             </a:extLst>
           </p:cNvPr>
@@ -1139,7 +1141,7 @@
           <a:p>
             <a:fld id="{45D29F64-CD52-9145-B05C-AB9DB2C6669A}" type="datetimeFigureOut">
               <a:rPr lang="en-US" smtClean="0"/>
-              <a:t>4/11/19</a:t>
+              <a:t>4/23/19</a:t>
             </a:fld>
             <a:endParaRPr lang="en-US"/>
           </a:p>
@@ -1150,7 +1152,7 @@
           <p:cNvPr id="5" name="Footer Placeholder 4">
             <a:extLst>
               <a:ext uri="{FF2B5EF4-FFF2-40B4-BE49-F238E27FC236}">
-                <a16:creationId xmlns:a16="http://schemas.microsoft.com/office/drawing/2014/main" id="{9F9CBA5D-DA04-1849-97A2-5E156B619E76}"/>
+                <a16:creationId xmlns:a16="http://schemas.microsoft.com/office/drawing/2014/main" xmlns="" id="{9F9CBA5D-DA04-1849-97A2-5E156B619E76}"/>
               </a:ext>
             </a:extLst>
           </p:cNvPr>
@@ -1175,7 +1177,7 @@
           <p:cNvPr id="6" name="Slide Number Placeholder 5">
             <a:extLst>
               <a:ext uri="{FF2B5EF4-FFF2-40B4-BE49-F238E27FC236}">
-                <a16:creationId xmlns:a16="http://schemas.microsoft.com/office/drawing/2014/main" id="{CF1125EA-E670-6D43-9539-E2289A017005}"/>
+                <a16:creationId xmlns:a16="http://schemas.microsoft.com/office/drawing/2014/main" xmlns="" id="{CF1125EA-E670-6D43-9539-E2289A017005}"/>
               </a:ext>
             </a:extLst>
           </p:cNvPr>
@@ -1234,7 +1236,7 @@
           <p:cNvPr id="2" name="Title 1">
             <a:extLst>
               <a:ext uri="{FF2B5EF4-FFF2-40B4-BE49-F238E27FC236}">
-                <a16:creationId xmlns:a16="http://schemas.microsoft.com/office/drawing/2014/main" id="{262AD6D9-F928-4748-9C7F-D4545C80CAA4}"/>
+                <a16:creationId xmlns:a16="http://schemas.microsoft.com/office/drawing/2014/main" xmlns="" id="{262AD6D9-F928-4748-9C7F-D4545C80CAA4}"/>
               </a:ext>
             </a:extLst>
           </p:cNvPr>
@@ -1262,7 +1264,7 @@
           <p:cNvPr id="3" name="Content Placeholder 2">
             <a:extLst>
               <a:ext uri="{FF2B5EF4-FFF2-40B4-BE49-F238E27FC236}">
-                <a16:creationId xmlns:a16="http://schemas.microsoft.com/office/drawing/2014/main" id="{51D797BF-990E-9A4C-82AC-12AD06F3C184}"/>
+                <a16:creationId xmlns:a16="http://schemas.microsoft.com/office/drawing/2014/main" xmlns="" id="{51D797BF-990E-9A4C-82AC-12AD06F3C184}"/>
               </a:ext>
             </a:extLst>
           </p:cNvPr>
@@ -1324,7 +1326,7 @@
           <p:cNvPr id="4" name="Content Placeholder 3">
             <a:extLst>
               <a:ext uri="{FF2B5EF4-FFF2-40B4-BE49-F238E27FC236}">
-                <a16:creationId xmlns:a16="http://schemas.microsoft.com/office/drawing/2014/main" id="{3DC4D9D4-E298-6D41-ACED-A11435ED9D77}"/>
+                <a16:creationId xmlns:a16="http://schemas.microsoft.com/office/drawing/2014/main" xmlns="" id="{3DC4D9D4-E298-6D41-ACED-A11435ED9D77}"/>
               </a:ext>
             </a:extLst>
           </p:cNvPr>
@@ -1386,7 +1388,7 @@
           <p:cNvPr id="5" name="Date Placeholder 4">
             <a:extLst>
               <a:ext uri="{FF2B5EF4-FFF2-40B4-BE49-F238E27FC236}">
-                <a16:creationId xmlns:a16="http://schemas.microsoft.com/office/drawing/2014/main" id="{E17C102D-9E12-A244-9FD1-B8C9B6279B35}"/>
+                <a16:creationId xmlns:a16="http://schemas.microsoft.com/office/drawing/2014/main" xmlns="" id="{E17C102D-9E12-A244-9FD1-B8C9B6279B35}"/>
               </a:ext>
             </a:extLst>
           </p:cNvPr>
@@ -1404,7 +1406,7 @@
           <a:p>
             <a:fld id="{45D29F64-CD52-9145-B05C-AB9DB2C6669A}" type="datetimeFigureOut">
               <a:rPr lang="en-US" smtClean="0"/>
-              <a:t>4/11/19</a:t>
+              <a:t>4/23/19</a:t>
             </a:fld>
             <a:endParaRPr lang="en-US"/>
           </a:p>
@@ -1415,7 +1417,7 @@
           <p:cNvPr id="6" name="Footer Placeholder 5">
             <a:extLst>
               <a:ext uri="{FF2B5EF4-FFF2-40B4-BE49-F238E27FC236}">
-                <a16:creationId xmlns:a16="http://schemas.microsoft.com/office/drawing/2014/main" id="{0AFE2BCB-F3E8-8549-B6D4-F6040A561AFB}"/>
+                <a16:creationId xmlns:a16="http://schemas.microsoft.com/office/drawing/2014/main" xmlns="" id="{0AFE2BCB-F3E8-8549-B6D4-F6040A561AFB}"/>
               </a:ext>
             </a:extLst>
           </p:cNvPr>
@@ -1440,7 +1442,7 @@
           <p:cNvPr id="7" name="Slide Number Placeholder 6">
             <a:extLst>
               <a:ext uri="{FF2B5EF4-FFF2-40B4-BE49-F238E27FC236}">
-                <a16:creationId xmlns:a16="http://schemas.microsoft.com/office/drawing/2014/main" id="{C39549C6-C80B-BD44-8EF9-A19E907A7CFE}"/>
+                <a16:creationId xmlns:a16="http://schemas.microsoft.com/office/drawing/2014/main" xmlns="" id="{C39549C6-C80B-BD44-8EF9-A19E907A7CFE}"/>
               </a:ext>
             </a:extLst>
           </p:cNvPr>
@@ -1499,7 +1501,7 @@
           <p:cNvPr id="2" name="Title 1">
             <a:extLst>
               <a:ext uri="{FF2B5EF4-FFF2-40B4-BE49-F238E27FC236}">
-                <a16:creationId xmlns:a16="http://schemas.microsoft.com/office/drawing/2014/main" id="{FCEA8641-4386-D644-912C-5AF5E240C2CB}"/>
+                <a16:creationId xmlns:a16="http://schemas.microsoft.com/office/drawing/2014/main" xmlns="" id="{FCEA8641-4386-D644-912C-5AF5E240C2CB}"/>
               </a:ext>
             </a:extLst>
           </p:cNvPr>
@@ -1532,7 +1534,7 @@
           <p:cNvPr id="3" name="Text Placeholder 2">
             <a:extLst>
               <a:ext uri="{FF2B5EF4-FFF2-40B4-BE49-F238E27FC236}">
-                <a16:creationId xmlns:a16="http://schemas.microsoft.com/office/drawing/2014/main" id="{0003CA97-F6C8-4A4C-9811-B27526619B85}"/>
+                <a16:creationId xmlns:a16="http://schemas.microsoft.com/office/drawing/2014/main" xmlns="" id="{0003CA97-F6C8-4A4C-9811-B27526619B85}"/>
               </a:ext>
             </a:extLst>
           </p:cNvPr>
@@ -1603,7 +1605,7 @@
           <p:cNvPr id="4" name="Content Placeholder 3">
             <a:extLst>
               <a:ext uri="{FF2B5EF4-FFF2-40B4-BE49-F238E27FC236}">
-                <a16:creationId xmlns:a16="http://schemas.microsoft.com/office/drawing/2014/main" id="{C428443A-4B63-D44B-992D-A5333C63135A}"/>
+                <a16:creationId xmlns:a16="http://schemas.microsoft.com/office/drawing/2014/main" xmlns="" id="{C428443A-4B63-D44B-992D-A5333C63135A}"/>
               </a:ext>
             </a:extLst>
           </p:cNvPr>
@@ -1665,7 +1667,7 @@
           <p:cNvPr id="5" name="Text Placeholder 4">
             <a:extLst>
               <a:ext uri="{FF2B5EF4-FFF2-40B4-BE49-F238E27FC236}">
-                <a16:creationId xmlns:a16="http://schemas.microsoft.com/office/drawing/2014/main" id="{AB6EDAA3-A02E-E244-A6F8-31DA5C48F793}"/>
+                <a16:creationId xmlns:a16="http://schemas.microsoft.com/office/drawing/2014/main" xmlns="" id="{AB6EDAA3-A02E-E244-A6F8-31DA5C48F793}"/>
               </a:ext>
             </a:extLst>
           </p:cNvPr>
@@ -1736,7 +1738,7 @@
           <p:cNvPr id="6" name="Content Placeholder 5">
             <a:extLst>
               <a:ext uri="{FF2B5EF4-FFF2-40B4-BE49-F238E27FC236}">
-                <a16:creationId xmlns:a16="http://schemas.microsoft.com/office/drawing/2014/main" id="{A625C399-2052-374A-9A63-FF2581D9CF40}"/>
+                <a16:creationId xmlns:a16="http://schemas.microsoft.com/office/drawing/2014/main" xmlns="" id="{A625C399-2052-374A-9A63-FF2581D9CF40}"/>
               </a:ext>
             </a:extLst>
           </p:cNvPr>
@@ -1798,7 +1800,7 @@
           <p:cNvPr id="7" name="Date Placeholder 6">
             <a:extLst>
               <a:ext uri="{FF2B5EF4-FFF2-40B4-BE49-F238E27FC236}">
-                <a16:creationId xmlns:a16="http://schemas.microsoft.com/office/drawing/2014/main" id="{1A599785-4F03-0646-859D-A5B1A395854F}"/>
+                <a16:creationId xmlns:a16="http://schemas.microsoft.com/office/drawing/2014/main" xmlns="" id="{1A599785-4F03-0646-859D-A5B1A395854F}"/>
               </a:ext>
             </a:extLst>
           </p:cNvPr>
@@ -1816,7 +1818,7 @@
           <a:p>
             <a:fld id="{45D29F64-CD52-9145-B05C-AB9DB2C6669A}" type="datetimeFigureOut">
               <a:rPr lang="en-US" smtClean="0"/>
-              <a:t>4/11/19</a:t>
+              <a:t>4/23/19</a:t>
             </a:fld>
             <a:endParaRPr lang="en-US"/>
           </a:p>
@@ -1827,7 +1829,7 @@
           <p:cNvPr id="8" name="Footer Placeholder 7">
             <a:extLst>
               <a:ext uri="{FF2B5EF4-FFF2-40B4-BE49-F238E27FC236}">
-                <a16:creationId xmlns:a16="http://schemas.microsoft.com/office/drawing/2014/main" id="{6AE386FC-4B01-3D4A-B5E6-A4445E725378}"/>
+                <a16:creationId xmlns:a16="http://schemas.microsoft.com/office/drawing/2014/main" xmlns="" id="{6AE386FC-4B01-3D4A-B5E6-A4445E725378}"/>
               </a:ext>
             </a:extLst>
           </p:cNvPr>
@@ -1852,7 +1854,7 @@
           <p:cNvPr id="9" name="Slide Number Placeholder 8">
             <a:extLst>
               <a:ext uri="{FF2B5EF4-FFF2-40B4-BE49-F238E27FC236}">
-                <a16:creationId xmlns:a16="http://schemas.microsoft.com/office/drawing/2014/main" id="{39F0E8DD-4FFE-6540-8032-73316B86EFDA}"/>
+                <a16:creationId xmlns:a16="http://schemas.microsoft.com/office/drawing/2014/main" xmlns="" id="{39F0E8DD-4FFE-6540-8032-73316B86EFDA}"/>
               </a:ext>
             </a:extLst>
           </p:cNvPr>
@@ -1911,7 +1913,7 @@
           <p:cNvPr id="2" name="Title 1">
             <a:extLst>
               <a:ext uri="{FF2B5EF4-FFF2-40B4-BE49-F238E27FC236}">
-                <a16:creationId xmlns:a16="http://schemas.microsoft.com/office/drawing/2014/main" id="{3F5899AE-DFEB-5545-9F33-6F738A85210C}"/>
+                <a16:creationId xmlns:a16="http://schemas.microsoft.com/office/drawing/2014/main" xmlns="" id="{3F5899AE-DFEB-5545-9F33-6F738A85210C}"/>
               </a:ext>
             </a:extLst>
           </p:cNvPr>
@@ -1939,7 +1941,7 @@
           <p:cNvPr id="3" name="Date Placeholder 2">
             <a:extLst>
               <a:ext uri="{FF2B5EF4-FFF2-40B4-BE49-F238E27FC236}">
-                <a16:creationId xmlns:a16="http://schemas.microsoft.com/office/drawing/2014/main" id="{D2BBC704-A814-5E4D-A194-EEDA752CFFB8}"/>
+                <a16:creationId xmlns:a16="http://schemas.microsoft.com/office/drawing/2014/main" xmlns="" id="{D2BBC704-A814-5E4D-A194-EEDA752CFFB8}"/>
               </a:ext>
             </a:extLst>
           </p:cNvPr>
@@ -1957,7 +1959,7 @@
           <a:p>
             <a:fld id="{45D29F64-CD52-9145-B05C-AB9DB2C6669A}" type="datetimeFigureOut">
               <a:rPr lang="en-US" smtClean="0"/>
-              <a:t>4/11/19</a:t>
+              <a:t>4/23/19</a:t>
             </a:fld>
             <a:endParaRPr lang="en-US"/>
           </a:p>
@@ -1968,7 +1970,7 @@
           <p:cNvPr id="4" name="Footer Placeholder 3">
             <a:extLst>
               <a:ext uri="{FF2B5EF4-FFF2-40B4-BE49-F238E27FC236}">
-                <a16:creationId xmlns:a16="http://schemas.microsoft.com/office/drawing/2014/main" id="{5A0140CA-3C42-9F41-BAF5-D4C41D47C7CA}"/>
+                <a16:creationId xmlns:a16="http://schemas.microsoft.com/office/drawing/2014/main" xmlns="" id="{5A0140CA-3C42-9F41-BAF5-D4C41D47C7CA}"/>
               </a:ext>
             </a:extLst>
           </p:cNvPr>
@@ -1993,7 +1995,7 @@
           <p:cNvPr id="5" name="Slide Number Placeholder 4">
             <a:extLst>
               <a:ext uri="{FF2B5EF4-FFF2-40B4-BE49-F238E27FC236}">
-                <a16:creationId xmlns:a16="http://schemas.microsoft.com/office/drawing/2014/main" id="{37086D94-F459-FE40-9093-8A1D3E43A3A9}"/>
+                <a16:creationId xmlns:a16="http://schemas.microsoft.com/office/drawing/2014/main" xmlns="" id="{37086D94-F459-FE40-9093-8A1D3E43A3A9}"/>
               </a:ext>
             </a:extLst>
           </p:cNvPr>
@@ -2052,7 +2054,7 @@
           <p:cNvPr id="2" name="Date Placeholder 1">
             <a:extLst>
               <a:ext uri="{FF2B5EF4-FFF2-40B4-BE49-F238E27FC236}">
-                <a16:creationId xmlns:a16="http://schemas.microsoft.com/office/drawing/2014/main" id="{07A9ACC7-829A-7F4D-8420-A762D036E8CD}"/>
+                <a16:creationId xmlns:a16="http://schemas.microsoft.com/office/drawing/2014/main" xmlns="" id="{07A9ACC7-829A-7F4D-8420-A762D036E8CD}"/>
               </a:ext>
             </a:extLst>
           </p:cNvPr>
@@ -2070,7 +2072,7 @@
           <a:p>
             <a:fld id="{45D29F64-CD52-9145-B05C-AB9DB2C6669A}" type="datetimeFigureOut">
               <a:rPr lang="en-US" smtClean="0"/>
-              <a:t>4/11/19</a:t>
+              <a:t>4/23/19</a:t>
             </a:fld>
             <a:endParaRPr lang="en-US"/>
           </a:p>
@@ -2081,7 +2083,7 @@
           <p:cNvPr id="3" name="Footer Placeholder 2">
             <a:extLst>
               <a:ext uri="{FF2B5EF4-FFF2-40B4-BE49-F238E27FC236}">
-                <a16:creationId xmlns:a16="http://schemas.microsoft.com/office/drawing/2014/main" id="{8FBBF79B-F213-0A4F-B7FB-1DCDEC5761BE}"/>
+                <a16:creationId xmlns:a16="http://schemas.microsoft.com/office/drawing/2014/main" xmlns="" id="{8FBBF79B-F213-0A4F-B7FB-1DCDEC5761BE}"/>
               </a:ext>
             </a:extLst>
           </p:cNvPr>
@@ -2106,7 +2108,7 @@
           <p:cNvPr id="4" name="Slide Number Placeholder 3">
             <a:extLst>
               <a:ext uri="{FF2B5EF4-FFF2-40B4-BE49-F238E27FC236}">
-                <a16:creationId xmlns:a16="http://schemas.microsoft.com/office/drawing/2014/main" id="{B052EC9E-99E7-9841-A360-BDDEE513FB5E}"/>
+                <a16:creationId xmlns:a16="http://schemas.microsoft.com/office/drawing/2014/main" xmlns="" id="{B052EC9E-99E7-9841-A360-BDDEE513FB5E}"/>
               </a:ext>
             </a:extLst>
           </p:cNvPr>
@@ -2165,7 +2167,7 @@
           <p:cNvPr id="2" name="Title 1">
             <a:extLst>
               <a:ext uri="{FF2B5EF4-FFF2-40B4-BE49-F238E27FC236}">
-                <a16:creationId xmlns:a16="http://schemas.microsoft.com/office/drawing/2014/main" id="{070A10A2-F9B0-F344-8BC8-7A00229D2949}"/>
+                <a16:creationId xmlns:a16="http://schemas.microsoft.com/office/drawing/2014/main" xmlns="" id="{070A10A2-F9B0-F344-8BC8-7A00229D2949}"/>
               </a:ext>
             </a:extLst>
           </p:cNvPr>
@@ -2202,7 +2204,7 @@
           <p:cNvPr id="3" name="Content Placeholder 2">
             <a:extLst>
               <a:ext uri="{FF2B5EF4-FFF2-40B4-BE49-F238E27FC236}">
-                <a16:creationId xmlns:a16="http://schemas.microsoft.com/office/drawing/2014/main" id="{61A868DF-34E6-1848-983C-F5D0F4A4A893}"/>
+                <a16:creationId xmlns:a16="http://schemas.microsoft.com/office/drawing/2014/main" xmlns="" id="{61A868DF-34E6-1848-983C-F5D0F4A4A893}"/>
               </a:ext>
             </a:extLst>
           </p:cNvPr>
@@ -2292,7 +2294,7 @@
           <p:cNvPr id="4" name="Text Placeholder 3">
             <a:extLst>
               <a:ext uri="{FF2B5EF4-FFF2-40B4-BE49-F238E27FC236}">
-                <a16:creationId xmlns:a16="http://schemas.microsoft.com/office/drawing/2014/main" id="{376E3DE5-437D-434F-8910-AA8A3F1F1273}"/>
+                <a16:creationId xmlns:a16="http://schemas.microsoft.com/office/drawing/2014/main" xmlns="" id="{376E3DE5-437D-434F-8910-AA8A3F1F1273}"/>
               </a:ext>
             </a:extLst>
           </p:cNvPr>
@@ -2363,7 +2365,7 @@
           <p:cNvPr id="5" name="Date Placeholder 4">
             <a:extLst>
               <a:ext uri="{FF2B5EF4-FFF2-40B4-BE49-F238E27FC236}">
-                <a16:creationId xmlns:a16="http://schemas.microsoft.com/office/drawing/2014/main" id="{2F5DF4B7-6C2B-2B48-A238-F01177207469}"/>
+                <a16:creationId xmlns:a16="http://schemas.microsoft.com/office/drawing/2014/main" xmlns="" id="{2F5DF4B7-6C2B-2B48-A238-F01177207469}"/>
               </a:ext>
             </a:extLst>
           </p:cNvPr>
@@ -2381,7 +2383,7 @@
           <a:p>
             <a:fld id="{45D29F64-CD52-9145-B05C-AB9DB2C6669A}" type="datetimeFigureOut">
               <a:rPr lang="en-US" smtClean="0"/>
-              <a:t>4/11/19</a:t>
+              <a:t>4/23/19</a:t>
             </a:fld>
             <a:endParaRPr lang="en-US"/>
           </a:p>
@@ -2392,7 +2394,7 @@
           <p:cNvPr id="6" name="Footer Placeholder 5">
             <a:extLst>
               <a:ext uri="{FF2B5EF4-FFF2-40B4-BE49-F238E27FC236}">
-                <a16:creationId xmlns:a16="http://schemas.microsoft.com/office/drawing/2014/main" id="{A6EF2281-1ABA-7342-8F35-F0F2D64611D1}"/>
+                <a16:creationId xmlns:a16="http://schemas.microsoft.com/office/drawing/2014/main" xmlns="" id="{A6EF2281-1ABA-7342-8F35-F0F2D64611D1}"/>
               </a:ext>
             </a:extLst>
           </p:cNvPr>
@@ -2417,7 +2419,7 @@
           <p:cNvPr id="7" name="Slide Number Placeholder 6">
             <a:extLst>
               <a:ext uri="{FF2B5EF4-FFF2-40B4-BE49-F238E27FC236}">
-                <a16:creationId xmlns:a16="http://schemas.microsoft.com/office/drawing/2014/main" id="{56AACA73-B098-A443-86E5-3593BAFE81EC}"/>
+                <a16:creationId xmlns:a16="http://schemas.microsoft.com/office/drawing/2014/main" xmlns="" id="{56AACA73-B098-A443-86E5-3593BAFE81EC}"/>
               </a:ext>
             </a:extLst>
           </p:cNvPr>
@@ -2476,7 +2478,7 @@
           <p:cNvPr id="2" name="Title 1">
             <a:extLst>
               <a:ext uri="{FF2B5EF4-FFF2-40B4-BE49-F238E27FC236}">
-                <a16:creationId xmlns:a16="http://schemas.microsoft.com/office/drawing/2014/main" id="{FACBEB41-F32F-6449-BD04-263892C29998}"/>
+                <a16:creationId xmlns:a16="http://schemas.microsoft.com/office/drawing/2014/main" xmlns="" id="{FACBEB41-F32F-6449-BD04-263892C29998}"/>
               </a:ext>
             </a:extLst>
           </p:cNvPr>
@@ -2513,7 +2515,7 @@
           <p:cNvPr id="3" name="Picture Placeholder 2">
             <a:extLst>
               <a:ext uri="{FF2B5EF4-FFF2-40B4-BE49-F238E27FC236}">
-                <a16:creationId xmlns:a16="http://schemas.microsoft.com/office/drawing/2014/main" id="{0AD7B342-A149-9E4F-B5C0-EBE269660B70}"/>
+                <a16:creationId xmlns:a16="http://schemas.microsoft.com/office/drawing/2014/main" xmlns="" id="{0AD7B342-A149-9E4F-B5C0-EBE269660B70}"/>
               </a:ext>
             </a:extLst>
           </p:cNvPr>
@@ -2580,7 +2582,7 @@
           <p:cNvPr id="4" name="Text Placeholder 3">
             <a:extLst>
               <a:ext uri="{FF2B5EF4-FFF2-40B4-BE49-F238E27FC236}">
-                <a16:creationId xmlns:a16="http://schemas.microsoft.com/office/drawing/2014/main" id="{C7034AEB-C9CB-5641-A86A-8CE4D74CA17E}"/>
+                <a16:creationId xmlns:a16="http://schemas.microsoft.com/office/drawing/2014/main" xmlns="" id="{C7034AEB-C9CB-5641-A86A-8CE4D74CA17E}"/>
               </a:ext>
             </a:extLst>
           </p:cNvPr>
@@ -2651,7 +2653,7 @@
           <p:cNvPr id="5" name="Date Placeholder 4">
             <a:extLst>
               <a:ext uri="{FF2B5EF4-FFF2-40B4-BE49-F238E27FC236}">
-                <a16:creationId xmlns:a16="http://schemas.microsoft.com/office/drawing/2014/main" id="{5CF1E772-D352-3342-8861-BDE00833F7EF}"/>
+                <a16:creationId xmlns:a16="http://schemas.microsoft.com/office/drawing/2014/main" xmlns="" id="{5CF1E772-D352-3342-8861-BDE00833F7EF}"/>
               </a:ext>
             </a:extLst>
           </p:cNvPr>
@@ -2669,7 +2671,7 @@
           <a:p>
             <a:fld id="{45D29F64-CD52-9145-B05C-AB9DB2C6669A}" type="datetimeFigureOut">
               <a:rPr lang="en-US" smtClean="0"/>
-              <a:t>4/11/19</a:t>
+              <a:t>4/23/19</a:t>
             </a:fld>
             <a:endParaRPr lang="en-US"/>
           </a:p>
@@ -2680,7 +2682,7 @@
           <p:cNvPr id="6" name="Footer Placeholder 5">
             <a:extLst>
               <a:ext uri="{FF2B5EF4-FFF2-40B4-BE49-F238E27FC236}">
-                <a16:creationId xmlns:a16="http://schemas.microsoft.com/office/drawing/2014/main" id="{D38A5059-1DE0-404B-897B-615661062EB6}"/>
+                <a16:creationId xmlns:a16="http://schemas.microsoft.com/office/drawing/2014/main" xmlns="" id="{D38A5059-1DE0-404B-897B-615661062EB6}"/>
               </a:ext>
             </a:extLst>
           </p:cNvPr>
@@ -2705,7 +2707,7 @@
           <p:cNvPr id="7" name="Slide Number Placeholder 6">
             <a:extLst>
               <a:ext uri="{FF2B5EF4-FFF2-40B4-BE49-F238E27FC236}">
-                <a16:creationId xmlns:a16="http://schemas.microsoft.com/office/drawing/2014/main" id="{FEC9B585-298C-9142-B3E4-9683821FD0C3}"/>
+                <a16:creationId xmlns:a16="http://schemas.microsoft.com/office/drawing/2014/main" xmlns="" id="{FEC9B585-298C-9142-B3E4-9683821FD0C3}"/>
               </a:ext>
             </a:extLst>
           </p:cNvPr>
@@ -2769,7 +2771,7 @@
           <p:cNvPr id="2" name="Title Placeholder 1">
             <a:extLst>
               <a:ext uri="{FF2B5EF4-FFF2-40B4-BE49-F238E27FC236}">
-                <a16:creationId xmlns:a16="http://schemas.microsoft.com/office/drawing/2014/main" id="{4FA3C14F-9E83-204C-93F3-4A106E79DB61}"/>
+                <a16:creationId xmlns:a16="http://schemas.microsoft.com/office/drawing/2014/main" xmlns="" id="{4FA3C14F-9E83-204C-93F3-4A106E79DB61}"/>
               </a:ext>
             </a:extLst>
           </p:cNvPr>
@@ -2807,7 +2809,7 @@
           <p:cNvPr id="3" name="Text Placeholder 2">
             <a:extLst>
               <a:ext uri="{FF2B5EF4-FFF2-40B4-BE49-F238E27FC236}">
-                <a16:creationId xmlns:a16="http://schemas.microsoft.com/office/drawing/2014/main" id="{52192E8A-1958-E54D-9F03-ABB935DE7303}"/>
+                <a16:creationId xmlns:a16="http://schemas.microsoft.com/office/drawing/2014/main" xmlns="" id="{52192E8A-1958-E54D-9F03-ABB935DE7303}"/>
               </a:ext>
             </a:extLst>
           </p:cNvPr>
@@ -2874,7 +2876,7 @@
           <p:cNvPr id="4" name="Date Placeholder 3">
             <a:extLst>
               <a:ext uri="{FF2B5EF4-FFF2-40B4-BE49-F238E27FC236}">
-                <a16:creationId xmlns:a16="http://schemas.microsoft.com/office/drawing/2014/main" id="{7325D930-3387-4845-B851-27EB48A50D33}"/>
+                <a16:creationId xmlns:a16="http://schemas.microsoft.com/office/drawing/2014/main" xmlns="" id="{7325D930-3387-4845-B851-27EB48A50D33}"/>
               </a:ext>
             </a:extLst>
           </p:cNvPr>
@@ -2910,7 +2912,7 @@
           <a:p>
             <a:fld id="{45D29F64-CD52-9145-B05C-AB9DB2C6669A}" type="datetimeFigureOut">
               <a:rPr lang="en-US" smtClean="0"/>
-              <a:t>4/11/19</a:t>
+              <a:t>4/23/19</a:t>
             </a:fld>
             <a:endParaRPr lang="en-US"/>
           </a:p>
@@ -2921,7 +2923,7 @@
           <p:cNvPr id="5" name="Footer Placeholder 4">
             <a:extLst>
               <a:ext uri="{FF2B5EF4-FFF2-40B4-BE49-F238E27FC236}">
-                <a16:creationId xmlns:a16="http://schemas.microsoft.com/office/drawing/2014/main" id="{2B233A07-F101-A046-B90E-4F3B57476DFA}"/>
+                <a16:creationId xmlns:a16="http://schemas.microsoft.com/office/drawing/2014/main" xmlns="" id="{2B233A07-F101-A046-B90E-4F3B57476DFA}"/>
               </a:ext>
             </a:extLst>
           </p:cNvPr>
@@ -2964,7 +2966,7 @@
           <p:cNvPr id="6" name="Slide Number Placeholder 5">
             <a:extLst>
               <a:ext uri="{FF2B5EF4-FFF2-40B4-BE49-F238E27FC236}">
-                <a16:creationId xmlns:a16="http://schemas.microsoft.com/office/drawing/2014/main" id="{1864A47E-8A61-6845-AFEE-CDA6D79ED527}"/>
+                <a16:creationId xmlns:a16="http://schemas.microsoft.com/office/drawing/2014/main" xmlns="" id="{1864A47E-8A61-6845-AFEE-CDA6D79ED527}"/>
               </a:ext>
             </a:extLst>
           </p:cNvPr>
@@ -3332,7 +3334,7 @@
           <p:cNvPr id="2" name="Group 1">
             <a:extLst>
               <a:ext uri="{FF2B5EF4-FFF2-40B4-BE49-F238E27FC236}">
-                <a16:creationId xmlns:a16="http://schemas.microsoft.com/office/drawing/2014/main" id="{21C01040-A5E5-5440-BE0E-83D695C5AF7C}"/>
+                <a16:creationId xmlns:a16="http://schemas.microsoft.com/office/drawing/2014/main" xmlns="" id="{21C01040-A5E5-5440-BE0E-83D695C5AF7C}"/>
               </a:ext>
             </a:extLst>
           </p:cNvPr>
@@ -3352,7 +3354,7 @@
             <p:cNvPr id="4" name="Donut 3">
               <a:extLst>
                 <a:ext uri="{FF2B5EF4-FFF2-40B4-BE49-F238E27FC236}">
-                  <a16:creationId xmlns:a16="http://schemas.microsoft.com/office/drawing/2014/main" id="{3B2A361F-FDE3-7349-9868-C5FD2DECD6F0}"/>
+                  <a16:creationId xmlns:a16="http://schemas.microsoft.com/office/drawing/2014/main" xmlns="" id="{3B2A361F-FDE3-7349-9868-C5FD2DECD6F0}"/>
                 </a:ext>
               </a:extLst>
             </p:cNvPr>
@@ -3404,7 +3406,7 @@
             <p:cNvPr id="10" name="Donut 9">
               <a:extLst>
                 <a:ext uri="{FF2B5EF4-FFF2-40B4-BE49-F238E27FC236}">
-                  <a16:creationId xmlns:a16="http://schemas.microsoft.com/office/drawing/2014/main" id="{BDE35D79-7A44-0147-9C60-C169BA20B071}"/>
+                  <a16:creationId xmlns:a16="http://schemas.microsoft.com/office/drawing/2014/main" xmlns="" id="{BDE35D79-7A44-0147-9C60-C169BA20B071}"/>
                 </a:ext>
               </a:extLst>
             </p:cNvPr>
@@ -3456,7 +3458,7 @@
             <p:cNvPr id="12" name="Donut 11">
               <a:extLst>
                 <a:ext uri="{FF2B5EF4-FFF2-40B4-BE49-F238E27FC236}">
-                  <a16:creationId xmlns:a16="http://schemas.microsoft.com/office/drawing/2014/main" id="{E56352FB-83ED-8E41-A2BB-E276C56457E6}"/>
+                  <a16:creationId xmlns:a16="http://schemas.microsoft.com/office/drawing/2014/main" xmlns="" id="{E56352FB-83ED-8E41-A2BB-E276C56457E6}"/>
                 </a:ext>
               </a:extLst>
             </p:cNvPr>
@@ -3508,7 +3510,7 @@
             <p:cNvPr id="14" name="Donut 13">
               <a:extLst>
                 <a:ext uri="{FF2B5EF4-FFF2-40B4-BE49-F238E27FC236}">
-                  <a16:creationId xmlns:a16="http://schemas.microsoft.com/office/drawing/2014/main" id="{89D72E26-3D0E-F247-A940-D093C75917A9}"/>
+                  <a16:creationId xmlns:a16="http://schemas.microsoft.com/office/drawing/2014/main" xmlns="" id="{89D72E26-3D0E-F247-A940-D093C75917A9}"/>
                 </a:ext>
               </a:extLst>
             </p:cNvPr>
@@ -3560,7 +3562,7 @@
             <p:cNvPr id="16" name="Picture 15">
               <a:extLst>
                 <a:ext uri="{FF2B5EF4-FFF2-40B4-BE49-F238E27FC236}">
-                  <a16:creationId xmlns:a16="http://schemas.microsoft.com/office/drawing/2014/main" id="{65348E9C-5E39-C74F-8639-A4E368B71856}"/>
+                  <a16:creationId xmlns:a16="http://schemas.microsoft.com/office/drawing/2014/main" xmlns="" id="{65348E9C-5E39-C74F-8639-A4E368B71856}"/>
                 </a:ext>
               </a:extLst>
             </p:cNvPr>
@@ -3590,7 +3592,7 @@
             <p:cNvPr id="20" name="Picture 19">
               <a:extLst>
                 <a:ext uri="{FF2B5EF4-FFF2-40B4-BE49-F238E27FC236}">
-                  <a16:creationId xmlns:a16="http://schemas.microsoft.com/office/drawing/2014/main" id="{8803E842-7FB6-6F44-A22E-C3CA6FD7E349}"/>
+                  <a16:creationId xmlns:a16="http://schemas.microsoft.com/office/drawing/2014/main" xmlns="" id="{8803E842-7FB6-6F44-A22E-C3CA6FD7E349}"/>
                 </a:ext>
               </a:extLst>
             </p:cNvPr>
@@ -3620,7 +3622,7 @@
             <p:cNvPr id="21" name="Picture 20">
               <a:extLst>
                 <a:ext uri="{FF2B5EF4-FFF2-40B4-BE49-F238E27FC236}">
-                  <a16:creationId xmlns:a16="http://schemas.microsoft.com/office/drawing/2014/main" id="{303227FF-CA43-ED43-AA6E-589BBC9A9D59}"/>
+                  <a16:creationId xmlns:a16="http://schemas.microsoft.com/office/drawing/2014/main" xmlns="" id="{303227FF-CA43-ED43-AA6E-589BBC9A9D59}"/>
                 </a:ext>
               </a:extLst>
             </p:cNvPr>
@@ -3650,7 +3652,7 @@
             <p:cNvPr id="22" name="Picture 21">
               <a:extLst>
                 <a:ext uri="{FF2B5EF4-FFF2-40B4-BE49-F238E27FC236}">
-                  <a16:creationId xmlns:a16="http://schemas.microsoft.com/office/drawing/2014/main" id="{28D04A45-750D-5149-A269-373E9B55611F}"/>
+                  <a16:creationId xmlns:a16="http://schemas.microsoft.com/office/drawing/2014/main" xmlns="" id="{28D04A45-750D-5149-A269-373E9B55611F}"/>
                 </a:ext>
               </a:extLst>
             </p:cNvPr>
@@ -3680,7 +3682,7 @@
             <p:cNvPr id="24" name="Straight Arrow Connector 23">
               <a:extLst>
                 <a:ext uri="{FF2B5EF4-FFF2-40B4-BE49-F238E27FC236}">
-                  <a16:creationId xmlns:a16="http://schemas.microsoft.com/office/drawing/2014/main" id="{B0D28AA1-5104-B849-AF68-A0F380A29D2E}"/>
+                  <a16:creationId xmlns:a16="http://schemas.microsoft.com/office/drawing/2014/main" xmlns="" id="{B0D28AA1-5104-B849-AF68-A0F380A29D2E}"/>
                 </a:ext>
               </a:extLst>
             </p:cNvPr>
@@ -3722,7 +3724,7 @@
             <p:cNvPr id="25" name="Straight Arrow Connector 24">
               <a:extLst>
                 <a:ext uri="{FF2B5EF4-FFF2-40B4-BE49-F238E27FC236}">
-                  <a16:creationId xmlns:a16="http://schemas.microsoft.com/office/drawing/2014/main" id="{CD795BB4-ABBB-A64E-895F-0481BBE8E4EA}"/>
+                  <a16:creationId xmlns:a16="http://schemas.microsoft.com/office/drawing/2014/main" xmlns="" id="{CD795BB4-ABBB-A64E-895F-0481BBE8E4EA}"/>
                 </a:ext>
               </a:extLst>
             </p:cNvPr>
@@ -3766,7 +3768,7 @@
             <p:cNvPr id="27" name="Straight Arrow Connector 26">
               <a:extLst>
                 <a:ext uri="{FF2B5EF4-FFF2-40B4-BE49-F238E27FC236}">
-                  <a16:creationId xmlns:a16="http://schemas.microsoft.com/office/drawing/2014/main" id="{6F1AA03E-031D-8848-99C0-5A36AF0E5605}"/>
+                  <a16:creationId xmlns:a16="http://schemas.microsoft.com/office/drawing/2014/main" xmlns="" id="{6F1AA03E-031D-8848-99C0-5A36AF0E5605}"/>
                 </a:ext>
               </a:extLst>
             </p:cNvPr>
@@ -3811,7 +3813,7 @@
             <p:cNvPr id="28" name="Straight Arrow Connector 27">
               <a:extLst>
                 <a:ext uri="{FF2B5EF4-FFF2-40B4-BE49-F238E27FC236}">
-                  <a16:creationId xmlns:a16="http://schemas.microsoft.com/office/drawing/2014/main" id="{79B7509F-94D0-C044-9DC2-A554B9DB4C67}"/>
+                  <a16:creationId xmlns:a16="http://schemas.microsoft.com/office/drawing/2014/main" xmlns="" id="{79B7509F-94D0-C044-9DC2-A554B9DB4C67}"/>
                 </a:ext>
               </a:extLst>
             </p:cNvPr>
@@ -3856,7 +3858,7 @@
             <p:cNvPr id="34" name="Straight Arrow Connector 33">
               <a:extLst>
                 <a:ext uri="{FF2B5EF4-FFF2-40B4-BE49-F238E27FC236}">
-                  <a16:creationId xmlns:a16="http://schemas.microsoft.com/office/drawing/2014/main" id="{B64B615A-337A-E447-8F57-6F1155594D20}"/>
+                  <a16:creationId xmlns:a16="http://schemas.microsoft.com/office/drawing/2014/main" xmlns="" id="{B64B615A-337A-E447-8F57-6F1155594D20}"/>
                 </a:ext>
               </a:extLst>
             </p:cNvPr>
@@ -3901,7 +3903,7 @@
             <p:cNvPr id="35" name="Straight Arrow Connector 34">
               <a:extLst>
                 <a:ext uri="{FF2B5EF4-FFF2-40B4-BE49-F238E27FC236}">
-                  <a16:creationId xmlns:a16="http://schemas.microsoft.com/office/drawing/2014/main" id="{9CF84DCC-C72A-C348-8EC1-3A9D17DF0926}"/>
+                  <a16:creationId xmlns:a16="http://schemas.microsoft.com/office/drawing/2014/main" xmlns="" id="{9CF84DCC-C72A-C348-8EC1-3A9D17DF0926}"/>
                 </a:ext>
               </a:extLst>
             </p:cNvPr>
@@ -3946,7 +3948,7 @@
             <p:cNvPr id="36" name="Straight Arrow Connector 35">
               <a:extLst>
                 <a:ext uri="{FF2B5EF4-FFF2-40B4-BE49-F238E27FC236}">
-                  <a16:creationId xmlns:a16="http://schemas.microsoft.com/office/drawing/2014/main" id="{F1E7A251-AD40-E846-8C3D-087F623E8345}"/>
+                  <a16:creationId xmlns:a16="http://schemas.microsoft.com/office/drawing/2014/main" xmlns="" id="{F1E7A251-AD40-E846-8C3D-087F623E8345}"/>
                 </a:ext>
               </a:extLst>
             </p:cNvPr>
@@ -3991,7 +3993,7 @@
             <p:cNvPr id="37" name="TextBox 36">
               <a:extLst>
                 <a:ext uri="{FF2B5EF4-FFF2-40B4-BE49-F238E27FC236}">
-                  <a16:creationId xmlns:a16="http://schemas.microsoft.com/office/drawing/2014/main" id="{32233D15-47D3-4143-B8F5-40394DF42E51}"/>
+                  <a16:creationId xmlns:a16="http://schemas.microsoft.com/office/drawing/2014/main" xmlns="" id="{32233D15-47D3-4143-B8F5-40394DF42E51}"/>
                 </a:ext>
               </a:extLst>
             </p:cNvPr>
@@ -4030,7 +4032,7 @@
             <p:cNvPr id="38" name="TextBox 37">
               <a:extLst>
                 <a:ext uri="{FF2B5EF4-FFF2-40B4-BE49-F238E27FC236}">
-                  <a16:creationId xmlns:a16="http://schemas.microsoft.com/office/drawing/2014/main" id="{92F3D126-75F9-8E47-ACC8-6DE8CE351B10}"/>
+                  <a16:creationId xmlns:a16="http://schemas.microsoft.com/office/drawing/2014/main" xmlns="" id="{92F3D126-75F9-8E47-ACC8-6DE8CE351B10}"/>
                 </a:ext>
               </a:extLst>
             </p:cNvPr>
@@ -4065,7 +4067,7 @@
             <p:cNvPr id="40" name="Straight Arrow Connector 39">
               <a:extLst>
                 <a:ext uri="{FF2B5EF4-FFF2-40B4-BE49-F238E27FC236}">
-                  <a16:creationId xmlns:a16="http://schemas.microsoft.com/office/drawing/2014/main" id="{D129C510-0E92-F748-95B7-D3290C7F5292}"/>
+                  <a16:creationId xmlns:a16="http://schemas.microsoft.com/office/drawing/2014/main" xmlns="" id="{D129C510-0E92-F748-95B7-D3290C7F5292}"/>
                 </a:ext>
               </a:extLst>
             </p:cNvPr>
@@ -4111,7 +4113,7 @@
             <p:cNvPr id="45" name="Straight Arrow Connector 44">
               <a:extLst>
                 <a:ext uri="{FF2B5EF4-FFF2-40B4-BE49-F238E27FC236}">
-                  <a16:creationId xmlns:a16="http://schemas.microsoft.com/office/drawing/2014/main" id="{6A37E265-7C1D-4E42-8DE5-F1525A585474}"/>
+                  <a16:creationId xmlns:a16="http://schemas.microsoft.com/office/drawing/2014/main" xmlns="" id="{6A37E265-7C1D-4E42-8DE5-F1525A585474}"/>
                 </a:ext>
               </a:extLst>
             </p:cNvPr>
@@ -4157,7 +4159,7 @@
             <p:cNvPr id="47" name="Straight Arrow Connector 46">
               <a:extLst>
                 <a:ext uri="{FF2B5EF4-FFF2-40B4-BE49-F238E27FC236}">
-                  <a16:creationId xmlns:a16="http://schemas.microsoft.com/office/drawing/2014/main" id="{01B65FEC-66A0-E54A-A1A9-01441382ADA4}"/>
+                  <a16:creationId xmlns:a16="http://schemas.microsoft.com/office/drawing/2014/main" xmlns="" id="{01B65FEC-66A0-E54A-A1A9-01441382ADA4}"/>
                 </a:ext>
               </a:extLst>
             </p:cNvPr>
@@ -4203,7 +4205,7 @@
             <p:cNvPr id="48" name="Donut 47">
               <a:extLst>
                 <a:ext uri="{FF2B5EF4-FFF2-40B4-BE49-F238E27FC236}">
-                  <a16:creationId xmlns:a16="http://schemas.microsoft.com/office/drawing/2014/main" id="{1AD3C458-7283-094D-A4AC-30A8D632277B}"/>
+                  <a16:creationId xmlns:a16="http://schemas.microsoft.com/office/drawing/2014/main" xmlns="" id="{1AD3C458-7283-094D-A4AC-30A8D632277B}"/>
                 </a:ext>
               </a:extLst>
             </p:cNvPr>
@@ -4255,7 +4257,7 @@
             <p:cNvPr id="49" name="Donut 48">
               <a:extLst>
                 <a:ext uri="{FF2B5EF4-FFF2-40B4-BE49-F238E27FC236}">
-                  <a16:creationId xmlns:a16="http://schemas.microsoft.com/office/drawing/2014/main" id="{54296AC5-4EA6-2E48-B195-3F349430556D}"/>
+                  <a16:creationId xmlns:a16="http://schemas.microsoft.com/office/drawing/2014/main" xmlns="" id="{54296AC5-4EA6-2E48-B195-3F349430556D}"/>
                 </a:ext>
               </a:extLst>
             </p:cNvPr>
@@ -4307,7 +4309,7 @@
             <p:cNvPr id="50" name="Donut 49">
               <a:extLst>
                 <a:ext uri="{FF2B5EF4-FFF2-40B4-BE49-F238E27FC236}">
-                  <a16:creationId xmlns:a16="http://schemas.microsoft.com/office/drawing/2014/main" id="{ECEA39D9-22FF-2142-92DA-F78CCF525516}"/>
+                  <a16:creationId xmlns:a16="http://schemas.microsoft.com/office/drawing/2014/main" xmlns="" id="{ECEA39D9-22FF-2142-92DA-F78CCF525516}"/>
                 </a:ext>
               </a:extLst>
             </p:cNvPr>
@@ -4359,7 +4361,7 @@
             <p:cNvPr id="51" name="Donut 50">
               <a:extLst>
                 <a:ext uri="{FF2B5EF4-FFF2-40B4-BE49-F238E27FC236}">
-                  <a16:creationId xmlns:a16="http://schemas.microsoft.com/office/drawing/2014/main" id="{027D34A4-3CCC-5E4C-8C3B-04AEEFC20D48}"/>
+                  <a16:creationId xmlns:a16="http://schemas.microsoft.com/office/drawing/2014/main" xmlns="" id="{027D34A4-3CCC-5E4C-8C3B-04AEEFC20D48}"/>
                 </a:ext>
               </a:extLst>
             </p:cNvPr>
@@ -4411,7 +4413,7 @@
             <p:cNvPr id="52" name="Picture 51">
               <a:extLst>
                 <a:ext uri="{FF2B5EF4-FFF2-40B4-BE49-F238E27FC236}">
-                  <a16:creationId xmlns:a16="http://schemas.microsoft.com/office/drawing/2014/main" id="{5D3188FF-EB25-4542-9B0E-F071C76D530F}"/>
+                  <a16:creationId xmlns:a16="http://schemas.microsoft.com/office/drawing/2014/main" xmlns="" id="{5D3188FF-EB25-4542-9B0E-F071C76D530F}"/>
                 </a:ext>
               </a:extLst>
             </p:cNvPr>
@@ -4441,7 +4443,7 @@
             <p:cNvPr id="53" name="Picture 52">
               <a:extLst>
                 <a:ext uri="{FF2B5EF4-FFF2-40B4-BE49-F238E27FC236}">
-                  <a16:creationId xmlns:a16="http://schemas.microsoft.com/office/drawing/2014/main" id="{E80586E2-8A21-B44A-B2A6-E2A37289C605}"/>
+                  <a16:creationId xmlns:a16="http://schemas.microsoft.com/office/drawing/2014/main" xmlns="" id="{E80586E2-8A21-B44A-B2A6-E2A37289C605}"/>
                 </a:ext>
               </a:extLst>
             </p:cNvPr>
@@ -4471,7 +4473,7 @@
             <p:cNvPr id="54" name="Picture 53">
               <a:extLst>
                 <a:ext uri="{FF2B5EF4-FFF2-40B4-BE49-F238E27FC236}">
-                  <a16:creationId xmlns:a16="http://schemas.microsoft.com/office/drawing/2014/main" id="{10C0DB48-7DBA-884E-BE90-9CC62393ECA2}"/>
+                  <a16:creationId xmlns:a16="http://schemas.microsoft.com/office/drawing/2014/main" xmlns="" id="{10C0DB48-7DBA-884E-BE90-9CC62393ECA2}"/>
                 </a:ext>
               </a:extLst>
             </p:cNvPr>
@@ -4501,7 +4503,7 @@
             <p:cNvPr id="55" name="Picture 54">
               <a:extLst>
                 <a:ext uri="{FF2B5EF4-FFF2-40B4-BE49-F238E27FC236}">
-                  <a16:creationId xmlns:a16="http://schemas.microsoft.com/office/drawing/2014/main" id="{B4AE2BC6-738E-E543-8EFA-CBB71B892574}"/>
+                  <a16:creationId xmlns:a16="http://schemas.microsoft.com/office/drawing/2014/main" xmlns="" id="{B4AE2BC6-738E-E543-8EFA-CBB71B892574}"/>
                 </a:ext>
               </a:extLst>
             </p:cNvPr>
@@ -4531,7 +4533,7 @@
             <p:cNvPr id="57" name="Straight Arrow Connector 56">
               <a:extLst>
                 <a:ext uri="{FF2B5EF4-FFF2-40B4-BE49-F238E27FC236}">
-                  <a16:creationId xmlns:a16="http://schemas.microsoft.com/office/drawing/2014/main" id="{B7E0628D-3896-0D40-8C0F-2A2C37242174}"/>
+                  <a16:creationId xmlns:a16="http://schemas.microsoft.com/office/drawing/2014/main" xmlns="" id="{B7E0628D-3896-0D40-8C0F-2A2C37242174}"/>
                 </a:ext>
               </a:extLst>
             </p:cNvPr>
@@ -4576,7 +4578,7 @@
             <p:cNvPr id="58" name="Straight Arrow Connector 57">
               <a:extLst>
                 <a:ext uri="{FF2B5EF4-FFF2-40B4-BE49-F238E27FC236}">
-                  <a16:creationId xmlns:a16="http://schemas.microsoft.com/office/drawing/2014/main" id="{A8ACF2FB-D778-3646-84C4-C402FC592721}"/>
+                  <a16:creationId xmlns:a16="http://schemas.microsoft.com/office/drawing/2014/main" xmlns="" id="{A8ACF2FB-D778-3646-84C4-C402FC592721}"/>
                 </a:ext>
               </a:extLst>
             </p:cNvPr>
@@ -4621,7 +4623,7 @@
             <p:cNvPr id="59" name="Straight Arrow Connector 58">
               <a:extLst>
                 <a:ext uri="{FF2B5EF4-FFF2-40B4-BE49-F238E27FC236}">
-                  <a16:creationId xmlns:a16="http://schemas.microsoft.com/office/drawing/2014/main" id="{E424E677-519B-644C-852E-DAFC1041F8F9}"/>
+                  <a16:creationId xmlns:a16="http://schemas.microsoft.com/office/drawing/2014/main" xmlns="" id="{E424E677-519B-644C-852E-DAFC1041F8F9}"/>
                 </a:ext>
               </a:extLst>
             </p:cNvPr>
@@ -4666,7 +4668,7 @@
             <p:cNvPr id="60" name="Straight Arrow Connector 59">
               <a:extLst>
                 <a:ext uri="{FF2B5EF4-FFF2-40B4-BE49-F238E27FC236}">
-                  <a16:creationId xmlns:a16="http://schemas.microsoft.com/office/drawing/2014/main" id="{CC702EAB-6327-3548-9BA5-19449AE977CC}"/>
+                  <a16:creationId xmlns:a16="http://schemas.microsoft.com/office/drawing/2014/main" xmlns="" id="{CC702EAB-6327-3548-9BA5-19449AE977CC}"/>
                 </a:ext>
               </a:extLst>
             </p:cNvPr>
@@ -4711,7 +4713,7 @@
             <p:cNvPr id="61" name="Straight Arrow Connector 60">
               <a:extLst>
                 <a:ext uri="{FF2B5EF4-FFF2-40B4-BE49-F238E27FC236}">
-                  <a16:creationId xmlns:a16="http://schemas.microsoft.com/office/drawing/2014/main" id="{0E175693-96D0-5548-87EF-74C7A77A63D4}"/>
+                  <a16:creationId xmlns:a16="http://schemas.microsoft.com/office/drawing/2014/main" xmlns="" id="{0E175693-96D0-5548-87EF-74C7A77A63D4}"/>
                 </a:ext>
               </a:extLst>
             </p:cNvPr>
@@ -4756,7 +4758,7 @@
             <p:cNvPr id="62" name="Straight Arrow Connector 61">
               <a:extLst>
                 <a:ext uri="{FF2B5EF4-FFF2-40B4-BE49-F238E27FC236}">
-                  <a16:creationId xmlns:a16="http://schemas.microsoft.com/office/drawing/2014/main" id="{F787A27D-C2A6-494E-9E42-2C8E021EA6BA}"/>
+                  <a16:creationId xmlns:a16="http://schemas.microsoft.com/office/drawing/2014/main" xmlns="" id="{F787A27D-C2A6-494E-9E42-2C8E021EA6BA}"/>
                 </a:ext>
               </a:extLst>
             </p:cNvPr>
@@ -4801,7 +4803,7 @@
             <p:cNvPr id="65" name="Straight Arrow Connector 64">
               <a:extLst>
                 <a:ext uri="{FF2B5EF4-FFF2-40B4-BE49-F238E27FC236}">
-                  <a16:creationId xmlns:a16="http://schemas.microsoft.com/office/drawing/2014/main" id="{665894B1-601F-B54F-B53B-D7434ED7704F}"/>
+                  <a16:creationId xmlns:a16="http://schemas.microsoft.com/office/drawing/2014/main" xmlns="" id="{665894B1-601F-B54F-B53B-D7434ED7704F}"/>
                 </a:ext>
               </a:extLst>
             </p:cNvPr>
@@ -4848,7 +4850,7 @@
             <p:cNvPr id="66" name="Straight Arrow Connector 65">
               <a:extLst>
                 <a:ext uri="{FF2B5EF4-FFF2-40B4-BE49-F238E27FC236}">
-                  <a16:creationId xmlns:a16="http://schemas.microsoft.com/office/drawing/2014/main" id="{8D00B99C-A25A-0544-9CCC-62BED27C14E3}"/>
+                  <a16:creationId xmlns:a16="http://schemas.microsoft.com/office/drawing/2014/main" xmlns="" id="{8D00B99C-A25A-0544-9CCC-62BED27C14E3}"/>
                 </a:ext>
               </a:extLst>
             </p:cNvPr>
@@ -4895,7 +4897,7 @@
             <p:cNvPr id="74" name="Straight Arrow Connector 73">
               <a:extLst>
                 <a:ext uri="{FF2B5EF4-FFF2-40B4-BE49-F238E27FC236}">
-                  <a16:creationId xmlns:a16="http://schemas.microsoft.com/office/drawing/2014/main" id="{9897DA5B-3CCB-0745-A483-551471B7CE67}"/>
+                  <a16:creationId xmlns:a16="http://schemas.microsoft.com/office/drawing/2014/main" xmlns="" id="{9897DA5B-3CCB-0745-A483-551471B7CE67}"/>
                 </a:ext>
               </a:extLst>
             </p:cNvPr>
@@ -4942,7 +4944,7 @@
             <p:cNvPr id="86" name="TextBox 85">
               <a:extLst>
                 <a:ext uri="{FF2B5EF4-FFF2-40B4-BE49-F238E27FC236}">
-                  <a16:creationId xmlns:a16="http://schemas.microsoft.com/office/drawing/2014/main" id="{08D6A736-4169-4F4B-A504-8B317B727C73}"/>
+                  <a16:creationId xmlns:a16="http://schemas.microsoft.com/office/drawing/2014/main" xmlns="" id="{08D6A736-4169-4F4B-A504-8B317B727C73}"/>
                 </a:ext>
               </a:extLst>
             </p:cNvPr>
@@ -4977,7 +4979,7 @@
             <p:cNvPr id="87" name="Straight Arrow Connector 86">
               <a:extLst>
                 <a:ext uri="{FF2B5EF4-FFF2-40B4-BE49-F238E27FC236}">
-                  <a16:creationId xmlns:a16="http://schemas.microsoft.com/office/drawing/2014/main" id="{D894C924-CCB7-294F-92D3-516C5963A38F}"/>
+                  <a16:creationId xmlns:a16="http://schemas.microsoft.com/office/drawing/2014/main" xmlns="" id="{D894C924-CCB7-294F-92D3-516C5963A38F}"/>
                 </a:ext>
               </a:extLst>
             </p:cNvPr>
@@ -5021,7 +5023,7 @@
             <p:cNvPr id="88" name="Straight Arrow Connector 87">
               <a:extLst>
                 <a:ext uri="{FF2B5EF4-FFF2-40B4-BE49-F238E27FC236}">
-                  <a16:creationId xmlns:a16="http://schemas.microsoft.com/office/drawing/2014/main" id="{643ADA86-9B33-E942-973D-84EF8B397DA7}"/>
+                  <a16:creationId xmlns:a16="http://schemas.microsoft.com/office/drawing/2014/main" xmlns="" id="{643ADA86-9B33-E942-973D-84EF8B397DA7}"/>
                 </a:ext>
               </a:extLst>
             </p:cNvPr>
@@ -5065,7 +5067,7 @@
             <p:cNvPr id="92" name="Rectangle 91">
               <a:extLst>
                 <a:ext uri="{FF2B5EF4-FFF2-40B4-BE49-F238E27FC236}">
-                  <a16:creationId xmlns:a16="http://schemas.microsoft.com/office/drawing/2014/main" id="{0706AB93-4F5E-9F46-B494-FAA5B69D424F}"/>
+                  <a16:creationId xmlns:a16="http://schemas.microsoft.com/office/drawing/2014/main" xmlns="" id="{0706AB93-4F5E-9F46-B494-FAA5B69D424F}"/>
                 </a:ext>
               </a:extLst>
             </p:cNvPr>
@@ -5148,7 +5150,7 @@
           <p:cNvPr id="23" name="Group 22">
             <a:extLst>
               <a:ext uri="{FF2B5EF4-FFF2-40B4-BE49-F238E27FC236}">
-                <a16:creationId xmlns:a16="http://schemas.microsoft.com/office/drawing/2014/main" id="{BCC420A2-DA9C-7942-B39C-D09C4F5EA55A}"/>
+                <a16:creationId xmlns:a16="http://schemas.microsoft.com/office/drawing/2014/main" xmlns="" id="{BCC420A2-DA9C-7942-B39C-D09C4F5EA55A}"/>
               </a:ext>
             </a:extLst>
           </p:cNvPr>
@@ -5168,7 +5170,7 @@
             <p:cNvPr id="5" name="Straight Connector 4">
               <a:extLst>
                 <a:ext uri="{FF2B5EF4-FFF2-40B4-BE49-F238E27FC236}">
-                  <a16:creationId xmlns:a16="http://schemas.microsoft.com/office/drawing/2014/main" id="{39360EB3-2F94-A44A-B39F-9DB160370D7A}"/>
+                  <a16:creationId xmlns:a16="http://schemas.microsoft.com/office/drawing/2014/main" xmlns="" id="{39360EB3-2F94-A44A-B39F-9DB160370D7A}"/>
                 </a:ext>
               </a:extLst>
             </p:cNvPr>
@@ -5211,7 +5213,7 @@
             <p:cNvPr id="6" name="Straight Connector 5">
               <a:extLst>
                 <a:ext uri="{FF2B5EF4-FFF2-40B4-BE49-F238E27FC236}">
-                  <a16:creationId xmlns:a16="http://schemas.microsoft.com/office/drawing/2014/main" id="{853E8DA6-DA6D-6C46-BFE7-416FBF17C8C7}"/>
+                  <a16:creationId xmlns:a16="http://schemas.microsoft.com/office/drawing/2014/main" xmlns="" id="{853E8DA6-DA6D-6C46-BFE7-416FBF17C8C7}"/>
                 </a:ext>
               </a:extLst>
             </p:cNvPr>
@@ -5255,7 +5257,7 @@
             <p:cNvPr id="9" name="Straight Arrow Connector 8">
               <a:extLst>
                 <a:ext uri="{FF2B5EF4-FFF2-40B4-BE49-F238E27FC236}">
-                  <a16:creationId xmlns:a16="http://schemas.microsoft.com/office/drawing/2014/main" id="{CF5C9E10-448B-F945-BDB2-68260461DD67}"/>
+                  <a16:creationId xmlns:a16="http://schemas.microsoft.com/office/drawing/2014/main" xmlns="" id="{CF5C9E10-448B-F945-BDB2-68260461DD67}"/>
                 </a:ext>
               </a:extLst>
             </p:cNvPr>
@@ -5297,7 +5299,7 @@
             <p:cNvPr id="10" name="TextBox 9">
               <a:extLst>
                 <a:ext uri="{FF2B5EF4-FFF2-40B4-BE49-F238E27FC236}">
-                  <a16:creationId xmlns:a16="http://schemas.microsoft.com/office/drawing/2014/main" id="{FFC39BBD-2C9F-A441-B982-D45EDEFFB0E5}"/>
+                  <a16:creationId xmlns:a16="http://schemas.microsoft.com/office/drawing/2014/main" xmlns="" id="{FFC39BBD-2C9F-A441-B982-D45EDEFFB0E5}"/>
                 </a:ext>
               </a:extLst>
             </p:cNvPr>
@@ -5336,7 +5338,7 @@
             <p:cNvPr id="11" name="TextBox 10">
               <a:extLst>
                 <a:ext uri="{FF2B5EF4-FFF2-40B4-BE49-F238E27FC236}">
-                  <a16:creationId xmlns:a16="http://schemas.microsoft.com/office/drawing/2014/main" id="{6E340A3D-9611-684E-B25B-F9AB12BDD1D4}"/>
+                  <a16:creationId xmlns:a16="http://schemas.microsoft.com/office/drawing/2014/main" xmlns="" id="{6E340A3D-9611-684E-B25B-F9AB12BDD1D4}"/>
                 </a:ext>
               </a:extLst>
             </p:cNvPr>
@@ -5375,7 +5377,7 @@
             <p:cNvPr id="12" name="Straight Arrow Connector 11">
               <a:extLst>
                 <a:ext uri="{FF2B5EF4-FFF2-40B4-BE49-F238E27FC236}">
-                  <a16:creationId xmlns:a16="http://schemas.microsoft.com/office/drawing/2014/main" id="{735FC0BE-6106-9543-A10D-686E0BE6FB36}"/>
+                  <a16:creationId xmlns:a16="http://schemas.microsoft.com/office/drawing/2014/main" xmlns="" id="{735FC0BE-6106-9543-A10D-686E0BE6FB36}"/>
                 </a:ext>
               </a:extLst>
             </p:cNvPr>
@@ -5420,7 +5422,7 @@
             <p:cNvPr id="15" name="Straight Arrow Connector 14">
               <a:extLst>
                 <a:ext uri="{FF2B5EF4-FFF2-40B4-BE49-F238E27FC236}">
-                  <a16:creationId xmlns:a16="http://schemas.microsoft.com/office/drawing/2014/main" id="{F8024A55-957A-0D40-B26F-ABA50E186F24}"/>
+                  <a16:creationId xmlns:a16="http://schemas.microsoft.com/office/drawing/2014/main" xmlns="" id="{F8024A55-957A-0D40-B26F-ABA50E186F24}"/>
                 </a:ext>
               </a:extLst>
             </p:cNvPr>
@@ -5465,7 +5467,7 @@
             <p:cNvPr id="17" name="TextBox 16">
               <a:extLst>
                 <a:ext uri="{FF2B5EF4-FFF2-40B4-BE49-F238E27FC236}">
-                  <a16:creationId xmlns:a16="http://schemas.microsoft.com/office/drawing/2014/main" id="{16D3F9D4-E5F7-6B4D-A03D-0AA606EE74AB}"/>
+                  <a16:creationId xmlns:a16="http://schemas.microsoft.com/office/drawing/2014/main" xmlns="" id="{16D3F9D4-E5F7-6B4D-A03D-0AA606EE74AB}"/>
                 </a:ext>
               </a:extLst>
             </p:cNvPr>
@@ -5504,7 +5506,7 @@
             <p:cNvPr id="18" name="TextBox 17">
               <a:extLst>
                 <a:ext uri="{FF2B5EF4-FFF2-40B4-BE49-F238E27FC236}">
-                  <a16:creationId xmlns:a16="http://schemas.microsoft.com/office/drawing/2014/main" id="{8B25EDDD-F275-834A-AA71-146F0B514D87}"/>
+                  <a16:creationId xmlns:a16="http://schemas.microsoft.com/office/drawing/2014/main" xmlns="" id="{8B25EDDD-F275-834A-AA71-146F0B514D87}"/>
                 </a:ext>
               </a:extLst>
             </p:cNvPr>
@@ -5539,7 +5541,7 @@
             <p:cNvPr id="19" name="TextBox 18">
               <a:extLst>
                 <a:ext uri="{FF2B5EF4-FFF2-40B4-BE49-F238E27FC236}">
-                  <a16:creationId xmlns:a16="http://schemas.microsoft.com/office/drawing/2014/main" id="{F447B65D-C5AF-DB48-A22C-6A80F0DBED91}"/>
+                  <a16:creationId xmlns:a16="http://schemas.microsoft.com/office/drawing/2014/main" xmlns="" id="{F447B65D-C5AF-DB48-A22C-6A80F0DBED91}"/>
                 </a:ext>
               </a:extLst>
             </p:cNvPr>
@@ -5574,7 +5576,7 @@
             <p:cNvPr id="20" name="Arc 19">
               <a:extLst>
                 <a:ext uri="{FF2B5EF4-FFF2-40B4-BE49-F238E27FC236}">
-                  <a16:creationId xmlns:a16="http://schemas.microsoft.com/office/drawing/2014/main" id="{2A1C4EA9-9F3E-6C4D-A9D7-CC767EFDC316}"/>
+                  <a16:creationId xmlns:a16="http://schemas.microsoft.com/office/drawing/2014/main" xmlns="" id="{2A1C4EA9-9F3E-6C4D-A9D7-CC767EFDC316}"/>
                 </a:ext>
               </a:extLst>
             </p:cNvPr>
@@ -5626,7 +5628,7 @@
             <p:cNvPr id="21" name="TextBox 20">
               <a:extLst>
                 <a:ext uri="{FF2B5EF4-FFF2-40B4-BE49-F238E27FC236}">
-                  <a16:creationId xmlns:a16="http://schemas.microsoft.com/office/drawing/2014/main" id="{6906D6A8-C6DC-7E42-B6AC-74F70CA0B1F4}"/>
+                  <a16:creationId xmlns:a16="http://schemas.microsoft.com/office/drawing/2014/main" xmlns="" id="{6906D6A8-C6DC-7E42-B6AC-74F70CA0B1F4}"/>
                 </a:ext>
               </a:extLst>
             </p:cNvPr>
@@ -5661,6 +5663,384 @@
     <p:extLst>
       <p:ext uri="{BB962C8B-B14F-4D97-AF65-F5344CB8AC3E}">
         <p14:creationId xmlns:p14="http://schemas.microsoft.com/office/powerpoint/2010/main" val="4073120337"/>
+      </p:ext>
+    </p:extLst>
+  </p:cSld>
+  <p:clrMapOvr>
+    <a:masterClrMapping/>
+  </p:clrMapOvr>
+</p:sld>
+</file>
+
+<file path=ppt/slides/slide3.xml><?xml version="1.0" encoding="utf-8"?>
+<p:sld xmlns:a="http://schemas.openxmlformats.org/drawingml/2006/main" xmlns:r="http://schemas.openxmlformats.org/officeDocument/2006/relationships" xmlns:p="http://schemas.openxmlformats.org/presentationml/2006/main">
+  <p:cSld>
+    <p:spTree>
+      <p:nvGrpSpPr>
+        <p:cNvPr id="1" name=""/>
+        <p:cNvGrpSpPr/>
+        <p:nvPr/>
+      </p:nvGrpSpPr>
+      <p:grpSpPr>
+        <a:xfrm>
+          <a:off x="0" y="0"/>
+          <a:ext cx="0" cy="0"/>
+          <a:chOff x="0" y="0"/>
+          <a:chExt cx="0" cy="0"/>
+        </a:xfrm>
+      </p:grpSpPr>
+      <p:grpSp>
+        <p:nvGrpSpPr>
+          <p:cNvPr id="18" name="Group 17"/>
+          <p:cNvGrpSpPr/>
+          <p:nvPr/>
+        </p:nvGrpSpPr>
+        <p:grpSpPr>
+          <a:xfrm>
+            <a:off x="3429000" y="1145893"/>
+            <a:ext cx="2099683" cy="3680750"/>
+            <a:chOff x="3429000" y="1122743"/>
+            <a:chExt cx="2099683" cy="3680750"/>
+          </a:xfrm>
+        </p:grpSpPr>
+        <p:pic>
+          <p:nvPicPr>
+            <p:cNvPr id="4" name="Picture 3">
+              <a:extLst>
+                <a:ext uri="{FF2B5EF4-FFF2-40B4-BE49-F238E27FC236}">
+                  <a16:creationId xmlns="" xmlns:a16="http://schemas.microsoft.com/office/drawing/2014/main" id="{9594DC97-7FD9-6C4C-AA8C-A206E9FDE4B1}"/>
+                </a:ext>
+              </a:extLst>
+            </p:cNvPr>
+            <p:cNvPicPr>
+              <a:picLocks noChangeAspect="1"/>
+            </p:cNvPicPr>
+            <p:nvPr/>
+          </p:nvPicPr>
+          <p:blipFill>
+            <a:blip r:embed="rId2"/>
+            <a:stretch>
+              <a:fillRect/>
+            </a:stretch>
+          </p:blipFill>
+          <p:spPr>
+            <a:xfrm rot="21300000">
+              <a:off x="3429000" y="2339786"/>
+              <a:ext cx="1974164" cy="2167128"/>
+            </a:xfrm>
+            <a:prstGeom prst="rect">
+              <a:avLst/>
+            </a:prstGeom>
+          </p:spPr>
+        </p:pic>
+        <p:sp>
+          <p:nvSpPr>
+            <p:cNvPr id="5" name="TextBox 4"/>
+            <p:cNvSpPr txBox="1"/>
+            <p:nvPr/>
+          </p:nvSpPr>
+          <p:spPr>
+            <a:xfrm>
+              <a:off x="3437447" y="2453831"/>
+              <a:ext cx="415498" cy="523220"/>
+            </a:xfrm>
+            <a:prstGeom prst="rect">
+              <a:avLst/>
+            </a:prstGeom>
+            <a:noFill/>
+          </p:spPr>
+          <p:txBody>
+            <a:bodyPr wrap="none" rtlCol="0">
+              <a:spAutoFit/>
+            </a:bodyPr>
+            <a:lstStyle/>
+            <a:p>
+              <a:r>
+                <a:rPr lang="en-US" sz="2800" dirty="0" smtClean="0"/>
+                <a:t>U</a:t>
+              </a:r>
+              <a:endParaRPr lang="en-US" sz="2800" dirty="0"/>
+            </a:p>
+          </p:txBody>
+        </p:sp>
+        <p:sp>
+          <p:nvSpPr>
+            <p:cNvPr id="6" name="TextBox 5"/>
+            <p:cNvSpPr txBox="1"/>
+            <p:nvPr/>
+          </p:nvSpPr>
+          <p:spPr>
+            <a:xfrm>
+              <a:off x="5140435" y="2453831"/>
+              <a:ext cx="388248" cy="523220"/>
+            </a:xfrm>
+            <a:prstGeom prst="rect">
+              <a:avLst/>
+            </a:prstGeom>
+            <a:noFill/>
+          </p:spPr>
+          <p:txBody>
+            <a:bodyPr wrap="none" rtlCol="0">
+              <a:spAutoFit/>
+            </a:bodyPr>
+            <a:lstStyle/>
+            <a:p>
+              <a:r>
+                <a:rPr lang="en-US" sz="2800" dirty="0" smtClean="0"/>
+                <a:t>V</a:t>
+              </a:r>
+              <a:endParaRPr lang="en-US" sz="2800" dirty="0"/>
+            </a:p>
+          </p:txBody>
+        </p:sp>
+        <p:cxnSp>
+          <p:nvCxnSpPr>
+            <p:cNvPr id="8" name="Straight Connector 7"/>
+            <p:cNvCxnSpPr/>
+            <p:nvPr/>
+          </p:nvCxnSpPr>
+          <p:spPr>
+            <a:xfrm flipV="1">
+              <a:off x="4462382" y="1122743"/>
+              <a:ext cx="0" cy="3680750"/>
+            </a:xfrm>
+            <a:prstGeom prst="line">
+              <a:avLst/>
+            </a:prstGeom>
+            <a:ln w="28575">
+              <a:prstDash val="solid"/>
+            </a:ln>
+          </p:spPr>
+          <p:style>
+            <a:lnRef idx="1">
+              <a:schemeClr val="accent1"/>
+            </a:lnRef>
+            <a:fillRef idx="0">
+              <a:schemeClr val="accent1"/>
+            </a:fillRef>
+            <a:effectRef idx="0">
+              <a:schemeClr val="accent1"/>
+            </a:effectRef>
+            <a:fontRef idx="minor">
+              <a:schemeClr val="tx1"/>
+            </a:fontRef>
+          </p:style>
+        </p:cxnSp>
+        <p:cxnSp>
+          <p:nvCxnSpPr>
+            <p:cNvPr id="11" name="Straight Connector 10"/>
+            <p:cNvCxnSpPr/>
+            <p:nvPr/>
+          </p:nvCxnSpPr>
+          <p:spPr>
+            <a:xfrm flipV="1">
+              <a:off x="3975225" y="1375489"/>
+              <a:ext cx="1512091" cy="2966948"/>
+            </a:xfrm>
+            <a:prstGeom prst="line">
+              <a:avLst/>
+            </a:prstGeom>
+            <a:ln w="28575">
+              <a:prstDash val="solid"/>
+            </a:ln>
+          </p:spPr>
+          <p:style>
+            <a:lnRef idx="1">
+              <a:schemeClr val="accent1"/>
+            </a:lnRef>
+            <a:fillRef idx="0">
+              <a:schemeClr val="accent1"/>
+            </a:fillRef>
+            <a:effectRef idx="0">
+              <a:schemeClr val="accent1"/>
+            </a:effectRef>
+            <a:fontRef idx="minor">
+              <a:schemeClr val="tx1"/>
+            </a:fontRef>
+          </p:style>
+        </p:cxnSp>
+        <p:sp>
+          <p:nvSpPr>
+            <p:cNvPr id="15" name="Arc 14"/>
+            <p:cNvSpPr/>
+            <p:nvPr/>
+          </p:nvSpPr>
+          <p:spPr>
+            <a:xfrm>
+              <a:off x="3529907" y="1856966"/>
+              <a:ext cx="1864949" cy="1425226"/>
+            </a:xfrm>
+            <a:prstGeom prst="arc">
+              <a:avLst>
+                <a:gd name="adj1" fmla="val 16200000"/>
+                <a:gd name="adj2" fmla="val 19329949"/>
+              </a:avLst>
+            </a:prstGeom>
+            <a:ln w="28575"/>
+          </p:spPr>
+          <p:style>
+            <a:lnRef idx="1">
+              <a:schemeClr val="accent1"/>
+            </a:lnRef>
+            <a:fillRef idx="0">
+              <a:schemeClr val="accent1"/>
+            </a:fillRef>
+            <a:effectRef idx="0">
+              <a:schemeClr val="accent1"/>
+            </a:effectRef>
+            <a:fontRef idx="minor">
+              <a:schemeClr val="tx1"/>
+            </a:fontRef>
+          </p:style>
+          <p:txBody>
+            <a:bodyPr rtlCol="0" anchor="ctr"/>
+            <a:lstStyle/>
+            <a:p>
+              <a:pPr algn="ctr"/>
+              <a:endParaRPr lang="en-US"/>
+            </a:p>
+          </p:txBody>
+        </p:sp>
+        <p:sp>
+          <p:nvSpPr>
+            <p:cNvPr id="16" name="TextBox 15"/>
+            <p:cNvSpPr txBox="1"/>
+            <p:nvPr/>
+          </p:nvSpPr>
+          <p:spPr>
+            <a:xfrm>
+              <a:off x="4611912" y="1511599"/>
+              <a:ext cx="554960" cy="369332"/>
+            </a:xfrm>
+            <a:prstGeom prst="rect">
+              <a:avLst/>
+            </a:prstGeom>
+            <a:noFill/>
+          </p:spPr>
+          <p:txBody>
+            <a:bodyPr wrap="none" rtlCol="0">
+              <a:spAutoFit/>
+            </a:bodyPr>
+            <a:lstStyle/>
+            <a:p>
+              <a:r>
+                <a:rPr lang="en-US" smtClean="0"/>
+                <a:t>7.5°</a:t>
+              </a:r>
+              <a:endParaRPr lang="en-US"/>
+            </a:p>
+          </p:txBody>
+        </p:sp>
+      </p:grpSp>
+    </p:spTree>
+    <p:extLst>
+      <p:ext uri="{BB962C8B-B14F-4D97-AF65-F5344CB8AC3E}">
+        <p14:creationId xmlns:p14="http://schemas.microsoft.com/office/powerpoint/2010/main" val="861734353"/>
+      </p:ext>
+    </p:extLst>
+  </p:cSld>
+  <p:clrMapOvr>
+    <a:masterClrMapping/>
+  </p:clrMapOvr>
+</p:sld>
+</file>
+
+<file path=ppt/slides/slide4.xml><?xml version="1.0" encoding="utf-8"?>
+<p:sld xmlns:a="http://schemas.openxmlformats.org/drawingml/2006/main" xmlns:r="http://schemas.openxmlformats.org/officeDocument/2006/relationships" xmlns:p="http://schemas.openxmlformats.org/presentationml/2006/main">
+  <p:cSld>
+    <p:spTree>
+      <p:nvGrpSpPr>
+        <p:cNvPr id="1" name=""/>
+        <p:cNvGrpSpPr/>
+        <p:nvPr/>
+      </p:nvGrpSpPr>
+      <p:grpSpPr>
+        <a:xfrm>
+          <a:off x="0" y="0"/>
+          <a:ext cx="0" cy="0"/>
+          <a:chOff x="0" y="0"/>
+          <a:chExt cx="0" cy="0"/>
+        </a:xfrm>
+      </p:grpSpPr>
+      <p:grpSp>
+        <p:nvGrpSpPr>
+          <p:cNvPr id="6" name="Group 5"/>
+          <p:cNvGrpSpPr/>
+          <p:nvPr/>
+        </p:nvGrpSpPr>
+        <p:grpSpPr>
+          <a:xfrm>
+            <a:off x="1534081" y="1111169"/>
+            <a:ext cx="5539710" cy="3221138"/>
+            <a:chOff x="1534081" y="1111169"/>
+            <a:chExt cx="5539710" cy="3221138"/>
+          </a:xfrm>
+        </p:grpSpPr>
+        <p:pic>
+          <p:nvPicPr>
+            <p:cNvPr id="4" name="Picture 3"/>
+            <p:cNvPicPr>
+              <a:picLocks noChangeAspect="1"/>
+            </p:cNvPicPr>
+            <p:nvPr/>
+          </p:nvPicPr>
+          <p:blipFill>
+            <a:blip r:embed="rId2">
+              <a:extLst>
+                <a:ext uri="{28A0092B-C50C-407E-A947-70E740481C1C}">
+                  <a14:useLocalDpi xmlns:a14="http://schemas.microsoft.com/office/drawing/2010/main" val="0"/>
+                </a:ext>
+              </a:extLst>
+            </a:blip>
+            <a:stretch>
+              <a:fillRect/>
+            </a:stretch>
+          </p:blipFill>
+          <p:spPr>
+            <a:xfrm>
+              <a:off x="1534081" y="1111169"/>
+              <a:ext cx="5539710" cy="3221138"/>
+            </a:xfrm>
+            <a:prstGeom prst="rect">
+              <a:avLst/>
+            </a:prstGeom>
+          </p:spPr>
+        </p:pic>
+        <p:sp>
+          <p:nvSpPr>
+            <p:cNvPr id="5" name="TextBox 4"/>
+            <p:cNvSpPr txBox="1"/>
+            <p:nvPr/>
+          </p:nvSpPr>
+          <p:spPr>
+            <a:xfrm>
+              <a:off x="1794077" y="3962975"/>
+              <a:ext cx="4269246" cy="369332"/>
+            </a:xfrm>
+            <a:prstGeom prst="rect">
+              <a:avLst/>
+            </a:prstGeom>
+            <a:noFill/>
+          </p:spPr>
+          <p:txBody>
+            <a:bodyPr wrap="none" rtlCol="0">
+              <a:spAutoFit/>
+            </a:bodyPr>
+            <a:lstStyle/>
+            <a:p>
+              <a:r>
+                <a:rPr lang="en-US" dirty="0" smtClean="0"/>
+                <a:t>Straws: 32 ----------------------------------------- 1</a:t>
+              </a:r>
+              <a:endParaRPr lang="en-US" dirty="0"/>
+            </a:p>
+          </p:txBody>
+        </p:sp>
+      </p:grpSp>
+    </p:spTree>
+    <p:extLst>
+      <p:ext uri="{BB962C8B-B14F-4D97-AF65-F5344CB8AC3E}">
+        <p14:creationId xmlns:p14="http://schemas.microsoft.com/office/powerpoint/2010/main" val="1956453261"/>
       </p:ext>
     </p:extLst>
   </p:cSld>

</xml_diff>

<commit_message>
Added drift time pictures.
</commit_message>
<xml_diff>
--- a/KinnairdThesis/Body/Figures/ThesisImages.pptx
+++ b/KinnairdThesis/Body/Figures/ThesisImages.pptx
@@ -9,6 +9,7 @@
     <p:sldId id="257" r:id="rId3"/>
     <p:sldId id="258" r:id="rId4"/>
     <p:sldId id="259" r:id="rId5"/>
+    <p:sldId id="260" r:id="rId6"/>
   </p:sldIdLst>
   <p:sldSz cx="12192000" cy="6858000"/>
   <p:notesSz cx="6858000" cy="9144000"/>
@@ -262,7 +263,7 @@
           <a:p>
             <a:fld id="{45D29F64-CD52-9145-B05C-AB9DB2C6669A}" type="datetimeFigureOut">
               <a:rPr lang="en-US" smtClean="0"/>
-              <a:t>4/23/19</a:t>
+              <a:t>4/24/19</a:t>
             </a:fld>
             <a:endParaRPr lang="en-US"/>
           </a:p>
@@ -460,7 +461,7 @@
           <a:p>
             <a:fld id="{45D29F64-CD52-9145-B05C-AB9DB2C6669A}" type="datetimeFigureOut">
               <a:rPr lang="en-US" smtClean="0"/>
-              <a:t>4/23/19</a:t>
+              <a:t>4/24/19</a:t>
             </a:fld>
             <a:endParaRPr lang="en-US"/>
           </a:p>
@@ -668,7 +669,7 @@
           <a:p>
             <a:fld id="{45D29F64-CD52-9145-B05C-AB9DB2C6669A}" type="datetimeFigureOut">
               <a:rPr lang="en-US" smtClean="0"/>
-              <a:t>4/23/19</a:t>
+              <a:t>4/24/19</a:t>
             </a:fld>
             <a:endParaRPr lang="en-US"/>
           </a:p>
@@ -866,7 +867,7 @@
           <a:p>
             <a:fld id="{45D29F64-CD52-9145-B05C-AB9DB2C6669A}" type="datetimeFigureOut">
               <a:rPr lang="en-US" smtClean="0"/>
-              <a:t>4/23/19</a:t>
+              <a:t>4/24/19</a:t>
             </a:fld>
             <a:endParaRPr lang="en-US"/>
           </a:p>
@@ -1141,7 +1142,7 @@
           <a:p>
             <a:fld id="{45D29F64-CD52-9145-B05C-AB9DB2C6669A}" type="datetimeFigureOut">
               <a:rPr lang="en-US" smtClean="0"/>
-              <a:t>4/23/19</a:t>
+              <a:t>4/24/19</a:t>
             </a:fld>
             <a:endParaRPr lang="en-US"/>
           </a:p>
@@ -1406,7 +1407,7 @@
           <a:p>
             <a:fld id="{45D29F64-CD52-9145-B05C-AB9DB2C6669A}" type="datetimeFigureOut">
               <a:rPr lang="en-US" smtClean="0"/>
-              <a:t>4/23/19</a:t>
+              <a:t>4/24/19</a:t>
             </a:fld>
             <a:endParaRPr lang="en-US"/>
           </a:p>
@@ -1818,7 +1819,7 @@
           <a:p>
             <a:fld id="{45D29F64-CD52-9145-B05C-AB9DB2C6669A}" type="datetimeFigureOut">
               <a:rPr lang="en-US" smtClean="0"/>
-              <a:t>4/23/19</a:t>
+              <a:t>4/24/19</a:t>
             </a:fld>
             <a:endParaRPr lang="en-US"/>
           </a:p>
@@ -1959,7 +1960,7 @@
           <a:p>
             <a:fld id="{45D29F64-CD52-9145-B05C-AB9DB2C6669A}" type="datetimeFigureOut">
               <a:rPr lang="en-US" smtClean="0"/>
-              <a:t>4/23/19</a:t>
+              <a:t>4/24/19</a:t>
             </a:fld>
             <a:endParaRPr lang="en-US"/>
           </a:p>
@@ -2072,7 +2073,7 @@
           <a:p>
             <a:fld id="{45D29F64-CD52-9145-B05C-AB9DB2C6669A}" type="datetimeFigureOut">
               <a:rPr lang="en-US" smtClean="0"/>
-              <a:t>4/23/19</a:t>
+              <a:t>4/24/19</a:t>
             </a:fld>
             <a:endParaRPr lang="en-US"/>
           </a:p>
@@ -2383,7 +2384,7 @@
           <a:p>
             <a:fld id="{45D29F64-CD52-9145-B05C-AB9DB2C6669A}" type="datetimeFigureOut">
               <a:rPr lang="en-US" smtClean="0"/>
-              <a:t>4/23/19</a:t>
+              <a:t>4/24/19</a:t>
             </a:fld>
             <a:endParaRPr lang="en-US"/>
           </a:p>
@@ -2671,7 +2672,7 @@
           <a:p>
             <a:fld id="{45D29F64-CD52-9145-B05C-AB9DB2C6669A}" type="datetimeFigureOut">
               <a:rPr lang="en-US" smtClean="0"/>
-              <a:t>4/23/19</a:t>
+              <a:t>4/24/19</a:t>
             </a:fld>
             <a:endParaRPr lang="en-US"/>
           </a:p>
@@ -2912,7 +2913,7 @@
           <a:p>
             <a:fld id="{45D29F64-CD52-9145-B05C-AB9DB2C6669A}" type="datetimeFigureOut">
               <a:rPr lang="en-US" smtClean="0"/>
-              <a:t>4/23/19</a:t>
+              <a:t>4/24/19</a:t>
             </a:fld>
             <a:endParaRPr lang="en-US"/>
           </a:p>
@@ -6050,6 +6051,403 @@
 </p:sld>
 </file>
 
+<file path=ppt/slides/slide5.xml><?xml version="1.0" encoding="utf-8"?>
+<p:sld xmlns:a="http://schemas.openxmlformats.org/drawingml/2006/main" xmlns:r="http://schemas.openxmlformats.org/officeDocument/2006/relationships" xmlns:p="http://schemas.openxmlformats.org/presentationml/2006/main">
+  <p:cSld>
+    <p:spTree>
+      <p:nvGrpSpPr>
+        <p:cNvPr id="1" name=""/>
+        <p:cNvGrpSpPr/>
+        <p:nvPr/>
+      </p:nvGrpSpPr>
+      <p:grpSpPr>
+        <a:xfrm>
+          <a:off x="0" y="0"/>
+          <a:ext cx="0" cy="0"/>
+          <a:chOff x="0" y="0"/>
+          <a:chExt cx="0" cy="0"/>
+        </a:xfrm>
+      </p:grpSpPr>
+      <p:grpSp>
+        <p:nvGrpSpPr>
+          <p:cNvPr id="9" name="Group 8"/>
+          <p:cNvGrpSpPr/>
+          <p:nvPr/>
+        </p:nvGrpSpPr>
+        <p:grpSpPr>
+          <a:xfrm>
+            <a:off x="2578764" y="987552"/>
+            <a:ext cx="2569308" cy="3959352"/>
+            <a:chOff x="2578764" y="987552"/>
+            <a:chExt cx="2569308" cy="3959352"/>
+          </a:xfrm>
+        </p:grpSpPr>
+        <p:sp>
+          <p:nvSpPr>
+            <p:cNvPr id="2" name="Rectangle 1"/>
+            <p:cNvSpPr/>
+            <p:nvPr/>
+          </p:nvSpPr>
+          <p:spPr>
+            <a:xfrm>
+              <a:off x="2578764" y="987552"/>
+              <a:ext cx="2569308" cy="3959352"/>
+            </a:xfrm>
+            <a:prstGeom prst="rect">
+              <a:avLst/>
+            </a:prstGeom>
+            <a:solidFill>
+              <a:schemeClr val="bg1"/>
+            </a:solidFill>
+            <a:ln>
+              <a:noFill/>
+            </a:ln>
+          </p:spPr>
+          <p:style>
+            <a:lnRef idx="2">
+              <a:schemeClr val="accent1">
+                <a:shade val="50000"/>
+              </a:schemeClr>
+            </a:lnRef>
+            <a:fillRef idx="1">
+              <a:schemeClr val="accent1"/>
+            </a:fillRef>
+            <a:effectRef idx="0">
+              <a:schemeClr val="accent1"/>
+            </a:effectRef>
+            <a:fontRef idx="minor">
+              <a:schemeClr val="lt1"/>
+            </a:fontRef>
+          </p:style>
+          <p:txBody>
+            <a:bodyPr rtlCol="0" anchor="ctr"/>
+            <a:lstStyle/>
+            <a:p>
+              <a:pPr algn="ctr"/>
+              <a:endParaRPr lang="en-US"/>
+            </a:p>
+          </p:txBody>
+        </p:sp>
+        <p:pic>
+          <p:nvPicPr>
+            <p:cNvPr id="4" name="Picture 3">
+              <a:extLst>
+                <a:ext uri="{FF2B5EF4-FFF2-40B4-BE49-F238E27FC236}">
+                  <a16:creationId xmlns:a16="http://schemas.microsoft.com/office/drawing/2014/main" xmlns="" id="{2E17FE61-10C3-E64B-ABB3-5FFD96909365}"/>
+                </a:ext>
+              </a:extLst>
+            </p:cNvPr>
+            <p:cNvPicPr>
+              <a:picLocks noChangeAspect="1"/>
+            </p:cNvPicPr>
+            <p:nvPr/>
+          </p:nvPicPr>
+          <p:blipFill rotWithShape="1">
+            <a:blip r:embed="rId2"/>
+            <a:srcRect r="43312"/>
+            <a:stretch/>
+          </p:blipFill>
+          <p:spPr>
+            <a:xfrm>
+              <a:off x="2578764" y="1648825"/>
+              <a:ext cx="2433644" cy="2962297"/>
+            </a:xfrm>
+            <a:prstGeom prst="rect">
+              <a:avLst/>
+            </a:prstGeom>
+          </p:spPr>
+        </p:pic>
+        <p:sp>
+          <p:nvSpPr>
+            <p:cNvPr id="5" name="Donut 4">
+              <a:extLst>
+                <a:ext uri="{FF2B5EF4-FFF2-40B4-BE49-F238E27FC236}">
+                  <a16:creationId xmlns:a16="http://schemas.microsoft.com/office/drawing/2014/main" xmlns="" id="{A05B1990-5D9B-6044-AC97-F08B64FB7307}"/>
+                </a:ext>
+              </a:extLst>
+            </p:cNvPr>
+            <p:cNvSpPr/>
+            <p:nvPr/>
+          </p:nvSpPr>
+          <p:spPr>
+            <a:xfrm>
+              <a:off x="3544963" y="2044065"/>
+              <a:ext cx="261256" cy="261256"/>
+            </a:xfrm>
+            <a:prstGeom prst="donut">
+              <a:avLst>
+                <a:gd name="adj" fmla="val 793"/>
+              </a:avLst>
+            </a:prstGeom>
+            <a:solidFill>
+              <a:srgbClr val="FF0000"/>
+            </a:solidFill>
+            <a:ln w="12700">
+              <a:solidFill>
+                <a:srgbClr val="FF0000"/>
+              </a:solidFill>
+            </a:ln>
+          </p:spPr>
+          <p:style>
+            <a:lnRef idx="2">
+              <a:schemeClr val="accent1">
+                <a:shade val="50000"/>
+              </a:schemeClr>
+            </a:lnRef>
+            <a:fillRef idx="1">
+              <a:schemeClr val="accent1"/>
+            </a:fillRef>
+            <a:effectRef idx="0">
+              <a:schemeClr val="accent1"/>
+            </a:effectRef>
+            <a:fontRef idx="minor">
+              <a:schemeClr val="lt1"/>
+            </a:fontRef>
+          </p:style>
+          <p:txBody>
+            <a:bodyPr rtlCol="0" anchor="ctr"/>
+            <a:lstStyle/>
+            <a:p>
+              <a:pPr algn="ctr"/>
+              <a:endParaRPr lang="en-US">
+                <a:solidFill>
+                  <a:schemeClr val="tx1"/>
+                </a:solidFill>
+              </a:endParaRPr>
+            </a:p>
+          </p:txBody>
+        </p:sp>
+        <p:sp>
+          <p:nvSpPr>
+            <p:cNvPr id="6" name="Donut 5">
+              <a:extLst>
+                <a:ext uri="{FF2B5EF4-FFF2-40B4-BE49-F238E27FC236}">
+                  <a16:creationId xmlns:a16="http://schemas.microsoft.com/office/drawing/2014/main" xmlns="" id="{E87D4265-32C9-8641-9224-27CBAEBBC555}"/>
+                </a:ext>
+              </a:extLst>
+            </p:cNvPr>
+            <p:cNvSpPr/>
+            <p:nvPr/>
+          </p:nvSpPr>
+          <p:spPr>
+            <a:xfrm>
+              <a:off x="3815380" y="4058910"/>
+              <a:ext cx="170213" cy="170213"/>
+            </a:xfrm>
+            <a:prstGeom prst="donut">
+              <a:avLst>
+                <a:gd name="adj" fmla="val 793"/>
+              </a:avLst>
+            </a:prstGeom>
+            <a:solidFill>
+              <a:srgbClr val="FF0000"/>
+            </a:solidFill>
+            <a:ln w="12700">
+              <a:solidFill>
+                <a:srgbClr val="FF0000"/>
+              </a:solidFill>
+            </a:ln>
+          </p:spPr>
+          <p:style>
+            <a:lnRef idx="2">
+              <a:schemeClr val="accent1">
+                <a:shade val="50000"/>
+              </a:schemeClr>
+            </a:lnRef>
+            <a:fillRef idx="1">
+              <a:schemeClr val="accent1"/>
+            </a:fillRef>
+            <a:effectRef idx="0">
+              <a:schemeClr val="accent1"/>
+            </a:effectRef>
+            <a:fontRef idx="minor">
+              <a:schemeClr val="lt1"/>
+            </a:fontRef>
+          </p:style>
+          <p:txBody>
+            <a:bodyPr rtlCol="0" anchor="ctr"/>
+            <a:lstStyle/>
+            <a:p>
+              <a:pPr algn="ctr"/>
+              <a:endParaRPr lang="en-US">
+                <a:solidFill>
+                  <a:schemeClr val="tx1"/>
+                </a:solidFill>
+              </a:endParaRPr>
+            </a:p>
+          </p:txBody>
+        </p:sp>
+        <p:sp>
+          <p:nvSpPr>
+            <p:cNvPr id="7" name="Donut 6">
+              <a:extLst>
+                <a:ext uri="{FF2B5EF4-FFF2-40B4-BE49-F238E27FC236}">
+                  <a16:creationId xmlns:a16="http://schemas.microsoft.com/office/drawing/2014/main" xmlns="" id="{94E5F9FB-A235-5A4B-ACA8-09116E31D8B2}"/>
+                </a:ext>
+              </a:extLst>
+            </p:cNvPr>
+            <p:cNvSpPr/>
+            <p:nvPr/>
+          </p:nvSpPr>
+          <p:spPr>
+            <a:xfrm>
+              <a:off x="3547223" y="3612032"/>
+              <a:ext cx="261256" cy="261256"/>
+            </a:xfrm>
+            <a:prstGeom prst="donut">
+              <a:avLst>
+                <a:gd name="adj" fmla="val 793"/>
+              </a:avLst>
+            </a:prstGeom>
+            <a:solidFill>
+              <a:srgbClr val="FF0000"/>
+            </a:solidFill>
+            <a:ln w="12700">
+              <a:solidFill>
+                <a:srgbClr val="FF0000"/>
+              </a:solidFill>
+            </a:ln>
+          </p:spPr>
+          <p:style>
+            <a:lnRef idx="2">
+              <a:schemeClr val="accent1">
+                <a:shade val="50000"/>
+              </a:schemeClr>
+            </a:lnRef>
+            <a:fillRef idx="1">
+              <a:schemeClr val="accent1"/>
+            </a:fillRef>
+            <a:effectRef idx="0">
+              <a:schemeClr val="accent1"/>
+            </a:effectRef>
+            <a:fontRef idx="minor">
+              <a:schemeClr val="lt1"/>
+            </a:fontRef>
+          </p:style>
+          <p:txBody>
+            <a:bodyPr rtlCol="0" anchor="ctr"/>
+            <a:lstStyle/>
+            <a:p>
+              <a:pPr algn="ctr"/>
+              <a:endParaRPr lang="en-US">
+                <a:solidFill>
+                  <a:schemeClr val="tx1"/>
+                </a:solidFill>
+              </a:endParaRPr>
+            </a:p>
+          </p:txBody>
+        </p:sp>
+        <p:sp>
+          <p:nvSpPr>
+            <p:cNvPr id="8" name="Donut 7">
+              <a:extLst>
+                <a:ext uri="{FF2B5EF4-FFF2-40B4-BE49-F238E27FC236}">
+                  <a16:creationId xmlns:a16="http://schemas.microsoft.com/office/drawing/2014/main" xmlns="" id="{A8505250-A9B4-8441-82AA-79C65E428040}"/>
+                </a:ext>
+              </a:extLst>
+            </p:cNvPr>
+            <p:cNvSpPr/>
+            <p:nvPr/>
+          </p:nvSpPr>
+          <p:spPr>
+            <a:xfrm>
+              <a:off x="3801529" y="2489386"/>
+              <a:ext cx="170213" cy="170213"/>
+            </a:xfrm>
+            <a:prstGeom prst="donut">
+              <a:avLst>
+                <a:gd name="adj" fmla="val 793"/>
+              </a:avLst>
+            </a:prstGeom>
+            <a:solidFill>
+              <a:srgbClr val="FF0000"/>
+            </a:solidFill>
+            <a:ln w="12700">
+              <a:solidFill>
+                <a:srgbClr val="FF0000"/>
+              </a:solidFill>
+            </a:ln>
+          </p:spPr>
+          <p:style>
+            <a:lnRef idx="2">
+              <a:schemeClr val="accent1">
+                <a:shade val="50000"/>
+              </a:schemeClr>
+            </a:lnRef>
+            <a:fillRef idx="1">
+              <a:schemeClr val="accent1"/>
+            </a:fillRef>
+            <a:effectRef idx="0">
+              <a:schemeClr val="accent1"/>
+            </a:effectRef>
+            <a:fontRef idx="minor">
+              <a:schemeClr val="lt1"/>
+            </a:fontRef>
+          </p:style>
+          <p:txBody>
+            <a:bodyPr rtlCol="0" anchor="ctr"/>
+            <a:lstStyle/>
+            <a:p>
+              <a:pPr algn="ctr"/>
+              <a:endParaRPr lang="en-US">
+                <a:solidFill>
+                  <a:schemeClr val="tx1"/>
+                </a:solidFill>
+              </a:endParaRPr>
+            </a:p>
+          </p:txBody>
+        </p:sp>
+        <p:cxnSp>
+          <p:nvCxnSpPr>
+            <p:cNvPr id="10" name="Straight Connector 9"/>
+            <p:cNvCxnSpPr/>
+            <p:nvPr/>
+          </p:nvCxnSpPr>
+          <p:spPr>
+            <a:xfrm>
+              <a:off x="3813874" y="1389888"/>
+              <a:ext cx="0" cy="3364992"/>
+            </a:xfrm>
+            <a:prstGeom prst="line">
+              <a:avLst/>
+            </a:prstGeom>
+            <a:ln w="19050">
+              <a:solidFill>
+                <a:schemeClr val="tx1"/>
+              </a:solidFill>
+              <a:headEnd type="arrow" w="med" len="med"/>
+              <a:tailEnd type="none" w="med" len="med"/>
+            </a:ln>
+          </p:spPr>
+          <p:style>
+            <a:lnRef idx="1">
+              <a:schemeClr val="accent1"/>
+            </a:lnRef>
+            <a:fillRef idx="0">
+              <a:schemeClr val="accent1"/>
+            </a:fillRef>
+            <a:effectRef idx="0">
+              <a:schemeClr val="accent1"/>
+            </a:effectRef>
+            <a:fontRef idx="minor">
+              <a:schemeClr val="tx1"/>
+            </a:fontRef>
+          </p:style>
+        </p:cxnSp>
+      </p:grpSp>
+    </p:spTree>
+    <p:extLst>
+      <p:ext uri="{BB962C8B-B14F-4D97-AF65-F5344CB8AC3E}">
+        <p14:creationId xmlns:p14="http://schemas.microsoft.com/office/powerpoint/2010/main" val="473552350"/>
+      </p:ext>
+    </p:extLst>
+  </p:cSld>
+  <p:clrMapOvr>
+    <a:masterClrMapping/>
+  </p:clrMapOvr>
+</p:sld>
+</file>
+
 <file path=ppt/theme/theme1.xml><?xml version="1.0" encoding="utf-8"?>
 <a:theme xmlns:a="http://schemas.openxmlformats.org/drawingml/2006/main" name="Office Theme">
   <a:themeElements>

</xml_diff>

<commit_message>
Added new 2d opera pics with fixed up text.
</commit_message>
<xml_diff>
--- a/KinnairdThesis/Body/Figures/ThesisImages.pptx
+++ b/KinnairdThesis/Body/Figures/ThesisImages.pptx
@@ -10,6 +10,8 @@
     <p:sldId id="258" r:id="rId4"/>
     <p:sldId id="259" r:id="rId5"/>
     <p:sldId id="260" r:id="rId6"/>
+    <p:sldId id="261" r:id="rId7"/>
+    <p:sldId id="262" r:id="rId8"/>
   </p:sldIdLst>
   <p:sldSz cx="12192000" cy="6858000"/>
   <p:notesSz cx="6858000" cy="9144000"/>
@@ -138,7 +140,7 @@
           <p:cNvPr id="2" name="Title 1">
             <a:extLst>
               <a:ext uri="{FF2B5EF4-FFF2-40B4-BE49-F238E27FC236}">
-                <a16:creationId xmlns:a16="http://schemas.microsoft.com/office/drawing/2014/main" xmlns="" id="{1B57B3C4-E435-3843-ADF5-0E6600617A31}"/>
+                <a16:creationId xmlns="" xmlns:a16="http://schemas.microsoft.com/office/drawing/2014/main" id="{1B57B3C4-E435-3843-ADF5-0E6600617A31}"/>
               </a:ext>
             </a:extLst>
           </p:cNvPr>
@@ -175,7 +177,7 @@
           <p:cNvPr id="3" name="Subtitle 2">
             <a:extLst>
               <a:ext uri="{FF2B5EF4-FFF2-40B4-BE49-F238E27FC236}">
-                <a16:creationId xmlns:a16="http://schemas.microsoft.com/office/drawing/2014/main" xmlns="" id="{B014CD73-195A-E146-85B8-CBD8E010BCF0}"/>
+                <a16:creationId xmlns="" xmlns:a16="http://schemas.microsoft.com/office/drawing/2014/main" id="{B014CD73-195A-E146-85B8-CBD8E010BCF0}"/>
               </a:ext>
             </a:extLst>
           </p:cNvPr>
@@ -245,7 +247,7 @@
           <p:cNvPr id="4" name="Date Placeholder 3">
             <a:extLst>
               <a:ext uri="{FF2B5EF4-FFF2-40B4-BE49-F238E27FC236}">
-                <a16:creationId xmlns:a16="http://schemas.microsoft.com/office/drawing/2014/main" xmlns="" id="{658C6929-9B51-6044-B476-05C2B4D39479}"/>
+                <a16:creationId xmlns="" xmlns:a16="http://schemas.microsoft.com/office/drawing/2014/main" id="{658C6929-9B51-6044-B476-05C2B4D39479}"/>
               </a:ext>
             </a:extLst>
           </p:cNvPr>
@@ -274,7 +276,7 @@
           <p:cNvPr id="5" name="Footer Placeholder 4">
             <a:extLst>
               <a:ext uri="{FF2B5EF4-FFF2-40B4-BE49-F238E27FC236}">
-                <a16:creationId xmlns:a16="http://schemas.microsoft.com/office/drawing/2014/main" xmlns="" id="{EC3DA1B3-BF32-604F-9AA7-7B04982FD0E2}"/>
+                <a16:creationId xmlns="" xmlns:a16="http://schemas.microsoft.com/office/drawing/2014/main" id="{EC3DA1B3-BF32-604F-9AA7-7B04982FD0E2}"/>
               </a:ext>
             </a:extLst>
           </p:cNvPr>
@@ -299,7 +301,7 @@
           <p:cNvPr id="6" name="Slide Number Placeholder 5">
             <a:extLst>
               <a:ext uri="{FF2B5EF4-FFF2-40B4-BE49-F238E27FC236}">
-                <a16:creationId xmlns:a16="http://schemas.microsoft.com/office/drawing/2014/main" xmlns="" id="{88F32B42-BB5D-BB48-8764-9F99727CEF04}"/>
+                <a16:creationId xmlns="" xmlns:a16="http://schemas.microsoft.com/office/drawing/2014/main" id="{88F32B42-BB5D-BB48-8764-9F99727CEF04}"/>
               </a:ext>
             </a:extLst>
           </p:cNvPr>
@@ -358,7 +360,7 @@
           <p:cNvPr id="2" name="Title 1">
             <a:extLst>
               <a:ext uri="{FF2B5EF4-FFF2-40B4-BE49-F238E27FC236}">
-                <a16:creationId xmlns:a16="http://schemas.microsoft.com/office/drawing/2014/main" xmlns="" id="{9BBDEE72-3661-8A4F-BB8D-9F356D4CF066}"/>
+                <a16:creationId xmlns="" xmlns:a16="http://schemas.microsoft.com/office/drawing/2014/main" id="{9BBDEE72-3661-8A4F-BB8D-9F356D4CF066}"/>
               </a:ext>
             </a:extLst>
           </p:cNvPr>
@@ -386,7 +388,7 @@
           <p:cNvPr id="3" name="Vertical Text Placeholder 2">
             <a:extLst>
               <a:ext uri="{FF2B5EF4-FFF2-40B4-BE49-F238E27FC236}">
-                <a16:creationId xmlns:a16="http://schemas.microsoft.com/office/drawing/2014/main" xmlns="" id="{E5116906-5D68-0447-AFCD-16E5B4C58A42}"/>
+                <a16:creationId xmlns="" xmlns:a16="http://schemas.microsoft.com/office/drawing/2014/main" id="{E5116906-5D68-0447-AFCD-16E5B4C58A42}"/>
               </a:ext>
             </a:extLst>
           </p:cNvPr>
@@ -443,7 +445,7 @@
           <p:cNvPr id="4" name="Date Placeholder 3">
             <a:extLst>
               <a:ext uri="{FF2B5EF4-FFF2-40B4-BE49-F238E27FC236}">
-                <a16:creationId xmlns:a16="http://schemas.microsoft.com/office/drawing/2014/main" xmlns="" id="{C6E4F998-D16E-004E-A0D2-E7FF3D7E4F68}"/>
+                <a16:creationId xmlns="" xmlns:a16="http://schemas.microsoft.com/office/drawing/2014/main" id="{C6E4F998-D16E-004E-A0D2-E7FF3D7E4F68}"/>
               </a:ext>
             </a:extLst>
           </p:cNvPr>
@@ -472,7 +474,7 @@
           <p:cNvPr id="5" name="Footer Placeholder 4">
             <a:extLst>
               <a:ext uri="{FF2B5EF4-FFF2-40B4-BE49-F238E27FC236}">
-                <a16:creationId xmlns:a16="http://schemas.microsoft.com/office/drawing/2014/main" xmlns="" id="{7089704E-D200-514A-B5B7-82DAA49671B8}"/>
+                <a16:creationId xmlns="" xmlns:a16="http://schemas.microsoft.com/office/drawing/2014/main" id="{7089704E-D200-514A-B5B7-82DAA49671B8}"/>
               </a:ext>
             </a:extLst>
           </p:cNvPr>
@@ -497,7 +499,7 @@
           <p:cNvPr id="6" name="Slide Number Placeholder 5">
             <a:extLst>
               <a:ext uri="{FF2B5EF4-FFF2-40B4-BE49-F238E27FC236}">
-                <a16:creationId xmlns:a16="http://schemas.microsoft.com/office/drawing/2014/main" xmlns="" id="{0C72463F-D09A-A346-A1F4-2911755D017A}"/>
+                <a16:creationId xmlns="" xmlns:a16="http://schemas.microsoft.com/office/drawing/2014/main" id="{0C72463F-D09A-A346-A1F4-2911755D017A}"/>
               </a:ext>
             </a:extLst>
           </p:cNvPr>
@@ -556,7 +558,7 @@
           <p:cNvPr id="2" name="Vertical Title 1">
             <a:extLst>
               <a:ext uri="{FF2B5EF4-FFF2-40B4-BE49-F238E27FC236}">
-                <a16:creationId xmlns:a16="http://schemas.microsoft.com/office/drawing/2014/main" xmlns="" id="{AB5946E9-397D-C049-A068-F804360E4392}"/>
+                <a16:creationId xmlns="" xmlns:a16="http://schemas.microsoft.com/office/drawing/2014/main" id="{AB5946E9-397D-C049-A068-F804360E4392}"/>
               </a:ext>
             </a:extLst>
           </p:cNvPr>
@@ -589,7 +591,7 @@
           <p:cNvPr id="3" name="Vertical Text Placeholder 2">
             <a:extLst>
               <a:ext uri="{FF2B5EF4-FFF2-40B4-BE49-F238E27FC236}">
-                <a16:creationId xmlns:a16="http://schemas.microsoft.com/office/drawing/2014/main" xmlns="" id="{89793A4A-3706-F84B-8A06-D16899A78EAB}"/>
+                <a16:creationId xmlns="" xmlns:a16="http://schemas.microsoft.com/office/drawing/2014/main" id="{89793A4A-3706-F84B-8A06-D16899A78EAB}"/>
               </a:ext>
             </a:extLst>
           </p:cNvPr>
@@ -651,7 +653,7 @@
           <p:cNvPr id="4" name="Date Placeholder 3">
             <a:extLst>
               <a:ext uri="{FF2B5EF4-FFF2-40B4-BE49-F238E27FC236}">
-                <a16:creationId xmlns:a16="http://schemas.microsoft.com/office/drawing/2014/main" xmlns="" id="{C25651AD-1FC0-704D-A779-A6A4A66E029E}"/>
+                <a16:creationId xmlns="" xmlns:a16="http://schemas.microsoft.com/office/drawing/2014/main" id="{C25651AD-1FC0-704D-A779-A6A4A66E029E}"/>
               </a:ext>
             </a:extLst>
           </p:cNvPr>
@@ -680,7 +682,7 @@
           <p:cNvPr id="5" name="Footer Placeholder 4">
             <a:extLst>
               <a:ext uri="{FF2B5EF4-FFF2-40B4-BE49-F238E27FC236}">
-                <a16:creationId xmlns:a16="http://schemas.microsoft.com/office/drawing/2014/main" xmlns="" id="{8126BAD6-4443-004B-BAA1-FE8E085C9F8F}"/>
+                <a16:creationId xmlns="" xmlns:a16="http://schemas.microsoft.com/office/drawing/2014/main" id="{8126BAD6-4443-004B-BAA1-FE8E085C9F8F}"/>
               </a:ext>
             </a:extLst>
           </p:cNvPr>
@@ -705,7 +707,7 @@
           <p:cNvPr id="6" name="Slide Number Placeholder 5">
             <a:extLst>
               <a:ext uri="{FF2B5EF4-FFF2-40B4-BE49-F238E27FC236}">
-                <a16:creationId xmlns:a16="http://schemas.microsoft.com/office/drawing/2014/main" xmlns="" id="{14ED176A-F057-8D41-B00B-B444EA48310F}"/>
+                <a16:creationId xmlns="" xmlns:a16="http://schemas.microsoft.com/office/drawing/2014/main" id="{14ED176A-F057-8D41-B00B-B444EA48310F}"/>
               </a:ext>
             </a:extLst>
           </p:cNvPr>
@@ -764,7 +766,7 @@
           <p:cNvPr id="2" name="Title 1">
             <a:extLst>
               <a:ext uri="{FF2B5EF4-FFF2-40B4-BE49-F238E27FC236}">
-                <a16:creationId xmlns:a16="http://schemas.microsoft.com/office/drawing/2014/main" xmlns="" id="{A7D2B129-1333-1F47-BC4B-33786578E7FC}"/>
+                <a16:creationId xmlns="" xmlns:a16="http://schemas.microsoft.com/office/drawing/2014/main" id="{A7D2B129-1333-1F47-BC4B-33786578E7FC}"/>
               </a:ext>
             </a:extLst>
           </p:cNvPr>
@@ -792,7 +794,7 @@
           <p:cNvPr id="3" name="Content Placeholder 2">
             <a:extLst>
               <a:ext uri="{FF2B5EF4-FFF2-40B4-BE49-F238E27FC236}">
-                <a16:creationId xmlns:a16="http://schemas.microsoft.com/office/drawing/2014/main" xmlns="" id="{9ECDE62D-58E9-6849-98E2-AAA0CCAADDA0}"/>
+                <a16:creationId xmlns="" xmlns:a16="http://schemas.microsoft.com/office/drawing/2014/main" id="{9ECDE62D-58E9-6849-98E2-AAA0CCAADDA0}"/>
               </a:ext>
             </a:extLst>
           </p:cNvPr>
@@ -849,7 +851,7 @@
           <p:cNvPr id="4" name="Date Placeholder 3">
             <a:extLst>
               <a:ext uri="{FF2B5EF4-FFF2-40B4-BE49-F238E27FC236}">
-                <a16:creationId xmlns:a16="http://schemas.microsoft.com/office/drawing/2014/main" xmlns="" id="{EFEA11BF-2A45-4444-AEED-3C1B0AFA193B}"/>
+                <a16:creationId xmlns="" xmlns:a16="http://schemas.microsoft.com/office/drawing/2014/main" id="{EFEA11BF-2A45-4444-AEED-3C1B0AFA193B}"/>
               </a:ext>
             </a:extLst>
           </p:cNvPr>
@@ -878,7 +880,7 @@
           <p:cNvPr id="5" name="Footer Placeholder 4">
             <a:extLst>
               <a:ext uri="{FF2B5EF4-FFF2-40B4-BE49-F238E27FC236}">
-                <a16:creationId xmlns:a16="http://schemas.microsoft.com/office/drawing/2014/main" xmlns="" id="{009B56B8-8A13-414C-BD29-0782690DB1B9}"/>
+                <a16:creationId xmlns="" xmlns:a16="http://schemas.microsoft.com/office/drawing/2014/main" id="{009B56B8-8A13-414C-BD29-0782690DB1B9}"/>
               </a:ext>
             </a:extLst>
           </p:cNvPr>
@@ -903,7 +905,7 @@
           <p:cNvPr id="6" name="Slide Number Placeholder 5">
             <a:extLst>
               <a:ext uri="{FF2B5EF4-FFF2-40B4-BE49-F238E27FC236}">
-                <a16:creationId xmlns:a16="http://schemas.microsoft.com/office/drawing/2014/main" xmlns="" id="{C4272DC2-C101-6D47-BF16-05E39FF23B46}"/>
+                <a16:creationId xmlns="" xmlns:a16="http://schemas.microsoft.com/office/drawing/2014/main" id="{C4272DC2-C101-6D47-BF16-05E39FF23B46}"/>
               </a:ext>
             </a:extLst>
           </p:cNvPr>
@@ -962,7 +964,7 @@
           <p:cNvPr id="2" name="Title 1">
             <a:extLst>
               <a:ext uri="{FF2B5EF4-FFF2-40B4-BE49-F238E27FC236}">
-                <a16:creationId xmlns:a16="http://schemas.microsoft.com/office/drawing/2014/main" xmlns="" id="{BAC22880-4B93-754D-9213-68DE4C171F7F}"/>
+                <a16:creationId xmlns="" xmlns:a16="http://schemas.microsoft.com/office/drawing/2014/main" id="{BAC22880-4B93-754D-9213-68DE4C171F7F}"/>
               </a:ext>
             </a:extLst>
           </p:cNvPr>
@@ -999,7 +1001,7 @@
           <p:cNvPr id="3" name="Text Placeholder 2">
             <a:extLst>
               <a:ext uri="{FF2B5EF4-FFF2-40B4-BE49-F238E27FC236}">
-                <a16:creationId xmlns:a16="http://schemas.microsoft.com/office/drawing/2014/main" xmlns="" id="{6B11070C-81F8-0A4F-A81D-8C3C228925A3}"/>
+                <a16:creationId xmlns="" xmlns:a16="http://schemas.microsoft.com/office/drawing/2014/main" id="{6B11070C-81F8-0A4F-A81D-8C3C228925A3}"/>
               </a:ext>
             </a:extLst>
           </p:cNvPr>
@@ -1124,7 +1126,7 @@
           <p:cNvPr id="4" name="Date Placeholder 3">
             <a:extLst>
               <a:ext uri="{FF2B5EF4-FFF2-40B4-BE49-F238E27FC236}">
-                <a16:creationId xmlns:a16="http://schemas.microsoft.com/office/drawing/2014/main" xmlns="" id="{23C53577-1831-364C-B339-4121968BB6DA}"/>
+                <a16:creationId xmlns="" xmlns:a16="http://schemas.microsoft.com/office/drawing/2014/main" id="{23C53577-1831-364C-B339-4121968BB6DA}"/>
               </a:ext>
             </a:extLst>
           </p:cNvPr>
@@ -1153,7 +1155,7 @@
           <p:cNvPr id="5" name="Footer Placeholder 4">
             <a:extLst>
               <a:ext uri="{FF2B5EF4-FFF2-40B4-BE49-F238E27FC236}">
-                <a16:creationId xmlns:a16="http://schemas.microsoft.com/office/drawing/2014/main" xmlns="" id="{9F9CBA5D-DA04-1849-97A2-5E156B619E76}"/>
+                <a16:creationId xmlns="" xmlns:a16="http://schemas.microsoft.com/office/drawing/2014/main" id="{9F9CBA5D-DA04-1849-97A2-5E156B619E76}"/>
               </a:ext>
             </a:extLst>
           </p:cNvPr>
@@ -1178,7 +1180,7 @@
           <p:cNvPr id="6" name="Slide Number Placeholder 5">
             <a:extLst>
               <a:ext uri="{FF2B5EF4-FFF2-40B4-BE49-F238E27FC236}">
-                <a16:creationId xmlns:a16="http://schemas.microsoft.com/office/drawing/2014/main" xmlns="" id="{CF1125EA-E670-6D43-9539-E2289A017005}"/>
+                <a16:creationId xmlns="" xmlns:a16="http://schemas.microsoft.com/office/drawing/2014/main" id="{CF1125EA-E670-6D43-9539-E2289A017005}"/>
               </a:ext>
             </a:extLst>
           </p:cNvPr>
@@ -1237,7 +1239,7 @@
           <p:cNvPr id="2" name="Title 1">
             <a:extLst>
               <a:ext uri="{FF2B5EF4-FFF2-40B4-BE49-F238E27FC236}">
-                <a16:creationId xmlns:a16="http://schemas.microsoft.com/office/drawing/2014/main" xmlns="" id="{262AD6D9-F928-4748-9C7F-D4545C80CAA4}"/>
+                <a16:creationId xmlns="" xmlns:a16="http://schemas.microsoft.com/office/drawing/2014/main" id="{262AD6D9-F928-4748-9C7F-D4545C80CAA4}"/>
               </a:ext>
             </a:extLst>
           </p:cNvPr>
@@ -1265,7 +1267,7 @@
           <p:cNvPr id="3" name="Content Placeholder 2">
             <a:extLst>
               <a:ext uri="{FF2B5EF4-FFF2-40B4-BE49-F238E27FC236}">
-                <a16:creationId xmlns:a16="http://schemas.microsoft.com/office/drawing/2014/main" xmlns="" id="{51D797BF-990E-9A4C-82AC-12AD06F3C184}"/>
+                <a16:creationId xmlns="" xmlns:a16="http://schemas.microsoft.com/office/drawing/2014/main" id="{51D797BF-990E-9A4C-82AC-12AD06F3C184}"/>
               </a:ext>
             </a:extLst>
           </p:cNvPr>
@@ -1327,7 +1329,7 @@
           <p:cNvPr id="4" name="Content Placeholder 3">
             <a:extLst>
               <a:ext uri="{FF2B5EF4-FFF2-40B4-BE49-F238E27FC236}">
-                <a16:creationId xmlns:a16="http://schemas.microsoft.com/office/drawing/2014/main" xmlns="" id="{3DC4D9D4-E298-6D41-ACED-A11435ED9D77}"/>
+                <a16:creationId xmlns="" xmlns:a16="http://schemas.microsoft.com/office/drawing/2014/main" id="{3DC4D9D4-E298-6D41-ACED-A11435ED9D77}"/>
               </a:ext>
             </a:extLst>
           </p:cNvPr>
@@ -1389,7 +1391,7 @@
           <p:cNvPr id="5" name="Date Placeholder 4">
             <a:extLst>
               <a:ext uri="{FF2B5EF4-FFF2-40B4-BE49-F238E27FC236}">
-                <a16:creationId xmlns:a16="http://schemas.microsoft.com/office/drawing/2014/main" xmlns="" id="{E17C102D-9E12-A244-9FD1-B8C9B6279B35}"/>
+                <a16:creationId xmlns="" xmlns:a16="http://schemas.microsoft.com/office/drawing/2014/main" id="{E17C102D-9E12-A244-9FD1-B8C9B6279B35}"/>
               </a:ext>
             </a:extLst>
           </p:cNvPr>
@@ -1418,7 +1420,7 @@
           <p:cNvPr id="6" name="Footer Placeholder 5">
             <a:extLst>
               <a:ext uri="{FF2B5EF4-FFF2-40B4-BE49-F238E27FC236}">
-                <a16:creationId xmlns:a16="http://schemas.microsoft.com/office/drawing/2014/main" xmlns="" id="{0AFE2BCB-F3E8-8549-B6D4-F6040A561AFB}"/>
+                <a16:creationId xmlns="" xmlns:a16="http://schemas.microsoft.com/office/drawing/2014/main" id="{0AFE2BCB-F3E8-8549-B6D4-F6040A561AFB}"/>
               </a:ext>
             </a:extLst>
           </p:cNvPr>
@@ -1443,7 +1445,7 @@
           <p:cNvPr id="7" name="Slide Number Placeholder 6">
             <a:extLst>
               <a:ext uri="{FF2B5EF4-FFF2-40B4-BE49-F238E27FC236}">
-                <a16:creationId xmlns:a16="http://schemas.microsoft.com/office/drawing/2014/main" xmlns="" id="{C39549C6-C80B-BD44-8EF9-A19E907A7CFE}"/>
+                <a16:creationId xmlns="" xmlns:a16="http://schemas.microsoft.com/office/drawing/2014/main" id="{C39549C6-C80B-BD44-8EF9-A19E907A7CFE}"/>
               </a:ext>
             </a:extLst>
           </p:cNvPr>
@@ -1502,7 +1504,7 @@
           <p:cNvPr id="2" name="Title 1">
             <a:extLst>
               <a:ext uri="{FF2B5EF4-FFF2-40B4-BE49-F238E27FC236}">
-                <a16:creationId xmlns:a16="http://schemas.microsoft.com/office/drawing/2014/main" xmlns="" id="{FCEA8641-4386-D644-912C-5AF5E240C2CB}"/>
+                <a16:creationId xmlns="" xmlns:a16="http://schemas.microsoft.com/office/drawing/2014/main" id="{FCEA8641-4386-D644-912C-5AF5E240C2CB}"/>
               </a:ext>
             </a:extLst>
           </p:cNvPr>
@@ -1535,7 +1537,7 @@
           <p:cNvPr id="3" name="Text Placeholder 2">
             <a:extLst>
               <a:ext uri="{FF2B5EF4-FFF2-40B4-BE49-F238E27FC236}">
-                <a16:creationId xmlns:a16="http://schemas.microsoft.com/office/drawing/2014/main" xmlns="" id="{0003CA97-F6C8-4A4C-9811-B27526619B85}"/>
+                <a16:creationId xmlns="" xmlns:a16="http://schemas.microsoft.com/office/drawing/2014/main" id="{0003CA97-F6C8-4A4C-9811-B27526619B85}"/>
               </a:ext>
             </a:extLst>
           </p:cNvPr>
@@ -1606,7 +1608,7 @@
           <p:cNvPr id="4" name="Content Placeholder 3">
             <a:extLst>
               <a:ext uri="{FF2B5EF4-FFF2-40B4-BE49-F238E27FC236}">
-                <a16:creationId xmlns:a16="http://schemas.microsoft.com/office/drawing/2014/main" xmlns="" id="{C428443A-4B63-D44B-992D-A5333C63135A}"/>
+                <a16:creationId xmlns="" xmlns:a16="http://schemas.microsoft.com/office/drawing/2014/main" id="{C428443A-4B63-D44B-992D-A5333C63135A}"/>
               </a:ext>
             </a:extLst>
           </p:cNvPr>
@@ -1668,7 +1670,7 @@
           <p:cNvPr id="5" name="Text Placeholder 4">
             <a:extLst>
               <a:ext uri="{FF2B5EF4-FFF2-40B4-BE49-F238E27FC236}">
-                <a16:creationId xmlns:a16="http://schemas.microsoft.com/office/drawing/2014/main" xmlns="" id="{AB6EDAA3-A02E-E244-A6F8-31DA5C48F793}"/>
+                <a16:creationId xmlns="" xmlns:a16="http://schemas.microsoft.com/office/drawing/2014/main" id="{AB6EDAA3-A02E-E244-A6F8-31DA5C48F793}"/>
               </a:ext>
             </a:extLst>
           </p:cNvPr>
@@ -1739,7 +1741,7 @@
           <p:cNvPr id="6" name="Content Placeholder 5">
             <a:extLst>
               <a:ext uri="{FF2B5EF4-FFF2-40B4-BE49-F238E27FC236}">
-                <a16:creationId xmlns:a16="http://schemas.microsoft.com/office/drawing/2014/main" xmlns="" id="{A625C399-2052-374A-9A63-FF2581D9CF40}"/>
+                <a16:creationId xmlns="" xmlns:a16="http://schemas.microsoft.com/office/drawing/2014/main" id="{A625C399-2052-374A-9A63-FF2581D9CF40}"/>
               </a:ext>
             </a:extLst>
           </p:cNvPr>
@@ -1801,7 +1803,7 @@
           <p:cNvPr id="7" name="Date Placeholder 6">
             <a:extLst>
               <a:ext uri="{FF2B5EF4-FFF2-40B4-BE49-F238E27FC236}">
-                <a16:creationId xmlns:a16="http://schemas.microsoft.com/office/drawing/2014/main" xmlns="" id="{1A599785-4F03-0646-859D-A5B1A395854F}"/>
+                <a16:creationId xmlns="" xmlns:a16="http://schemas.microsoft.com/office/drawing/2014/main" id="{1A599785-4F03-0646-859D-A5B1A395854F}"/>
               </a:ext>
             </a:extLst>
           </p:cNvPr>
@@ -1830,7 +1832,7 @@
           <p:cNvPr id="8" name="Footer Placeholder 7">
             <a:extLst>
               <a:ext uri="{FF2B5EF4-FFF2-40B4-BE49-F238E27FC236}">
-                <a16:creationId xmlns:a16="http://schemas.microsoft.com/office/drawing/2014/main" xmlns="" id="{6AE386FC-4B01-3D4A-B5E6-A4445E725378}"/>
+                <a16:creationId xmlns="" xmlns:a16="http://schemas.microsoft.com/office/drawing/2014/main" id="{6AE386FC-4B01-3D4A-B5E6-A4445E725378}"/>
               </a:ext>
             </a:extLst>
           </p:cNvPr>
@@ -1855,7 +1857,7 @@
           <p:cNvPr id="9" name="Slide Number Placeholder 8">
             <a:extLst>
               <a:ext uri="{FF2B5EF4-FFF2-40B4-BE49-F238E27FC236}">
-                <a16:creationId xmlns:a16="http://schemas.microsoft.com/office/drawing/2014/main" xmlns="" id="{39F0E8DD-4FFE-6540-8032-73316B86EFDA}"/>
+                <a16:creationId xmlns="" xmlns:a16="http://schemas.microsoft.com/office/drawing/2014/main" id="{39F0E8DD-4FFE-6540-8032-73316B86EFDA}"/>
               </a:ext>
             </a:extLst>
           </p:cNvPr>
@@ -1914,7 +1916,7 @@
           <p:cNvPr id="2" name="Title 1">
             <a:extLst>
               <a:ext uri="{FF2B5EF4-FFF2-40B4-BE49-F238E27FC236}">
-                <a16:creationId xmlns:a16="http://schemas.microsoft.com/office/drawing/2014/main" xmlns="" id="{3F5899AE-DFEB-5545-9F33-6F738A85210C}"/>
+                <a16:creationId xmlns="" xmlns:a16="http://schemas.microsoft.com/office/drawing/2014/main" id="{3F5899AE-DFEB-5545-9F33-6F738A85210C}"/>
               </a:ext>
             </a:extLst>
           </p:cNvPr>
@@ -1942,7 +1944,7 @@
           <p:cNvPr id="3" name="Date Placeholder 2">
             <a:extLst>
               <a:ext uri="{FF2B5EF4-FFF2-40B4-BE49-F238E27FC236}">
-                <a16:creationId xmlns:a16="http://schemas.microsoft.com/office/drawing/2014/main" xmlns="" id="{D2BBC704-A814-5E4D-A194-EEDA752CFFB8}"/>
+                <a16:creationId xmlns="" xmlns:a16="http://schemas.microsoft.com/office/drawing/2014/main" id="{D2BBC704-A814-5E4D-A194-EEDA752CFFB8}"/>
               </a:ext>
             </a:extLst>
           </p:cNvPr>
@@ -1971,7 +1973,7 @@
           <p:cNvPr id="4" name="Footer Placeholder 3">
             <a:extLst>
               <a:ext uri="{FF2B5EF4-FFF2-40B4-BE49-F238E27FC236}">
-                <a16:creationId xmlns:a16="http://schemas.microsoft.com/office/drawing/2014/main" xmlns="" id="{5A0140CA-3C42-9F41-BAF5-D4C41D47C7CA}"/>
+                <a16:creationId xmlns="" xmlns:a16="http://schemas.microsoft.com/office/drawing/2014/main" id="{5A0140CA-3C42-9F41-BAF5-D4C41D47C7CA}"/>
               </a:ext>
             </a:extLst>
           </p:cNvPr>
@@ -1996,7 +1998,7 @@
           <p:cNvPr id="5" name="Slide Number Placeholder 4">
             <a:extLst>
               <a:ext uri="{FF2B5EF4-FFF2-40B4-BE49-F238E27FC236}">
-                <a16:creationId xmlns:a16="http://schemas.microsoft.com/office/drawing/2014/main" xmlns="" id="{37086D94-F459-FE40-9093-8A1D3E43A3A9}"/>
+                <a16:creationId xmlns="" xmlns:a16="http://schemas.microsoft.com/office/drawing/2014/main" id="{37086D94-F459-FE40-9093-8A1D3E43A3A9}"/>
               </a:ext>
             </a:extLst>
           </p:cNvPr>
@@ -2055,7 +2057,7 @@
           <p:cNvPr id="2" name="Date Placeholder 1">
             <a:extLst>
               <a:ext uri="{FF2B5EF4-FFF2-40B4-BE49-F238E27FC236}">
-                <a16:creationId xmlns:a16="http://schemas.microsoft.com/office/drawing/2014/main" xmlns="" id="{07A9ACC7-829A-7F4D-8420-A762D036E8CD}"/>
+                <a16:creationId xmlns="" xmlns:a16="http://schemas.microsoft.com/office/drawing/2014/main" id="{07A9ACC7-829A-7F4D-8420-A762D036E8CD}"/>
               </a:ext>
             </a:extLst>
           </p:cNvPr>
@@ -2084,7 +2086,7 @@
           <p:cNvPr id="3" name="Footer Placeholder 2">
             <a:extLst>
               <a:ext uri="{FF2B5EF4-FFF2-40B4-BE49-F238E27FC236}">
-                <a16:creationId xmlns:a16="http://schemas.microsoft.com/office/drawing/2014/main" xmlns="" id="{8FBBF79B-F213-0A4F-B7FB-1DCDEC5761BE}"/>
+                <a16:creationId xmlns="" xmlns:a16="http://schemas.microsoft.com/office/drawing/2014/main" id="{8FBBF79B-F213-0A4F-B7FB-1DCDEC5761BE}"/>
               </a:ext>
             </a:extLst>
           </p:cNvPr>
@@ -2109,7 +2111,7 @@
           <p:cNvPr id="4" name="Slide Number Placeholder 3">
             <a:extLst>
               <a:ext uri="{FF2B5EF4-FFF2-40B4-BE49-F238E27FC236}">
-                <a16:creationId xmlns:a16="http://schemas.microsoft.com/office/drawing/2014/main" xmlns="" id="{B052EC9E-99E7-9841-A360-BDDEE513FB5E}"/>
+                <a16:creationId xmlns="" xmlns:a16="http://schemas.microsoft.com/office/drawing/2014/main" id="{B052EC9E-99E7-9841-A360-BDDEE513FB5E}"/>
               </a:ext>
             </a:extLst>
           </p:cNvPr>
@@ -2168,7 +2170,7 @@
           <p:cNvPr id="2" name="Title 1">
             <a:extLst>
               <a:ext uri="{FF2B5EF4-FFF2-40B4-BE49-F238E27FC236}">
-                <a16:creationId xmlns:a16="http://schemas.microsoft.com/office/drawing/2014/main" xmlns="" id="{070A10A2-F9B0-F344-8BC8-7A00229D2949}"/>
+                <a16:creationId xmlns="" xmlns:a16="http://schemas.microsoft.com/office/drawing/2014/main" id="{070A10A2-F9B0-F344-8BC8-7A00229D2949}"/>
               </a:ext>
             </a:extLst>
           </p:cNvPr>
@@ -2205,7 +2207,7 @@
           <p:cNvPr id="3" name="Content Placeholder 2">
             <a:extLst>
               <a:ext uri="{FF2B5EF4-FFF2-40B4-BE49-F238E27FC236}">
-                <a16:creationId xmlns:a16="http://schemas.microsoft.com/office/drawing/2014/main" xmlns="" id="{61A868DF-34E6-1848-983C-F5D0F4A4A893}"/>
+                <a16:creationId xmlns="" xmlns:a16="http://schemas.microsoft.com/office/drawing/2014/main" id="{61A868DF-34E6-1848-983C-F5D0F4A4A893}"/>
               </a:ext>
             </a:extLst>
           </p:cNvPr>
@@ -2295,7 +2297,7 @@
           <p:cNvPr id="4" name="Text Placeholder 3">
             <a:extLst>
               <a:ext uri="{FF2B5EF4-FFF2-40B4-BE49-F238E27FC236}">
-                <a16:creationId xmlns:a16="http://schemas.microsoft.com/office/drawing/2014/main" xmlns="" id="{376E3DE5-437D-434F-8910-AA8A3F1F1273}"/>
+                <a16:creationId xmlns="" xmlns:a16="http://schemas.microsoft.com/office/drawing/2014/main" id="{376E3DE5-437D-434F-8910-AA8A3F1F1273}"/>
               </a:ext>
             </a:extLst>
           </p:cNvPr>
@@ -2366,7 +2368,7 @@
           <p:cNvPr id="5" name="Date Placeholder 4">
             <a:extLst>
               <a:ext uri="{FF2B5EF4-FFF2-40B4-BE49-F238E27FC236}">
-                <a16:creationId xmlns:a16="http://schemas.microsoft.com/office/drawing/2014/main" xmlns="" id="{2F5DF4B7-6C2B-2B48-A238-F01177207469}"/>
+                <a16:creationId xmlns="" xmlns:a16="http://schemas.microsoft.com/office/drawing/2014/main" id="{2F5DF4B7-6C2B-2B48-A238-F01177207469}"/>
               </a:ext>
             </a:extLst>
           </p:cNvPr>
@@ -2395,7 +2397,7 @@
           <p:cNvPr id="6" name="Footer Placeholder 5">
             <a:extLst>
               <a:ext uri="{FF2B5EF4-FFF2-40B4-BE49-F238E27FC236}">
-                <a16:creationId xmlns:a16="http://schemas.microsoft.com/office/drawing/2014/main" xmlns="" id="{A6EF2281-1ABA-7342-8F35-F0F2D64611D1}"/>
+                <a16:creationId xmlns="" xmlns:a16="http://schemas.microsoft.com/office/drawing/2014/main" id="{A6EF2281-1ABA-7342-8F35-F0F2D64611D1}"/>
               </a:ext>
             </a:extLst>
           </p:cNvPr>
@@ -2420,7 +2422,7 @@
           <p:cNvPr id="7" name="Slide Number Placeholder 6">
             <a:extLst>
               <a:ext uri="{FF2B5EF4-FFF2-40B4-BE49-F238E27FC236}">
-                <a16:creationId xmlns:a16="http://schemas.microsoft.com/office/drawing/2014/main" xmlns="" id="{56AACA73-B098-A443-86E5-3593BAFE81EC}"/>
+                <a16:creationId xmlns="" xmlns:a16="http://schemas.microsoft.com/office/drawing/2014/main" id="{56AACA73-B098-A443-86E5-3593BAFE81EC}"/>
               </a:ext>
             </a:extLst>
           </p:cNvPr>
@@ -2479,7 +2481,7 @@
           <p:cNvPr id="2" name="Title 1">
             <a:extLst>
               <a:ext uri="{FF2B5EF4-FFF2-40B4-BE49-F238E27FC236}">
-                <a16:creationId xmlns:a16="http://schemas.microsoft.com/office/drawing/2014/main" xmlns="" id="{FACBEB41-F32F-6449-BD04-263892C29998}"/>
+                <a16:creationId xmlns="" xmlns:a16="http://schemas.microsoft.com/office/drawing/2014/main" id="{FACBEB41-F32F-6449-BD04-263892C29998}"/>
               </a:ext>
             </a:extLst>
           </p:cNvPr>
@@ -2516,7 +2518,7 @@
           <p:cNvPr id="3" name="Picture Placeholder 2">
             <a:extLst>
               <a:ext uri="{FF2B5EF4-FFF2-40B4-BE49-F238E27FC236}">
-                <a16:creationId xmlns:a16="http://schemas.microsoft.com/office/drawing/2014/main" xmlns="" id="{0AD7B342-A149-9E4F-B5C0-EBE269660B70}"/>
+                <a16:creationId xmlns="" xmlns:a16="http://schemas.microsoft.com/office/drawing/2014/main" id="{0AD7B342-A149-9E4F-B5C0-EBE269660B70}"/>
               </a:ext>
             </a:extLst>
           </p:cNvPr>
@@ -2583,7 +2585,7 @@
           <p:cNvPr id="4" name="Text Placeholder 3">
             <a:extLst>
               <a:ext uri="{FF2B5EF4-FFF2-40B4-BE49-F238E27FC236}">
-                <a16:creationId xmlns:a16="http://schemas.microsoft.com/office/drawing/2014/main" xmlns="" id="{C7034AEB-C9CB-5641-A86A-8CE4D74CA17E}"/>
+                <a16:creationId xmlns="" xmlns:a16="http://schemas.microsoft.com/office/drawing/2014/main" id="{C7034AEB-C9CB-5641-A86A-8CE4D74CA17E}"/>
               </a:ext>
             </a:extLst>
           </p:cNvPr>
@@ -2654,7 +2656,7 @@
           <p:cNvPr id="5" name="Date Placeholder 4">
             <a:extLst>
               <a:ext uri="{FF2B5EF4-FFF2-40B4-BE49-F238E27FC236}">
-                <a16:creationId xmlns:a16="http://schemas.microsoft.com/office/drawing/2014/main" xmlns="" id="{5CF1E772-D352-3342-8861-BDE00833F7EF}"/>
+                <a16:creationId xmlns="" xmlns:a16="http://schemas.microsoft.com/office/drawing/2014/main" id="{5CF1E772-D352-3342-8861-BDE00833F7EF}"/>
               </a:ext>
             </a:extLst>
           </p:cNvPr>
@@ -2683,7 +2685,7 @@
           <p:cNvPr id="6" name="Footer Placeholder 5">
             <a:extLst>
               <a:ext uri="{FF2B5EF4-FFF2-40B4-BE49-F238E27FC236}">
-                <a16:creationId xmlns:a16="http://schemas.microsoft.com/office/drawing/2014/main" xmlns="" id="{D38A5059-1DE0-404B-897B-615661062EB6}"/>
+                <a16:creationId xmlns="" xmlns:a16="http://schemas.microsoft.com/office/drawing/2014/main" id="{D38A5059-1DE0-404B-897B-615661062EB6}"/>
               </a:ext>
             </a:extLst>
           </p:cNvPr>
@@ -2708,7 +2710,7 @@
           <p:cNvPr id="7" name="Slide Number Placeholder 6">
             <a:extLst>
               <a:ext uri="{FF2B5EF4-FFF2-40B4-BE49-F238E27FC236}">
-                <a16:creationId xmlns:a16="http://schemas.microsoft.com/office/drawing/2014/main" xmlns="" id="{FEC9B585-298C-9142-B3E4-9683821FD0C3}"/>
+                <a16:creationId xmlns="" xmlns:a16="http://schemas.microsoft.com/office/drawing/2014/main" id="{FEC9B585-298C-9142-B3E4-9683821FD0C3}"/>
               </a:ext>
             </a:extLst>
           </p:cNvPr>
@@ -2772,7 +2774,7 @@
           <p:cNvPr id="2" name="Title Placeholder 1">
             <a:extLst>
               <a:ext uri="{FF2B5EF4-FFF2-40B4-BE49-F238E27FC236}">
-                <a16:creationId xmlns:a16="http://schemas.microsoft.com/office/drawing/2014/main" xmlns="" id="{4FA3C14F-9E83-204C-93F3-4A106E79DB61}"/>
+                <a16:creationId xmlns="" xmlns:a16="http://schemas.microsoft.com/office/drawing/2014/main" id="{4FA3C14F-9E83-204C-93F3-4A106E79DB61}"/>
               </a:ext>
             </a:extLst>
           </p:cNvPr>
@@ -2810,7 +2812,7 @@
           <p:cNvPr id="3" name="Text Placeholder 2">
             <a:extLst>
               <a:ext uri="{FF2B5EF4-FFF2-40B4-BE49-F238E27FC236}">
-                <a16:creationId xmlns:a16="http://schemas.microsoft.com/office/drawing/2014/main" xmlns="" id="{52192E8A-1958-E54D-9F03-ABB935DE7303}"/>
+                <a16:creationId xmlns="" xmlns:a16="http://schemas.microsoft.com/office/drawing/2014/main" id="{52192E8A-1958-E54D-9F03-ABB935DE7303}"/>
               </a:ext>
             </a:extLst>
           </p:cNvPr>
@@ -2877,7 +2879,7 @@
           <p:cNvPr id="4" name="Date Placeholder 3">
             <a:extLst>
               <a:ext uri="{FF2B5EF4-FFF2-40B4-BE49-F238E27FC236}">
-                <a16:creationId xmlns:a16="http://schemas.microsoft.com/office/drawing/2014/main" xmlns="" id="{7325D930-3387-4845-B851-27EB48A50D33}"/>
+                <a16:creationId xmlns="" xmlns:a16="http://schemas.microsoft.com/office/drawing/2014/main" id="{7325D930-3387-4845-B851-27EB48A50D33}"/>
               </a:ext>
             </a:extLst>
           </p:cNvPr>
@@ -2924,7 +2926,7 @@
           <p:cNvPr id="5" name="Footer Placeholder 4">
             <a:extLst>
               <a:ext uri="{FF2B5EF4-FFF2-40B4-BE49-F238E27FC236}">
-                <a16:creationId xmlns:a16="http://schemas.microsoft.com/office/drawing/2014/main" xmlns="" id="{2B233A07-F101-A046-B90E-4F3B57476DFA}"/>
+                <a16:creationId xmlns="" xmlns:a16="http://schemas.microsoft.com/office/drawing/2014/main" id="{2B233A07-F101-A046-B90E-4F3B57476DFA}"/>
               </a:ext>
             </a:extLst>
           </p:cNvPr>
@@ -2967,7 +2969,7 @@
           <p:cNvPr id="6" name="Slide Number Placeholder 5">
             <a:extLst>
               <a:ext uri="{FF2B5EF4-FFF2-40B4-BE49-F238E27FC236}">
-                <a16:creationId xmlns:a16="http://schemas.microsoft.com/office/drawing/2014/main" xmlns="" id="{1864A47E-8A61-6845-AFEE-CDA6D79ED527}"/>
+                <a16:creationId xmlns="" xmlns:a16="http://schemas.microsoft.com/office/drawing/2014/main" id="{1864A47E-8A61-6845-AFEE-CDA6D79ED527}"/>
               </a:ext>
             </a:extLst>
           </p:cNvPr>
@@ -3335,7 +3337,7 @@
           <p:cNvPr id="2" name="Group 1">
             <a:extLst>
               <a:ext uri="{FF2B5EF4-FFF2-40B4-BE49-F238E27FC236}">
-                <a16:creationId xmlns:a16="http://schemas.microsoft.com/office/drawing/2014/main" xmlns="" id="{21C01040-A5E5-5440-BE0E-83D695C5AF7C}"/>
+                <a16:creationId xmlns="" xmlns:a16="http://schemas.microsoft.com/office/drawing/2014/main" id="{21C01040-A5E5-5440-BE0E-83D695C5AF7C}"/>
               </a:ext>
             </a:extLst>
           </p:cNvPr>
@@ -3355,7 +3357,7 @@
             <p:cNvPr id="4" name="Donut 3">
               <a:extLst>
                 <a:ext uri="{FF2B5EF4-FFF2-40B4-BE49-F238E27FC236}">
-                  <a16:creationId xmlns:a16="http://schemas.microsoft.com/office/drawing/2014/main" xmlns="" id="{3B2A361F-FDE3-7349-9868-C5FD2DECD6F0}"/>
+                  <a16:creationId xmlns="" xmlns:a16="http://schemas.microsoft.com/office/drawing/2014/main" id="{3B2A361F-FDE3-7349-9868-C5FD2DECD6F0}"/>
                 </a:ext>
               </a:extLst>
             </p:cNvPr>
@@ -3407,7 +3409,7 @@
             <p:cNvPr id="10" name="Donut 9">
               <a:extLst>
                 <a:ext uri="{FF2B5EF4-FFF2-40B4-BE49-F238E27FC236}">
-                  <a16:creationId xmlns:a16="http://schemas.microsoft.com/office/drawing/2014/main" xmlns="" id="{BDE35D79-7A44-0147-9C60-C169BA20B071}"/>
+                  <a16:creationId xmlns="" xmlns:a16="http://schemas.microsoft.com/office/drawing/2014/main" id="{BDE35D79-7A44-0147-9C60-C169BA20B071}"/>
                 </a:ext>
               </a:extLst>
             </p:cNvPr>
@@ -3459,7 +3461,7 @@
             <p:cNvPr id="12" name="Donut 11">
               <a:extLst>
                 <a:ext uri="{FF2B5EF4-FFF2-40B4-BE49-F238E27FC236}">
-                  <a16:creationId xmlns:a16="http://schemas.microsoft.com/office/drawing/2014/main" xmlns="" id="{E56352FB-83ED-8E41-A2BB-E276C56457E6}"/>
+                  <a16:creationId xmlns="" xmlns:a16="http://schemas.microsoft.com/office/drawing/2014/main" id="{E56352FB-83ED-8E41-A2BB-E276C56457E6}"/>
                 </a:ext>
               </a:extLst>
             </p:cNvPr>
@@ -3511,7 +3513,7 @@
             <p:cNvPr id="14" name="Donut 13">
               <a:extLst>
                 <a:ext uri="{FF2B5EF4-FFF2-40B4-BE49-F238E27FC236}">
-                  <a16:creationId xmlns:a16="http://schemas.microsoft.com/office/drawing/2014/main" xmlns="" id="{89D72E26-3D0E-F247-A940-D093C75917A9}"/>
+                  <a16:creationId xmlns="" xmlns:a16="http://schemas.microsoft.com/office/drawing/2014/main" id="{89D72E26-3D0E-F247-A940-D093C75917A9}"/>
                 </a:ext>
               </a:extLst>
             </p:cNvPr>
@@ -3563,7 +3565,7 @@
             <p:cNvPr id="16" name="Picture 15">
               <a:extLst>
                 <a:ext uri="{FF2B5EF4-FFF2-40B4-BE49-F238E27FC236}">
-                  <a16:creationId xmlns:a16="http://schemas.microsoft.com/office/drawing/2014/main" xmlns="" id="{65348E9C-5E39-C74F-8639-A4E368B71856}"/>
+                  <a16:creationId xmlns="" xmlns:a16="http://schemas.microsoft.com/office/drawing/2014/main" id="{65348E9C-5E39-C74F-8639-A4E368B71856}"/>
                 </a:ext>
               </a:extLst>
             </p:cNvPr>
@@ -3593,7 +3595,7 @@
             <p:cNvPr id="20" name="Picture 19">
               <a:extLst>
                 <a:ext uri="{FF2B5EF4-FFF2-40B4-BE49-F238E27FC236}">
-                  <a16:creationId xmlns:a16="http://schemas.microsoft.com/office/drawing/2014/main" xmlns="" id="{8803E842-7FB6-6F44-A22E-C3CA6FD7E349}"/>
+                  <a16:creationId xmlns="" xmlns:a16="http://schemas.microsoft.com/office/drawing/2014/main" id="{8803E842-7FB6-6F44-A22E-C3CA6FD7E349}"/>
                 </a:ext>
               </a:extLst>
             </p:cNvPr>
@@ -3623,7 +3625,7 @@
             <p:cNvPr id="21" name="Picture 20">
               <a:extLst>
                 <a:ext uri="{FF2B5EF4-FFF2-40B4-BE49-F238E27FC236}">
-                  <a16:creationId xmlns:a16="http://schemas.microsoft.com/office/drawing/2014/main" xmlns="" id="{303227FF-CA43-ED43-AA6E-589BBC9A9D59}"/>
+                  <a16:creationId xmlns="" xmlns:a16="http://schemas.microsoft.com/office/drawing/2014/main" id="{303227FF-CA43-ED43-AA6E-589BBC9A9D59}"/>
                 </a:ext>
               </a:extLst>
             </p:cNvPr>
@@ -3653,7 +3655,7 @@
             <p:cNvPr id="22" name="Picture 21">
               <a:extLst>
                 <a:ext uri="{FF2B5EF4-FFF2-40B4-BE49-F238E27FC236}">
-                  <a16:creationId xmlns:a16="http://schemas.microsoft.com/office/drawing/2014/main" xmlns="" id="{28D04A45-750D-5149-A269-373E9B55611F}"/>
+                  <a16:creationId xmlns="" xmlns:a16="http://schemas.microsoft.com/office/drawing/2014/main" id="{28D04A45-750D-5149-A269-373E9B55611F}"/>
                 </a:ext>
               </a:extLst>
             </p:cNvPr>
@@ -3683,7 +3685,7 @@
             <p:cNvPr id="24" name="Straight Arrow Connector 23">
               <a:extLst>
                 <a:ext uri="{FF2B5EF4-FFF2-40B4-BE49-F238E27FC236}">
-                  <a16:creationId xmlns:a16="http://schemas.microsoft.com/office/drawing/2014/main" xmlns="" id="{B0D28AA1-5104-B849-AF68-A0F380A29D2E}"/>
+                  <a16:creationId xmlns="" xmlns:a16="http://schemas.microsoft.com/office/drawing/2014/main" id="{B0D28AA1-5104-B849-AF68-A0F380A29D2E}"/>
                 </a:ext>
               </a:extLst>
             </p:cNvPr>
@@ -3725,7 +3727,7 @@
             <p:cNvPr id="25" name="Straight Arrow Connector 24">
               <a:extLst>
                 <a:ext uri="{FF2B5EF4-FFF2-40B4-BE49-F238E27FC236}">
-                  <a16:creationId xmlns:a16="http://schemas.microsoft.com/office/drawing/2014/main" xmlns="" id="{CD795BB4-ABBB-A64E-895F-0481BBE8E4EA}"/>
+                  <a16:creationId xmlns="" xmlns:a16="http://schemas.microsoft.com/office/drawing/2014/main" id="{CD795BB4-ABBB-A64E-895F-0481BBE8E4EA}"/>
                 </a:ext>
               </a:extLst>
             </p:cNvPr>
@@ -3769,7 +3771,7 @@
             <p:cNvPr id="27" name="Straight Arrow Connector 26">
               <a:extLst>
                 <a:ext uri="{FF2B5EF4-FFF2-40B4-BE49-F238E27FC236}">
-                  <a16:creationId xmlns:a16="http://schemas.microsoft.com/office/drawing/2014/main" xmlns="" id="{6F1AA03E-031D-8848-99C0-5A36AF0E5605}"/>
+                  <a16:creationId xmlns="" xmlns:a16="http://schemas.microsoft.com/office/drawing/2014/main" id="{6F1AA03E-031D-8848-99C0-5A36AF0E5605}"/>
                 </a:ext>
               </a:extLst>
             </p:cNvPr>
@@ -3814,7 +3816,7 @@
             <p:cNvPr id="28" name="Straight Arrow Connector 27">
               <a:extLst>
                 <a:ext uri="{FF2B5EF4-FFF2-40B4-BE49-F238E27FC236}">
-                  <a16:creationId xmlns:a16="http://schemas.microsoft.com/office/drawing/2014/main" xmlns="" id="{79B7509F-94D0-C044-9DC2-A554B9DB4C67}"/>
+                  <a16:creationId xmlns="" xmlns:a16="http://schemas.microsoft.com/office/drawing/2014/main" id="{79B7509F-94D0-C044-9DC2-A554B9DB4C67}"/>
                 </a:ext>
               </a:extLst>
             </p:cNvPr>
@@ -3859,7 +3861,7 @@
             <p:cNvPr id="34" name="Straight Arrow Connector 33">
               <a:extLst>
                 <a:ext uri="{FF2B5EF4-FFF2-40B4-BE49-F238E27FC236}">
-                  <a16:creationId xmlns:a16="http://schemas.microsoft.com/office/drawing/2014/main" xmlns="" id="{B64B615A-337A-E447-8F57-6F1155594D20}"/>
+                  <a16:creationId xmlns="" xmlns:a16="http://schemas.microsoft.com/office/drawing/2014/main" id="{B64B615A-337A-E447-8F57-6F1155594D20}"/>
                 </a:ext>
               </a:extLst>
             </p:cNvPr>
@@ -3904,7 +3906,7 @@
             <p:cNvPr id="35" name="Straight Arrow Connector 34">
               <a:extLst>
                 <a:ext uri="{FF2B5EF4-FFF2-40B4-BE49-F238E27FC236}">
-                  <a16:creationId xmlns:a16="http://schemas.microsoft.com/office/drawing/2014/main" xmlns="" id="{9CF84DCC-C72A-C348-8EC1-3A9D17DF0926}"/>
+                  <a16:creationId xmlns="" xmlns:a16="http://schemas.microsoft.com/office/drawing/2014/main" id="{9CF84DCC-C72A-C348-8EC1-3A9D17DF0926}"/>
                 </a:ext>
               </a:extLst>
             </p:cNvPr>
@@ -3949,7 +3951,7 @@
             <p:cNvPr id="36" name="Straight Arrow Connector 35">
               <a:extLst>
                 <a:ext uri="{FF2B5EF4-FFF2-40B4-BE49-F238E27FC236}">
-                  <a16:creationId xmlns:a16="http://schemas.microsoft.com/office/drawing/2014/main" xmlns="" id="{F1E7A251-AD40-E846-8C3D-087F623E8345}"/>
+                  <a16:creationId xmlns="" xmlns:a16="http://schemas.microsoft.com/office/drawing/2014/main" id="{F1E7A251-AD40-E846-8C3D-087F623E8345}"/>
                 </a:ext>
               </a:extLst>
             </p:cNvPr>
@@ -3994,7 +3996,7 @@
             <p:cNvPr id="37" name="TextBox 36">
               <a:extLst>
                 <a:ext uri="{FF2B5EF4-FFF2-40B4-BE49-F238E27FC236}">
-                  <a16:creationId xmlns:a16="http://schemas.microsoft.com/office/drawing/2014/main" xmlns="" id="{32233D15-47D3-4143-B8F5-40394DF42E51}"/>
+                  <a16:creationId xmlns="" xmlns:a16="http://schemas.microsoft.com/office/drawing/2014/main" id="{32233D15-47D3-4143-B8F5-40394DF42E51}"/>
                 </a:ext>
               </a:extLst>
             </p:cNvPr>
@@ -4033,7 +4035,7 @@
             <p:cNvPr id="38" name="TextBox 37">
               <a:extLst>
                 <a:ext uri="{FF2B5EF4-FFF2-40B4-BE49-F238E27FC236}">
-                  <a16:creationId xmlns:a16="http://schemas.microsoft.com/office/drawing/2014/main" xmlns="" id="{92F3D126-75F9-8E47-ACC8-6DE8CE351B10}"/>
+                  <a16:creationId xmlns="" xmlns:a16="http://schemas.microsoft.com/office/drawing/2014/main" id="{92F3D126-75F9-8E47-ACC8-6DE8CE351B10}"/>
                 </a:ext>
               </a:extLst>
             </p:cNvPr>
@@ -4068,7 +4070,7 @@
             <p:cNvPr id="40" name="Straight Arrow Connector 39">
               <a:extLst>
                 <a:ext uri="{FF2B5EF4-FFF2-40B4-BE49-F238E27FC236}">
-                  <a16:creationId xmlns:a16="http://schemas.microsoft.com/office/drawing/2014/main" xmlns="" id="{D129C510-0E92-F748-95B7-D3290C7F5292}"/>
+                  <a16:creationId xmlns="" xmlns:a16="http://schemas.microsoft.com/office/drawing/2014/main" id="{D129C510-0E92-F748-95B7-D3290C7F5292}"/>
                 </a:ext>
               </a:extLst>
             </p:cNvPr>
@@ -4114,7 +4116,7 @@
             <p:cNvPr id="45" name="Straight Arrow Connector 44">
               <a:extLst>
                 <a:ext uri="{FF2B5EF4-FFF2-40B4-BE49-F238E27FC236}">
-                  <a16:creationId xmlns:a16="http://schemas.microsoft.com/office/drawing/2014/main" xmlns="" id="{6A37E265-7C1D-4E42-8DE5-F1525A585474}"/>
+                  <a16:creationId xmlns="" xmlns:a16="http://schemas.microsoft.com/office/drawing/2014/main" id="{6A37E265-7C1D-4E42-8DE5-F1525A585474}"/>
                 </a:ext>
               </a:extLst>
             </p:cNvPr>
@@ -4160,7 +4162,7 @@
             <p:cNvPr id="47" name="Straight Arrow Connector 46">
               <a:extLst>
                 <a:ext uri="{FF2B5EF4-FFF2-40B4-BE49-F238E27FC236}">
-                  <a16:creationId xmlns:a16="http://schemas.microsoft.com/office/drawing/2014/main" xmlns="" id="{01B65FEC-66A0-E54A-A1A9-01441382ADA4}"/>
+                  <a16:creationId xmlns="" xmlns:a16="http://schemas.microsoft.com/office/drawing/2014/main" id="{01B65FEC-66A0-E54A-A1A9-01441382ADA4}"/>
                 </a:ext>
               </a:extLst>
             </p:cNvPr>
@@ -4206,7 +4208,7 @@
             <p:cNvPr id="48" name="Donut 47">
               <a:extLst>
                 <a:ext uri="{FF2B5EF4-FFF2-40B4-BE49-F238E27FC236}">
-                  <a16:creationId xmlns:a16="http://schemas.microsoft.com/office/drawing/2014/main" xmlns="" id="{1AD3C458-7283-094D-A4AC-30A8D632277B}"/>
+                  <a16:creationId xmlns="" xmlns:a16="http://schemas.microsoft.com/office/drawing/2014/main" id="{1AD3C458-7283-094D-A4AC-30A8D632277B}"/>
                 </a:ext>
               </a:extLst>
             </p:cNvPr>
@@ -4258,7 +4260,7 @@
             <p:cNvPr id="49" name="Donut 48">
               <a:extLst>
                 <a:ext uri="{FF2B5EF4-FFF2-40B4-BE49-F238E27FC236}">
-                  <a16:creationId xmlns:a16="http://schemas.microsoft.com/office/drawing/2014/main" xmlns="" id="{54296AC5-4EA6-2E48-B195-3F349430556D}"/>
+                  <a16:creationId xmlns="" xmlns:a16="http://schemas.microsoft.com/office/drawing/2014/main" id="{54296AC5-4EA6-2E48-B195-3F349430556D}"/>
                 </a:ext>
               </a:extLst>
             </p:cNvPr>
@@ -4310,7 +4312,7 @@
             <p:cNvPr id="50" name="Donut 49">
               <a:extLst>
                 <a:ext uri="{FF2B5EF4-FFF2-40B4-BE49-F238E27FC236}">
-                  <a16:creationId xmlns:a16="http://schemas.microsoft.com/office/drawing/2014/main" xmlns="" id="{ECEA39D9-22FF-2142-92DA-F78CCF525516}"/>
+                  <a16:creationId xmlns="" xmlns:a16="http://schemas.microsoft.com/office/drawing/2014/main" id="{ECEA39D9-22FF-2142-92DA-F78CCF525516}"/>
                 </a:ext>
               </a:extLst>
             </p:cNvPr>
@@ -4362,7 +4364,7 @@
             <p:cNvPr id="51" name="Donut 50">
               <a:extLst>
                 <a:ext uri="{FF2B5EF4-FFF2-40B4-BE49-F238E27FC236}">
-                  <a16:creationId xmlns:a16="http://schemas.microsoft.com/office/drawing/2014/main" xmlns="" id="{027D34A4-3CCC-5E4C-8C3B-04AEEFC20D48}"/>
+                  <a16:creationId xmlns="" xmlns:a16="http://schemas.microsoft.com/office/drawing/2014/main" id="{027D34A4-3CCC-5E4C-8C3B-04AEEFC20D48}"/>
                 </a:ext>
               </a:extLst>
             </p:cNvPr>
@@ -4414,7 +4416,7 @@
             <p:cNvPr id="52" name="Picture 51">
               <a:extLst>
                 <a:ext uri="{FF2B5EF4-FFF2-40B4-BE49-F238E27FC236}">
-                  <a16:creationId xmlns:a16="http://schemas.microsoft.com/office/drawing/2014/main" xmlns="" id="{5D3188FF-EB25-4542-9B0E-F071C76D530F}"/>
+                  <a16:creationId xmlns="" xmlns:a16="http://schemas.microsoft.com/office/drawing/2014/main" id="{5D3188FF-EB25-4542-9B0E-F071C76D530F}"/>
                 </a:ext>
               </a:extLst>
             </p:cNvPr>
@@ -4444,7 +4446,7 @@
             <p:cNvPr id="53" name="Picture 52">
               <a:extLst>
                 <a:ext uri="{FF2B5EF4-FFF2-40B4-BE49-F238E27FC236}">
-                  <a16:creationId xmlns:a16="http://schemas.microsoft.com/office/drawing/2014/main" xmlns="" id="{E80586E2-8A21-B44A-B2A6-E2A37289C605}"/>
+                  <a16:creationId xmlns="" xmlns:a16="http://schemas.microsoft.com/office/drawing/2014/main" id="{E80586E2-8A21-B44A-B2A6-E2A37289C605}"/>
                 </a:ext>
               </a:extLst>
             </p:cNvPr>
@@ -4474,7 +4476,7 @@
             <p:cNvPr id="54" name="Picture 53">
               <a:extLst>
                 <a:ext uri="{FF2B5EF4-FFF2-40B4-BE49-F238E27FC236}">
-                  <a16:creationId xmlns:a16="http://schemas.microsoft.com/office/drawing/2014/main" xmlns="" id="{10C0DB48-7DBA-884E-BE90-9CC62393ECA2}"/>
+                  <a16:creationId xmlns="" xmlns:a16="http://schemas.microsoft.com/office/drawing/2014/main" id="{10C0DB48-7DBA-884E-BE90-9CC62393ECA2}"/>
                 </a:ext>
               </a:extLst>
             </p:cNvPr>
@@ -4504,7 +4506,7 @@
             <p:cNvPr id="55" name="Picture 54">
               <a:extLst>
                 <a:ext uri="{FF2B5EF4-FFF2-40B4-BE49-F238E27FC236}">
-                  <a16:creationId xmlns:a16="http://schemas.microsoft.com/office/drawing/2014/main" xmlns="" id="{B4AE2BC6-738E-E543-8EFA-CBB71B892574}"/>
+                  <a16:creationId xmlns="" xmlns:a16="http://schemas.microsoft.com/office/drawing/2014/main" id="{B4AE2BC6-738E-E543-8EFA-CBB71B892574}"/>
                 </a:ext>
               </a:extLst>
             </p:cNvPr>
@@ -4534,7 +4536,7 @@
             <p:cNvPr id="57" name="Straight Arrow Connector 56">
               <a:extLst>
                 <a:ext uri="{FF2B5EF4-FFF2-40B4-BE49-F238E27FC236}">
-                  <a16:creationId xmlns:a16="http://schemas.microsoft.com/office/drawing/2014/main" xmlns="" id="{B7E0628D-3896-0D40-8C0F-2A2C37242174}"/>
+                  <a16:creationId xmlns="" xmlns:a16="http://schemas.microsoft.com/office/drawing/2014/main" id="{B7E0628D-3896-0D40-8C0F-2A2C37242174}"/>
                 </a:ext>
               </a:extLst>
             </p:cNvPr>
@@ -4579,7 +4581,7 @@
             <p:cNvPr id="58" name="Straight Arrow Connector 57">
               <a:extLst>
                 <a:ext uri="{FF2B5EF4-FFF2-40B4-BE49-F238E27FC236}">
-                  <a16:creationId xmlns:a16="http://schemas.microsoft.com/office/drawing/2014/main" xmlns="" id="{A8ACF2FB-D778-3646-84C4-C402FC592721}"/>
+                  <a16:creationId xmlns="" xmlns:a16="http://schemas.microsoft.com/office/drawing/2014/main" id="{A8ACF2FB-D778-3646-84C4-C402FC592721}"/>
                 </a:ext>
               </a:extLst>
             </p:cNvPr>
@@ -4624,7 +4626,7 @@
             <p:cNvPr id="59" name="Straight Arrow Connector 58">
               <a:extLst>
                 <a:ext uri="{FF2B5EF4-FFF2-40B4-BE49-F238E27FC236}">
-                  <a16:creationId xmlns:a16="http://schemas.microsoft.com/office/drawing/2014/main" xmlns="" id="{E424E677-519B-644C-852E-DAFC1041F8F9}"/>
+                  <a16:creationId xmlns="" xmlns:a16="http://schemas.microsoft.com/office/drawing/2014/main" id="{E424E677-519B-644C-852E-DAFC1041F8F9}"/>
                 </a:ext>
               </a:extLst>
             </p:cNvPr>
@@ -4669,7 +4671,7 @@
             <p:cNvPr id="60" name="Straight Arrow Connector 59">
               <a:extLst>
                 <a:ext uri="{FF2B5EF4-FFF2-40B4-BE49-F238E27FC236}">
-                  <a16:creationId xmlns:a16="http://schemas.microsoft.com/office/drawing/2014/main" xmlns="" id="{CC702EAB-6327-3548-9BA5-19449AE977CC}"/>
+                  <a16:creationId xmlns="" xmlns:a16="http://schemas.microsoft.com/office/drawing/2014/main" id="{CC702EAB-6327-3548-9BA5-19449AE977CC}"/>
                 </a:ext>
               </a:extLst>
             </p:cNvPr>
@@ -4714,7 +4716,7 @@
             <p:cNvPr id="61" name="Straight Arrow Connector 60">
               <a:extLst>
                 <a:ext uri="{FF2B5EF4-FFF2-40B4-BE49-F238E27FC236}">
-                  <a16:creationId xmlns:a16="http://schemas.microsoft.com/office/drawing/2014/main" xmlns="" id="{0E175693-96D0-5548-87EF-74C7A77A63D4}"/>
+                  <a16:creationId xmlns="" xmlns:a16="http://schemas.microsoft.com/office/drawing/2014/main" id="{0E175693-96D0-5548-87EF-74C7A77A63D4}"/>
                 </a:ext>
               </a:extLst>
             </p:cNvPr>
@@ -4759,7 +4761,7 @@
             <p:cNvPr id="62" name="Straight Arrow Connector 61">
               <a:extLst>
                 <a:ext uri="{FF2B5EF4-FFF2-40B4-BE49-F238E27FC236}">
-                  <a16:creationId xmlns:a16="http://schemas.microsoft.com/office/drawing/2014/main" xmlns="" id="{F787A27D-C2A6-494E-9E42-2C8E021EA6BA}"/>
+                  <a16:creationId xmlns="" xmlns:a16="http://schemas.microsoft.com/office/drawing/2014/main" id="{F787A27D-C2A6-494E-9E42-2C8E021EA6BA}"/>
                 </a:ext>
               </a:extLst>
             </p:cNvPr>
@@ -4804,7 +4806,7 @@
             <p:cNvPr id="65" name="Straight Arrow Connector 64">
               <a:extLst>
                 <a:ext uri="{FF2B5EF4-FFF2-40B4-BE49-F238E27FC236}">
-                  <a16:creationId xmlns:a16="http://schemas.microsoft.com/office/drawing/2014/main" xmlns="" id="{665894B1-601F-B54F-B53B-D7434ED7704F}"/>
+                  <a16:creationId xmlns="" xmlns:a16="http://schemas.microsoft.com/office/drawing/2014/main" id="{665894B1-601F-B54F-B53B-D7434ED7704F}"/>
                 </a:ext>
               </a:extLst>
             </p:cNvPr>
@@ -4851,7 +4853,7 @@
             <p:cNvPr id="66" name="Straight Arrow Connector 65">
               <a:extLst>
                 <a:ext uri="{FF2B5EF4-FFF2-40B4-BE49-F238E27FC236}">
-                  <a16:creationId xmlns:a16="http://schemas.microsoft.com/office/drawing/2014/main" xmlns="" id="{8D00B99C-A25A-0544-9CCC-62BED27C14E3}"/>
+                  <a16:creationId xmlns="" xmlns:a16="http://schemas.microsoft.com/office/drawing/2014/main" id="{8D00B99C-A25A-0544-9CCC-62BED27C14E3}"/>
                 </a:ext>
               </a:extLst>
             </p:cNvPr>
@@ -4898,7 +4900,7 @@
             <p:cNvPr id="74" name="Straight Arrow Connector 73">
               <a:extLst>
                 <a:ext uri="{FF2B5EF4-FFF2-40B4-BE49-F238E27FC236}">
-                  <a16:creationId xmlns:a16="http://schemas.microsoft.com/office/drawing/2014/main" xmlns="" id="{9897DA5B-3CCB-0745-A483-551471B7CE67}"/>
+                  <a16:creationId xmlns="" xmlns:a16="http://schemas.microsoft.com/office/drawing/2014/main" id="{9897DA5B-3CCB-0745-A483-551471B7CE67}"/>
                 </a:ext>
               </a:extLst>
             </p:cNvPr>
@@ -4945,7 +4947,7 @@
             <p:cNvPr id="86" name="TextBox 85">
               <a:extLst>
                 <a:ext uri="{FF2B5EF4-FFF2-40B4-BE49-F238E27FC236}">
-                  <a16:creationId xmlns:a16="http://schemas.microsoft.com/office/drawing/2014/main" xmlns="" id="{08D6A736-4169-4F4B-A504-8B317B727C73}"/>
+                  <a16:creationId xmlns="" xmlns:a16="http://schemas.microsoft.com/office/drawing/2014/main" id="{08D6A736-4169-4F4B-A504-8B317B727C73}"/>
                 </a:ext>
               </a:extLst>
             </p:cNvPr>
@@ -4980,7 +4982,7 @@
             <p:cNvPr id="87" name="Straight Arrow Connector 86">
               <a:extLst>
                 <a:ext uri="{FF2B5EF4-FFF2-40B4-BE49-F238E27FC236}">
-                  <a16:creationId xmlns:a16="http://schemas.microsoft.com/office/drawing/2014/main" xmlns="" id="{D894C924-CCB7-294F-92D3-516C5963A38F}"/>
+                  <a16:creationId xmlns="" xmlns:a16="http://schemas.microsoft.com/office/drawing/2014/main" id="{D894C924-CCB7-294F-92D3-516C5963A38F}"/>
                 </a:ext>
               </a:extLst>
             </p:cNvPr>
@@ -5024,7 +5026,7 @@
             <p:cNvPr id="88" name="Straight Arrow Connector 87">
               <a:extLst>
                 <a:ext uri="{FF2B5EF4-FFF2-40B4-BE49-F238E27FC236}">
-                  <a16:creationId xmlns:a16="http://schemas.microsoft.com/office/drawing/2014/main" xmlns="" id="{643ADA86-9B33-E942-973D-84EF8B397DA7}"/>
+                  <a16:creationId xmlns="" xmlns:a16="http://schemas.microsoft.com/office/drawing/2014/main" id="{643ADA86-9B33-E942-973D-84EF8B397DA7}"/>
                 </a:ext>
               </a:extLst>
             </p:cNvPr>
@@ -5068,7 +5070,7 @@
             <p:cNvPr id="92" name="Rectangle 91">
               <a:extLst>
                 <a:ext uri="{FF2B5EF4-FFF2-40B4-BE49-F238E27FC236}">
-                  <a16:creationId xmlns:a16="http://schemas.microsoft.com/office/drawing/2014/main" xmlns="" id="{0706AB93-4F5E-9F46-B494-FAA5B69D424F}"/>
+                  <a16:creationId xmlns="" xmlns:a16="http://schemas.microsoft.com/office/drawing/2014/main" id="{0706AB93-4F5E-9F46-B494-FAA5B69D424F}"/>
                 </a:ext>
               </a:extLst>
             </p:cNvPr>
@@ -5151,7 +5153,7 @@
           <p:cNvPr id="23" name="Group 22">
             <a:extLst>
               <a:ext uri="{FF2B5EF4-FFF2-40B4-BE49-F238E27FC236}">
-                <a16:creationId xmlns:a16="http://schemas.microsoft.com/office/drawing/2014/main" xmlns="" id="{BCC420A2-DA9C-7942-B39C-D09C4F5EA55A}"/>
+                <a16:creationId xmlns="" xmlns:a16="http://schemas.microsoft.com/office/drawing/2014/main" id="{BCC420A2-DA9C-7942-B39C-D09C4F5EA55A}"/>
               </a:ext>
             </a:extLst>
           </p:cNvPr>
@@ -5171,7 +5173,7 @@
             <p:cNvPr id="5" name="Straight Connector 4">
               <a:extLst>
                 <a:ext uri="{FF2B5EF4-FFF2-40B4-BE49-F238E27FC236}">
-                  <a16:creationId xmlns:a16="http://schemas.microsoft.com/office/drawing/2014/main" xmlns="" id="{39360EB3-2F94-A44A-B39F-9DB160370D7A}"/>
+                  <a16:creationId xmlns="" xmlns:a16="http://schemas.microsoft.com/office/drawing/2014/main" id="{39360EB3-2F94-A44A-B39F-9DB160370D7A}"/>
                 </a:ext>
               </a:extLst>
             </p:cNvPr>
@@ -5214,7 +5216,7 @@
             <p:cNvPr id="6" name="Straight Connector 5">
               <a:extLst>
                 <a:ext uri="{FF2B5EF4-FFF2-40B4-BE49-F238E27FC236}">
-                  <a16:creationId xmlns:a16="http://schemas.microsoft.com/office/drawing/2014/main" xmlns="" id="{853E8DA6-DA6D-6C46-BFE7-416FBF17C8C7}"/>
+                  <a16:creationId xmlns="" xmlns:a16="http://schemas.microsoft.com/office/drawing/2014/main" id="{853E8DA6-DA6D-6C46-BFE7-416FBF17C8C7}"/>
                 </a:ext>
               </a:extLst>
             </p:cNvPr>
@@ -5258,7 +5260,7 @@
             <p:cNvPr id="9" name="Straight Arrow Connector 8">
               <a:extLst>
                 <a:ext uri="{FF2B5EF4-FFF2-40B4-BE49-F238E27FC236}">
-                  <a16:creationId xmlns:a16="http://schemas.microsoft.com/office/drawing/2014/main" xmlns="" id="{CF5C9E10-448B-F945-BDB2-68260461DD67}"/>
+                  <a16:creationId xmlns="" xmlns:a16="http://schemas.microsoft.com/office/drawing/2014/main" id="{CF5C9E10-448B-F945-BDB2-68260461DD67}"/>
                 </a:ext>
               </a:extLst>
             </p:cNvPr>
@@ -5300,7 +5302,7 @@
             <p:cNvPr id="10" name="TextBox 9">
               <a:extLst>
                 <a:ext uri="{FF2B5EF4-FFF2-40B4-BE49-F238E27FC236}">
-                  <a16:creationId xmlns:a16="http://schemas.microsoft.com/office/drawing/2014/main" xmlns="" id="{FFC39BBD-2C9F-A441-B982-D45EDEFFB0E5}"/>
+                  <a16:creationId xmlns="" xmlns:a16="http://schemas.microsoft.com/office/drawing/2014/main" id="{FFC39BBD-2C9F-A441-B982-D45EDEFFB0E5}"/>
                 </a:ext>
               </a:extLst>
             </p:cNvPr>
@@ -5339,7 +5341,7 @@
             <p:cNvPr id="11" name="TextBox 10">
               <a:extLst>
                 <a:ext uri="{FF2B5EF4-FFF2-40B4-BE49-F238E27FC236}">
-                  <a16:creationId xmlns:a16="http://schemas.microsoft.com/office/drawing/2014/main" xmlns="" id="{6E340A3D-9611-684E-B25B-F9AB12BDD1D4}"/>
+                  <a16:creationId xmlns="" xmlns:a16="http://schemas.microsoft.com/office/drawing/2014/main" id="{6E340A3D-9611-684E-B25B-F9AB12BDD1D4}"/>
                 </a:ext>
               </a:extLst>
             </p:cNvPr>
@@ -5378,7 +5380,7 @@
             <p:cNvPr id="12" name="Straight Arrow Connector 11">
               <a:extLst>
                 <a:ext uri="{FF2B5EF4-FFF2-40B4-BE49-F238E27FC236}">
-                  <a16:creationId xmlns:a16="http://schemas.microsoft.com/office/drawing/2014/main" xmlns="" id="{735FC0BE-6106-9543-A10D-686E0BE6FB36}"/>
+                  <a16:creationId xmlns="" xmlns:a16="http://schemas.microsoft.com/office/drawing/2014/main" id="{735FC0BE-6106-9543-A10D-686E0BE6FB36}"/>
                 </a:ext>
               </a:extLst>
             </p:cNvPr>
@@ -5423,7 +5425,7 @@
             <p:cNvPr id="15" name="Straight Arrow Connector 14">
               <a:extLst>
                 <a:ext uri="{FF2B5EF4-FFF2-40B4-BE49-F238E27FC236}">
-                  <a16:creationId xmlns:a16="http://schemas.microsoft.com/office/drawing/2014/main" xmlns="" id="{F8024A55-957A-0D40-B26F-ABA50E186F24}"/>
+                  <a16:creationId xmlns="" xmlns:a16="http://schemas.microsoft.com/office/drawing/2014/main" id="{F8024A55-957A-0D40-B26F-ABA50E186F24}"/>
                 </a:ext>
               </a:extLst>
             </p:cNvPr>
@@ -5468,7 +5470,7 @@
             <p:cNvPr id="17" name="TextBox 16">
               <a:extLst>
                 <a:ext uri="{FF2B5EF4-FFF2-40B4-BE49-F238E27FC236}">
-                  <a16:creationId xmlns:a16="http://schemas.microsoft.com/office/drawing/2014/main" xmlns="" id="{16D3F9D4-E5F7-6B4D-A03D-0AA606EE74AB}"/>
+                  <a16:creationId xmlns="" xmlns:a16="http://schemas.microsoft.com/office/drawing/2014/main" id="{16D3F9D4-E5F7-6B4D-A03D-0AA606EE74AB}"/>
                 </a:ext>
               </a:extLst>
             </p:cNvPr>
@@ -5507,7 +5509,7 @@
             <p:cNvPr id="18" name="TextBox 17">
               <a:extLst>
                 <a:ext uri="{FF2B5EF4-FFF2-40B4-BE49-F238E27FC236}">
-                  <a16:creationId xmlns:a16="http://schemas.microsoft.com/office/drawing/2014/main" xmlns="" id="{8B25EDDD-F275-834A-AA71-146F0B514D87}"/>
+                  <a16:creationId xmlns="" xmlns:a16="http://schemas.microsoft.com/office/drawing/2014/main" id="{8B25EDDD-F275-834A-AA71-146F0B514D87}"/>
                 </a:ext>
               </a:extLst>
             </p:cNvPr>
@@ -5542,7 +5544,7 @@
             <p:cNvPr id="19" name="TextBox 18">
               <a:extLst>
                 <a:ext uri="{FF2B5EF4-FFF2-40B4-BE49-F238E27FC236}">
-                  <a16:creationId xmlns:a16="http://schemas.microsoft.com/office/drawing/2014/main" xmlns="" id="{F447B65D-C5AF-DB48-A22C-6A80F0DBED91}"/>
+                  <a16:creationId xmlns="" xmlns:a16="http://schemas.microsoft.com/office/drawing/2014/main" id="{F447B65D-C5AF-DB48-A22C-6A80F0DBED91}"/>
                 </a:ext>
               </a:extLst>
             </p:cNvPr>
@@ -5577,7 +5579,7 @@
             <p:cNvPr id="20" name="Arc 19">
               <a:extLst>
                 <a:ext uri="{FF2B5EF4-FFF2-40B4-BE49-F238E27FC236}">
-                  <a16:creationId xmlns:a16="http://schemas.microsoft.com/office/drawing/2014/main" xmlns="" id="{2A1C4EA9-9F3E-6C4D-A9D7-CC767EFDC316}"/>
+                  <a16:creationId xmlns="" xmlns:a16="http://schemas.microsoft.com/office/drawing/2014/main" id="{2A1C4EA9-9F3E-6C4D-A9D7-CC767EFDC316}"/>
                 </a:ext>
               </a:extLst>
             </p:cNvPr>
@@ -5629,7 +5631,7 @@
             <p:cNvPr id="21" name="TextBox 20">
               <a:extLst>
                 <a:ext uri="{FF2B5EF4-FFF2-40B4-BE49-F238E27FC236}">
-                  <a16:creationId xmlns:a16="http://schemas.microsoft.com/office/drawing/2014/main" xmlns="" id="{6906D6A8-C6DC-7E42-B6AC-74F70CA0B1F4}"/>
+                  <a16:creationId xmlns="" xmlns:a16="http://schemas.microsoft.com/office/drawing/2014/main" id="{6906D6A8-C6DC-7E42-B6AC-74F70CA0B1F4}"/>
                 </a:ext>
               </a:extLst>
             </p:cNvPr>
@@ -5709,7 +5711,7 @@
             <p:cNvPr id="4" name="Picture 3">
               <a:extLst>
                 <a:ext uri="{FF2B5EF4-FFF2-40B4-BE49-F238E27FC236}">
-                  <a16:creationId xmlns="" xmlns:a16="http://schemas.microsoft.com/office/drawing/2014/main" id="{9594DC97-7FD9-6C4C-AA8C-A206E9FDE4B1}"/>
+                  <a16:creationId xmlns:a16="http://schemas.microsoft.com/office/drawing/2014/main" xmlns="" id="{9594DC97-7FD9-6C4C-AA8C-A206E9FDE4B1}"/>
                 </a:ext>
               </a:extLst>
             </p:cNvPr>
@@ -6133,7 +6135,7 @@
             <p:cNvPr id="4" name="Picture 3">
               <a:extLst>
                 <a:ext uri="{FF2B5EF4-FFF2-40B4-BE49-F238E27FC236}">
-                  <a16:creationId xmlns:a16="http://schemas.microsoft.com/office/drawing/2014/main" xmlns="" id="{2E17FE61-10C3-E64B-ABB3-5FFD96909365}"/>
+                  <a16:creationId xmlns="" xmlns:a16="http://schemas.microsoft.com/office/drawing/2014/main" id="{2E17FE61-10C3-E64B-ABB3-5FFD96909365}"/>
                 </a:ext>
               </a:extLst>
             </p:cNvPr>
@@ -6162,7 +6164,7 @@
             <p:cNvPr id="5" name="Donut 4">
               <a:extLst>
                 <a:ext uri="{FF2B5EF4-FFF2-40B4-BE49-F238E27FC236}">
-                  <a16:creationId xmlns:a16="http://schemas.microsoft.com/office/drawing/2014/main" xmlns="" id="{A05B1990-5D9B-6044-AC97-F08B64FB7307}"/>
+                  <a16:creationId xmlns="" xmlns:a16="http://schemas.microsoft.com/office/drawing/2014/main" id="{A05B1990-5D9B-6044-AC97-F08B64FB7307}"/>
                 </a:ext>
               </a:extLst>
             </p:cNvPr>
@@ -6222,7 +6224,7 @@
             <p:cNvPr id="6" name="Donut 5">
               <a:extLst>
                 <a:ext uri="{FF2B5EF4-FFF2-40B4-BE49-F238E27FC236}">
-                  <a16:creationId xmlns:a16="http://schemas.microsoft.com/office/drawing/2014/main" xmlns="" id="{E87D4265-32C9-8641-9224-27CBAEBBC555}"/>
+                  <a16:creationId xmlns="" xmlns:a16="http://schemas.microsoft.com/office/drawing/2014/main" id="{E87D4265-32C9-8641-9224-27CBAEBBC555}"/>
                 </a:ext>
               </a:extLst>
             </p:cNvPr>
@@ -6282,7 +6284,7 @@
             <p:cNvPr id="7" name="Donut 6">
               <a:extLst>
                 <a:ext uri="{FF2B5EF4-FFF2-40B4-BE49-F238E27FC236}">
-                  <a16:creationId xmlns:a16="http://schemas.microsoft.com/office/drawing/2014/main" xmlns="" id="{94E5F9FB-A235-5A4B-ACA8-09116E31D8B2}"/>
+                  <a16:creationId xmlns="" xmlns:a16="http://schemas.microsoft.com/office/drawing/2014/main" id="{94E5F9FB-A235-5A4B-ACA8-09116E31D8B2}"/>
                 </a:ext>
               </a:extLst>
             </p:cNvPr>
@@ -6342,7 +6344,7 @@
             <p:cNvPr id="8" name="Donut 7">
               <a:extLst>
                 <a:ext uri="{FF2B5EF4-FFF2-40B4-BE49-F238E27FC236}">
-                  <a16:creationId xmlns:a16="http://schemas.microsoft.com/office/drawing/2014/main" xmlns="" id="{A8505250-A9B4-8441-82AA-79C65E428040}"/>
+                  <a16:creationId xmlns="" xmlns:a16="http://schemas.microsoft.com/office/drawing/2014/main" id="{A8505250-A9B4-8441-82AA-79C65E428040}"/>
                 </a:ext>
               </a:extLst>
             </p:cNvPr>
@@ -6439,6 +6441,739 @@
     <p:extLst>
       <p:ext uri="{BB962C8B-B14F-4D97-AF65-F5344CB8AC3E}">
         <p14:creationId xmlns:p14="http://schemas.microsoft.com/office/powerpoint/2010/main" val="473552350"/>
+      </p:ext>
+    </p:extLst>
+  </p:cSld>
+  <p:clrMapOvr>
+    <a:masterClrMapping/>
+  </p:clrMapOvr>
+</p:sld>
+</file>
+
+<file path=ppt/slides/slide6.xml><?xml version="1.0" encoding="utf-8"?>
+<p:sld xmlns:a="http://schemas.openxmlformats.org/drawingml/2006/main" xmlns:r="http://schemas.openxmlformats.org/officeDocument/2006/relationships" xmlns:p="http://schemas.openxmlformats.org/presentationml/2006/main">
+  <p:cSld>
+    <p:spTree>
+      <p:nvGrpSpPr>
+        <p:cNvPr id="1" name=""/>
+        <p:cNvGrpSpPr/>
+        <p:nvPr/>
+      </p:nvGrpSpPr>
+      <p:grpSpPr>
+        <a:xfrm>
+          <a:off x="0" y="0"/>
+          <a:ext cx="0" cy="0"/>
+          <a:chOff x="0" y="0"/>
+          <a:chExt cx="0" cy="0"/>
+        </a:xfrm>
+      </p:grpSpPr>
+      <p:grpSp>
+        <p:nvGrpSpPr>
+          <p:cNvPr id="40" name="Group 39"/>
+          <p:cNvGrpSpPr/>
+          <p:nvPr/>
+        </p:nvGrpSpPr>
+        <p:grpSpPr>
+          <a:xfrm>
+            <a:off x="6223909" y="3301222"/>
+            <a:ext cx="5287783" cy="2704000"/>
+            <a:chOff x="6223909" y="3301222"/>
+            <a:chExt cx="5287783" cy="2704000"/>
+          </a:xfrm>
+        </p:grpSpPr>
+        <p:pic>
+          <p:nvPicPr>
+            <p:cNvPr id="4" name="Content Placeholder 6">
+              <a:extLst>
+                <a:ext uri="{FF2B5EF4-FFF2-40B4-BE49-F238E27FC236}">
+                  <a16:creationId xmlns="" xmlns:a16="http://schemas.microsoft.com/office/drawing/2014/main" id="{B5FBF01F-5A46-AE45-A386-1197E9C84285}"/>
+                </a:ext>
+              </a:extLst>
+            </p:cNvPr>
+            <p:cNvPicPr>
+              <a:picLocks noChangeAspect="1"/>
+            </p:cNvPicPr>
+            <p:nvPr/>
+          </p:nvPicPr>
+          <p:blipFill rotWithShape="1">
+            <a:blip r:embed="rId2"/>
+            <a:srcRect t="7860"/>
+            <a:stretch/>
+          </p:blipFill>
+          <p:spPr>
+            <a:xfrm>
+              <a:off x="6223909" y="3301222"/>
+              <a:ext cx="5163632" cy="2704000"/>
+            </a:xfrm>
+            <a:prstGeom prst="rect">
+              <a:avLst/>
+            </a:prstGeom>
+          </p:spPr>
+        </p:pic>
+        <p:sp>
+          <p:nvSpPr>
+            <p:cNvPr id="13" name="TextBox 12">
+              <a:extLst>
+                <a:ext uri="{FF2B5EF4-FFF2-40B4-BE49-F238E27FC236}">
+                  <a16:creationId xmlns="" xmlns:a16="http://schemas.microsoft.com/office/drawing/2014/main" id="{7C96A7DC-9E77-1440-A26F-E69E8E484244}"/>
+                </a:ext>
+              </a:extLst>
+            </p:cNvPr>
+            <p:cNvSpPr txBox="1"/>
+            <p:nvPr/>
+          </p:nvSpPr>
+          <p:spPr>
+            <a:xfrm>
+              <a:off x="7497443" y="4222673"/>
+              <a:ext cx="1171994" cy="646331"/>
+            </a:xfrm>
+            <a:prstGeom prst="rect">
+              <a:avLst/>
+            </a:prstGeom>
+            <a:noFill/>
+          </p:spPr>
+          <p:txBody>
+            <a:bodyPr wrap="square" rtlCol="0">
+              <a:spAutoFit/>
+            </a:bodyPr>
+            <a:lstStyle/>
+            <a:p>
+              <a:r>
+                <a:rPr lang="en-US" dirty="0"/>
+                <a:t>Tracker region</a:t>
+              </a:r>
+            </a:p>
+          </p:txBody>
+        </p:sp>
+        <p:sp>
+          <p:nvSpPr>
+            <p:cNvPr id="17" name="TextBox 16">
+              <a:extLst>
+                <a:ext uri="{FF2B5EF4-FFF2-40B4-BE49-F238E27FC236}">
+                  <a16:creationId xmlns="" xmlns:a16="http://schemas.microsoft.com/office/drawing/2014/main" id="{B35BD146-CF53-6741-A6CA-F9917A9B6AB2}"/>
+                </a:ext>
+              </a:extLst>
+            </p:cNvPr>
+            <p:cNvSpPr txBox="1"/>
+            <p:nvPr/>
+          </p:nvSpPr>
+          <p:spPr>
+            <a:xfrm rot="16200000">
+              <a:off x="10992639" y="4352409"/>
+              <a:ext cx="668773" cy="369332"/>
+            </a:xfrm>
+            <a:prstGeom prst="rect">
+              <a:avLst/>
+            </a:prstGeom>
+            <a:noFill/>
+          </p:spPr>
+          <p:txBody>
+            <a:bodyPr wrap="none" rtlCol="0">
+              <a:spAutoFit/>
+            </a:bodyPr>
+            <a:lstStyle/>
+            <a:p>
+              <a:r>
+                <a:rPr lang="en-US" dirty="0" smtClean="0"/>
+                <a:t>B</a:t>
+              </a:r>
+              <a:r>
+                <a:rPr lang="en-US" baseline="-25000" dirty="0"/>
+                <a:t>r</a:t>
+              </a:r>
+              <a:r>
+                <a:rPr lang="en-US" dirty="0" smtClean="0"/>
+                <a:t> (T)</a:t>
+              </a:r>
+              <a:endParaRPr lang="en-US" dirty="0"/>
+            </a:p>
+          </p:txBody>
+        </p:sp>
+        <p:sp>
+          <p:nvSpPr>
+            <p:cNvPr id="18" name="Oval 17"/>
+            <p:cNvSpPr/>
+            <p:nvPr/>
+          </p:nvSpPr>
+          <p:spPr>
+            <a:xfrm>
+              <a:off x="8608414" y="4409290"/>
+              <a:ext cx="284984" cy="284984"/>
+            </a:xfrm>
+            <a:prstGeom prst="ellipse">
+              <a:avLst/>
+            </a:prstGeom>
+            <a:ln w="76200">
+              <a:solidFill>
+                <a:schemeClr val="accent1"/>
+              </a:solidFill>
+            </a:ln>
+          </p:spPr>
+          <p:style>
+            <a:lnRef idx="2">
+              <a:schemeClr val="accent1">
+                <a:shade val="50000"/>
+              </a:schemeClr>
+            </a:lnRef>
+            <a:fillRef idx="1">
+              <a:schemeClr val="accent1"/>
+            </a:fillRef>
+            <a:effectRef idx="0">
+              <a:schemeClr val="accent1"/>
+            </a:effectRef>
+            <a:fontRef idx="minor">
+              <a:schemeClr val="lt1"/>
+            </a:fontRef>
+          </p:style>
+          <p:txBody>
+            <a:bodyPr rtlCol="0" anchor="ctr"/>
+            <a:lstStyle/>
+            <a:p>
+              <a:pPr algn="ctr"/>
+              <a:endParaRPr lang="en-US" sz="900" baseline="30000" dirty="0"/>
+            </a:p>
+          </p:txBody>
+        </p:sp>
+        <p:sp>
+          <p:nvSpPr>
+            <p:cNvPr id="25" name="TextBox 24"/>
+            <p:cNvSpPr txBox="1"/>
+            <p:nvPr/>
+          </p:nvSpPr>
+          <p:spPr>
+            <a:xfrm>
+              <a:off x="8587691" y="4374718"/>
+              <a:ext cx="364202" cy="338554"/>
+            </a:xfrm>
+            <a:prstGeom prst="rect">
+              <a:avLst/>
+            </a:prstGeom>
+            <a:noFill/>
+          </p:spPr>
+          <p:txBody>
+            <a:bodyPr wrap="none" rtlCol="0">
+              <a:spAutoFit/>
+            </a:bodyPr>
+            <a:lstStyle/>
+            <a:p>
+              <a:r>
+                <a:rPr lang="en-US" sz="1600" dirty="0" err="1" smtClean="0">
+                  <a:solidFill>
+                    <a:schemeClr val="bg1"/>
+                  </a:solidFill>
+                </a:rPr>
+                <a:t>μ</a:t>
+              </a:r>
+              <a:r>
+                <a:rPr lang="en-US" sz="1600" baseline="30000" dirty="0" smtClean="0">
+                  <a:solidFill>
+                    <a:schemeClr val="bg1"/>
+                  </a:solidFill>
+                </a:rPr>
+                <a:t>+</a:t>
+              </a:r>
+              <a:endParaRPr lang="en-US" sz="1600" baseline="30000" dirty="0">
+                <a:solidFill>
+                  <a:schemeClr val="bg1"/>
+                </a:solidFill>
+              </a:endParaRPr>
+            </a:p>
+          </p:txBody>
+        </p:sp>
+      </p:grpSp>
+      <p:grpSp>
+        <p:nvGrpSpPr>
+          <p:cNvPr id="39" name="Group 38"/>
+          <p:cNvGrpSpPr/>
+          <p:nvPr/>
+        </p:nvGrpSpPr>
+        <p:grpSpPr>
+          <a:xfrm>
+            <a:off x="365245" y="3300412"/>
+            <a:ext cx="5336580" cy="2703999"/>
+            <a:chOff x="365245" y="3300412"/>
+            <a:chExt cx="5336580" cy="2703999"/>
+          </a:xfrm>
+        </p:grpSpPr>
+        <p:pic>
+          <p:nvPicPr>
+            <p:cNvPr id="5" name="Picture 4">
+              <a:extLst>
+                <a:ext uri="{FF2B5EF4-FFF2-40B4-BE49-F238E27FC236}">
+                  <a16:creationId xmlns="" xmlns:a16="http://schemas.microsoft.com/office/drawing/2014/main" id="{E0BBAB1D-27A1-D444-B305-BB3992CA6764}"/>
+                </a:ext>
+              </a:extLst>
+            </p:cNvPr>
+            <p:cNvPicPr>
+              <a:picLocks noChangeAspect="1"/>
+            </p:cNvPicPr>
+            <p:nvPr/>
+          </p:nvPicPr>
+          <p:blipFill rotWithShape="1">
+            <a:blip r:embed="rId3"/>
+            <a:srcRect t="7860"/>
+            <a:stretch/>
+          </p:blipFill>
+          <p:spPr>
+            <a:xfrm>
+              <a:off x="365245" y="3300412"/>
+              <a:ext cx="5165308" cy="2703999"/>
+            </a:xfrm>
+            <a:prstGeom prst="rect">
+              <a:avLst/>
+            </a:prstGeom>
+          </p:spPr>
+        </p:pic>
+        <p:sp>
+          <p:nvSpPr>
+            <p:cNvPr id="6" name="TextBox 5">
+              <a:extLst>
+                <a:ext uri="{FF2B5EF4-FFF2-40B4-BE49-F238E27FC236}">
+                  <a16:creationId xmlns="" xmlns:a16="http://schemas.microsoft.com/office/drawing/2014/main" id="{7C96A7DC-9E77-1440-A26F-E69E8E484244}"/>
+                </a:ext>
+              </a:extLst>
+            </p:cNvPr>
+            <p:cNvSpPr txBox="1"/>
+            <p:nvPr/>
+          </p:nvSpPr>
+          <p:spPr>
+            <a:xfrm>
+              <a:off x="1704584" y="4225003"/>
+              <a:ext cx="1043621" cy="646331"/>
+            </a:xfrm>
+            <a:prstGeom prst="rect">
+              <a:avLst/>
+            </a:prstGeom>
+            <a:noFill/>
+          </p:spPr>
+          <p:txBody>
+            <a:bodyPr wrap="square" rtlCol="0">
+              <a:spAutoFit/>
+            </a:bodyPr>
+            <a:lstStyle/>
+            <a:p>
+              <a:r>
+                <a:rPr lang="en-US" dirty="0"/>
+                <a:t>Tracker region</a:t>
+              </a:r>
+            </a:p>
+          </p:txBody>
+        </p:sp>
+        <p:sp>
+          <p:nvSpPr>
+            <p:cNvPr id="7" name="TextBox 6">
+              <a:extLst>
+                <a:ext uri="{FF2B5EF4-FFF2-40B4-BE49-F238E27FC236}">
+                  <a16:creationId xmlns="" xmlns:a16="http://schemas.microsoft.com/office/drawing/2014/main" id="{B35BD146-CF53-6741-A6CA-F9917A9B6AB2}"/>
+                </a:ext>
+              </a:extLst>
+            </p:cNvPr>
+            <p:cNvSpPr txBox="1"/>
+            <p:nvPr/>
+          </p:nvSpPr>
+          <p:spPr>
+            <a:xfrm rot="16200000">
+              <a:off x="5175783" y="4352408"/>
+              <a:ext cx="682751" cy="369332"/>
+            </a:xfrm>
+            <a:prstGeom prst="rect">
+              <a:avLst/>
+            </a:prstGeom>
+            <a:noFill/>
+          </p:spPr>
+          <p:txBody>
+            <a:bodyPr wrap="none" rtlCol="0">
+              <a:spAutoFit/>
+            </a:bodyPr>
+            <a:lstStyle/>
+            <a:p>
+              <a:r>
+                <a:rPr lang="en-US" dirty="0" smtClean="0"/>
+                <a:t>B</a:t>
+              </a:r>
+              <a:r>
+                <a:rPr lang="en-US" baseline="-25000" dirty="0" smtClean="0"/>
+                <a:t>y</a:t>
+              </a:r>
+              <a:r>
+                <a:rPr lang="en-US" dirty="0" smtClean="0"/>
+                <a:t> (T)</a:t>
+              </a:r>
+              <a:endParaRPr lang="en-US" dirty="0"/>
+            </a:p>
+          </p:txBody>
+        </p:sp>
+        <p:sp>
+          <p:nvSpPr>
+            <p:cNvPr id="11" name="TextBox 10"/>
+            <p:cNvSpPr txBox="1"/>
+            <p:nvPr/>
+          </p:nvSpPr>
+          <p:spPr>
+            <a:xfrm>
+              <a:off x="2373866" y="5143975"/>
+              <a:ext cx="1157311" cy="369332"/>
+            </a:xfrm>
+            <a:prstGeom prst="rect">
+              <a:avLst/>
+            </a:prstGeom>
+            <a:noFill/>
+          </p:spPr>
+          <p:txBody>
+            <a:bodyPr wrap="square" rtlCol="0">
+              <a:spAutoFit/>
+            </a:bodyPr>
+            <a:lstStyle/>
+            <a:p>
+              <a:r>
+                <a:rPr lang="en-US" dirty="0"/>
+                <a:t>1.45 T</a:t>
+              </a:r>
+            </a:p>
+          </p:txBody>
+        </p:sp>
+        <p:cxnSp>
+          <p:nvCxnSpPr>
+            <p:cNvPr id="12" name="Straight Arrow Connector 11"/>
+            <p:cNvCxnSpPr/>
+            <p:nvPr/>
+          </p:nvCxnSpPr>
+          <p:spPr>
+            <a:xfrm flipV="1">
+              <a:off x="3220784" y="5100558"/>
+              <a:ext cx="0" cy="412749"/>
+            </a:xfrm>
+            <a:prstGeom prst="straightConnector1">
+              <a:avLst/>
+            </a:prstGeom>
+            <a:ln w="28575">
+              <a:solidFill>
+                <a:schemeClr val="tx1"/>
+              </a:solidFill>
+              <a:tailEnd type="triangle"/>
+            </a:ln>
+          </p:spPr>
+          <p:style>
+            <a:lnRef idx="1">
+              <a:schemeClr val="accent1"/>
+            </a:lnRef>
+            <a:fillRef idx="0">
+              <a:schemeClr val="accent1"/>
+            </a:fillRef>
+            <a:effectRef idx="0">
+              <a:schemeClr val="accent1"/>
+            </a:effectRef>
+            <a:fontRef idx="minor">
+              <a:schemeClr val="tx1"/>
+            </a:fontRef>
+          </p:style>
+        </p:cxnSp>
+        <p:sp>
+          <p:nvSpPr>
+            <p:cNvPr id="33" name="Oval 32"/>
+            <p:cNvSpPr/>
+            <p:nvPr/>
+          </p:nvSpPr>
+          <p:spPr>
+            <a:xfrm>
+              <a:off x="2792362" y="4416483"/>
+              <a:ext cx="284984" cy="284984"/>
+            </a:xfrm>
+            <a:prstGeom prst="ellipse">
+              <a:avLst/>
+            </a:prstGeom>
+            <a:ln w="76200">
+              <a:solidFill>
+                <a:schemeClr val="accent1"/>
+              </a:solidFill>
+            </a:ln>
+          </p:spPr>
+          <p:style>
+            <a:lnRef idx="2">
+              <a:schemeClr val="accent1">
+                <a:shade val="50000"/>
+              </a:schemeClr>
+            </a:lnRef>
+            <a:fillRef idx="1">
+              <a:schemeClr val="accent1"/>
+            </a:fillRef>
+            <a:effectRef idx="0">
+              <a:schemeClr val="accent1"/>
+            </a:effectRef>
+            <a:fontRef idx="minor">
+              <a:schemeClr val="lt1"/>
+            </a:fontRef>
+          </p:style>
+          <p:txBody>
+            <a:bodyPr rtlCol="0" anchor="ctr"/>
+            <a:lstStyle/>
+            <a:p>
+              <a:pPr algn="ctr"/>
+              <a:endParaRPr lang="en-US" sz="900" baseline="30000" dirty="0"/>
+            </a:p>
+          </p:txBody>
+        </p:sp>
+        <p:sp>
+          <p:nvSpPr>
+            <p:cNvPr id="34" name="TextBox 33"/>
+            <p:cNvSpPr txBox="1"/>
+            <p:nvPr/>
+          </p:nvSpPr>
+          <p:spPr>
+            <a:xfrm>
+              <a:off x="2767590" y="4381911"/>
+              <a:ext cx="364202" cy="338554"/>
+            </a:xfrm>
+            <a:prstGeom prst="rect">
+              <a:avLst/>
+            </a:prstGeom>
+            <a:noFill/>
+          </p:spPr>
+          <p:txBody>
+            <a:bodyPr wrap="none" rtlCol="0">
+              <a:spAutoFit/>
+            </a:bodyPr>
+            <a:lstStyle/>
+            <a:p>
+              <a:r>
+                <a:rPr lang="en-US" sz="1600" dirty="0" err="1" smtClean="0">
+                  <a:solidFill>
+                    <a:schemeClr val="bg1"/>
+                  </a:solidFill>
+                </a:rPr>
+                <a:t>μ</a:t>
+              </a:r>
+              <a:r>
+                <a:rPr lang="en-US" sz="1600" baseline="30000" dirty="0" smtClean="0">
+                  <a:solidFill>
+                    <a:schemeClr val="bg1"/>
+                  </a:solidFill>
+                </a:rPr>
+                <a:t>+</a:t>
+              </a:r>
+              <a:endParaRPr lang="en-US" sz="1600" baseline="30000" dirty="0">
+                <a:solidFill>
+                  <a:schemeClr val="bg1"/>
+                </a:solidFill>
+              </a:endParaRPr>
+            </a:p>
+          </p:txBody>
+        </p:sp>
+      </p:grpSp>
+    </p:spTree>
+    <p:extLst>
+      <p:ext uri="{BB962C8B-B14F-4D97-AF65-F5344CB8AC3E}">
+        <p14:creationId xmlns:p14="http://schemas.microsoft.com/office/powerpoint/2010/main" val="75743569"/>
+      </p:ext>
+    </p:extLst>
+  </p:cSld>
+  <p:clrMapOvr>
+    <a:masterClrMapping/>
+  </p:clrMapOvr>
+</p:sld>
+</file>
+
+<file path=ppt/slides/slide7.xml><?xml version="1.0" encoding="utf-8"?>
+<p:sld xmlns:a="http://schemas.openxmlformats.org/drawingml/2006/main" xmlns:r="http://schemas.openxmlformats.org/officeDocument/2006/relationships" xmlns:p="http://schemas.openxmlformats.org/presentationml/2006/main">
+  <p:cSld>
+    <p:spTree>
+      <p:nvGrpSpPr>
+        <p:cNvPr id="1" name=""/>
+        <p:cNvGrpSpPr/>
+        <p:nvPr/>
+      </p:nvGrpSpPr>
+      <p:grpSpPr>
+        <a:xfrm>
+          <a:off x="0" y="0"/>
+          <a:ext cx="0" cy="0"/>
+          <a:chOff x="0" y="0"/>
+          <a:chExt cx="0" cy="0"/>
+        </a:xfrm>
+      </p:grpSpPr>
+      <p:cxnSp>
+        <p:nvCxnSpPr>
+          <p:cNvPr id="4" name="Straight Connector 3"/>
+          <p:cNvCxnSpPr/>
+          <p:nvPr/>
+        </p:nvCxnSpPr>
+        <p:spPr>
+          <a:xfrm>
+            <a:off x="8755871" y="2950246"/>
+            <a:ext cx="0" cy="3262895"/>
+          </a:xfrm>
+          <a:prstGeom prst="line">
+            <a:avLst/>
+          </a:prstGeom>
+        </p:spPr>
+        <p:style>
+          <a:lnRef idx="1">
+            <a:schemeClr val="accent1"/>
+          </a:lnRef>
+          <a:fillRef idx="0">
+            <a:schemeClr val="accent1"/>
+          </a:fillRef>
+          <a:effectRef idx="0">
+            <a:schemeClr val="accent1"/>
+          </a:effectRef>
+          <a:fontRef idx="minor">
+            <a:schemeClr val="tx1"/>
+          </a:fontRef>
+        </p:style>
+      </p:cxnSp>
+      <p:cxnSp>
+        <p:nvCxnSpPr>
+          <p:cNvPr id="5" name="Straight Connector 4"/>
+          <p:cNvCxnSpPr/>
+          <p:nvPr/>
+        </p:nvCxnSpPr>
+        <p:spPr>
+          <a:xfrm>
+            <a:off x="365245" y="4543488"/>
+            <a:ext cx="11364073" cy="0"/>
+          </a:xfrm>
+          <a:prstGeom prst="line">
+            <a:avLst/>
+          </a:prstGeom>
+        </p:spPr>
+        <p:style>
+          <a:lnRef idx="1">
+            <a:schemeClr val="accent1"/>
+          </a:lnRef>
+          <a:fillRef idx="0">
+            <a:schemeClr val="accent1"/>
+          </a:fillRef>
+          <a:effectRef idx="0">
+            <a:schemeClr val="accent1"/>
+          </a:effectRef>
+          <a:fontRef idx="minor">
+            <a:schemeClr val="tx1"/>
+          </a:fontRef>
+        </p:style>
+      </p:cxnSp>
+      <p:cxnSp>
+        <p:nvCxnSpPr>
+          <p:cNvPr id="6" name="Straight Connector 5"/>
+          <p:cNvCxnSpPr/>
+          <p:nvPr/>
+        </p:nvCxnSpPr>
+        <p:spPr>
+          <a:xfrm>
+            <a:off x="8900435" y="2943950"/>
+            <a:ext cx="0" cy="3262895"/>
+          </a:xfrm>
+          <a:prstGeom prst="line">
+            <a:avLst/>
+          </a:prstGeom>
+        </p:spPr>
+        <p:style>
+          <a:lnRef idx="1">
+            <a:schemeClr val="accent1"/>
+          </a:lnRef>
+          <a:fillRef idx="0">
+            <a:schemeClr val="accent1"/>
+          </a:fillRef>
+          <a:effectRef idx="0">
+            <a:schemeClr val="accent1"/>
+          </a:effectRef>
+          <a:fontRef idx="minor">
+            <a:schemeClr val="tx1"/>
+          </a:fontRef>
+        </p:style>
+      </p:cxnSp>
+      <p:cxnSp>
+        <p:nvCxnSpPr>
+          <p:cNvPr id="7" name="Straight Connector 6"/>
+          <p:cNvCxnSpPr/>
+          <p:nvPr/>
+        </p:nvCxnSpPr>
+        <p:spPr>
+          <a:xfrm>
+            <a:off x="2939819" y="2957439"/>
+            <a:ext cx="0" cy="3262895"/>
+          </a:xfrm>
+          <a:prstGeom prst="line">
+            <a:avLst/>
+          </a:prstGeom>
+        </p:spPr>
+        <p:style>
+          <a:lnRef idx="1">
+            <a:schemeClr val="accent1"/>
+          </a:lnRef>
+          <a:fillRef idx="0">
+            <a:schemeClr val="accent1"/>
+          </a:fillRef>
+          <a:effectRef idx="0">
+            <a:schemeClr val="accent1"/>
+          </a:effectRef>
+          <a:fontRef idx="minor">
+            <a:schemeClr val="tx1"/>
+          </a:fontRef>
+        </p:style>
+      </p:cxnSp>
+      <p:cxnSp>
+        <p:nvCxnSpPr>
+          <p:cNvPr id="8" name="Straight Connector 7"/>
+          <p:cNvCxnSpPr/>
+          <p:nvPr/>
+        </p:nvCxnSpPr>
+        <p:spPr>
+          <a:xfrm>
+            <a:off x="3084383" y="2951143"/>
+            <a:ext cx="0" cy="3262895"/>
+          </a:xfrm>
+          <a:prstGeom prst="line">
+            <a:avLst/>
+          </a:prstGeom>
+        </p:spPr>
+        <p:style>
+          <a:lnRef idx="1">
+            <a:schemeClr val="accent1"/>
+          </a:lnRef>
+          <a:fillRef idx="0">
+            <a:schemeClr val="accent1"/>
+          </a:fillRef>
+          <a:effectRef idx="0">
+            <a:schemeClr val="accent1"/>
+          </a:effectRef>
+          <a:fontRef idx="minor">
+            <a:schemeClr val="tx1"/>
+          </a:fontRef>
+        </p:style>
+      </p:cxnSp>
+      <p:sp>
+        <p:nvSpPr>
+          <p:cNvPr id="9" name="TextBox 8"/>
+          <p:cNvSpPr txBox="1"/>
+          <p:nvPr/>
+        </p:nvSpPr>
+        <p:spPr>
+          <a:xfrm>
+            <a:off x="1871663" y="1514475"/>
+            <a:ext cx="7176773" cy="369332"/>
+          </a:xfrm>
+          <a:prstGeom prst="rect">
+            <a:avLst/>
+          </a:prstGeom>
+          <a:noFill/>
+        </p:spPr>
+        <p:txBody>
+          <a:bodyPr wrap="none" rtlCol="0">
+            <a:spAutoFit/>
+          </a:bodyPr>
+          <a:lstStyle/>
+          <a:p>
+            <a:r>
+              <a:rPr lang="en-US" dirty="0" smtClean="0"/>
+              <a:t>Lines used to line up storage region in previous magnetic field picture slide</a:t>
+            </a:r>
+            <a:endParaRPr lang="en-US" dirty="0"/>
+          </a:p>
+        </p:txBody>
+      </p:sp>
+    </p:spTree>
+    <p:extLst>
+      <p:ext uri="{BB962C8B-B14F-4D97-AF65-F5344CB8AC3E}">
+        <p14:creationId xmlns:p14="http://schemas.microsoft.com/office/powerpoint/2010/main" val="1438483516"/>
       </p:ext>
     </p:extLst>
   </p:cSld>

</xml_diff>

<commit_message>
Work on calorimeter section.
</commit_message>
<xml_diff>
--- a/KinnairdThesis/Body/Figures/ThesisImages.pptx
+++ b/KinnairdThesis/Body/Figures/ThesisImages.pptx
@@ -12,6 +12,7 @@
     <p:sldId id="260" r:id="rId6"/>
     <p:sldId id="261" r:id="rId7"/>
     <p:sldId id="262" r:id="rId8"/>
+    <p:sldId id="263" r:id="rId9"/>
   </p:sldIdLst>
   <p:sldSz cx="12192000" cy="6858000"/>
   <p:notesSz cx="6858000" cy="9144000"/>
@@ -140,7 +141,7 @@
           <p:cNvPr id="2" name="Title 1">
             <a:extLst>
               <a:ext uri="{FF2B5EF4-FFF2-40B4-BE49-F238E27FC236}">
-                <a16:creationId xmlns="" xmlns:a16="http://schemas.microsoft.com/office/drawing/2014/main" id="{1B57B3C4-E435-3843-ADF5-0E6600617A31}"/>
+                <a16:creationId xmlns:a16="http://schemas.microsoft.com/office/drawing/2014/main" xmlns="" id="{1B57B3C4-E435-3843-ADF5-0E6600617A31}"/>
               </a:ext>
             </a:extLst>
           </p:cNvPr>
@@ -177,7 +178,7 @@
           <p:cNvPr id="3" name="Subtitle 2">
             <a:extLst>
               <a:ext uri="{FF2B5EF4-FFF2-40B4-BE49-F238E27FC236}">
-                <a16:creationId xmlns="" xmlns:a16="http://schemas.microsoft.com/office/drawing/2014/main" id="{B014CD73-195A-E146-85B8-CBD8E010BCF0}"/>
+                <a16:creationId xmlns:a16="http://schemas.microsoft.com/office/drawing/2014/main" xmlns="" id="{B014CD73-195A-E146-85B8-CBD8E010BCF0}"/>
               </a:ext>
             </a:extLst>
           </p:cNvPr>
@@ -247,7 +248,7 @@
           <p:cNvPr id="4" name="Date Placeholder 3">
             <a:extLst>
               <a:ext uri="{FF2B5EF4-FFF2-40B4-BE49-F238E27FC236}">
-                <a16:creationId xmlns="" xmlns:a16="http://schemas.microsoft.com/office/drawing/2014/main" id="{658C6929-9B51-6044-B476-05C2B4D39479}"/>
+                <a16:creationId xmlns:a16="http://schemas.microsoft.com/office/drawing/2014/main" xmlns="" id="{658C6929-9B51-6044-B476-05C2B4D39479}"/>
               </a:ext>
             </a:extLst>
           </p:cNvPr>
@@ -265,7 +266,7 @@
           <a:p>
             <a:fld id="{45D29F64-CD52-9145-B05C-AB9DB2C6669A}" type="datetimeFigureOut">
               <a:rPr lang="en-US" smtClean="0"/>
-              <a:t>4/24/19</a:t>
+              <a:t>4/25/19</a:t>
             </a:fld>
             <a:endParaRPr lang="en-US"/>
           </a:p>
@@ -276,7 +277,7 @@
           <p:cNvPr id="5" name="Footer Placeholder 4">
             <a:extLst>
               <a:ext uri="{FF2B5EF4-FFF2-40B4-BE49-F238E27FC236}">
-                <a16:creationId xmlns="" xmlns:a16="http://schemas.microsoft.com/office/drawing/2014/main" id="{EC3DA1B3-BF32-604F-9AA7-7B04982FD0E2}"/>
+                <a16:creationId xmlns:a16="http://schemas.microsoft.com/office/drawing/2014/main" xmlns="" id="{EC3DA1B3-BF32-604F-9AA7-7B04982FD0E2}"/>
               </a:ext>
             </a:extLst>
           </p:cNvPr>
@@ -301,7 +302,7 @@
           <p:cNvPr id="6" name="Slide Number Placeholder 5">
             <a:extLst>
               <a:ext uri="{FF2B5EF4-FFF2-40B4-BE49-F238E27FC236}">
-                <a16:creationId xmlns="" xmlns:a16="http://schemas.microsoft.com/office/drawing/2014/main" id="{88F32B42-BB5D-BB48-8764-9F99727CEF04}"/>
+                <a16:creationId xmlns:a16="http://schemas.microsoft.com/office/drawing/2014/main" xmlns="" id="{88F32B42-BB5D-BB48-8764-9F99727CEF04}"/>
               </a:ext>
             </a:extLst>
           </p:cNvPr>
@@ -360,7 +361,7 @@
           <p:cNvPr id="2" name="Title 1">
             <a:extLst>
               <a:ext uri="{FF2B5EF4-FFF2-40B4-BE49-F238E27FC236}">
-                <a16:creationId xmlns="" xmlns:a16="http://schemas.microsoft.com/office/drawing/2014/main" id="{9BBDEE72-3661-8A4F-BB8D-9F356D4CF066}"/>
+                <a16:creationId xmlns:a16="http://schemas.microsoft.com/office/drawing/2014/main" xmlns="" id="{9BBDEE72-3661-8A4F-BB8D-9F356D4CF066}"/>
               </a:ext>
             </a:extLst>
           </p:cNvPr>
@@ -388,7 +389,7 @@
           <p:cNvPr id="3" name="Vertical Text Placeholder 2">
             <a:extLst>
               <a:ext uri="{FF2B5EF4-FFF2-40B4-BE49-F238E27FC236}">
-                <a16:creationId xmlns="" xmlns:a16="http://schemas.microsoft.com/office/drawing/2014/main" id="{E5116906-5D68-0447-AFCD-16E5B4C58A42}"/>
+                <a16:creationId xmlns:a16="http://schemas.microsoft.com/office/drawing/2014/main" xmlns="" id="{E5116906-5D68-0447-AFCD-16E5B4C58A42}"/>
               </a:ext>
             </a:extLst>
           </p:cNvPr>
@@ -445,7 +446,7 @@
           <p:cNvPr id="4" name="Date Placeholder 3">
             <a:extLst>
               <a:ext uri="{FF2B5EF4-FFF2-40B4-BE49-F238E27FC236}">
-                <a16:creationId xmlns="" xmlns:a16="http://schemas.microsoft.com/office/drawing/2014/main" id="{C6E4F998-D16E-004E-A0D2-E7FF3D7E4F68}"/>
+                <a16:creationId xmlns:a16="http://schemas.microsoft.com/office/drawing/2014/main" xmlns="" id="{C6E4F998-D16E-004E-A0D2-E7FF3D7E4F68}"/>
               </a:ext>
             </a:extLst>
           </p:cNvPr>
@@ -463,7 +464,7 @@
           <a:p>
             <a:fld id="{45D29F64-CD52-9145-B05C-AB9DB2C6669A}" type="datetimeFigureOut">
               <a:rPr lang="en-US" smtClean="0"/>
-              <a:t>4/24/19</a:t>
+              <a:t>4/25/19</a:t>
             </a:fld>
             <a:endParaRPr lang="en-US"/>
           </a:p>
@@ -474,7 +475,7 @@
           <p:cNvPr id="5" name="Footer Placeholder 4">
             <a:extLst>
               <a:ext uri="{FF2B5EF4-FFF2-40B4-BE49-F238E27FC236}">
-                <a16:creationId xmlns="" xmlns:a16="http://schemas.microsoft.com/office/drawing/2014/main" id="{7089704E-D200-514A-B5B7-82DAA49671B8}"/>
+                <a16:creationId xmlns:a16="http://schemas.microsoft.com/office/drawing/2014/main" xmlns="" id="{7089704E-D200-514A-B5B7-82DAA49671B8}"/>
               </a:ext>
             </a:extLst>
           </p:cNvPr>
@@ -499,7 +500,7 @@
           <p:cNvPr id="6" name="Slide Number Placeholder 5">
             <a:extLst>
               <a:ext uri="{FF2B5EF4-FFF2-40B4-BE49-F238E27FC236}">
-                <a16:creationId xmlns="" xmlns:a16="http://schemas.microsoft.com/office/drawing/2014/main" id="{0C72463F-D09A-A346-A1F4-2911755D017A}"/>
+                <a16:creationId xmlns:a16="http://schemas.microsoft.com/office/drawing/2014/main" xmlns="" id="{0C72463F-D09A-A346-A1F4-2911755D017A}"/>
               </a:ext>
             </a:extLst>
           </p:cNvPr>
@@ -558,7 +559,7 @@
           <p:cNvPr id="2" name="Vertical Title 1">
             <a:extLst>
               <a:ext uri="{FF2B5EF4-FFF2-40B4-BE49-F238E27FC236}">
-                <a16:creationId xmlns="" xmlns:a16="http://schemas.microsoft.com/office/drawing/2014/main" id="{AB5946E9-397D-C049-A068-F804360E4392}"/>
+                <a16:creationId xmlns:a16="http://schemas.microsoft.com/office/drawing/2014/main" xmlns="" id="{AB5946E9-397D-C049-A068-F804360E4392}"/>
               </a:ext>
             </a:extLst>
           </p:cNvPr>
@@ -591,7 +592,7 @@
           <p:cNvPr id="3" name="Vertical Text Placeholder 2">
             <a:extLst>
               <a:ext uri="{FF2B5EF4-FFF2-40B4-BE49-F238E27FC236}">
-                <a16:creationId xmlns="" xmlns:a16="http://schemas.microsoft.com/office/drawing/2014/main" id="{89793A4A-3706-F84B-8A06-D16899A78EAB}"/>
+                <a16:creationId xmlns:a16="http://schemas.microsoft.com/office/drawing/2014/main" xmlns="" id="{89793A4A-3706-F84B-8A06-D16899A78EAB}"/>
               </a:ext>
             </a:extLst>
           </p:cNvPr>
@@ -653,7 +654,7 @@
           <p:cNvPr id="4" name="Date Placeholder 3">
             <a:extLst>
               <a:ext uri="{FF2B5EF4-FFF2-40B4-BE49-F238E27FC236}">
-                <a16:creationId xmlns="" xmlns:a16="http://schemas.microsoft.com/office/drawing/2014/main" id="{C25651AD-1FC0-704D-A779-A6A4A66E029E}"/>
+                <a16:creationId xmlns:a16="http://schemas.microsoft.com/office/drawing/2014/main" xmlns="" id="{C25651AD-1FC0-704D-A779-A6A4A66E029E}"/>
               </a:ext>
             </a:extLst>
           </p:cNvPr>
@@ -671,7 +672,7 @@
           <a:p>
             <a:fld id="{45D29F64-CD52-9145-B05C-AB9DB2C6669A}" type="datetimeFigureOut">
               <a:rPr lang="en-US" smtClean="0"/>
-              <a:t>4/24/19</a:t>
+              <a:t>4/25/19</a:t>
             </a:fld>
             <a:endParaRPr lang="en-US"/>
           </a:p>
@@ -682,7 +683,7 @@
           <p:cNvPr id="5" name="Footer Placeholder 4">
             <a:extLst>
               <a:ext uri="{FF2B5EF4-FFF2-40B4-BE49-F238E27FC236}">
-                <a16:creationId xmlns="" xmlns:a16="http://schemas.microsoft.com/office/drawing/2014/main" id="{8126BAD6-4443-004B-BAA1-FE8E085C9F8F}"/>
+                <a16:creationId xmlns:a16="http://schemas.microsoft.com/office/drawing/2014/main" xmlns="" id="{8126BAD6-4443-004B-BAA1-FE8E085C9F8F}"/>
               </a:ext>
             </a:extLst>
           </p:cNvPr>
@@ -707,7 +708,7 @@
           <p:cNvPr id="6" name="Slide Number Placeholder 5">
             <a:extLst>
               <a:ext uri="{FF2B5EF4-FFF2-40B4-BE49-F238E27FC236}">
-                <a16:creationId xmlns="" xmlns:a16="http://schemas.microsoft.com/office/drawing/2014/main" id="{14ED176A-F057-8D41-B00B-B444EA48310F}"/>
+                <a16:creationId xmlns:a16="http://schemas.microsoft.com/office/drawing/2014/main" xmlns="" id="{14ED176A-F057-8D41-B00B-B444EA48310F}"/>
               </a:ext>
             </a:extLst>
           </p:cNvPr>
@@ -766,7 +767,7 @@
           <p:cNvPr id="2" name="Title 1">
             <a:extLst>
               <a:ext uri="{FF2B5EF4-FFF2-40B4-BE49-F238E27FC236}">
-                <a16:creationId xmlns="" xmlns:a16="http://schemas.microsoft.com/office/drawing/2014/main" id="{A7D2B129-1333-1F47-BC4B-33786578E7FC}"/>
+                <a16:creationId xmlns:a16="http://schemas.microsoft.com/office/drawing/2014/main" xmlns="" id="{A7D2B129-1333-1F47-BC4B-33786578E7FC}"/>
               </a:ext>
             </a:extLst>
           </p:cNvPr>
@@ -794,7 +795,7 @@
           <p:cNvPr id="3" name="Content Placeholder 2">
             <a:extLst>
               <a:ext uri="{FF2B5EF4-FFF2-40B4-BE49-F238E27FC236}">
-                <a16:creationId xmlns="" xmlns:a16="http://schemas.microsoft.com/office/drawing/2014/main" id="{9ECDE62D-58E9-6849-98E2-AAA0CCAADDA0}"/>
+                <a16:creationId xmlns:a16="http://schemas.microsoft.com/office/drawing/2014/main" xmlns="" id="{9ECDE62D-58E9-6849-98E2-AAA0CCAADDA0}"/>
               </a:ext>
             </a:extLst>
           </p:cNvPr>
@@ -851,7 +852,7 @@
           <p:cNvPr id="4" name="Date Placeholder 3">
             <a:extLst>
               <a:ext uri="{FF2B5EF4-FFF2-40B4-BE49-F238E27FC236}">
-                <a16:creationId xmlns="" xmlns:a16="http://schemas.microsoft.com/office/drawing/2014/main" id="{EFEA11BF-2A45-4444-AEED-3C1B0AFA193B}"/>
+                <a16:creationId xmlns:a16="http://schemas.microsoft.com/office/drawing/2014/main" xmlns="" id="{EFEA11BF-2A45-4444-AEED-3C1B0AFA193B}"/>
               </a:ext>
             </a:extLst>
           </p:cNvPr>
@@ -869,7 +870,7 @@
           <a:p>
             <a:fld id="{45D29F64-CD52-9145-B05C-AB9DB2C6669A}" type="datetimeFigureOut">
               <a:rPr lang="en-US" smtClean="0"/>
-              <a:t>4/24/19</a:t>
+              <a:t>4/25/19</a:t>
             </a:fld>
             <a:endParaRPr lang="en-US"/>
           </a:p>
@@ -880,7 +881,7 @@
           <p:cNvPr id="5" name="Footer Placeholder 4">
             <a:extLst>
               <a:ext uri="{FF2B5EF4-FFF2-40B4-BE49-F238E27FC236}">
-                <a16:creationId xmlns="" xmlns:a16="http://schemas.microsoft.com/office/drawing/2014/main" id="{009B56B8-8A13-414C-BD29-0782690DB1B9}"/>
+                <a16:creationId xmlns:a16="http://schemas.microsoft.com/office/drawing/2014/main" xmlns="" id="{009B56B8-8A13-414C-BD29-0782690DB1B9}"/>
               </a:ext>
             </a:extLst>
           </p:cNvPr>
@@ -905,7 +906,7 @@
           <p:cNvPr id="6" name="Slide Number Placeholder 5">
             <a:extLst>
               <a:ext uri="{FF2B5EF4-FFF2-40B4-BE49-F238E27FC236}">
-                <a16:creationId xmlns="" xmlns:a16="http://schemas.microsoft.com/office/drawing/2014/main" id="{C4272DC2-C101-6D47-BF16-05E39FF23B46}"/>
+                <a16:creationId xmlns:a16="http://schemas.microsoft.com/office/drawing/2014/main" xmlns="" id="{C4272DC2-C101-6D47-BF16-05E39FF23B46}"/>
               </a:ext>
             </a:extLst>
           </p:cNvPr>
@@ -964,7 +965,7 @@
           <p:cNvPr id="2" name="Title 1">
             <a:extLst>
               <a:ext uri="{FF2B5EF4-FFF2-40B4-BE49-F238E27FC236}">
-                <a16:creationId xmlns="" xmlns:a16="http://schemas.microsoft.com/office/drawing/2014/main" id="{BAC22880-4B93-754D-9213-68DE4C171F7F}"/>
+                <a16:creationId xmlns:a16="http://schemas.microsoft.com/office/drawing/2014/main" xmlns="" id="{BAC22880-4B93-754D-9213-68DE4C171F7F}"/>
               </a:ext>
             </a:extLst>
           </p:cNvPr>
@@ -1001,7 +1002,7 @@
           <p:cNvPr id="3" name="Text Placeholder 2">
             <a:extLst>
               <a:ext uri="{FF2B5EF4-FFF2-40B4-BE49-F238E27FC236}">
-                <a16:creationId xmlns="" xmlns:a16="http://schemas.microsoft.com/office/drawing/2014/main" id="{6B11070C-81F8-0A4F-A81D-8C3C228925A3}"/>
+                <a16:creationId xmlns:a16="http://schemas.microsoft.com/office/drawing/2014/main" xmlns="" id="{6B11070C-81F8-0A4F-A81D-8C3C228925A3}"/>
               </a:ext>
             </a:extLst>
           </p:cNvPr>
@@ -1126,7 +1127,7 @@
           <p:cNvPr id="4" name="Date Placeholder 3">
             <a:extLst>
               <a:ext uri="{FF2B5EF4-FFF2-40B4-BE49-F238E27FC236}">
-                <a16:creationId xmlns="" xmlns:a16="http://schemas.microsoft.com/office/drawing/2014/main" id="{23C53577-1831-364C-B339-4121968BB6DA}"/>
+                <a16:creationId xmlns:a16="http://schemas.microsoft.com/office/drawing/2014/main" xmlns="" id="{23C53577-1831-364C-B339-4121968BB6DA}"/>
               </a:ext>
             </a:extLst>
           </p:cNvPr>
@@ -1144,7 +1145,7 @@
           <a:p>
             <a:fld id="{45D29F64-CD52-9145-B05C-AB9DB2C6669A}" type="datetimeFigureOut">
               <a:rPr lang="en-US" smtClean="0"/>
-              <a:t>4/24/19</a:t>
+              <a:t>4/25/19</a:t>
             </a:fld>
             <a:endParaRPr lang="en-US"/>
           </a:p>
@@ -1155,7 +1156,7 @@
           <p:cNvPr id="5" name="Footer Placeholder 4">
             <a:extLst>
               <a:ext uri="{FF2B5EF4-FFF2-40B4-BE49-F238E27FC236}">
-                <a16:creationId xmlns="" xmlns:a16="http://schemas.microsoft.com/office/drawing/2014/main" id="{9F9CBA5D-DA04-1849-97A2-5E156B619E76}"/>
+                <a16:creationId xmlns:a16="http://schemas.microsoft.com/office/drawing/2014/main" xmlns="" id="{9F9CBA5D-DA04-1849-97A2-5E156B619E76}"/>
               </a:ext>
             </a:extLst>
           </p:cNvPr>
@@ -1180,7 +1181,7 @@
           <p:cNvPr id="6" name="Slide Number Placeholder 5">
             <a:extLst>
               <a:ext uri="{FF2B5EF4-FFF2-40B4-BE49-F238E27FC236}">
-                <a16:creationId xmlns="" xmlns:a16="http://schemas.microsoft.com/office/drawing/2014/main" id="{CF1125EA-E670-6D43-9539-E2289A017005}"/>
+                <a16:creationId xmlns:a16="http://schemas.microsoft.com/office/drawing/2014/main" xmlns="" id="{CF1125EA-E670-6D43-9539-E2289A017005}"/>
               </a:ext>
             </a:extLst>
           </p:cNvPr>
@@ -1239,7 +1240,7 @@
           <p:cNvPr id="2" name="Title 1">
             <a:extLst>
               <a:ext uri="{FF2B5EF4-FFF2-40B4-BE49-F238E27FC236}">
-                <a16:creationId xmlns="" xmlns:a16="http://schemas.microsoft.com/office/drawing/2014/main" id="{262AD6D9-F928-4748-9C7F-D4545C80CAA4}"/>
+                <a16:creationId xmlns:a16="http://schemas.microsoft.com/office/drawing/2014/main" xmlns="" id="{262AD6D9-F928-4748-9C7F-D4545C80CAA4}"/>
               </a:ext>
             </a:extLst>
           </p:cNvPr>
@@ -1267,7 +1268,7 @@
           <p:cNvPr id="3" name="Content Placeholder 2">
             <a:extLst>
               <a:ext uri="{FF2B5EF4-FFF2-40B4-BE49-F238E27FC236}">
-                <a16:creationId xmlns="" xmlns:a16="http://schemas.microsoft.com/office/drawing/2014/main" id="{51D797BF-990E-9A4C-82AC-12AD06F3C184}"/>
+                <a16:creationId xmlns:a16="http://schemas.microsoft.com/office/drawing/2014/main" xmlns="" id="{51D797BF-990E-9A4C-82AC-12AD06F3C184}"/>
               </a:ext>
             </a:extLst>
           </p:cNvPr>
@@ -1329,7 +1330,7 @@
           <p:cNvPr id="4" name="Content Placeholder 3">
             <a:extLst>
               <a:ext uri="{FF2B5EF4-FFF2-40B4-BE49-F238E27FC236}">
-                <a16:creationId xmlns="" xmlns:a16="http://schemas.microsoft.com/office/drawing/2014/main" id="{3DC4D9D4-E298-6D41-ACED-A11435ED9D77}"/>
+                <a16:creationId xmlns:a16="http://schemas.microsoft.com/office/drawing/2014/main" xmlns="" id="{3DC4D9D4-E298-6D41-ACED-A11435ED9D77}"/>
               </a:ext>
             </a:extLst>
           </p:cNvPr>
@@ -1391,7 +1392,7 @@
           <p:cNvPr id="5" name="Date Placeholder 4">
             <a:extLst>
               <a:ext uri="{FF2B5EF4-FFF2-40B4-BE49-F238E27FC236}">
-                <a16:creationId xmlns="" xmlns:a16="http://schemas.microsoft.com/office/drawing/2014/main" id="{E17C102D-9E12-A244-9FD1-B8C9B6279B35}"/>
+                <a16:creationId xmlns:a16="http://schemas.microsoft.com/office/drawing/2014/main" xmlns="" id="{E17C102D-9E12-A244-9FD1-B8C9B6279B35}"/>
               </a:ext>
             </a:extLst>
           </p:cNvPr>
@@ -1409,7 +1410,7 @@
           <a:p>
             <a:fld id="{45D29F64-CD52-9145-B05C-AB9DB2C6669A}" type="datetimeFigureOut">
               <a:rPr lang="en-US" smtClean="0"/>
-              <a:t>4/24/19</a:t>
+              <a:t>4/25/19</a:t>
             </a:fld>
             <a:endParaRPr lang="en-US"/>
           </a:p>
@@ -1420,7 +1421,7 @@
           <p:cNvPr id="6" name="Footer Placeholder 5">
             <a:extLst>
               <a:ext uri="{FF2B5EF4-FFF2-40B4-BE49-F238E27FC236}">
-                <a16:creationId xmlns="" xmlns:a16="http://schemas.microsoft.com/office/drawing/2014/main" id="{0AFE2BCB-F3E8-8549-B6D4-F6040A561AFB}"/>
+                <a16:creationId xmlns:a16="http://schemas.microsoft.com/office/drawing/2014/main" xmlns="" id="{0AFE2BCB-F3E8-8549-B6D4-F6040A561AFB}"/>
               </a:ext>
             </a:extLst>
           </p:cNvPr>
@@ -1445,7 +1446,7 @@
           <p:cNvPr id="7" name="Slide Number Placeholder 6">
             <a:extLst>
               <a:ext uri="{FF2B5EF4-FFF2-40B4-BE49-F238E27FC236}">
-                <a16:creationId xmlns="" xmlns:a16="http://schemas.microsoft.com/office/drawing/2014/main" id="{C39549C6-C80B-BD44-8EF9-A19E907A7CFE}"/>
+                <a16:creationId xmlns:a16="http://schemas.microsoft.com/office/drawing/2014/main" xmlns="" id="{C39549C6-C80B-BD44-8EF9-A19E907A7CFE}"/>
               </a:ext>
             </a:extLst>
           </p:cNvPr>
@@ -1504,7 +1505,7 @@
           <p:cNvPr id="2" name="Title 1">
             <a:extLst>
               <a:ext uri="{FF2B5EF4-FFF2-40B4-BE49-F238E27FC236}">
-                <a16:creationId xmlns="" xmlns:a16="http://schemas.microsoft.com/office/drawing/2014/main" id="{FCEA8641-4386-D644-912C-5AF5E240C2CB}"/>
+                <a16:creationId xmlns:a16="http://schemas.microsoft.com/office/drawing/2014/main" xmlns="" id="{FCEA8641-4386-D644-912C-5AF5E240C2CB}"/>
               </a:ext>
             </a:extLst>
           </p:cNvPr>
@@ -1537,7 +1538,7 @@
           <p:cNvPr id="3" name="Text Placeholder 2">
             <a:extLst>
               <a:ext uri="{FF2B5EF4-FFF2-40B4-BE49-F238E27FC236}">
-                <a16:creationId xmlns="" xmlns:a16="http://schemas.microsoft.com/office/drawing/2014/main" id="{0003CA97-F6C8-4A4C-9811-B27526619B85}"/>
+                <a16:creationId xmlns:a16="http://schemas.microsoft.com/office/drawing/2014/main" xmlns="" id="{0003CA97-F6C8-4A4C-9811-B27526619B85}"/>
               </a:ext>
             </a:extLst>
           </p:cNvPr>
@@ -1608,7 +1609,7 @@
           <p:cNvPr id="4" name="Content Placeholder 3">
             <a:extLst>
               <a:ext uri="{FF2B5EF4-FFF2-40B4-BE49-F238E27FC236}">
-                <a16:creationId xmlns="" xmlns:a16="http://schemas.microsoft.com/office/drawing/2014/main" id="{C428443A-4B63-D44B-992D-A5333C63135A}"/>
+                <a16:creationId xmlns:a16="http://schemas.microsoft.com/office/drawing/2014/main" xmlns="" id="{C428443A-4B63-D44B-992D-A5333C63135A}"/>
               </a:ext>
             </a:extLst>
           </p:cNvPr>
@@ -1670,7 +1671,7 @@
           <p:cNvPr id="5" name="Text Placeholder 4">
             <a:extLst>
               <a:ext uri="{FF2B5EF4-FFF2-40B4-BE49-F238E27FC236}">
-                <a16:creationId xmlns="" xmlns:a16="http://schemas.microsoft.com/office/drawing/2014/main" id="{AB6EDAA3-A02E-E244-A6F8-31DA5C48F793}"/>
+                <a16:creationId xmlns:a16="http://schemas.microsoft.com/office/drawing/2014/main" xmlns="" id="{AB6EDAA3-A02E-E244-A6F8-31DA5C48F793}"/>
               </a:ext>
             </a:extLst>
           </p:cNvPr>
@@ -1741,7 +1742,7 @@
           <p:cNvPr id="6" name="Content Placeholder 5">
             <a:extLst>
               <a:ext uri="{FF2B5EF4-FFF2-40B4-BE49-F238E27FC236}">
-                <a16:creationId xmlns="" xmlns:a16="http://schemas.microsoft.com/office/drawing/2014/main" id="{A625C399-2052-374A-9A63-FF2581D9CF40}"/>
+                <a16:creationId xmlns:a16="http://schemas.microsoft.com/office/drawing/2014/main" xmlns="" id="{A625C399-2052-374A-9A63-FF2581D9CF40}"/>
               </a:ext>
             </a:extLst>
           </p:cNvPr>
@@ -1803,7 +1804,7 @@
           <p:cNvPr id="7" name="Date Placeholder 6">
             <a:extLst>
               <a:ext uri="{FF2B5EF4-FFF2-40B4-BE49-F238E27FC236}">
-                <a16:creationId xmlns="" xmlns:a16="http://schemas.microsoft.com/office/drawing/2014/main" id="{1A599785-4F03-0646-859D-A5B1A395854F}"/>
+                <a16:creationId xmlns:a16="http://schemas.microsoft.com/office/drawing/2014/main" xmlns="" id="{1A599785-4F03-0646-859D-A5B1A395854F}"/>
               </a:ext>
             </a:extLst>
           </p:cNvPr>
@@ -1821,7 +1822,7 @@
           <a:p>
             <a:fld id="{45D29F64-CD52-9145-B05C-AB9DB2C6669A}" type="datetimeFigureOut">
               <a:rPr lang="en-US" smtClean="0"/>
-              <a:t>4/24/19</a:t>
+              <a:t>4/25/19</a:t>
             </a:fld>
             <a:endParaRPr lang="en-US"/>
           </a:p>
@@ -1832,7 +1833,7 @@
           <p:cNvPr id="8" name="Footer Placeholder 7">
             <a:extLst>
               <a:ext uri="{FF2B5EF4-FFF2-40B4-BE49-F238E27FC236}">
-                <a16:creationId xmlns="" xmlns:a16="http://schemas.microsoft.com/office/drawing/2014/main" id="{6AE386FC-4B01-3D4A-B5E6-A4445E725378}"/>
+                <a16:creationId xmlns:a16="http://schemas.microsoft.com/office/drawing/2014/main" xmlns="" id="{6AE386FC-4B01-3D4A-B5E6-A4445E725378}"/>
               </a:ext>
             </a:extLst>
           </p:cNvPr>
@@ -1857,7 +1858,7 @@
           <p:cNvPr id="9" name="Slide Number Placeholder 8">
             <a:extLst>
               <a:ext uri="{FF2B5EF4-FFF2-40B4-BE49-F238E27FC236}">
-                <a16:creationId xmlns="" xmlns:a16="http://schemas.microsoft.com/office/drawing/2014/main" id="{39F0E8DD-4FFE-6540-8032-73316B86EFDA}"/>
+                <a16:creationId xmlns:a16="http://schemas.microsoft.com/office/drawing/2014/main" xmlns="" id="{39F0E8DD-4FFE-6540-8032-73316B86EFDA}"/>
               </a:ext>
             </a:extLst>
           </p:cNvPr>
@@ -1916,7 +1917,7 @@
           <p:cNvPr id="2" name="Title 1">
             <a:extLst>
               <a:ext uri="{FF2B5EF4-FFF2-40B4-BE49-F238E27FC236}">
-                <a16:creationId xmlns="" xmlns:a16="http://schemas.microsoft.com/office/drawing/2014/main" id="{3F5899AE-DFEB-5545-9F33-6F738A85210C}"/>
+                <a16:creationId xmlns:a16="http://schemas.microsoft.com/office/drawing/2014/main" xmlns="" id="{3F5899AE-DFEB-5545-9F33-6F738A85210C}"/>
               </a:ext>
             </a:extLst>
           </p:cNvPr>
@@ -1944,7 +1945,7 @@
           <p:cNvPr id="3" name="Date Placeholder 2">
             <a:extLst>
               <a:ext uri="{FF2B5EF4-FFF2-40B4-BE49-F238E27FC236}">
-                <a16:creationId xmlns="" xmlns:a16="http://schemas.microsoft.com/office/drawing/2014/main" id="{D2BBC704-A814-5E4D-A194-EEDA752CFFB8}"/>
+                <a16:creationId xmlns:a16="http://schemas.microsoft.com/office/drawing/2014/main" xmlns="" id="{D2BBC704-A814-5E4D-A194-EEDA752CFFB8}"/>
               </a:ext>
             </a:extLst>
           </p:cNvPr>
@@ -1962,7 +1963,7 @@
           <a:p>
             <a:fld id="{45D29F64-CD52-9145-B05C-AB9DB2C6669A}" type="datetimeFigureOut">
               <a:rPr lang="en-US" smtClean="0"/>
-              <a:t>4/24/19</a:t>
+              <a:t>4/25/19</a:t>
             </a:fld>
             <a:endParaRPr lang="en-US"/>
           </a:p>
@@ -1973,7 +1974,7 @@
           <p:cNvPr id="4" name="Footer Placeholder 3">
             <a:extLst>
               <a:ext uri="{FF2B5EF4-FFF2-40B4-BE49-F238E27FC236}">
-                <a16:creationId xmlns="" xmlns:a16="http://schemas.microsoft.com/office/drawing/2014/main" id="{5A0140CA-3C42-9F41-BAF5-D4C41D47C7CA}"/>
+                <a16:creationId xmlns:a16="http://schemas.microsoft.com/office/drawing/2014/main" xmlns="" id="{5A0140CA-3C42-9F41-BAF5-D4C41D47C7CA}"/>
               </a:ext>
             </a:extLst>
           </p:cNvPr>
@@ -1998,7 +1999,7 @@
           <p:cNvPr id="5" name="Slide Number Placeholder 4">
             <a:extLst>
               <a:ext uri="{FF2B5EF4-FFF2-40B4-BE49-F238E27FC236}">
-                <a16:creationId xmlns="" xmlns:a16="http://schemas.microsoft.com/office/drawing/2014/main" id="{37086D94-F459-FE40-9093-8A1D3E43A3A9}"/>
+                <a16:creationId xmlns:a16="http://schemas.microsoft.com/office/drawing/2014/main" xmlns="" id="{37086D94-F459-FE40-9093-8A1D3E43A3A9}"/>
               </a:ext>
             </a:extLst>
           </p:cNvPr>
@@ -2057,7 +2058,7 @@
           <p:cNvPr id="2" name="Date Placeholder 1">
             <a:extLst>
               <a:ext uri="{FF2B5EF4-FFF2-40B4-BE49-F238E27FC236}">
-                <a16:creationId xmlns="" xmlns:a16="http://schemas.microsoft.com/office/drawing/2014/main" id="{07A9ACC7-829A-7F4D-8420-A762D036E8CD}"/>
+                <a16:creationId xmlns:a16="http://schemas.microsoft.com/office/drawing/2014/main" xmlns="" id="{07A9ACC7-829A-7F4D-8420-A762D036E8CD}"/>
               </a:ext>
             </a:extLst>
           </p:cNvPr>
@@ -2075,7 +2076,7 @@
           <a:p>
             <a:fld id="{45D29F64-CD52-9145-B05C-AB9DB2C6669A}" type="datetimeFigureOut">
               <a:rPr lang="en-US" smtClean="0"/>
-              <a:t>4/24/19</a:t>
+              <a:t>4/25/19</a:t>
             </a:fld>
             <a:endParaRPr lang="en-US"/>
           </a:p>
@@ -2086,7 +2087,7 @@
           <p:cNvPr id="3" name="Footer Placeholder 2">
             <a:extLst>
               <a:ext uri="{FF2B5EF4-FFF2-40B4-BE49-F238E27FC236}">
-                <a16:creationId xmlns="" xmlns:a16="http://schemas.microsoft.com/office/drawing/2014/main" id="{8FBBF79B-F213-0A4F-B7FB-1DCDEC5761BE}"/>
+                <a16:creationId xmlns:a16="http://schemas.microsoft.com/office/drawing/2014/main" xmlns="" id="{8FBBF79B-F213-0A4F-B7FB-1DCDEC5761BE}"/>
               </a:ext>
             </a:extLst>
           </p:cNvPr>
@@ -2111,7 +2112,7 @@
           <p:cNvPr id="4" name="Slide Number Placeholder 3">
             <a:extLst>
               <a:ext uri="{FF2B5EF4-FFF2-40B4-BE49-F238E27FC236}">
-                <a16:creationId xmlns="" xmlns:a16="http://schemas.microsoft.com/office/drawing/2014/main" id="{B052EC9E-99E7-9841-A360-BDDEE513FB5E}"/>
+                <a16:creationId xmlns:a16="http://schemas.microsoft.com/office/drawing/2014/main" xmlns="" id="{B052EC9E-99E7-9841-A360-BDDEE513FB5E}"/>
               </a:ext>
             </a:extLst>
           </p:cNvPr>
@@ -2170,7 +2171,7 @@
           <p:cNvPr id="2" name="Title 1">
             <a:extLst>
               <a:ext uri="{FF2B5EF4-FFF2-40B4-BE49-F238E27FC236}">
-                <a16:creationId xmlns="" xmlns:a16="http://schemas.microsoft.com/office/drawing/2014/main" id="{070A10A2-F9B0-F344-8BC8-7A00229D2949}"/>
+                <a16:creationId xmlns:a16="http://schemas.microsoft.com/office/drawing/2014/main" xmlns="" id="{070A10A2-F9B0-F344-8BC8-7A00229D2949}"/>
               </a:ext>
             </a:extLst>
           </p:cNvPr>
@@ -2207,7 +2208,7 @@
           <p:cNvPr id="3" name="Content Placeholder 2">
             <a:extLst>
               <a:ext uri="{FF2B5EF4-FFF2-40B4-BE49-F238E27FC236}">
-                <a16:creationId xmlns="" xmlns:a16="http://schemas.microsoft.com/office/drawing/2014/main" id="{61A868DF-34E6-1848-983C-F5D0F4A4A893}"/>
+                <a16:creationId xmlns:a16="http://schemas.microsoft.com/office/drawing/2014/main" xmlns="" id="{61A868DF-34E6-1848-983C-F5D0F4A4A893}"/>
               </a:ext>
             </a:extLst>
           </p:cNvPr>
@@ -2297,7 +2298,7 @@
           <p:cNvPr id="4" name="Text Placeholder 3">
             <a:extLst>
               <a:ext uri="{FF2B5EF4-FFF2-40B4-BE49-F238E27FC236}">
-                <a16:creationId xmlns="" xmlns:a16="http://schemas.microsoft.com/office/drawing/2014/main" id="{376E3DE5-437D-434F-8910-AA8A3F1F1273}"/>
+                <a16:creationId xmlns:a16="http://schemas.microsoft.com/office/drawing/2014/main" xmlns="" id="{376E3DE5-437D-434F-8910-AA8A3F1F1273}"/>
               </a:ext>
             </a:extLst>
           </p:cNvPr>
@@ -2368,7 +2369,7 @@
           <p:cNvPr id="5" name="Date Placeholder 4">
             <a:extLst>
               <a:ext uri="{FF2B5EF4-FFF2-40B4-BE49-F238E27FC236}">
-                <a16:creationId xmlns="" xmlns:a16="http://schemas.microsoft.com/office/drawing/2014/main" id="{2F5DF4B7-6C2B-2B48-A238-F01177207469}"/>
+                <a16:creationId xmlns:a16="http://schemas.microsoft.com/office/drawing/2014/main" xmlns="" id="{2F5DF4B7-6C2B-2B48-A238-F01177207469}"/>
               </a:ext>
             </a:extLst>
           </p:cNvPr>
@@ -2386,7 +2387,7 @@
           <a:p>
             <a:fld id="{45D29F64-CD52-9145-B05C-AB9DB2C6669A}" type="datetimeFigureOut">
               <a:rPr lang="en-US" smtClean="0"/>
-              <a:t>4/24/19</a:t>
+              <a:t>4/25/19</a:t>
             </a:fld>
             <a:endParaRPr lang="en-US"/>
           </a:p>
@@ -2397,7 +2398,7 @@
           <p:cNvPr id="6" name="Footer Placeholder 5">
             <a:extLst>
               <a:ext uri="{FF2B5EF4-FFF2-40B4-BE49-F238E27FC236}">
-                <a16:creationId xmlns="" xmlns:a16="http://schemas.microsoft.com/office/drawing/2014/main" id="{A6EF2281-1ABA-7342-8F35-F0F2D64611D1}"/>
+                <a16:creationId xmlns:a16="http://schemas.microsoft.com/office/drawing/2014/main" xmlns="" id="{A6EF2281-1ABA-7342-8F35-F0F2D64611D1}"/>
               </a:ext>
             </a:extLst>
           </p:cNvPr>
@@ -2422,7 +2423,7 @@
           <p:cNvPr id="7" name="Slide Number Placeholder 6">
             <a:extLst>
               <a:ext uri="{FF2B5EF4-FFF2-40B4-BE49-F238E27FC236}">
-                <a16:creationId xmlns="" xmlns:a16="http://schemas.microsoft.com/office/drawing/2014/main" id="{56AACA73-B098-A443-86E5-3593BAFE81EC}"/>
+                <a16:creationId xmlns:a16="http://schemas.microsoft.com/office/drawing/2014/main" xmlns="" id="{56AACA73-B098-A443-86E5-3593BAFE81EC}"/>
               </a:ext>
             </a:extLst>
           </p:cNvPr>
@@ -2481,7 +2482,7 @@
           <p:cNvPr id="2" name="Title 1">
             <a:extLst>
               <a:ext uri="{FF2B5EF4-FFF2-40B4-BE49-F238E27FC236}">
-                <a16:creationId xmlns="" xmlns:a16="http://schemas.microsoft.com/office/drawing/2014/main" id="{FACBEB41-F32F-6449-BD04-263892C29998}"/>
+                <a16:creationId xmlns:a16="http://schemas.microsoft.com/office/drawing/2014/main" xmlns="" id="{FACBEB41-F32F-6449-BD04-263892C29998}"/>
               </a:ext>
             </a:extLst>
           </p:cNvPr>
@@ -2518,7 +2519,7 @@
           <p:cNvPr id="3" name="Picture Placeholder 2">
             <a:extLst>
               <a:ext uri="{FF2B5EF4-FFF2-40B4-BE49-F238E27FC236}">
-                <a16:creationId xmlns="" xmlns:a16="http://schemas.microsoft.com/office/drawing/2014/main" id="{0AD7B342-A149-9E4F-B5C0-EBE269660B70}"/>
+                <a16:creationId xmlns:a16="http://schemas.microsoft.com/office/drawing/2014/main" xmlns="" id="{0AD7B342-A149-9E4F-B5C0-EBE269660B70}"/>
               </a:ext>
             </a:extLst>
           </p:cNvPr>
@@ -2585,7 +2586,7 @@
           <p:cNvPr id="4" name="Text Placeholder 3">
             <a:extLst>
               <a:ext uri="{FF2B5EF4-FFF2-40B4-BE49-F238E27FC236}">
-                <a16:creationId xmlns="" xmlns:a16="http://schemas.microsoft.com/office/drawing/2014/main" id="{C7034AEB-C9CB-5641-A86A-8CE4D74CA17E}"/>
+                <a16:creationId xmlns:a16="http://schemas.microsoft.com/office/drawing/2014/main" xmlns="" id="{C7034AEB-C9CB-5641-A86A-8CE4D74CA17E}"/>
               </a:ext>
             </a:extLst>
           </p:cNvPr>
@@ -2656,7 +2657,7 @@
           <p:cNvPr id="5" name="Date Placeholder 4">
             <a:extLst>
               <a:ext uri="{FF2B5EF4-FFF2-40B4-BE49-F238E27FC236}">
-                <a16:creationId xmlns="" xmlns:a16="http://schemas.microsoft.com/office/drawing/2014/main" id="{5CF1E772-D352-3342-8861-BDE00833F7EF}"/>
+                <a16:creationId xmlns:a16="http://schemas.microsoft.com/office/drawing/2014/main" xmlns="" id="{5CF1E772-D352-3342-8861-BDE00833F7EF}"/>
               </a:ext>
             </a:extLst>
           </p:cNvPr>
@@ -2674,7 +2675,7 @@
           <a:p>
             <a:fld id="{45D29F64-CD52-9145-B05C-AB9DB2C6669A}" type="datetimeFigureOut">
               <a:rPr lang="en-US" smtClean="0"/>
-              <a:t>4/24/19</a:t>
+              <a:t>4/25/19</a:t>
             </a:fld>
             <a:endParaRPr lang="en-US"/>
           </a:p>
@@ -2685,7 +2686,7 @@
           <p:cNvPr id="6" name="Footer Placeholder 5">
             <a:extLst>
               <a:ext uri="{FF2B5EF4-FFF2-40B4-BE49-F238E27FC236}">
-                <a16:creationId xmlns="" xmlns:a16="http://schemas.microsoft.com/office/drawing/2014/main" id="{D38A5059-1DE0-404B-897B-615661062EB6}"/>
+                <a16:creationId xmlns:a16="http://schemas.microsoft.com/office/drawing/2014/main" xmlns="" id="{D38A5059-1DE0-404B-897B-615661062EB6}"/>
               </a:ext>
             </a:extLst>
           </p:cNvPr>
@@ -2710,7 +2711,7 @@
           <p:cNvPr id="7" name="Slide Number Placeholder 6">
             <a:extLst>
               <a:ext uri="{FF2B5EF4-FFF2-40B4-BE49-F238E27FC236}">
-                <a16:creationId xmlns="" xmlns:a16="http://schemas.microsoft.com/office/drawing/2014/main" id="{FEC9B585-298C-9142-B3E4-9683821FD0C3}"/>
+                <a16:creationId xmlns:a16="http://schemas.microsoft.com/office/drawing/2014/main" xmlns="" id="{FEC9B585-298C-9142-B3E4-9683821FD0C3}"/>
               </a:ext>
             </a:extLst>
           </p:cNvPr>
@@ -2774,7 +2775,7 @@
           <p:cNvPr id="2" name="Title Placeholder 1">
             <a:extLst>
               <a:ext uri="{FF2B5EF4-FFF2-40B4-BE49-F238E27FC236}">
-                <a16:creationId xmlns="" xmlns:a16="http://schemas.microsoft.com/office/drawing/2014/main" id="{4FA3C14F-9E83-204C-93F3-4A106E79DB61}"/>
+                <a16:creationId xmlns:a16="http://schemas.microsoft.com/office/drawing/2014/main" xmlns="" id="{4FA3C14F-9E83-204C-93F3-4A106E79DB61}"/>
               </a:ext>
             </a:extLst>
           </p:cNvPr>
@@ -2812,7 +2813,7 @@
           <p:cNvPr id="3" name="Text Placeholder 2">
             <a:extLst>
               <a:ext uri="{FF2B5EF4-FFF2-40B4-BE49-F238E27FC236}">
-                <a16:creationId xmlns="" xmlns:a16="http://schemas.microsoft.com/office/drawing/2014/main" id="{52192E8A-1958-E54D-9F03-ABB935DE7303}"/>
+                <a16:creationId xmlns:a16="http://schemas.microsoft.com/office/drawing/2014/main" xmlns="" id="{52192E8A-1958-E54D-9F03-ABB935DE7303}"/>
               </a:ext>
             </a:extLst>
           </p:cNvPr>
@@ -2879,7 +2880,7 @@
           <p:cNvPr id="4" name="Date Placeholder 3">
             <a:extLst>
               <a:ext uri="{FF2B5EF4-FFF2-40B4-BE49-F238E27FC236}">
-                <a16:creationId xmlns="" xmlns:a16="http://schemas.microsoft.com/office/drawing/2014/main" id="{7325D930-3387-4845-B851-27EB48A50D33}"/>
+                <a16:creationId xmlns:a16="http://schemas.microsoft.com/office/drawing/2014/main" xmlns="" id="{7325D930-3387-4845-B851-27EB48A50D33}"/>
               </a:ext>
             </a:extLst>
           </p:cNvPr>
@@ -2915,7 +2916,7 @@
           <a:p>
             <a:fld id="{45D29F64-CD52-9145-B05C-AB9DB2C6669A}" type="datetimeFigureOut">
               <a:rPr lang="en-US" smtClean="0"/>
-              <a:t>4/24/19</a:t>
+              <a:t>4/25/19</a:t>
             </a:fld>
             <a:endParaRPr lang="en-US"/>
           </a:p>
@@ -2926,7 +2927,7 @@
           <p:cNvPr id="5" name="Footer Placeholder 4">
             <a:extLst>
               <a:ext uri="{FF2B5EF4-FFF2-40B4-BE49-F238E27FC236}">
-                <a16:creationId xmlns="" xmlns:a16="http://schemas.microsoft.com/office/drawing/2014/main" id="{2B233A07-F101-A046-B90E-4F3B57476DFA}"/>
+                <a16:creationId xmlns:a16="http://schemas.microsoft.com/office/drawing/2014/main" xmlns="" id="{2B233A07-F101-A046-B90E-4F3B57476DFA}"/>
               </a:ext>
             </a:extLst>
           </p:cNvPr>
@@ -2969,7 +2970,7 @@
           <p:cNvPr id="6" name="Slide Number Placeholder 5">
             <a:extLst>
               <a:ext uri="{FF2B5EF4-FFF2-40B4-BE49-F238E27FC236}">
-                <a16:creationId xmlns="" xmlns:a16="http://schemas.microsoft.com/office/drawing/2014/main" id="{1864A47E-8A61-6845-AFEE-CDA6D79ED527}"/>
+                <a16:creationId xmlns:a16="http://schemas.microsoft.com/office/drawing/2014/main" xmlns="" id="{1864A47E-8A61-6845-AFEE-CDA6D79ED527}"/>
               </a:ext>
             </a:extLst>
           </p:cNvPr>
@@ -3337,7 +3338,7 @@
           <p:cNvPr id="2" name="Group 1">
             <a:extLst>
               <a:ext uri="{FF2B5EF4-FFF2-40B4-BE49-F238E27FC236}">
-                <a16:creationId xmlns="" xmlns:a16="http://schemas.microsoft.com/office/drawing/2014/main" id="{21C01040-A5E5-5440-BE0E-83D695C5AF7C}"/>
+                <a16:creationId xmlns:a16="http://schemas.microsoft.com/office/drawing/2014/main" xmlns="" id="{21C01040-A5E5-5440-BE0E-83D695C5AF7C}"/>
               </a:ext>
             </a:extLst>
           </p:cNvPr>
@@ -3357,7 +3358,7 @@
             <p:cNvPr id="4" name="Donut 3">
               <a:extLst>
                 <a:ext uri="{FF2B5EF4-FFF2-40B4-BE49-F238E27FC236}">
-                  <a16:creationId xmlns="" xmlns:a16="http://schemas.microsoft.com/office/drawing/2014/main" id="{3B2A361F-FDE3-7349-9868-C5FD2DECD6F0}"/>
+                  <a16:creationId xmlns:a16="http://schemas.microsoft.com/office/drawing/2014/main" xmlns="" id="{3B2A361F-FDE3-7349-9868-C5FD2DECD6F0}"/>
                 </a:ext>
               </a:extLst>
             </p:cNvPr>
@@ -3409,7 +3410,7 @@
             <p:cNvPr id="10" name="Donut 9">
               <a:extLst>
                 <a:ext uri="{FF2B5EF4-FFF2-40B4-BE49-F238E27FC236}">
-                  <a16:creationId xmlns="" xmlns:a16="http://schemas.microsoft.com/office/drawing/2014/main" id="{BDE35D79-7A44-0147-9C60-C169BA20B071}"/>
+                  <a16:creationId xmlns:a16="http://schemas.microsoft.com/office/drawing/2014/main" xmlns="" id="{BDE35D79-7A44-0147-9C60-C169BA20B071}"/>
                 </a:ext>
               </a:extLst>
             </p:cNvPr>
@@ -3461,7 +3462,7 @@
             <p:cNvPr id="12" name="Donut 11">
               <a:extLst>
                 <a:ext uri="{FF2B5EF4-FFF2-40B4-BE49-F238E27FC236}">
-                  <a16:creationId xmlns="" xmlns:a16="http://schemas.microsoft.com/office/drawing/2014/main" id="{E56352FB-83ED-8E41-A2BB-E276C56457E6}"/>
+                  <a16:creationId xmlns:a16="http://schemas.microsoft.com/office/drawing/2014/main" xmlns="" id="{E56352FB-83ED-8E41-A2BB-E276C56457E6}"/>
                 </a:ext>
               </a:extLst>
             </p:cNvPr>
@@ -3513,7 +3514,7 @@
             <p:cNvPr id="14" name="Donut 13">
               <a:extLst>
                 <a:ext uri="{FF2B5EF4-FFF2-40B4-BE49-F238E27FC236}">
-                  <a16:creationId xmlns="" xmlns:a16="http://schemas.microsoft.com/office/drawing/2014/main" id="{89D72E26-3D0E-F247-A940-D093C75917A9}"/>
+                  <a16:creationId xmlns:a16="http://schemas.microsoft.com/office/drawing/2014/main" xmlns="" id="{89D72E26-3D0E-F247-A940-D093C75917A9}"/>
                 </a:ext>
               </a:extLst>
             </p:cNvPr>
@@ -3565,7 +3566,7 @@
             <p:cNvPr id="16" name="Picture 15">
               <a:extLst>
                 <a:ext uri="{FF2B5EF4-FFF2-40B4-BE49-F238E27FC236}">
-                  <a16:creationId xmlns="" xmlns:a16="http://schemas.microsoft.com/office/drawing/2014/main" id="{65348E9C-5E39-C74F-8639-A4E368B71856}"/>
+                  <a16:creationId xmlns:a16="http://schemas.microsoft.com/office/drawing/2014/main" xmlns="" id="{65348E9C-5E39-C74F-8639-A4E368B71856}"/>
                 </a:ext>
               </a:extLst>
             </p:cNvPr>
@@ -3595,7 +3596,7 @@
             <p:cNvPr id="20" name="Picture 19">
               <a:extLst>
                 <a:ext uri="{FF2B5EF4-FFF2-40B4-BE49-F238E27FC236}">
-                  <a16:creationId xmlns="" xmlns:a16="http://schemas.microsoft.com/office/drawing/2014/main" id="{8803E842-7FB6-6F44-A22E-C3CA6FD7E349}"/>
+                  <a16:creationId xmlns:a16="http://schemas.microsoft.com/office/drawing/2014/main" xmlns="" id="{8803E842-7FB6-6F44-A22E-C3CA6FD7E349}"/>
                 </a:ext>
               </a:extLst>
             </p:cNvPr>
@@ -3625,7 +3626,7 @@
             <p:cNvPr id="21" name="Picture 20">
               <a:extLst>
                 <a:ext uri="{FF2B5EF4-FFF2-40B4-BE49-F238E27FC236}">
-                  <a16:creationId xmlns="" xmlns:a16="http://schemas.microsoft.com/office/drawing/2014/main" id="{303227FF-CA43-ED43-AA6E-589BBC9A9D59}"/>
+                  <a16:creationId xmlns:a16="http://schemas.microsoft.com/office/drawing/2014/main" xmlns="" id="{303227FF-CA43-ED43-AA6E-589BBC9A9D59}"/>
                 </a:ext>
               </a:extLst>
             </p:cNvPr>
@@ -3655,7 +3656,7 @@
             <p:cNvPr id="22" name="Picture 21">
               <a:extLst>
                 <a:ext uri="{FF2B5EF4-FFF2-40B4-BE49-F238E27FC236}">
-                  <a16:creationId xmlns="" xmlns:a16="http://schemas.microsoft.com/office/drawing/2014/main" id="{28D04A45-750D-5149-A269-373E9B55611F}"/>
+                  <a16:creationId xmlns:a16="http://schemas.microsoft.com/office/drawing/2014/main" xmlns="" id="{28D04A45-750D-5149-A269-373E9B55611F}"/>
                 </a:ext>
               </a:extLst>
             </p:cNvPr>
@@ -3685,7 +3686,7 @@
             <p:cNvPr id="24" name="Straight Arrow Connector 23">
               <a:extLst>
                 <a:ext uri="{FF2B5EF4-FFF2-40B4-BE49-F238E27FC236}">
-                  <a16:creationId xmlns="" xmlns:a16="http://schemas.microsoft.com/office/drawing/2014/main" id="{B0D28AA1-5104-B849-AF68-A0F380A29D2E}"/>
+                  <a16:creationId xmlns:a16="http://schemas.microsoft.com/office/drawing/2014/main" xmlns="" id="{B0D28AA1-5104-B849-AF68-A0F380A29D2E}"/>
                 </a:ext>
               </a:extLst>
             </p:cNvPr>
@@ -3727,7 +3728,7 @@
             <p:cNvPr id="25" name="Straight Arrow Connector 24">
               <a:extLst>
                 <a:ext uri="{FF2B5EF4-FFF2-40B4-BE49-F238E27FC236}">
-                  <a16:creationId xmlns="" xmlns:a16="http://schemas.microsoft.com/office/drawing/2014/main" id="{CD795BB4-ABBB-A64E-895F-0481BBE8E4EA}"/>
+                  <a16:creationId xmlns:a16="http://schemas.microsoft.com/office/drawing/2014/main" xmlns="" id="{CD795BB4-ABBB-A64E-895F-0481BBE8E4EA}"/>
                 </a:ext>
               </a:extLst>
             </p:cNvPr>
@@ -3771,7 +3772,7 @@
             <p:cNvPr id="27" name="Straight Arrow Connector 26">
               <a:extLst>
                 <a:ext uri="{FF2B5EF4-FFF2-40B4-BE49-F238E27FC236}">
-                  <a16:creationId xmlns="" xmlns:a16="http://schemas.microsoft.com/office/drawing/2014/main" id="{6F1AA03E-031D-8848-99C0-5A36AF0E5605}"/>
+                  <a16:creationId xmlns:a16="http://schemas.microsoft.com/office/drawing/2014/main" xmlns="" id="{6F1AA03E-031D-8848-99C0-5A36AF0E5605}"/>
                 </a:ext>
               </a:extLst>
             </p:cNvPr>
@@ -3816,7 +3817,7 @@
             <p:cNvPr id="28" name="Straight Arrow Connector 27">
               <a:extLst>
                 <a:ext uri="{FF2B5EF4-FFF2-40B4-BE49-F238E27FC236}">
-                  <a16:creationId xmlns="" xmlns:a16="http://schemas.microsoft.com/office/drawing/2014/main" id="{79B7509F-94D0-C044-9DC2-A554B9DB4C67}"/>
+                  <a16:creationId xmlns:a16="http://schemas.microsoft.com/office/drawing/2014/main" xmlns="" id="{79B7509F-94D0-C044-9DC2-A554B9DB4C67}"/>
                 </a:ext>
               </a:extLst>
             </p:cNvPr>
@@ -3861,7 +3862,7 @@
             <p:cNvPr id="34" name="Straight Arrow Connector 33">
               <a:extLst>
                 <a:ext uri="{FF2B5EF4-FFF2-40B4-BE49-F238E27FC236}">
-                  <a16:creationId xmlns="" xmlns:a16="http://schemas.microsoft.com/office/drawing/2014/main" id="{B64B615A-337A-E447-8F57-6F1155594D20}"/>
+                  <a16:creationId xmlns:a16="http://schemas.microsoft.com/office/drawing/2014/main" xmlns="" id="{B64B615A-337A-E447-8F57-6F1155594D20}"/>
                 </a:ext>
               </a:extLst>
             </p:cNvPr>
@@ -3906,7 +3907,7 @@
             <p:cNvPr id="35" name="Straight Arrow Connector 34">
               <a:extLst>
                 <a:ext uri="{FF2B5EF4-FFF2-40B4-BE49-F238E27FC236}">
-                  <a16:creationId xmlns="" xmlns:a16="http://schemas.microsoft.com/office/drawing/2014/main" id="{9CF84DCC-C72A-C348-8EC1-3A9D17DF0926}"/>
+                  <a16:creationId xmlns:a16="http://schemas.microsoft.com/office/drawing/2014/main" xmlns="" id="{9CF84DCC-C72A-C348-8EC1-3A9D17DF0926}"/>
                 </a:ext>
               </a:extLst>
             </p:cNvPr>
@@ -3951,7 +3952,7 @@
             <p:cNvPr id="36" name="Straight Arrow Connector 35">
               <a:extLst>
                 <a:ext uri="{FF2B5EF4-FFF2-40B4-BE49-F238E27FC236}">
-                  <a16:creationId xmlns="" xmlns:a16="http://schemas.microsoft.com/office/drawing/2014/main" id="{F1E7A251-AD40-E846-8C3D-087F623E8345}"/>
+                  <a16:creationId xmlns:a16="http://schemas.microsoft.com/office/drawing/2014/main" xmlns="" id="{F1E7A251-AD40-E846-8C3D-087F623E8345}"/>
                 </a:ext>
               </a:extLst>
             </p:cNvPr>
@@ -3996,7 +3997,7 @@
             <p:cNvPr id="37" name="TextBox 36">
               <a:extLst>
                 <a:ext uri="{FF2B5EF4-FFF2-40B4-BE49-F238E27FC236}">
-                  <a16:creationId xmlns="" xmlns:a16="http://schemas.microsoft.com/office/drawing/2014/main" id="{32233D15-47D3-4143-B8F5-40394DF42E51}"/>
+                  <a16:creationId xmlns:a16="http://schemas.microsoft.com/office/drawing/2014/main" xmlns="" id="{32233D15-47D3-4143-B8F5-40394DF42E51}"/>
                 </a:ext>
               </a:extLst>
             </p:cNvPr>
@@ -4035,7 +4036,7 @@
             <p:cNvPr id="38" name="TextBox 37">
               <a:extLst>
                 <a:ext uri="{FF2B5EF4-FFF2-40B4-BE49-F238E27FC236}">
-                  <a16:creationId xmlns="" xmlns:a16="http://schemas.microsoft.com/office/drawing/2014/main" id="{92F3D126-75F9-8E47-ACC8-6DE8CE351B10}"/>
+                  <a16:creationId xmlns:a16="http://schemas.microsoft.com/office/drawing/2014/main" xmlns="" id="{92F3D126-75F9-8E47-ACC8-6DE8CE351B10}"/>
                 </a:ext>
               </a:extLst>
             </p:cNvPr>
@@ -4070,7 +4071,7 @@
             <p:cNvPr id="40" name="Straight Arrow Connector 39">
               <a:extLst>
                 <a:ext uri="{FF2B5EF4-FFF2-40B4-BE49-F238E27FC236}">
-                  <a16:creationId xmlns="" xmlns:a16="http://schemas.microsoft.com/office/drawing/2014/main" id="{D129C510-0E92-F748-95B7-D3290C7F5292}"/>
+                  <a16:creationId xmlns:a16="http://schemas.microsoft.com/office/drawing/2014/main" xmlns="" id="{D129C510-0E92-F748-95B7-D3290C7F5292}"/>
                 </a:ext>
               </a:extLst>
             </p:cNvPr>
@@ -4116,7 +4117,7 @@
             <p:cNvPr id="45" name="Straight Arrow Connector 44">
               <a:extLst>
                 <a:ext uri="{FF2B5EF4-FFF2-40B4-BE49-F238E27FC236}">
-                  <a16:creationId xmlns="" xmlns:a16="http://schemas.microsoft.com/office/drawing/2014/main" id="{6A37E265-7C1D-4E42-8DE5-F1525A585474}"/>
+                  <a16:creationId xmlns:a16="http://schemas.microsoft.com/office/drawing/2014/main" xmlns="" id="{6A37E265-7C1D-4E42-8DE5-F1525A585474}"/>
                 </a:ext>
               </a:extLst>
             </p:cNvPr>
@@ -4162,7 +4163,7 @@
             <p:cNvPr id="47" name="Straight Arrow Connector 46">
               <a:extLst>
                 <a:ext uri="{FF2B5EF4-FFF2-40B4-BE49-F238E27FC236}">
-                  <a16:creationId xmlns="" xmlns:a16="http://schemas.microsoft.com/office/drawing/2014/main" id="{01B65FEC-66A0-E54A-A1A9-01441382ADA4}"/>
+                  <a16:creationId xmlns:a16="http://schemas.microsoft.com/office/drawing/2014/main" xmlns="" id="{01B65FEC-66A0-E54A-A1A9-01441382ADA4}"/>
                 </a:ext>
               </a:extLst>
             </p:cNvPr>
@@ -4208,7 +4209,7 @@
             <p:cNvPr id="48" name="Donut 47">
               <a:extLst>
                 <a:ext uri="{FF2B5EF4-FFF2-40B4-BE49-F238E27FC236}">
-                  <a16:creationId xmlns="" xmlns:a16="http://schemas.microsoft.com/office/drawing/2014/main" id="{1AD3C458-7283-094D-A4AC-30A8D632277B}"/>
+                  <a16:creationId xmlns:a16="http://schemas.microsoft.com/office/drawing/2014/main" xmlns="" id="{1AD3C458-7283-094D-A4AC-30A8D632277B}"/>
                 </a:ext>
               </a:extLst>
             </p:cNvPr>
@@ -4260,7 +4261,7 @@
             <p:cNvPr id="49" name="Donut 48">
               <a:extLst>
                 <a:ext uri="{FF2B5EF4-FFF2-40B4-BE49-F238E27FC236}">
-                  <a16:creationId xmlns="" xmlns:a16="http://schemas.microsoft.com/office/drawing/2014/main" id="{54296AC5-4EA6-2E48-B195-3F349430556D}"/>
+                  <a16:creationId xmlns:a16="http://schemas.microsoft.com/office/drawing/2014/main" xmlns="" id="{54296AC5-4EA6-2E48-B195-3F349430556D}"/>
                 </a:ext>
               </a:extLst>
             </p:cNvPr>
@@ -4312,7 +4313,7 @@
             <p:cNvPr id="50" name="Donut 49">
               <a:extLst>
                 <a:ext uri="{FF2B5EF4-FFF2-40B4-BE49-F238E27FC236}">
-                  <a16:creationId xmlns="" xmlns:a16="http://schemas.microsoft.com/office/drawing/2014/main" id="{ECEA39D9-22FF-2142-92DA-F78CCF525516}"/>
+                  <a16:creationId xmlns:a16="http://schemas.microsoft.com/office/drawing/2014/main" xmlns="" id="{ECEA39D9-22FF-2142-92DA-F78CCF525516}"/>
                 </a:ext>
               </a:extLst>
             </p:cNvPr>
@@ -4364,7 +4365,7 @@
             <p:cNvPr id="51" name="Donut 50">
               <a:extLst>
                 <a:ext uri="{FF2B5EF4-FFF2-40B4-BE49-F238E27FC236}">
-                  <a16:creationId xmlns="" xmlns:a16="http://schemas.microsoft.com/office/drawing/2014/main" id="{027D34A4-3CCC-5E4C-8C3B-04AEEFC20D48}"/>
+                  <a16:creationId xmlns:a16="http://schemas.microsoft.com/office/drawing/2014/main" xmlns="" id="{027D34A4-3CCC-5E4C-8C3B-04AEEFC20D48}"/>
                 </a:ext>
               </a:extLst>
             </p:cNvPr>
@@ -4416,7 +4417,7 @@
             <p:cNvPr id="52" name="Picture 51">
               <a:extLst>
                 <a:ext uri="{FF2B5EF4-FFF2-40B4-BE49-F238E27FC236}">
-                  <a16:creationId xmlns="" xmlns:a16="http://schemas.microsoft.com/office/drawing/2014/main" id="{5D3188FF-EB25-4542-9B0E-F071C76D530F}"/>
+                  <a16:creationId xmlns:a16="http://schemas.microsoft.com/office/drawing/2014/main" xmlns="" id="{5D3188FF-EB25-4542-9B0E-F071C76D530F}"/>
                 </a:ext>
               </a:extLst>
             </p:cNvPr>
@@ -4446,7 +4447,7 @@
             <p:cNvPr id="53" name="Picture 52">
               <a:extLst>
                 <a:ext uri="{FF2B5EF4-FFF2-40B4-BE49-F238E27FC236}">
-                  <a16:creationId xmlns="" xmlns:a16="http://schemas.microsoft.com/office/drawing/2014/main" id="{E80586E2-8A21-B44A-B2A6-E2A37289C605}"/>
+                  <a16:creationId xmlns:a16="http://schemas.microsoft.com/office/drawing/2014/main" xmlns="" id="{E80586E2-8A21-B44A-B2A6-E2A37289C605}"/>
                 </a:ext>
               </a:extLst>
             </p:cNvPr>
@@ -4476,7 +4477,7 @@
             <p:cNvPr id="54" name="Picture 53">
               <a:extLst>
                 <a:ext uri="{FF2B5EF4-FFF2-40B4-BE49-F238E27FC236}">
-                  <a16:creationId xmlns="" xmlns:a16="http://schemas.microsoft.com/office/drawing/2014/main" id="{10C0DB48-7DBA-884E-BE90-9CC62393ECA2}"/>
+                  <a16:creationId xmlns:a16="http://schemas.microsoft.com/office/drawing/2014/main" xmlns="" id="{10C0DB48-7DBA-884E-BE90-9CC62393ECA2}"/>
                 </a:ext>
               </a:extLst>
             </p:cNvPr>
@@ -4506,7 +4507,7 @@
             <p:cNvPr id="55" name="Picture 54">
               <a:extLst>
                 <a:ext uri="{FF2B5EF4-FFF2-40B4-BE49-F238E27FC236}">
-                  <a16:creationId xmlns="" xmlns:a16="http://schemas.microsoft.com/office/drawing/2014/main" id="{B4AE2BC6-738E-E543-8EFA-CBB71B892574}"/>
+                  <a16:creationId xmlns:a16="http://schemas.microsoft.com/office/drawing/2014/main" xmlns="" id="{B4AE2BC6-738E-E543-8EFA-CBB71B892574}"/>
                 </a:ext>
               </a:extLst>
             </p:cNvPr>
@@ -4536,7 +4537,7 @@
             <p:cNvPr id="57" name="Straight Arrow Connector 56">
               <a:extLst>
                 <a:ext uri="{FF2B5EF4-FFF2-40B4-BE49-F238E27FC236}">
-                  <a16:creationId xmlns="" xmlns:a16="http://schemas.microsoft.com/office/drawing/2014/main" id="{B7E0628D-3896-0D40-8C0F-2A2C37242174}"/>
+                  <a16:creationId xmlns:a16="http://schemas.microsoft.com/office/drawing/2014/main" xmlns="" id="{B7E0628D-3896-0D40-8C0F-2A2C37242174}"/>
                 </a:ext>
               </a:extLst>
             </p:cNvPr>
@@ -4581,7 +4582,7 @@
             <p:cNvPr id="58" name="Straight Arrow Connector 57">
               <a:extLst>
                 <a:ext uri="{FF2B5EF4-FFF2-40B4-BE49-F238E27FC236}">
-                  <a16:creationId xmlns="" xmlns:a16="http://schemas.microsoft.com/office/drawing/2014/main" id="{A8ACF2FB-D778-3646-84C4-C402FC592721}"/>
+                  <a16:creationId xmlns:a16="http://schemas.microsoft.com/office/drawing/2014/main" xmlns="" id="{A8ACF2FB-D778-3646-84C4-C402FC592721}"/>
                 </a:ext>
               </a:extLst>
             </p:cNvPr>
@@ -4626,7 +4627,7 @@
             <p:cNvPr id="59" name="Straight Arrow Connector 58">
               <a:extLst>
                 <a:ext uri="{FF2B5EF4-FFF2-40B4-BE49-F238E27FC236}">
-                  <a16:creationId xmlns="" xmlns:a16="http://schemas.microsoft.com/office/drawing/2014/main" id="{E424E677-519B-644C-852E-DAFC1041F8F9}"/>
+                  <a16:creationId xmlns:a16="http://schemas.microsoft.com/office/drawing/2014/main" xmlns="" id="{E424E677-519B-644C-852E-DAFC1041F8F9}"/>
                 </a:ext>
               </a:extLst>
             </p:cNvPr>
@@ -4671,7 +4672,7 @@
             <p:cNvPr id="60" name="Straight Arrow Connector 59">
               <a:extLst>
                 <a:ext uri="{FF2B5EF4-FFF2-40B4-BE49-F238E27FC236}">
-                  <a16:creationId xmlns="" xmlns:a16="http://schemas.microsoft.com/office/drawing/2014/main" id="{CC702EAB-6327-3548-9BA5-19449AE977CC}"/>
+                  <a16:creationId xmlns:a16="http://schemas.microsoft.com/office/drawing/2014/main" xmlns="" id="{CC702EAB-6327-3548-9BA5-19449AE977CC}"/>
                 </a:ext>
               </a:extLst>
             </p:cNvPr>
@@ -4716,7 +4717,7 @@
             <p:cNvPr id="61" name="Straight Arrow Connector 60">
               <a:extLst>
                 <a:ext uri="{FF2B5EF4-FFF2-40B4-BE49-F238E27FC236}">
-                  <a16:creationId xmlns="" xmlns:a16="http://schemas.microsoft.com/office/drawing/2014/main" id="{0E175693-96D0-5548-87EF-74C7A77A63D4}"/>
+                  <a16:creationId xmlns:a16="http://schemas.microsoft.com/office/drawing/2014/main" xmlns="" id="{0E175693-96D0-5548-87EF-74C7A77A63D4}"/>
                 </a:ext>
               </a:extLst>
             </p:cNvPr>
@@ -4761,7 +4762,7 @@
             <p:cNvPr id="62" name="Straight Arrow Connector 61">
               <a:extLst>
                 <a:ext uri="{FF2B5EF4-FFF2-40B4-BE49-F238E27FC236}">
-                  <a16:creationId xmlns="" xmlns:a16="http://schemas.microsoft.com/office/drawing/2014/main" id="{F787A27D-C2A6-494E-9E42-2C8E021EA6BA}"/>
+                  <a16:creationId xmlns:a16="http://schemas.microsoft.com/office/drawing/2014/main" xmlns="" id="{F787A27D-C2A6-494E-9E42-2C8E021EA6BA}"/>
                 </a:ext>
               </a:extLst>
             </p:cNvPr>
@@ -4806,7 +4807,7 @@
             <p:cNvPr id="65" name="Straight Arrow Connector 64">
               <a:extLst>
                 <a:ext uri="{FF2B5EF4-FFF2-40B4-BE49-F238E27FC236}">
-                  <a16:creationId xmlns="" xmlns:a16="http://schemas.microsoft.com/office/drawing/2014/main" id="{665894B1-601F-B54F-B53B-D7434ED7704F}"/>
+                  <a16:creationId xmlns:a16="http://schemas.microsoft.com/office/drawing/2014/main" xmlns="" id="{665894B1-601F-B54F-B53B-D7434ED7704F}"/>
                 </a:ext>
               </a:extLst>
             </p:cNvPr>
@@ -4853,7 +4854,7 @@
             <p:cNvPr id="66" name="Straight Arrow Connector 65">
               <a:extLst>
                 <a:ext uri="{FF2B5EF4-FFF2-40B4-BE49-F238E27FC236}">
-                  <a16:creationId xmlns="" xmlns:a16="http://schemas.microsoft.com/office/drawing/2014/main" id="{8D00B99C-A25A-0544-9CCC-62BED27C14E3}"/>
+                  <a16:creationId xmlns:a16="http://schemas.microsoft.com/office/drawing/2014/main" xmlns="" id="{8D00B99C-A25A-0544-9CCC-62BED27C14E3}"/>
                 </a:ext>
               </a:extLst>
             </p:cNvPr>
@@ -4900,7 +4901,7 @@
             <p:cNvPr id="74" name="Straight Arrow Connector 73">
               <a:extLst>
                 <a:ext uri="{FF2B5EF4-FFF2-40B4-BE49-F238E27FC236}">
-                  <a16:creationId xmlns="" xmlns:a16="http://schemas.microsoft.com/office/drawing/2014/main" id="{9897DA5B-3CCB-0745-A483-551471B7CE67}"/>
+                  <a16:creationId xmlns:a16="http://schemas.microsoft.com/office/drawing/2014/main" xmlns="" id="{9897DA5B-3CCB-0745-A483-551471B7CE67}"/>
                 </a:ext>
               </a:extLst>
             </p:cNvPr>
@@ -4947,7 +4948,7 @@
             <p:cNvPr id="86" name="TextBox 85">
               <a:extLst>
                 <a:ext uri="{FF2B5EF4-FFF2-40B4-BE49-F238E27FC236}">
-                  <a16:creationId xmlns="" xmlns:a16="http://schemas.microsoft.com/office/drawing/2014/main" id="{08D6A736-4169-4F4B-A504-8B317B727C73}"/>
+                  <a16:creationId xmlns:a16="http://schemas.microsoft.com/office/drawing/2014/main" xmlns="" id="{08D6A736-4169-4F4B-A504-8B317B727C73}"/>
                 </a:ext>
               </a:extLst>
             </p:cNvPr>
@@ -4982,7 +4983,7 @@
             <p:cNvPr id="87" name="Straight Arrow Connector 86">
               <a:extLst>
                 <a:ext uri="{FF2B5EF4-FFF2-40B4-BE49-F238E27FC236}">
-                  <a16:creationId xmlns="" xmlns:a16="http://schemas.microsoft.com/office/drawing/2014/main" id="{D894C924-CCB7-294F-92D3-516C5963A38F}"/>
+                  <a16:creationId xmlns:a16="http://schemas.microsoft.com/office/drawing/2014/main" xmlns="" id="{D894C924-CCB7-294F-92D3-516C5963A38F}"/>
                 </a:ext>
               </a:extLst>
             </p:cNvPr>
@@ -5026,7 +5027,7 @@
             <p:cNvPr id="88" name="Straight Arrow Connector 87">
               <a:extLst>
                 <a:ext uri="{FF2B5EF4-FFF2-40B4-BE49-F238E27FC236}">
-                  <a16:creationId xmlns="" xmlns:a16="http://schemas.microsoft.com/office/drawing/2014/main" id="{643ADA86-9B33-E942-973D-84EF8B397DA7}"/>
+                  <a16:creationId xmlns:a16="http://schemas.microsoft.com/office/drawing/2014/main" xmlns="" id="{643ADA86-9B33-E942-973D-84EF8B397DA7}"/>
                 </a:ext>
               </a:extLst>
             </p:cNvPr>
@@ -5070,7 +5071,7 @@
             <p:cNvPr id="92" name="Rectangle 91">
               <a:extLst>
                 <a:ext uri="{FF2B5EF4-FFF2-40B4-BE49-F238E27FC236}">
-                  <a16:creationId xmlns="" xmlns:a16="http://schemas.microsoft.com/office/drawing/2014/main" id="{0706AB93-4F5E-9F46-B494-FAA5B69D424F}"/>
+                  <a16:creationId xmlns:a16="http://schemas.microsoft.com/office/drawing/2014/main" xmlns="" id="{0706AB93-4F5E-9F46-B494-FAA5B69D424F}"/>
                 </a:ext>
               </a:extLst>
             </p:cNvPr>
@@ -5153,7 +5154,7 @@
           <p:cNvPr id="23" name="Group 22">
             <a:extLst>
               <a:ext uri="{FF2B5EF4-FFF2-40B4-BE49-F238E27FC236}">
-                <a16:creationId xmlns="" xmlns:a16="http://schemas.microsoft.com/office/drawing/2014/main" id="{BCC420A2-DA9C-7942-B39C-D09C4F5EA55A}"/>
+                <a16:creationId xmlns:a16="http://schemas.microsoft.com/office/drawing/2014/main" xmlns="" id="{BCC420A2-DA9C-7942-B39C-D09C4F5EA55A}"/>
               </a:ext>
             </a:extLst>
           </p:cNvPr>
@@ -5173,7 +5174,7 @@
             <p:cNvPr id="5" name="Straight Connector 4">
               <a:extLst>
                 <a:ext uri="{FF2B5EF4-FFF2-40B4-BE49-F238E27FC236}">
-                  <a16:creationId xmlns="" xmlns:a16="http://schemas.microsoft.com/office/drawing/2014/main" id="{39360EB3-2F94-A44A-B39F-9DB160370D7A}"/>
+                  <a16:creationId xmlns:a16="http://schemas.microsoft.com/office/drawing/2014/main" xmlns="" id="{39360EB3-2F94-A44A-B39F-9DB160370D7A}"/>
                 </a:ext>
               </a:extLst>
             </p:cNvPr>
@@ -5216,7 +5217,7 @@
             <p:cNvPr id="6" name="Straight Connector 5">
               <a:extLst>
                 <a:ext uri="{FF2B5EF4-FFF2-40B4-BE49-F238E27FC236}">
-                  <a16:creationId xmlns="" xmlns:a16="http://schemas.microsoft.com/office/drawing/2014/main" id="{853E8DA6-DA6D-6C46-BFE7-416FBF17C8C7}"/>
+                  <a16:creationId xmlns:a16="http://schemas.microsoft.com/office/drawing/2014/main" xmlns="" id="{853E8DA6-DA6D-6C46-BFE7-416FBF17C8C7}"/>
                 </a:ext>
               </a:extLst>
             </p:cNvPr>
@@ -5260,7 +5261,7 @@
             <p:cNvPr id="9" name="Straight Arrow Connector 8">
               <a:extLst>
                 <a:ext uri="{FF2B5EF4-FFF2-40B4-BE49-F238E27FC236}">
-                  <a16:creationId xmlns="" xmlns:a16="http://schemas.microsoft.com/office/drawing/2014/main" id="{CF5C9E10-448B-F945-BDB2-68260461DD67}"/>
+                  <a16:creationId xmlns:a16="http://schemas.microsoft.com/office/drawing/2014/main" xmlns="" id="{CF5C9E10-448B-F945-BDB2-68260461DD67}"/>
                 </a:ext>
               </a:extLst>
             </p:cNvPr>
@@ -5302,7 +5303,7 @@
             <p:cNvPr id="10" name="TextBox 9">
               <a:extLst>
                 <a:ext uri="{FF2B5EF4-FFF2-40B4-BE49-F238E27FC236}">
-                  <a16:creationId xmlns="" xmlns:a16="http://schemas.microsoft.com/office/drawing/2014/main" id="{FFC39BBD-2C9F-A441-B982-D45EDEFFB0E5}"/>
+                  <a16:creationId xmlns:a16="http://schemas.microsoft.com/office/drawing/2014/main" xmlns="" id="{FFC39BBD-2C9F-A441-B982-D45EDEFFB0E5}"/>
                 </a:ext>
               </a:extLst>
             </p:cNvPr>
@@ -5341,7 +5342,7 @@
             <p:cNvPr id="11" name="TextBox 10">
               <a:extLst>
                 <a:ext uri="{FF2B5EF4-FFF2-40B4-BE49-F238E27FC236}">
-                  <a16:creationId xmlns="" xmlns:a16="http://schemas.microsoft.com/office/drawing/2014/main" id="{6E340A3D-9611-684E-B25B-F9AB12BDD1D4}"/>
+                  <a16:creationId xmlns:a16="http://schemas.microsoft.com/office/drawing/2014/main" xmlns="" id="{6E340A3D-9611-684E-B25B-F9AB12BDD1D4}"/>
                 </a:ext>
               </a:extLst>
             </p:cNvPr>
@@ -5380,7 +5381,7 @@
             <p:cNvPr id="12" name="Straight Arrow Connector 11">
               <a:extLst>
                 <a:ext uri="{FF2B5EF4-FFF2-40B4-BE49-F238E27FC236}">
-                  <a16:creationId xmlns="" xmlns:a16="http://schemas.microsoft.com/office/drawing/2014/main" id="{735FC0BE-6106-9543-A10D-686E0BE6FB36}"/>
+                  <a16:creationId xmlns:a16="http://schemas.microsoft.com/office/drawing/2014/main" xmlns="" id="{735FC0BE-6106-9543-A10D-686E0BE6FB36}"/>
                 </a:ext>
               </a:extLst>
             </p:cNvPr>
@@ -5425,7 +5426,7 @@
             <p:cNvPr id="15" name="Straight Arrow Connector 14">
               <a:extLst>
                 <a:ext uri="{FF2B5EF4-FFF2-40B4-BE49-F238E27FC236}">
-                  <a16:creationId xmlns="" xmlns:a16="http://schemas.microsoft.com/office/drawing/2014/main" id="{F8024A55-957A-0D40-B26F-ABA50E186F24}"/>
+                  <a16:creationId xmlns:a16="http://schemas.microsoft.com/office/drawing/2014/main" xmlns="" id="{F8024A55-957A-0D40-B26F-ABA50E186F24}"/>
                 </a:ext>
               </a:extLst>
             </p:cNvPr>
@@ -5470,7 +5471,7 @@
             <p:cNvPr id="17" name="TextBox 16">
               <a:extLst>
                 <a:ext uri="{FF2B5EF4-FFF2-40B4-BE49-F238E27FC236}">
-                  <a16:creationId xmlns="" xmlns:a16="http://schemas.microsoft.com/office/drawing/2014/main" id="{16D3F9D4-E5F7-6B4D-A03D-0AA606EE74AB}"/>
+                  <a16:creationId xmlns:a16="http://schemas.microsoft.com/office/drawing/2014/main" xmlns="" id="{16D3F9D4-E5F7-6B4D-A03D-0AA606EE74AB}"/>
                 </a:ext>
               </a:extLst>
             </p:cNvPr>
@@ -5509,7 +5510,7 @@
             <p:cNvPr id="18" name="TextBox 17">
               <a:extLst>
                 <a:ext uri="{FF2B5EF4-FFF2-40B4-BE49-F238E27FC236}">
-                  <a16:creationId xmlns="" xmlns:a16="http://schemas.microsoft.com/office/drawing/2014/main" id="{8B25EDDD-F275-834A-AA71-146F0B514D87}"/>
+                  <a16:creationId xmlns:a16="http://schemas.microsoft.com/office/drawing/2014/main" xmlns="" id="{8B25EDDD-F275-834A-AA71-146F0B514D87}"/>
                 </a:ext>
               </a:extLst>
             </p:cNvPr>
@@ -5544,7 +5545,7 @@
             <p:cNvPr id="19" name="TextBox 18">
               <a:extLst>
                 <a:ext uri="{FF2B5EF4-FFF2-40B4-BE49-F238E27FC236}">
-                  <a16:creationId xmlns="" xmlns:a16="http://schemas.microsoft.com/office/drawing/2014/main" id="{F447B65D-C5AF-DB48-A22C-6A80F0DBED91}"/>
+                  <a16:creationId xmlns:a16="http://schemas.microsoft.com/office/drawing/2014/main" xmlns="" id="{F447B65D-C5AF-DB48-A22C-6A80F0DBED91}"/>
                 </a:ext>
               </a:extLst>
             </p:cNvPr>
@@ -5579,7 +5580,7 @@
             <p:cNvPr id="20" name="Arc 19">
               <a:extLst>
                 <a:ext uri="{FF2B5EF4-FFF2-40B4-BE49-F238E27FC236}">
-                  <a16:creationId xmlns="" xmlns:a16="http://schemas.microsoft.com/office/drawing/2014/main" id="{2A1C4EA9-9F3E-6C4D-A9D7-CC767EFDC316}"/>
+                  <a16:creationId xmlns:a16="http://schemas.microsoft.com/office/drawing/2014/main" xmlns="" id="{2A1C4EA9-9F3E-6C4D-A9D7-CC767EFDC316}"/>
                 </a:ext>
               </a:extLst>
             </p:cNvPr>
@@ -5631,7 +5632,7 @@
             <p:cNvPr id="21" name="TextBox 20">
               <a:extLst>
                 <a:ext uri="{FF2B5EF4-FFF2-40B4-BE49-F238E27FC236}">
-                  <a16:creationId xmlns="" xmlns:a16="http://schemas.microsoft.com/office/drawing/2014/main" id="{6906D6A8-C6DC-7E42-B6AC-74F70CA0B1F4}"/>
+                  <a16:creationId xmlns:a16="http://schemas.microsoft.com/office/drawing/2014/main" xmlns="" id="{6906D6A8-C6DC-7E42-B6AC-74F70CA0B1F4}"/>
                 </a:ext>
               </a:extLst>
             </p:cNvPr>
@@ -5711,7 +5712,7 @@
             <p:cNvPr id="4" name="Picture 3">
               <a:extLst>
                 <a:ext uri="{FF2B5EF4-FFF2-40B4-BE49-F238E27FC236}">
-                  <a16:creationId xmlns:a16="http://schemas.microsoft.com/office/drawing/2014/main" xmlns="" id="{9594DC97-7FD9-6C4C-AA8C-A206E9FDE4B1}"/>
+                  <a16:creationId xmlns="" xmlns:a16="http://schemas.microsoft.com/office/drawing/2014/main" id="{9594DC97-7FD9-6C4C-AA8C-A206E9FDE4B1}"/>
                 </a:ext>
               </a:extLst>
             </p:cNvPr>
@@ -6135,7 +6136,7 @@
             <p:cNvPr id="4" name="Picture 3">
               <a:extLst>
                 <a:ext uri="{FF2B5EF4-FFF2-40B4-BE49-F238E27FC236}">
-                  <a16:creationId xmlns="" xmlns:a16="http://schemas.microsoft.com/office/drawing/2014/main" id="{2E17FE61-10C3-E64B-ABB3-5FFD96909365}"/>
+                  <a16:creationId xmlns:a16="http://schemas.microsoft.com/office/drawing/2014/main" xmlns="" id="{2E17FE61-10C3-E64B-ABB3-5FFD96909365}"/>
                 </a:ext>
               </a:extLst>
             </p:cNvPr>
@@ -6164,7 +6165,7 @@
             <p:cNvPr id="5" name="Donut 4">
               <a:extLst>
                 <a:ext uri="{FF2B5EF4-FFF2-40B4-BE49-F238E27FC236}">
-                  <a16:creationId xmlns="" xmlns:a16="http://schemas.microsoft.com/office/drawing/2014/main" id="{A05B1990-5D9B-6044-AC97-F08B64FB7307}"/>
+                  <a16:creationId xmlns:a16="http://schemas.microsoft.com/office/drawing/2014/main" xmlns="" id="{A05B1990-5D9B-6044-AC97-F08B64FB7307}"/>
                 </a:ext>
               </a:extLst>
             </p:cNvPr>
@@ -6224,7 +6225,7 @@
             <p:cNvPr id="6" name="Donut 5">
               <a:extLst>
                 <a:ext uri="{FF2B5EF4-FFF2-40B4-BE49-F238E27FC236}">
-                  <a16:creationId xmlns="" xmlns:a16="http://schemas.microsoft.com/office/drawing/2014/main" id="{E87D4265-32C9-8641-9224-27CBAEBBC555}"/>
+                  <a16:creationId xmlns:a16="http://schemas.microsoft.com/office/drawing/2014/main" xmlns="" id="{E87D4265-32C9-8641-9224-27CBAEBBC555}"/>
                 </a:ext>
               </a:extLst>
             </p:cNvPr>
@@ -6284,7 +6285,7 @@
             <p:cNvPr id="7" name="Donut 6">
               <a:extLst>
                 <a:ext uri="{FF2B5EF4-FFF2-40B4-BE49-F238E27FC236}">
-                  <a16:creationId xmlns="" xmlns:a16="http://schemas.microsoft.com/office/drawing/2014/main" id="{94E5F9FB-A235-5A4B-ACA8-09116E31D8B2}"/>
+                  <a16:creationId xmlns:a16="http://schemas.microsoft.com/office/drawing/2014/main" xmlns="" id="{94E5F9FB-A235-5A4B-ACA8-09116E31D8B2}"/>
                 </a:ext>
               </a:extLst>
             </p:cNvPr>
@@ -6344,7 +6345,7 @@
             <p:cNvPr id="8" name="Donut 7">
               <a:extLst>
                 <a:ext uri="{FF2B5EF4-FFF2-40B4-BE49-F238E27FC236}">
-                  <a16:creationId xmlns="" xmlns:a16="http://schemas.microsoft.com/office/drawing/2014/main" id="{A8505250-A9B4-8441-82AA-79C65E428040}"/>
+                  <a16:creationId xmlns:a16="http://schemas.microsoft.com/office/drawing/2014/main" xmlns="" id="{A8505250-A9B4-8441-82AA-79C65E428040}"/>
                 </a:ext>
               </a:extLst>
             </p:cNvPr>
@@ -6486,7 +6487,7 @@
             <p:cNvPr id="4" name="Content Placeholder 6">
               <a:extLst>
                 <a:ext uri="{FF2B5EF4-FFF2-40B4-BE49-F238E27FC236}">
-                  <a16:creationId xmlns="" xmlns:a16="http://schemas.microsoft.com/office/drawing/2014/main" id="{B5FBF01F-5A46-AE45-A386-1197E9C84285}"/>
+                  <a16:creationId xmlns:a16="http://schemas.microsoft.com/office/drawing/2014/main" xmlns="" id="{B5FBF01F-5A46-AE45-A386-1197E9C84285}"/>
                 </a:ext>
               </a:extLst>
             </p:cNvPr>
@@ -6515,7 +6516,7 @@
             <p:cNvPr id="13" name="TextBox 12">
               <a:extLst>
                 <a:ext uri="{FF2B5EF4-FFF2-40B4-BE49-F238E27FC236}">
-                  <a16:creationId xmlns="" xmlns:a16="http://schemas.microsoft.com/office/drawing/2014/main" id="{7C96A7DC-9E77-1440-A26F-E69E8E484244}"/>
+                  <a16:creationId xmlns:a16="http://schemas.microsoft.com/office/drawing/2014/main" xmlns="" id="{7C96A7DC-9E77-1440-A26F-E69E8E484244}"/>
                 </a:ext>
               </a:extLst>
             </p:cNvPr>
@@ -6550,7 +6551,7 @@
             <p:cNvPr id="17" name="TextBox 16">
               <a:extLst>
                 <a:ext uri="{FF2B5EF4-FFF2-40B4-BE49-F238E27FC236}">
-                  <a16:creationId xmlns="" xmlns:a16="http://schemas.microsoft.com/office/drawing/2014/main" id="{B35BD146-CF53-6741-A6CA-F9917A9B6AB2}"/>
+                  <a16:creationId xmlns:a16="http://schemas.microsoft.com/office/drawing/2014/main" xmlns="" id="{B35BD146-CF53-6741-A6CA-F9917A9B6AB2}"/>
                 </a:ext>
               </a:extLst>
             </p:cNvPr>
@@ -6700,7 +6701,7 @@
             <p:cNvPr id="5" name="Picture 4">
               <a:extLst>
                 <a:ext uri="{FF2B5EF4-FFF2-40B4-BE49-F238E27FC236}">
-                  <a16:creationId xmlns="" xmlns:a16="http://schemas.microsoft.com/office/drawing/2014/main" id="{E0BBAB1D-27A1-D444-B305-BB3992CA6764}"/>
+                  <a16:creationId xmlns:a16="http://schemas.microsoft.com/office/drawing/2014/main" xmlns="" id="{E0BBAB1D-27A1-D444-B305-BB3992CA6764}"/>
                 </a:ext>
               </a:extLst>
             </p:cNvPr>
@@ -6729,7 +6730,7 @@
             <p:cNvPr id="6" name="TextBox 5">
               <a:extLst>
                 <a:ext uri="{FF2B5EF4-FFF2-40B4-BE49-F238E27FC236}">
-                  <a16:creationId xmlns="" xmlns:a16="http://schemas.microsoft.com/office/drawing/2014/main" id="{7C96A7DC-9E77-1440-A26F-E69E8E484244}"/>
+                  <a16:creationId xmlns:a16="http://schemas.microsoft.com/office/drawing/2014/main" xmlns="" id="{7C96A7DC-9E77-1440-A26F-E69E8E484244}"/>
                 </a:ext>
               </a:extLst>
             </p:cNvPr>
@@ -6764,7 +6765,7 @@
             <p:cNvPr id="7" name="TextBox 6">
               <a:extLst>
                 <a:ext uri="{FF2B5EF4-FFF2-40B4-BE49-F238E27FC236}">
-                  <a16:creationId xmlns="" xmlns:a16="http://schemas.microsoft.com/office/drawing/2014/main" id="{B35BD146-CF53-6741-A6CA-F9917A9B6AB2}"/>
+                  <a16:creationId xmlns:a16="http://schemas.microsoft.com/office/drawing/2014/main" xmlns="" id="{B35BD146-CF53-6741-A6CA-F9917A9B6AB2}"/>
                 </a:ext>
               </a:extLst>
             </p:cNvPr>
@@ -7174,6 +7175,168 @@
     <p:extLst>
       <p:ext uri="{BB962C8B-B14F-4D97-AF65-F5344CB8AC3E}">
         <p14:creationId xmlns:p14="http://schemas.microsoft.com/office/powerpoint/2010/main" val="1438483516"/>
+      </p:ext>
+    </p:extLst>
+  </p:cSld>
+  <p:clrMapOvr>
+    <a:masterClrMapping/>
+  </p:clrMapOvr>
+</p:sld>
+</file>
+
+<file path=ppt/slides/slide8.xml><?xml version="1.0" encoding="utf-8"?>
+<p:sld xmlns:a="http://schemas.openxmlformats.org/drawingml/2006/main" xmlns:r="http://schemas.openxmlformats.org/officeDocument/2006/relationships" xmlns:p="http://schemas.openxmlformats.org/presentationml/2006/main">
+  <p:cSld>
+    <p:spTree>
+      <p:nvGrpSpPr>
+        <p:cNvPr id="1" name=""/>
+        <p:cNvGrpSpPr/>
+        <p:nvPr/>
+      </p:nvGrpSpPr>
+      <p:grpSpPr>
+        <a:xfrm>
+          <a:off x="0" y="0"/>
+          <a:ext cx="0" cy="0"/>
+          <a:chOff x="0" y="0"/>
+          <a:chExt cx="0" cy="0"/>
+        </a:xfrm>
+      </p:grpSpPr>
+      <p:pic>
+        <p:nvPicPr>
+          <p:cNvPr id="4" name="Picture 3"/>
+          <p:cNvPicPr>
+            <a:picLocks noChangeAspect="1"/>
+          </p:cNvPicPr>
+          <p:nvPr/>
+        </p:nvPicPr>
+        <p:blipFill>
+          <a:blip r:embed="rId2">
+            <a:extLst>
+              <a:ext uri="{28A0092B-C50C-407E-A947-70E740481C1C}">
+                <a14:useLocalDpi xmlns:a14="http://schemas.microsoft.com/office/drawing/2010/main" val="0"/>
+              </a:ext>
+            </a:extLst>
+          </a:blip>
+          <a:stretch>
+            <a:fillRect/>
+          </a:stretch>
+        </p:blipFill>
+        <p:spPr>
+          <a:xfrm>
+            <a:off x="1337037" y="705573"/>
+            <a:ext cx="6832600" cy="5549900"/>
+          </a:xfrm>
+          <a:prstGeom prst="rect">
+            <a:avLst/>
+          </a:prstGeom>
+        </p:spPr>
+      </p:pic>
+      <p:sp>
+        <p:nvSpPr>
+          <p:cNvPr id="5" name="TextBox 4"/>
+          <p:cNvSpPr txBox="1"/>
+          <p:nvPr/>
+        </p:nvSpPr>
+        <p:spPr>
+          <a:xfrm>
+            <a:off x="3731980" y="1991375"/>
+            <a:ext cx="1295291" cy="369332"/>
+          </a:xfrm>
+          <a:prstGeom prst="rect">
+            <a:avLst/>
+          </a:prstGeom>
+          <a:solidFill>
+            <a:schemeClr val="bg1"/>
+          </a:solidFill>
+        </p:spPr>
+        <p:txBody>
+          <a:bodyPr wrap="none" rtlCol="0">
+            <a:spAutoFit/>
+          </a:bodyPr>
+          <a:lstStyle/>
+          <a:p>
+            <a:r>
+              <a:rPr lang="en-US" dirty="0" smtClean="0"/>
+              <a:t>Calorimeter</a:t>
+            </a:r>
+            <a:endParaRPr lang="en-US" dirty="0"/>
+          </a:p>
+        </p:txBody>
+      </p:sp>
+      <p:cxnSp>
+        <p:nvCxnSpPr>
+          <p:cNvPr id="7" name="Straight Arrow Connector 6"/>
+          <p:cNvCxnSpPr>
+            <a:stCxn id="5" idx="1"/>
+          </p:cNvCxnSpPr>
+          <p:nvPr/>
+        </p:nvCxnSpPr>
+        <p:spPr>
+          <a:xfrm flipH="1">
+            <a:off x="2870521" y="2176041"/>
+            <a:ext cx="861459" cy="0"/>
+          </a:xfrm>
+          <a:prstGeom prst="straightConnector1">
+            <a:avLst/>
+          </a:prstGeom>
+          <a:ln w="38100">
+            <a:solidFill>
+              <a:srgbClr val="FF0000"/>
+            </a:solidFill>
+            <a:tailEnd type="triangle"/>
+          </a:ln>
+        </p:spPr>
+        <p:style>
+          <a:lnRef idx="1">
+            <a:schemeClr val="accent1"/>
+          </a:lnRef>
+          <a:fillRef idx="0">
+            <a:schemeClr val="accent1"/>
+          </a:fillRef>
+          <a:effectRef idx="0">
+            <a:schemeClr val="accent1"/>
+          </a:effectRef>
+          <a:fontRef idx="minor">
+            <a:schemeClr val="tx1"/>
+          </a:fontRef>
+        </p:style>
+      </p:cxnSp>
+      <p:sp>
+        <p:nvSpPr>
+          <p:cNvPr id="10" name="TextBox 9"/>
+          <p:cNvSpPr txBox="1"/>
+          <p:nvPr/>
+        </p:nvSpPr>
+        <p:spPr>
+          <a:xfrm>
+            <a:off x="5339788" y="3388984"/>
+            <a:ext cx="1200457" cy="369332"/>
+          </a:xfrm>
+          <a:prstGeom prst="rect">
+            <a:avLst/>
+          </a:prstGeom>
+          <a:solidFill>
+            <a:schemeClr val="bg1"/>
+          </a:solidFill>
+        </p:spPr>
+        <p:txBody>
+          <a:bodyPr wrap="none" rtlCol="0">
+            <a:spAutoFit/>
+          </a:bodyPr>
+          <a:lstStyle/>
+          <a:p>
+            <a:r>
+              <a:rPr lang="en-US" smtClean="0"/>
+              <a:t>Electronics</a:t>
+            </a:r>
+            <a:endParaRPr lang="en-US" dirty="0"/>
+          </a:p>
+        </p:txBody>
+      </p:sp>
+    </p:spTree>
+    <p:extLst>
+      <p:ext uri="{BB962C8B-B14F-4D97-AF65-F5344CB8AC3E}">
+        <p14:creationId xmlns:p14="http://schemas.microsoft.com/office/powerpoint/2010/main" val="1444941668"/>
       </p:ext>
     </p:extLst>
   </p:cSld>

</xml_diff>

<commit_message>
Start of work on Geane stuff, added tracker reference frame picture.
</commit_message>
<xml_diff>
--- a/KinnairdThesis/Body/Figures/ThesisImages.pptx
+++ b/KinnairdThesis/Body/Figures/ThesisImages.pptx
@@ -14,6 +14,7 @@
     <p:sldId id="262" r:id="rId8"/>
     <p:sldId id="263" r:id="rId9"/>
     <p:sldId id="264" r:id="rId10"/>
+    <p:sldId id="265" r:id="rId11"/>
   </p:sldIdLst>
   <p:sldSz cx="12192000" cy="6858000"/>
   <p:notesSz cx="6858000" cy="9144000"/>
@@ -142,7 +143,7 @@
           <p:cNvPr id="2" name="Title 1">
             <a:extLst>
               <a:ext uri="{FF2B5EF4-FFF2-40B4-BE49-F238E27FC236}">
-                <a16:creationId xmlns:a16="http://schemas.microsoft.com/office/drawing/2014/main" id="{1B57B3C4-E435-3843-ADF5-0E6600617A31}"/>
+                <a16:creationId xmlns:a16="http://schemas.microsoft.com/office/drawing/2014/main" xmlns="" id="{1B57B3C4-E435-3843-ADF5-0E6600617A31}"/>
               </a:ext>
             </a:extLst>
           </p:cNvPr>
@@ -179,7 +180,7 @@
           <p:cNvPr id="3" name="Subtitle 2">
             <a:extLst>
               <a:ext uri="{FF2B5EF4-FFF2-40B4-BE49-F238E27FC236}">
-                <a16:creationId xmlns:a16="http://schemas.microsoft.com/office/drawing/2014/main" id="{B014CD73-195A-E146-85B8-CBD8E010BCF0}"/>
+                <a16:creationId xmlns:a16="http://schemas.microsoft.com/office/drawing/2014/main" xmlns="" id="{B014CD73-195A-E146-85B8-CBD8E010BCF0}"/>
               </a:ext>
             </a:extLst>
           </p:cNvPr>
@@ -249,7 +250,7 @@
           <p:cNvPr id="4" name="Date Placeholder 3">
             <a:extLst>
               <a:ext uri="{FF2B5EF4-FFF2-40B4-BE49-F238E27FC236}">
-                <a16:creationId xmlns:a16="http://schemas.microsoft.com/office/drawing/2014/main" id="{658C6929-9B51-6044-B476-05C2B4D39479}"/>
+                <a16:creationId xmlns:a16="http://schemas.microsoft.com/office/drawing/2014/main" xmlns="" id="{658C6929-9B51-6044-B476-05C2B4D39479}"/>
               </a:ext>
             </a:extLst>
           </p:cNvPr>
@@ -267,7 +268,7 @@
           <a:p>
             <a:fld id="{45D29F64-CD52-9145-B05C-AB9DB2C6669A}" type="datetimeFigureOut">
               <a:rPr lang="en-US" smtClean="0"/>
-              <a:t>4/26/19</a:t>
+              <a:t>5/1/19</a:t>
             </a:fld>
             <a:endParaRPr lang="en-US"/>
           </a:p>
@@ -278,7 +279,7 @@
           <p:cNvPr id="5" name="Footer Placeholder 4">
             <a:extLst>
               <a:ext uri="{FF2B5EF4-FFF2-40B4-BE49-F238E27FC236}">
-                <a16:creationId xmlns:a16="http://schemas.microsoft.com/office/drawing/2014/main" id="{EC3DA1B3-BF32-604F-9AA7-7B04982FD0E2}"/>
+                <a16:creationId xmlns:a16="http://schemas.microsoft.com/office/drawing/2014/main" xmlns="" id="{EC3DA1B3-BF32-604F-9AA7-7B04982FD0E2}"/>
               </a:ext>
             </a:extLst>
           </p:cNvPr>
@@ -303,7 +304,7 @@
           <p:cNvPr id="6" name="Slide Number Placeholder 5">
             <a:extLst>
               <a:ext uri="{FF2B5EF4-FFF2-40B4-BE49-F238E27FC236}">
-                <a16:creationId xmlns:a16="http://schemas.microsoft.com/office/drawing/2014/main" id="{88F32B42-BB5D-BB48-8764-9F99727CEF04}"/>
+                <a16:creationId xmlns:a16="http://schemas.microsoft.com/office/drawing/2014/main" xmlns="" id="{88F32B42-BB5D-BB48-8764-9F99727CEF04}"/>
               </a:ext>
             </a:extLst>
           </p:cNvPr>
@@ -362,7 +363,7 @@
           <p:cNvPr id="2" name="Title 1">
             <a:extLst>
               <a:ext uri="{FF2B5EF4-FFF2-40B4-BE49-F238E27FC236}">
-                <a16:creationId xmlns:a16="http://schemas.microsoft.com/office/drawing/2014/main" id="{9BBDEE72-3661-8A4F-BB8D-9F356D4CF066}"/>
+                <a16:creationId xmlns:a16="http://schemas.microsoft.com/office/drawing/2014/main" xmlns="" id="{9BBDEE72-3661-8A4F-BB8D-9F356D4CF066}"/>
               </a:ext>
             </a:extLst>
           </p:cNvPr>
@@ -390,7 +391,7 @@
           <p:cNvPr id="3" name="Vertical Text Placeholder 2">
             <a:extLst>
               <a:ext uri="{FF2B5EF4-FFF2-40B4-BE49-F238E27FC236}">
-                <a16:creationId xmlns:a16="http://schemas.microsoft.com/office/drawing/2014/main" id="{E5116906-5D68-0447-AFCD-16E5B4C58A42}"/>
+                <a16:creationId xmlns:a16="http://schemas.microsoft.com/office/drawing/2014/main" xmlns="" id="{E5116906-5D68-0447-AFCD-16E5B4C58A42}"/>
               </a:ext>
             </a:extLst>
           </p:cNvPr>
@@ -447,7 +448,7 @@
           <p:cNvPr id="4" name="Date Placeholder 3">
             <a:extLst>
               <a:ext uri="{FF2B5EF4-FFF2-40B4-BE49-F238E27FC236}">
-                <a16:creationId xmlns:a16="http://schemas.microsoft.com/office/drawing/2014/main" id="{C6E4F998-D16E-004E-A0D2-E7FF3D7E4F68}"/>
+                <a16:creationId xmlns:a16="http://schemas.microsoft.com/office/drawing/2014/main" xmlns="" id="{C6E4F998-D16E-004E-A0D2-E7FF3D7E4F68}"/>
               </a:ext>
             </a:extLst>
           </p:cNvPr>
@@ -465,7 +466,7 @@
           <a:p>
             <a:fld id="{45D29F64-CD52-9145-B05C-AB9DB2C6669A}" type="datetimeFigureOut">
               <a:rPr lang="en-US" smtClean="0"/>
-              <a:t>4/26/19</a:t>
+              <a:t>5/1/19</a:t>
             </a:fld>
             <a:endParaRPr lang="en-US"/>
           </a:p>
@@ -476,7 +477,7 @@
           <p:cNvPr id="5" name="Footer Placeholder 4">
             <a:extLst>
               <a:ext uri="{FF2B5EF4-FFF2-40B4-BE49-F238E27FC236}">
-                <a16:creationId xmlns:a16="http://schemas.microsoft.com/office/drawing/2014/main" id="{7089704E-D200-514A-B5B7-82DAA49671B8}"/>
+                <a16:creationId xmlns:a16="http://schemas.microsoft.com/office/drawing/2014/main" xmlns="" id="{7089704E-D200-514A-B5B7-82DAA49671B8}"/>
               </a:ext>
             </a:extLst>
           </p:cNvPr>
@@ -501,7 +502,7 @@
           <p:cNvPr id="6" name="Slide Number Placeholder 5">
             <a:extLst>
               <a:ext uri="{FF2B5EF4-FFF2-40B4-BE49-F238E27FC236}">
-                <a16:creationId xmlns:a16="http://schemas.microsoft.com/office/drawing/2014/main" id="{0C72463F-D09A-A346-A1F4-2911755D017A}"/>
+                <a16:creationId xmlns:a16="http://schemas.microsoft.com/office/drawing/2014/main" xmlns="" id="{0C72463F-D09A-A346-A1F4-2911755D017A}"/>
               </a:ext>
             </a:extLst>
           </p:cNvPr>
@@ -560,7 +561,7 @@
           <p:cNvPr id="2" name="Vertical Title 1">
             <a:extLst>
               <a:ext uri="{FF2B5EF4-FFF2-40B4-BE49-F238E27FC236}">
-                <a16:creationId xmlns:a16="http://schemas.microsoft.com/office/drawing/2014/main" id="{AB5946E9-397D-C049-A068-F804360E4392}"/>
+                <a16:creationId xmlns:a16="http://schemas.microsoft.com/office/drawing/2014/main" xmlns="" id="{AB5946E9-397D-C049-A068-F804360E4392}"/>
               </a:ext>
             </a:extLst>
           </p:cNvPr>
@@ -593,7 +594,7 @@
           <p:cNvPr id="3" name="Vertical Text Placeholder 2">
             <a:extLst>
               <a:ext uri="{FF2B5EF4-FFF2-40B4-BE49-F238E27FC236}">
-                <a16:creationId xmlns:a16="http://schemas.microsoft.com/office/drawing/2014/main" id="{89793A4A-3706-F84B-8A06-D16899A78EAB}"/>
+                <a16:creationId xmlns:a16="http://schemas.microsoft.com/office/drawing/2014/main" xmlns="" id="{89793A4A-3706-F84B-8A06-D16899A78EAB}"/>
               </a:ext>
             </a:extLst>
           </p:cNvPr>
@@ -655,7 +656,7 @@
           <p:cNvPr id="4" name="Date Placeholder 3">
             <a:extLst>
               <a:ext uri="{FF2B5EF4-FFF2-40B4-BE49-F238E27FC236}">
-                <a16:creationId xmlns:a16="http://schemas.microsoft.com/office/drawing/2014/main" id="{C25651AD-1FC0-704D-A779-A6A4A66E029E}"/>
+                <a16:creationId xmlns:a16="http://schemas.microsoft.com/office/drawing/2014/main" xmlns="" id="{C25651AD-1FC0-704D-A779-A6A4A66E029E}"/>
               </a:ext>
             </a:extLst>
           </p:cNvPr>
@@ -673,7 +674,7 @@
           <a:p>
             <a:fld id="{45D29F64-CD52-9145-B05C-AB9DB2C6669A}" type="datetimeFigureOut">
               <a:rPr lang="en-US" smtClean="0"/>
-              <a:t>4/26/19</a:t>
+              <a:t>5/1/19</a:t>
             </a:fld>
             <a:endParaRPr lang="en-US"/>
           </a:p>
@@ -684,7 +685,7 @@
           <p:cNvPr id="5" name="Footer Placeholder 4">
             <a:extLst>
               <a:ext uri="{FF2B5EF4-FFF2-40B4-BE49-F238E27FC236}">
-                <a16:creationId xmlns:a16="http://schemas.microsoft.com/office/drawing/2014/main" id="{8126BAD6-4443-004B-BAA1-FE8E085C9F8F}"/>
+                <a16:creationId xmlns:a16="http://schemas.microsoft.com/office/drawing/2014/main" xmlns="" id="{8126BAD6-4443-004B-BAA1-FE8E085C9F8F}"/>
               </a:ext>
             </a:extLst>
           </p:cNvPr>
@@ -709,7 +710,7 @@
           <p:cNvPr id="6" name="Slide Number Placeholder 5">
             <a:extLst>
               <a:ext uri="{FF2B5EF4-FFF2-40B4-BE49-F238E27FC236}">
-                <a16:creationId xmlns:a16="http://schemas.microsoft.com/office/drawing/2014/main" id="{14ED176A-F057-8D41-B00B-B444EA48310F}"/>
+                <a16:creationId xmlns:a16="http://schemas.microsoft.com/office/drawing/2014/main" xmlns="" id="{14ED176A-F057-8D41-B00B-B444EA48310F}"/>
               </a:ext>
             </a:extLst>
           </p:cNvPr>
@@ -768,7 +769,7 @@
           <p:cNvPr id="2" name="Title 1">
             <a:extLst>
               <a:ext uri="{FF2B5EF4-FFF2-40B4-BE49-F238E27FC236}">
-                <a16:creationId xmlns:a16="http://schemas.microsoft.com/office/drawing/2014/main" id="{A7D2B129-1333-1F47-BC4B-33786578E7FC}"/>
+                <a16:creationId xmlns:a16="http://schemas.microsoft.com/office/drawing/2014/main" xmlns="" id="{A7D2B129-1333-1F47-BC4B-33786578E7FC}"/>
               </a:ext>
             </a:extLst>
           </p:cNvPr>
@@ -796,7 +797,7 @@
           <p:cNvPr id="3" name="Content Placeholder 2">
             <a:extLst>
               <a:ext uri="{FF2B5EF4-FFF2-40B4-BE49-F238E27FC236}">
-                <a16:creationId xmlns:a16="http://schemas.microsoft.com/office/drawing/2014/main" id="{9ECDE62D-58E9-6849-98E2-AAA0CCAADDA0}"/>
+                <a16:creationId xmlns:a16="http://schemas.microsoft.com/office/drawing/2014/main" xmlns="" id="{9ECDE62D-58E9-6849-98E2-AAA0CCAADDA0}"/>
               </a:ext>
             </a:extLst>
           </p:cNvPr>
@@ -853,7 +854,7 @@
           <p:cNvPr id="4" name="Date Placeholder 3">
             <a:extLst>
               <a:ext uri="{FF2B5EF4-FFF2-40B4-BE49-F238E27FC236}">
-                <a16:creationId xmlns:a16="http://schemas.microsoft.com/office/drawing/2014/main" id="{EFEA11BF-2A45-4444-AEED-3C1B0AFA193B}"/>
+                <a16:creationId xmlns:a16="http://schemas.microsoft.com/office/drawing/2014/main" xmlns="" id="{EFEA11BF-2A45-4444-AEED-3C1B0AFA193B}"/>
               </a:ext>
             </a:extLst>
           </p:cNvPr>
@@ -871,7 +872,7 @@
           <a:p>
             <a:fld id="{45D29F64-CD52-9145-B05C-AB9DB2C6669A}" type="datetimeFigureOut">
               <a:rPr lang="en-US" smtClean="0"/>
-              <a:t>4/26/19</a:t>
+              <a:t>5/1/19</a:t>
             </a:fld>
             <a:endParaRPr lang="en-US"/>
           </a:p>
@@ -882,7 +883,7 @@
           <p:cNvPr id="5" name="Footer Placeholder 4">
             <a:extLst>
               <a:ext uri="{FF2B5EF4-FFF2-40B4-BE49-F238E27FC236}">
-                <a16:creationId xmlns:a16="http://schemas.microsoft.com/office/drawing/2014/main" id="{009B56B8-8A13-414C-BD29-0782690DB1B9}"/>
+                <a16:creationId xmlns:a16="http://schemas.microsoft.com/office/drawing/2014/main" xmlns="" id="{009B56B8-8A13-414C-BD29-0782690DB1B9}"/>
               </a:ext>
             </a:extLst>
           </p:cNvPr>
@@ -907,7 +908,7 @@
           <p:cNvPr id="6" name="Slide Number Placeholder 5">
             <a:extLst>
               <a:ext uri="{FF2B5EF4-FFF2-40B4-BE49-F238E27FC236}">
-                <a16:creationId xmlns:a16="http://schemas.microsoft.com/office/drawing/2014/main" id="{C4272DC2-C101-6D47-BF16-05E39FF23B46}"/>
+                <a16:creationId xmlns:a16="http://schemas.microsoft.com/office/drawing/2014/main" xmlns="" id="{C4272DC2-C101-6D47-BF16-05E39FF23B46}"/>
               </a:ext>
             </a:extLst>
           </p:cNvPr>
@@ -966,7 +967,7 @@
           <p:cNvPr id="2" name="Title 1">
             <a:extLst>
               <a:ext uri="{FF2B5EF4-FFF2-40B4-BE49-F238E27FC236}">
-                <a16:creationId xmlns:a16="http://schemas.microsoft.com/office/drawing/2014/main" id="{BAC22880-4B93-754D-9213-68DE4C171F7F}"/>
+                <a16:creationId xmlns:a16="http://schemas.microsoft.com/office/drawing/2014/main" xmlns="" id="{BAC22880-4B93-754D-9213-68DE4C171F7F}"/>
               </a:ext>
             </a:extLst>
           </p:cNvPr>
@@ -1003,7 +1004,7 @@
           <p:cNvPr id="3" name="Text Placeholder 2">
             <a:extLst>
               <a:ext uri="{FF2B5EF4-FFF2-40B4-BE49-F238E27FC236}">
-                <a16:creationId xmlns:a16="http://schemas.microsoft.com/office/drawing/2014/main" id="{6B11070C-81F8-0A4F-A81D-8C3C228925A3}"/>
+                <a16:creationId xmlns:a16="http://schemas.microsoft.com/office/drawing/2014/main" xmlns="" id="{6B11070C-81F8-0A4F-A81D-8C3C228925A3}"/>
               </a:ext>
             </a:extLst>
           </p:cNvPr>
@@ -1128,7 +1129,7 @@
           <p:cNvPr id="4" name="Date Placeholder 3">
             <a:extLst>
               <a:ext uri="{FF2B5EF4-FFF2-40B4-BE49-F238E27FC236}">
-                <a16:creationId xmlns:a16="http://schemas.microsoft.com/office/drawing/2014/main" id="{23C53577-1831-364C-B339-4121968BB6DA}"/>
+                <a16:creationId xmlns:a16="http://schemas.microsoft.com/office/drawing/2014/main" xmlns="" id="{23C53577-1831-364C-B339-4121968BB6DA}"/>
               </a:ext>
             </a:extLst>
           </p:cNvPr>
@@ -1146,7 +1147,7 @@
           <a:p>
             <a:fld id="{45D29F64-CD52-9145-B05C-AB9DB2C6669A}" type="datetimeFigureOut">
               <a:rPr lang="en-US" smtClean="0"/>
-              <a:t>4/26/19</a:t>
+              <a:t>5/1/19</a:t>
             </a:fld>
             <a:endParaRPr lang="en-US"/>
           </a:p>
@@ -1157,7 +1158,7 @@
           <p:cNvPr id="5" name="Footer Placeholder 4">
             <a:extLst>
               <a:ext uri="{FF2B5EF4-FFF2-40B4-BE49-F238E27FC236}">
-                <a16:creationId xmlns:a16="http://schemas.microsoft.com/office/drawing/2014/main" id="{9F9CBA5D-DA04-1849-97A2-5E156B619E76}"/>
+                <a16:creationId xmlns:a16="http://schemas.microsoft.com/office/drawing/2014/main" xmlns="" id="{9F9CBA5D-DA04-1849-97A2-5E156B619E76}"/>
               </a:ext>
             </a:extLst>
           </p:cNvPr>
@@ -1182,7 +1183,7 @@
           <p:cNvPr id="6" name="Slide Number Placeholder 5">
             <a:extLst>
               <a:ext uri="{FF2B5EF4-FFF2-40B4-BE49-F238E27FC236}">
-                <a16:creationId xmlns:a16="http://schemas.microsoft.com/office/drawing/2014/main" id="{CF1125EA-E670-6D43-9539-E2289A017005}"/>
+                <a16:creationId xmlns:a16="http://schemas.microsoft.com/office/drawing/2014/main" xmlns="" id="{CF1125EA-E670-6D43-9539-E2289A017005}"/>
               </a:ext>
             </a:extLst>
           </p:cNvPr>
@@ -1241,7 +1242,7 @@
           <p:cNvPr id="2" name="Title 1">
             <a:extLst>
               <a:ext uri="{FF2B5EF4-FFF2-40B4-BE49-F238E27FC236}">
-                <a16:creationId xmlns:a16="http://schemas.microsoft.com/office/drawing/2014/main" id="{262AD6D9-F928-4748-9C7F-D4545C80CAA4}"/>
+                <a16:creationId xmlns:a16="http://schemas.microsoft.com/office/drawing/2014/main" xmlns="" id="{262AD6D9-F928-4748-9C7F-D4545C80CAA4}"/>
               </a:ext>
             </a:extLst>
           </p:cNvPr>
@@ -1269,7 +1270,7 @@
           <p:cNvPr id="3" name="Content Placeholder 2">
             <a:extLst>
               <a:ext uri="{FF2B5EF4-FFF2-40B4-BE49-F238E27FC236}">
-                <a16:creationId xmlns:a16="http://schemas.microsoft.com/office/drawing/2014/main" id="{51D797BF-990E-9A4C-82AC-12AD06F3C184}"/>
+                <a16:creationId xmlns:a16="http://schemas.microsoft.com/office/drawing/2014/main" xmlns="" id="{51D797BF-990E-9A4C-82AC-12AD06F3C184}"/>
               </a:ext>
             </a:extLst>
           </p:cNvPr>
@@ -1331,7 +1332,7 @@
           <p:cNvPr id="4" name="Content Placeholder 3">
             <a:extLst>
               <a:ext uri="{FF2B5EF4-FFF2-40B4-BE49-F238E27FC236}">
-                <a16:creationId xmlns:a16="http://schemas.microsoft.com/office/drawing/2014/main" id="{3DC4D9D4-E298-6D41-ACED-A11435ED9D77}"/>
+                <a16:creationId xmlns:a16="http://schemas.microsoft.com/office/drawing/2014/main" xmlns="" id="{3DC4D9D4-E298-6D41-ACED-A11435ED9D77}"/>
               </a:ext>
             </a:extLst>
           </p:cNvPr>
@@ -1393,7 +1394,7 @@
           <p:cNvPr id="5" name="Date Placeholder 4">
             <a:extLst>
               <a:ext uri="{FF2B5EF4-FFF2-40B4-BE49-F238E27FC236}">
-                <a16:creationId xmlns:a16="http://schemas.microsoft.com/office/drawing/2014/main" id="{E17C102D-9E12-A244-9FD1-B8C9B6279B35}"/>
+                <a16:creationId xmlns:a16="http://schemas.microsoft.com/office/drawing/2014/main" xmlns="" id="{E17C102D-9E12-A244-9FD1-B8C9B6279B35}"/>
               </a:ext>
             </a:extLst>
           </p:cNvPr>
@@ -1411,7 +1412,7 @@
           <a:p>
             <a:fld id="{45D29F64-CD52-9145-B05C-AB9DB2C6669A}" type="datetimeFigureOut">
               <a:rPr lang="en-US" smtClean="0"/>
-              <a:t>4/26/19</a:t>
+              <a:t>5/1/19</a:t>
             </a:fld>
             <a:endParaRPr lang="en-US"/>
           </a:p>
@@ -1422,7 +1423,7 @@
           <p:cNvPr id="6" name="Footer Placeholder 5">
             <a:extLst>
               <a:ext uri="{FF2B5EF4-FFF2-40B4-BE49-F238E27FC236}">
-                <a16:creationId xmlns:a16="http://schemas.microsoft.com/office/drawing/2014/main" id="{0AFE2BCB-F3E8-8549-B6D4-F6040A561AFB}"/>
+                <a16:creationId xmlns:a16="http://schemas.microsoft.com/office/drawing/2014/main" xmlns="" id="{0AFE2BCB-F3E8-8549-B6D4-F6040A561AFB}"/>
               </a:ext>
             </a:extLst>
           </p:cNvPr>
@@ -1447,7 +1448,7 @@
           <p:cNvPr id="7" name="Slide Number Placeholder 6">
             <a:extLst>
               <a:ext uri="{FF2B5EF4-FFF2-40B4-BE49-F238E27FC236}">
-                <a16:creationId xmlns:a16="http://schemas.microsoft.com/office/drawing/2014/main" id="{C39549C6-C80B-BD44-8EF9-A19E907A7CFE}"/>
+                <a16:creationId xmlns:a16="http://schemas.microsoft.com/office/drawing/2014/main" xmlns="" id="{C39549C6-C80B-BD44-8EF9-A19E907A7CFE}"/>
               </a:ext>
             </a:extLst>
           </p:cNvPr>
@@ -1506,7 +1507,7 @@
           <p:cNvPr id="2" name="Title 1">
             <a:extLst>
               <a:ext uri="{FF2B5EF4-FFF2-40B4-BE49-F238E27FC236}">
-                <a16:creationId xmlns:a16="http://schemas.microsoft.com/office/drawing/2014/main" id="{FCEA8641-4386-D644-912C-5AF5E240C2CB}"/>
+                <a16:creationId xmlns:a16="http://schemas.microsoft.com/office/drawing/2014/main" xmlns="" id="{FCEA8641-4386-D644-912C-5AF5E240C2CB}"/>
               </a:ext>
             </a:extLst>
           </p:cNvPr>
@@ -1539,7 +1540,7 @@
           <p:cNvPr id="3" name="Text Placeholder 2">
             <a:extLst>
               <a:ext uri="{FF2B5EF4-FFF2-40B4-BE49-F238E27FC236}">
-                <a16:creationId xmlns:a16="http://schemas.microsoft.com/office/drawing/2014/main" id="{0003CA97-F6C8-4A4C-9811-B27526619B85}"/>
+                <a16:creationId xmlns:a16="http://schemas.microsoft.com/office/drawing/2014/main" xmlns="" id="{0003CA97-F6C8-4A4C-9811-B27526619B85}"/>
               </a:ext>
             </a:extLst>
           </p:cNvPr>
@@ -1610,7 +1611,7 @@
           <p:cNvPr id="4" name="Content Placeholder 3">
             <a:extLst>
               <a:ext uri="{FF2B5EF4-FFF2-40B4-BE49-F238E27FC236}">
-                <a16:creationId xmlns:a16="http://schemas.microsoft.com/office/drawing/2014/main" id="{C428443A-4B63-D44B-992D-A5333C63135A}"/>
+                <a16:creationId xmlns:a16="http://schemas.microsoft.com/office/drawing/2014/main" xmlns="" id="{C428443A-4B63-D44B-992D-A5333C63135A}"/>
               </a:ext>
             </a:extLst>
           </p:cNvPr>
@@ -1672,7 +1673,7 @@
           <p:cNvPr id="5" name="Text Placeholder 4">
             <a:extLst>
               <a:ext uri="{FF2B5EF4-FFF2-40B4-BE49-F238E27FC236}">
-                <a16:creationId xmlns:a16="http://schemas.microsoft.com/office/drawing/2014/main" id="{AB6EDAA3-A02E-E244-A6F8-31DA5C48F793}"/>
+                <a16:creationId xmlns:a16="http://schemas.microsoft.com/office/drawing/2014/main" xmlns="" id="{AB6EDAA3-A02E-E244-A6F8-31DA5C48F793}"/>
               </a:ext>
             </a:extLst>
           </p:cNvPr>
@@ -1743,7 +1744,7 @@
           <p:cNvPr id="6" name="Content Placeholder 5">
             <a:extLst>
               <a:ext uri="{FF2B5EF4-FFF2-40B4-BE49-F238E27FC236}">
-                <a16:creationId xmlns:a16="http://schemas.microsoft.com/office/drawing/2014/main" id="{A625C399-2052-374A-9A63-FF2581D9CF40}"/>
+                <a16:creationId xmlns:a16="http://schemas.microsoft.com/office/drawing/2014/main" xmlns="" id="{A625C399-2052-374A-9A63-FF2581D9CF40}"/>
               </a:ext>
             </a:extLst>
           </p:cNvPr>
@@ -1805,7 +1806,7 @@
           <p:cNvPr id="7" name="Date Placeholder 6">
             <a:extLst>
               <a:ext uri="{FF2B5EF4-FFF2-40B4-BE49-F238E27FC236}">
-                <a16:creationId xmlns:a16="http://schemas.microsoft.com/office/drawing/2014/main" id="{1A599785-4F03-0646-859D-A5B1A395854F}"/>
+                <a16:creationId xmlns:a16="http://schemas.microsoft.com/office/drawing/2014/main" xmlns="" id="{1A599785-4F03-0646-859D-A5B1A395854F}"/>
               </a:ext>
             </a:extLst>
           </p:cNvPr>
@@ -1823,7 +1824,7 @@
           <a:p>
             <a:fld id="{45D29F64-CD52-9145-B05C-AB9DB2C6669A}" type="datetimeFigureOut">
               <a:rPr lang="en-US" smtClean="0"/>
-              <a:t>4/26/19</a:t>
+              <a:t>5/1/19</a:t>
             </a:fld>
             <a:endParaRPr lang="en-US"/>
           </a:p>
@@ -1834,7 +1835,7 @@
           <p:cNvPr id="8" name="Footer Placeholder 7">
             <a:extLst>
               <a:ext uri="{FF2B5EF4-FFF2-40B4-BE49-F238E27FC236}">
-                <a16:creationId xmlns:a16="http://schemas.microsoft.com/office/drawing/2014/main" id="{6AE386FC-4B01-3D4A-B5E6-A4445E725378}"/>
+                <a16:creationId xmlns:a16="http://schemas.microsoft.com/office/drawing/2014/main" xmlns="" id="{6AE386FC-4B01-3D4A-B5E6-A4445E725378}"/>
               </a:ext>
             </a:extLst>
           </p:cNvPr>
@@ -1859,7 +1860,7 @@
           <p:cNvPr id="9" name="Slide Number Placeholder 8">
             <a:extLst>
               <a:ext uri="{FF2B5EF4-FFF2-40B4-BE49-F238E27FC236}">
-                <a16:creationId xmlns:a16="http://schemas.microsoft.com/office/drawing/2014/main" id="{39F0E8DD-4FFE-6540-8032-73316B86EFDA}"/>
+                <a16:creationId xmlns:a16="http://schemas.microsoft.com/office/drawing/2014/main" xmlns="" id="{39F0E8DD-4FFE-6540-8032-73316B86EFDA}"/>
               </a:ext>
             </a:extLst>
           </p:cNvPr>
@@ -1918,7 +1919,7 @@
           <p:cNvPr id="2" name="Title 1">
             <a:extLst>
               <a:ext uri="{FF2B5EF4-FFF2-40B4-BE49-F238E27FC236}">
-                <a16:creationId xmlns:a16="http://schemas.microsoft.com/office/drawing/2014/main" id="{3F5899AE-DFEB-5545-9F33-6F738A85210C}"/>
+                <a16:creationId xmlns:a16="http://schemas.microsoft.com/office/drawing/2014/main" xmlns="" id="{3F5899AE-DFEB-5545-9F33-6F738A85210C}"/>
               </a:ext>
             </a:extLst>
           </p:cNvPr>
@@ -1946,7 +1947,7 @@
           <p:cNvPr id="3" name="Date Placeholder 2">
             <a:extLst>
               <a:ext uri="{FF2B5EF4-FFF2-40B4-BE49-F238E27FC236}">
-                <a16:creationId xmlns:a16="http://schemas.microsoft.com/office/drawing/2014/main" id="{D2BBC704-A814-5E4D-A194-EEDA752CFFB8}"/>
+                <a16:creationId xmlns:a16="http://schemas.microsoft.com/office/drawing/2014/main" xmlns="" id="{D2BBC704-A814-5E4D-A194-EEDA752CFFB8}"/>
               </a:ext>
             </a:extLst>
           </p:cNvPr>
@@ -1964,7 +1965,7 @@
           <a:p>
             <a:fld id="{45D29F64-CD52-9145-B05C-AB9DB2C6669A}" type="datetimeFigureOut">
               <a:rPr lang="en-US" smtClean="0"/>
-              <a:t>4/26/19</a:t>
+              <a:t>5/1/19</a:t>
             </a:fld>
             <a:endParaRPr lang="en-US"/>
           </a:p>
@@ -1975,7 +1976,7 @@
           <p:cNvPr id="4" name="Footer Placeholder 3">
             <a:extLst>
               <a:ext uri="{FF2B5EF4-FFF2-40B4-BE49-F238E27FC236}">
-                <a16:creationId xmlns:a16="http://schemas.microsoft.com/office/drawing/2014/main" id="{5A0140CA-3C42-9F41-BAF5-D4C41D47C7CA}"/>
+                <a16:creationId xmlns:a16="http://schemas.microsoft.com/office/drawing/2014/main" xmlns="" id="{5A0140CA-3C42-9F41-BAF5-D4C41D47C7CA}"/>
               </a:ext>
             </a:extLst>
           </p:cNvPr>
@@ -2000,7 +2001,7 @@
           <p:cNvPr id="5" name="Slide Number Placeholder 4">
             <a:extLst>
               <a:ext uri="{FF2B5EF4-FFF2-40B4-BE49-F238E27FC236}">
-                <a16:creationId xmlns:a16="http://schemas.microsoft.com/office/drawing/2014/main" id="{37086D94-F459-FE40-9093-8A1D3E43A3A9}"/>
+                <a16:creationId xmlns:a16="http://schemas.microsoft.com/office/drawing/2014/main" xmlns="" id="{37086D94-F459-FE40-9093-8A1D3E43A3A9}"/>
               </a:ext>
             </a:extLst>
           </p:cNvPr>
@@ -2059,7 +2060,7 @@
           <p:cNvPr id="2" name="Date Placeholder 1">
             <a:extLst>
               <a:ext uri="{FF2B5EF4-FFF2-40B4-BE49-F238E27FC236}">
-                <a16:creationId xmlns:a16="http://schemas.microsoft.com/office/drawing/2014/main" id="{07A9ACC7-829A-7F4D-8420-A762D036E8CD}"/>
+                <a16:creationId xmlns:a16="http://schemas.microsoft.com/office/drawing/2014/main" xmlns="" id="{07A9ACC7-829A-7F4D-8420-A762D036E8CD}"/>
               </a:ext>
             </a:extLst>
           </p:cNvPr>
@@ -2077,7 +2078,7 @@
           <a:p>
             <a:fld id="{45D29F64-CD52-9145-B05C-AB9DB2C6669A}" type="datetimeFigureOut">
               <a:rPr lang="en-US" smtClean="0"/>
-              <a:t>4/26/19</a:t>
+              <a:t>5/1/19</a:t>
             </a:fld>
             <a:endParaRPr lang="en-US"/>
           </a:p>
@@ -2088,7 +2089,7 @@
           <p:cNvPr id="3" name="Footer Placeholder 2">
             <a:extLst>
               <a:ext uri="{FF2B5EF4-FFF2-40B4-BE49-F238E27FC236}">
-                <a16:creationId xmlns:a16="http://schemas.microsoft.com/office/drawing/2014/main" id="{8FBBF79B-F213-0A4F-B7FB-1DCDEC5761BE}"/>
+                <a16:creationId xmlns:a16="http://schemas.microsoft.com/office/drawing/2014/main" xmlns="" id="{8FBBF79B-F213-0A4F-B7FB-1DCDEC5761BE}"/>
               </a:ext>
             </a:extLst>
           </p:cNvPr>
@@ -2113,7 +2114,7 @@
           <p:cNvPr id="4" name="Slide Number Placeholder 3">
             <a:extLst>
               <a:ext uri="{FF2B5EF4-FFF2-40B4-BE49-F238E27FC236}">
-                <a16:creationId xmlns:a16="http://schemas.microsoft.com/office/drawing/2014/main" id="{B052EC9E-99E7-9841-A360-BDDEE513FB5E}"/>
+                <a16:creationId xmlns:a16="http://schemas.microsoft.com/office/drawing/2014/main" xmlns="" id="{B052EC9E-99E7-9841-A360-BDDEE513FB5E}"/>
               </a:ext>
             </a:extLst>
           </p:cNvPr>
@@ -2172,7 +2173,7 @@
           <p:cNvPr id="2" name="Title 1">
             <a:extLst>
               <a:ext uri="{FF2B5EF4-FFF2-40B4-BE49-F238E27FC236}">
-                <a16:creationId xmlns:a16="http://schemas.microsoft.com/office/drawing/2014/main" id="{070A10A2-F9B0-F344-8BC8-7A00229D2949}"/>
+                <a16:creationId xmlns:a16="http://schemas.microsoft.com/office/drawing/2014/main" xmlns="" id="{070A10A2-F9B0-F344-8BC8-7A00229D2949}"/>
               </a:ext>
             </a:extLst>
           </p:cNvPr>
@@ -2209,7 +2210,7 @@
           <p:cNvPr id="3" name="Content Placeholder 2">
             <a:extLst>
               <a:ext uri="{FF2B5EF4-FFF2-40B4-BE49-F238E27FC236}">
-                <a16:creationId xmlns:a16="http://schemas.microsoft.com/office/drawing/2014/main" id="{61A868DF-34E6-1848-983C-F5D0F4A4A893}"/>
+                <a16:creationId xmlns:a16="http://schemas.microsoft.com/office/drawing/2014/main" xmlns="" id="{61A868DF-34E6-1848-983C-F5D0F4A4A893}"/>
               </a:ext>
             </a:extLst>
           </p:cNvPr>
@@ -2299,7 +2300,7 @@
           <p:cNvPr id="4" name="Text Placeholder 3">
             <a:extLst>
               <a:ext uri="{FF2B5EF4-FFF2-40B4-BE49-F238E27FC236}">
-                <a16:creationId xmlns:a16="http://schemas.microsoft.com/office/drawing/2014/main" id="{376E3DE5-437D-434F-8910-AA8A3F1F1273}"/>
+                <a16:creationId xmlns:a16="http://schemas.microsoft.com/office/drawing/2014/main" xmlns="" id="{376E3DE5-437D-434F-8910-AA8A3F1F1273}"/>
               </a:ext>
             </a:extLst>
           </p:cNvPr>
@@ -2370,7 +2371,7 @@
           <p:cNvPr id="5" name="Date Placeholder 4">
             <a:extLst>
               <a:ext uri="{FF2B5EF4-FFF2-40B4-BE49-F238E27FC236}">
-                <a16:creationId xmlns:a16="http://schemas.microsoft.com/office/drawing/2014/main" id="{2F5DF4B7-6C2B-2B48-A238-F01177207469}"/>
+                <a16:creationId xmlns:a16="http://schemas.microsoft.com/office/drawing/2014/main" xmlns="" id="{2F5DF4B7-6C2B-2B48-A238-F01177207469}"/>
               </a:ext>
             </a:extLst>
           </p:cNvPr>
@@ -2388,7 +2389,7 @@
           <a:p>
             <a:fld id="{45D29F64-CD52-9145-B05C-AB9DB2C6669A}" type="datetimeFigureOut">
               <a:rPr lang="en-US" smtClean="0"/>
-              <a:t>4/26/19</a:t>
+              <a:t>5/1/19</a:t>
             </a:fld>
             <a:endParaRPr lang="en-US"/>
           </a:p>
@@ -2399,7 +2400,7 @@
           <p:cNvPr id="6" name="Footer Placeholder 5">
             <a:extLst>
               <a:ext uri="{FF2B5EF4-FFF2-40B4-BE49-F238E27FC236}">
-                <a16:creationId xmlns:a16="http://schemas.microsoft.com/office/drawing/2014/main" id="{A6EF2281-1ABA-7342-8F35-F0F2D64611D1}"/>
+                <a16:creationId xmlns:a16="http://schemas.microsoft.com/office/drawing/2014/main" xmlns="" id="{A6EF2281-1ABA-7342-8F35-F0F2D64611D1}"/>
               </a:ext>
             </a:extLst>
           </p:cNvPr>
@@ -2424,7 +2425,7 @@
           <p:cNvPr id="7" name="Slide Number Placeholder 6">
             <a:extLst>
               <a:ext uri="{FF2B5EF4-FFF2-40B4-BE49-F238E27FC236}">
-                <a16:creationId xmlns:a16="http://schemas.microsoft.com/office/drawing/2014/main" id="{56AACA73-B098-A443-86E5-3593BAFE81EC}"/>
+                <a16:creationId xmlns:a16="http://schemas.microsoft.com/office/drawing/2014/main" xmlns="" id="{56AACA73-B098-A443-86E5-3593BAFE81EC}"/>
               </a:ext>
             </a:extLst>
           </p:cNvPr>
@@ -2483,7 +2484,7 @@
           <p:cNvPr id="2" name="Title 1">
             <a:extLst>
               <a:ext uri="{FF2B5EF4-FFF2-40B4-BE49-F238E27FC236}">
-                <a16:creationId xmlns:a16="http://schemas.microsoft.com/office/drawing/2014/main" id="{FACBEB41-F32F-6449-BD04-263892C29998}"/>
+                <a16:creationId xmlns:a16="http://schemas.microsoft.com/office/drawing/2014/main" xmlns="" id="{FACBEB41-F32F-6449-BD04-263892C29998}"/>
               </a:ext>
             </a:extLst>
           </p:cNvPr>
@@ -2520,7 +2521,7 @@
           <p:cNvPr id="3" name="Picture Placeholder 2">
             <a:extLst>
               <a:ext uri="{FF2B5EF4-FFF2-40B4-BE49-F238E27FC236}">
-                <a16:creationId xmlns:a16="http://schemas.microsoft.com/office/drawing/2014/main" id="{0AD7B342-A149-9E4F-B5C0-EBE269660B70}"/>
+                <a16:creationId xmlns:a16="http://schemas.microsoft.com/office/drawing/2014/main" xmlns="" id="{0AD7B342-A149-9E4F-B5C0-EBE269660B70}"/>
               </a:ext>
             </a:extLst>
           </p:cNvPr>
@@ -2587,7 +2588,7 @@
           <p:cNvPr id="4" name="Text Placeholder 3">
             <a:extLst>
               <a:ext uri="{FF2B5EF4-FFF2-40B4-BE49-F238E27FC236}">
-                <a16:creationId xmlns:a16="http://schemas.microsoft.com/office/drawing/2014/main" id="{C7034AEB-C9CB-5641-A86A-8CE4D74CA17E}"/>
+                <a16:creationId xmlns:a16="http://schemas.microsoft.com/office/drawing/2014/main" xmlns="" id="{C7034AEB-C9CB-5641-A86A-8CE4D74CA17E}"/>
               </a:ext>
             </a:extLst>
           </p:cNvPr>
@@ -2658,7 +2659,7 @@
           <p:cNvPr id="5" name="Date Placeholder 4">
             <a:extLst>
               <a:ext uri="{FF2B5EF4-FFF2-40B4-BE49-F238E27FC236}">
-                <a16:creationId xmlns:a16="http://schemas.microsoft.com/office/drawing/2014/main" id="{5CF1E772-D352-3342-8861-BDE00833F7EF}"/>
+                <a16:creationId xmlns:a16="http://schemas.microsoft.com/office/drawing/2014/main" xmlns="" id="{5CF1E772-D352-3342-8861-BDE00833F7EF}"/>
               </a:ext>
             </a:extLst>
           </p:cNvPr>
@@ -2676,7 +2677,7 @@
           <a:p>
             <a:fld id="{45D29F64-CD52-9145-B05C-AB9DB2C6669A}" type="datetimeFigureOut">
               <a:rPr lang="en-US" smtClean="0"/>
-              <a:t>4/26/19</a:t>
+              <a:t>5/1/19</a:t>
             </a:fld>
             <a:endParaRPr lang="en-US"/>
           </a:p>
@@ -2687,7 +2688,7 @@
           <p:cNvPr id="6" name="Footer Placeholder 5">
             <a:extLst>
               <a:ext uri="{FF2B5EF4-FFF2-40B4-BE49-F238E27FC236}">
-                <a16:creationId xmlns:a16="http://schemas.microsoft.com/office/drawing/2014/main" id="{D38A5059-1DE0-404B-897B-615661062EB6}"/>
+                <a16:creationId xmlns:a16="http://schemas.microsoft.com/office/drawing/2014/main" xmlns="" id="{D38A5059-1DE0-404B-897B-615661062EB6}"/>
               </a:ext>
             </a:extLst>
           </p:cNvPr>
@@ -2712,7 +2713,7 @@
           <p:cNvPr id="7" name="Slide Number Placeholder 6">
             <a:extLst>
               <a:ext uri="{FF2B5EF4-FFF2-40B4-BE49-F238E27FC236}">
-                <a16:creationId xmlns:a16="http://schemas.microsoft.com/office/drawing/2014/main" id="{FEC9B585-298C-9142-B3E4-9683821FD0C3}"/>
+                <a16:creationId xmlns:a16="http://schemas.microsoft.com/office/drawing/2014/main" xmlns="" id="{FEC9B585-298C-9142-B3E4-9683821FD0C3}"/>
               </a:ext>
             </a:extLst>
           </p:cNvPr>
@@ -2776,7 +2777,7 @@
           <p:cNvPr id="2" name="Title Placeholder 1">
             <a:extLst>
               <a:ext uri="{FF2B5EF4-FFF2-40B4-BE49-F238E27FC236}">
-                <a16:creationId xmlns:a16="http://schemas.microsoft.com/office/drawing/2014/main" id="{4FA3C14F-9E83-204C-93F3-4A106E79DB61}"/>
+                <a16:creationId xmlns:a16="http://schemas.microsoft.com/office/drawing/2014/main" xmlns="" id="{4FA3C14F-9E83-204C-93F3-4A106E79DB61}"/>
               </a:ext>
             </a:extLst>
           </p:cNvPr>
@@ -2814,7 +2815,7 @@
           <p:cNvPr id="3" name="Text Placeholder 2">
             <a:extLst>
               <a:ext uri="{FF2B5EF4-FFF2-40B4-BE49-F238E27FC236}">
-                <a16:creationId xmlns:a16="http://schemas.microsoft.com/office/drawing/2014/main" id="{52192E8A-1958-E54D-9F03-ABB935DE7303}"/>
+                <a16:creationId xmlns:a16="http://schemas.microsoft.com/office/drawing/2014/main" xmlns="" id="{52192E8A-1958-E54D-9F03-ABB935DE7303}"/>
               </a:ext>
             </a:extLst>
           </p:cNvPr>
@@ -2881,7 +2882,7 @@
           <p:cNvPr id="4" name="Date Placeholder 3">
             <a:extLst>
               <a:ext uri="{FF2B5EF4-FFF2-40B4-BE49-F238E27FC236}">
-                <a16:creationId xmlns:a16="http://schemas.microsoft.com/office/drawing/2014/main" id="{7325D930-3387-4845-B851-27EB48A50D33}"/>
+                <a16:creationId xmlns:a16="http://schemas.microsoft.com/office/drawing/2014/main" xmlns="" id="{7325D930-3387-4845-B851-27EB48A50D33}"/>
               </a:ext>
             </a:extLst>
           </p:cNvPr>
@@ -2917,7 +2918,7 @@
           <a:p>
             <a:fld id="{45D29F64-CD52-9145-B05C-AB9DB2C6669A}" type="datetimeFigureOut">
               <a:rPr lang="en-US" smtClean="0"/>
-              <a:t>4/26/19</a:t>
+              <a:t>5/1/19</a:t>
             </a:fld>
             <a:endParaRPr lang="en-US"/>
           </a:p>
@@ -2928,7 +2929,7 @@
           <p:cNvPr id="5" name="Footer Placeholder 4">
             <a:extLst>
               <a:ext uri="{FF2B5EF4-FFF2-40B4-BE49-F238E27FC236}">
-                <a16:creationId xmlns:a16="http://schemas.microsoft.com/office/drawing/2014/main" id="{2B233A07-F101-A046-B90E-4F3B57476DFA}"/>
+                <a16:creationId xmlns:a16="http://schemas.microsoft.com/office/drawing/2014/main" xmlns="" id="{2B233A07-F101-A046-B90E-4F3B57476DFA}"/>
               </a:ext>
             </a:extLst>
           </p:cNvPr>
@@ -2971,7 +2972,7 @@
           <p:cNvPr id="6" name="Slide Number Placeholder 5">
             <a:extLst>
               <a:ext uri="{FF2B5EF4-FFF2-40B4-BE49-F238E27FC236}">
-                <a16:creationId xmlns:a16="http://schemas.microsoft.com/office/drawing/2014/main" id="{1864A47E-8A61-6845-AFEE-CDA6D79ED527}"/>
+                <a16:creationId xmlns:a16="http://schemas.microsoft.com/office/drawing/2014/main" xmlns="" id="{1864A47E-8A61-6845-AFEE-CDA6D79ED527}"/>
               </a:ext>
             </a:extLst>
           </p:cNvPr>
@@ -3339,7 +3340,7 @@
           <p:cNvPr id="2" name="Group 1">
             <a:extLst>
               <a:ext uri="{FF2B5EF4-FFF2-40B4-BE49-F238E27FC236}">
-                <a16:creationId xmlns:a16="http://schemas.microsoft.com/office/drawing/2014/main" id="{21C01040-A5E5-5440-BE0E-83D695C5AF7C}"/>
+                <a16:creationId xmlns:a16="http://schemas.microsoft.com/office/drawing/2014/main" xmlns="" id="{21C01040-A5E5-5440-BE0E-83D695C5AF7C}"/>
               </a:ext>
             </a:extLst>
           </p:cNvPr>
@@ -3359,7 +3360,7 @@
             <p:cNvPr id="4" name="Donut 3">
               <a:extLst>
                 <a:ext uri="{FF2B5EF4-FFF2-40B4-BE49-F238E27FC236}">
-                  <a16:creationId xmlns:a16="http://schemas.microsoft.com/office/drawing/2014/main" id="{3B2A361F-FDE3-7349-9868-C5FD2DECD6F0}"/>
+                  <a16:creationId xmlns:a16="http://schemas.microsoft.com/office/drawing/2014/main" xmlns="" id="{3B2A361F-FDE3-7349-9868-C5FD2DECD6F0}"/>
                 </a:ext>
               </a:extLst>
             </p:cNvPr>
@@ -3411,7 +3412,7 @@
             <p:cNvPr id="10" name="Donut 9">
               <a:extLst>
                 <a:ext uri="{FF2B5EF4-FFF2-40B4-BE49-F238E27FC236}">
-                  <a16:creationId xmlns:a16="http://schemas.microsoft.com/office/drawing/2014/main" id="{BDE35D79-7A44-0147-9C60-C169BA20B071}"/>
+                  <a16:creationId xmlns:a16="http://schemas.microsoft.com/office/drawing/2014/main" xmlns="" id="{BDE35D79-7A44-0147-9C60-C169BA20B071}"/>
                 </a:ext>
               </a:extLst>
             </p:cNvPr>
@@ -3463,7 +3464,7 @@
             <p:cNvPr id="12" name="Donut 11">
               <a:extLst>
                 <a:ext uri="{FF2B5EF4-FFF2-40B4-BE49-F238E27FC236}">
-                  <a16:creationId xmlns:a16="http://schemas.microsoft.com/office/drawing/2014/main" id="{E56352FB-83ED-8E41-A2BB-E276C56457E6}"/>
+                  <a16:creationId xmlns:a16="http://schemas.microsoft.com/office/drawing/2014/main" xmlns="" id="{E56352FB-83ED-8E41-A2BB-E276C56457E6}"/>
                 </a:ext>
               </a:extLst>
             </p:cNvPr>
@@ -3515,7 +3516,7 @@
             <p:cNvPr id="14" name="Donut 13">
               <a:extLst>
                 <a:ext uri="{FF2B5EF4-FFF2-40B4-BE49-F238E27FC236}">
-                  <a16:creationId xmlns:a16="http://schemas.microsoft.com/office/drawing/2014/main" id="{89D72E26-3D0E-F247-A940-D093C75917A9}"/>
+                  <a16:creationId xmlns:a16="http://schemas.microsoft.com/office/drawing/2014/main" xmlns="" id="{89D72E26-3D0E-F247-A940-D093C75917A9}"/>
                 </a:ext>
               </a:extLst>
             </p:cNvPr>
@@ -3567,7 +3568,7 @@
             <p:cNvPr id="16" name="Picture 15">
               <a:extLst>
                 <a:ext uri="{FF2B5EF4-FFF2-40B4-BE49-F238E27FC236}">
-                  <a16:creationId xmlns:a16="http://schemas.microsoft.com/office/drawing/2014/main" id="{65348E9C-5E39-C74F-8639-A4E368B71856}"/>
+                  <a16:creationId xmlns:a16="http://schemas.microsoft.com/office/drawing/2014/main" xmlns="" id="{65348E9C-5E39-C74F-8639-A4E368B71856}"/>
                 </a:ext>
               </a:extLst>
             </p:cNvPr>
@@ -3597,7 +3598,7 @@
             <p:cNvPr id="20" name="Picture 19">
               <a:extLst>
                 <a:ext uri="{FF2B5EF4-FFF2-40B4-BE49-F238E27FC236}">
-                  <a16:creationId xmlns:a16="http://schemas.microsoft.com/office/drawing/2014/main" id="{8803E842-7FB6-6F44-A22E-C3CA6FD7E349}"/>
+                  <a16:creationId xmlns:a16="http://schemas.microsoft.com/office/drawing/2014/main" xmlns="" id="{8803E842-7FB6-6F44-A22E-C3CA6FD7E349}"/>
                 </a:ext>
               </a:extLst>
             </p:cNvPr>
@@ -3627,7 +3628,7 @@
             <p:cNvPr id="21" name="Picture 20">
               <a:extLst>
                 <a:ext uri="{FF2B5EF4-FFF2-40B4-BE49-F238E27FC236}">
-                  <a16:creationId xmlns:a16="http://schemas.microsoft.com/office/drawing/2014/main" id="{303227FF-CA43-ED43-AA6E-589BBC9A9D59}"/>
+                  <a16:creationId xmlns:a16="http://schemas.microsoft.com/office/drawing/2014/main" xmlns="" id="{303227FF-CA43-ED43-AA6E-589BBC9A9D59}"/>
                 </a:ext>
               </a:extLst>
             </p:cNvPr>
@@ -3657,7 +3658,7 @@
             <p:cNvPr id="22" name="Picture 21">
               <a:extLst>
                 <a:ext uri="{FF2B5EF4-FFF2-40B4-BE49-F238E27FC236}">
-                  <a16:creationId xmlns:a16="http://schemas.microsoft.com/office/drawing/2014/main" id="{28D04A45-750D-5149-A269-373E9B55611F}"/>
+                  <a16:creationId xmlns:a16="http://schemas.microsoft.com/office/drawing/2014/main" xmlns="" id="{28D04A45-750D-5149-A269-373E9B55611F}"/>
                 </a:ext>
               </a:extLst>
             </p:cNvPr>
@@ -3687,7 +3688,7 @@
             <p:cNvPr id="24" name="Straight Arrow Connector 23">
               <a:extLst>
                 <a:ext uri="{FF2B5EF4-FFF2-40B4-BE49-F238E27FC236}">
-                  <a16:creationId xmlns:a16="http://schemas.microsoft.com/office/drawing/2014/main" id="{B0D28AA1-5104-B849-AF68-A0F380A29D2E}"/>
+                  <a16:creationId xmlns:a16="http://schemas.microsoft.com/office/drawing/2014/main" xmlns="" id="{B0D28AA1-5104-B849-AF68-A0F380A29D2E}"/>
                 </a:ext>
               </a:extLst>
             </p:cNvPr>
@@ -3729,7 +3730,7 @@
             <p:cNvPr id="25" name="Straight Arrow Connector 24">
               <a:extLst>
                 <a:ext uri="{FF2B5EF4-FFF2-40B4-BE49-F238E27FC236}">
-                  <a16:creationId xmlns:a16="http://schemas.microsoft.com/office/drawing/2014/main" id="{CD795BB4-ABBB-A64E-895F-0481BBE8E4EA}"/>
+                  <a16:creationId xmlns:a16="http://schemas.microsoft.com/office/drawing/2014/main" xmlns="" id="{CD795BB4-ABBB-A64E-895F-0481BBE8E4EA}"/>
                 </a:ext>
               </a:extLst>
             </p:cNvPr>
@@ -3773,7 +3774,7 @@
             <p:cNvPr id="27" name="Straight Arrow Connector 26">
               <a:extLst>
                 <a:ext uri="{FF2B5EF4-FFF2-40B4-BE49-F238E27FC236}">
-                  <a16:creationId xmlns:a16="http://schemas.microsoft.com/office/drawing/2014/main" id="{6F1AA03E-031D-8848-99C0-5A36AF0E5605}"/>
+                  <a16:creationId xmlns:a16="http://schemas.microsoft.com/office/drawing/2014/main" xmlns="" id="{6F1AA03E-031D-8848-99C0-5A36AF0E5605}"/>
                 </a:ext>
               </a:extLst>
             </p:cNvPr>
@@ -3818,7 +3819,7 @@
             <p:cNvPr id="28" name="Straight Arrow Connector 27">
               <a:extLst>
                 <a:ext uri="{FF2B5EF4-FFF2-40B4-BE49-F238E27FC236}">
-                  <a16:creationId xmlns:a16="http://schemas.microsoft.com/office/drawing/2014/main" id="{79B7509F-94D0-C044-9DC2-A554B9DB4C67}"/>
+                  <a16:creationId xmlns:a16="http://schemas.microsoft.com/office/drawing/2014/main" xmlns="" id="{79B7509F-94D0-C044-9DC2-A554B9DB4C67}"/>
                 </a:ext>
               </a:extLst>
             </p:cNvPr>
@@ -3863,7 +3864,7 @@
             <p:cNvPr id="34" name="Straight Arrow Connector 33">
               <a:extLst>
                 <a:ext uri="{FF2B5EF4-FFF2-40B4-BE49-F238E27FC236}">
-                  <a16:creationId xmlns:a16="http://schemas.microsoft.com/office/drawing/2014/main" id="{B64B615A-337A-E447-8F57-6F1155594D20}"/>
+                  <a16:creationId xmlns:a16="http://schemas.microsoft.com/office/drawing/2014/main" xmlns="" id="{B64B615A-337A-E447-8F57-6F1155594D20}"/>
                 </a:ext>
               </a:extLst>
             </p:cNvPr>
@@ -3908,7 +3909,7 @@
             <p:cNvPr id="35" name="Straight Arrow Connector 34">
               <a:extLst>
                 <a:ext uri="{FF2B5EF4-FFF2-40B4-BE49-F238E27FC236}">
-                  <a16:creationId xmlns:a16="http://schemas.microsoft.com/office/drawing/2014/main" id="{9CF84DCC-C72A-C348-8EC1-3A9D17DF0926}"/>
+                  <a16:creationId xmlns:a16="http://schemas.microsoft.com/office/drawing/2014/main" xmlns="" id="{9CF84DCC-C72A-C348-8EC1-3A9D17DF0926}"/>
                 </a:ext>
               </a:extLst>
             </p:cNvPr>
@@ -3953,7 +3954,7 @@
             <p:cNvPr id="36" name="Straight Arrow Connector 35">
               <a:extLst>
                 <a:ext uri="{FF2B5EF4-FFF2-40B4-BE49-F238E27FC236}">
-                  <a16:creationId xmlns:a16="http://schemas.microsoft.com/office/drawing/2014/main" id="{F1E7A251-AD40-E846-8C3D-087F623E8345}"/>
+                  <a16:creationId xmlns:a16="http://schemas.microsoft.com/office/drawing/2014/main" xmlns="" id="{F1E7A251-AD40-E846-8C3D-087F623E8345}"/>
                 </a:ext>
               </a:extLst>
             </p:cNvPr>
@@ -3998,7 +3999,7 @@
             <p:cNvPr id="37" name="TextBox 36">
               <a:extLst>
                 <a:ext uri="{FF2B5EF4-FFF2-40B4-BE49-F238E27FC236}">
-                  <a16:creationId xmlns:a16="http://schemas.microsoft.com/office/drawing/2014/main" id="{32233D15-47D3-4143-B8F5-40394DF42E51}"/>
+                  <a16:creationId xmlns:a16="http://schemas.microsoft.com/office/drawing/2014/main" xmlns="" id="{32233D15-47D3-4143-B8F5-40394DF42E51}"/>
                 </a:ext>
               </a:extLst>
             </p:cNvPr>
@@ -4037,7 +4038,7 @@
             <p:cNvPr id="38" name="TextBox 37">
               <a:extLst>
                 <a:ext uri="{FF2B5EF4-FFF2-40B4-BE49-F238E27FC236}">
-                  <a16:creationId xmlns:a16="http://schemas.microsoft.com/office/drawing/2014/main" id="{92F3D126-75F9-8E47-ACC8-6DE8CE351B10}"/>
+                  <a16:creationId xmlns:a16="http://schemas.microsoft.com/office/drawing/2014/main" xmlns="" id="{92F3D126-75F9-8E47-ACC8-6DE8CE351B10}"/>
                 </a:ext>
               </a:extLst>
             </p:cNvPr>
@@ -4072,7 +4073,7 @@
             <p:cNvPr id="40" name="Straight Arrow Connector 39">
               <a:extLst>
                 <a:ext uri="{FF2B5EF4-FFF2-40B4-BE49-F238E27FC236}">
-                  <a16:creationId xmlns:a16="http://schemas.microsoft.com/office/drawing/2014/main" id="{D129C510-0E92-F748-95B7-D3290C7F5292}"/>
+                  <a16:creationId xmlns:a16="http://schemas.microsoft.com/office/drawing/2014/main" xmlns="" id="{D129C510-0E92-F748-95B7-D3290C7F5292}"/>
                 </a:ext>
               </a:extLst>
             </p:cNvPr>
@@ -4118,7 +4119,7 @@
             <p:cNvPr id="45" name="Straight Arrow Connector 44">
               <a:extLst>
                 <a:ext uri="{FF2B5EF4-FFF2-40B4-BE49-F238E27FC236}">
-                  <a16:creationId xmlns:a16="http://schemas.microsoft.com/office/drawing/2014/main" id="{6A37E265-7C1D-4E42-8DE5-F1525A585474}"/>
+                  <a16:creationId xmlns:a16="http://schemas.microsoft.com/office/drawing/2014/main" xmlns="" id="{6A37E265-7C1D-4E42-8DE5-F1525A585474}"/>
                 </a:ext>
               </a:extLst>
             </p:cNvPr>
@@ -4164,7 +4165,7 @@
             <p:cNvPr id="47" name="Straight Arrow Connector 46">
               <a:extLst>
                 <a:ext uri="{FF2B5EF4-FFF2-40B4-BE49-F238E27FC236}">
-                  <a16:creationId xmlns:a16="http://schemas.microsoft.com/office/drawing/2014/main" id="{01B65FEC-66A0-E54A-A1A9-01441382ADA4}"/>
+                  <a16:creationId xmlns:a16="http://schemas.microsoft.com/office/drawing/2014/main" xmlns="" id="{01B65FEC-66A0-E54A-A1A9-01441382ADA4}"/>
                 </a:ext>
               </a:extLst>
             </p:cNvPr>
@@ -4210,7 +4211,7 @@
             <p:cNvPr id="48" name="Donut 47">
               <a:extLst>
                 <a:ext uri="{FF2B5EF4-FFF2-40B4-BE49-F238E27FC236}">
-                  <a16:creationId xmlns:a16="http://schemas.microsoft.com/office/drawing/2014/main" id="{1AD3C458-7283-094D-A4AC-30A8D632277B}"/>
+                  <a16:creationId xmlns:a16="http://schemas.microsoft.com/office/drawing/2014/main" xmlns="" id="{1AD3C458-7283-094D-A4AC-30A8D632277B}"/>
                 </a:ext>
               </a:extLst>
             </p:cNvPr>
@@ -4262,7 +4263,7 @@
             <p:cNvPr id="49" name="Donut 48">
               <a:extLst>
                 <a:ext uri="{FF2B5EF4-FFF2-40B4-BE49-F238E27FC236}">
-                  <a16:creationId xmlns:a16="http://schemas.microsoft.com/office/drawing/2014/main" id="{54296AC5-4EA6-2E48-B195-3F349430556D}"/>
+                  <a16:creationId xmlns:a16="http://schemas.microsoft.com/office/drawing/2014/main" xmlns="" id="{54296AC5-4EA6-2E48-B195-3F349430556D}"/>
                 </a:ext>
               </a:extLst>
             </p:cNvPr>
@@ -4314,7 +4315,7 @@
             <p:cNvPr id="50" name="Donut 49">
               <a:extLst>
                 <a:ext uri="{FF2B5EF4-FFF2-40B4-BE49-F238E27FC236}">
-                  <a16:creationId xmlns:a16="http://schemas.microsoft.com/office/drawing/2014/main" id="{ECEA39D9-22FF-2142-92DA-F78CCF525516}"/>
+                  <a16:creationId xmlns:a16="http://schemas.microsoft.com/office/drawing/2014/main" xmlns="" id="{ECEA39D9-22FF-2142-92DA-F78CCF525516}"/>
                 </a:ext>
               </a:extLst>
             </p:cNvPr>
@@ -4366,7 +4367,7 @@
             <p:cNvPr id="51" name="Donut 50">
               <a:extLst>
                 <a:ext uri="{FF2B5EF4-FFF2-40B4-BE49-F238E27FC236}">
-                  <a16:creationId xmlns:a16="http://schemas.microsoft.com/office/drawing/2014/main" id="{027D34A4-3CCC-5E4C-8C3B-04AEEFC20D48}"/>
+                  <a16:creationId xmlns:a16="http://schemas.microsoft.com/office/drawing/2014/main" xmlns="" id="{027D34A4-3CCC-5E4C-8C3B-04AEEFC20D48}"/>
                 </a:ext>
               </a:extLst>
             </p:cNvPr>
@@ -4418,7 +4419,7 @@
             <p:cNvPr id="52" name="Picture 51">
               <a:extLst>
                 <a:ext uri="{FF2B5EF4-FFF2-40B4-BE49-F238E27FC236}">
-                  <a16:creationId xmlns:a16="http://schemas.microsoft.com/office/drawing/2014/main" id="{5D3188FF-EB25-4542-9B0E-F071C76D530F}"/>
+                  <a16:creationId xmlns:a16="http://schemas.microsoft.com/office/drawing/2014/main" xmlns="" id="{5D3188FF-EB25-4542-9B0E-F071C76D530F}"/>
                 </a:ext>
               </a:extLst>
             </p:cNvPr>
@@ -4448,7 +4449,7 @@
             <p:cNvPr id="53" name="Picture 52">
               <a:extLst>
                 <a:ext uri="{FF2B5EF4-FFF2-40B4-BE49-F238E27FC236}">
-                  <a16:creationId xmlns:a16="http://schemas.microsoft.com/office/drawing/2014/main" id="{E80586E2-8A21-B44A-B2A6-E2A37289C605}"/>
+                  <a16:creationId xmlns:a16="http://schemas.microsoft.com/office/drawing/2014/main" xmlns="" id="{E80586E2-8A21-B44A-B2A6-E2A37289C605}"/>
                 </a:ext>
               </a:extLst>
             </p:cNvPr>
@@ -4478,7 +4479,7 @@
             <p:cNvPr id="54" name="Picture 53">
               <a:extLst>
                 <a:ext uri="{FF2B5EF4-FFF2-40B4-BE49-F238E27FC236}">
-                  <a16:creationId xmlns:a16="http://schemas.microsoft.com/office/drawing/2014/main" id="{10C0DB48-7DBA-884E-BE90-9CC62393ECA2}"/>
+                  <a16:creationId xmlns:a16="http://schemas.microsoft.com/office/drawing/2014/main" xmlns="" id="{10C0DB48-7DBA-884E-BE90-9CC62393ECA2}"/>
                 </a:ext>
               </a:extLst>
             </p:cNvPr>
@@ -4508,7 +4509,7 @@
             <p:cNvPr id="55" name="Picture 54">
               <a:extLst>
                 <a:ext uri="{FF2B5EF4-FFF2-40B4-BE49-F238E27FC236}">
-                  <a16:creationId xmlns:a16="http://schemas.microsoft.com/office/drawing/2014/main" id="{B4AE2BC6-738E-E543-8EFA-CBB71B892574}"/>
+                  <a16:creationId xmlns:a16="http://schemas.microsoft.com/office/drawing/2014/main" xmlns="" id="{B4AE2BC6-738E-E543-8EFA-CBB71B892574}"/>
                 </a:ext>
               </a:extLst>
             </p:cNvPr>
@@ -4538,7 +4539,7 @@
             <p:cNvPr id="57" name="Straight Arrow Connector 56">
               <a:extLst>
                 <a:ext uri="{FF2B5EF4-FFF2-40B4-BE49-F238E27FC236}">
-                  <a16:creationId xmlns:a16="http://schemas.microsoft.com/office/drawing/2014/main" id="{B7E0628D-3896-0D40-8C0F-2A2C37242174}"/>
+                  <a16:creationId xmlns:a16="http://schemas.microsoft.com/office/drawing/2014/main" xmlns="" id="{B7E0628D-3896-0D40-8C0F-2A2C37242174}"/>
                 </a:ext>
               </a:extLst>
             </p:cNvPr>
@@ -4583,7 +4584,7 @@
             <p:cNvPr id="58" name="Straight Arrow Connector 57">
               <a:extLst>
                 <a:ext uri="{FF2B5EF4-FFF2-40B4-BE49-F238E27FC236}">
-                  <a16:creationId xmlns:a16="http://schemas.microsoft.com/office/drawing/2014/main" id="{A8ACF2FB-D778-3646-84C4-C402FC592721}"/>
+                  <a16:creationId xmlns:a16="http://schemas.microsoft.com/office/drawing/2014/main" xmlns="" id="{A8ACF2FB-D778-3646-84C4-C402FC592721}"/>
                 </a:ext>
               </a:extLst>
             </p:cNvPr>
@@ -4628,7 +4629,7 @@
             <p:cNvPr id="59" name="Straight Arrow Connector 58">
               <a:extLst>
                 <a:ext uri="{FF2B5EF4-FFF2-40B4-BE49-F238E27FC236}">
-                  <a16:creationId xmlns:a16="http://schemas.microsoft.com/office/drawing/2014/main" id="{E424E677-519B-644C-852E-DAFC1041F8F9}"/>
+                  <a16:creationId xmlns:a16="http://schemas.microsoft.com/office/drawing/2014/main" xmlns="" id="{E424E677-519B-644C-852E-DAFC1041F8F9}"/>
                 </a:ext>
               </a:extLst>
             </p:cNvPr>
@@ -4673,7 +4674,7 @@
             <p:cNvPr id="60" name="Straight Arrow Connector 59">
               <a:extLst>
                 <a:ext uri="{FF2B5EF4-FFF2-40B4-BE49-F238E27FC236}">
-                  <a16:creationId xmlns:a16="http://schemas.microsoft.com/office/drawing/2014/main" id="{CC702EAB-6327-3548-9BA5-19449AE977CC}"/>
+                  <a16:creationId xmlns:a16="http://schemas.microsoft.com/office/drawing/2014/main" xmlns="" id="{CC702EAB-6327-3548-9BA5-19449AE977CC}"/>
                 </a:ext>
               </a:extLst>
             </p:cNvPr>
@@ -4718,7 +4719,7 @@
             <p:cNvPr id="61" name="Straight Arrow Connector 60">
               <a:extLst>
                 <a:ext uri="{FF2B5EF4-FFF2-40B4-BE49-F238E27FC236}">
-                  <a16:creationId xmlns:a16="http://schemas.microsoft.com/office/drawing/2014/main" id="{0E175693-96D0-5548-87EF-74C7A77A63D4}"/>
+                  <a16:creationId xmlns:a16="http://schemas.microsoft.com/office/drawing/2014/main" xmlns="" id="{0E175693-96D0-5548-87EF-74C7A77A63D4}"/>
                 </a:ext>
               </a:extLst>
             </p:cNvPr>
@@ -4763,7 +4764,7 @@
             <p:cNvPr id="62" name="Straight Arrow Connector 61">
               <a:extLst>
                 <a:ext uri="{FF2B5EF4-FFF2-40B4-BE49-F238E27FC236}">
-                  <a16:creationId xmlns:a16="http://schemas.microsoft.com/office/drawing/2014/main" id="{F787A27D-C2A6-494E-9E42-2C8E021EA6BA}"/>
+                  <a16:creationId xmlns:a16="http://schemas.microsoft.com/office/drawing/2014/main" xmlns="" id="{F787A27D-C2A6-494E-9E42-2C8E021EA6BA}"/>
                 </a:ext>
               </a:extLst>
             </p:cNvPr>
@@ -4808,7 +4809,7 @@
             <p:cNvPr id="65" name="Straight Arrow Connector 64">
               <a:extLst>
                 <a:ext uri="{FF2B5EF4-FFF2-40B4-BE49-F238E27FC236}">
-                  <a16:creationId xmlns:a16="http://schemas.microsoft.com/office/drawing/2014/main" id="{665894B1-601F-B54F-B53B-D7434ED7704F}"/>
+                  <a16:creationId xmlns:a16="http://schemas.microsoft.com/office/drawing/2014/main" xmlns="" id="{665894B1-601F-B54F-B53B-D7434ED7704F}"/>
                 </a:ext>
               </a:extLst>
             </p:cNvPr>
@@ -4855,7 +4856,7 @@
             <p:cNvPr id="66" name="Straight Arrow Connector 65">
               <a:extLst>
                 <a:ext uri="{FF2B5EF4-FFF2-40B4-BE49-F238E27FC236}">
-                  <a16:creationId xmlns:a16="http://schemas.microsoft.com/office/drawing/2014/main" id="{8D00B99C-A25A-0544-9CCC-62BED27C14E3}"/>
+                  <a16:creationId xmlns:a16="http://schemas.microsoft.com/office/drawing/2014/main" xmlns="" id="{8D00B99C-A25A-0544-9CCC-62BED27C14E3}"/>
                 </a:ext>
               </a:extLst>
             </p:cNvPr>
@@ -4902,7 +4903,7 @@
             <p:cNvPr id="74" name="Straight Arrow Connector 73">
               <a:extLst>
                 <a:ext uri="{FF2B5EF4-FFF2-40B4-BE49-F238E27FC236}">
-                  <a16:creationId xmlns:a16="http://schemas.microsoft.com/office/drawing/2014/main" id="{9897DA5B-3CCB-0745-A483-551471B7CE67}"/>
+                  <a16:creationId xmlns:a16="http://schemas.microsoft.com/office/drawing/2014/main" xmlns="" id="{9897DA5B-3CCB-0745-A483-551471B7CE67}"/>
                 </a:ext>
               </a:extLst>
             </p:cNvPr>
@@ -4949,7 +4950,7 @@
             <p:cNvPr id="86" name="TextBox 85">
               <a:extLst>
                 <a:ext uri="{FF2B5EF4-FFF2-40B4-BE49-F238E27FC236}">
-                  <a16:creationId xmlns:a16="http://schemas.microsoft.com/office/drawing/2014/main" id="{08D6A736-4169-4F4B-A504-8B317B727C73}"/>
+                  <a16:creationId xmlns:a16="http://schemas.microsoft.com/office/drawing/2014/main" xmlns="" id="{08D6A736-4169-4F4B-A504-8B317B727C73}"/>
                 </a:ext>
               </a:extLst>
             </p:cNvPr>
@@ -4984,7 +4985,7 @@
             <p:cNvPr id="87" name="Straight Arrow Connector 86">
               <a:extLst>
                 <a:ext uri="{FF2B5EF4-FFF2-40B4-BE49-F238E27FC236}">
-                  <a16:creationId xmlns:a16="http://schemas.microsoft.com/office/drawing/2014/main" id="{D894C924-CCB7-294F-92D3-516C5963A38F}"/>
+                  <a16:creationId xmlns:a16="http://schemas.microsoft.com/office/drawing/2014/main" xmlns="" id="{D894C924-CCB7-294F-92D3-516C5963A38F}"/>
                 </a:ext>
               </a:extLst>
             </p:cNvPr>
@@ -5028,7 +5029,7 @@
             <p:cNvPr id="88" name="Straight Arrow Connector 87">
               <a:extLst>
                 <a:ext uri="{FF2B5EF4-FFF2-40B4-BE49-F238E27FC236}">
-                  <a16:creationId xmlns:a16="http://schemas.microsoft.com/office/drawing/2014/main" id="{643ADA86-9B33-E942-973D-84EF8B397DA7}"/>
+                  <a16:creationId xmlns:a16="http://schemas.microsoft.com/office/drawing/2014/main" xmlns="" id="{643ADA86-9B33-E942-973D-84EF8B397DA7}"/>
                 </a:ext>
               </a:extLst>
             </p:cNvPr>
@@ -5072,7 +5073,7 @@
             <p:cNvPr id="92" name="Rectangle 91">
               <a:extLst>
                 <a:ext uri="{FF2B5EF4-FFF2-40B4-BE49-F238E27FC236}">
-                  <a16:creationId xmlns:a16="http://schemas.microsoft.com/office/drawing/2014/main" id="{0706AB93-4F5E-9F46-B494-FAA5B69D424F}"/>
+                  <a16:creationId xmlns:a16="http://schemas.microsoft.com/office/drawing/2014/main" xmlns="" id="{0706AB93-4F5E-9F46-B494-FAA5B69D424F}"/>
                 </a:ext>
               </a:extLst>
             </p:cNvPr>
@@ -5124,6 +5125,404 @@
     <p:extLst>
       <p:ext uri="{BB962C8B-B14F-4D97-AF65-F5344CB8AC3E}">
         <p14:creationId xmlns:p14="http://schemas.microsoft.com/office/powerpoint/2010/main" val="3319779810"/>
+      </p:ext>
+    </p:extLst>
+  </p:cSld>
+  <p:clrMapOvr>
+    <a:masterClrMapping/>
+  </p:clrMapOvr>
+</p:sld>
+</file>
+
+<file path=ppt/slides/slide10.xml><?xml version="1.0" encoding="utf-8"?>
+<p:sld xmlns:a="http://schemas.openxmlformats.org/drawingml/2006/main" xmlns:r="http://schemas.openxmlformats.org/officeDocument/2006/relationships" xmlns:p="http://schemas.openxmlformats.org/presentationml/2006/main">
+  <p:cSld>
+    <p:spTree>
+      <p:nvGrpSpPr>
+        <p:cNvPr id="1" name=""/>
+        <p:cNvGrpSpPr/>
+        <p:nvPr/>
+      </p:nvGrpSpPr>
+      <p:grpSpPr>
+        <a:xfrm>
+          <a:off x="0" y="0"/>
+          <a:ext cx="0" cy="0"/>
+          <a:chOff x="0" y="0"/>
+          <a:chExt cx="0" cy="0"/>
+        </a:xfrm>
+      </p:grpSpPr>
+      <p:pic>
+        <p:nvPicPr>
+          <p:cNvPr id="4" name="Picture 3"/>
+          <p:cNvPicPr>
+            <a:picLocks noChangeAspect="1"/>
+          </p:cNvPicPr>
+          <p:nvPr/>
+        </p:nvPicPr>
+        <p:blipFill>
+          <a:blip r:embed="rId2">
+            <a:extLst>
+              <a:ext uri="{28A0092B-C50C-407E-A947-70E740481C1C}">
+                <a14:useLocalDpi xmlns:a14="http://schemas.microsoft.com/office/drawing/2010/main" val="0"/>
+              </a:ext>
+            </a:extLst>
+          </a:blip>
+          <a:stretch>
+            <a:fillRect/>
+          </a:stretch>
+        </p:blipFill>
+        <p:spPr>
+          <a:xfrm>
+            <a:off x="3104873" y="1338470"/>
+            <a:ext cx="6381321" cy="3714804"/>
+          </a:xfrm>
+          <a:prstGeom prst="rect">
+            <a:avLst/>
+          </a:prstGeom>
+          <a:ln>
+            <a:noFill/>
+          </a:ln>
+        </p:spPr>
+      </p:pic>
+      <p:sp>
+        <p:nvSpPr>
+          <p:cNvPr id="5" name="Frame 4"/>
+          <p:cNvSpPr/>
+          <p:nvPr/>
+        </p:nvSpPr>
+        <p:spPr>
+          <a:xfrm rot="180000">
+            <a:off x="3449940" y="1785147"/>
+            <a:ext cx="5691184" cy="2507227"/>
+          </a:xfrm>
+          <a:prstGeom prst="frame">
+            <a:avLst>
+              <a:gd name="adj1" fmla="val 3420"/>
+            </a:avLst>
+          </a:prstGeom>
+          <a:solidFill>
+            <a:srgbClr val="FF0000"/>
+          </a:solidFill>
+          <a:ln>
+            <a:noFill/>
+          </a:ln>
+        </p:spPr>
+        <p:style>
+          <a:lnRef idx="2">
+            <a:schemeClr val="accent1">
+              <a:shade val="50000"/>
+            </a:schemeClr>
+          </a:lnRef>
+          <a:fillRef idx="1">
+            <a:schemeClr val="accent1"/>
+          </a:fillRef>
+          <a:effectRef idx="0">
+            <a:schemeClr val="accent1"/>
+          </a:effectRef>
+          <a:fontRef idx="minor">
+            <a:schemeClr val="lt1"/>
+          </a:fontRef>
+        </p:style>
+        <p:txBody>
+          <a:bodyPr rtlCol="0" anchor="ctr"/>
+          <a:lstStyle/>
+          <a:p>
+            <a:pPr algn="ctr"/>
+            <a:endParaRPr lang="en-US">
+              <a:solidFill>
+                <a:schemeClr val="tx1"/>
+              </a:solidFill>
+            </a:endParaRPr>
+          </a:p>
+        </p:txBody>
+      </p:sp>
+      <p:cxnSp>
+        <p:nvCxnSpPr>
+          <p:cNvPr id="7" name="Straight Arrow Connector 6"/>
+          <p:cNvCxnSpPr/>
+          <p:nvPr/>
+        </p:nvCxnSpPr>
+        <p:spPr>
+          <a:xfrm rot="60000" flipV="1">
+            <a:off x="5388823" y="2072157"/>
+            <a:ext cx="31382" cy="898667"/>
+          </a:xfrm>
+          <a:prstGeom prst="straightConnector1">
+            <a:avLst/>
+          </a:prstGeom>
+          <a:ln w="57150">
+            <a:solidFill>
+              <a:srgbClr val="FFFF00"/>
+            </a:solidFill>
+            <a:tailEnd type="triangle"/>
+          </a:ln>
+        </p:spPr>
+        <p:style>
+          <a:lnRef idx="1">
+            <a:schemeClr val="accent1"/>
+          </a:lnRef>
+          <a:fillRef idx="0">
+            <a:schemeClr val="accent1"/>
+          </a:fillRef>
+          <a:effectRef idx="0">
+            <a:schemeClr val="accent1"/>
+          </a:effectRef>
+          <a:fontRef idx="minor">
+            <a:schemeClr val="tx1"/>
+          </a:fontRef>
+        </p:style>
+      </p:cxnSp>
+      <p:cxnSp>
+        <p:nvCxnSpPr>
+          <p:cNvPr id="9" name="Straight Arrow Connector 8"/>
+          <p:cNvCxnSpPr/>
+          <p:nvPr/>
+        </p:nvCxnSpPr>
+        <p:spPr>
+          <a:xfrm>
+            <a:off x="5345703" y="2947498"/>
+            <a:ext cx="2573309" cy="134861"/>
+          </a:xfrm>
+          <a:prstGeom prst="straightConnector1">
+            <a:avLst/>
+          </a:prstGeom>
+          <a:ln w="57150">
+            <a:solidFill>
+              <a:srgbClr val="FFFF00"/>
+            </a:solidFill>
+            <a:tailEnd type="triangle"/>
+          </a:ln>
+        </p:spPr>
+        <p:style>
+          <a:lnRef idx="1">
+            <a:schemeClr val="accent1"/>
+          </a:lnRef>
+          <a:fillRef idx="0">
+            <a:schemeClr val="accent1"/>
+          </a:fillRef>
+          <a:effectRef idx="0">
+            <a:schemeClr val="accent1"/>
+          </a:effectRef>
+          <a:fontRef idx="minor">
+            <a:schemeClr val="tx1"/>
+          </a:fontRef>
+        </p:style>
+      </p:cxnSp>
+      <p:sp>
+        <p:nvSpPr>
+          <p:cNvPr id="13" name="TextBox 12"/>
+          <p:cNvSpPr txBox="1"/>
+          <p:nvPr/>
+        </p:nvSpPr>
+        <p:spPr>
+          <a:xfrm>
+            <a:off x="7777801" y="2603342"/>
+            <a:ext cx="352982" cy="523220"/>
+          </a:xfrm>
+          <a:prstGeom prst="rect">
+            <a:avLst/>
+          </a:prstGeom>
+          <a:noFill/>
+        </p:spPr>
+        <p:txBody>
+          <a:bodyPr wrap="none" rtlCol="0">
+            <a:spAutoFit/>
+          </a:bodyPr>
+          <a:lstStyle/>
+          <a:p>
+            <a:r>
+              <a:rPr lang="en-US" sz="2800" dirty="0">
+                <a:solidFill>
+                  <a:srgbClr val="FFFF00"/>
+                </a:solidFill>
+              </a:rPr>
+              <a:t>Z</a:t>
+            </a:r>
+          </a:p>
+        </p:txBody>
+      </p:sp>
+      <p:sp>
+        <p:nvSpPr>
+          <p:cNvPr id="14" name="TextBox 13"/>
+          <p:cNvSpPr txBox="1"/>
+          <p:nvPr/>
+        </p:nvSpPr>
+        <p:spPr>
+          <a:xfrm>
+            <a:off x="4992729" y="1759964"/>
+            <a:ext cx="370614" cy="523220"/>
+          </a:xfrm>
+          <a:prstGeom prst="rect">
+            <a:avLst/>
+          </a:prstGeom>
+          <a:noFill/>
+        </p:spPr>
+        <p:txBody>
+          <a:bodyPr wrap="none" rtlCol="0">
+            <a:spAutoFit/>
+          </a:bodyPr>
+          <a:lstStyle/>
+          <a:p>
+            <a:r>
+              <a:rPr lang="en-US" sz="2800" dirty="0" smtClean="0">
+                <a:solidFill>
+                  <a:srgbClr val="FFFF00"/>
+                </a:solidFill>
+              </a:rPr>
+              <a:t>X</a:t>
+            </a:r>
+            <a:endParaRPr lang="en-US" sz="2800" dirty="0">
+              <a:solidFill>
+                <a:srgbClr val="FFFF00"/>
+              </a:solidFill>
+            </a:endParaRPr>
+          </a:p>
+        </p:txBody>
+      </p:sp>
+      <p:sp>
+        <p:nvSpPr>
+          <p:cNvPr id="16" name="Oval 15"/>
+          <p:cNvSpPr/>
+          <p:nvPr/>
+        </p:nvSpPr>
+        <p:spPr>
+          <a:xfrm>
+            <a:off x="4845985" y="2851096"/>
+            <a:ext cx="203200" cy="203200"/>
+          </a:xfrm>
+          <a:prstGeom prst="ellipse">
+            <a:avLst/>
+          </a:prstGeom>
+          <a:solidFill>
+            <a:srgbClr val="FFFF00"/>
+          </a:solidFill>
+          <a:ln>
+            <a:solidFill>
+              <a:srgbClr val="FFFF00"/>
+            </a:solidFill>
+          </a:ln>
+        </p:spPr>
+        <p:style>
+          <a:lnRef idx="2">
+            <a:schemeClr val="accent1">
+              <a:shade val="50000"/>
+            </a:schemeClr>
+          </a:lnRef>
+          <a:fillRef idx="1">
+            <a:schemeClr val="accent1"/>
+          </a:fillRef>
+          <a:effectRef idx="0">
+            <a:schemeClr val="accent1"/>
+          </a:effectRef>
+          <a:fontRef idx="minor">
+            <a:schemeClr val="lt1"/>
+          </a:fontRef>
+        </p:style>
+        <p:txBody>
+          <a:bodyPr rtlCol="0" anchor="ctr"/>
+          <a:lstStyle/>
+          <a:p>
+            <a:pPr algn="ctr"/>
+            <a:endParaRPr lang="en-US"/>
+          </a:p>
+        </p:txBody>
+      </p:sp>
+      <p:sp>
+        <p:nvSpPr>
+          <p:cNvPr id="17" name="Donut 16"/>
+          <p:cNvSpPr/>
+          <p:nvPr/>
+        </p:nvSpPr>
+        <p:spPr>
+          <a:xfrm>
+            <a:off x="4658671" y="2662104"/>
+            <a:ext cx="570788" cy="570788"/>
+          </a:xfrm>
+          <a:prstGeom prst="donut">
+            <a:avLst>
+              <a:gd name="adj" fmla="val 4592"/>
+            </a:avLst>
+          </a:prstGeom>
+          <a:solidFill>
+            <a:srgbClr val="FFFF00"/>
+          </a:solidFill>
+          <a:ln>
+            <a:solidFill>
+              <a:srgbClr val="FFFF00"/>
+            </a:solidFill>
+          </a:ln>
+        </p:spPr>
+        <p:style>
+          <a:lnRef idx="2">
+            <a:schemeClr val="accent1">
+              <a:shade val="50000"/>
+            </a:schemeClr>
+          </a:lnRef>
+          <a:fillRef idx="1">
+            <a:schemeClr val="accent1"/>
+          </a:fillRef>
+          <a:effectRef idx="0">
+            <a:schemeClr val="accent1"/>
+          </a:effectRef>
+          <a:fontRef idx="minor">
+            <a:schemeClr val="lt1"/>
+          </a:fontRef>
+        </p:style>
+        <p:txBody>
+          <a:bodyPr rtlCol="0" anchor="ctr"/>
+          <a:lstStyle/>
+          <a:p>
+            <a:pPr algn="ctr"/>
+            <a:endParaRPr lang="en-US">
+              <a:solidFill>
+                <a:schemeClr val="tx1"/>
+              </a:solidFill>
+            </a:endParaRPr>
+          </a:p>
+        </p:txBody>
+      </p:sp>
+      <p:sp>
+        <p:nvSpPr>
+          <p:cNvPr id="18" name="TextBox 17"/>
+          <p:cNvSpPr txBox="1"/>
+          <p:nvPr/>
+        </p:nvSpPr>
+        <p:spPr>
+          <a:xfrm>
+            <a:off x="4361384" y="2486047"/>
+            <a:ext cx="370614" cy="523220"/>
+          </a:xfrm>
+          <a:prstGeom prst="rect">
+            <a:avLst/>
+          </a:prstGeom>
+          <a:noFill/>
+        </p:spPr>
+        <p:txBody>
+          <a:bodyPr wrap="none" rtlCol="0">
+            <a:spAutoFit/>
+          </a:bodyPr>
+          <a:lstStyle/>
+          <a:p>
+            <a:r>
+              <a:rPr lang="en-US" sz="2800" dirty="0" smtClean="0">
+                <a:solidFill>
+                  <a:srgbClr val="FFFF00"/>
+                </a:solidFill>
+              </a:rPr>
+              <a:t>Y</a:t>
+            </a:r>
+            <a:endParaRPr lang="en-US" sz="2800" dirty="0">
+              <a:solidFill>
+                <a:srgbClr val="FFFF00"/>
+              </a:solidFill>
+            </a:endParaRPr>
+          </a:p>
+        </p:txBody>
+      </p:sp>
+    </p:spTree>
+    <p:extLst>
+      <p:ext uri="{BB962C8B-B14F-4D97-AF65-F5344CB8AC3E}">
+        <p14:creationId xmlns:p14="http://schemas.microsoft.com/office/powerpoint/2010/main" val="1090399682"/>
       </p:ext>
     </p:extLst>
   </p:cSld>
@@ -5155,7 +5554,7 @@
           <p:cNvPr id="23" name="Group 22">
             <a:extLst>
               <a:ext uri="{FF2B5EF4-FFF2-40B4-BE49-F238E27FC236}">
-                <a16:creationId xmlns:a16="http://schemas.microsoft.com/office/drawing/2014/main" id="{BCC420A2-DA9C-7942-B39C-D09C4F5EA55A}"/>
+                <a16:creationId xmlns:a16="http://schemas.microsoft.com/office/drawing/2014/main" xmlns="" id="{BCC420A2-DA9C-7942-B39C-D09C4F5EA55A}"/>
               </a:ext>
             </a:extLst>
           </p:cNvPr>
@@ -5175,7 +5574,7 @@
             <p:cNvPr id="5" name="Straight Connector 4">
               <a:extLst>
                 <a:ext uri="{FF2B5EF4-FFF2-40B4-BE49-F238E27FC236}">
-                  <a16:creationId xmlns:a16="http://schemas.microsoft.com/office/drawing/2014/main" id="{39360EB3-2F94-A44A-B39F-9DB160370D7A}"/>
+                  <a16:creationId xmlns:a16="http://schemas.microsoft.com/office/drawing/2014/main" xmlns="" id="{39360EB3-2F94-A44A-B39F-9DB160370D7A}"/>
                 </a:ext>
               </a:extLst>
             </p:cNvPr>
@@ -5218,7 +5617,7 @@
             <p:cNvPr id="6" name="Straight Connector 5">
               <a:extLst>
                 <a:ext uri="{FF2B5EF4-FFF2-40B4-BE49-F238E27FC236}">
-                  <a16:creationId xmlns:a16="http://schemas.microsoft.com/office/drawing/2014/main" id="{853E8DA6-DA6D-6C46-BFE7-416FBF17C8C7}"/>
+                  <a16:creationId xmlns:a16="http://schemas.microsoft.com/office/drawing/2014/main" xmlns="" id="{853E8DA6-DA6D-6C46-BFE7-416FBF17C8C7}"/>
                 </a:ext>
               </a:extLst>
             </p:cNvPr>
@@ -5262,7 +5661,7 @@
             <p:cNvPr id="9" name="Straight Arrow Connector 8">
               <a:extLst>
                 <a:ext uri="{FF2B5EF4-FFF2-40B4-BE49-F238E27FC236}">
-                  <a16:creationId xmlns:a16="http://schemas.microsoft.com/office/drawing/2014/main" id="{CF5C9E10-448B-F945-BDB2-68260461DD67}"/>
+                  <a16:creationId xmlns:a16="http://schemas.microsoft.com/office/drawing/2014/main" xmlns="" id="{CF5C9E10-448B-F945-BDB2-68260461DD67}"/>
                 </a:ext>
               </a:extLst>
             </p:cNvPr>
@@ -5304,7 +5703,7 @@
             <p:cNvPr id="10" name="TextBox 9">
               <a:extLst>
                 <a:ext uri="{FF2B5EF4-FFF2-40B4-BE49-F238E27FC236}">
-                  <a16:creationId xmlns:a16="http://schemas.microsoft.com/office/drawing/2014/main" id="{FFC39BBD-2C9F-A441-B982-D45EDEFFB0E5}"/>
+                  <a16:creationId xmlns:a16="http://schemas.microsoft.com/office/drawing/2014/main" xmlns="" id="{FFC39BBD-2C9F-A441-B982-D45EDEFFB0E5}"/>
                 </a:ext>
               </a:extLst>
             </p:cNvPr>
@@ -5343,7 +5742,7 @@
             <p:cNvPr id="11" name="TextBox 10">
               <a:extLst>
                 <a:ext uri="{FF2B5EF4-FFF2-40B4-BE49-F238E27FC236}">
-                  <a16:creationId xmlns:a16="http://schemas.microsoft.com/office/drawing/2014/main" id="{6E340A3D-9611-684E-B25B-F9AB12BDD1D4}"/>
+                  <a16:creationId xmlns:a16="http://schemas.microsoft.com/office/drawing/2014/main" xmlns="" id="{6E340A3D-9611-684E-B25B-F9AB12BDD1D4}"/>
                 </a:ext>
               </a:extLst>
             </p:cNvPr>
@@ -5382,7 +5781,7 @@
             <p:cNvPr id="12" name="Straight Arrow Connector 11">
               <a:extLst>
                 <a:ext uri="{FF2B5EF4-FFF2-40B4-BE49-F238E27FC236}">
-                  <a16:creationId xmlns:a16="http://schemas.microsoft.com/office/drawing/2014/main" id="{735FC0BE-6106-9543-A10D-686E0BE6FB36}"/>
+                  <a16:creationId xmlns:a16="http://schemas.microsoft.com/office/drawing/2014/main" xmlns="" id="{735FC0BE-6106-9543-A10D-686E0BE6FB36}"/>
                 </a:ext>
               </a:extLst>
             </p:cNvPr>
@@ -5427,7 +5826,7 @@
             <p:cNvPr id="15" name="Straight Arrow Connector 14">
               <a:extLst>
                 <a:ext uri="{FF2B5EF4-FFF2-40B4-BE49-F238E27FC236}">
-                  <a16:creationId xmlns:a16="http://schemas.microsoft.com/office/drawing/2014/main" id="{F8024A55-957A-0D40-B26F-ABA50E186F24}"/>
+                  <a16:creationId xmlns:a16="http://schemas.microsoft.com/office/drawing/2014/main" xmlns="" id="{F8024A55-957A-0D40-B26F-ABA50E186F24}"/>
                 </a:ext>
               </a:extLst>
             </p:cNvPr>
@@ -5472,7 +5871,7 @@
             <p:cNvPr id="17" name="TextBox 16">
               <a:extLst>
                 <a:ext uri="{FF2B5EF4-FFF2-40B4-BE49-F238E27FC236}">
-                  <a16:creationId xmlns:a16="http://schemas.microsoft.com/office/drawing/2014/main" id="{16D3F9D4-E5F7-6B4D-A03D-0AA606EE74AB}"/>
+                  <a16:creationId xmlns:a16="http://schemas.microsoft.com/office/drawing/2014/main" xmlns="" id="{16D3F9D4-E5F7-6B4D-A03D-0AA606EE74AB}"/>
                 </a:ext>
               </a:extLst>
             </p:cNvPr>
@@ -5511,7 +5910,7 @@
             <p:cNvPr id="18" name="TextBox 17">
               <a:extLst>
                 <a:ext uri="{FF2B5EF4-FFF2-40B4-BE49-F238E27FC236}">
-                  <a16:creationId xmlns:a16="http://schemas.microsoft.com/office/drawing/2014/main" id="{8B25EDDD-F275-834A-AA71-146F0B514D87}"/>
+                  <a16:creationId xmlns:a16="http://schemas.microsoft.com/office/drawing/2014/main" xmlns="" id="{8B25EDDD-F275-834A-AA71-146F0B514D87}"/>
                 </a:ext>
               </a:extLst>
             </p:cNvPr>
@@ -5546,7 +5945,7 @@
             <p:cNvPr id="19" name="TextBox 18">
               <a:extLst>
                 <a:ext uri="{FF2B5EF4-FFF2-40B4-BE49-F238E27FC236}">
-                  <a16:creationId xmlns:a16="http://schemas.microsoft.com/office/drawing/2014/main" id="{F447B65D-C5AF-DB48-A22C-6A80F0DBED91}"/>
+                  <a16:creationId xmlns:a16="http://schemas.microsoft.com/office/drawing/2014/main" xmlns="" id="{F447B65D-C5AF-DB48-A22C-6A80F0DBED91}"/>
                 </a:ext>
               </a:extLst>
             </p:cNvPr>
@@ -5581,7 +5980,7 @@
             <p:cNvPr id="20" name="Arc 19">
               <a:extLst>
                 <a:ext uri="{FF2B5EF4-FFF2-40B4-BE49-F238E27FC236}">
-                  <a16:creationId xmlns:a16="http://schemas.microsoft.com/office/drawing/2014/main" id="{2A1C4EA9-9F3E-6C4D-A9D7-CC767EFDC316}"/>
+                  <a16:creationId xmlns:a16="http://schemas.microsoft.com/office/drawing/2014/main" xmlns="" id="{2A1C4EA9-9F3E-6C4D-A9D7-CC767EFDC316}"/>
                 </a:ext>
               </a:extLst>
             </p:cNvPr>
@@ -5633,7 +6032,7 @@
             <p:cNvPr id="21" name="TextBox 20">
               <a:extLst>
                 <a:ext uri="{FF2B5EF4-FFF2-40B4-BE49-F238E27FC236}">
-                  <a16:creationId xmlns:a16="http://schemas.microsoft.com/office/drawing/2014/main" id="{6906D6A8-C6DC-7E42-B6AC-74F70CA0B1F4}"/>
+                  <a16:creationId xmlns:a16="http://schemas.microsoft.com/office/drawing/2014/main" xmlns="" id="{6906D6A8-C6DC-7E42-B6AC-74F70CA0B1F4}"/>
                 </a:ext>
               </a:extLst>
             </p:cNvPr>
@@ -5713,7 +6112,7 @@
             <p:cNvPr id="4" name="Picture 3">
               <a:extLst>
                 <a:ext uri="{FF2B5EF4-FFF2-40B4-BE49-F238E27FC236}">
-                  <a16:creationId xmlns:a16="http://schemas.microsoft.com/office/drawing/2014/main" id="{9594DC97-7FD9-6C4C-AA8C-A206E9FDE4B1}"/>
+                  <a16:creationId xmlns:a16="http://schemas.microsoft.com/office/drawing/2014/main" xmlns="" id="{9594DC97-7FD9-6C4C-AA8C-A206E9FDE4B1}"/>
                 </a:ext>
               </a:extLst>
             </p:cNvPr>
@@ -6133,7 +6532,7 @@
             <p:cNvPr id="4" name="Picture 3">
               <a:extLst>
                 <a:ext uri="{FF2B5EF4-FFF2-40B4-BE49-F238E27FC236}">
-                  <a16:creationId xmlns:a16="http://schemas.microsoft.com/office/drawing/2014/main" id="{2E17FE61-10C3-E64B-ABB3-5FFD96909365}"/>
+                  <a16:creationId xmlns:a16="http://schemas.microsoft.com/office/drawing/2014/main" xmlns="" id="{2E17FE61-10C3-E64B-ABB3-5FFD96909365}"/>
                 </a:ext>
               </a:extLst>
             </p:cNvPr>
@@ -6162,7 +6561,7 @@
             <p:cNvPr id="5" name="Donut 4">
               <a:extLst>
                 <a:ext uri="{FF2B5EF4-FFF2-40B4-BE49-F238E27FC236}">
-                  <a16:creationId xmlns:a16="http://schemas.microsoft.com/office/drawing/2014/main" id="{A05B1990-5D9B-6044-AC97-F08B64FB7307}"/>
+                  <a16:creationId xmlns:a16="http://schemas.microsoft.com/office/drawing/2014/main" xmlns="" id="{A05B1990-5D9B-6044-AC97-F08B64FB7307}"/>
                 </a:ext>
               </a:extLst>
             </p:cNvPr>
@@ -6222,7 +6621,7 @@
             <p:cNvPr id="6" name="Donut 5">
               <a:extLst>
                 <a:ext uri="{FF2B5EF4-FFF2-40B4-BE49-F238E27FC236}">
-                  <a16:creationId xmlns:a16="http://schemas.microsoft.com/office/drawing/2014/main" id="{E87D4265-32C9-8641-9224-27CBAEBBC555}"/>
+                  <a16:creationId xmlns:a16="http://schemas.microsoft.com/office/drawing/2014/main" xmlns="" id="{E87D4265-32C9-8641-9224-27CBAEBBC555}"/>
                 </a:ext>
               </a:extLst>
             </p:cNvPr>
@@ -6282,7 +6681,7 @@
             <p:cNvPr id="7" name="Donut 6">
               <a:extLst>
                 <a:ext uri="{FF2B5EF4-FFF2-40B4-BE49-F238E27FC236}">
-                  <a16:creationId xmlns:a16="http://schemas.microsoft.com/office/drawing/2014/main" id="{94E5F9FB-A235-5A4B-ACA8-09116E31D8B2}"/>
+                  <a16:creationId xmlns:a16="http://schemas.microsoft.com/office/drawing/2014/main" xmlns="" id="{94E5F9FB-A235-5A4B-ACA8-09116E31D8B2}"/>
                 </a:ext>
               </a:extLst>
             </p:cNvPr>
@@ -6342,7 +6741,7 @@
             <p:cNvPr id="8" name="Donut 7">
               <a:extLst>
                 <a:ext uri="{FF2B5EF4-FFF2-40B4-BE49-F238E27FC236}">
-                  <a16:creationId xmlns:a16="http://schemas.microsoft.com/office/drawing/2014/main" id="{A8505250-A9B4-8441-82AA-79C65E428040}"/>
+                  <a16:creationId xmlns:a16="http://schemas.microsoft.com/office/drawing/2014/main" xmlns="" id="{A8505250-A9B4-8441-82AA-79C65E428040}"/>
                 </a:ext>
               </a:extLst>
             </p:cNvPr>
@@ -6484,7 +6883,7 @@
             <p:cNvPr id="4" name="Content Placeholder 6">
               <a:extLst>
                 <a:ext uri="{FF2B5EF4-FFF2-40B4-BE49-F238E27FC236}">
-                  <a16:creationId xmlns:a16="http://schemas.microsoft.com/office/drawing/2014/main" id="{B5FBF01F-5A46-AE45-A386-1197E9C84285}"/>
+                  <a16:creationId xmlns:a16="http://schemas.microsoft.com/office/drawing/2014/main" xmlns="" id="{B5FBF01F-5A46-AE45-A386-1197E9C84285}"/>
                 </a:ext>
               </a:extLst>
             </p:cNvPr>
@@ -6513,7 +6912,7 @@
             <p:cNvPr id="13" name="TextBox 12">
               <a:extLst>
                 <a:ext uri="{FF2B5EF4-FFF2-40B4-BE49-F238E27FC236}">
-                  <a16:creationId xmlns:a16="http://schemas.microsoft.com/office/drawing/2014/main" id="{7C96A7DC-9E77-1440-A26F-E69E8E484244}"/>
+                  <a16:creationId xmlns:a16="http://schemas.microsoft.com/office/drawing/2014/main" xmlns="" id="{7C96A7DC-9E77-1440-A26F-E69E8E484244}"/>
                 </a:ext>
               </a:extLst>
             </p:cNvPr>
@@ -6548,7 +6947,7 @@
             <p:cNvPr id="17" name="TextBox 16">
               <a:extLst>
                 <a:ext uri="{FF2B5EF4-FFF2-40B4-BE49-F238E27FC236}">
-                  <a16:creationId xmlns:a16="http://schemas.microsoft.com/office/drawing/2014/main" id="{B35BD146-CF53-6741-A6CA-F9917A9B6AB2}"/>
+                  <a16:creationId xmlns:a16="http://schemas.microsoft.com/office/drawing/2014/main" xmlns="" id="{B35BD146-CF53-6741-A6CA-F9917A9B6AB2}"/>
                 </a:ext>
               </a:extLst>
             </p:cNvPr>
@@ -6692,7 +7091,7 @@
             <p:cNvPr id="5" name="Picture 4">
               <a:extLst>
                 <a:ext uri="{FF2B5EF4-FFF2-40B4-BE49-F238E27FC236}">
-                  <a16:creationId xmlns:a16="http://schemas.microsoft.com/office/drawing/2014/main" id="{E0BBAB1D-27A1-D444-B305-BB3992CA6764}"/>
+                  <a16:creationId xmlns:a16="http://schemas.microsoft.com/office/drawing/2014/main" xmlns="" id="{E0BBAB1D-27A1-D444-B305-BB3992CA6764}"/>
                 </a:ext>
               </a:extLst>
             </p:cNvPr>
@@ -6721,7 +7120,7 @@
             <p:cNvPr id="6" name="TextBox 5">
               <a:extLst>
                 <a:ext uri="{FF2B5EF4-FFF2-40B4-BE49-F238E27FC236}">
-                  <a16:creationId xmlns:a16="http://schemas.microsoft.com/office/drawing/2014/main" id="{7C96A7DC-9E77-1440-A26F-E69E8E484244}"/>
+                  <a16:creationId xmlns:a16="http://schemas.microsoft.com/office/drawing/2014/main" xmlns="" id="{7C96A7DC-9E77-1440-A26F-E69E8E484244}"/>
                 </a:ext>
               </a:extLst>
             </p:cNvPr>
@@ -6756,7 +7155,7 @@
             <p:cNvPr id="7" name="TextBox 6">
               <a:extLst>
                 <a:ext uri="{FF2B5EF4-FFF2-40B4-BE49-F238E27FC236}">
-                  <a16:creationId xmlns:a16="http://schemas.microsoft.com/office/drawing/2014/main" id="{B35BD146-CF53-6741-A6CA-F9917A9B6AB2}"/>
+                  <a16:creationId xmlns:a16="http://schemas.microsoft.com/office/drawing/2014/main" xmlns="" id="{B35BD146-CF53-6741-A6CA-F9917A9B6AB2}"/>
                 </a:ext>
               </a:extLst>
             </p:cNvPr>
@@ -7351,7 +7750,7 @@
           <p:cNvPr id="4" name="Straight Connector 3">
             <a:extLst>
               <a:ext uri="{FF2B5EF4-FFF2-40B4-BE49-F238E27FC236}">
-                <a16:creationId xmlns:a16="http://schemas.microsoft.com/office/drawing/2014/main" id="{FD28D3A8-529B-8C4E-8288-913CD864D634}"/>
+                <a16:creationId xmlns:a16="http://schemas.microsoft.com/office/drawing/2014/main" xmlns="" id="{FD28D3A8-529B-8C4E-8288-913CD864D634}"/>
               </a:ext>
             </a:extLst>
           </p:cNvPr>
@@ -7389,7 +7788,7 @@
           <p:cNvPr id="5" name="Straight Connector 4">
             <a:extLst>
               <a:ext uri="{FF2B5EF4-FFF2-40B4-BE49-F238E27FC236}">
-                <a16:creationId xmlns:a16="http://schemas.microsoft.com/office/drawing/2014/main" id="{13F75B51-BB9F-4D40-B3C1-F4810DBCAB70}"/>
+                <a16:creationId xmlns:a16="http://schemas.microsoft.com/office/drawing/2014/main" xmlns="" id="{13F75B51-BB9F-4D40-B3C1-F4810DBCAB70}"/>
               </a:ext>
             </a:extLst>
           </p:cNvPr>
@@ -7427,7 +7826,7 @@
           <p:cNvPr id="6" name="Straight Connector 5">
             <a:extLst>
               <a:ext uri="{FF2B5EF4-FFF2-40B4-BE49-F238E27FC236}">
-                <a16:creationId xmlns:a16="http://schemas.microsoft.com/office/drawing/2014/main" id="{245E092D-CE07-3742-B7F7-4E54FC78EB19}"/>
+                <a16:creationId xmlns:a16="http://schemas.microsoft.com/office/drawing/2014/main" xmlns="" id="{245E092D-CE07-3742-B7F7-4E54FC78EB19}"/>
               </a:ext>
             </a:extLst>
           </p:cNvPr>
@@ -7470,7 +7869,7 @@
           <p:cNvPr id="7" name="Straight Connector 6">
             <a:extLst>
               <a:ext uri="{FF2B5EF4-FFF2-40B4-BE49-F238E27FC236}">
-                <a16:creationId xmlns:a16="http://schemas.microsoft.com/office/drawing/2014/main" id="{D2CD578E-7069-EB4B-9FE1-E85E81F0B9FA}"/>
+                <a16:creationId xmlns:a16="http://schemas.microsoft.com/office/drawing/2014/main" xmlns="" id="{D2CD578E-7069-EB4B-9FE1-E85E81F0B9FA}"/>
               </a:ext>
             </a:extLst>
           </p:cNvPr>
@@ -7513,7 +7912,7 @@
           <p:cNvPr id="8" name="Straight Connector 7">
             <a:extLst>
               <a:ext uri="{FF2B5EF4-FFF2-40B4-BE49-F238E27FC236}">
-                <a16:creationId xmlns:a16="http://schemas.microsoft.com/office/drawing/2014/main" id="{4D82641A-CCD1-2443-94A3-1E08780A7290}"/>
+                <a16:creationId xmlns:a16="http://schemas.microsoft.com/office/drawing/2014/main" xmlns="" id="{4D82641A-CCD1-2443-94A3-1E08780A7290}"/>
               </a:ext>
             </a:extLst>
           </p:cNvPr>
@@ -7556,7 +7955,7 @@
           <p:cNvPr id="9" name="Straight Connector 8">
             <a:extLst>
               <a:ext uri="{FF2B5EF4-FFF2-40B4-BE49-F238E27FC236}">
-                <a16:creationId xmlns:a16="http://schemas.microsoft.com/office/drawing/2014/main" id="{EF7A0A7C-12A4-C642-A587-1C9DB2BC1299}"/>
+                <a16:creationId xmlns:a16="http://schemas.microsoft.com/office/drawing/2014/main" xmlns="" id="{EF7A0A7C-12A4-C642-A587-1C9DB2BC1299}"/>
               </a:ext>
             </a:extLst>
           </p:cNvPr>
@@ -7599,7 +7998,7 @@
           <p:cNvPr id="10" name="Straight Connector 9">
             <a:extLst>
               <a:ext uri="{FF2B5EF4-FFF2-40B4-BE49-F238E27FC236}">
-                <a16:creationId xmlns:a16="http://schemas.microsoft.com/office/drawing/2014/main" id="{8C75174E-D43B-4B4D-AB2D-C81870CE047B}"/>
+                <a16:creationId xmlns:a16="http://schemas.microsoft.com/office/drawing/2014/main" xmlns="" id="{8C75174E-D43B-4B4D-AB2D-C81870CE047B}"/>
               </a:ext>
             </a:extLst>
           </p:cNvPr>
@@ -7642,7 +8041,7 @@
           <p:cNvPr id="11" name="Straight Connector 10">
             <a:extLst>
               <a:ext uri="{FF2B5EF4-FFF2-40B4-BE49-F238E27FC236}">
-                <a16:creationId xmlns:a16="http://schemas.microsoft.com/office/drawing/2014/main" id="{F4C2AEBC-8FA0-0D44-9999-B462F527608F}"/>
+                <a16:creationId xmlns:a16="http://schemas.microsoft.com/office/drawing/2014/main" xmlns="" id="{F4C2AEBC-8FA0-0D44-9999-B462F527608F}"/>
               </a:ext>
             </a:extLst>
           </p:cNvPr>
@@ -7685,7 +8084,7 @@
           <p:cNvPr id="12" name="Straight Connector 11">
             <a:extLst>
               <a:ext uri="{FF2B5EF4-FFF2-40B4-BE49-F238E27FC236}">
-                <a16:creationId xmlns:a16="http://schemas.microsoft.com/office/drawing/2014/main" id="{B8FB4FD3-B69F-DB49-B230-E409721C041B}"/>
+                <a16:creationId xmlns:a16="http://schemas.microsoft.com/office/drawing/2014/main" xmlns="" id="{B8FB4FD3-B69F-DB49-B230-E409721C041B}"/>
               </a:ext>
             </a:extLst>
           </p:cNvPr>
@@ -7728,7 +8127,7 @@
           <p:cNvPr id="13" name="Straight Connector 12">
             <a:extLst>
               <a:ext uri="{FF2B5EF4-FFF2-40B4-BE49-F238E27FC236}">
-                <a16:creationId xmlns:a16="http://schemas.microsoft.com/office/drawing/2014/main" id="{8A42643D-E60D-9B4B-9419-AAA8CC97FD62}"/>
+                <a16:creationId xmlns:a16="http://schemas.microsoft.com/office/drawing/2014/main" xmlns="" id="{8A42643D-E60D-9B4B-9419-AAA8CC97FD62}"/>
               </a:ext>
             </a:extLst>
           </p:cNvPr>
@@ -7771,7 +8170,7 @@
           <p:cNvPr id="14" name="Right Triangle 13">
             <a:extLst>
               <a:ext uri="{FF2B5EF4-FFF2-40B4-BE49-F238E27FC236}">
-                <a16:creationId xmlns:a16="http://schemas.microsoft.com/office/drawing/2014/main" id="{49740E78-E748-7744-B0EF-C287ABFE1252}"/>
+                <a16:creationId xmlns:a16="http://schemas.microsoft.com/office/drawing/2014/main" xmlns="" id="{49740E78-E748-7744-B0EF-C287ABFE1252}"/>
               </a:ext>
             </a:extLst>
           </p:cNvPr>
@@ -7817,7 +8216,7 @@
           <p:cNvPr id="15" name="Right Triangle 14">
             <a:extLst>
               <a:ext uri="{FF2B5EF4-FFF2-40B4-BE49-F238E27FC236}">
-                <a16:creationId xmlns:a16="http://schemas.microsoft.com/office/drawing/2014/main" id="{8FE36568-9112-AE40-949C-3BCE5D915CA3}"/>
+                <a16:creationId xmlns:a16="http://schemas.microsoft.com/office/drawing/2014/main" xmlns="" id="{8FE36568-9112-AE40-949C-3BCE5D915CA3}"/>
               </a:ext>
             </a:extLst>
           </p:cNvPr>

</xml_diff>

<commit_message>
Work on track fitting stuff, maybe adding new appendix on transport matrix properties.
</commit_message>
<xml_diff>
--- a/KinnairdThesis/Body/Figures/ThesisImages.pptx
+++ b/KinnairdThesis/Body/Figures/ThesisImages.pptx
@@ -5151,374 +5151,389 @@
           <a:chExt cx="0" cy="0"/>
         </a:xfrm>
       </p:grpSpPr>
-      <p:pic>
-        <p:nvPicPr>
-          <p:cNvPr id="4" name="Picture 3"/>
-          <p:cNvPicPr>
-            <a:picLocks noChangeAspect="1"/>
-          </p:cNvPicPr>
+      <p:grpSp>
+        <p:nvGrpSpPr>
+          <p:cNvPr id="19" name="Group 18"/>
+          <p:cNvGrpSpPr/>
           <p:nvPr/>
-        </p:nvPicPr>
-        <p:blipFill>
-          <a:blip r:embed="rId2">
-            <a:extLst>
-              <a:ext uri="{28A0092B-C50C-407E-A947-70E740481C1C}">
-                <a14:useLocalDpi xmlns:a14="http://schemas.microsoft.com/office/drawing/2010/main" val="0"/>
-              </a:ext>
-            </a:extLst>
-          </a:blip>
-          <a:stretch>
-            <a:fillRect/>
-          </a:stretch>
-        </p:blipFill>
-        <p:spPr>
+        </p:nvGrpSpPr>
+        <p:grpSpPr>
           <a:xfrm>
             <a:off x="3104873" y="1338470"/>
             <a:ext cx="6381321" cy="3714804"/>
+            <a:chOff x="3104873" y="1338470"/>
+            <a:chExt cx="6381321" cy="3714804"/>
           </a:xfrm>
-          <a:prstGeom prst="rect">
-            <a:avLst/>
-          </a:prstGeom>
-          <a:ln>
+        </p:grpSpPr>
+        <p:pic>
+          <p:nvPicPr>
+            <p:cNvPr id="4" name="Picture 3"/>
+            <p:cNvPicPr>
+              <a:picLocks noChangeAspect="1"/>
+            </p:cNvPicPr>
+            <p:nvPr/>
+          </p:nvPicPr>
+          <p:blipFill>
+            <a:blip r:embed="rId2">
+              <a:extLst>
+                <a:ext uri="{28A0092B-C50C-407E-A947-70E740481C1C}">
+                  <a14:useLocalDpi xmlns:a14="http://schemas.microsoft.com/office/drawing/2010/main" val="0"/>
+                </a:ext>
+              </a:extLst>
+            </a:blip>
+            <a:stretch>
+              <a:fillRect/>
+            </a:stretch>
+          </p:blipFill>
+          <p:spPr>
+            <a:xfrm>
+              <a:off x="3104873" y="1338470"/>
+              <a:ext cx="6381321" cy="3714804"/>
+            </a:xfrm>
+            <a:prstGeom prst="rect">
+              <a:avLst/>
+            </a:prstGeom>
+            <a:ln>
+              <a:noFill/>
+            </a:ln>
+          </p:spPr>
+        </p:pic>
+        <p:sp>
+          <p:nvSpPr>
+            <p:cNvPr id="5" name="Frame 4"/>
+            <p:cNvSpPr/>
+            <p:nvPr/>
+          </p:nvSpPr>
+          <p:spPr>
+            <a:xfrm rot="180000">
+              <a:off x="3449940" y="1785147"/>
+              <a:ext cx="5691184" cy="2507227"/>
+            </a:xfrm>
+            <a:prstGeom prst="frame">
+              <a:avLst>
+                <a:gd name="adj1" fmla="val 3420"/>
+              </a:avLst>
+            </a:prstGeom>
+            <a:solidFill>
+              <a:srgbClr val="FF0000"/>
+            </a:solidFill>
+            <a:ln>
+              <a:noFill/>
+            </a:ln>
+          </p:spPr>
+          <p:style>
+            <a:lnRef idx="2">
+              <a:schemeClr val="accent1">
+                <a:shade val="50000"/>
+              </a:schemeClr>
+            </a:lnRef>
+            <a:fillRef idx="1">
+              <a:schemeClr val="accent1"/>
+            </a:fillRef>
+            <a:effectRef idx="0">
+              <a:schemeClr val="accent1"/>
+            </a:effectRef>
+            <a:fontRef idx="minor">
+              <a:schemeClr val="lt1"/>
+            </a:fontRef>
+          </p:style>
+          <p:txBody>
+            <a:bodyPr rtlCol="0" anchor="ctr"/>
+            <a:lstStyle/>
+            <a:p>
+              <a:pPr algn="ctr"/>
+              <a:endParaRPr lang="en-US">
+                <a:solidFill>
+                  <a:schemeClr val="tx1"/>
+                </a:solidFill>
+              </a:endParaRPr>
+            </a:p>
+          </p:txBody>
+        </p:sp>
+        <p:cxnSp>
+          <p:nvCxnSpPr>
+            <p:cNvPr id="7" name="Straight Arrow Connector 6"/>
+            <p:cNvCxnSpPr/>
+            <p:nvPr/>
+          </p:nvCxnSpPr>
+          <p:spPr>
+            <a:xfrm rot="60000" flipV="1">
+              <a:off x="5388823" y="2072157"/>
+              <a:ext cx="31382" cy="898667"/>
+            </a:xfrm>
+            <a:prstGeom prst="straightConnector1">
+              <a:avLst/>
+            </a:prstGeom>
+            <a:ln w="57150">
+              <a:solidFill>
+                <a:srgbClr val="FFFF00"/>
+              </a:solidFill>
+              <a:tailEnd type="triangle"/>
+            </a:ln>
+          </p:spPr>
+          <p:style>
+            <a:lnRef idx="1">
+              <a:schemeClr val="accent1"/>
+            </a:lnRef>
+            <a:fillRef idx="0">
+              <a:schemeClr val="accent1"/>
+            </a:fillRef>
+            <a:effectRef idx="0">
+              <a:schemeClr val="accent1"/>
+            </a:effectRef>
+            <a:fontRef idx="minor">
+              <a:schemeClr val="tx1"/>
+            </a:fontRef>
+          </p:style>
+        </p:cxnSp>
+        <p:cxnSp>
+          <p:nvCxnSpPr>
+            <p:cNvPr id="9" name="Straight Arrow Connector 8"/>
+            <p:cNvCxnSpPr/>
+            <p:nvPr/>
+          </p:nvCxnSpPr>
+          <p:spPr>
+            <a:xfrm>
+              <a:off x="5345703" y="2947498"/>
+              <a:ext cx="2573309" cy="134861"/>
+            </a:xfrm>
+            <a:prstGeom prst="straightConnector1">
+              <a:avLst/>
+            </a:prstGeom>
+            <a:ln w="57150">
+              <a:solidFill>
+                <a:srgbClr val="FFFF00"/>
+              </a:solidFill>
+              <a:tailEnd type="triangle"/>
+            </a:ln>
+          </p:spPr>
+          <p:style>
+            <a:lnRef idx="1">
+              <a:schemeClr val="accent1"/>
+            </a:lnRef>
+            <a:fillRef idx="0">
+              <a:schemeClr val="accent1"/>
+            </a:fillRef>
+            <a:effectRef idx="0">
+              <a:schemeClr val="accent1"/>
+            </a:effectRef>
+            <a:fontRef idx="minor">
+              <a:schemeClr val="tx1"/>
+            </a:fontRef>
+          </p:style>
+        </p:cxnSp>
+        <p:sp>
+          <p:nvSpPr>
+            <p:cNvPr id="13" name="TextBox 12"/>
+            <p:cNvSpPr txBox="1"/>
+            <p:nvPr/>
+          </p:nvSpPr>
+          <p:spPr>
+            <a:xfrm>
+              <a:off x="7777801" y="2603342"/>
+              <a:ext cx="352982" cy="523220"/>
+            </a:xfrm>
+            <a:prstGeom prst="rect">
+              <a:avLst/>
+            </a:prstGeom>
             <a:noFill/>
-          </a:ln>
-        </p:spPr>
-      </p:pic>
-      <p:sp>
-        <p:nvSpPr>
-          <p:cNvPr id="5" name="Frame 4"/>
-          <p:cNvSpPr/>
-          <p:nvPr/>
-        </p:nvSpPr>
-        <p:spPr>
-          <a:xfrm rot="180000">
-            <a:off x="3449940" y="1785147"/>
-            <a:ext cx="5691184" cy="2507227"/>
-          </a:xfrm>
-          <a:prstGeom prst="frame">
-            <a:avLst>
-              <a:gd name="adj1" fmla="val 3420"/>
-            </a:avLst>
-          </a:prstGeom>
-          <a:solidFill>
-            <a:srgbClr val="FF0000"/>
-          </a:solidFill>
-          <a:ln>
+          </p:spPr>
+          <p:txBody>
+            <a:bodyPr wrap="none" rtlCol="0">
+              <a:spAutoFit/>
+            </a:bodyPr>
+            <a:lstStyle/>
+            <a:p>
+              <a:r>
+                <a:rPr lang="en-US" sz="2800" dirty="0">
+                  <a:solidFill>
+                    <a:srgbClr val="FFFF00"/>
+                  </a:solidFill>
+                </a:rPr>
+                <a:t>Z</a:t>
+              </a:r>
+            </a:p>
+          </p:txBody>
+        </p:sp>
+        <p:sp>
+          <p:nvSpPr>
+            <p:cNvPr id="14" name="TextBox 13"/>
+            <p:cNvSpPr txBox="1"/>
+            <p:nvPr/>
+          </p:nvSpPr>
+          <p:spPr>
+            <a:xfrm>
+              <a:off x="4992729" y="1759964"/>
+              <a:ext cx="370614" cy="523220"/>
+            </a:xfrm>
+            <a:prstGeom prst="rect">
+              <a:avLst/>
+            </a:prstGeom>
             <a:noFill/>
-          </a:ln>
-        </p:spPr>
-        <p:style>
-          <a:lnRef idx="2">
-            <a:schemeClr val="accent1">
-              <a:shade val="50000"/>
-            </a:schemeClr>
-          </a:lnRef>
-          <a:fillRef idx="1">
-            <a:schemeClr val="accent1"/>
-          </a:fillRef>
-          <a:effectRef idx="0">
-            <a:schemeClr val="accent1"/>
-          </a:effectRef>
-          <a:fontRef idx="minor">
-            <a:schemeClr val="lt1"/>
-          </a:fontRef>
-        </p:style>
-        <p:txBody>
-          <a:bodyPr rtlCol="0" anchor="ctr"/>
-          <a:lstStyle/>
-          <a:p>
-            <a:pPr algn="ctr"/>
-            <a:endParaRPr lang="en-US">
-              <a:solidFill>
-                <a:schemeClr val="tx1"/>
-              </a:solidFill>
-            </a:endParaRPr>
-          </a:p>
-        </p:txBody>
-      </p:sp>
-      <p:cxnSp>
-        <p:nvCxnSpPr>
-          <p:cNvPr id="7" name="Straight Arrow Connector 6"/>
-          <p:cNvCxnSpPr/>
-          <p:nvPr/>
-        </p:nvCxnSpPr>
-        <p:spPr>
-          <a:xfrm rot="60000" flipV="1">
-            <a:off x="5388823" y="2072157"/>
-            <a:ext cx="31382" cy="898667"/>
-          </a:xfrm>
-          <a:prstGeom prst="straightConnector1">
-            <a:avLst/>
-          </a:prstGeom>
-          <a:ln w="57150">
+          </p:spPr>
+          <p:txBody>
+            <a:bodyPr wrap="none" rtlCol="0">
+              <a:spAutoFit/>
+            </a:bodyPr>
+            <a:lstStyle/>
+            <a:p>
+              <a:r>
+                <a:rPr lang="en-US" sz="2800" dirty="0" smtClean="0">
+                  <a:solidFill>
+                    <a:srgbClr val="FFFF00"/>
+                  </a:solidFill>
+                </a:rPr>
+                <a:t>X</a:t>
+              </a:r>
+              <a:endParaRPr lang="en-US" sz="2800" dirty="0">
+                <a:solidFill>
+                  <a:srgbClr val="FFFF00"/>
+                </a:solidFill>
+              </a:endParaRPr>
+            </a:p>
+          </p:txBody>
+        </p:sp>
+        <p:sp>
+          <p:nvSpPr>
+            <p:cNvPr id="16" name="Oval 15"/>
+            <p:cNvSpPr/>
+            <p:nvPr/>
+          </p:nvSpPr>
+          <p:spPr>
+            <a:xfrm>
+              <a:off x="4845985" y="2851096"/>
+              <a:ext cx="203200" cy="203200"/>
+            </a:xfrm>
+            <a:prstGeom prst="ellipse">
+              <a:avLst/>
+            </a:prstGeom>
             <a:solidFill>
               <a:srgbClr val="FFFF00"/>
             </a:solidFill>
-            <a:tailEnd type="triangle"/>
-          </a:ln>
-        </p:spPr>
-        <p:style>
-          <a:lnRef idx="1">
-            <a:schemeClr val="accent1"/>
-          </a:lnRef>
-          <a:fillRef idx="0">
-            <a:schemeClr val="accent1"/>
-          </a:fillRef>
-          <a:effectRef idx="0">
-            <a:schemeClr val="accent1"/>
-          </a:effectRef>
-          <a:fontRef idx="minor">
-            <a:schemeClr val="tx1"/>
-          </a:fontRef>
-        </p:style>
-      </p:cxnSp>
-      <p:cxnSp>
-        <p:nvCxnSpPr>
-          <p:cNvPr id="9" name="Straight Arrow Connector 8"/>
-          <p:cNvCxnSpPr/>
-          <p:nvPr/>
-        </p:nvCxnSpPr>
-        <p:spPr>
-          <a:xfrm>
-            <a:off x="5345703" y="2947498"/>
-            <a:ext cx="2573309" cy="134861"/>
-          </a:xfrm>
-          <a:prstGeom prst="straightConnector1">
-            <a:avLst/>
-          </a:prstGeom>
-          <a:ln w="57150">
+            <a:ln>
+              <a:solidFill>
+                <a:srgbClr val="FFFF00"/>
+              </a:solidFill>
+            </a:ln>
+          </p:spPr>
+          <p:style>
+            <a:lnRef idx="2">
+              <a:schemeClr val="accent1">
+                <a:shade val="50000"/>
+              </a:schemeClr>
+            </a:lnRef>
+            <a:fillRef idx="1">
+              <a:schemeClr val="accent1"/>
+            </a:fillRef>
+            <a:effectRef idx="0">
+              <a:schemeClr val="accent1"/>
+            </a:effectRef>
+            <a:fontRef idx="minor">
+              <a:schemeClr val="lt1"/>
+            </a:fontRef>
+          </p:style>
+          <p:txBody>
+            <a:bodyPr rtlCol="0" anchor="ctr"/>
+            <a:lstStyle/>
+            <a:p>
+              <a:pPr algn="ctr"/>
+              <a:endParaRPr lang="en-US"/>
+            </a:p>
+          </p:txBody>
+        </p:sp>
+        <p:sp>
+          <p:nvSpPr>
+            <p:cNvPr id="17" name="Donut 16"/>
+            <p:cNvSpPr/>
+            <p:nvPr/>
+          </p:nvSpPr>
+          <p:spPr>
+            <a:xfrm>
+              <a:off x="4658671" y="2662104"/>
+              <a:ext cx="570788" cy="570788"/>
+            </a:xfrm>
+            <a:prstGeom prst="donut">
+              <a:avLst>
+                <a:gd name="adj" fmla="val 4592"/>
+              </a:avLst>
+            </a:prstGeom>
             <a:solidFill>
               <a:srgbClr val="FFFF00"/>
             </a:solidFill>
-            <a:tailEnd type="triangle"/>
-          </a:ln>
-        </p:spPr>
-        <p:style>
-          <a:lnRef idx="1">
-            <a:schemeClr val="accent1"/>
-          </a:lnRef>
-          <a:fillRef idx="0">
-            <a:schemeClr val="accent1"/>
-          </a:fillRef>
-          <a:effectRef idx="0">
-            <a:schemeClr val="accent1"/>
-          </a:effectRef>
-          <a:fontRef idx="minor">
-            <a:schemeClr val="tx1"/>
-          </a:fontRef>
-        </p:style>
-      </p:cxnSp>
-      <p:sp>
-        <p:nvSpPr>
-          <p:cNvPr id="13" name="TextBox 12"/>
-          <p:cNvSpPr txBox="1"/>
-          <p:nvPr/>
-        </p:nvSpPr>
-        <p:spPr>
-          <a:xfrm>
-            <a:off x="7777801" y="2603342"/>
-            <a:ext cx="352982" cy="523220"/>
-          </a:xfrm>
-          <a:prstGeom prst="rect">
-            <a:avLst/>
-          </a:prstGeom>
-          <a:noFill/>
-        </p:spPr>
-        <p:txBody>
-          <a:bodyPr wrap="none" rtlCol="0">
-            <a:spAutoFit/>
-          </a:bodyPr>
-          <a:lstStyle/>
-          <a:p>
-            <a:r>
-              <a:rPr lang="en-US" sz="2800" dirty="0">
+            <a:ln>
+              <a:solidFill>
+                <a:srgbClr val="FFFF00"/>
+              </a:solidFill>
+            </a:ln>
+          </p:spPr>
+          <p:style>
+            <a:lnRef idx="2">
+              <a:schemeClr val="accent1">
+                <a:shade val="50000"/>
+              </a:schemeClr>
+            </a:lnRef>
+            <a:fillRef idx="1">
+              <a:schemeClr val="accent1"/>
+            </a:fillRef>
+            <a:effectRef idx="0">
+              <a:schemeClr val="accent1"/>
+            </a:effectRef>
+            <a:fontRef idx="minor">
+              <a:schemeClr val="lt1"/>
+            </a:fontRef>
+          </p:style>
+          <p:txBody>
+            <a:bodyPr rtlCol="0" anchor="ctr"/>
+            <a:lstStyle/>
+            <a:p>
+              <a:pPr algn="ctr"/>
+              <a:endParaRPr lang="en-US">
+                <a:solidFill>
+                  <a:schemeClr val="tx1"/>
+                </a:solidFill>
+              </a:endParaRPr>
+            </a:p>
+          </p:txBody>
+        </p:sp>
+        <p:sp>
+          <p:nvSpPr>
+            <p:cNvPr id="18" name="TextBox 17"/>
+            <p:cNvSpPr txBox="1"/>
+            <p:nvPr/>
+          </p:nvSpPr>
+          <p:spPr>
+            <a:xfrm>
+              <a:off x="4361384" y="2486047"/>
+              <a:ext cx="370614" cy="523220"/>
+            </a:xfrm>
+            <a:prstGeom prst="rect">
+              <a:avLst/>
+            </a:prstGeom>
+            <a:noFill/>
+          </p:spPr>
+          <p:txBody>
+            <a:bodyPr wrap="none" rtlCol="0">
+              <a:spAutoFit/>
+            </a:bodyPr>
+            <a:lstStyle/>
+            <a:p>
+              <a:r>
+                <a:rPr lang="en-US" sz="2800" dirty="0" smtClean="0">
+                  <a:solidFill>
+                    <a:srgbClr val="FFFF00"/>
+                  </a:solidFill>
+                </a:rPr>
+                <a:t>Y</a:t>
+              </a:r>
+              <a:endParaRPr lang="en-US" sz="2800" dirty="0">
                 <a:solidFill>
                   <a:srgbClr val="FFFF00"/>
                 </a:solidFill>
-              </a:rPr>
-              <a:t>Z</a:t>
-            </a:r>
-          </a:p>
-        </p:txBody>
-      </p:sp>
-      <p:sp>
-        <p:nvSpPr>
-          <p:cNvPr id="14" name="TextBox 13"/>
-          <p:cNvSpPr txBox="1"/>
-          <p:nvPr/>
-        </p:nvSpPr>
-        <p:spPr>
-          <a:xfrm>
-            <a:off x="4992729" y="1759964"/>
-            <a:ext cx="370614" cy="523220"/>
-          </a:xfrm>
-          <a:prstGeom prst="rect">
-            <a:avLst/>
-          </a:prstGeom>
-          <a:noFill/>
-        </p:spPr>
-        <p:txBody>
-          <a:bodyPr wrap="none" rtlCol="0">
-            <a:spAutoFit/>
-          </a:bodyPr>
-          <a:lstStyle/>
-          <a:p>
-            <a:r>
-              <a:rPr lang="en-US" sz="2800" dirty="0" smtClean="0">
-                <a:solidFill>
-                  <a:srgbClr val="FFFF00"/>
-                </a:solidFill>
-              </a:rPr>
-              <a:t>X</a:t>
-            </a:r>
-            <a:endParaRPr lang="en-US" sz="2800" dirty="0">
-              <a:solidFill>
-                <a:srgbClr val="FFFF00"/>
-              </a:solidFill>
-            </a:endParaRPr>
-          </a:p>
-        </p:txBody>
-      </p:sp>
-      <p:sp>
-        <p:nvSpPr>
-          <p:cNvPr id="16" name="Oval 15"/>
-          <p:cNvSpPr/>
-          <p:nvPr/>
-        </p:nvSpPr>
-        <p:spPr>
-          <a:xfrm>
-            <a:off x="4845985" y="2851096"/>
-            <a:ext cx="203200" cy="203200"/>
-          </a:xfrm>
-          <a:prstGeom prst="ellipse">
-            <a:avLst/>
-          </a:prstGeom>
-          <a:solidFill>
-            <a:srgbClr val="FFFF00"/>
-          </a:solidFill>
-          <a:ln>
-            <a:solidFill>
-              <a:srgbClr val="FFFF00"/>
-            </a:solidFill>
-          </a:ln>
-        </p:spPr>
-        <p:style>
-          <a:lnRef idx="2">
-            <a:schemeClr val="accent1">
-              <a:shade val="50000"/>
-            </a:schemeClr>
-          </a:lnRef>
-          <a:fillRef idx="1">
-            <a:schemeClr val="accent1"/>
-          </a:fillRef>
-          <a:effectRef idx="0">
-            <a:schemeClr val="accent1"/>
-          </a:effectRef>
-          <a:fontRef idx="minor">
-            <a:schemeClr val="lt1"/>
-          </a:fontRef>
-        </p:style>
-        <p:txBody>
-          <a:bodyPr rtlCol="0" anchor="ctr"/>
-          <a:lstStyle/>
-          <a:p>
-            <a:pPr algn="ctr"/>
-            <a:endParaRPr lang="en-US"/>
-          </a:p>
-        </p:txBody>
-      </p:sp>
-      <p:sp>
-        <p:nvSpPr>
-          <p:cNvPr id="17" name="Donut 16"/>
-          <p:cNvSpPr/>
-          <p:nvPr/>
-        </p:nvSpPr>
-        <p:spPr>
-          <a:xfrm>
-            <a:off x="4658671" y="2662104"/>
-            <a:ext cx="570788" cy="570788"/>
-          </a:xfrm>
-          <a:prstGeom prst="donut">
-            <a:avLst>
-              <a:gd name="adj" fmla="val 4592"/>
-            </a:avLst>
-          </a:prstGeom>
-          <a:solidFill>
-            <a:srgbClr val="FFFF00"/>
-          </a:solidFill>
-          <a:ln>
-            <a:solidFill>
-              <a:srgbClr val="FFFF00"/>
-            </a:solidFill>
-          </a:ln>
-        </p:spPr>
-        <p:style>
-          <a:lnRef idx="2">
-            <a:schemeClr val="accent1">
-              <a:shade val="50000"/>
-            </a:schemeClr>
-          </a:lnRef>
-          <a:fillRef idx="1">
-            <a:schemeClr val="accent1"/>
-          </a:fillRef>
-          <a:effectRef idx="0">
-            <a:schemeClr val="accent1"/>
-          </a:effectRef>
-          <a:fontRef idx="minor">
-            <a:schemeClr val="lt1"/>
-          </a:fontRef>
-        </p:style>
-        <p:txBody>
-          <a:bodyPr rtlCol="0" anchor="ctr"/>
-          <a:lstStyle/>
-          <a:p>
-            <a:pPr algn="ctr"/>
-            <a:endParaRPr lang="en-US">
-              <a:solidFill>
-                <a:schemeClr val="tx1"/>
-              </a:solidFill>
-            </a:endParaRPr>
-          </a:p>
-        </p:txBody>
-      </p:sp>
-      <p:sp>
-        <p:nvSpPr>
-          <p:cNvPr id="18" name="TextBox 17"/>
-          <p:cNvSpPr txBox="1"/>
-          <p:nvPr/>
-        </p:nvSpPr>
-        <p:spPr>
-          <a:xfrm>
-            <a:off x="4361384" y="2486047"/>
-            <a:ext cx="370614" cy="523220"/>
-          </a:xfrm>
-          <a:prstGeom prst="rect">
-            <a:avLst/>
-          </a:prstGeom>
-          <a:noFill/>
-        </p:spPr>
-        <p:txBody>
-          <a:bodyPr wrap="none" rtlCol="0">
-            <a:spAutoFit/>
-          </a:bodyPr>
-          <a:lstStyle/>
-          <a:p>
-            <a:r>
-              <a:rPr lang="en-US" sz="2800" dirty="0" smtClean="0">
-                <a:solidFill>
-                  <a:srgbClr val="FFFF00"/>
-                </a:solidFill>
-              </a:rPr>
-              <a:t>Y</a:t>
-            </a:r>
-            <a:endParaRPr lang="en-US" sz="2800" dirty="0">
-              <a:solidFill>
-                <a:srgbClr val="FFFF00"/>
-              </a:solidFill>
-            </a:endParaRPr>
-          </a:p>
-        </p:txBody>
-      </p:sp>
+              </a:endParaRPr>
+            </a:p>
+          </p:txBody>
+        </p:sp>
+      </p:grpSp>
     </p:spTree>
     <p:extLst>
       <p:ext uri="{BB962C8B-B14F-4D97-AF65-F5344CB8AC3E}">

</xml_diff>

<commit_message>
Reviewed appendix and added free surface system picture.
</commit_message>
<xml_diff>
--- a/KinnairdThesis/Body/Figures/ThesisImages.pptx
+++ b/KinnairdThesis/Body/Figures/ThesisImages.pptx
@@ -15,6 +15,7 @@
     <p:sldId id="263" r:id="rId9"/>
     <p:sldId id="264" r:id="rId10"/>
     <p:sldId id="265" r:id="rId11"/>
+    <p:sldId id="266" r:id="rId12"/>
   </p:sldIdLst>
   <p:sldSz cx="12192000" cy="6858000"/>
   <p:notesSz cx="6858000" cy="9144000"/>
@@ -143,7 +144,7 @@
           <p:cNvPr id="2" name="Title 1">
             <a:extLst>
               <a:ext uri="{FF2B5EF4-FFF2-40B4-BE49-F238E27FC236}">
-                <a16:creationId xmlns:a16="http://schemas.microsoft.com/office/drawing/2014/main" xmlns="" id="{1B57B3C4-E435-3843-ADF5-0E6600617A31}"/>
+                <a16:creationId xmlns="" xmlns:a16="http://schemas.microsoft.com/office/drawing/2014/main" id="{1B57B3C4-E435-3843-ADF5-0E6600617A31}"/>
               </a:ext>
             </a:extLst>
           </p:cNvPr>
@@ -180,7 +181,7 @@
           <p:cNvPr id="3" name="Subtitle 2">
             <a:extLst>
               <a:ext uri="{FF2B5EF4-FFF2-40B4-BE49-F238E27FC236}">
-                <a16:creationId xmlns:a16="http://schemas.microsoft.com/office/drawing/2014/main" xmlns="" id="{B014CD73-195A-E146-85B8-CBD8E010BCF0}"/>
+                <a16:creationId xmlns="" xmlns:a16="http://schemas.microsoft.com/office/drawing/2014/main" id="{B014CD73-195A-E146-85B8-CBD8E010BCF0}"/>
               </a:ext>
             </a:extLst>
           </p:cNvPr>
@@ -250,7 +251,7 @@
           <p:cNvPr id="4" name="Date Placeholder 3">
             <a:extLst>
               <a:ext uri="{FF2B5EF4-FFF2-40B4-BE49-F238E27FC236}">
-                <a16:creationId xmlns:a16="http://schemas.microsoft.com/office/drawing/2014/main" xmlns="" id="{658C6929-9B51-6044-B476-05C2B4D39479}"/>
+                <a16:creationId xmlns="" xmlns:a16="http://schemas.microsoft.com/office/drawing/2014/main" id="{658C6929-9B51-6044-B476-05C2B4D39479}"/>
               </a:ext>
             </a:extLst>
           </p:cNvPr>
@@ -279,7 +280,7 @@
           <p:cNvPr id="5" name="Footer Placeholder 4">
             <a:extLst>
               <a:ext uri="{FF2B5EF4-FFF2-40B4-BE49-F238E27FC236}">
-                <a16:creationId xmlns:a16="http://schemas.microsoft.com/office/drawing/2014/main" xmlns="" id="{EC3DA1B3-BF32-604F-9AA7-7B04982FD0E2}"/>
+                <a16:creationId xmlns="" xmlns:a16="http://schemas.microsoft.com/office/drawing/2014/main" id="{EC3DA1B3-BF32-604F-9AA7-7B04982FD0E2}"/>
               </a:ext>
             </a:extLst>
           </p:cNvPr>
@@ -304,7 +305,7 @@
           <p:cNvPr id="6" name="Slide Number Placeholder 5">
             <a:extLst>
               <a:ext uri="{FF2B5EF4-FFF2-40B4-BE49-F238E27FC236}">
-                <a16:creationId xmlns:a16="http://schemas.microsoft.com/office/drawing/2014/main" xmlns="" id="{88F32B42-BB5D-BB48-8764-9F99727CEF04}"/>
+                <a16:creationId xmlns="" xmlns:a16="http://schemas.microsoft.com/office/drawing/2014/main" id="{88F32B42-BB5D-BB48-8764-9F99727CEF04}"/>
               </a:ext>
             </a:extLst>
           </p:cNvPr>
@@ -363,7 +364,7 @@
           <p:cNvPr id="2" name="Title 1">
             <a:extLst>
               <a:ext uri="{FF2B5EF4-FFF2-40B4-BE49-F238E27FC236}">
-                <a16:creationId xmlns:a16="http://schemas.microsoft.com/office/drawing/2014/main" xmlns="" id="{9BBDEE72-3661-8A4F-BB8D-9F356D4CF066}"/>
+                <a16:creationId xmlns="" xmlns:a16="http://schemas.microsoft.com/office/drawing/2014/main" id="{9BBDEE72-3661-8A4F-BB8D-9F356D4CF066}"/>
               </a:ext>
             </a:extLst>
           </p:cNvPr>
@@ -391,7 +392,7 @@
           <p:cNvPr id="3" name="Vertical Text Placeholder 2">
             <a:extLst>
               <a:ext uri="{FF2B5EF4-FFF2-40B4-BE49-F238E27FC236}">
-                <a16:creationId xmlns:a16="http://schemas.microsoft.com/office/drawing/2014/main" xmlns="" id="{E5116906-5D68-0447-AFCD-16E5B4C58A42}"/>
+                <a16:creationId xmlns="" xmlns:a16="http://schemas.microsoft.com/office/drawing/2014/main" id="{E5116906-5D68-0447-AFCD-16E5B4C58A42}"/>
               </a:ext>
             </a:extLst>
           </p:cNvPr>
@@ -448,7 +449,7 @@
           <p:cNvPr id="4" name="Date Placeholder 3">
             <a:extLst>
               <a:ext uri="{FF2B5EF4-FFF2-40B4-BE49-F238E27FC236}">
-                <a16:creationId xmlns:a16="http://schemas.microsoft.com/office/drawing/2014/main" xmlns="" id="{C6E4F998-D16E-004E-A0D2-E7FF3D7E4F68}"/>
+                <a16:creationId xmlns="" xmlns:a16="http://schemas.microsoft.com/office/drawing/2014/main" id="{C6E4F998-D16E-004E-A0D2-E7FF3D7E4F68}"/>
               </a:ext>
             </a:extLst>
           </p:cNvPr>
@@ -477,7 +478,7 @@
           <p:cNvPr id="5" name="Footer Placeholder 4">
             <a:extLst>
               <a:ext uri="{FF2B5EF4-FFF2-40B4-BE49-F238E27FC236}">
-                <a16:creationId xmlns:a16="http://schemas.microsoft.com/office/drawing/2014/main" xmlns="" id="{7089704E-D200-514A-B5B7-82DAA49671B8}"/>
+                <a16:creationId xmlns="" xmlns:a16="http://schemas.microsoft.com/office/drawing/2014/main" id="{7089704E-D200-514A-B5B7-82DAA49671B8}"/>
               </a:ext>
             </a:extLst>
           </p:cNvPr>
@@ -502,7 +503,7 @@
           <p:cNvPr id="6" name="Slide Number Placeholder 5">
             <a:extLst>
               <a:ext uri="{FF2B5EF4-FFF2-40B4-BE49-F238E27FC236}">
-                <a16:creationId xmlns:a16="http://schemas.microsoft.com/office/drawing/2014/main" xmlns="" id="{0C72463F-D09A-A346-A1F4-2911755D017A}"/>
+                <a16:creationId xmlns="" xmlns:a16="http://schemas.microsoft.com/office/drawing/2014/main" id="{0C72463F-D09A-A346-A1F4-2911755D017A}"/>
               </a:ext>
             </a:extLst>
           </p:cNvPr>
@@ -561,7 +562,7 @@
           <p:cNvPr id="2" name="Vertical Title 1">
             <a:extLst>
               <a:ext uri="{FF2B5EF4-FFF2-40B4-BE49-F238E27FC236}">
-                <a16:creationId xmlns:a16="http://schemas.microsoft.com/office/drawing/2014/main" xmlns="" id="{AB5946E9-397D-C049-A068-F804360E4392}"/>
+                <a16:creationId xmlns="" xmlns:a16="http://schemas.microsoft.com/office/drawing/2014/main" id="{AB5946E9-397D-C049-A068-F804360E4392}"/>
               </a:ext>
             </a:extLst>
           </p:cNvPr>
@@ -594,7 +595,7 @@
           <p:cNvPr id="3" name="Vertical Text Placeholder 2">
             <a:extLst>
               <a:ext uri="{FF2B5EF4-FFF2-40B4-BE49-F238E27FC236}">
-                <a16:creationId xmlns:a16="http://schemas.microsoft.com/office/drawing/2014/main" xmlns="" id="{89793A4A-3706-F84B-8A06-D16899A78EAB}"/>
+                <a16:creationId xmlns="" xmlns:a16="http://schemas.microsoft.com/office/drawing/2014/main" id="{89793A4A-3706-F84B-8A06-D16899A78EAB}"/>
               </a:ext>
             </a:extLst>
           </p:cNvPr>
@@ -656,7 +657,7 @@
           <p:cNvPr id="4" name="Date Placeholder 3">
             <a:extLst>
               <a:ext uri="{FF2B5EF4-FFF2-40B4-BE49-F238E27FC236}">
-                <a16:creationId xmlns:a16="http://schemas.microsoft.com/office/drawing/2014/main" xmlns="" id="{C25651AD-1FC0-704D-A779-A6A4A66E029E}"/>
+                <a16:creationId xmlns="" xmlns:a16="http://schemas.microsoft.com/office/drawing/2014/main" id="{C25651AD-1FC0-704D-A779-A6A4A66E029E}"/>
               </a:ext>
             </a:extLst>
           </p:cNvPr>
@@ -685,7 +686,7 @@
           <p:cNvPr id="5" name="Footer Placeholder 4">
             <a:extLst>
               <a:ext uri="{FF2B5EF4-FFF2-40B4-BE49-F238E27FC236}">
-                <a16:creationId xmlns:a16="http://schemas.microsoft.com/office/drawing/2014/main" xmlns="" id="{8126BAD6-4443-004B-BAA1-FE8E085C9F8F}"/>
+                <a16:creationId xmlns="" xmlns:a16="http://schemas.microsoft.com/office/drawing/2014/main" id="{8126BAD6-4443-004B-BAA1-FE8E085C9F8F}"/>
               </a:ext>
             </a:extLst>
           </p:cNvPr>
@@ -710,7 +711,7 @@
           <p:cNvPr id="6" name="Slide Number Placeholder 5">
             <a:extLst>
               <a:ext uri="{FF2B5EF4-FFF2-40B4-BE49-F238E27FC236}">
-                <a16:creationId xmlns:a16="http://schemas.microsoft.com/office/drawing/2014/main" xmlns="" id="{14ED176A-F057-8D41-B00B-B444EA48310F}"/>
+                <a16:creationId xmlns="" xmlns:a16="http://schemas.microsoft.com/office/drawing/2014/main" id="{14ED176A-F057-8D41-B00B-B444EA48310F}"/>
               </a:ext>
             </a:extLst>
           </p:cNvPr>
@@ -769,7 +770,7 @@
           <p:cNvPr id="2" name="Title 1">
             <a:extLst>
               <a:ext uri="{FF2B5EF4-FFF2-40B4-BE49-F238E27FC236}">
-                <a16:creationId xmlns:a16="http://schemas.microsoft.com/office/drawing/2014/main" xmlns="" id="{A7D2B129-1333-1F47-BC4B-33786578E7FC}"/>
+                <a16:creationId xmlns="" xmlns:a16="http://schemas.microsoft.com/office/drawing/2014/main" id="{A7D2B129-1333-1F47-BC4B-33786578E7FC}"/>
               </a:ext>
             </a:extLst>
           </p:cNvPr>
@@ -797,7 +798,7 @@
           <p:cNvPr id="3" name="Content Placeholder 2">
             <a:extLst>
               <a:ext uri="{FF2B5EF4-FFF2-40B4-BE49-F238E27FC236}">
-                <a16:creationId xmlns:a16="http://schemas.microsoft.com/office/drawing/2014/main" xmlns="" id="{9ECDE62D-58E9-6849-98E2-AAA0CCAADDA0}"/>
+                <a16:creationId xmlns="" xmlns:a16="http://schemas.microsoft.com/office/drawing/2014/main" id="{9ECDE62D-58E9-6849-98E2-AAA0CCAADDA0}"/>
               </a:ext>
             </a:extLst>
           </p:cNvPr>
@@ -854,7 +855,7 @@
           <p:cNvPr id="4" name="Date Placeholder 3">
             <a:extLst>
               <a:ext uri="{FF2B5EF4-FFF2-40B4-BE49-F238E27FC236}">
-                <a16:creationId xmlns:a16="http://schemas.microsoft.com/office/drawing/2014/main" xmlns="" id="{EFEA11BF-2A45-4444-AEED-3C1B0AFA193B}"/>
+                <a16:creationId xmlns="" xmlns:a16="http://schemas.microsoft.com/office/drawing/2014/main" id="{EFEA11BF-2A45-4444-AEED-3C1B0AFA193B}"/>
               </a:ext>
             </a:extLst>
           </p:cNvPr>
@@ -883,7 +884,7 @@
           <p:cNvPr id="5" name="Footer Placeholder 4">
             <a:extLst>
               <a:ext uri="{FF2B5EF4-FFF2-40B4-BE49-F238E27FC236}">
-                <a16:creationId xmlns:a16="http://schemas.microsoft.com/office/drawing/2014/main" xmlns="" id="{009B56B8-8A13-414C-BD29-0782690DB1B9}"/>
+                <a16:creationId xmlns="" xmlns:a16="http://schemas.microsoft.com/office/drawing/2014/main" id="{009B56B8-8A13-414C-BD29-0782690DB1B9}"/>
               </a:ext>
             </a:extLst>
           </p:cNvPr>
@@ -908,7 +909,7 @@
           <p:cNvPr id="6" name="Slide Number Placeholder 5">
             <a:extLst>
               <a:ext uri="{FF2B5EF4-FFF2-40B4-BE49-F238E27FC236}">
-                <a16:creationId xmlns:a16="http://schemas.microsoft.com/office/drawing/2014/main" xmlns="" id="{C4272DC2-C101-6D47-BF16-05E39FF23B46}"/>
+                <a16:creationId xmlns="" xmlns:a16="http://schemas.microsoft.com/office/drawing/2014/main" id="{C4272DC2-C101-6D47-BF16-05E39FF23B46}"/>
               </a:ext>
             </a:extLst>
           </p:cNvPr>
@@ -967,7 +968,7 @@
           <p:cNvPr id="2" name="Title 1">
             <a:extLst>
               <a:ext uri="{FF2B5EF4-FFF2-40B4-BE49-F238E27FC236}">
-                <a16:creationId xmlns:a16="http://schemas.microsoft.com/office/drawing/2014/main" xmlns="" id="{BAC22880-4B93-754D-9213-68DE4C171F7F}"/>
+                <a16:creationId xmlns="" xmlns:a16="http://schemas.microsoft.com/office/drawing/2014/main" id="{BAC22880-4B93-754D-9213-68DE4C171F7F}"/>
               </a:ext>
             </a:extLst>
           </p:cNvPr>
@@ -1004,7 +1005,7 @@
           <p:cNvPr id="3" name="Text Placeholder 2">
             <a:extLst>
               <a:ext uri="{FF2B5EF4-FFF2-40B4-BE49-F238E27FC236}">
-                <a16:creationId xmlns:a16="http://schemas.microsoft.com/office/drawing/2014/main" xmlns="" id="{6B11070C-81F8-0A4F-A81D-8C3C228925A3}"/>
+                <a16:creationId xmlns="" xmlns:a16="http://schemas.microsoft.com/office/drawing/2014/main" id="{6B11070C-81F8-0A4F-A81D-8C3C228925A3}"/>
               </a:ext>
             </a:extLst>
           </p:cNvPr>
@@ -1129,7 +1130,7 @@
           <p:cNvPr id="4" name="Date Placeholder 3">
             <a:extLst>
               <a:ext uri="{FF2B5EF4-FFF2-40B4-BE49-F238E27FC236}">
-                <a16:creationId xmlns:a16="http://schemas.microsoft.com/office/drawing/2014/main" xmlns="" id="{23C53577-1831-364C-B339-4121968BB6DA}"/>
+                <a16:creationId xmlns="" xmlns:a16="http://schemas.microsoft.com/office/drawing/2014/main" id="{23C53577-1831-364C-B339-4121968BB6DA}"/>
               </a:ext>
             </a:extLst>
           </p:cNvPr>
@@ -1158,7 +1159,7 @@
           <p:cNvPr id="5" name="Footer Placeholder 4">
             <a:extLst>
               <a:ext uri="{FF2B5EF4-FFF2-40B4-BE49-F238E27FC236}">
-                <a16:creationId xmlns:a16="http://schemas.microsoft.com/office/drawing/2014/main" xmlns="" id="{9F9CBA5D-DA04-1849-97A2-5E156B619E76}"/>
+                <a16:creationId xmlns="" xmlns:a16="http://schemas.microsoft.com/office/drawing/2014/main" id="{9F9CBA5D-DA04-1849-97A2-5E156B619E76}"/>
               </a:ext>
             </a:extLst>
           </p:cNvPr>
@@ -1183,7 +1184,7 @@
           <p:cNvPr id="6" name="Slide Number Placeholder 5">
             <a:extLst>
               <a:ext uri="{FF2B5EF4-FFF2-40B4-BE49-F238E27FC236}">
-                <a16:creationId xmlns:a16="http://schemas.microsoft.com/office/drawing/2014/main" xmlns="" id="{CF1125EA-E670-6D43-9539-E2289A017005}"/>
+                <a16:creationId xmlns="" xmlns:a16="http://schemas.microsoft.com/office/drawing/2014/main" id="{CF1125EA-E670-6D43-9539-E2289A017005}"/>
               </a:ext>
             </a:extLst>
           </p:cNvPr>
@@ -1242,7 +1243,7 @@
           <p:cNvPr id="2" name="Title 1">
             <a:extLst>
               <a:ext uri="{FF2B5EF4-FFF2-40B4-BE49-F238E27FC236}">
-                <a16:creationId xmlns:a16="http://schemas.microsoft.com/office/drawing/2014/main" xmlns="" id="{262AD6D9-F928-4748-9C7F-D4545C80CAA4}"/>
+                <a16:creationId xmlns="" xmlns:a16="http://schemas.microsoft.com/office/drawing/2014/main" id="{262AD6D9-F928-4748-9C7F-D4545C80CAA4}"/>
               </a:ext>
             </a:extLst>
           </p:cNvPr>
@@ -1270,7 +1271,7 @@
           <p:cNvPr id="3" name="Content Placeholder 2">
             <a:extLst>
               <a:ext uri="{FF2B5EF4-FFF2-40B4-BE49-F238E27FC236}">
-                <a16:creationId xmlns:a16="http://schemas.microsoft.com/office/drawing/2014/main" xmlns="" id="{51D797BF-990E-9A4C-82AC-12AD06F3C184}"/>
+                <a16:creationId xmlns="" xmlns:a16="http://schemas.microsoft.com/office/drawing/2014/main" id="{51D797BF-990E-9A4C-82AC-12AD06F3C184}"/>
               </a:ext>
             </a:extLst>
           </p:cNvPr>
@@ -1332,7 +1333,7 @@
           <p:cNvPr id="4" name="Content Placeholder 3">
             <a:extLst>
               <a:ext uri="{FF2B5EF4-FFF2-40B4-BE49-F238E27FC236}">
-                <a16:creationId xmlns:a16="http://schemas.microsoft.com/office/drawing/2014/main" xmlns="" id="{3DC4D9D4-E298-6D41-ACED-A11435ED9D77}"/>
+                <a16:creationId xmlns="" xmlns:a16="http://schemas.microsoft.com/office/drawing/2014/main" id="{3DC4D9D4-E298-6D41-ACED-A11435ED9D77}"/>
               </a:ext>
             </a:extLst>
           </p:cNvPr>
@@ -1394,7 +1395,7 @@
           <p:cNvPr id="5" name="Date Placeholder 4">
             <a:extLst>
               <a:ext uri="{FF2B5EF4-FFF2-40B4-BE49-F238E27FC236}">
-                <a16:creationId xmlns:a16="http://schemas.microsoft.com/office/drawing/2014/main" xmlns="" id="{E17C102D-9E12-A244-9FD1-B8C9B6279B35}"/>
+                <a16:creationId xmlns="" xmlns:a16="http://schemas.microsoft.com/office/drawing/2014/main" id="{E17C102D-9E12-A244-9FD1-B8C9B6279B35}"/>
               </a:ext>
             </a:extLst>
           </p:cNvPr>
@@ -1423,7 +1424,7 @@
           <p:cNvPr id="6" name="Footer Placeholder 5">
             <a:extLst>
               <a:ext uri="{FF2B5EF4-FFF2-40B4-BE49-F238E27FC236}">
-                <a16:creationId xmlns:a16="http://schemas.microsoft.com/office/drawing/2014/main" xmlns="" id="{0AFE2BCB-F3E8-8549-B6D4-F6040A561AFB}"/>
+                <a16:creationId xmlns="" xmlns:a16="http://schemas.microsoft.com/office/drawing/2014/main" id="{0AFE2BCB-F3E8-8549-B6D4-F6040A561AFB}"/>
               </a:ext>
             </a:extLst>
           </p:cNvPr>
@@ -1448,7 +1449,7 @@
           <p:cNvPr id="7" name="Slide Number Placeholder 6">
             <a:extLst>
               <a:ext uri="{FF2B5EF4-FFF2-40B4-BE49-F238E27FC236}">
-                <a16:creationId xmlns:a16="http://schemas.microsoft.com/office/drawing/2014/main" xmlns="" id="{C39549C6-C80B-BD44-8EF9-A19E907A7CFE}"/>
+                <a16:creationId xmlns="" xmlns:a16="http://schemas.microsoft.com/office/drawing/2014/main" id="{C39549C6-C80B-BD44-8EF9-A19E907A7CFE}"/>
               </a:ext>
             </a:extLst>
           </p:cNvPr>
@@ -1507,7 +1508,7 @@
           <p:cNvPr id="2" name="Title 1">
             <a:extLst>
               <a:ext uri="{FF2B5EF4-FFF2-40B4-BE49-F238E27FC236}">
-                <a16:creationId xmlns:a16="http://schemas.microsoft.com/office/drawing/2014/main" xmlns="" id="{FCEA8641-4386-D644-912C-5AF5E240C2CB}"/>
+                <a16:creationId xmlns="" xmlns:a16="http://schemas.microsoft.com/office/drawing/2014/main" id="{FCEA8641-4386-D644-912C-5AF5E240C2CB}"/>
               </a:ext>
             </a:extLst>
           </p:cNvPr>
@@ -1540,7 +1541,7 @@
           <p:cNvPr id="3" name="Text Placeholder 2">
             <a:extLst>
               <a:ext uri="{FF2B5EF4-FFF2-40B4-BE49-F238E27FC236}">
-                <a16:creationId xmlns:a16="http://schemas.microsoft.com/office/drawing/2014/main" xmlns="" id="{0003CA97-F6C8-4A4C-9811-B27526619B85}"/>
+                <a16:creationId xmlns="" xmlns:a16="http://schemas.microsoft.com/office/drawing/2014/main" id="{0003CA97-F6C8-4A4C-9811-B27526619B85}"/>
               </a:ext>
             </a:extLst>
           </p:cNvPr>
@@ -1611,7 +1612,7 @@
           <p:cNvPr id="4" name="Content Placeholder 3">
             <a:extLst>
               <a:ext uri="{FF2B5EF4-FFF2-40B4-BE49-F238E27FC236}">
-                <a16:creationId xmlns:a16="http://schemas.microsoft.com/office/drawing/2014/main" xmlns="" id="{C428443A-4B63-D44B-992D-A5333C63135A}"/>
+                <a16:creationId xmlns="" xmlns:a16="http://schemas.microsoft.com/office/drawing/2014/main" id="{C428443A-4B63-D44B-992D-A5333C63135A}"/>
               </a:ext>
             </a:extLst>
           </p:cNvPr>
@@ -1673,7 +1674,7 @@
           <p:cNvPr id="5" name="Text Placeholder 4">
             <a:extLst>
               <a:ext uri="{FF2B5EF4-FFF2-40B4-BE49-F238E27FC236}">
-                <a16:creationId xmlns:a16="http://schemas.microsoft.com/office/drawing/2014/main" xmlns="" id="{AB6EDAA3-A02E-E244-A6F8-31DA5C48F793}"/>
+                <a16:creationId xmlns="" xmlns:a16="http://schemas.microsoft.com/office/drawing/2014/main" id="{AB6EDAA3-A02E-E244-A6F8-31DA5C48F793}"/>
               </a:ext>
             </a:extLst>
           </p:cNvPr>
@@ -1744,7 +1745,7 @@
           <p:cNvPr id="6" name="Content Placeholder 5">
             <a:extLst>
               <a:ext uri="{FF2B5EF4-FFF2-40B4-BE49-F238E27FC236}">
-                <a16:creationId xmlns:a16="http://schemas.microsoft.com/office/drawing/2014/main" xmlns="" id="{A625C399-2052-374A-9A63-FF2581D9CF40}"/>
+                <a16:creationId xmlns="" xmlns:a16="http://schemas.microsoft.com/office/drawing/2014/main" id="{A625C399-2052-374A-9A63-FF2581D9CF40}"/>
               </a:ext>
             </a:extLst>
           </p:cNvPr>
@@ -1806,7 +1807,7 @@
           <p:cNvPr id="7" name="Date Placeholder 6">
             <a:extLst>
               <a:ext uri="{FF2B5EF4-FFF2-40B4-BE49-F238E27FC236}">
-                <a16:creationId xmlns:a16="http://schemas.microsoft.com/office/drawing/2014/main" xmlns="" id="{1A599785-4F03-0646-859D-A5B1A395854F}"/>
+                <a16:creationId xmlns="" xmlns:a16="http://schemas.microsoft.com/office/drawing/2014/main" id="{1A599785-4F03-0646-859D-A5B1A395854F}"/>
               </a:ext>
             </a:extLst>
           </p:cNvPr>
@@ -1835,7 +1836,7 @@
           <p:cNvPr id="8" name="Footer Placeholder 7">
             <a:extLst>
               <a:ext uri="{FF2B5EF4-FFF2-40B4-BE49-F238E27FC236}">
-                <a16:creationId xmlns:a16="http://schemas.microsoft.com/office/drawing/2014/main" xmlns="" id="{6AE386FC-4B01-3D4A-B5E6-A4445E725378}"/>
+                <a16:creationId xmlns="" xmlns:a16="http://schemas.microsoft.com/office/drawing/2014/main" id="{6AE386FC-4B01-3D4A-B5E6-A4445E725378}"/>
               </a:ext>
             </a:extLst>
           </p:cNvPr>
@@ -1860,7 +1861,7 @@
           <p:cNvPr id="9" name="Slide Number Placeholder 8">
             <a:extLst>
               <a:ext uri="{FF2B5EF4-FFF2-40B4-BE49-F238E27FC236}">
-                <a16:creationId xmlns:a16="http://schemas.microsoft.com/office/drawing/2014/main" xmlns="" id="{39F0E8DD-4FFE-6540-8032-73316B86EFDA}"/>
+                <a16:creationId xmlns="" xmlns:a16="http://schemas.microsoft.com/office/drawing/2014/main" id="{39F0E8DD-4FFE-6540-8032-73316B86EFDA}"/>
               </a:ext>
             </a:extLst>
           </p:cNvPr>
@@ -1919,7 +1920,7 @@
           <p:cNvPr id="2" name="Title 1">
             <a:extLst>
               <a:ext uri="{FF2B5EF4-FFF2-40B4-BE49-F238E27FC236}">
-                <a16:creationId xmlns:a16="http://schemas.microsoft.com/office/drawing/2014/main" xmlns="" id="{3F5899AE-DFEB-5545-9F33-6F738A85210C}"/>
+                <a16:creationId xmlns="" xmlns:a16="http://schemas.microsoft.com/office/drawing/2014/main" id="{3F5899AE-DFEB-5545-9F33-6F738A85210C}"/>
               </a:ext>
             </a:extLst>
           </p:cNvPr>
@@ -1947,7 +1948,7 @@
           <p:cNvPr id="3" name="Date Placeholder 2">
             <a:extLst>
               <a:ext uri="{FF2B5EF4-FFF2-40B4-BE49-F238E27FC236}">
-                <a16:creationId xmlns:a16="http://schemas.microsoft.com/office/drawing/2014/main" xmlns="" id="{D2BBC704-A814-5E4D-A194-EEDA752CFFB8}"/>
+                <a16:creationId xmlns="" xmlns:a16="http://schemas.microsoft.com/office/drawing/2014/main" id="{D2BBC704-A814-5E4D-A194-EEDA752CFFB8}"/>
               </a:ext>
             </a:extLst>
           </p:cNvPr>
@@ -1976,7 +1977,7 @@
           <p:cNvPr id="4" name="Footer Placeholder 3">
             <a:extLst>
               <a:ext uri="{FF2B5EF4-FFF2-40B4-BE49-F238E27FC236}">
-                <a16:creationId xmlns:a16="http://schemas.microsoft.com/office/drawing/2014/main" xmlns="" id="{5A0140CA-3C42-9F41-BAF5-D4C41D47C7CA}"/>
+                <a16:creationId xmlns="" xmlns:a16="http://schemas.microsoft.com/office/drawing/2014/main" id="{5A0140CA-3C42-9F41-BAF5-D4C41D47C7CA}"/>
               </a:ext>
             </a:extLst>
           </p:cNvPr>
@@ -2001,7 +2002,7 @@
           <p:cNvPr id="5" name="Slide Number Placeholder 4">
             <a:extLst>
               <a:ext uri="{FF2B5EF4-FFF2-40B4-BE49-F238E27FC236}">
-                <a16:creationId xmlns:a16="http://schemas.microsoft.com/office/drawing/2014/main" xmlns="" id="{37086D94-F459-FE40-9093-8A1D3E43A3A9}"/>
+                <a16:creationId xmlns="" xmlns:a16="http://schemas.microsoft.com/office/drawing/2014/main" id="{37086D94-F459-FE40-9093-8A1D3E43A3A9}"/>
               </a:ext>
             </a:extLst>
           </p:cNvPr>
@@ -2060,7 +2061,7 @@
           <p:cNvPr id="2" name="Date Placeholder 1">
             <a:extLst>
               <a:ext uri="{FF2B5EF4-FFF2-40B4-BE49-F238E27FC236}">
-                <a16:creationId xmlns:a16="http://schemas.microsoft.com/office/drawing/2014/main" xmlns="" id="{07A9ACC7-829A-7F4D-8420-A762D036E8CD}"/>
+                <a16:creationId xmlns="" xmlns:a16="http://schemas.microsoft.com/office/drawing/2014/main" id="{07A9ACC7-829A-7F4D-8420-A762D036E8CD}"/>
               </a:ext>
             </a:extLst>
           </p:cNvPr>
@@ -2089,7 +2090,7 @@
           <p:cNvPr id="3" name="Footer Placeholder 2">
             <a:extLst>
               <a:ext uri="{FF2B5EF4-FFF2-40B4-BE49-F238E27FC236}">
-                <a16:creationId xmlns:a16="http://schemas.microsoft.com/office/drawing/2014/main" xmlns="" id="{8FBBF79B-F213-0A4F-B7FB-1DCDEC5761BE}"/>
+                <a16:creationId xmlns="" xmlns:a16="http://schemas.microsoft.com/office/drawing/2014/main" id="{8FBBF79B-F213-0A4F-B7FB-1DCDEC5761BE}"/>
               </a:ext>
             </a:extLst>
           </p:cNvPr>
@@ -2114,7 +2115,7 @@
           <p:cNvPr id="4" name="Slide Number Placeholder 3">
             <a:extLst>
               <a:ext uri="{FF2B5EF4-FFF2-40B4-BE49-F238E27FC236}">
-                <a16:creationId xmlns:a16="http://schemas.microsoft.com/office/drawing/2014/main" xmlns="" id="{B052EC9E-99E7-9841-A360-BDDEE513FB5E}"/>
+                <a16:creationId xmlns="" xmlns:a16="http://schemas.microsoft.com/office/drawing/2014/main" id="{B052EC9E-99E7-9841-A360-BDDEE513FB5E}"/>
               </a:ext>
             </a:extLst>
           </p:cNvPr>
@@ -2173,7 +2174,7 @@
           <p:cNvPr id="2" name="Title 1">
             <a:extLst>
               <a:ext uri="{FF2B5EF4-FFF2-40B4-BE49-F238E27FC236}">
-                <a16:creationId xmlns:a16="http://schemas.microsoft.com/office/drawing/2014/main" xmlns="" id="{070A10A2-F9B0-F344-8BC8-7A00229D2949}"/>
+                <a16:creationId xmlns="" xmlns:a16="http://schemas.microsoft.com/office/drawing/2014/main" id="{070A10A2-F9B0-F344-8BC8-7A00229D2949}"/>
               </a:ext>
             </a:extLst>
           </p:cNvPr>
@@ -2210,7 +2211,7 @@
           <p:cNvPr id="3" name="Content Placeholder 2">
             <a:extLst>
               <a:ext uri="{FF2B5EF4-FFF2-40B4-BE49-F238E27FC236}">
-                <a16:creationId xmlns:a16="http://schemas.microsoft.com/office/drawing/2014/main" xmlns="" id="{61A868DF-34E6-1848-983C-F5D0F4A4A893}"/>
+                <a16:creationId xmlns="" xmlns:a16="http://schemas.microsoft.com/office/drawing/2014/main" id="{61A868DF-34E6-1848-983C-F5D0F4A4A893}"/>
               </a:ext>
             </a:extLst>
           </p:cNvPr>
@@ -2300,7 +2301,7 @@
           <p:cNvPr id="4" name="Text Placeholder 3">
             <a:extLst>
               <a:ext uri="{FF2B5EF4-FFF2-40B4-BE49-F238E27FC236}">
-                <a16:creationId xmlns:a16="http://schemas.microsoft.com/office/drawing/2014/main" xmlns="" id="{376E3DE5-437D-434F-8910-AA8A3F1F1273}"/>
+                <a16:creationId xmlns="" xmlns:a16="http://schemas.microsoft.com/office/drawing/2014/main" id="{376E3DE5-437D-434F-8910-AA8A3F1F1273}"/>
               </a:ext>
             </a:extLst>
           </p:cNvPr>
@@ -2371,7 +2372,7 @@
           <p:cNvPr id="5" name="Date Placeholder 4">
             <a:extLst>
               <a:ext uri="{FF2B5EF4-FFF2-40B4-BE49-F238E27FC236}">
-                <a16:creationId xmlns:a16="http://schemas.microsoft.com/office/drawing/2014/main" xmlns="" id="{2F5DF4B7-6C2B-2B48-A238-F01177207469}"/>
+                <a16:creationId xmlns="" xmlns:a16="http://schemas.microsoft.com/office/drawing/2014/main" id="{2F5DF4B7-6C2B-2B48-A238-F01177207469}"/>
               </a:ext>
             </a:extLst>
           </p:cNvPr>
@@ -2400,7 +2401,7 @@
           <p:cNvPr id="6" name="Footer Placeholder 5">
             <a:extLst>
               <a:ext uri="{FF2B5EF4-FFF2-40B4-BE49-F238E27FC236}">
-                <a16:creationId xmlns:a16="http://schemas.microsoft.com/office/drawing/2014/main" xmlns="" id="{A6EF2281-1ABA-7342-8F35-F0F2D64611D1}"/>
+                <a16:creationId xmlns="" xmlns:a16="http://schemas.microsoft.com/office/drawing/2014/main" id="{A6EF2281-1ABA-7342-8F35-F0F2D64611D1}"/>
               </a:ext>
             </a:extLst>
           </p:cNvPr>
@@ -2425,7 +2426,7 @@
           <p:cNvPr id="7" name="Slide Number Placeholder 6">
             <a:extLst>
               <a:ext uri="{FF2B5EF4-FFF2-40B4-BE49-F238E27FC236}">
-                <a16:creationId xmlns:a16="http://schemas.microsoft.com/office/drawing/2014/main" xmlns="" id="{56AACA73-B098-A443-86E5-3593BAFE81EC}"/>
+                <a16:creationId xmlns="" xmlns:a16="http://schemas.microsoft.com/office/drawing/2014/main" id="{56AACA73-B098-A443-86E5-3593BAFE81EC}"/>
               </a:ext>
             </a:extLst>
           </p:cNvPr>
@@ -2484,7 +2485,7 @@
           <p:cNvPr id="2" name="Title 1">
             <a:extLst>
               <a:ext uri="{FF2B5EF4-FFF2-40B4-BE49-F238E27FC236}">
-                <a16:creationId xmlns:a16="http://schemas.microsoft.com/office/drawing/2014/main" xmlns="" id="{FACBEB41-F32F-6449-BD04-263892C29998}"/>
+                <a16:creationId xmlns="" xmlns:a16="http://schemas.microsoft.com/office/drawing/2014/main" id="{FACBEB41-F32F-6449-BD04-263892C29998}"/>
               </a:ext>
             </a:extLst>
           </p:cNvPr>
@@ -2521,7 +2522,7 @@
           <p:cNvPr id="3" name="Picture Placeholder 2">
             <a:extLst>
               <a:ext uri="{FF2B5EF4-FFF2-40B4-BE49-F238E27FC236}">
-                <a16:creationId xmlns:a16="http://schemas.microsoft.com/office/drawing/2014/main" xmlns="" id="{0AD7B342-A149-9E4F-B5C0-EBE269660B70}"/>
+                <a16:creationId xmlns="" xmlns:a16="http://schemas.microsoft.com/office/drawing/2014/main" id="{0AD7B342-A149-9E4F-B5C0-EBE269660B70}"/>
               </a:ext>
             </a:extLst>
           </p:cNvPr>
@@ -2588,7 +2589,7 @@
           <p:cNvPr id="4" name="Text Placeholder 3">
             <a:extLst>
               <a:ext uri="{FF2B5EF4-FFF2-40B4-BE49-F238E27FC236}">
-                <a16:creationId xmlns:a16="http://schemas.microsoft.com/office/drawing/2014/main" xmlns="" id="{C7034AEB-C9CB-5641-A86A-8CE4D74CA17E}"/>
+                <a16:creationId xmlns="" xmlns:a16="http://schemas.microsoft.com/office/drawing/2014/main" id="{C7034AEB-C9CB-5641-A86A-8CE4D74CA17E}"/>
               </a:ext>
             </a:extLst>
           </p:cNvPr>
@@ -2659,7 +2660,7 @@
           <p:cNvPr id="5" name="Date Placeholder 4">
             <a:extLst>
               <a:ext uri="{FF2B5EF4-FFF2-40B4-BE49-F238E27FC236}">
-                <a16:creationId xmlns:a16="http://schemas.microsoft.com/office/drawing/2014/main" xmlns="" id="{5CF1E772-D352-3342-8861-BDE00833F7EF}"/>
+                <a16:creationId xmlns="" xmlns:a16="http://schemas.microsoft.com/office/drawing/2014/main" id="{5CF1E772-D352-3342-8861-BDE00833F7EF}"/>
               </a:ext>
             </a:extLst>
           </p:cNvPr>
@@ -2688,7 +2689,7 @@
           <p:cNvPr id="6" name="Footer Placeholder 5">
             <a:extLst>
               <a:ext uri="{FF2B5EF4-FFF2-40B4-BE49-F238E27FC236}">
-                <a16:creationId xmlns:a16="http://schemas.microsoft.com/office/drawing/2014/main" xmlns="" id="{D38A5059-1DE0-404B-897B-615661062EB6}"/>
+                <a16:creationId xmlns="" xmlns:a16="http://schemas.microsoft.com/office/drawing/2014/main" id="{D38A5059-1DE0-404B-897B-615661062EB6}"/>
               </a:ext>
             </a:extLst>
           </p:cNvPr>
@@ -2713,7 +2714,7 @@
           <p:cNvPr id="7" name="Slide Number Placeholder 6">
             <a:extLst>
               <a:ext uri="{FF2B5EF4-FFF2-40B4-BE49-F238E27FC236}">
-                <a16:creationId xmlns:a16="http://schemas.microsoft.com/office/drawing/2014/main" xmlns="" id="{FEC9B585-298C-9142-B3E4-9683821FD0C3}"/>
+                <a16:creationId xmlns="" xmlns:a16="http://schemas.microsoft.com/office/drawing/2014/main" id="{FEC9B585-298C-9142-B3E4-9683821FD0C3}"/>
               </a:ext>
             </a:extLst>
           </p:cNvPr>
@@ -2777,7 +2778,7 @@
           <p:cNvPr id="2" name="Title Placeholder 1">
             <a:extLst>
               <a:ext uri="{FF2B5EF4-FFF2-40B4-BE49-F238E27FC236}">
-                <a16:creationId xmlns:a16="http://schemas.microsoft.com/office/drawing/2014/main" xmlns="" id="{4FA3C14F-9E83-204C-93F3-4A106E79DB61}"/>
+                <a16:creationId xmlns="" xmlns:a16="http://schemas.microsoft.com/office/drawing/2014/main" id="{4FA3C14F-9E83-204C-93F3-4A106E79DB61}"/>
               </a:ext>
             </a:extLst>
           </p:cNvPr>
@@ -2815,7 +2816,7 @@
           <p:cNvPr id="3" name="Text Placeholder 2">
             <a:extLst>
               <a:ext uri="{FF2B5EF4-FFF2-40B4-BE49-F238E27FC236}">
-                <a16:creationId xmlns:a16="http://schemas.microsoft.com/office/drawing/2014/main" xmlns="" id="{52192E8A-1958-E54D-9F03-ABB935DE7303}"/>
+                <a16:creationId xmlns="" xmlns:a16="http://schemas.microsoft.com/office/drawing/2014/main" id="{52192E8A-1958-E54D-9F03-ABB935DE7303}"/>
               </a:ext>
             </a:extLst>
           </p:cNvPr>
@@ -2882,7 +2883,7 @@
           <p:cNvPr id="4" name="Date Placeholder 3">
             <a:extLst>
               <a:ext uri="{FF2B5EF4-FFF2-40B4-BE49-F238E27FC236}">
-                <a16:creationId xmlns:a16="http://schemas.microsoft.com/office/drawing/2014/main" xmlns="" id="{7325D930-3387-4845-B851-27EB48A50D33}"/>
+                <a16:creationId xmlns="" xmlns:a16="http://schemas.microsoft.com/office/drawing/2014/main" id="{7325D930-3387-4845-B851-27EB48A50D33}"/>
               </a:ext>
             </a:extLst>
           </p:cNvPr>
@@ -2929,7 +2930,7 @@
           <p:cNvPr id="5" name="Footer Placeholder 4">
             <a:extLst>
               <a:ext uri="{FF2B5EF4-FFF2-40B4-BE49-F238E27FC236}">
-                <a16:creationId xmlns:a16="http://schemas.microsoft.com/office/drawing/2014/main" xmlns="" id="{2B233A07-F101-A046-B90E-4F3B57476DFA}"/>
+                <a16:creationId xmlns="" xmlns:a16="http://schemas.microsoft.com/office/drawing/2014/main" id="{2B233A07-F101-A046-B90E-4F3B57476DFA}"/>
               </a:ext>
             </a:extLst>
           </p:cNvPr>
@@ -2972,7 +2973,7 @@
           <p:cNvPr id="6" name="Slide Number Placeholder 5">
             <a:extLst>
               <a:ext uri="{FF2B5EF4-FFF2-40B4-BE49-F238E27FC236}">
-                <a16:creationId xmlns:a16="http://schemas.microsoft.com/office/drawing/2014/main" xmlns="" id="{1864A47E-8A61-6845-AFEE-CDA6D79ED527}"/>
+                <a16:creationId xmlns="" xmlns:a16="http://schemas.microsoft.com/office/drawing/2014/main" id="{1864A47E-8A61-6845-AFEE-CDA6D79ED527}"/>
               </a:ext>
             </a:extLst>
           </p:cNvPr>
@@ -3340,7 +3341,7 @@
           <p:cNvPr id="2" name="Group 1">
             <a:extLst>
               <a:ext uri="{FF2B5EF4-FFF2-40B4-BE49-F238E27FC236}">
-                <a16:creationId xmlns:a16="http://schemas.microsoft.com/office/drawing/2014/main" xmlns="" id="{21C01040-A5E5-5440-BE0E-83D695C5AF7C}"/>
+                <a16:creationId xmlns="" xmlns:a16="http://schemas.microsoft.com/office/drawing/2014/main" id="{21C01040-A5E5-5440-BE0E-83D695C5AF7C}"/>
               </a:ext>
             </a:extLst>
           </p:cNvPr>
@@ -3360,7 +3361,7 @@
             <p:cNvPr id="4" name="Donut 3">
               <a:extLst>
                 <a:ext uri="{FF2B5EF4-FFF2-40B4-BE49-F238E27FC236}">
-                  <a16:creationId xmlns:a16="http://schemas.microsoft.com/office/drawing/2014/main" xmlns="" id="{3B2A361F-FDE3-7349-9868-C5FD2DECD6F0}"/>
+                  <a16:creationId xmlns="" xmlns:a16="http://schemas.microsoft.com/office/drawing/2014/main" id="{3B2A361F-FDE3-7349-9868-C5FD2DECD6F0}"/>
                 </a:ext>
               </a:extLst>
             </p:cNvPr>
@@ -3412,7 +3413,7 @@
             <p:cNvPr id="10" name="Donut 9">
               <a:extLst>
                 <a:ext uri="{FF2B5EF4-FFF2-40B4-BE49-F238E27FC236}">
-                  <a16:creationId xmlns:a16="http://schemas.microsoft.com/office/drawing/2014/main" xmlns="" id="{BDE35D79-7A44-0147-9C60-C169BA20B071}"/>
+                  <a16:creationId xmlns="" xmlns:a16="http://schemas.microsoft.com/office/drawing/2014/main" id="{BDE35D79-7A44-0147-9C60-C169BA20B071}"/>
                 </a:ext>
               </a:extLst>
             </p:cNvPr>
@@ -3464,7 +3465,7 @@
             <p:cNvPr id="12" name="Donut 11">
               <a:extLst>
                 <a:ext uri="{FF2B5EF4-FFF2-40B4-BE49-F238E27FC236}">
-                  <a16:creationId xmlns:a16="http://schemas.microsoft.com/office/drawing/2014/main" xmlns="" id="{E56352FB-83ED-8E41-A2BB-E276C56457E6}"/>
+                  <a16:creationId xmlns="" xmlns:a16="http://schemas.microsoft.com/office/drawing/2014/main" id="{E56352FB-83ED-8E41-A2BB-E276C56457E6}"/>
                 </a:ext>
               </a:extLst>
             </p:cNvPr>
@@ -3516,7 +3517,7 @@
             <p:cNvPr id="14" name="Donut 13">
               <a:extLst>
                 <a:ext uri="{FF2B5EF4-FFF2-40B4-BE49-F238E27FC236}">
-                  <a16:creationId xmlns:a16="http://schemas.microsoft.com/office/drawing/2014/main" xmlns="" id="{89D72E26-3D0E-F247-A940-D093C75917A9}"/>
+                  <a16:creationId xmlns="" xmlns:a16="http://schemas.microsoft.com/office/drawing/2014/main" id="{89D72E26-3D0E-F247-A940-D093C75917A9}"/>
                 </a:ext>
               </a:extLst>
             </p:cNvPr>
@@ -3568,7 +3569,7 @@
             <p:cNvPr id="16" name="Picture 15">
               <a:extLst>
                 <a:ext uri="{FF2B5EF4-FFF2-40B4-BE49-F238E27FC236}">
-                  <a16:creationId xmlns:a16="http://schemas.microsoft.com/office/drawing/2014/main" xmlns="" id="{65348E9C-5E39-C74F-8639-A4E368B71856}"/>
+                  <a16:creationId xmlns="" xmlns:a16="http://schemas.microsoft.com/office/drawing/2014/main" id="{65348E9C-5E39-C74F-8639-A4E368B71856}"/>
                 </a:ext>
               </a:extLst>
             </p:cNvPr>
@@ -3598,7 +3599,7 @@
             <p:cNvPr id="20" name="Picture 19">
               <a:extLst>
                 <a:ext uri="{FF2B5EF4-FFF2-40B4-BE49-F238E27FC236}">
-                  <a16:creationId xmlns:a16="http://schemas.microsoft.com/office/drawing/2014/main" xmlns="" id="{8803E842-7FB6-6F44-A22E-C3CA6FD7E349}"/>
+                  <a16:creationId xmlns="" xmlns:a16="http://schemas.microsoft.com/office/drawing/2014/main" id="{8803E842-7FB6-6F44-A22E-C3CA6FD7E349}"/>
                 </a:ext>
               </a:extLst>
             </p:cNvPr>
@@ -3628,7 +3629,7 @@
             <p:cNvPr id="21" name="Picture 20">
               <a:extLst>
                 <a:ext uri="{FF2B5EF4-FFF2-40B4-BE49-F238E27FC236}">
-                  <a16:creationId xmlns:a16="http://schemas.microsoft.com/office/drawing/2014/main" xmlns="" id="{303227FF-CA43-ED43-AA6E-589BBC9A9D59}"/>
+                  <a16:creationId xmlns="" xmlns:a16="http://schemas.microsoft.com/office/drawing/2014/main" id="{303227FF-CA43-ED43-AA6E-589BBC9A9D59}"/>
                 </a:ext>
               </a:extLst>
             </p:cNvPr>
@@ -3658,7 +3659,7 @@
             <p:cNvPr id="22" name="Picture 21">
               <a:extLst>
                 <a:ext uri="{FF2B5EF4-FFF2-40B4-BE49-F238E27FC236}">
-                  <a16:creationId xmlns:a16="http://schemas.microsoft.com/office/drawing/2014/main" xmlns="" id="{28D04A45-750D-5149-A269-373E9B55611F}"/>
+                  <a16:creationId xmlns="" xmlns:a16="http://schemas.microsoft.com/office/drawing/2014/main" id="{28D04A45-750D-5149-A269-373E9B55611F}"/>
                 </a:ext>
               </a:extLst>
             </p:cNvPr>
@@ -3688,7 +3689,7 @@
             <p:cNvPr id="24" name="Straight Arrow Connector 23">
               <a:extLst>
                 <a:ext uri="{FF2B5EF4-FFF2-40B4-BE49-F238E27FC236}">
-                  <a16:creationId xmlns:a16="http://schemas.microsoft.com/office/drawing/2014/main" xmlns="" id="{B0D28AA1-5104-B849-AF68-A0F380A29D2E}"/>
+                  <a16:creationId xmlns="" xmlns:a16="http://schemas.microsoft.com/office/drawing/2014/main" id="{B0D28AA1-5104-B849-AF68-A0F380A29D2E}"/>
                 </a:ext>
               </a:extLst>
             </p:cNvPr>
@@ -3730,7 +3731,7 @@
             <p:cNvPr id="25" name="Straight Arrow Connector 24">
               <a:extLst>
                 <a:ext uri="{FF2B5EF4-FFF2-40B4-BE49-F238E27FC236}">
-                  <a16:creationId xmlns:a16="http://schemas.microsoft.com/office/drawing/2014/main" xmlns="" id="{CD795BB4-ABBB-A64E-895F-0481BBE8E4EA}"/>
+                  <a16:creationId xmlns="" xmlns:a16="http://schemas.microsoft.com/office/drawing/2014/main" id="{CD795BB4-ABBB-A64E-895F-0481BBE8E4EA}"/>
                 </a:ext>
               </a:extLst>
             </p:cNvPr>
@@ -3774,7 +3775,7 @@
             <p:cNvPr id="27" name="Straight Arrow Connector 26">
               <a:extLst>
                 <a:ext uri="{FF2B5EF4-FFF2-40B4-BE49-F238E27FC236}">
-                  <a16:creationId xmlns:a16="http://schemas.microsoft.com/office/drawing/2014/main" xmlns="" id="{6F1AA03E-031D-8848-99C0-5A36AF0E5605}"/>
+                  <a16:creationId xmlns="" xmlns:a16="http://schemas.microsoft.com/office/drawing/2014/main" id="{6F1AA03E-031D-8848-99C0-5A36AF0E5605}"/>
                 </a:ext>
               </a:extLst>
             </p:cNvPr>
@@ -3819,7 +3820,7 @@
             <p:cNvPr id="28" name="Straight Arrow Connector 27">
               <a:extLst>
                 <a:ext uri="{FF2B5EF4-FFF2-40B4-BE49-F238E27FC236}">
-                  <a16:creationId xmlns:a16="http://schemas.microsoft.com/office/drawing/2014/main" xmlns="" id="{79B7509F-94D0-C044-9DC2-A554B9DB4C67}"/>
+                  <a16:creationId xmlns="" xmlns:a16="http://schemas.microsoft.com/office/drawing/2014/main" id="{79B7509F-94D0-C044-9DC2-A554B9DB4C67}"/>
                 </a:ext>
               </a:extLst>
             </p:cNvPr>
@@ -3864,7 +3865,7 @@
             <p:cNvPr id="34" name="Straight Arrow Connector 33">
               <a:extLst>
                 <a:ext uri="{FF2B5EF4-FFF2-40B4-BE49-F238E27FC236}">
-                  <a16:creationId xmlns:a16="http://schemas.microsoft.com/office/drawing/2014/main" xmlns="" id="{B64B615A-337A-E447-8F57-6F1155594D20}"/>
+                  <a16:creationId xmlns="" xmlns:a16="http://schemas.microsoft.com/office/drawing/2014/main" id="{B64B615A-337A-E447-8F57-6F1155594D20}"/>
                 </a:ext>
               </a:extLst>
             </p:cNvPr>
@@ -3909,7 +3910,7 @@
             <p:cNvPr id="35" name="Straight Arrow Connector 34">
               <a:extLst>
                 <a:ext uri="{FF2B5EF4-FFF2-40B4-BE49-F238E27FC236}">
-                  <a16:creationId xmlns:a16="http://schemas.microsoft.com/office/drawing/2014/main" xmlns="" id="{9CF84DCC-C72A-C348-8EC1-3A9D17DF0926}"/>
+                  <a16:creationId xmlns="" xmlns:a16="http://schemas.microsoft.com/office/drawing/2014/main" id="{9CF84DCC-C72A-C348-8EC1-3A9D17DF0926}"/>
                 </a:ext>
               </a:extLst>
             </p:cNvPr>
@@ -3954,7 +3955,7 @@
             <p:cNvPr id="36" name="Straight Arrow Connector 35">
               <a:extLst>
                 <a:ext uri="{FF2B5EF4-FFF2-40B4-BE49-F238E27FC236}">
-                  <a16:creationId xmlns:a16="http://schemas.microsoft.com/office/drawing/2014/main" xmlns="" id="{F1E7A251-AD40-E846-8C3D-087F623E8345}"/>
+                  <a16:creationId xmlns="" xmlns:a16="http://schemas.microsoft.com/office/drawing/2014/main" id="{F1E7A251-AD40-E846-8C3D-087F623E8345}"/>
                 </a:ext>
               </a:extLst>
             </p:cNvPr>
@@ -3999,7 +4000,7 @@
             <p:cNvPr id="37" name="TextBox 36">
               <a:extLst>
                 <a:ext uri="{FF2B5EF4-FFF2-40B4-BE49-F238E27FC236}">
-                  <a16:creationId xmlns:a16="http://schemas.microsoft.com/office/drawing/2014/main" xmlns="" id="{32233D15-47D3-4143-B8F5-40394DF42E51}"/>
+                  <a16:creationId xmlns="" xmlns:a16="http://schemas.microsoft.com/office/drawing/2014/main" id="{32233D15-47D3-4143-B8F5-40394DF42E51}"/>
                 </a:ext>
               </a:extLst>
             </p:cNvPr>
@@ -4038,7 +4039,7 @@
             <p:cNvPr id="38" name="TextBox 37">
               <a:extLst>
                 <a:ext uri="{FF2B5EF4-FFF2-40B4-BE49-F238E27FC236}">
-                  <a16:creationId xmlns:a16="http://schemas.microsoft.com/office/drawing/2014/main" xmlns="" id="{92F3D126-75F9-8E47-ACC8-6DE8CE351B10}"/>
+                  <a16:creationId xmlns="" xmlns:a16="http://schemas.microsoft.com/office/drawing/2014/main" id="{92F3D126-75F9-8E47-ACC8-6DE8CE351B10}"/>
                 </a:ext>
               </a:extLst>
             </p:cNvPr>
@@ -4073,7 +4074,7 @@
             <p:cNvPr id="40" name="Straight Arrow Connector 39">
               <a:extLst>
                 <a:ext uri="{FF2B5EF4-FFF2-40B4-BE49-F238E27FC236}">
-                  <a16:creationId xmlns:a16="http://schemas.microsoft.com/office/drawing/2014/main" xmlns="" id="{D129C510-0E92-F748-95B7-D3290C7F5292}"/>
+                  <a16:creationId xmlns="" xmlns:a16="http://schemas.microsoft.com/office/drawing/2014/main" id="{D129C510-0E92-F748-95B7-D3290C7F5292}"/>
                 </a:ext>
               </a:extLst>
             </p:cNvPr>
@@ -4119,7 +4120,7 @@
             <p:cNvPr id="45" name="Straight Arrow Connector 44">
               <a:extLst>
                 <a:ext uri="{FF2B5EF4-FFF2-40B4-BE49-F238E27FC236}">
-                  <a16:creationId xmlns:a16="http://schemas.microsoft.com/office/drawing/2014/main" xmlns="" id="{6A37E265-7C1D-4E42-8DE5-F1525A585474}"/>
+                  <a16:creationId xmlns="" xmlns:a16="http://schemas.microsoft.com/office/drawing/2014/main" id="{6A37E265-7C1D-4E42-8DE5-F1525A585474}"/>
                 </a:ext>
               </a:extLst>
             </p:cNvPr>
@@ -4165,7 +4166,7 @@
             <p:cNvPr id="47" name="Straight Arrow Connector 46">
               <a:extLst>
                 <a:ext uri="{FF2B5EF4-FFF2-40B4-BE49-F238E27FC236}">
-                  <a16:creationId xmlns:a16="http://schemas.microsoft.com/office/drawing/2014/main" xmlns="" id="{01B65FEC-66A0-E54A-A1A9-01441382ADA4}"/>
+                  <a16:creationId xmlns="" xmlns:a16="http://schemas.microsoft.com/office/drawing/2014/main" id="{01B65FEC-66A0-E54A-A1A9-01441382ADA4}"/>
                 </a:ext>
               </a:extLst>
             </p:cNvPr>
@@ -4211,7 +4212,7 @@
             <p:cNvPr id="48" name="Donut 47">
               <a:extLst>
                 <a:ext uri="{FF2B5EF4-FFF2-40B4-BE49-F238E27FC236}">
-                  <a16:creationId xmlns:a16="http://schemas.microsoft.com/office/drawing/2014/main" xmlns="" id="{1AD3C458-7283-094D-A4AC-30A8D632277B}"/>
+                  <a16:creationId xmlns="" xmlns:a16="http://schemas.microsoft.com/office/drawing/2014/main" id="{1AD3C458-7283-094D-A4AC-30A8D632277B}"/>
                 </a:ext>
               </a:extLst>
             </p:cNvPr>
@@ -4263,7 +4264,7 @@
             <p:cNvPr id="49" name="Donut 48">
               <a:extLst>
                 <a:ext uri="{FF2B5EF4-FFF2-40B4-BE49-F238E27FC236}">
-                  <a16:creationId xmlns:a16="http://schemas.microsoft.com/office/drawing/2014/main" xmlns="" id="{54296AC5-4EA6-2E48-B195-3F349430556D}"/>
+                  <a16:creationId xmlns="" xmlns:a16="http://schemas.microsoft.com/office/drawing/2014/main" id="{54296AC5-4EA6-2E48-B195-3F349430556D}"/>
                 </a:ext>
               </a:extLst>
             </p:cNvPr>
@@ -4315,7 +4316,7 @@
             <p:cNvPr id="50" name="Donut 49">
               <a:extLst>
                 <a:ext uri="{FF2B5EF4-FFF2-40B4-BE49-F238E27FC236}">
-                  <a16:creationId xmlns:a16="http://schemas.microsoft.com/office/drawing/2014/main" xmlns="" id="{ECEA39D9-22FF-2142-92DA-F78CCF525516}"/>
+                  <a16:creationId xmlns="" xmlns:a16="http://schemas.microsoft.com/office/drawing/2014/main" id="{ECEA39D9-22FF-2142-92DA-F78CCF525516}"/>
                 </a:ext>
               </a:extLst>
             </p:cNvPr>
@@ -4367,7 +4368,7 @@
             <p:cNvPr id="51" name="Donut 50">
               <a:extLst>
                 <a:ext uri="{FF2B5EF4-FFF2-40B4-BE49-F238E27FC236}">
-                  <a16:creationId xmlns:a16="http://schemas.microsoft.com/office/drawing/2014/main" xmlns="" id="{027D34A4-3CCC-5E4C-8C3B-04AEEFC20D48}"/>
+                  <a16:creationId xmlns="" xmlns:a16="http://schemas.microsoft.com/office/drawing/2014/main" id="{027D34A4-3CCC-5E4C-8C3B-04AEEFC20D48}"/>
                 </a:ext>
               </a:extLst>
             </p:cNvPr>
@@ -4419,7 +4420,7 @@
             <p:cNvPr id="52" name="Picture 51">
               <a:extLst>
                 <a:ext uri="{FF2B5EF4-FFF2-40B4-BE49-F238E27FC236}">
-                  <a16:creationId xmlns:a16="http://schemas.microsoft.com/office/drawing/2014/main" xmlns="" id="{5D3188FF-EB25-4542-9B0E-F071C76D530F}"/>
+                  <a16:creationId xmlns="" xmlns:a16="http://schemas.microsoft.com/office/drawing/2014/main" id="{5D3188FF-EB25-4542-9B0E-F071C76D530F}"/>
                 </a:ext>
               </a:extLst>
             </p:cNvPr>
@@ -4449,7 +4450,7 @@
             <p:cNvPr id="53" name="Picture 52">
               <a:extLst>
                 <a:ext uri="{FF2B5EF4-FFF2-40B4-BE49-F238E27FC236}">
-                  <a16:creationId xmlns:a16="http://schemas.microsoft.com/office/drawing/2014/main" xmlns="" id="{E80586E2-8A21-B44A-B2A6-E2A37289C605}"/>
+                  <a16:creationId xmlns="" xmlns:a16="http://schemas.microsoft.com/office/drawing/2014/main" id="{E80586E2-8A21-B44A-B2A6-E2A37289C605}"/>
                 </a:ext>
               </a:extLst>
             </p:cNvPr>
@@ -4479,7 +4480,7 @@
             <p:cNvPr id="54" name="Picture 53">
               <a:extLst>
                 <a:ext uri="{FF2B5EF4-FFF2-40B4-BE49-F238E27FC236}">
-                  <a16:creationId xmlns:a16="http://schemas.microsoft.com/office/drawing/2014/main" xmlns="" id="{10C0DB48-7DBA-884E-BE90-9CC62393ECA2}"/>
+                  <a16:creationId xmlns="" xmlns:a16="http://schemas.microsoft.com/office/drawing/2014/main" id="{10C0DB48-7DBA-884E-BE90-9CC62393ECA2}"/>
                 </a:ext>
               </a:extLst>
             </p:cNvPr>
@@ -4509,7 +4510,7 @@
             <p:cNvPr id="55" name="Picture 54">
               <a:extLst>
                 <a:ext uri="{FF2B5EF4-FFF2-40B4-BE49-F238E27FC236}">
-                  <a16:creationId xmlns:a16="http://schemas.microsoft.com/office/drawing/2014/main" xmlns="" id="{B4AE2BC6-738E-E543-8EFA-CBB71B892574}"/>
+                  <a16:creationId xmlns="" xmlns:a16="http://schemas.microsoft.com/office/drawing/2014/main" id="{B4AE2BC6-738E-E543-8EFA-CBB71B892574}"/>
                 </a:ext>
               </a:extLst>
             </p:cNvPr>
@@ -4539,7 +4540,7 @@
             <p:cNvPr id="57" name="Straight Arrow Connector 56">
               <a:extLst>
                 <a:ext uri="{FF2B5EF4-FFF2-40B4-BE49-F238E27FC236}">
-                  <a16:creationId xmlns:a16="http://schemas.microsoft.com/office/drawing/2014/main" xmlns="" id="{B7E0628D-3896-0D40-8C0F-2A2C37242174}"/>
+                  <a16:creationId xmlns="" xmlns:a16="http://schemas.microsoft.com/office/drawing/2014/main" id="{B7E0628D-3896-0D40-8C0F-2A2C37242174}"/>
                 </a:ext>
               </a:extLst>
             </p:cNvPr>
@@ -4584,7 +4585,7 @@
             <p:cNvPr id="58" name="Straight Arrow Connector 57">
               <a:extLst>
                 <a:ext uri="{FF2B5EF4-FFF2-40B4-BE49-F238E27FC236}">
-                  <a16:creationId xmlns:a16="http://schemas.microsoft.com/office/drawing/2014/main" xmlns="" id="{A8ACF2FB-D778-3646-84C4-C402FC592721}"/>
+                  <a16:creationId xmlns="" xmlns:a16="http://schemas.microsoft.com/office/drawing/2014/main" id="{A8ACF2FB-D778-3646-84C4-C402FC592721}"/>
                 </a:ext>
               </a:extLst>
             </p:cNvPr>
@@ -4629,7 +4630,7 @@
             <p:cNvPr id="59" name="Straight Arrow Connector 58">
               <a:extLst>
                 <a:ext uri="{FF2B5EF4-FFF2-40B4-BE49-F238E27FC236}">
-                  <a16:creationId xmlns:a16="http://schemas.microsoft.com/office/drawing/2014/main" xmlns="" id="{E424E677-519B-644C-852E-DAFC1041F8F9}"/>
+                  <a16:creationId xmlns="" xmlns:a16="http://schemas.microsoft.com/office/drawing/2014/main" id="{E424E677-519B-644C-852E-DAFC1041F8F9}"/>
                 </a:ext>
               </a:extLst>
             </p:cNvPr>
@@ -4674,7 +4675,7 @@
             <p:cNvPr id="60" name="Straight Arrow Connector 59">
               <a:extLst>
                 <a:ext uri="{FF2B5EF4-FFF2-40B4-BE49-F238E27FC236}">
-                  <a16:creationId xmlns:a16="http://schemas.microsoft.com/office/drawing/2014/main" xmlns="" id="{CC702EAB-6327-3548-9BA5-19449AE977CC}"/>
+                  <a16:creationId xmlns="" xmlns:a16="http://schemas.microsoft.com/office/drawing/2014/main" id="{CC702EAB-6327-3548-9BA5-19449AE977CC}"/>
                 </a:ext>
               </a:extLst>
             </p:cNvPr>
@@ -4719,7 +4720,7 @@
             <p:cNvPr id="61" name="Straight Arrow Connector 60">
               <a:extLst>
                 <a:ext uri="{FF2B5EF4-FFF2-40B4-BE49-F238E27FC236}">
-                  <a16:creationId xmlns:a16="http://schemas.microsoft.com/office/drawing/2014/main" xmlns="" id="{0E175693-96D0-5548-87EF-74C7A77A63D4}"/>
+                  <a16:creationId xmlns="" xmlns:a16="http://schemas.microsoft.com/office/drawing/2014/main" id="{0E175693-96D0-5548-87EF-74C7A77A63D4}"/>
                 </a:ext>
               </a:extLst>
             </p:cNvPr>
@@ -4764,7 +4765,7 @@
             <p:cNvPr id="62" name="Straight Arrow Connector 61">
               <a:extLst>
                 <a:ext uri="{FF2B5EF4-FFF2-40B4-BE49-F238E27FC236}">
-                  <a16:creationId xmlns:a16="http://schemas.microsoft.com/office/drawing/2014/main" xmlns="" id="{F787A27D-C2A6-494E-9E42-2C8E021EA6BA}"/>
+                  <a16:creationId xmlns="" xmlns:a16="http://schemas.microsoft.com/office/drawing/2014/main" id="{F787A27D-C2A6-494E-9E42-2C8E021EA6BA}"/>
                 </a:ext>
               </a:extLst>
             </p:cNvPr>
@@ -4809,7 +4810,7 @@
             <p:cNvPr id="65" name="Straight Arrow Connector 64">
               <a:extLst>
                 <a:ext uri="{FF2B5EF4-FFF2-40B4-BE49-F238E27FC236}">
-                  <a16:creationId xmlns:a16="http://schemas.microsoft.com/office/drawing/2014/main" xmlns="" id="{665894B1-601F-B54F-B53B-D7434ED7704F}"/>
+                  <a16:creationId xmlns="" xmlns:a16="http://schemas.microsoft.com/office/drawing/2014/main" id="{665894B1-601F-B54F-B53B-D7434ED7704F}"/>
                 </a:ext>
               </a:extLst>
             </p:cNvPr>
@@ -4856,7 +4857,7 @@
             <p:cNvPr id="66" name="Straight Arrow Connector 65">
               <a:extLst>
                 <a:ext uri="{FF2B5EF4-FFF2-40B4-BE49-F238E27FC236}">
-                  <a16:creationId xmlns:a16="http://schemas.microsoft.com/office/drawing/2014/main" xmlns="" id="{8D00B99C-A25A-0544-9CCC-62BED27C14E3}"/>
+                  <a16:creationId xmlns="" xmlns:a16="http://schemas.microsoft.com/office/drawing/2014/main" id="{8D00B99C-A25A-0544-9CCC-62BED27C14E3}"/>
                 </a:ext>
               </a:extLst>
             </p:cNvPr>
@@ -4903,7 +4904,7 @@
             <p:cNvPr id="74" name="Straight Arrow Connector 73">
               <a:extLst>
                 <a:ext uri="{FF2B5EF4-FFF2-40B4-BE49-F238E27FC236}">
-                  <a16:creationId xmlns:a16="http://schemas.microsoft.com/office/drawing/2014/main" xmlns="" id="{9897DA5B-3CCB-0745-A483-551471B7CE67}"/>
+                  <a16:creationId xmlns="" xmlns:a16="http://schemas.microsoft.com/office/drawing/2014/main" id="{9897DA5B-3CCB-0745-A483-551471B7CE67}"/>
                 </a:ext>
               </a:extLst>
             </p:cNvPr>
@@ -4950,7 +4951,7 @@
             <p:cNvPr id="86" name="TextBox 85">
               <a:extLst>
                 <a:ext uri="{FF2B5EF4-FFF2-40B4-BE49-F238E27FC236}">
-                  <a16:creationId xmlns:a16="http://schemas.microsoft.com/office/drawing/2014/main" xmlns="" id="{08D6A736-4169-4F4B-A504-8B317B727C73}"/>
+                  <a16:creationId xmlns="" xmlns:a16="http://schemas.microsoft.com/office/drawing/2014/main" id="{08D6A736-4169-4F4B-A504-8B317B727C73}"/>
                 </a:ext>
               </a:extLst>
             </p:cNvPr>
@@ -4985,7 +4986,7 @@
             <p:cNvPr id="87" name="Straight Arrow Connector 86">
               <a:extLst>
                 <a:ext uri="{FF2B5EF4-FFF2-40B4-BE49-F238E27FC236}">
-                  <a16:creationId xmlns:a16="http://schemas.microsoft.com/office/drawing/2014/main" xmlns="" id="{D894C924-CCB7-294F-92D3-516C5963A38F}"/>
+                  <a16:creationId xmlns="" xmlns:a16="http://schemas.microsoft.com/office/drawing/2014/main" id="{D894C924-CCB7-294F-92D3-516C5963A38F}"/>
                 </a:ext>
               </a:extLst>
             </p:cNvPr>
@@ -5029,7 +5030,7 @@
             <p:cNvPr id="88" name="Straight Arrow Connector 87">
               <a:extLst>
                 <a:ext uri="{FF2B5EF4-FFF2-40B4-BE49-F238E27FC236}">
-                  <a16:creationId xmlns:a16="http://schemas.microsoft.com/office/drawing/2014/main" xmlns="" id="{643ADA86-9B33-E942-973D-84EF8B397DA7}"/>
+                  <a16:creationId xmlns="" xmlns:a16="http://schemas.microsoft.com/office/drawing/2014/main" id="{643ADA86-9B33-E942-973D-84EF8B397DA7}"/>
                 </a:ext>
               </a:extLst>
             </p:cNvPr>
@@ -5073,7 +5074,7 @@
             <p:cNvPr id="92" name="Rectangle 91">
               <a:extLst>
                 <a:ext uri="{FF2B5EF4-FFF2-40B4-BE49-F238E27FC236}">
-                  <a16:creationId xmlns:a16="http://schemas.microsoft.com/office/drawing/2014/main" xmlns="" id="{0706AB93-4F5E-9F46-B494-FAA5B69D424F}"/>
+                  <a16:creationId xmlns="" xmlns:a16="http://schemas.microsoft.com/office/drawing/2014/main" id="{0706AB93-4F5E-9F46-B494-FAA5B69D424F}"/>
                 </a:ext>
               </a:extLst>
             </p:cNvPr>
@@ -5547,6 +5548,248 @@
 </p:sld>
 </file>
 
+<file path=ppt/slides/slide11.xml><?xml version="1.0" encoding="utf-8"?>
+<p:sld xmlns:a="http://schemas.openxmlformats.org/drawingml/2006/main" xmlns:r="http://schemas.openxmlformats.org/officeDocument/2006/relationships" xmlns:p="http://schemas.openxmlformats.org/presentationml/2006/main">
+  <p:cSld>
+    <p:spTree>
+      <p:nvGrpSpPr>
+        <p:cNvPr id="1" name=""/>
+        <p:cNvGrpSpPr/>
+        <p:nvPr/>
+      </p:nvGrpSpPr>
+      <p:grpSpPr>
+        <a:xfrm>
+          <a:off x="0" y="0"/>
+          <a:ext cx="0" cy="0"/>
+          <a:chOff x="0" y="0"/>
+          <a:chExt cx="0" cy="0"/>
+        </a:xfrm>
+      </p:grpSpPr>
+      <p:pic>
+        <p:nvPicPr>
+          <p:cNvPr id="11" name="Picture 10"/>
+          <p:cNvPicPr>
+            <a:picLocks noChangeAspect="1"/>
+          </p:cNvPicPr>
+          <p:nvPr/>
+        </p:nvPicPr>
+        <p:blipFill>
+          <a:blip r:embed="rId2">
+            <a:extLst>
+              <a:ext uri="{28A0092B-C50C-407E-A947-70E740481C1C}">
+                <a14:useLocalDpi xmlns:a14="http://schemas.microsoft.com/office/drawing/2010/main" val="0"/>
+              </a:ext>
+            </a:extLst>
+          </a:blip>
+          <a:stretch>
+            <a:fillRect/>
+          </a:stretch>
+        </p:blipFill>
+        <p:spPr>
+          <a:xfrm>
+            <a:off x="3367157" y="294861"/>
+            <a:ext cx="4914900" cy="2730500"/>
+          </a:xfrm>
+          <a:prstGeom prst="rect">
+            <a:avLst/>
+          </a:prstGeom>
+        </p:spPr>
+      </p:pic>
+      <p:grpSp>
+        <p:nvGrpSpPr>
+          <p:cNvPr id="16" name="Group 15"/>
+          <p:cNvGrpSpPr/>
+          <p:nvPr/>
+        </p:nvGrpSpPr>
+        <p:grpSpPr>
+          <a:xfrm>
+            <a:off x="3525078" y="3237395"/>
+            <a:ext cx="3982279" cy="2908852"/>
+            <a:chOff x="3525078" y="3237395"/>
+            <a:chExt cx="3982279" cy="2908852"/>
+          </a:xfrm>
+        </p:grpSpPr>
+        <p:pic>
+          <p:nvPicPr>
+            <p:cNvPr id="12" name="Picture 11"/>
+            <p:cNvPicPr>
+              <a:picLocks noChangeAspect="1"/>
+            </p:cNvPicPr>
+            <p:nvPr/>
+          </p:nvPicPr>
+          <p:blipFill rotWithShape="1">
+            <a:blip r:embed="rId2">
+              <a:extLst>
+                <a:ext uri="{28A0092B-C50C-407E-A947-70E740481C1C}">
+                  <a14:useLocalDpi xmlns:a14="http://schemas.microsoft.com/office/drawing/2010/main" val="0"/>
+                </a:ext>
+              </a:extLst>
+            </a:blip>
+            <a:srcRect l="2264" r="26823"/>
+            <a:stretch/>
+          </p:blipFill>
+          <p:spPr>
+            <a:xfrm>
+              <a:off x="3525078" y="3415747"/>
+              <a:ext cx="3485322" cy="2730500"/>
+            </a:xfrm>
+            <a:prstGeom prst="rect">
+              <a:avLst/>
+            </a:prstGeom>
+          </p:spPr>
+        </p:pic>
+        <p:sp>
+          <p:nvSpPr>
+            <p:cNvPr id="13" name="Rectangle 12"/>
+            <p:cNvSpPr/>
+            <p:nvPr/>
+          </p:nvSpPr>
+          <p:spPr>
+            <a:xfrm>
+              <a:off x="4293704" y="3237395"/>
+              <a:ext cx="556592" cy="592482"/>
+            </a:xfrm>
+            <a:prstGeom prst="rect">
+              <a:avLst/>
+            </a:prstGeom>
+            <a:solidFill>
+              <a:schemeClr val="bg1"/>
+            </a:solidFill>
+            <a:ln>
+              <a:noFill/>
+            </a:ln>
+          </p:spPr>
+          <p:style>
+            <a:lnRef idx="2">
+              <a:schemeClr val="accent1">
+                <a:shade val="50000"/>
+              </a:schemeClr>
+            </a:lnRef>
+            <a:fillRef idx="1">
+              <a:schemeClr val="accent1"/>
+            </a:fillRef>
+            <a:effectRef idx="0">
+              <a:schemeClr val="accent1"/>
+            </a:effectRef>
+            <a:fontRef idx="minor">
+              <a:schemeClr val="lt1"/>
+            </a:fontRef>
+          </p:style>
+          <p:txBody>
+            <a:bodyPr rtlCol="0" anchor="ctr"/>
+            <a:lstStyle/>
+            <a:p>
+              <a:pPr algn="ctr"/>
+              <a:endParaRPr lang="en-US"/>
+            </a:p>
+          </p:txBody>
+        </p:sp>
+        <p:sp>
+          <p:nvSpPr>
+            <p:cNvPr id="14" name="Rectangle 13"/>
+            <p:cNvSpPr/>
+            <p:nvPr/>
+          </p:nvSpPr>
+          <p:spPr>
+            <a:xfrm>
+              <a:off x="6076122" y="3237395"/>
+              <a:ext cx="556592" cy="592482"/>
+            </a:xfrm>
+            <a:prstGeom prst="rect">
+              <a:avLst/>
+            </a:prstGeom>
+            <a:solidFill>
+              <a:schemeClr val="bg1"/>
+            </a:solidFill>
+            <a:ln>
+              <a:noFill/>
+            </a:ln>
+          </p:spPr>
+          <p:style>
+            <a:lnRef idx="2">
+              <a:schemeClr val="accent1">
+                <a:shade val="50000"/>
+              </a:schemeClr>
+            </a:lnRef>
+            <a:fillRef idx="1">
+              <a:schemeClr val="accent1"/>
+            </a:fillRef>
+            <a:effectRef idx="0">
+              <a:schemeClr val="accent1"/>
+            </a:effectRef>
+            <a:fontRef idx="minor">
+              <a:schemeClr val="lt1"/>
+            </a:fontRef>
+          </p:style>
+          <p:txBody>
+            <a:bodyPr rtlCol="0" anchor="ctr"/>
+            <a:lstStyle/>
+            <a:p>
+              <a:pPr algn="ctr"/>
+              <a:endParaRPr lang="en-US"/>
+            </a:p>
+          </p:txBody>
+        </p:sp>
+        <p:sp>
+          <p:nvSpPr>
+            <p:cNvPr id="15" name="Oval 14"/>
+            <p:cNvSpPr/>
+            <p:nvPr/>
+          </p:nvSpPr>
+          <p:spPr>
+            <a:xfrm>
+              <a:off x="6632714" y="4903305"/>
+              <a:ext cx="874643" cy="1136925"/>
+            </a:xfrm>
+            <a:prstGeom prst="ellipse">
+              <a:avLst/>
+            </a:prstGeom>
+            <a:solidFill>
+              <a:schemeClr val="bg1"/>
+            </a:solidFill>
+            <a:ln>
+              <a:noFill/>
+            </a:ln>
+          </p:spPr>
+          <p:style>
+            <a:lnRef idx="2">
+              <a:schemeClr val="accent1">
+                <a:shade val="50000"/>
+              </a:schemeClr>
+            </a:lnRef>
+            <a:fillRef idx="1">
+              <a:schemeClr val="accent1"/>
+            </a:fillRef>
+            <a:effectRef idx="0">
+              <a:schemeClr val="accent1"/>
+            </a:effectRef>
+            <a:fontRef idx="minor">
+              <a:schemeClr val="lt1"/>
+            </a:fontRef>
+          </p:style>
+          <p:txBody>
+            <a:bodyPr rtlCol="0" anchor="ctr"/>
+            <a:lstStyle/>
+            <a:p>
+              <a:pPr algn="ctr"/>
+              <a:endParaRPr lang="en-US"/>
+            </a:p>
+          </p:txBody>
+        </p:sp>
+      </p:grpSp>
+    </p:spTree>
+    <p:extLst>
+      <p:ext uri="{BB962C8B-B14F-4D97-AF65-F5344CB8AC3E}">
+        <p14:creationId xmlns:p14="http://schemas.microsoft.com/office/powerpoint/2010/main" val="340724385"/>
+      </p:ext>
+    </p:extLst>
+  </p:cSld>
+  <p:clrMapOvr>
+    <a:masterClrMapping/>
+  </p:clrMapOvr>
+</p:sld>
+</file>
+
 <file path=ppt/slides/slide2.xml><?xml version="1.0" encoding="utf-8"?>
 <p:sld xmlns:a="http://schemas.openxmlformats.org/drawingml/2006/main" xmlns:r="http://schemas.openxmlformats.org/officeDocument/2006/relationships" xmlns:p="http://schemas.openxmlformats.org/presentationml/2006/main">
   <p:cSld>
@@ -5569,7 +5812,7 @@
           <p:cNvPr id="23" name="Group 22">
             <a:extLst>
               <a:ext uri="{FF2B5EF4-FFF2-40B4-BE49-F238E27FC236}">
-                <a16:creationId xmlns:a16="http://schemas.microsoft.com/office/drawing/2014/main" xmlns="" id="{BCC420A2-DA9C-7942-B39C-D09C4F5EA55A}"/>
+                <a16:creationId xmlns="" xmlns:a16="http://schemas.microsoft.com/office/drawing/2014/main" id="{BCC420A2-DA9C-7942-B39C-D09C4F5EA55A}"/>
               </a:ext>
             </a:extLst>
           </p:cNvPr>
@@ -5589,7 +5832,7 @@
             <p:cNvPr id="5" name="Straight Connector 4">
               <a:extLst>
                 <a:ext uri="{FF2B5EF4-FFF2-40B4-BE49-F238E27FC236}">
-                  <a16:creationId xmlns:a16="http://schemas.microsoft.com/office/drawing/2014/main" xmlns="" id="{39360EB3-2F94-A44A-B39F-9DB160370D7A}"/>
+                  <a16:creationId xmlns="" xmlns:a16="http://schemas.microsoft.com/office/drawing/2014/main" id="{39360EB3-2F94-A44A-B39F-9DB160370D7A}"/>
                 </a:ext>
               </a:extLst>
             </p:cNvPr>
@@ -5632,7 +5875,7 @@
             <p:cNvPr id="6" name="Straight Connector 5">
               <a:extLst>
                 <a:ext uri="{FF2B5EF4-FFF2-40B4-BE49-F238E27FC236}">
-                  <a16:creationId xmlns:a16="http://schemas.microsoft.com/office/drawing/2014/main" xmlns="" id="{853E8DA6-DA6D-6C46-BFE7-416FBF17C8C7}"/>
+                  <a16:creationId xmlns="" xmlns:a16="http://schemas.microsoft.com/office/drawing/2014/main" id="{853E8DA6-DA6D-6C46-BFE7-416FBF17C8C7}"/>
                 </a:ext>
               </a:extLst>
             </p:cNvPr>
@@ -5676,7 +5919,7 @@
             <p:cNvPr id="9" name="Straight Arrow Connector 8">
               <a:extLst>
                 <a:ext uri="{FF2B5EF4-FFF2-40B4-BE49-F238E27FC236}">
-                  <a16:creationId xmlns:a16="http://schemas.microsoft.com/office/drawing/2014/main" xmlns="" id="{CF5C9E10-448B-F945-BDB2-68260461DD67}"/>
+                  <a16:creationId xmlns="" xmlns:a16="http://schemas.microsoft.com/office/drawing/2014/main" id="{CF5C9E10-448B-F945-BDB2-68260461DD67}"/>
                 </a:ext>
               </a:extLst>
             </p:cNvPr>
@@ -5718,7 +5961,7 @@
             <p:cNvPr id="10" name="TextBox 9">
               <a:extLst>
                 <a:ext uri="{FF2B5EF4-FFF2-40B4-BE49-F238E27FC236}">
-                  <a16:creationId xmlns:a16="http://schemas.microsoft.com/office/drawing/2014/main" xmlns="" id="{FFC39BBD-2C9F-A441-B982-D45EDEFFB0E5}"/>
+                  <a16:creationId xmlns="" xmlns:a16="http://schemas.microsoft.com/office/drawing/2014/main" id="{FFC39BBD-2C9F-A441-B982-D45EDEFFB0E5}"/>
                 </a:ext>
               </a:extLst>
             </p:cNvPr>
@@ -5757,7 +6000,7 @@
             <p:cNvPr id="11" name="TextBox 10">
               <a:extLst>
                 <a:ext uri="{FF2B5EF4-FFF2-40B4-BE49-F238E27FC236}">
-                  <a16:creationId xmlns:a16="http://schemas.microsoft.com/office/drawing/2014/main" xmlns="" id="{6E340A3D-9611-684E-B25B-F9AB12BDD1D4}"/>
+                  <a16:creationId xmlns="" xmlns:a16="http://schemas.microsoft.com/office/drawing/2014/main" id="{6E340A3D-9611-684E-B25B-F9AB12BDD1D4}"/>
                 </a:ext>
               </a:extLst>
             </p:cNvPr>
@@ -5796,7 +6039,7 @@
             <p:cNvPr id="12" name="Straight Arrow Connector 11">
               <a:extLst>
                 <a:ext uri="{FF2B5EF4-FFF2-40B4-BE49-F238E27FC236}">
-                  <a16:creationId xmlns:a16="http://schemas.microsoft.com/office/drawing/2014/main" xmlns="" id="{735FC0BE-6106-9543-A10D-686E0BE6FB36}"/>
+                  <a16:creationId xmlns="" xmlns:a16="http://schemas.microsoft.com/office/drawing/2014/main" id="{735FC0BE-6106-9543-A10D-686E0BE6FB36}"/>
                 </a:ext>
               </a:extLst>
             </p:cNvPr>
@@ -5841,7 +6084,7 @@
             <p:cNvPr id="15" name="Straight Arrow Connector 14">
               <a:extLst>
                 <a:ext uri="{FF2B5EF4-FFF2-40B4-BE49-F238E27FC236}">
-                  <a16:creationId xmlns:a16="http://schemas.microsoft.com/office/drawing/2014/main" xmlns="" id="{F8024A55-957A-0D40-B26F-ABA50E186F24}"/>
+                  <a16:creationId xmlns="" xmlns:a16="http://schemas.microsoft.com/office/drawing/2014/main" id="{F8024A55-957A-0D40-B26F-ABA50E186F24}"/>
                 </a:ext>
               </a:extLst>
             </p:cNvPr>
@@ -5886,7 +6129,7 @@
             <p:cNvPr id="17" name="TextBox 16">
               <a:extLst>
                 <a:ext uri="{FF2B5EF4-FFF2-40B4-BE49-F238E27FC236}">
-                  <a16:creationId xmlns:a16="http://schemas.microsoft.com/office/drawing/2014/main" xmlns="" id="{16D3F9D4-E5F7-6B4D-A03D-0AA606EE74AB}"/>
+                  <a16:creationId xmlns="" xmlns:a16="http://schemas.microsoft.com/office/drawing/2014/main" id="{16D3F9D4-E5F7-6B4D-A03D-0AA606EE74AB}"/>
                 </a:ext>
               </a:extLst>
             </p:cNvPr>
@@ -5925,7 +6168,7 @@
             <p:cNvPr id="18" name="TextBox 17">
               <a:extLst>
                 <a:ext uri="{FF2B5EF4-FFF2-40B4-BE49-F238E27FC236}">
-                  <a16:creationId xmlns:a16="http://schemas.microsoft.com/office/drawing/2014/main" xmlns="" id="{8B25EDDD-F275-834A-AA71-146F0B514D87}"/>
+                  <a16:creationId xmlns="" xmlns:a16="http://schemas.microsoft.com/office/drawing/2014/main" id="{8B25EDDD-F275-834A-AA71-146F0B514D87}"/>
                 </a:ext>
               </a:extLst>
             </p:cNvPr>
@@ -5960,7 +6203,7 @@
             <p:cNvPr id="19" name="TextBox 18">
               <a:extLst>
                 <a:ext uri="{FF2B5EF4-FFF2-40B4-BE49-F238E27FC236}">
-                  <a16:creationId xmlns:a16="http://schemas.microsoft.com/office/drawing/2014/main" xmlns="" id="{F447B65D-C5AF-DB48-A22C-6A80F0DBED91}"/>
+                  <a16:creationId xmlns="" xmlns:a16="http://schemas.microsoft.com/office/drawing/2014/main" id="{F447B65D-C5AF-DB48-A22C-6A80F0DBED91}"/>
                 </a:ext>
               </a:extLst>
             </p:cNvPr>
@@ -5995,7 +6238,7 @@
             <p:cNvPr id="20" name="Arc 19">
               <a:extLst>
                 <a:ext uri="{FF2B5EF4-FFF2-40B4-BE49-F238E27FC236}">
-                  <a16:creationId xmlns:a16="http://schemas.microsoft.com/office/drawing/2014/main" xmlns="" id="{2A1C4EA9-9F3E-6C4D-A9D7-CC767EFDC316}"/>
+                  <a16:creationId xmlns="" xmlns:a16="http://schemas.microsoft.com/office/drawing/2014/main" id="{2A1C4EA9-9F3E-6C4D-A9D7-CC767EFDC316}"/>
                 </a:ext>
               </a:extLst>
             </p:cNvPr>
@@ -6047,7 +6290,7 @@
             <p:cNvPr id="21" name="TextBox 20">
               <a:extLst>
                 <a:ext uri="{FF2B5EF4-FFF2-40B4-BE49-F238E27FC236}">
-                  <a16:creationId xmlns:a16="http://schemas.microsoft.com/office/drawing/2014/main" xmlns="" id="{6906D6A8-C6DC-7E42-B6AC-74F70CA0B1F4}"/>
+                  <a16:creationId xmlns="" xmlns:a16="http://schemas.microsoft.com/office/drawing/2014/main" id="{6906D6A8-C6DC-7E42-B6AC-74F70CA0B1F4}"/>
                 </a:ext>
               </a:extLst>
             </p:cNvPr>
@@ -6127,7 +6370,7 @@
             <p:cNvPr id="4" name="Picture 3">
               <a:extLst>
                 <a:ext uri="{FF2B5EF4-FFF2-40B4-BE49-F238E27FC236}">
-                  <a16:creationId xmlns:a16="http://schemas.microsoft.com/office/drawing/2014/main" xmlns="" id="{9594DC97-7FD9-6C4C-AA8C-A206E9FDE4B1}"/>
+                  <a16:creationId xmlns="" xmlns:a16="http://schemas.microsoft.com/office/drawing/2014/main" id="{9594DC97-7FD9-6C4C-AA8C-A206E9FDE4B1}"/>
                 </a:ext>
               </a:extLst>
             </p:cNvPr>
@@ -6547,7 +6790,7 @@
             <p:cNvPr id="4" name="Picture 3">
               <a:extLst>
                 <a:ext uri="{FF2B5EF4-FFF2-40B4-BE49-F238E27FC236}">
-                  <a16:creationId xmlns:a16="http://schemas.microsoft.com/office/drawing/2014/main" xmlns="" id="{2E17FE61-10C3-E64B-ABB3-5FFD96909365}"/>
+                  <a16:creationId xmlns="" xmlns:a16="http://schemas.microsoft.com/office/drawing/2014/main" id="{2E17FE61-10C3-E64B-ABB3-5FFD96909365}"/>
                 </a:ext>
               </a:extLst>
             </p:cNvPr>
@@ -6576,7 +6819,7 @@
             <p:cNvPr id="5" name="Donut 4">
               <a:extLst>
                 <a:ext uri="{FF2B5EF4-FFF2-40B4-BE49-F238E27FC236}">
-                  <a16:creationId xmlns:a16="http://schemas.microsoft.com/office/drawing/2014/main" xmlns="" id="{A05B1990-5D9B-6044-AC97-F08B64FB7307}"/>
+                  <a16:creationId xmlns="" xmlns:a16="http://schemas.microsoft.com/office/drawing/2014/main" id="{A05B1990-5D9B-6044-AC97-F08B64FB7307}"/>
                 </a:ext>
               </a:extLst>
             </p:cNvPr>
@@ -6636,7 +6879,7 @@
             <p:cNvPr id="6" name="Donut 5">
               <a:extLst>
                 <a:ext uri="{FF2B5EF4-FFF2-40B4-BE49-F238E27FC236}">
-                  <a16:creationId xmlns:a16="http://schemas.microsoft.com/office/drawing/2014/main" xmlns="" id="{E87D4265-32C9-8641-9224-27CBAEBBC555}"/>
+                  <a16:creationId xmlns="" xmlns:a16="http://schemas.microsoft.com/office/drawing/2014/main" id="{E87D4265-32C9-8641-9224-27CBAEBBC555}"/>
                 </a:ext>
               </a:extLst>
             </p:cNvPr>
@@ -6696,7 +6939,7 @@
             <p:cNvPr id="7" name="Donut 6">
               <a:extLst>
                 <a:ext uri="{FF2B5EF4-FFF2-40B4-BE49-F238E27FC236}">
-                  <a16:creationId xmlns:a16="http://schemas.microsoft.com/office/drawing/2014/main" xmlns="" id="{94E5F9FB-A235-5A4B-ACA8-09116E31D8B2}"/>
+                  <a16:creationId xmlns="" xmlns:a16="http://schemas.microsoft.com/office/drawing/2014/main" id="{94E5F9FB-A235-5A4B-ACA8-09116E31D8B2}"/>
                 </a:ext>
               </a:extLst>
             </p:cNvPr>
@@ -6756,7 +6999,7 @@
             <p:cNvPr id="8" name="Donut 7">
               <a:extLst>
                 <a:ext uri="{FF2B5EF4-FFF2-40B4-BE49-F238E27FC236}">
-                  <a16:creationId xmlns:a16="http://schemas.microsoft.com/office/drawing/2014/main" xmlns="" id="{A8505250-A9B4-8441-82AA-79C65E428040}"/>
+                  <a16:creationId xmlns="" xmlns:a16="http://schemas.microsoft.com/office/drawing/2014/main" id="{A8505250-A9B4-8441-82AA-79C65E428040}"/>
                 </a:ext>
               </a:extLst>
             </p:cNvPr>
@@ -6898,7 +7141,7 @@
             <p:cNvPr id="4" name="Content Placeholder 6">
               <a:extLst>
                 <a:ext uri="{FF2B5EF4-FFF2-40B4-BE49-F238E27FC236}">
-                  <a16:creationId xmlns:a16="http://schemas.microsoft.com/office/drawing/2014/main" xmlns="" id="{B5FBF01F-5A46-AE45-A386-1197E9C84285}"/>
+                  <a16:creationId xmlns="" xmlns:a16="http://schemas.microsoft.com/office/drawing/2014/main" id="{B5FBF01F-5A46-AE45-A386-1197E9C84285}"/>
                 </a:ext>
               </a:extLst>
             </p:cNvPr>
@@ -6927,7 +7170,7 @@
             <p:cNvPr id="13" name="TextBox 12">
               <a:extLst>
                 <a:ext uri="{FF2B5EF4-FFF2-40B4-BE49-F238E27FC236}">
-                  <a16:creationId xmlns:a16="http://schemas.microsoft.com/office/drawing/2014/main" xmlns="" id="{7C96A7DC-9E77-1440-A26F-E69E8E484244}"/>
+                  <a16:creationId xmlns="" xmlns:a16="http://schemas.microsoft.com/office/drawing/2014/main" id="{7C96A7DC-9E77-1440-A26F-E69E8E484244}"/>
                 </a:ext>
               </a:extLst>
             </p:cNvPr>
@@ -6962,7 +7205,7 @@
             <p:cNvPr id="17" name="TextBox 16">
               <a:extLst>
                 <a:ext uri="{FF2B5EF4-FFF2-40B4-BE49-F238E27FC236}">
-                  <a16:creationId xmlns:a16="http://schemas.microsoft.com/office/drawing/2014/main" xmlns="" id="{B35BD146-CF53-6741-A6CA-F9917A9B6AB2}"/>
+                  <a16:creationId xmlns="" xmlns:a16="http://schemas.microsoft.com/office/drawing/2014/main" id="{B35BD146-CF53-6741-A6CA-F9917A9B6AB2}"/>
                 </a:ext>
               </a:extLst>
             </p:cNvPr>
@@ -7106,7 +7349,7 @@
             <p:cNvPr id="5" name="Picture 4">
               <a:extLst>
                 <a:ext uri="{FF2B5EF4-FFF2-40B4-BE49-F238E27FC236}">
-                  <a16:creationId xmlns:a16="http://schemas.microsoft.com/office/drawing/2014/main" xmlns="" id="{E0BBAB1D-27A1-D444-B305-BB3992CA6764}"/>
+                  <a16:creationId xmlns="" xmlns:a16="http://schemas.microsoft.com/office/drawing/2014/main" id="{E0BBAB1D-27A1-D444-B305-BB3992CA6764}"/>
                 </a:ext>
               </a:extLst>
             </p:cNvPr>
@@ -7135,7 +7378,7 @@
             <p:cNvPr id="6" name="TextBox 5">
               <a:extLst>
                 <a:ext uri="{FF2B5EF4-FFF2-40B4-BE49-F238E27FC236}">
-                  <a16:creationId xmlns:a16="http://schemas.microsoft.com/office/drawing/2014/main" xmlns="" id="{7C96A7DC-9E77-1440-A26F-E69E8E484244}"/>
+                  <a16:creationId xmlns="" xmlns:a16="http://schemas.microsoft.com/office/drawing/2014/main" id="{7C96A7DC-9E77-1440-A26F-E69E8E484244}"/>
                 </a:ext>
               </a:extLst>
             </p:cNvPr>
@@ -7170,7 +7413,7 @@
             <p:cNvPr id="7" name="TextBox 6">
               <a:extLst>
                 <a:ext uri="{FF2B5EF4-FFF2-40B4-BE49-F238E27FC236}">
-                  <a16:creationId xmlns:a16="http://schemas.microsoft.com/office/drawing/2014/main" xmlns="" id="{B35BD146-CF53-6741-A6CA-F9917A9B6AB2}"/>
+                  <a16:creationId xmlns="" xmlns:a16="http://schemas.microsoft.com/office/drawing/2014/main" id="{B35BD146-CF53-6741-A6CA-F9917A9B6AB2}"/>
                 </a:ext>
               </a:extLst>
             </p:cNvPr>
@@ -7765,7 +8008,7 @@
           <p:cNvPr id="4" name="Straight Connector 3">
             <a:extLst>
               <a:ext uri="{FF2B5EF4-FFF2-40B4-BE49-F238E27FC236}">
-                <a16:creationId xmlns:a16="http://schemas.microsoft.com/office/drawing/2014/main" xmlns="" id="{FD28D3A8-529B-8C4E-8288-913CD864D634}"/>
+                <a16:creationId xmlns="" xmlns:a16="http://schemas.microsoft.com/office/drawing/2014/main" id="{FD28D3A8-529B-8C4E-8288-913CD864D634}"/>
               </a:ext>
             </a:extLst>
           </p:cNvPr>
@@ -7803,7 +8046,7 @@
           <p:cNvPr id="5" name="Straight Connector 4">
             <a:extLst>
               <a:ext uri="{FF2B5EF4-FFF2-40B4-BE49-F238E27FC236}">
-                <a16:creationId xmlns:a16="http://schemas.microsoft.com/office/drawing/2014/main" xmlns="" id="{13F75B51-BB9F-4D40-B3C1-F4810DBCAB70}"/>
+                <a16:creationId xmlns="" xmlns:a16="http://schemas.microsoft.com/office/drawing/2014/main" id="{13F75B51-BB9F-4D40-B3C1-F4810DBCAB70}"/>
               </a:ext>
             </a:extLst>
           </p:cNvPr>
@@ -7841,7 +8084,7 @@
           <p:cNvPr id="6" name="Straight Connector 5">
             <a:extLst>
               <a:ext uri="{FF2B5EF4-FFF2-40B4-BE49-F238E27FC236}">
-                <a16:creationId xmlns:a16="http://schemas.microsoft.com/office/drawing/2014/main" xmlns="" id="{245E092D-CE07-3742-B7F7-4E54FC78EB19}"/>
+                <a16:creationId xmlns="" xmlns:a16="http://schemas.microsoft.com/office/drawing/2014/main" id="{245E092D-CE07-3742-B7F7-4E54FC78EB19}"/>
               </a:ext>
             </a:extLst>
           </p:cNvPr>
@@ -7884,7 +8127,7 @@
           <p:cNvPr id="7" name="Straight Connector 6">
             <a:extLst>
               <a:ext uri="{FF2B5EF4-FFF2-40B4-BE49-F238E27FC236}">
-                <a16:creationId xmlns:a16="http://schemas.microsoft.com/office/drawing/2014/main" xmlns="" id="{D2CD578E-7069-EB4B-9FE1-E85E81F0B9FA}"/>
+                <a16:creationId xmlns="" xmlns:a16="http://schemas.microsoft.com/office/drawing/2014/main" id="{D2CD578E-7069-EB4B-9FE1-E85E81F0B9FA}"/>
               </a:ext>
             </a:extLst>
           </p:cNvPr>
@@ -7927,7 +8170,7 @@
           <p:cNvPr id="8" name="Straight Connector 7">
             <a:extLst>
               <a:ext uri="{FF2B5EF4-FFF2-40B4-BE49-F238E27FC236}">
-                <a16:creationId xmlns:a16="http://schemas.microsoft.com/office/drawing/2014/main" xmlns="" id="{4D82641A-CCD1-2443-94A3-1E08780A7290}"/>
+                <a16:creationId xmlns="" xmlns:a16="http://schemas.microsoft.com/office/drawing/2014/main" id="{4D82641A-CCD1-2443-94A3-1E08780A7290}"/>
               </a:ext>
             </a:extLst>
           </p:cNvPr>
@@ -7970,7 +8213,7 @@
           <p:cNvPr id="9" name="Straight Connector 8">
             <a:extLst>
               <a:ext uri="{FF2B5EF4-FFF2-40B4-BE49-F238E27FC236}">
-                <a16:creationId xmlns:a16="http://schemas.microsoft.com/office/drawing/2014/main" xmlns="" id="{EF7A0A7C-12A4-C642-A587-1C9DB2BC1299}"/>
+                <a16:creationId xmlns="" xmlns:a16="http://schemas.microsoft.com/office/drawing/2014/main" id="{EF7A0A7C-12A4-C642-A587-1C9DB2BC1299}"/>
               </a:ext>
             </a:extLst>
           </p:cNvPr>
@@ -8013,7 +8256,7 @@
           <p:cNvPr id="10" name="Straight Connector 9">
             <a:extLst>
               <a:ext uri="{FF2B5EF4-FFF2-40B4-BE49-F238E27FC236}">
-                <a16:creationId xmlns:a16="http://schemas.microsoft.com/office/drawing/2014/main" xmlns="" id="{8C75174E-D43B-4B4D-AB2D-C81870CE047B}"/>
+                <a16:creationId xmlns="" xmlns:a16="http://schemas.microsoft.com/office/drawing/2014/main" id="{8C75174E-D43B-4B4D-AB2D-C81870CE047B}"/>
               </a:ext>
             </a:extLst>
           </p:cNvPr>
@@ -8056,7 +8299,7 @@
           <p:cNvPr id="11" name="Straight Connector 10">
             <a:extLst>
               <a:ext uri="{FF2B5EF4-FFF2-40B4-BE49-F238E27FC236}">
-                <a16:creationId xmlns:a16="http://schemas.microsoft.com/office/drawing/2014/main" xmlns="" id="{F4C2AEBC-8FA0-0D44-9999-B462F527608F}"/>
+                <a16:creationId xmlns="" xmlns:a16="http://schemas.microsoft.com/office/drawing/2014/main" id="{F4C2AEBC-8FA0-0D44-9999-B462F527608F}"/>
               </a:ext>
             </a:extLst>
           </p:cNvPr>
@@ -8099,7 +8342,7 @@
           <p:cNvPr id="12" name="Straight Connector 11">
             <a:extLst>
               <a:ext uri="{FF2B5EF4-FFF2-40B4-BE49-F238E27FC236}">
-                <a16:creationId xmlns:a16="http://schemas.microsoft.com/office/drawing/2014/main" xmlns="" id="{B8FB4FD3-B69F-DB49-B230-E409721C041B}"/>
+                <a16:creationId xmlns="" xmlns:a16="http://schemas.microsoft.com/office/drawing/2014/main" id="{B8FB4FD3-B69F-DB49-B230-E409721C041B}"/>
               </a:ext>
             </a:extLst>
           </p:cNvPr>
@@ -8142,7 +8385,7 @@
           <p:cNvPr id="13" name="Straight Connector 12">
             <a:extLst>
               <a:ext uri="{FF2B5EF4-FFF2-40B4-BE49-F238E27FC236}">
-                <a16:creationId xmlns:a16="http://schemas.microsoft.com/office/drawing/2014/main" xmlns="" id="{8A42643D-E60D-9B4B-9419-AAA8CC97FD62}"/>
+                <a16:creationId xmlns="" xmlns:a16="http://schemas.microsoft.com/office/drawing/2014/main" id="{8A42643D-E60D-9B4B-9419-AAA8CC97FD62}"/>
               </a:ext>
             </a:extLst>
           </p:cNvPr>
@@ -8185,7 +8428,7 @@
           <p:cNvPr id="14" name="Right Triangle 13">
             <a:extLst>
               <a:ext uri="{FF2B5EF4-FFF2-40B4-BE49-F238E27FC236}">
-                <a16:creationId xmlns:a16="http://schemas.microsoft.com/office/drawing/2014/main" xmlns="" id="{49740E78-E748-7744-B0EF-C287ABFE1252}"/>
+                <a16:creationId xmlns="" xmlns:a16="http://schemas.microsoft.com/office/drawing/2014/main" id="{49740E78-E748-7744-B0EF-C287ABFE1252}"/>
               </a:ext>
             </a:extLst>
           </p:cNvPr>
@@ -8231,7 +8474,7 @@
           <p:cNvPr id="15" name="Right Triangle 14">
             <a:extLst>
               <a:ext uri="{FF2B5EF4-FFF2-40B4-BE49-F238E27FC236}">
-                <a16:creationId xmlns:a16="http://schemas.microsoft.com/office/drawing/2014/main" xmlns="" id="{8FE36568-9112-AE40-949C-3BCE5D915CA3}"/>
+                <a16:creationId xmlns="" xmlns:a16="http://schemas.microsoft.com/office/drawing/2014/main" id="{8FE36568-9112-AE40-949C-3BCE5D915CA3}"/>
               </a:ext>
             </a:extLst>
           </p:cNvPr>

</xml_diff>

<commit_message>
Putting more pileup stuff in, some of it is very temporary and might be taken out.
</commit_message>
<xml_diff>
--- a/KinnairdThesis/Body/Figures/ThesisImages.pptx
+++ b/KinnairdThesis/Body/Figures/ThesisImages.pptx
@@ -16,6 +16,7 @@
     <p:sldId id="264" r:id="rId10"/>
     <p:sldId id="265" r:id="rId11"/>
     <p:sldId id="266" r:id="rId12"/>
+    <p:sldId id="267" r:id="rId13"/>
   </p:sldIdLst>
   <p:sldSz cx="12192000" cy="6858000"/>
   <p:notesSz cx="6858000" cy="9144000"/>
@@ -144,7 +145,7 @@
           <p:cNvPr id="2" name="Title 1">
             <a:extLst>
               <a:ext uri="{FF2B5EF4-FFF2-40B4-BE49-F238E27FC236}">
-                <a16:creationId xmlns="" xmlns:a16="http://schemas.microsoft.com/office/drawing/2014/main" id="{1B57B3C4-E435-3843-ADF5-0E6600617A31}"/>
+                <a16:creationId xmlns:a16="http://schemas.microsoft.com/office/drawing/2014/main" xmlns="" id="{1B57B3C4-E435-3843-ADF5-0E6600617A31}"/>
               </a:ext>
             </a:extLst>
           </p:cNvPr>
@@ -181,7 +182,7 @@
           <p:cNvPr id="3" name="Subtitle 2">
             <a:extLst>
               <a:ext uri="{FF2B5EF4-FFF2-40B4-BE49-F238E27FC236}">
-                <a16:creationId xmlns="" xmlns:a16="http://schemas.microsoft.com/office/drawing/2014/main" id="{B014CD73-195A-E146-85B8-CBD8E010BCF0}"/>
+                <a16:creationId xmlns:a16="http://schemas.microsoft.com/office/drawing/2014/main" xmlns="" id="{B014CD73-195A-E146-85B8-CBD8E010BCF0}"/>
               </a:ext>
             </a:extLst>
           </p:cNvPr>
@@ -251,7 +252,7 @@
           <p:cNvPr id="4" name="Date Placeholder 3">
             <a:extLst>
               <a:ext uri="{FF2B5EF4-FFF2-40B4-BE49-F238E27FC236}">
-                <a16:creationId xmlns="" xmlns:a16="http://schemas.microsoft.com/office/drawing/2014/main" id="{658C6929-9B51-6044-B476-05C2B4D39479}"/>
+                <a16:creationId xmlns:a16="http://schemas.microsoft.com/office/drawing/2014/main" xmlns="" id="{658C6929-9B51-6044-B476-05C2B4D39479}"/>
               </a:ext>
             </a:extLst>
           </p:cNvPr>
@@ -269,7 +270,7 @@
           <a:p>
             <a:fld id="{45D29F64-CD52-9145-B05C-AB9DB2C6669A}" type="datetimeFigureOut">
               <a:rPr lang="en-US" smtClean="0"/>
-              <a:t>5/1/19</a:t>
+              <a:t>5/14/19</a:t>
             </a:fld>
             <a:endParaRPr lang="en-US"/>
           </a:p>
@@ -280,7 +281,7 @@
           <p:cNvPr id="5" name="Footer Placeholder 4">
             <a:extLst>
               <a:ext uri="{FF2B5EF4-FFF2-40B4-BE49-F238E27FC236}">
-                <a16:creationId xmlns="" xmlns:a16="http://schemas.microsoft.com/office/drawing/2014/main" id="{EC3DA1B3-BF32-604F-9AA7-7B04982FD0E2}"/>
+                <a16:creationId xmlns:a16="http://schemas.microsoft.com/office/drawing/2014/main" xmlns="" id="{EC3DA1B3-BF32-604F-9AA7-7B04982FD0E2}"/>
               </a:ext>
             </a:extLst>
           </p:cNvPr>
@@ -305,7 +306,7 @@
           <p:cNvPr id="6" name="Slide Number Placeholder 5">
             <a:extLst>
               <a:ext uri="{FF2B5EF4-FFF2-40B4-BE49-F238E27FC236}">
-                <a16:creationId xmlns="" xmlns:a16="http://schemas.microsoft.com/office/drawing/2014/main" id="{88F32B42-BB5D-BB48-8764-9F99727CEF04}"/>
+                <a16:creationId xmlns:a16="http://schemas.microsoft.com/office/drawing/2014/main" xmlns="" id="{88F32B42-BB5D-BB48-8764-9F99727CEF04}"/>
               </a:ext>
             </a:extLst>
           </p:cNvPr>
@@ -364,7 +365,7 @@
           <p:cNvPr id="2" name="Title 1">
             <a:extLst>
               <a:ext uri="{FF2B5EF4-FFF2-40B4-BE49-F238E27FC236}">
-                <a16:creationId xmlns="" xmlns:a16="http://schemas.microsoft.com/office/drawing/2014/main" id="{9BBDEE72-3661-8A4F-BB8D-9F356D4CF066}"/>
+                <a16:creationId xmlns:a16="http://schemas.microsoft.com/office/drawing/2014/main" xmlns="" id="{9BBDEE72-3661-8A4F-BB8D-9F356D4CF066}"/>
               </a:ext>
             </a:extLst>
           </p:cNvPr>
@@ -392,7 +393,7 @@
           <p:cNvPr id="3" name="Vertical Text Placeholder 2">
             <a:extLst>
               <a:ext uri="{FF2B5EF4-FFF2-40B4-BE49-F238E27FC236}">
-                <a16:creationId xmlns="" xmlns:a16="http://schemas.microsoft.com/office/drawing/2014/main" id="{E5116906-5D68-0447-AFCD-16E5B4C58A42}"/>
+                <a16:creationId xmlns:a16="http://schemas.microsoft.com/office/drawing/2014/main" xmlns="" id="{E5116906-5D68-0447-AFCD-16E5B4C58A42}"/>
               </a:ext>
             </a:extLst>
           </p:cNvPr>
@@ -449,7 +450,7 @@
           <p:cNvPr id="4" name="Date Placeholder 3">
             <a:extLst>
               <a:ext uri="{FF2B5EF4-FFF2-40B4-BE49-F238E27FC236}">
-                <a16:creationId xmlns="" xmlns:a16="http://schemas.microsoft.com/office/drawing/2014/main" id="{C6E4F998-D16E-004E-A0D2-E7FF3D7E4F68}"/>
+                <a16:creationId xmlns:a16="http://schemas.microsoft.com/office/drawing/2014/main" xmlns="" id="{C6E4F998-D16E-004E-A0D2-E7FF3D7E4F68}"/>
               </a:ext>
             </a:extLst>
           </p:cNvPr>
@@ -467,7 +468,7 @@
           <a:p>
             <a:fld id="{45D29F64-CD52-9145-B05C-AB9DB2C6669A}" type="datetimeFigureOut">
               <a:rPr lang="en-US" smtClean="0"/>
-              <a:t>5/1/19</a:t>
+              <a:t>5/14/19</a:t>
             </a:fld>
             <a:endParaRPr lang="en-US"/>
           </a:p>
@@ -478,7 +479,7 @@
           <p:cNvPr id="5" name="Footer Placeholder 4">
             <a:extLst>
               <a:ext uri="{FF2B5EF4-FFF2-40B4-BE49-F238E27FC236}">
-                <a16:creationId xmlns="" xmlns:a16="http://schemas.microsoft.com/office/drawing/2014/main" id="{7089704E-D200-514A-B5B7-82DAA49671B8}"/>
+                <a16:creationId xmlns:a16="http://schemas.microsoft.com/office/drawing/2014/main" xmlns="" id="{7089704E-D200-514A-B5B7-82DAA49671B8}"/>
               </a:ext>
             </a:extLst>
           </p:cNvPr>
@@ -503,7 +504,7 @@
           <p:cNvPr id="6" name="Slide Number Placeholder 5">
             <a:extLst>
               <a:ext uri="{FF2B5EF4-FFF2-40B4-BE49-F238E27FC236}">
-                <a16:creationId xmlns="" xmlns:a16="http://schemas.microsoft.com/office/drawing/2014/main" id="{0C72463F-D09A-A346-A1F4-2911755D017A}"/>
+                <a16:creationId xmlns:a16="http://schemas.microsoft.com/office/drawing/2014/main" xmlns="" id="{0C72463F-D09A-A346-A1F4-2911755D017A}"/>
               </a:ext>
             </a:extLst>
           </p:cNvPr>
@@ -562,7 +563,7 @@
           <p:cNvPr id="2" name="Vertical Title 1">
             <a:extLst>
               <a:ext uri="{FF2B5EF4-FFF2-40B4-BE49-F238E27FC236}">
-                <a16:creationId xmlns="" xmlns:a16="http://schemas.microsoft.com/office/drawing/2014/main" id="{AB5946E9-397D-C049-A068-F804360E4392}"/>
+                <a16:creationId xmlns:a16="http://schemas.microsoft.com/office/drawing/2014/main" xmlns="" id="{AB5946E9-397D-C049-A068-F804360E4392}"/>
               </a:ext>
             </a:extLst>
           </p:cNvPr>
@@ -595,7 +596,7 @@
           <p:cNvPr id="3" name="Vertical Text Placeholder 2">
             <a:extLst>
               <a:ext uri="{FF2B5EF4-FFF2-40B4-BE49-F238E27FC236}">
-                <a16:creationId xmlns="" xmlns:a16="http://schemas.microsoft.com/office/drawing/2014/main" id="{89793A4A-3706-F84B-8A06-D16899A78EAB}"/>
+                <a16:creationId xmlns:a16="http://schemas.microsoft.com/office/drawing/2014/main" xmlns="" id="{89793A4A-3706-F84B-8A06-D16899A78EAB}"/>
               </a:ext>
             </a:extLst>
           </p:cNvPr>
@@ -657,7 +658,7 @@
           <p:cNvPr id="4" name="Date Placeholder 3">
             <a:extLst>
               <a:ext uri="{FF2B5EF4-FFF2-40B4-BE49-F238E27FC236}">
-                <a16:creationId xmlns="" xmlns:a16="http://schemas.microsoft.com/office/drawing/2014/main" id="{C25651AD-1FC0-704D-A779-A6A4A66E029E}"/>
+                <a16:creationId xmlns:a16="http://schemas.microsoft.com/office/drawing/2014/main" xmlns="" id="{C25651AD-1FC0-704D-A779-A6A4A66E029E}"/>
               </a:ext>
             </a:extLst>
           </p:cNvPr>
@@ -675,7 +676,7 @@
           <a:p>
             <a:fld id="{45D29F64-CD52-9145-B05C-AB9DB2C6669A}" type="datetimeFigureOut">
               <a:rPr lang="en-US" smtClean="0"/>
-              <a:t>5/1/19</a:t>
+              <a:t>5/14/19</a:t>
             </a:fld>
             <a:endParaRPr lang="en-US"/>
           </a:p>
@@ -686,7 +687,7 @@
           <p:cNvPr id="5" name="Footer Placeholder 4">
             <a:extLst>
               <a:ext uri="{FF2B5EF4-FFF2-40B4-BE49-F238E27FC236}">
-                <a16:creationId xmlns="" xmlns:a16="http://schemas.microsoft.com/office/drawing/2014/main" id="{8126BAD6-4443-004B-BAA1-FE8E085C9F8F}"/>
+                <a16:creationId xmlns:a16="http://schemas.microsoft.com/office/drawing/2014/main" xmlns="" id="{8126BAD6-4443-004B-BAA1-FE8E085C9F8F}"/>
               </a:ext>
             </a:extLst>
           </p:cNvPr>
@@ -711,7 +712,7 @@
           <p:cNvPr id="6" name="Slide Number Placeholder 5">
             <a:extLst>
               <a:ext uri="{FF2B5EF4-FFF2-40B4-BE49-F238E27FC236}">
-                <a16:creationId xmlns="" xmlns:a16="http://schemas.microsoft.com/office/drawing/2014/main" id="{14ED176A-F057-8D41-B00B-B444EA48310F}"/>
+                <a16:creationId xmlns:a16="http://schemas.microsoft.com/office/drawing/2014/main" xmlns="" id="{14ED176A-F057-8D41-B00B-B444EA48310F}"/>
               </a:ext>
             </a:extLst>
           </p:cNvPr>
@@ -770,7 +771,7 @@
           <p:cNvPr id="2" name="Title 1">
             <a:extLst>
               <a:ext uri="{FF2B5EF4-FFF2-40B4-BE49-F238E27FC236}">
-                <a16:creationId xmlns="" xmlns:a16="http://schemas.microsoft.com/office/drawing/2014/main" id="{A7D2B129-1333-1F47-BC4B-33786578E7FC}"/>
+                <a16:creationId xmlns:a16="http://schemas.microsoft.com/office/drawing/2014/main" xmlns="" id="{A7D2B129-1333-1F47-BC4B-33786578E7FC}"/>
               </a:ext>
             </a:extLst>
           </p:cNvPr>
@@ -798,7 +799,7 @@
           <p:cNvPr id="3" name="Content Placeholder 2">
             <a:extLst>
               <a:ext uri="{FF2B5EF4-FFF2-40B4-BE49-F238E27FC236}">
-                <a16:creationId xmlns="" xmlns:a16="http://schemas.microsoft.com/office/drawing/2014/main" id="{9ECDE62D-58E9-6849-98E2-AAA0CCAADDA0}"/>
+                <a16:creationId xmlns:a16="http://schemas.microsoft.com/office/drawing/2014/main" xmlns="" id="{9ECDE62D-58E9-6849-98E2-AAA0CCAADDA0}"/>
               </a:ext>
             </a:extLst>
           </p:cNvPr>
@@ -855,7 +856,7 @@
           <p:cNvPr id="4" name="Date Placeholder 3">
             <a:extLst>
               <a:ext uri="{FF2B5EF4-FFF2-40B4-BE49-F238E27FC236}">
-                <a16:creationId xmlns="" xmlns:a16="http://schemas.microsoft.com/office/drawing/2014/main" id="{EFEA11BF-2A45-4444-AEED-3C1B0AFA193B}"/>
+                <a16:creationId xmlns:a16="http://schemas.microsoft.com/office/drawing/2014/main" xmlns="" id="{EFEA11BF-2A45-4444-AEED-3C1B0AFA193B}"/>
               </a:ext>
             </a:extLst>
           </p:cNvPr>
@@ -873,7 +874,7 @@
           <a:p>
             <a:fld id="{45D29F64-CD52-9145-B05C-AB9DB2C6669A}" type="datetimeFigureOut">
               <a:rPr lang="en-US" smtClean="0"/>
-              <a:t>5/1/19</a:t>
+              <a:t>5/14/19</a:t>
             </a:fld>
             <a:endParaRPr lang="en-US"/>
           </a:p>
@@ -884,7 +885,7 @@
           <p:cNvPr id="5" name="Footer Placeholder 4">
             <a:extLst>
               <a:ext uri="{FF2B5EF4-FFF2-40B4-BE49-F238E27FC236}">
-                <a16:creationId xmlns="" xmlns:a16="http://schemas.microsoft.com/office/drawing/2014/main" id="{009B56B8-8A13-414C-BD29-0782690DB1B9}"/>
+                <a16:creationId xmlns:a16="http://schemas.microsoft.com/office/drawing/2014/main" xmlns="" id="{009B56B8-8A13-414C-BD29-0782690DB1B9}"/>
               </a:ext>
             </a:extLst>
           </p:cNvPr>
@@ -909,7 +910,7 @@
           <p:cNvPr id="6" name="Slide Number Placeholder 5">
             <a:extLst>
               <a:ext uri="{FF2B5EF4-FFF2-40B4-BE49-F238E27FC236}">
-                <a16:creationId xmlns="" xmlns:a16="http://schemas.microsoft.com/office/drawing/2014/main" id="{C4272DC2-C101-6D47-BF16-05E39FF23B46}"/>
+                <a16:creationId xmlns:a16="http://schemas.microsoft.com/office/drawing/2014/main" xmlns="" id="{C4272DC2-C101-6D47-BF16-05E39FF23B46}"/>
               </a:ext>
             </a:extLst>
           </p:cNvPr>
@@ -968,7 +969,7 @@
           <p:cNvPr id="2" name="Title 1">
             <a:extLst>
               <a:ext uri="{FF2B5EF4-FFF2-40B4-BE49-F238E27FC236}">
-                <a16:creationId xmlns="" xmlns:a16="http://schemas.microsoft.com/office/drawing/2014/main" id="{BAC22880-4B93-754D-9213-68DE4C171F7F}"/>
+                <a16:creationId xmlns:a16="http://schemas.microsoft.com/office/drawing/2014/main" xmlns="" id="{BAC22880-4B93-754D-9213-68DE4C171F7F}"/>
               </a:ext>
             </a:extLst>
           </p:cNvPr>
@@ -1005,7 +1006,7 @@
           <p:cNvPr id="3" name="Text Placeholder 2">
             <a:extLst>
               <a:ext uri="{FF2B5EF4-FFF2-40B4-BE49-F238E27FC236}">
-                <a16:creationId xmlns="" xmlns:a16="http://schemas.microsoft.com/office/drawing/2014/main" id="{6B11070C-81F8-0A4F-A81D-8C3C228925A3}"/>
+                <a16:creationId xmlns:a16="http://schemas.microsoft.com/office/drawing/2014/main" xmlns="" id="{6B11070C-81F8-0A4F-A81D-8C3C228925A3}"/>
               </a:ext>
             </a:extLst>
           </p:cNvPr>
@@ -1130,7 +1131,7 @@
           <p:cNvPr id="4" name="Date Placeholder 3">
             <a:extLst>
               <a:ext uri="{FF2B5EF4-FFF2-40B4-BE49-F238E27FC236}">
-                <a16:creationId xmlns="" xmlns:a16="http://schemas.microsoft.com/office/drawing/2014/main" id="{23C53577-1831-364C-B339-4121968BB6DA}"/>
+                <a16:creationId xmlns:a16="http://schemas.microsoft.com/office/drawing/2014/main" xmlns="" id="{23C53577-1831-364C-B339-4121968BB6DA}"/>
               </a:ext>
             </a:extLst>
           </p:cNvPr>
@@ -1148,7 +1149,7 @@
           <a:p>
             <a:fld id="{45D29F64-CD52-9145-B05C-AB9DB2C6669A}" type="datetimeFigureOut">
               <a:rPr lang="en-US" smtClean="0"/>
-              <a:t>5/1/19</a:t>
+              <a:t>5/14/19</a:t>
             </a:fld>
             <a:endParaRPr lang="en-US"/>
           </a:p>
@@ -1159,7 +1160,7 @@
           <p:cNvPr id="5" name="Footer Placeholder 4">
             <a:extLst>
               <a:ext uri="{FF2B5EF4-FFF2-40B4-BE49-F238E27FC236}">
-                <a16:creationId xmlns="" xmlns:a16="http://schemas.microsoft.com/office/drawing/2014/main" id="{9F9CBA5D-DA04-1849-97A2-5E156B619E76}"/>
+                <a16:creationId xmlns:a16="http://schemas.microsoft.com/office/drawing/2014/main" xmlns="" id="{9F9CBA5D-DA04-1849-97A2-5E156B619E76}"/>
               </a:ext>
             </a:extLst>
           </p:cNvPr>
@@ -1184,7 +1185,7 @@
           <p:cNvPr id="6" name="Slide Number Placeholder 5">
             <a:extLst>
               <a:ext uri="{FF2B5EF4-FFF2-40B4-BE49-F238E27FC236}">
-                <a16:creationId xmlns="" xmlns:a16="http://schemas.microsoft.com/office/drawing/2014/main" id="{CF1125EA-E670-6D43-9539-E2289A017005}"/>
+                <a16:creationId xmlns:a16="http://schemas.microsoft.com/office/drawing/2014/main" xmlns="" id="{CF1125EA-E670-6D43-9539-E2289A017005}"/>
               </a:ext>
             </a:extLst>
           </p:cNvPr>
@@ -1243,7 +1244,7 @@
           <p:cNvPr id="2" name="Title 1">
             <a:extLst>
               <a:ext uri="{FF2B5EF4-FFF2-40B4-BE49-F238E27FC236}">
-                <a16:creationId xmlns="" xmlns:a16="http://schemas.microsoft.com/office/drawing/2014/main" id="{262AD6D9-F928-4748-9C7F-D4545C80CAA4}"/>
+                <a16:creationId xmlns:a16="http://schemas.microsoft.com/office/drawing/2014/main" xmlns="" id="{262AD6D9-F928-4748-9C7F-D4545C80CAA4}"/>
               </a:ext>
             </a:extLst>
           </p:cNvPr>
@@ -1271,7 +1272,7 @@
           <p:cNvPr id="3" name="Content Placeholder 2">
             <a:extLst>
               <a:ext uri="{FF2B5EF4-FFF2-40B4-BE49-F238E27FC236}">
-                <a16:creationId xmlns="" xmlns:a16="http://schemas.microsoft.com/office/drawing/2014/main" id="{51D797BF-990E-9A4C-82AC-12AD06F3C184}"/>
+                <a16:creationId xmlns:a16="http://schemas.microsoft.com/office/drawing/2014/main" xmlns="" id="{51D797BF-990E-9A4C-82AC-12AD06F3C184}"/>
               </a:ext>
             </a:extLst>
           </p:cNvPr>
@@ -1333,7 +1334,7 @@
           <p:cNvPr id="4" name="Content Placeholder 3">
             <a:extLst>
               <a:ext uri="{FF2B5EF4-FFF2-40B4-BE49-F238E27FC236}">
-                <a16:creationId xmlns="" xmlns:a16="http://schemas.microsoft.com/office/drawing/2014/main" id="{3DC4D9D4-E298-6D41-ACED-A11435ED9D77}"/>
+                <a16:creationId xmlns:a16="http://schemas.microsoft.com/office/drawing/2014/main" xmlns="" id="{3DC4D9D4-E298-6D41-ACED-A11435ED9D77}"/>
               </a:ext>
             </a:extLst>
           </p:cNvPr>
@@ -1395,7 +1396,7 @@
           <p:cNvPr id="5" name="Date Placeholder 4">
             <a:extLst>
               <a:ext uri="{FF2B5EF4-FFF2-40B4-BE49-F238E27FC236}">
-                <a16:creationId xmlns="" xmlns:a16="http://schemas.microsoft.com/office/drawing/2014/main" id="{E17C102D-9E12-A244-9FD1-B8C9B6279B35}"/>
+                <a16:creationId xmlns:a16="http://schemas.microsoft.com/office/drawing/2014/main" xmlns="" id="{E17C102D-9E12-A244-9FD1-B8C9B6279B35}"/>
               </a:ext>
             </a:extLst>
           </p:cNvPr>
@@ -1413,7 +1414,7 @@
           <a:p>
             <a:fld id="{45D29F64-CD52-9145-B05C-AB9DB2C6669A}" type="datetimeFigureOut">
               <a:rPr lang="en-US" smtClean="0"/>
-              <a:t>5/1/19</a:t>
+              <a:t>5/14/19</a:t>
             </a:fld>
             <a:endParaRPr lang="en-US"/>
           </a:p>
@@ -1424,7 +1425,7 @@
           <p:cNvPr id="6" name="Footer Placeholder 5">
             <a:extLst>
               <a:ext uri="{FF2B5EF4-FFF2-40B4-BE49-F238E27FC236}">
-                <a16:creationId xmlns="" xmlns:a16="http://schemas.microsoft.com/office/drawing/2014/main" id="{0AFE2BCB-F3E8-8549-B6D4-F6040A561AFB}"/>
+                <a16:creationId xmlns:a16="http://schemas.microsoft.com/office/drawing/2014/main" xmlns="" id="{0AFE2BCB-F3E8-8549-B6D4-F6040A561AFB}"/>
               </a:ext>
             </a:extLst>
           </p:cNvPr>
@@ -1449,7 +1450,7 @@
           <p:cNvPr id="7" name="Slide Number Placeholder 6">
             <a:extLst>
               <a:ext uri="{FF2B5EF4-FFF2-40B4-BE49-F238E27FC236}">
-                <a16:creationId xmlns="" xmlns:a16="http://schemas.microsoft.com/office/drawing/2014/main" id="{C39549C6-C80B-BD44-8EF9-A19E907A7CFE}"/>
+                <a16:creationId xmlns:a16="http://schemas.microsoft.com/office/drawing/2014/main" xmlns="" id="{C39549C6-C80B-BD44-8EF9-A19E907A7CFE}"/>
               </a:ext>
             </a:extLst>
           </p:cNvPr>
@@ -1508,7 +1509,7 @@
           <p:cNvPr id="2" name="Title 1">
             <a:extLst>
               <a:ext uri="{FF2B5EF4-FFF2-40B4-BE49-F238E27FC236}">
-                <a16:creationId xmlns="" xmlns:a16="http://schemas.microsoft.com/office/drawing/2014/main" id="{FCEA8641-4386-D644-912C-5AF5E240C2CB}"/>
+                <a16:creationId xmlns:a16="http://schemas.microsoft.com/office/drawing/2014/main" xmlns="" id="{FCEA8641-4386-D644-912C-5AF5E240C2CB}"/>
               </a:ext>
             </a:extLst>
           </p:cNvPr>
@@ -1541,7 +1542,7 @@
           <p:cNvPr id="3" name="Text Placeholder 2">
             <a:extLst>
               <a:ext uri="{FF2B5EF4-FFF2-40B4-BE49-F238E27FC236}">
-                <a16:creationId xmlns="" xmlns:a16="http://schemas.microsoft.com/office/drawing/2014/main" id="{0003CA97-F6C8-4A4C-9811-B27526619B85}"/>
+                <a16:creationId xmlns:a16="http://schemas.microsoft.com/office/drawing/2014/main" xmlns="" id="{0003CA97-F6C8-4A4C-9811-B27526619B85}"/>
               </a:ext>
             </a:extLst>
           </p:cNvPr>
@@ -1612,7 +1613,7 @@
           <p:cNvPr id="4" name="Content Placeholder 3">
             <a:extLst>
               <a:ext uri="{FF2B5EF4-FFF2-40B4-BE49-F238E27FC236}">
-                <a16:creationId xmlns="" xmlns:a16="http://schemas.microsoft.com/office/drawing/2014/main" id="{C428443A-4B63-D44B-992D-A5333C63135A}"/>
+                <a16:creationId xmlns:a16="http://schemas.microsoft.com/office/drawing/2014/main" xmlns="" id="{C428443A-4B63-D44B-992D-A5333C63135A}"/>
               </a:ext>
             </a:extLst>
           </p:cNvPr>
@@ -1674,7 +1675,7 @@
           <p:cNvPr id="5" name="Text Placeholder 4">
             <a:extLst>
               <a:ext uri="{FF2B5EF4-FFF2-40B4-BE49-F238E27FC236}">
-                <a16:creationId xmlns="" xmlns:a16="http://schemas.microsoft.com/office/drawing/2014/main" id="{AB6EDAA3-A02E-E244-A6F8-31DA5C48F793}"/>
+                <a16:creationId xmlns:a16="http://schemas.microsoft.com/office/drawing/2014/main" xmlns="" id="{AB6EDAA3-A02E-E244-A6F8-31DA5C48F793}"/>
               </a:ext>
             </a:extLst>
           </p:cNvPr>
@@ -1745,7 +1746,7 @@
           <p:cNvPr id="6" name="Content Placeholder 5">
             <a:extLst>
               <a:ext uri="{FF2B5EF4-FFF2-40B4-BE49-F238E27FC236}">
-                <a16:creationId xmlns="" xmlns:a16="http://schemas.microsoft.com/office/drawing/2014/main" id="{A625C399-2052-374A-9A63-FF2581D9CF40}"/>
+                <a16:creationId xmlns:a16="http://schemas.microsoft.com/office/drawing/2014/main" xmlns="" id="{A625C399-2052-374A-9A63-FF2581D9CF40}"/>
               </a:ext>
             </a:extLst>
           </p:cNvPr>
@@ -1807,7 +1808,7 @@
           <p:cNvPr id="7" name="Date Placeholder 6">
             <a:extLst>
               <a:ext uri="{FF2B5EF4-FFF2-40B4-BE49-F238E27FC236}">
-                <a16:creationId xmlns="" xmlns:a16="http://schemas.microsoft.com/office/drawing/2014/main" id="{1A599785-4F03-0646-859D-A5B1A395854F}"/>
+                <a16:creationId xmlns:a16="http://schemas.microsoft.com/office/drawing/2014/main" xmlns="" id="{1A599785-4F03-0646-859D-A5B1A395854F}"/>
               </a:ext>
             </a:extLst>
           </p:cNvPr>
@@ -1825,7 +1826,7 @@
           <a:p>
             <a:fld id="{45D29F64-CD52-9145-B05C-AB9DB2C6669A}" type="datetimeFigureOut">
               <a:rPr lang="en-US" smtClean="0"/>
-              <a:t>5/1/19</a:t>
+              <a:t>5/14/19</a:t>
             </a:fld>
             <a:endParaRPr lang="en-US"/>
           </a:p>
@@ -1836,7 +1837,7 @@
           <p:cNvPr id="8" name="Footer Placeholder 7">
             <a:extLst>
               <a:ext uri="{FF2B5EF4-FFF2-40B4-BE49-F238E27FC236}">
-                <a16:creationId xmlns="" xmlns:a16="http://schemas.microsoft.com/office/drawing/2014/main" id="{6AE386FC-4B01-3D4A-B5E6-A4445E725378}"/>
+                <a16:creationId xmlns:a16="http://schemas.microsoft.com/office/drawing/2014/main" xmlns="" id="{6AE386FC-4B01-3D4A-B5E6-A4445E725378}"/>
               </a:ext>
             </a:extLst>
           </p:cNvPr>
@@ -1861,7 +1862,7 @@
           <p:cNvPr id="9" name="Slide Number Placeholder 8">
             <a:extLst>
               <a:ext uri="{FF2B5EF4-FFF2-40B4-BE49-F238E27FC236}">
-                <a16:creationId xmlns="" xmlns:a16="http://schemas.microsoft.com/office/drawing/2014/main" id="{39F0E8DD-4FFE-6540-8032-73316B86EFDA}"/>
+                <a16:creationId xmlns:a16="http://schemas.microsoft.com/office/drawing/2014/main" xmlns="" id="{39F0E8DD-4FFE-6540-8032-73316B86EFDA}"/>
               </a:ext>
             </a:extLst>
           </p:cNvPr>
@@ -1920,7 +1921,7 @@
           <p:cNvPr id="2" name="Title 1">
             <a:extLst>
               <a:ext uri="{FF2B5EF4-FFF2-40B4-BE49-F238E27FC236}">
-                <a16:creationId xmlns="" xmlns:a16="http://schemas.microsoft.com/office/drawing/2014/main" id="{3F5899AE-DFEB-5545-9F33-6F738A85210C}"/>
+                <a16:creationId xmlns:a16="http://schemas.microsoft.com/office/drawing/2014/main" xmlns="" id="{3F5899AE-DFEB-5545-9F33-6F738A85210C}"/>
               </a:ext>
             </a:extLst>
           </p:cNvPr>
@@ -1948,7 +1949,7 @@
           <p:cNvPr id="3" name="Date Placeholder 2">
             <a:extLst>
               <a:ext uri="{FF2B5EF4-FFF2-40B4-BE49-F238E27FC236}">
-                <a16:creationId xmlns="" xmlns:a16="http://schemas.microsoft.com/office/drawing/2014/main" id="{D2BBC704-A814-5E4D-A194-EEDA752CFFB8}"/>
+                <a16:creationId xmlns:a16="http://schemas.microsoft.com/office/drawing/2014/main" xmlns="" id="{D2BBC704-A814-5E4D-A194-EEDA752CFFB8}"/>
               </a:ext>
             </a:extLst>
           </p:cNvPr>
@@ -1966,7 +1967,7 @@
           <a:p>
             <a:fld id="{45D29F64-CD52-9145-B05C-AB9DB2C6669A}" type="datetimeFigureOut">
               <a:rPr lang="en-US" smtClean="0"/>
-              <a:t>5/1/19</a:t>
+              <a:t>5/14/19</a:t>
             </a:fld>
             <a:endParaRPr lang="en-US"/>
           </a:p>
@@ -1977,7 +1978,7 @@
           <p:cNvPr id="4" name="Footer Placeholder 3">
             <a:extLst>
               <a:ext uri="{FF2B5EF4-FFF2-40B4-BE49-F238E27FC236}">
-                <a16:creationId xmlns="" xmlns:a16="http://schemas.microsoft.com/office/drawing/2014/main" id="{5A0140CA-3C42-9F41-BAF5-D4C41D47C7CA}"/>
+                <a16:creationId xmlns:a16="http://schemas.microsoft.com/office/drawing/2014/main" xmlns="" id="{5A0140CA-3C42-9F41-BAF5-D4C41D47C7CA}"/>
               </a:ext>
             </a:extLst>
           </p:cNvPr>
@@ -2002,7 +2003,7 @@
           <p:cNvPr id="5" name="Slide Number Placeholder 4">
             <a:extLst>
               <a:ext uri="{FF2B5EF4-FFF2-40B4-BE49-F238E27FC236}">
-                <a16:creationId xmlns="" xmlns:a16="http://schemas.microsoft.com/office/drawing/2014/main" id="{37086D94-F459-FE40-9093-8A1D3E43A3A9}"/>
+                <a16:creationId xmlns:a16="http://schemas.microsoft.com/office/drawing/2014/main" xmlns="" id="{37086D94-F459-FE40-9093-8A1D3E43A3A9}"/>
               </a:ext>
             </a:extLst>
           </p:cNvPr>
@@ -2061,7 +2062,7 @@
           <p:cNvPr id="2" name="Date Placeholder 1">
             <a:extLst>
               <a:ext uri="{FF2B5EF4-FFF2-40B4-BE49-F238E27FC236}">
-                <a16:creationId xmlns="" xmlns:a16="http://schemas.microsoft.com/office/drawing/2014/main" id="{07A9ACC7-829A-7F4D-8420-A762D036E8CD}"/>
+                <a16:creationId xmlns:a16="http://schemas.microsoft.com/office/drawing/2014/main" xmlns="" id="{07A9ACC7-829A-7F4D-8420-A762D036E8CD}"/>
               </a:ext>
             </a:extLst>
           </p:cNvPr>
@@ -2079,7 +2080,7 @@
           <a:p>
             <a:fld id="{45D29F64-CD52-9145-B05C-AB9DB2C6669A}" type="datetimeFigureOut">
               <a:rPr lang="en-US" smtClean="0"/>
-              <a:t>5/1/19</a:t>
+              <a:t>5/14/19</a:t>
             </a:fld>
             <a:endParaRPr lang="en-US"/>
           </a:p>
@@ -2090,7 +2091,7 @@
           <p:cNvPr id="3" name="Footer Placeholder 2">
             <a:extLst>
               <a:ext uri="{FF2B5EF4-FFF2-40B4-BE49-F238E27FC236}">
-                <a16:creationId xmlns="" xmlns:a16="http://schemas.microsoft.com/office/drawing/2014/main" id="{8FBBF79B-F213-0A4F-B7FB-1DCDEC5761BE}"/>
+                <a16:creationId xmlns:a16="http://schemas.microsoft.com/office/drawing/2014/main" xmlns="" id="{8FBBF79B-F213-0A4F-B7FB-1DCDEC5761BE}"/>
               </a:ext>
             </a:extLst>
           </p:cNvPr>
@@ -2115,7 +2116,7 @@
           <p:cNvPr id="4" name="Slide Number Placeholder 3">
             <a:extLst>
               <a:ext uri="{FF2B5EF4-FFF2-40B4-BE49-F238E27FC236}">
-                <a16:creationId xmlns="" xmlns:a16="http://schemas.microsoft.com/office/drawing/2014/main" id="{B052EC9E-99E7-9841-A360-BDDEE513FB5E}"/>
+                <a16:creationId xmlns:a16="http://schemas.microsoft.com/office/drawing/2014/main" xmlns="" id="{B052EC9E-99E7-9841-A360-BDDEE513FB5E}"/>
               </a:ext>
             </a:extLst>
           </p:cNvPr>
@@ -2174,7 +2175,7 @@
           <p:cNvPr id="2" name="Title 1">
             <a:extLst>
               <a:ext uri="{FF2B5EF4-FFF2-40B4-BE49-F238E27FC236}">
-                <a16:creationId xmlns="" xmlns:a16="http://schemas.microsoft.com/office/drawing/2014/main" id="{070A10A2-F9B0-F344-8BC8-7A00229D2949}"/>
+                <a16:creationId xmlns:a16="http://schemas.microsoft.com/office/drawing/2014/main" xmlns="" id="{070A10A2-F9B0-F344-8BC8-7A00229D2949}"/>
               </a:ext>
             </a:extLst>
           </p:cNvPr>
@@ -2211,7 +2212,7 @@
           <p:cNvPr id="3" name="Content Placeholder 2">
             <a:extLst>
               <a:ext uri="{FF2B5EF4-FFF2-40B4-BE49-F238E27FC236}">
-                <a16:creationId xmlns="" xmlns:a16="http://schemas.microsoft.com/office/drawing/2014/main" id="{61A868DF-34E6-1848-983C-F5D0F4A4A893}"/>
+                <a16:creationId xmlns:a16="http://schemas.microsoft.com/office/drawing/2014/main" xmlns="" id="{61A868DF-34E6-1848-983C-F5D0F4A4A893}"/>
               </a:ext>
             </a:extLst>
           </p:cNvPr>
@@ -2301,7 +2302,7 @@
           <p:cNvPr id="4" name="Text Placeholder 3">
             <a:extLst>
               <a:ext uri="{FF2B5EF4-FFF2-40B4-BE49-F238E27FC236}">
-                <a16:creationId xmlns="" xmlns:a16="http://schemas.microsoft.com/office/drawing/2014/main" id="{376E3DE5-437D-434F-8910-AA8A3F1F1273}"/>
+                <a16:creationId xmlns:a16="http://schemas.microsoft.com/office/drawing/2014/main" xmlns="" id="{376E3DE5-437D-434F-8910-AA8A3F1F1273}"/>
               </a:ext>
             </a:extLst>
           </p:cNvPr>
@@ -2372,7 +2373,7 @@
           <p:cNvPr id="5" name="Date Placeholder 4">
             <a:extLst>
               <a:ext uri="{FF2B5EF4-FFF2-40B4-BE49-F238E27FC236}">
-                <a16:creationId xmlns="" xmlns:a16="http://schemas.microsoft.com/office/drawing/2014/main" id="{2F5DF4B7-6C2B-2B48-A238-F01177207469}"/>
+                <a16:creationId xmlns:a16="http://schemas.microsoft.com/office/drawing/2014/main" xmlns="" id="{2F5DF4B7-6C2B-2B48-A238-F01177207469}"/>
               </a:ext>
             </a:extLst>
           </p:cNvPr>
@@ -2390,7 +2391,7 @@
           <a:p>
             <a:fld id="{45D29F64-CD52-9145-B05C-AB9DB2C6669A}" type="datetimeFigureOut">
               <a:rPr lang="en-US" smtClean="0"/>
-              <a:t>5/1/19</a:t>
+              <a:t>5/14/19</a:t>
             </a:fld>
             <a:endParaRPr lang="en-US"/>
           </a:p>
@@ -2401,7 +2402,7 @@
           <p:cNvPr id="6" name="Footer Placeholder 5">
             <a:extLst>
               <a:ext uri="{FF2B5EF4-FFF2-40B4-BE49-F238E27FC236}">
-                <a16:creationId xmlns="" xmlns:a16="http://schemas.microsoft.com/office/drawing/2014/main" id="{A6EF2281-1ABA-7342-8F35-F0F2D64611D1}"/>
+                <a16:creationId xmlns:a16="http://schemas.microsoft.com/office/drawing/2014/main" xmlns="" id="{A6EF2281-1ABA-7342-8F35-F0F2D64611D1}"/>
               </a:ext>
             </a:extLst>
           </p:cNvPr>
@@ -2426,7 +2427,7 @@
           <p:cNvPr id="7" name="Slide Number Placeholder 6">
             <a:extLst>
               <a:ext uri="{FF2B5EF4-FFF2-40B4-BE49-F238E27FC236}">
-                <a16:creationId xmlns="" xmlns:a16="http://schemas.microsoft.com/office/drawing/2014/main" id="{56AACA73-B098-A443-86E5-3593BAFE81EC}"/>
+                <a16:creationId xmlns:a16="http://schemas.microsoft.com/office/drawing/2014/main" xmlns="" id="{56AACA73-B098-A443-86E5-3593BAFE81EC}"/>
               </a:ext>
             </a:extLst>
           </p:cNvPr>
@@ -2485,7 +2486,7 @@
           <p:cNvPr id="2" name="Title 1">
             <a:extLst>
               <a:ext uri="{FF2B5EF4-FFF2-40B4-BE49-F238E27FC236}">
-                <a16:creationId xmlns="" xmlns:a16="http://schemas.microsoft.com/office/drawing/2014/main" id="{FACBEB41-F32F-6449-BD04-263892C29998}"/>
+                <a16:creationId xmlns:a16="http://schemas.microsoft.com/office/drawing/2014/main" xmlns="" id="{FACBEB41-F32F-6449-BD04-263892C29998}"/>
               </a:ext>
             </a:extLst>
           </p:cNvPr>
@@ -2522,7 +2523,7 @@
           <p:cNvPr id="3" name="Picture Placeholder 2">
             <a:extLst>
               <a:ext uri="{FF2B5EF4-FFF2-40B4-BE49-F238E27FC236}">
-                <a16:creationId xmlns="" xmlns:a16="http://schemas.microsoft.com/office/drawing/2014/main" id="{0AD7B342-A149-9E4F-B5C0-EBE269660B70}"/>
+                <a16:creationId xmlns:a16="http://schemas.microsoft.com/office/drawing/2014/main" xmlns="" id="{0AD7B342-A149-9E4F-B5C0-EBE269660B70}"/>
               </a:ext>
             </a:extLst>
           </p:cNvPr>
@@ -2589,7 +2590,7 @@
           <p:cNvPr id="4" name="Text Placeholder 3">
             <a:extLst>
               <a:ext uri="{FF2B5EF4-FFF2-40B4-BE49-F238E27FC236}">
-                <a16:creationId xmlns="" xmlns:a16="http://schemas.microsoft.com/office/drawing/2014/main" id="{C7034AEB-C9CB-5641-A86A-8CE4D74CA17E}"/>
+                <a16:creationId xmlns:a16="http://schemas.microsoft.com/office/drawing/2014/main" xmlns="" id="{C7034AEB-C9CB-5641-A86A-8CE4D74CA17E}"/>
               </a:ext>
             </a:extLst>
           </p:cNvPr>
@@ -2660,7 +2661,7 @@
           <p:cNvPr id="5" name="Date Placeholder 4">
             <a:extLst>
               <a:ext uri="{FF2B5EF4-FFF2-40B4-BE49-F238E27FC236}">
-                <a16:creationId xmlns="" xmlns:a16="http://schemas.microsoft.com/office/drawing/2014/main" id="{5CF1E772-D352-3342-8861-BDE00833F7EF}"/>
+                <a16:creationId xmlns:a16="http://schemas.microsoft.com/office/drawing/2014/main" xmlns="" id="{5CF1E772-D352-3342-8861-BDE00833F7EF}"/>
               </a:ext>
             </a:extLst>
           </p:cNvPr>
@@ -2678,7 +2679,7 @@
           <a:p>
             <a:fld id="{45D29F64-CD52-9145-B05C-AB9DB2C6669A}" type="datetimeFigureOut">
               <a:rPr lang="en-US" smtClean="0"/>
-              <a:t>5/1/19</a:t>
+              <a:t>5/14/19</a:t>
             </a:fld>
             <a:endParaRPr lang="en-US"/>
           </a:p>
@@ -2689,7 +2690,7 @@
           <p:cNvPr id="6" name="Footer Placeholder 5">
             <a:extLst>
               <a:ext uri="{FF2B5EF4-FFF2-40B4-BE49-F238E27FC236}">
-                <a16:creationId xmlns="" xmlns:a16="http://schemas.microsoft.com/office/drawing/2014/main" id="{D38A5059-1DE0-404B-897B-615661062EB6}"/>
+                <a16:creationId xmlns:a16="http://schemas.microsoft.com/office/drawing/2014/main" xmlns="" id="{D38A5059-1DE0-404B-897B-615661062EB6}"/>
               </a:ext>
             </a:extLst>
           </p:cNvPr>
@@ -2714,7 +2715,7 @@
           <p:cNvPr id="7" name="Slide Number Placeholder 6">
             <a:extLst>
               <a:ext uri="{FF2B5EF4-FFF2-40B4-BE49-F238E27FC236}">
-                <a16:creationId xmlns="" xmlns:a16="http://schemas.microsoft.com/office/drawing/2014/main" id="{FEC9B585-298C-9142-B3E4-9683821FD0C3}"/>
+                <a16:creationId xmlns:a16="http://schemas.microsoft.com/office/drawing/2014/main" xmlns="" id="{FEC9B585-298C-9142-B3E4-9683821FD0C3}"/>
               </a:ext>
             </a:extLst>
           </p:cNvPr>
@@ -2778,7 +2779,7 @@
           <p:cNvPr id="2" name="Title Placeholder 1">
             <a:extLst>
               <a:ext uri="{FF2B5EF4-FFF2-40B4-BE49-F238E27FC236}">
-                <a16:creationId xmlns="" xmlns:a16="http://schemas.microsoft.com/office/drawing/2014/main" id="{4FA3C14F-9E83-204C-93F3-4A106E79DB61}"/>
+                <a16:creationId xmlns:a16="http://schemas.microsoft.com/office/drawing/2014/main" xmlns="" id="{4FA3C14F-9E83-204C-93F3-4A106E79DB61}"/>
               </a:ext>
             </a:extLst>
           </p:cNvPr>
@@ -2816,7 +2817,7 @@
           <p:cNvPr id="3" name="Text Placeholder 2">
             <a:extLst>
               <a:ext uri="{FF2B5EF4-FFF2-40B4-BE49-F238E27FC236}">
-                <a16:creationId xmlns="" xmlns:a16="http://schemas.microsoft.com/office/drawing/2014/main" id="{52192E8A-1958-E54D-9F03-ABB935DE7303}"/>
+                <a16:creationId xmlns:a16="http://schemas.microsoft.com/office/drawing/2014/main" xmlns="" id="{52192E8A-1958-E54D-9F03-ABB935DE7303}"/>
               </a:ext>
             </a:extLst>
           </p:cNvPr>
@@ -2883,7 +2884,7 @@
           <p:cNvPr id="4" name="Date Placeholder 3">
             <a:extLst>
               <a:ext uri="{FF2B5EF4-FFF2-40B4-BE49-F238E27FC236}">
-                <a16:creationId xmlns="" xmlns:a16="http://schemas.microsoft.com/office/drawing/2014/main" id="{7325D930-3387-4845-B851-27EB48A50D33}"/>
+                <a16:creationId xmlns:a16="http://schemas.microsoft.com/office/drawing/2014/main" xmlns="" id="{7325D930-3387-4845-B851-27EB48A50D33}"/>
               </a:ext>
             </a:extLst>
           </p:cNvPr>
@@ -2919,7 +2920,7 @@
           <a:p>
             <a:fld id="{45D29F64-CD52-9145-B05C-AB9DB2C6669A}" type="datetimeFigureOut">
               <a:rPr lang="en-US" smtClean="0"/>
-              <a:t>5/1/19</a:t>
+              <a:t>5/14/19</a:t>
             </a:fld>
             <a:endParaRPr lang="en-US"/>
           </a:p>
@@ -2930,7 +2931,7 @@
           <p:cNvPr id="5" name="Footer Placeholder 4">
             <a:extLst>
               <a:ext uri="{FF2B5EF4-FFF2-40B4-BE49-F238E27FC236}">
-                <a16:creationId xmlns="" xmlns:a16="http://schemas.microsoft.com/office/drawing/2014/main" id="{2B233A07-F101-A046-B90E-4F3B57476DFA}"/>
+                <a16:creationId xmlns:a16="http://schemas.microsoft.com/office/drawing/2014/main" xmlns="" id="{2B233A07-F101-A046-B90E-4F3B57476DFA}"/>
               </a:ext>
             </a:extLst>
           </p:cNvPr>
@@ -2973,7 +2974,7 @@
           <p:cNvPr id="6" name="Slide Number Placeholder 5">
             <a:extLst>
               <a:ext uri="{FF2B5EF4-FFF2-40B4-BE49-F238E27FC236}">
-                <a16:creationId xmlns="" xmlns:a16="http://schemas.microsoft.com/office/drawing/2014/main" id="{1864A47E-8A61-6845-AFEE-CDA6D79ED527}"/>
+                <a16:creationId xmlns:a16="http://schemas.microsoft.com/office/drawing/2014/main" xmlns="" id="{1864A47E-8A61-6845-AFEE-CDA6D79ED527}"/>
               </a:ext>
             </a:extLst>
           </p:cNvPr>
@@ -3341,7 +3342,7 @@
           <p:cNvPr id="2" name="Group 1">
             <a:extLst>
               <a:ext uri="{FF2B5EF4-FFF2-40B4-BE49-F238E27FC236}">
-                <a16:creationId xmlns="" xmlns:a16="http://schemas.microsoft.com/office/drawing/2014/main" id="{21C01040-A5E5-5440-BE0E-83D695C5AF7C}"/>
+                <a16:creationId xmlns:a16="http://schemas.microsoft.com/office/drawing/2014/main" xmlns="" id="{21C01040-A5E5-5440-BE0E-83D695C5AF7C}"/>
               </a:ext>
             </a:extLst>
           </p:cNvPr>
@@ -3361,7 +3362,7 @@
             <p:cNvPr id="4" name="Donut 3">
               <a:extLst>
                 <a:ext uri="{FF2B5EF4-FFF2-40B4-BE49-F238E27FC236}">
-                  <a16:creationId xmlns="" xmlns:a16="http://schemas.microsoft.com/office/drawing/2014/main" id="{3B2A361F-FDE3-7349-9868-C5FD2DECD6F0}"/>
+                  <a16:creationId xmlns:a16="http://schemas.microsoft.com/office/drawing/2014/main" xmlns="" id="{3B2A361F-FDE3-7349-9868-C5FD2DECD6F0}"/>
                 </a:ext>
               </a:extLst>
             </p:cNvPr>
@@ -3413,7 +3414,7 @@
             <p:cNvPr id="10" name="Donut 9">
               <a:extLst>
                 <a:ext uri="{FF2B5EF4-FFF2-40B4-BE49-F238E27FC236}">
-                  <a16:creationId xmlns="" xmlns:a16="http://schemas.microsoft.com/office/drawing/2014/main" id="{BDE35D79-7A44-0147-9C60-C169BA20B071}"/>
+                  <a16:creationId xmlns:a16="http://schemas.microsoft.com/office/drawing/2014/main" xmlns="" id="{BDE35D79-7A44-0147-9C60-C169BA20B071}"/>
                 </a:ext>
               </a:extLst>
             </p:cNvPr>
@@ -3465,7 +3466,7 @@
             <p:cNvPr id="12" name="Donut 11">
               <a:extLst>
                 <a:ext uri="{FF2B5EF4-FFF2-40B4-BE49-F238E27FC236}">
-                  <a16:creationId xmlns="" xmlns:a16="http://schemas.microsoft.com/office/drawing/2014/main" id="{E56352FB-83ED-8E41-A2BB-E276C56457E6}"/>
+                  <a16:creationId xmlns:a16="http://schemas.microsoft.com/office/drawing/2014/main" xmlns="" id="{E56352FB-83ED-8E41-A2BB-E276C56457E6}"/>
                 </a:ext>
               </a:extLst>
             </p:cNvPr>
@@ -3517,7 +3518,7 @@
             <p:cNvPr id="14" name="Donut 13">
               <a:extLst>
                 <a:ext uri="{FF2B5EF4-FFF2-40B4-BE49-F238E27FC236}">
-                  <a16:creationId xmlns="" xmlns:a16="http://schemas.microsoft.com/office/drawing/2014/main" id="{89D72E26-3D0E-F247-A940-D093C75917A9}"/>
+                  <a16:creationId xmlns:a16="http://schemas.microsoft.com/office/drawing/2014/main" xmlns="" id="{89D72E26-3D0E-F247-A940-D093C75917A9}"/>
                 </a:ext>
               </a:extLst>
             </p:cNvPr>
@@ -3569,7 +3570,7 @@
             <p:cNvPr id="16" name="Picture 15">
               <a:extLst>
                 <a:ext uri="{FF2B5EF4-FFF2-40B4-BE49-F238E27FC236}">
-                  <a16:creationId xmlns="" xmlns:a16="http://schemas.microsoft.com/office/drawing/2014/main" id="{65348E9C-5E39-C74F-8639-A4E368B71856}"/>
+                  <a16:creationId xmlns:a16="http://schemas.microsoft.com/office/drawing/2014/main" xmlns="" id="{65348E9C-5E39-C74F-8639-A4E368B71856}"/>
                 </a:ext>
               </a:extLst>
             </p:cNvPr>
@@ -3599,7 +3600,7 @@
             <p:cNvPr id="20" name="Picture 19">
               <a:extLst>
                 <a:ext uri="{FF2B5EF4-FFF2-40B4-BE49-F238E27FC236}">
-                  <a16:creationId xmlns="" xmlns:a16="http://schemas.microsoft.com/office/drawing/2014/main" id="{8803E842-7FB6-6F44-A22E-C3CA6FD7E349}"/>
+                  <a16:creationId xmlns:a16="http://schemas.microsoft.com/office/drawing/2014/main" xmlns="" id="{8803E842-7FB6-6F44-A22E-C3CA6FD7E349}"/>
                 </a:ext>
               </a:extLst>
             </p:cNvPr>
@@ -3629,7 +3630,7 @@
             <p:cNvPr id="21" name="Picture 20">
               <a:extLst>
                 <a:ext uri="{FF2B5EF4-FFF2-40B4-BE49-F238E27FC236}">
-                  <a16:creationId xmlns="" xmlns:a16="http://schemas.microsoft.com/office/drawing/2014/main" id="{303227FF-CA43-ED43-AA6E-589BBC9A9D59}"/>
+                  <a16:creationId xmlns:a16="http://schemas.microsoft.com/office/drawing/2014/main" xmlns="" id="{303227FF-CA43-ED43-AA6E-589BBC9A9D59}"/>
                 </a:ext>
               </a:extLst>
             </p:cNvPr>
@@ -3659,7 +3660,7 @@
             <p:cNvPr id="22" name="Picture 21">
               <a:extLst>
                 <a:ext uri="{FF2B5EF4-FFF2-40B4-BE49-F238E27FC236}">
-                  <a16:creationId xmlns="" xmlns:a16="http://schemas.microsoft.com/office/drawing/2014/main" id="{28D04A45-750D-5149-A269-373E9B55611F}"/>
+                  <a16:creationId xmlns:a16="http://schemas.microsoft.com/office/drawing/2014/main" xmlns="" id="{28D04A45-750D-5149-A269-373E9B55611F}"/>
                 </a:ext>
               </a:extLst>
             </p:cNvPr>
@@ -3689,7 +3690,7 @@
             <p:cNvPr id="24" name="Straight Arrow Connector 23">
               <a:extLst>
                 <a:ext uri="{FF2B5EF4-FFF2-40B4-BE49-F238E27FC236}">
-                  <a16:creationId xmlns="" xmlns:a16="http://schemas.microsoft.com/office/drawing/2014/main" id="{B0D28AA1-5104-B849-AF68-A0F380A29D2E}"/>
+                  <a16:creationId xmlns:a16="http://schemas.microsoft.com/office/drawing/2014/main" xmlns="" id="{B0D28AA1-5104-B849-AF68-A0F380A29D2E}"/>
                 </a:ext>
               </a:extLst>
             </p:cNvPr>
@@ -3731,7 +3732,7 @@
             <p:cNvPr id="25" name="Straight Arrow Connector 24">
               <a:extLst>
                 <a:ext uri="{FF2B5EF4-FFF2-40B4-BE49-F238E27FC236}">
-                  <a16:creationId xmlns="" xmlns:a16="http://schemas.microsoft.com/office/drawing/2014/main" id="{CD795BB4-ABBB-A64E-895F-0481BBE8E4EA}"/>
+                  <a16:creationId xmlns:a16="http://schemas.microsoft.com/office/drawing/2014/main" xmlns="" id="{CD795BB4-ABBB-A64E-895F-0481BBE8E4EA}"/>
                 </a:ext>
               </a:extLst>
             </p:cNvPr>
@@ -3775,7 +3776,7 @@
             <p:cNvPr id="27" name="Straight Arrow Connector 26">
               <a:extLst>
                 <a:ext uri="{FF2B5EF4-FFF2-40B4-BE49-F238E27FC236}">
-                  <a16:creationId xmlns="" xmlns:a16="http://schemas.microsoft.com/office/drawing/2014/main" id="{6F1AA03E-031D-8848-99C0-5A36AF0E5605}"/>
+                  <a16:creationId xmlns:a16="http://schemas.microsoft.com/office/drawing/2014/main" xmlns="" id="{6F1AA03E-031D-8848-99C0-5A36AF0E5605}"/>
                 </a:ext>
               </a:extLst>
             </p:cNvPr>
@@ -3820,7 +3821,7 @@
             <p:cNvPr id="28" name="Straight Arrow Connector 27">
               <a:extLst>
                 <a:ext uri="{FF2B5EF4-FFF2-40B4-BE49-F238E27FC236}">
-                  <a16:creationId xmlns="" xmlns:a16="http://schemas.microsoft.com/office/drawing/2014/main" id="{79B7509F-94D0-C044-9DC2-A554B9DB4C67}"/>
+                  <a16:creationId xmlns:a16="http://schemas.microsoft.com/office/drawing/2014/main" xmlns="" id="{79B7509F-94D0-C044-9DC2-A554B9DB4C67}"/>
                 </a:ext>
               </a:extLst>
             </p:cNvPr>
@@ -3865,7 +3866,7 @@
             <p:cNvPr id="34" name="Straight Arrow Connector 33">
               <a:extLst>
                 <a:ext uri="{FF2B5EF4-FFF2-40B4-BE49-F238E27FC236}">
-                  <a16:creationId xmlns="" xmlns:a16="http://schemas.microsoft.com/office/drawing/2014/main" id="{B64B615A-337A-E447-8F57-6F1155594D20}"/>
+                  <a16:creationId xmlns:a16="http://schemas.microsoft.com/office/drawing/2014/main" xmlns="" id="{B64B615A-337A-E447-8F57-6F1155594D20}"/>
                 </a:ext>
               </a:extLst>
             </p:cNvPr>
@@ -3910,7 +3911,7 @@
             <p:cNvPr id="35" name="Straight Arrow Connector 34">
               <a:extLst>
                 <a:ext uri="{FF2B5EF4-FFF2-40B4-BE49-F238E27FC236}">
-                  <a16:creationId xmlns="" xmlns:a16="http://schemas.microsoft.com/office/drawing/2014/main" id="{9CF84DCC-C72A-C348-8EC1-3A9D17DF0926}"/>
+                  <a16:creationId xmlns:a16="http://schemas.microsoft.com/office/drawing/2014/main" xmlns="" id="{9CF84DCC-C72A-C348-8EC1-3A9D17DF0926}"/>
                 </a:ext>
               </a:extLst>
             </p:cNvPr>
@@ -3955,7 +3956,7 @@
             <p:cNvPr id="36" name="Straight Arrow Connector 35">
               <a:extLst>
                 <a:ext uri="{FF2B5EF4-FFF2-40B4-BE49-F238E27FC236}">
-                  <a16:creationId xmlns="" xmlns:a16="http://schemas.microsoft.com/office/drawing/2014/main" id="{F1E7A251-AD40-E846-8C3D-087F623E8345}"/>
+                  <a16:creationId xmlns:a16="http://schemas.microsoft.com/office/drawing/2014/main" xmlns="" id="{F1E7A251-AD40-E846-8C3D-087F623E8345}"/>
                 </a:ext>
               </a:extLst>
             </p:cNvPr>
@@ -4000,7 +4001,7 @@
             <p:cNvPr id="37" name="TextBox 36">
               <a:extLst>
                 <a:ext uri="{FF2B5EF4-FFF2-40B4-BE49-F238E27FC236}">
-                  <a16:creationId xmlns="" xmlns:a16="http://schemas.microsoft.com/office/drawing/2014/main" id="{32233D15-47D3-4143-B8F5-40394DF42E51}"/>
+                  <a16:creationId xmlns:a16="http://schemas.microsoft.com/office/drawing/2014/main" xmlns="" id="{32233D15-47D3-4143-B8F5-40394DF42E51}"/>
                 </a:ext>
               </a:extLst>
             </p:cNvPr>
@@ -4039,7 +4040,7 @@
             <p:cNvPr id="38" name="TextBox 37">
               <a:extLst>
                 <a:ext uri="{FF2B5EF4-FFF2-40B4-BE49-F238E27FC236}">
-                  <a16:creationId xmlns="" xmlns:a16="http://schemas.microsoft.com/office/drawing/2014/main" id="{92F3D126-75F9-8E47-ACC8-6DE8CE351B10}"/>
+                  <a16:creationId xmlns:a16="http://schemas.microsoft.com/office/drawing/2014/main" xmlns="" id="{92F3D126-75F9-8E47-ACC8-6DE8CE351B10}"/>
                 </a:ext>
               </a:extLst>
             </p:cNvPr>
@@ -4074,7 +4075,7 @@
             <p:cNvPr id="40" name="Straight Arrow Connector 39">
               <a:extLst>
                 <a:ext uri="{FF2B5EF4-FFF2-40B4-BE49-F238E27FC236}">
-                  <a16:creationId xmlns="" xmlns:a16="http://schemas.microsoft.com/office/drawing/2014/main" id="{D129C510-0E92-F748-95B7-D3290C7F5292}"/>
+                  <a16:creationId xmlns:a16="http://schemas.microsoft.com/office/drawing/2014/main" xmlns="" id="{D129C510-0E92-F748-95B7-D3290C7F5292}"/>
                 </a:ext>
               </a:extLst>
             </p:cNvPr>
@@ -4120,7 +4121,7 @@
             <p:cNvPr id="45" name="Straight Arrow Connector 44">
               <a:extLst>
                 <a:ext uri="{FF2B5EF4-FFF2-40B4-BE49-F238E27FC236}">
-                  <a16:creationId xmlns="" xmlns:a16="http://schemas.microsoft.com/office/drawing/2014/main" id="{6A37E265-7C1D-4E42-8DE5-F1525A585474}"/>
+                  <a16:creationId xmlns:a16="http://schemas.microsoft.com/office/drawing/2014/main" xmlns="" id="{6A37E265-7C1D-4E42-8DE5-F1525A585474}"/>
                 </a:ext>
               </a:extLst>
             </p:cNvPr>
@@ -4166,7 +4167,7 @@
             <p:cNvPr id="47" name="Straight Arrow Connector 46">
               <a:extLst>
                 <a:ext uri="{FF2B5EF4-FFF2-40B4-BE49-F238E27FC236}">
-                  <a16:creationId xmlns="" xmlns:a16="http://schemas.microsoft.com/office/drawing/2014/main" id="{01B65FEC-66A0-E54A-A1A9-01441382ADA4}"/>
+                  <a16:creationId xmlns:a16="http://schemas.microsoft.com/office/drawing/2014/main" xmlns="" id="{01B65FEC-66A0-E54A-A1A9-01441382ADA4}"/>
                 </a:ext>
               </a:extLst>
             </p:cNvPr>
@@ -4212,7 +4213,7 @@
             <p:cNvPr id="48" name="Donut 47">
               <a:extLst>
                 <a:ext uri="{FF2B5EF4-FFF2-40B4-BE49-F238E27FC236}">
-                  <a16:creationId xmlns="" xmlns:a16="http://schemas.microsoft.com/office/drawing/2014/main" id="{1AD3C458-7283-094D-A4AC-30A8D632277B}"/>
+                  <a16:creationId xmlns:a16="http://schemas.microsoft.com/office/drawing/2014/main" xmlns="" id="{1AD3C458-7283-094D-A4AC-30A8D632277B}"/>
                 </a:ext>
               </a:extLst>
             </p:cNvPr>
@@ -4264,7 +4265,7 @@
             <p:cNvPr id="49" name="Donut 48">
               <a:extLst>
                 <a:ext uri="{FF2B5EF4-FFF2-40B4-BE49-F238E27FC236}">
-                  <a16:creationId xmlns="" xmlns:a16="http://schemas.microsoft.com/office/drawing/2014/main" id="{54296AC5-4EA6-2E48-B195-3F349430556D}"/>
+                  <a16:creationId xmlns:a16="http://schemas.microsoft.com/office/drawing/2014/main" xmlns="" id="{54296AC5-4EA6-2E48-B195-3F349430556D}"/>
                 </a:ext>
               </a:extLst>
             </p:cNvPr>
@@ -4316,7 +4317,7 @@
             <p:cNvPr id="50" name="Donut 49">
               <a:extLst>
                 <a:ext uri="{FF2B5EF4-FFF2-40B4-BE49-F238E27FC236}">
-                  <a16:creationId xmlns="" xmlns:a16="http://schemas.microsoft.com/office/drawing/2014/main" id="{ECEA39D9-22FF-2142-92DA-F78CCF525516}"/>
+                  <a16:creationId xmlns:a16="http://schemas.microsoft.com/office/drawing/2014/main" xmlns="" id="{ECEA39D9-22FF-2142-92DA-F78CCF525516}"/>
                 </a:ext>
               </a:extLst>
             </p:cNvPr>
@@ -4368,7 +4369,7 @@
             <p:cNvPr id="51" name="Donut 50">
               <a:extLst>
                 <a:ext uri="{FF2B5EF4-FFF2-40B4-BE49-F238E27FC236}">
-                  <a16:creationId xmlns="" xmlns:a16="http://schemas.microsoft.com/office/drawing/2014/main" id="{027D34A4-3CCC-5E4C-8C3B-04AEEFC20D48}"/>
+                  <a16:creationId xmlns:a16="http://schemas.microsoft.com/office/drawing/2014/main" xmlns="" id="{027D34A4-3CCC-5E4C-8C3B-04AEEFC20D48}"/>
                 </a:ext>
               </a:extLst>
             </p:cNvPr>
@@ -4420,7 +4421,7 @@
             <p:cNvPr id="52" name="Picture 51">
               <a:extLst>
                 <a:ext uri="{FF2B5EF4-FFF2-40B4-BE49-F238E27FC236}">
-                  <a16:creationId xmlns="" xmlns:a16="http://schemas.microsoft.com/office/drawing/2014/main" id="{5D3188FF-EB25-4542-9B0E-F071C76D530F}"/>
+                  <a16:creationId xmlns:a16="http://schemas.microsoft.com/office/drawing/2014/main" xmlns="" id="{5D3188FF-EB25-4542-9B0E-F071C76D530F}"/>
                 </a:ext>
               </a:extLst>
             </p:cNvPr>
@@ -4450,7 +4451,7 @@
             <p:cNvPr id="53" name="Picture 52">
               <a:extLst>
                 <a:ext uri="{FF2B5EF4-FFF2-40B4-BE49-F238E27FC236}">
-                  <a16:creationId xmlns="" xmlns:a16="http://schemas.microsoft.com/office/drawing/2014/main" id="{E80586E2-8A21-B44A-B2A6-E2A37289C605}"/>
+                  <a16:creationId xmlns:a16="http://schemas.microsoft.com/office/drawing/2014/main" xmlns="" id="{E80586E2-8A21-B44A-B2A6-E2A37289C605}"/>
                 </a:ext>
               </a:extLst>
             </p:cNvPr>
@@ -4480,7 +4481,7 @@
             <p:cNvPr id="54" name="Picture 53">
               <a:extLst>
                 <a:ext uri="{FF2B5EF4-FFF2-40B4-BE49-F238E27FC236}">
-                  <a16:creationId xmlns="" xmlns:a16="http://schemas.microsoft.com/office/drawing/2014/main" id="{10C0DB48-7DBA-884E-BE90-9CC62393ECA2}"/>
+                  <a16:creationId xmlns:a16="http://schemas.microsoft.com/office/drawing/2014/main" xmlns="" id="{10C0DB48-7DBA-884E-BE90-9CC62393ECA2}"/>
                 </a:ext>
               </a:extLst>
             </p:cNvPr>
@@ -4510,7 +4511,7 @@
             <p:cNvPr id="55" name="Picture 54">
               <a:extLst>
                 <a:ext uri="{FF2B5EF4-FFF2-40B4-BE49-F238E27FC236}">
-                  <a16:creationId xmlns="" xmlns:a16="http://schemas.microsoft.com/office/drawing/2014/main" id="{B4AE2BC6-738E-E543-8EFA-CBB71B892574}"/>
+                  <a16:creationId xmlns:a16="http://schemas.microsoft.com/office/drawing/2014/main" xmlns="" id="{B4AE2BC6-738E-E543-8EFA-CBB71B892574}"/>
                 </a:ext>
               </a:extLst>
             </p:cNvPr>
@@ -4540,7 +4541,7 @@
             <p:cNvPr id="57" name="Straight Arrow Connector 56">
               <a:extLst>
                 <a:ext uri="{FF2B5EF4-FFF2-40B4-BE49-F238E27FC236}">
-                  <a16:creationId xmlns="" xmlns:a16="http://schemas.microsoft.com/office/drawing/2014/main" id="{B7E0628D-3896-0D40-8C0F-2A2C37242174}"/>
+                  <a16:creationId xmlns:a16="http://schemas.microsoft.com/office/drawing/2014/main" xmlns="" id="{B7E0628D-3896-0D40-8C0F-2A2C37242174}"/>
                 </a:ext>
               </a:extLst>
             </p:cNvPr>
@@ -4585,7 +4586,7 @@
             <p:cNvPr id="58" name="Straight Arrow Connector 57">
               <a:extLst>
                 <a:ext uri="{FF2B5EF4-FFF2-40B4-BE49-F238E27FC236}">
-                  <a16:creationId xmlns="" xmlns:a16="http://schemas.microsoft.com/office/drawing/2014/main" id="{A8ACF2FB-D778-3646-84C4-C402FC592721}"/>
+                  <a16:creationId xmlns:a16="http://schemas.microsoft.com/office/drawing/2014/main" xmlns="" id="{A8ACF2FB-D778-3646-84C4-C402FC592721}"/>
                 </a:ext>
               </a:extLst>
             </p:cNvPr>
@@ -4630,7 +4631,7 @@
             <p:cNvPr id="59" name="Straight Arrow Connector 58">
               <a:extLst>
                 <a:ext uri="{FF2B5EF4-FFF2-40B4-BE49-F238E27FC236}">
-                  <a16:creationId xmlns="" xmlns:a16="http://schemas.microsoft.com/office/drawing/2014/main" id="{E424E677-519B-644C-852E-DAFC1041F8F9}"/>
+                  <a16:creationId xmlns:a16="http://schemas.microsoft.com/office/drawing/2014/main" xmlns="" id="{E424E677-519B-644C-852E-DAFC1041F8F9}"/>
                 </a:ext>
               </a:extLst>
             </p:cNvPr>
@@ -4675,7 +4676,7 @@
             <p:cNvPr id="60" name="Straight Arrow Connector 59">
               <a:extLst>
                 <a:ext uri="{FF2B5EF4-FFF2-40B4-BE49-F238E27FC236}">
-                  <a16:creationId xmlns="" xmlns:a16="http://schemas.microsoft.com/office/drawing/2014/main" id="{CC702EAB-6327-3548-9BA5-19449AE977CC}"/>
+                  <a16:creationId xmlns:a16="http://schemas.microsoft.com/office/drawing/2014/main" xmlns="" id="{CC702EAB-6327-3548-9BA5-19449AE977CC}"/>
                 </a:ext>
               </a:extLst>
             </p:cNvPr>
@@ -4720,7 +4721,7 @@
             <p:cNvPr id="61" name="Straight Arrow Connector 60">
               <a:extLst>
                 <a:ext uri="{FF2B5EF4-FFF2-40B4-BE49-F238E27FC236}">
-                  <a16:creationId xmlns="" xmlns:a16="http://schemas.microsoft.com/office/drawing/2014/main" id="{0E175693-96D0-5548-87EF-74C7A77A63D4}"/>
+                  <a16:creationId xmlns:a16="http://schemas.microsoft.com/office/drawing/2014/main" xmlns="" id="{0E175693-96D0-5548-87EF-74C7A77A63D4}"/>
                 </a:ext>
               </a:extLst>
             </p:cNvPr>
@@ -4765,7 +4766,7 @@
             <p:cNvPr id="62" name="Straight Arrow Connector 61">
               <a:extLst>
                 <a:ext uri="{FF2B5EF4-FFF2-40B4-BE49-F238E27FC236}">
-                  <a16:creationId xmlns="" xmlns:a16="http://schemas.microsoft.com/office/drawing/2014/main" id="{F787A27D-C2A6-494E-9E42-2C8E021EA6BA}"/>
+                  <a16:creationId xmlns:a16="http://schemas.microsoft.com/office/drawing/2014/main" xmlns="" id="{F787A27D-C2A6-494E-9E42-2C8E021EA6BA}"/>
                 </a:ext>
               </a:extLst>
             </p:cNvPr>
@@ -4810,7 +4811,7 @@
             <p:cNvPr id="65" name="Straight Arrow Connector 64">
               <a:extLst>
                 <a:ext uri="{FF2B5EF4-FFF2-40B4-BE49-F238E27FC236}">
-                  <a16:creationId xmlns="" xmlns:a16="http://schemas.microsoft.com/office/drawing/2014/main" id="{665894B1-601F-B54F-B53B-D7434ED7704F}"/>
+                  <a16:creationId xmlns:a16="http://schemas.microsoft.com/office/drawing/2014/main" xmlns="" id="{665894B1-601F-B54F-B53B-D7434ED7704F}"/>
                 </a:ext>
               </a:extLst>
             </p:cNvPr>
@@ -4857,7 +4858,7 @@
             <p:cNvPr id="66" name="Straight Arrow Connector 65">
               <a:extLst>
                 <a:ext uri="{FF2B5EF4-FFF2-40B4-BE49-F238E27FC236}">
-                  <a16:creationId xmlns="" xmlns:a16="http://schemas.microsoft.com/office/drawing/2014/main" id="{8D00B99C-A25A-0544-9CCC-62BED27C14E3}"/>
+                  <a16:creationId xmlns:a16="http://schemas.microsoft.com/office/drawing/2014/main" xmlns="" id="{8D00B99C-A25A-0544-9CCC-62BED27C14E3}"/>
                 </a:ext>
               </a:extLst>
             </p:cNvPr>
@@ -4904,7 +4905,7 @@
             <p:cNvPr id="74" name="Straight Arrow Connector 73">
               <a:extLst>
                 <a:ext uri="{FF2B5EF4-FFF2-40B4-BE49-F238E27FC236}">
-                  <a16:creationId xmlns="" xmlns:a16="http://schemas.microsoft.com/office/drawing/2014/main" id="{9897DA5B-3CCB-0745-A483-551471B7CE67}"/>
+                  <a16:creationId xmlns:a16="http://schemas.microsoft.com/office/drawing/2014/main" xmlns="" id="{9897DA5B-3CCB-0745-A483-551471B7CE67}"/>
                 </a:ext>
               </a:extLst>
             </p:cNvPr>
@@ -4951,7 +4952,7 @@
             <p:cNvPr id="86" name="TextBox 85">
               <a:extLst>
                 <a:ext uri="{FF2B5EF4-FFF2-40B4-BE49-F238E27FC236}">
-                  <a16:creationId xmlns="" xmlns:a16="http://schemas.microsoft.com/office/drawing/2014/main" id="{08D6A736-4169-4F4B-A504-8B317B727C73}"/>
+                  <a16:creationId xmlns:a16="http://schemas.microsoft.com/office/drawing/2014/main" xmlns="" id="{08D6A736-4169-4F4B-A504-8B317B727C73}"/>
                 </a:ext>
               </a:extLst>
             </p:cNvPr>
@@ -4986,7 +4987,7 @@
             <p:cNvPr id="87" name="Straight Arrow Connector 86">
               <a:extLst>
                 <a:ext uri="{FF2B5EF4-FFF2-40B4-BE49-F238E27FC236}">
-                  <a16:creationId xmlns="" xmlns:a16="http://schemas.microsoft.com/office/drawing/2014/main" id="{D894C924-CCB7-294F-92D3-516C5963A38F}"/>
+                  <a16:creationId xmlns:a16="http://schemas.microsoft.com/office/drawing/2014/main" xmlns="" id="{D894C924-CCB7-294F-92D3-516C5963A38F}"/>
                 </a:ext>
               </a:extLst>
             </p:cNvPr>
@@ -5030,7 +5031,7 @@
             <p:cNvPr id="88" name="Straight Arrow Connector 87">
               <a:extLst>
                 <a:ext uri="{FF2B5EF4-FFF2-40B4-BE49-F238E27FC236}">
-                  <a16:creationId xmlns="" xmlns:a16="http://schemas.microsoft.com/office/drawing/2014/main" id="{643ADA86-9B33-E942-973D-84EF8B397DA7}"/>
+                  <a16:creationId xmlns:a16="http://schemas.microsoft.com/office/drawing/2014/main" xmlns="" id="{643ADA86-9B33-E942-973D-84EF8B397DA7}"/>
                 </a:ext>
               </a:extLst>
             </p:cNvPr>
@@ -5074,7 +5075,7 @@
             <p:cNvPr id="92" name="Rectangle 91">
               <a:extLst>
                 <a:ext uri="{FF2B5EF4-FFF2-40B4-BE49-F238E27FC236}">
-                  <a16:creationId xmlns="" xmlns:a16="http://schemas.microsoft.com/office/drawing/2014/main" id="{0706AB93-4F5E-9F46-B494-FAA5B69D424F}"/>
+                  <a16:creationId xmlns:a16="http://schemas.microsoft.com/office/drawing/2014/main" xmlns="" id="{0706AB93-4F5E-9F46-B494-FAA5B69D424F}"/>
                 </a:ext>
               </a:extLst>
             </p:cNvPr>
@@ -5790,6 +5791,2056 @@
 </p:sld>
 </file>
 
+<file path=ppt/slides/slide12.xml><?xml version="1.0" encoding="utf-8"?>
+<p:sld xmlns:a="http://schemas.openxmlformats.org/drawingml/2006/main" xmlns:r="http://schemas.openxmlformats.org/officeDocument/2006/relationships" xmlns:p="http://schemas.openxmlformats.org/presentationml/2006/main">
+  <p:cSld>
+    <p:spTree>
+      <p:nvGrpSpPr>
+        <p:cNvPr id="1" name=""/>
+        <p:cNvGrpSpPr/>
+        <p:nvPr/>
+      </p:nvGrpSpPr>
+      <p:grpSpPr>
+        <a:xfrm>
+          <a:off x="0" y="0"/>
+          <a:ext cx="0" cy="0"/>
+          <a:chOff x="0" y="0"/>
+          <a:chExt cx="0" cy="0"/>
+        </a:xfrm>
+      </p:grpSpPr>
+      <p:sp>
+        <p:nvSpPr>
+          <p:cNvPr id="5" name="Freeform 4">
+            <a:extLst>
+              <a:ext uri="{FF2B5EF4-FFF2-40B4-BE49-F238E27FC236}">
+                <a16:creationId xmlns="" xmlns:a16="http://schemas.microsoft.com/office/drawing/2014/main" id="{74D7D3D4-4089-724B-8458-CF97E05D6CA5}"/>
+              </a:ext>
+            </a:extLst>
+          </p:cNvPr>
+          <p:cNvSpPr/>
+          <p:nvPr/>
+        </p:nvSpPr>
+        <p:spPr>
+          <a:xfrm>
+            <a:off x="2526992" y="1902377"/>
+            <a:ext cx="5982083" cy="772605"/>
+          </a:xfrm>
+          <a:custGeom>
+            <a:avLst/>
+            <a:gdLst>
+              <a:gd name="connsiteX0" fmla="*/ 61724 w 4925824"/>
+              <a:gd name="connsiteY0" fmla="*/ 592012 h 613793"/>
+              <a:gd name="connsiteX1" fmla="*/ 112524 w 4925824"/>
+              <a:gd name="connsiteY1" fmla="*/ 598362 h 613793"/>
+              <a:gd name="connsiteX2" fmla="*/ 2335024 w 4925824"/>
+              <a:gd name="connsiteY2" fmla="*/ 90362 h 613793"/>
+              <a:gd name="connsiteX3" fmla="*/ 3141474 w 4925824"/>
+              <a:gd name="connsiteY3" fmla="*/ 14162 h 613793"/>
+              <a:gd name="connsiteX4" fmla="*/ 3884424 w 4925824"/>
+              <a:gd name="connsiteY4" fmla="*/ 1462 h 613793"/>
+              <a:gd name="connsiteX5" fmla="*/ 4373374 w 4925824"/>
+              <a:gd name="connsiteY5" fmla="*/ 33212 h 613793"/>
+              <a:gd name="connsiteX6" fmla="*/ 4570224 w 4925824"/>
+              <a:gd name="connsiteY6" fmla="*/ 39562 h 613793"/>
+              <a:gd name="connsiteX7" fmla="*/ 4925824 w 4925824"/>
+              <a:gd name="connsiteY7" fmla="*/ 71312 h 613793"/>
+              <a:gd name="connsiteX0" fmla="*/ 97611 w 4961711"/>
+              <a:gd name="connsiteY0" fmla="*/ 607924 h 643532"/>
+              <a:gd name="connsiteX1" fmla="*/ 148411 w 4961711"/>
+              <a:gd name="connsiteY1" fmla="*/ 614274 h 643532"/>
+              <a:gd name="connsiteX2" fmla="*/ 1024711 w 4961711"/>
+              <a:gd name="connsiteY2" fmla="*/ 360274 h 643532"/>
+              <a:gd name="connsiteX3" fmla="*/ 3177361 w 4961711"/>
+              <a:gd name="connsiteY3" fmla="*/ 30074 h 643532"/>
+              <a:gd name="connsiteX4" fmla="*/ 3920311 w 4961711"/>
+              <a:gd name="connsiteY4" fmla="*/ 17374 h 643532"/>
+              <a:gd name="connsiteX5" fmla="*/ 4409261 w 4961711"/>
+              <a:gd name="connsiteY5" fmla="*/ 49124 h 643532"/>
+              <a:gd name="connsiteX6" fmla="*/ 4606111 w 4961711"/>
+              <a:gd name="connsiteY6" fmla="*/ 55474 h 643532"/>
+              <a:gd name="connsiteX7" fmla="*/ 4961711 w 4961711"/>
+              <a:gd name="connsiteY7" fmla="*/ 87224 h 643532"/>
+              <a:gd name="connsiteX0" fmla="*/ 97611 w 4961711"/>
+              <a:gd name="connsiteY0" fmla="*/ 607924 h 643532"/>
+              <a:gd name="connsiteX1" fmla="*/ 148411 w 4961711"/>
+              <a:gd name="connsiteY1" fmla="*/ 614274 h 643532"/>
+              <a:gd name="connsiteX2" fmla="*/ 1024711 w 4961711"/>
+              <a:gd name="connsiteY2" fmla="*/ 360274 h 643532"/>
+              <a:gd name="connsiteX3" fmla="*/ 3177361 w 4961711"/>
+              <a:gd name="connsiteY3" fmla="*/ 30074 h 643532"/>
+              <a:gd name="connsiteX4" fmla="*/ 3920311 w 4961711"/>
+              <a:gd name="connsiteY4" fmla="*/ 17374 h 643532"/>
+              <a:gd name="connsiteX5" fmla="*/ 4409261 w 4961711"/>
+              <a:gd name="connsiteY5" fmla="*/ 49124 h 643532"/>
+              <a:gd name="connsiteX6" fmla="*/ 4606111 w 4961711"/>
+              <a:gd name="connsiteY6" fmla="*/ 55474 h 643532"/>
+              <a:gd name="connsiteX7" fmla="*/ 4961711 w 4961711"/>
+              <a:gd name="connsiteY7" fmla="*/ 87224 h 643532"/>
+              <a:gd name="connsiteX0" fmla="*/ 97611 w 4961711"/>
+              <a:gd name="connsiteY0" fmla="*/ 593460 h 629068"/>
+              <a:gd name="connsiteX1" fmla="*/ 148411 w 4961711"/>
+              <a:gd name="connsiteY1" fmla="*/ 599810 h 629068"/>
+              <a:gd name="connsiteX2" fmla="*/ 1024711 w 4961711"/>
+              <a:gd name="connsiteY2" fmla="*/ 345810 h 629068"/>
+              <a:gd name="connsiteX3" fmla="*/ 2135961 w 4961711"/>
+              <a:gd name="connsiteY3" fmla="*/ 117210 h 629068"/>
+              <a:gd name="connsiteX4" fmla="*/ 3920311 w 4961711"/>
+              <a:gd name="connsiteY4" fmla="*/ 2910 h 629068"/>
+              <a:gd name="connsiteX5" fmla="*/ 4409261 w 4961711"/>
+              <a:gd name="connsiteY5" fmla="*/ 34660 h 629068"/>
+              <a:gd name="connsiteX6" fmla="*/ 4606111 w 4961711"/>
+              <a:gd name="connsiteY6" fmla="*/ 41010 h 629068"/>
+              <a:gd name="connsiteX7" fmla="*/ 4961711 w 4961711"/>
+              <a:gd name="connsiteY7" fmla="*/ 72760 h 629068"/>
+              <a:gd name="connsiteX0" fmla="*/ 97611 w 4961711"/>
+              <a:gd name="connsiteY0" fmla="*/ 593460 h 629068"/>
+              <a:gd name="connsiteX1" fmla="*/ 148411 w 4961711"/>
+              <a:gd name="connsiteY1" fmla="*/ 599810 h 629068"/>
+              <a:gd name="connsiteX2" fmla="*/ 1024711 w 4961711"/>
+              <a:gd name="connsiteY2" fmla="*/ 345810 h 629068"/>
+              <a:gd name="connsiteX3" fmla="*/ 2135961 w 4961711"/>
+              <a:gd name="connsiteY3" fmla="*/ 117210 h 629068"/>
+              <a:gd name="connsiteX4" fmla="*/ 3920311 w 4961711"/>
+              <a:gd name="connsiteY4" fmla="*/ 2910 h 629068"/>
+              <a:gd name="connsiteX5" fmla="*/ 4409261 w 4961711"/>
+              <a:gd name="connsiteY5" fmla="*/ 34660 h 629068"/>
+              <a:gd name="connsiteX6" fmla="*/ 4606111 w 4961711"/>
+              <a:gd name="connsiteY6" fmla="*/ 41010 h 629068"/>
+              <a:gd name="connsiteX7" fmla="*/ 4961711 w 4961711"/>
+              <a:gd name="connsiteY7" fmla="*/ 72760 h 629068"/>
+              <a:gd name="connsiteX0" fmla="*/ 97611 w 4961711"/>
+              <a:gd name="connsiteY0" fmla="*/ 581565 h 617173"/>
+              <a:gd name="connsiteX1" fmla="*/ 148411 w 4961711"/>
+              <a:gd name="connsiteY1" fmla="*/ 587915 h 617173"/>
+              <a:gd name="connsiteX2" fmla="*/ 1024711 w 4961711"/>
+              <a:gd name="connsiteY2" fmla="*/ 333915 h 617173"/>
+              <a:gd name="connsiteX3" fmla="*/ 2135961 w 4961711"/>
+              <a:gd name="connsiteY3" fmla="*/ 105315 h 617173"/>
+              <a:gd name="connsiteX4" fmla="*/ 3171011 w 4961711"/>
+              <a:gd name="connsiteY4" fmla="*/ 3715 h 617173"/>
+              <a:gd name="connsiteX5" fmla="*/ 4409261 w 4961711"/>
+              <a:gd name="connsiteY5" fmla="*/ 22765 h 617173"/>
+              <a:gd name="connsiteX6" fmla="*/ 4606111 w 4961711"/>
+              <a:gd name="connsiteY6" fmla="*/ 29115 h 617173"/>
+              <a:gd name="connsiteX7" fmla="*/ 4961711 w 4961711"/>
+              <a:gd name="connsiteY7" fmla="*/ 60865 h 617173"/>
+              <a:gd name="connsiteX0" fmla="*/ 97611 w 4961711"/>
+              <a:gd name="connsiteY0" fmla="*/ 577850 h 613458"/>
+              <a:gd name="connsiteX1" fmla="*/ 148411 w 4961711"/>
+              <a:gd name="connsiteY1" fmla="*/ 584200 h 613458"/>
+              <a:gd name="connsiteX2" fmla="*/ 1024711 w 4961711"/>
+              <a:gd name="connsiteY2" fmla="*/ 330200 h 613458"/>
+              <a:gd name="connsiteX3" fmla="*/ 2135961 w 4961711"/>
+              <a:gd name="connsiteY3" fmla="*/ 101600 h 613458"/>
+              <a:gd name="connsiteX4" fmla="*/ 3171011 w 4961711"/>
+              <a:gd name="connsiteY4" fmla="*/ 0 h 613458"/>
+              <a:gd name="connsiteX5" fmla="*/ 4409261 w 4961711"/>
+              <a:gd name="connsiteY5" fmla="*/ 19050 h 613458"/>
+              <a:gd name="connsiteX6" fmla="*/ 4606111 w 4961711"/>
+              <a:gd name="connsiteY6" fmla="*/ 25400 h 613458"/>
+              <a:gd name="connsiteX7" fmla="*/ 4961711 w 4961711"/>
+              <a:gd name="connsiteY7" fmla="*/ 57150 h 613458"/>
+              <a:gd name="connsiteX0" fmla="*/ 97611 w 4961711"/>
+              <a:gd name="connsiteY0" fmla="*/ 590550 h 626158"/>
+              <a:gd name="connsiteX1" fmla="*/ 148411 w 4961711"/>
+              <a:gd name="connsiteY1" fmla="*/ 596900 h 626158"/>
+              <a:gd name="connsiteX2" fmla="*/ 1024711 w 4961711"/>
+              <a:gd name="connsiteY2" fmla="*/ 342900 h 626158"/>
+              <a:gd name="connsiteX3" fmla="*/ 2135961 w 4961711"/>
+              <a:gd name="connsiteY3" fmla="*/ 114300 h 626158"/>
+              <a:gd name="connsiteX4" fmla="*/ 3171011 w 4961711"/>
+              <a:gd name="connsiteY4" fmla="*/ 12700 h 626158"/>
+              <a:gd name="connsiteX5" fmla="*/ 3806011 w 4961711"/>
+              <a:gd name="connsiteY5" fmla="*/ 0 h 626158"/>
+              <a:gd name="connsiteX6" fmla="*/ 4606111 w 4961711"/>
+              <a:gd name="connsiteY6" fmla="*/ 38100 h 626158"/>
+              <a:gd name="connsiteX7" fmla="*/ 4961711 w 4961711"/>
+              <a:gd name="connsiteY7" fmla="*/ 69850 h 626158"/>
+              <a:gd name="connsiteX0" fmla="*/ 97611 w 4961711"/>
+              <a:gd name="connsiteY0" fmla="*/ 592486 h 628094"/>
+              <a:gd name="connsiteX1" fmla="*/ 148411 w 4961711"/>
+              <a:gd name="connsiteY1" fmla="*/ 598836 h 628094"/>
+              <a:gd name="connsiteX2" fmla="*/ 1024711 w 4961711"/>
+              <a:gd name="connsiteY2" fmla="*/ 344836 h 628094"/>
+              <a:gd name="connsiteX3" fmla="*/ 2135961 w 4961711"/>
+              <a:gd name="connsiteY3" fmla="*/ 116236 h 628094"/>
+              <a:gd name="connsiteX4" fmla="*/ 3171011 w 4961711"/>
+              <a:gd name="connsiteY4" fmla="*/ 14636 h 628094"/>
+              <a:gd name="connsiteX5" fmla="*/ 3806011 w 4961711"/>
+              <a:gd name="connsiteY5" fmla="*/ 1936 h 628094"/>
+              <a:gd name="connsiteX6" fmla="*/ 4529911 w 4961711"/>
+              <a:gd name="connsiteY6" fmla="*/ 27336 h 628094"/>
+              <a:gd name="connsiteX7" fmla="*/ 4961711 w 4961711"/>
+              <a:gd name="connsiteY7" fmla="*/ 71786 h 628094"/>
+              <a:gd name="connsiteX0" fmla="*/ 97611 w 4955361"/>
+              <a:gd name="connsiteY0" fmla="*/ 592486 h 628094"/>
+              <a:gd name="connsiteX1" fmla="*/ 148411 w 4955361"/>
+              <a:gd name="connsiteY1" fmla="*/ 598836 h 628094"/>
+              <a:gd name="connsiteX2" fmla="*/ 1024711 w 4955361"/>
+              <a:gd name="connsiteY2" fmla="*/ 344836 h 628094"/>
+              <a:gd name="connsiteX3" fmla="*/ 2135961 w 4955361"/>
+              <a:gd name="connsiteY3" fmla="*/ 116236 h 628094"/>
+              <a:gd name="connsiteX4" fmla="*/ 3171011 w 4955361"/>
+              <a:gd name="connsiteY4" fmla="*/ 14636 h 628094"/>
+              <a:gd name="connsiteX5" fmla="*/ 3806011 w 4955361"/>
+              <a:gd name="connsiteY5" fmla="*/ 1936 h 628094"/>
+              <a:gd name="connsiteX6" fmla="*/ 4529911 w 4955361"/>
+              <a:gd name="connsiteY6" fmla="*/ 27336 h 628094"/>
+              <a:gd name="connsiteX7" fmla="*/ 4955361 w 4955361"/>
+              <a:gd name="connsiteY7" fmla="*/ 65436 h 628094"/>
+              <a:gd name="connsiteX0" fmla="*/ 0 w 4857750"/>
+              <a:gd name="connsiteY0" fmla="*/ 592486 h 592486"/>
+              <a:gd name="connsiteX1" fmla="*/ 565150 w 4857750"/>
+              <a:gd name="connsiteY1" fmla="*/ 433736 h 592486"/>
+              <a:gd name="connsiteX2" fmla="*/ 927100 w 4857750"/>
+              <a:gd name="connsiteY2" fmla="*/ 344836 h 592486"/>
+              <a:gd name="connsiteX3" fmla="*/ 2038350 w 4857750"/>
+              <a:gd name="connsiteY3" fmla="*/ 116236 h 592486"/>
+              <a:gd name="connsiteX4" fmla="*/ 3073400 w 4857750"/>
+              <a:gd name="connsiteY4" fmla="*/ 14636 h 592486"/>
+              <a:gd name="connsiteX5" fmla="*/ 3708400 w 4857750"/>
+              <a:gd name="connsiteY5" fmla="*/ 1936 h 592486"/>
+              <a:gd name="connsiteX6" fmla="*/ 4432300 w 4857750"/>
+              <a:gd name="connsiteY6" fmla="*/ 27336 h 592486"/>
+              <a:gd name="connsiteX7" fmla="*/ 4857750 w 4857750"/>
+              <a:gd name="connsiteY7" fmla="*/ 65436 h 592486"/>
+            </a:gdLst>
+            <a:ahLst/>
+            <a:cxnLst>
+              <a:cxn ang="0">
+                <a:pos x="connsiteX0" y="connsiteY0"/>
+              </a:cxn>
+              <a:cxn ang="0">
+                <a:pos x="connsiteX1" y="connsiteY1"/>
+              </a:cxn>
+              <a:cxn ang="0">
+                <a:pos x="connsiteX2" y="connsiteY2"/>
+              </a:cxn>
+              <a:cxn ang="0">
+                <a:pos x="connsiteX3" y="connsiteY3"/>
+              </a:cxn>
+              <a:cxn ang="0">
+                <a:pos x="connsiteX4" y="connsiteY4"/>
+              </a:cxn>
+              <a:cxn ang="0">
+                <a:pos x="connsiteX5" y="connsiteY5"/>
+              </a:cxn>
+              <a:cxn ang="0">
+                <a:pos x="connsiteX6" y="connsiteY6"/>
+              </a:cxn>
+              <a:cxn ang="0">
+                <a:pos x="connsiteX7" y="connsiteY7"/>
+              </a:cxn>
+            </a:cxnLst>
+            <a:rect l="l" t="t" r="r" b="b"/>
+            <a:pathLst>
+              <a:path w="4857750" h="592486">
+                <a:moveTo>
+                  <a:pt x="0" y="592486"/>
+                </a:moveTo>
+                <a:lnTo>
+                  <a:pt x="565150" y="433736"/>
+                </a:lnTo>
+                <a:cubicBezTo>
+                  <a:pt x="719667" y="392461"/>
+                  <a:pt x="681567" y="397753"/>
+                  <a:pt x="927100" y="344836"/>
+                </a:cubicBezTo>
+                <a:cubicBezTo>
+                  <a:pt x="1172633" y="291919"/>
+                  <a:pt x="1680633" y="171269"/>
+                  <a:pt x="2038350" y="116236"/>
+                </a:cubicBezTo>
+                <a:cubicBezTo>
+                  <a:pt x="2396067" y="61203"/>
+                  <a:pt x="2795058" y="33686"/>
+                  <a:pt x="3073400" y="14636"/>
+                </a:cubicBezTo>
+                <a:cubicBezTo>
+                  <a:pt x="3351742" y="-4414"/>
+                  <a:pt x="3481917" y="-181"/>
+                  <a:pt x="3708400" y="1936"/>
+                </a:cubicBezTo>
+                <a:cubicBezTo>
+                  <a:pt x="3934883" y="4053"/>
+                  <a:pt x="4240742" y="16753"/>
+                  <a:pt x="4432300" y="27336"/>
+                </a:cubicBezTo>
+                <a:cubicBezTo>
+                  <a:pt x="4623858" y="37919"/>
+                  <a:pt x="4725987" y="52736"/>
+                  <a:pt x="4857750" y="65436"/>
+                </a:cubicBezTo>
+              </a:path>
+            </a:pathLst>
+          </a:custGeom>
+          <a:noFill/>
+          <a:ln w="28575">
+            <a:solidFill>
+              <a:schemeClr val="tx1"/>
+            </a:solidFill>
+          </a:ln>
+        </p:spPr>
+        <p:txBody>
+          <a:bodyPr rtlCol="0" anchor="ctr"/>
+          <a:lstStyle/>
+          <a:p>
+            <a:pPr algn="ctr"/>
+            <a:endParaRPr lang="en-US"/>
+          </a:p>
+        </p:txBody>
+      </p:sp>
+      <p:sp>
+        <p:nvSpPr>
+          <p:cNvPr id="6" name="Freeform 5">
+            <a:extLst>
+              <a:ext uri="{FF2B5EF4-FFF2-40B4-BE49-F238E27FC236}">
+                <a16:creationId xmlns="" xmlns:a16="http://schemas.microsoft.com/office/drawing/2014/main" id="{02185EB4-A11A-0C44-9859-42D7E5BAF6E7}"/>
+              </a:ext>
+            </a:extLst>
+          </p:cNvPr>
+          <p:cNvSpPr/>
+          <p:nvPr/>
+        </p:nvSpPr>
+        <p:spPr>
+          <a:xfrm>
+            <a:off x="2645351" y="3693239"/>
+            <a:ext cx="4465058" cy="141144"/>
+          </a:xfrm>
+          <a:custGeom>
+            <a:avLst/>
+            <a:gdLst>
+              <a:gd name="connsiteX0" fmla="*/ 61724 w 4925824"/>
+              <a:gd name="connsiteY0" fmla="*/ 592012 h 613793"/>
+              <a:gd name="connsiteX1" fmla="*/ 112524 w 4925824"/>
+              <a:gd name="connsiteY1" fmla="*/ 598362 h 613793"/>
+              <a:gd name="connsiteX2" fmla="*/ 2335024 w 4925824"/>
+              <a:gd name="connsiteY2" fmla="*/ 90362 h 613793"/>
+              <a:gd name="connsiteX3" fmla="*/ 3141474 w 4925824"/>
+              <a:gd name="connsiteY3" fmla="*/ 14162 h 613793"/>
+              <a:gd name="connsiteX4" fmla="*/ 3884424 w 4925824"/>
+              <a:gd name="connsiteY4" fmla="*/ 1462 h 613793"/>
+              <a:gd name="connsiteX5" fmla="*/ 4373374 w 4925824"/>
+              <a:gd name="connsiteY5" fmla="*/ 33212 h 613793"/>
+              <a:gd name="connsiteX6" fmla="*/ 4570224 w 4925824"/>
+              <a:gd name="connsiteY6" fmla="*/ 39562 h 613793"/>
+              <a:gd name="connsiteX7" fmla="*/ 4925824 w 4925824"/>
+              <a:gd name="connsiteY7" fmla="*/ 71312 h 613793"/>
+              <a:gd name="connsiteX0" fmla="*/ 97611 w 4961711"/>
+              <a:gd name="connsiteY0" fmla="*/ 607924 h 643532"/>
+              <a:gd name="connsiteX1" fmla="*/ 148411 w 4961711"/>
+              <a:gd name="connsiteY1" fmla="*/ 614274 h 643532"/>
+              <a:gd name="connsiteX2" fmla="*/ 1024711 w 4961711"/>
+              <a:gd name="connsiteY2" fmla="*/ 360274 h 643532"/>
+              <a:gd name="connsiteX3" fmla="*/ 3177361 w 4961711"/>
+              <a:gd name="connsiteY3" fmla="*/ 30074 h 643532"/>
+              <a:gd name="connsiteX4" fmla="*/ 3920311 w 4961711"/>
+              <a:gd name="connsiteY4" fmla="*/ 17374 h 643532"/>
+              <a:gd name="connsiteX5" fmla="*/ 4409261 w 4961711"/>
+              <a:gd name="connsiteY5" fmla="*/ 49124 h 643532"/>
+              <a:gd name="connsiteX6" fmla="*/ 4606111 w 4961711"/>
+              <a:gd name="connsiteY6" fmla="*/ 55474 h 643532"/>
+              <a:gd name="connsiteX7" fmla="*/ 4961711 w 4961711"/>
+              <a:gd name="connsiteY7" fmla="*/ 87224 h 643532"/>
+              <a:gd name="connsiteX0" fmla="*/ 97611 w 4961711"/>
+              <a:gd name="connsiteY0" fmla="*/ 607924 h 643532"/>
+              <a:gd name="connsiteX1" fmla="*/ 148411 w 4961711"/>
+              <a:gd name="connsiteY1" fmla="*/ 614274 h 643532"/>
+              <a:gd name="connsiteX2" fmla="*/ 1024711 w 4961711"/>
+              <a:gd name="connsiteY2" fmla="*/ 360274 h 643532"/>
+              <a:gd name="connsiteX3" fmla="*/ 3177361 w 4961711"/>
+              <a:gd name="connsiteY3" fmla="*/ 30074 h 643532"/>
+              <a:gd name="connsiteX4" fmla="*/ 3920311 w 4961711"/>
+              <a:gd name="connsiteY4" fmla="*/ 17374 h 643532"/>
+              <a:gd name="connsiteX5" fmla="*/ 4409261 w 4961711"/>
+              <a:gd name="connsiteY5" fmla="*/ 49124 h 643532"/>
+              <a:gd name="connsiteX6" fmla="*/ 4606111 w 4961711"/>
+              <a:gd name="connsiteY6" fmla="*/ 55474 h 643532"/>
+              <a:gd name="connsiteX7" fmla="*/ 4961711 w 4961711"/>
+              <a:gd name="connsiteY7" fmla="*/ 87224 h 643532"/>
+              <a:gd name="connsiteX0" fmla="*/ 97611 w 4961711"/>
+              <a:gd name="connsiteY0" fmla="*/ 593460 h 629068"/>
+              <a:gd name="connsiteX1" fmla="*/ 148411 w 4961711"/>
+              <a:gd name="connsiteY1" fmla="*/ 599810 h 629068"/>
+              <a:gd name="connsiteX2" fmla="*/ 1024711 w 4961711"/>
+              <a:gd name="connsiteY2" fmla="*/ 345810 h 629068"/>
+              <a:gd name="connsiteX3" fmla="*/ 2135961 w 4961711"/>
+              <a:gd name="connsiteY3" fmla="*/ 117210 h 629068"/>
+              <a:gd name="connsiteX4" fmla="*/ 3920311 w 4961711"/>
+              <a:gd name="connsiteY4" fmla="*/ 2910 h 629068"/>
+              <a:gd name="connsiteX5" fmla="*/ 4409261 w 4961711"/>
+              <a:gd name="connsiteY5" fmla="*/ 34660 h 629068"/>
+              <a:gd name="connsiteX6" fmla="*/ 4606111 w 4961711"/>
+              <a:gd name="connsiteY6" fmla="*/ 41010 h 629068"/>
+              <a:gd name="connsiteX7" fmla="*/ 4961711 w 4961711"/>
+              <a:gd name="connsiteY7" fmla="*/ 72760 h 629068"/>
+              <a:gd name="connsiteX0" fmla="*/ 97611 w 4961711"/>
+              <a:gd name="connsiteY0" fmla="*/ 593460 h 629068"/>
+              <a:gd name="connsiteX1" fmla="*/ 148411 w 4961711"/>
+              <a:gd name="connsiteY1" fmla="*/ 599810 h 629068"/>
+              <a:gd name="connsiteX2" fmla="*/ 1024711 w 4961711"/>
+              <a:gd name="connsiteY2" fmla="*/ 345810 h 629068"/>
+              <a:gd name="connsiteX3" fmla="*/ 2135961 w 4961711"/>
+              <a:gd name="connsiteY3" fmla="*/ 117210 h 629068"/>
+              <a:gd name="connsiteX4" fmla="*/ 3920311 w 4961711"/>
+              <a:gd name="connsiteY4" fmla="*/ 2910 h 629068"/>
+              <a:gd name="connsiteX5" fmla="*/ 4409261 w 4961711"/>
+              <a:gd name="connsiteY5" fmla="*/ 34660 h 629068"/>
+              <a:gd name="connsiteX6" fmla="*/ 4606111 w 4961711"/>
+              <a:gd name="connsiteY6" fmla="*/ 41010 h 629068"/>
+              <a:gd name="connsiteX7" fmla="*/ 4961711 w 4961711"/>
+              <a:gd name="connsiteY7" fmla="*/ 72760 h 629068"/>
+              <a:gd name="connsiteX0" fmla="*/ 97611 w 4961711"/>
+              <a:gd name="connsiteY0" fmla="*/ 581565 h 617173"/>
+              <a:gd name="connsiteX1" fmla="*/ 148411 w 4961711"/>
+              <a:gd name="connsiteY1" fmla="*/ 587915 h 617173"/>
+              <a:gd name="connsiteX2" fmla="*/ 1024711 w 4961711"/>
+              <a:gd name="connsiteY2" fmla="*/ 333915 h 617173"/>
+              <a:gd name="connsiteX3" fmla="*/ 2135961 w 4961711"/>
+              <a:gd name="connsiteY3" fmla="*/ 105315 h 617173"/>
+              <a:gd name="connsiteX4" fmla="*/ 3171011 w 4961711"/>
+              <a:gd name="connsiteY4" fmla="*/ 3715 h 617173"/>
+              <a:gd name="connsiteX5" fmla="*/ 4409261 w 4961711"/>
+              <a:gd name="connsiteY5" fmla="*/ 22765 h 617173"/>
+              <a:gd name="connsiteX6" fmla="*/ 4606111 w 4961711"/>
+              <a:gd name="connsiteY6" fmla="*/ 29115 h 617173"/>
+              <a:gd name="connsiteX7" fmla="*/ 4961711 w 4961711"/>
+              <a:gd name="connsiteY7" fmla="*/ 60865 h 617173"/>
+              <a:gd name="connsiteX0" fmla="*/ 97611 w 4961711"/>
+              <a:gd name="connsiteY0" fmla="*/ 577850 h 613458"/>
+              <a:gd name="connsiteX1" fmla="*/ 148411 w 4961711"/>
+              <a:gd name="connsiteY1" fmla="*/ 584200 h 613458"/>
+              <a:gd name="connsiteX2" fmla="*/ 1024711 w 4961711"/>
+              <a:gd name="connsiteY2" fmla="*/ 330200 h 613458"/>
+              <a:gd name="connsiteX3" fmla="*/ 2135961 w 4961711"/>
+              <a:gd name="connsiteY3" fmla="*/ 101600 h 613458"/>
+              <a:gd name="connsiteX4" fmla="*/ 3171011 w 4961711"/>
+              <a:gd name="connsiteY4" fmla="*/ 0 h 613458"/>
+              <a:gd name="connsiteX5" fmla="*/ 4409261 w 4961711"/>
+              <a:gd name="connsiteY5" fmla="*/ 19050 h 613458"/>
+              <a:gd name="connsiteX6" fmla="*/ 4606111 w 4961711"/>
+              <a:gd name="connsiteY6" fmla="*/ 25400 h 613458"/>
+              <a:gd name="connsiteX7" fmla="*/ 4961711 w 4961711"/>
+              <a:gd name="connsiteY7" fmla="*/ 57150 h 613458"/>
+              <a:gd name="connsiteX0" fmla="*/ 97611 w 4961711"/>
+              <a:gd name="connsiteY0" fmla="*/ 590550 h 626158"/>
+              <a:gd name="connsiteX1" fmla="*/ 148411 w 4961711"/>
+              <a:gd name="connsiteY1" fmla="*/ 596900 h 626158"/>
+              <a:gd name="connsiteX2" fmla="*/ 1024711 w 4961711"/>
+              <a:gd name="connsiteY2" fmla="*/ 342900 h 626158"/>
+              <a:gd name="connsiteX3" fmla="*/ 2135961 w 4961711"/>
+              <a:gd name="connsiteY3" fmla="*/ 114300 h 626158"/>
+              <a:gd name="connsiteX4" fmla="*/ 3171011 w 4961711"/>
+              <a:gd name="connsiteY4" fmla="*/ 12700 h 626158"/>
+              <a:gd name="connsiteX5" fmla="*/ 3806011 w 4961711"/>
+              <a:gd name="connsiteY5" fmla="*/ 0 h 626158"/>
+              <a:gd name="connsiteX6" fmla="*/ 4606111 w 4961711"/>
+              <a:gd name="connsiteY6" fmla="*/ 38100 h 626158"/>
+              <a:gd name="connsiteX7" fmla="*/ 4961711 w 4961711"/>
+              <a:gd name="connsiteY7" fmla="*/ 69850 h 626158"/>
+              <a:gd name="connsiteX0" fmla="*/ 97611 w 4961711"/>
+              <a:gd name="connsiteY0" fmla="*/ 592486 h 628094"/>
+              <a:gd name="connsiteX1" fmla="*/ 148411 w 4961711"/>
+              <a:gd name="connsiteY1" fmla="*/ 598836 h 628094"/>
+              <a:gd name="connsiteX2" fmla="*/ 1024711 w 4961711"/>
+              <a:gd name="connsiteY2" fmla="*/ 344836 h 628094"/>
+              <a:gd name="connsiteX3" fmla="*/ 2135961 w 4961711"/>
+              <a:gd name="connsiteY3" fmla="*/ 116236 h 628094"/>
+              <a:gd name="connsiteX4" fmla="*/ 3171011 w 4961711"/>
+              <a:gd name="connsiteY4" fmla="*/ 14636 h 628094"/>
+              <a:gd name="connsiteX5" fmla="*/ 3806011 w 4961711"/>
+              <a:gd name="connsiteY5" fmla="*/ 1936 h 628094"/>
+              <a:gd name="connsiteX6" fmla="*/ 4529911 w 4961711"/>
+              <a:gd name="connsiteY6" fmla="*/ 27336 h 628094"/>
+              <a:gd name="connsiteX7" fmla="*/ 4961711 w 4961711"/>
+              <a:gd name="connsiteY7" fmla="*/ 71786 h 628094"/>
+              <a:gd name="connsiteX0" fmla="*/ 97611 w 4955361"/>
+              <a:gd name="connsiteY0" fmla="*/ 592486 h 628094"/>
+              <a:gd name="connsiteX1" fmla="*/ 148411 w 4955361"/>
+              <a:gd name="connsiteY1" fmla="*/ 598836 h 628094"/>
+              <a:gd name="connsiteX2" fmla="*/ 1024711 w 4955361"/>
+              <a:gd name="connsiteY2" fmla="*/ 344836 h 628094"/>
+              <a:gd name="connsiteX3" fmla="*/ 2135961 w 4955361"/>
+              <a:gd name="connsiteY3" fmla="*/ 116236 h 628094"/>
+              <a:gd name="connsiteX4" fmla="*/ 3171011 w 4955361"/>
+              <a:gd name="connsiteY4" fmla="*/ 14636 h 628094"/>
+              <a:gd name="connsiteX5" fmla="*/ 3806011 w 4955361"/>
+              <a:gd name="connsiteY5" fmla="*/ 1936 h 628094"/>
+              <a:gd name="connsiteX6" fmla="*/ 4529911 w 4955361"/>
+              <a:gd name="connsiteY6" fmla="*/ 27336 h 628094"/>
+              <a:gd name="connsiteX7" fmla="*/ 4955361 w 4955361"/>
+              <a:gd name="connsiteY7" fmla="*/ 65436 h 628094"/>
+              <a:gd name="connsiteX0" fmla="*/ 0 w 4857750"/>
+              <a:gd name="connsiteY0" fmla="*/ 592486 h 592486"/>
+              <a:gd name="connsiteX1" fmla="*/ 565150 w 4857750"/>
+              <a:gd name="connsiteY1" fmla="*/ 433736 h 592486"/>
+              <a:gd name="connsiteX2" fmla="*/ 927100 w 4857750"/>
+              <a:gd name="connsiteY2" fmla="*/ 344836 h 592486"/>
+              <a:gd name="connsiteX3" fmla="*/ 2038350 w 4857750"/>
+              <a:gd name="connsiteY3" fmla="*/ 116236 h 592486"/>
+              <a:gd name="connsiteX4" fmla="*/ 3073400 w 4857750"/>
+              <a:gd name="connsiteY4" fmla="*/ 14636 h 592486"/>
+              <a:gd name="connsiteX5" fmla="*/ 3708400 w 4857750"/>
+              <a:gd name="connsiteY5" fmla="*/ 1936 h 592486"/>
+              <a:gd name="connsiteX6" fmla="*/ 4432300 w 4857750"/>
+              <a:gd name="connsiteY6" fmla="*/ 27336 h 592486"/>
+              <a:gd name="connsiteX7" fmla="*/ 4857750 w 4857750"/>
+              <a:gd name="connsiteY7" fmla="*/ 65436 h 592486"/>
+              <a:gd name="connsiteX0" fmla="*/ 0 w 4432572"/>
+              <a:gd name="connsiteY0" fmla="*/ 616459 h 622809"/>
+              <a:gd name="connsiteX1" fmla="*/ 565150 w 4432572"/>
+              <a:gd name="connsiteY1" fmla="*/ 457709 h 622809"/>
+              <a:gd name="connsiteX2" fmla="*/ 927100 w 4432572"/>
+              <a:gd name="connsiteY2" fmla="*/ 368809 h 622809"/>
+              <a:gd name="connsiteX3" fmla="*/ 2038350 w 4432572"/>
+              <a:gd name="connsiteY3" fmla="*/ 140209 h 622809"/>
+              <a:gd name="connsiteX4" fmla="*/ 3073400 w 4432572"/>
+              <a:gd name="connsiteY4" fmla="*/ 38609 h 622809"/>
+              <a:gd name="connsiteX5" fmla="*/ 3708400 w 4432572"/>
+              <a:gd name="connsiteY5" fmla="*/ 25909 h 622809"/>
+              <a:gd name="connsiteX6" fmla="*/ 4432300 w 4432572"/>
+              <a:gd name="connsiteY6" fmla="*/ 51309 h 622809"/>
+              <a:gd name="connsiteX7" fmla="*/ 3625850 w 4432572"/>
+              <a:gd name="connsiteY7" fmla="*/ 622809 h 622809"/>
+              <a:gd name="connsiteX0" fmla="*/ 0 w 3709346"/>
+              <a:gd name="connsiteY0" fmla="*/ 633827 h 672177"/>
+              <a:gd name="connsiteX1" fmla="*/ 565150 w 3709346"/>
+              <a:gd name="connsiteY1" fmla="*/ 475077 h 672177"/>
+              <a:gd name="connsiteX2" fmla="*/ 927100 w 3709346"/>
+              <a:gd name="connsiteY2" fmla="*/ 386177 h 672177"/>
+              <a:gd name="connsiteX3" fmla="*/ 2038350 w 3709346"/>
+              <a:gd name="connsiteY3" fmla="*/ 157577 h 672177"/>
+              <a:gd name="connsiteX4" fmla="*/ 3073400 w 3709346"/>
+              <a:gd name="connsiteY4" fmla="*/ 55977 h 672177"/>
+              <a:gd name="connsiteX5" fmla="*/ 3708400 w 3709346"/>
+              <a:gd name="connsiteY5" fmla="*/ 43277 h 672177"/>
+              <a:gd name="connsiteX6" fmla="*/ 3225800 w 3709346"/>
+              <a:gd name="connsiteY6" fmla="*/ 627477 h 672177"/>
+              <a:gd name="connsiteX7" fmla="*/ 3625850 w 3709346"/>
+              <a:gd name="connsiteY7" fmla="*/ 640177 h 672177"/>
+              <a:gd name="connsiteX0" fmla="*/ 0 w 3709033"/>
+              <a:gd name="connsiteY0" fmla="*/ 633827 h 640177"/>
+              <a:gd name="connsiteX1" fmla="*/ 565150 w 3709033"/>
+              <a:gd name="connsiteY1" fmla="*/ 475077 h 640177"/>
+              <a:gd name="connsiteX2" fmla="*/ 927100 w 3709033"/>
+              <a:gd name="connsiteY2" fmla="*/ 386177 h 640177"/>
+              <a:gd name="connsiteX3" fmla="*/ 2038350 w 3709033"/>
+              <a:gd name="connsiteY3" fmla="*/ 157577 h 640177"/>
+              <a:gd name="connsiteX4" fmla="*/ 3073400 w 3709033"/>
+              <a:gd name="connsiteY4" fmla="*/ 55977 h 640177"/>
+              <a:gd name="connsiteX5" fmla="*/ 3708400 w 3709033"/>
+              <a:gd name="connsiteY5" fmla="*/ 43277 h 640177"/>
+              <a:gd name="connsiteX6" fmla="*/ 3225800 w 3709033"/>
+              <a:gd name="connsiteY6" fmla="*/ 627477 h 640177"/>
+              <a:gd name="connsiteX7" fmla="*/ 3625850 w 3709033"/>
+              <a:gd name="connsiteY7" fmla="*/ 640177 h 640177"/>
+              <a:gd name="connsiteX0" fmla="*/ 0 w 3625850"/>
+              <a:gd name="connsiteY0" fmla="*/ 600394 h 608265"/>
+              <a:gd name="connsiteX1" fmla="*/ 565150 w 3625850"/>
+              <a:gd name="connsiteY1" fmla="*/ 441644 h 608265"/>
+              <a:gd name="connsiteX2" fmla="*/ 927100 w 3625850"/>
+              <a:gd name="connsiteY2" fmla="*/ 352744 h 608265"/>
+              <a:gd name="connsiteX3" fmla="*/ 2038350 w 3625850"/>
+              <a:gd name="connsiteY3" fmla="*/ 124144 h 608265"/>
+              <a:gd name="connsiteX4" fmla="*/ 3073400 w 3625850"/>
+              <a:gd name="connsiteY4" fmla="*/ 22544 h 608265"/>
+              <a:gd name="connsiteX5" fmla="*/ 2717800 w 3625850"/>
+              <a:gd name="connsiteY5" fmla="*/ 555944 h 608265"/>
+              <a:gd name="connsiteX6" fmla="*/ 3225800 w 3625850"/>
+              <a:gd name="connsiteY6" fmla="*/ 594044 h 608265"/>
+              <a:gd name="connsiteX7" fmla="*/ 3625850 w 3625850"/>
+              <a:gd name="connsiteY7" fmla="*/ 606744 h 608265"/>
+              <a:gd name="connsiteX0" fmla="*/ 0 w 3225800"/>
+              <a:gd name="connsiteY0" fmla="*/ 600394 h 608265"/>
+              <a:gd name="connsiteX1" fmla="*/ 565150 w 3225800"/>
+              <a:gd name="connsiteY1" fmla="*/ 441644 h 608265"/>
+              <a:gd name="connsiteX2" fmla="*/ 927100 w 3225800"/>
+              <a:gd name="connsiteY2" fmla="*/ 352744 h 608265"/>
+              <a:gd name="connsiteX3" fmla="*/ 2038350 w 3225800"/>
+              <a:gd name="connsiteY3" fmla="*/ 124144 h 608265"/>
+              <a:gd name="connsiteX4" fmla="*/ 3073400 w 3225800"/>
+              <a:gd name="connsiteY4" fmla="*/ 22544 h 608265"/>
+              <a:gd name="connsiteX5" fmla="*/ 2717800 w 3225800"/>
+              <a:gd name="connsiteY5" fmla="*/ 555944 h 608265"/>
+              <a:gd name="connsiteX6" fmla="*/ 3225800 w 3225800"/>
+              <a:gd name="connsiteY6" fmla="*/ 594044 h 608265"/>
+              <a:gd name="connsiteX0" fmla="*/ 0 w 3090289"/>
+              <a:gd name="connsiteY0" fmla="*/ 600394 h 600394"/>
+              <a:gd name="connsiteX1" fmla="*/ 565150 w 3090289"/>
+              <a:gd name="connsiteY1" fmla="*/ 441644 h 600394"/>
+              <a:gd name="connsiteX2" fmla="*/ 927100 w 3090289"/>
+              <a:gd name="connsiteY2" fmla="*/ 352744 h 600394"/>
+              <a:gd name="connsiteX3" fmla="*/ 2038350 w 3090289"/>
+              <a:gd name="connsiteY3" fmla="*/ 124144 h 600394"/>
+              <a:gd name="connsiteX4" fmla="*/ 3073400 w 3090289"/>
+              <a:gd name="connsiteY4" fmla="*/ 22544 h 600394"/>
+              <a:gd name="connsiteX5" fmla="*/ 2717800 w 3090289"/>
+              <a:gd name="connsiteY5" fmla="*/ 555944 h 600394"/>
+              <a:gd name="connsiteX0" fmla="*/ 0 w 3073400"/>
+              <a:gd name="connsiteY0" fmla="*/ 600394 h 600394"/>
+              <a:gd name="connsiteX1" fmla="*/ 565150 w 3073400"/>
+              <a:gd name="connsiteY1" fmla="*/ 441644 h 600394"/>
+              <a:gd name="connsiteX2" fmla="*/ 927100 w 3073400"/>
+              <a:gd name="connsiteY2" fmla="*/ 352744 h 600394"/>
+              <a:gd name="connsiteX3" fmla="*/ 2038350 w 3073400"/>
+              <a:gd name="connsiteY3" fmla="*/ 124144 h 600394"/>
+              <a:gd name="connsiteX4" fmla="*/ 3073400 w 3073400"/>
+              <a:gd name="connsiteY4" fmla="*/ 22544 h 600394"/>
+              <a:gd name="connsiteX0" fmla="*/ 0 w 2038350"/>
+              <a:gd name="connsiteY0" fmla="*/ 476250 h 476250"/>
+              <a:gd name="connsiteX1" fmla="*/ 565150 w 2038350"/>
+              <a:gd name="connsiteY1" fmla="*/ 317500 h 476250"/>
+              <a:gd name="connsiteX2" fmla="*/ 927100 w 2038350"/>
+              <a:gd name="connsiteY2" fmla="*/ 228600 h 476250"/>
+              <a:gd name="connsiteX3" fmla="*/ 2038350 w 2038350"/>
+              <a:gd name="connsiteY3" fmla="*/ 0 h 476250"/>
+              <a:gd name="connsiteX0" fmla="*/ 0 w 3638550"/>
+              <a:gd name="connsiteY0" fmla="*/ 252890 h 253897"/>
+              <a:gd name="connsiteX1" fmla="*/ 565150 w 3638550"/>
+              <a:gd name="connsiteY1" fmla="*/ 94140 h 253897"/>
+              <a:gd name="connsiteX2" fmla="*/ 927100 w 3638550"/>
+              <a:gd name="connsiteY2" fmla="*/ 5240 h 253897"/>
+              <a:gd name="connsiteX3" fmla="*/ 3638550 w 3638550"/>
+              <a:gd name="connsiteY3" fmla="*/ 246540 h 253897"/>
+              <a:gd name="connsiteX0" fmla="*/ 0 w 3638550"/>
+              <a:gd name="connsiteY0" fmla="*/ 252890 h 252890"/>
+              <a:gd name="connsiteX1" fmla="*/ 565150 w 3638550"/>
+              <a:gd name="connsiteY1" fmla="*/ 94140 h 252890"/>
+              <a:gd name="connsiteX2" fmla="*/ 927100 w 3638550"/>
+              <a:gd name="connsiteY2" fmla="*/ 5240 h 252890"/>
+              <a:gd name="connsiteX3" fmla="*/ 3638550 w 3638550"/>
+              <a:gd name="connsiteY3" fmla="*/ 246540 h 252890"/>
+              <a:gd name="connsiteX0" fmla="*/ 0 w 3638550"/>
+              <a:gd name="connsiteY0" fmla="*/ 158750 h 158750"/>
+              <a:gd name="connsiteX1" fmla="*/ 565150 w 3638550"/>
+              <a:gd name="connsiteY1" fmla="*/ 0 h 158750"/>
+              <a:gd name="connsiteX2" fmla="*/ 1885950 w 3638550"/>
+              <a:gd name="connsiteY2" fmla="*/ 69850 h 158750"/>
+              <a:gd name="connsiteX3" fmla="*/ 3638550 w 3638550"/>
+              <a:gd name="connsiteY3" fmla="*/ 152400 h 158750"/>
+              <a:gd name="connsiteX0" fmla="*/ 0 w 3638550"/>
+              <a:gd name="connsiteY0" fmla="*/ 89196 h 89196"/>
+              <a:gd name="connsiteX1" fmla="*/ 641350 w 3638550"/>
+              <a:gd name="connsiteY1" fmla="*/ 57446 h 89196"/>
+              <a:gd name="connsiteX2" fmla="*/ 1885950 w 3638550"/>
+              <a:gd name="connsiteY2" fmla="*/ 296 h 89196"/>
+              <a:gd name="connsiteX3" fmla="*/ 3638550 w 3638550"/>
+              <a:gd name="connsiteY3" fmla="*/ 82846 h 89196"/>
+              <a:gd name="connsiteX0" fmla="*/ 0 w 3638550"/>
+              <a:gd name="connsiteY0" fmla="*/ 89364 h 89364"/>
+              <a:gd name="connsiteX1" fmla="*/ 641350 w 3638550"/>
+              <a:gd name="connsiteY1" fmla="*/ 57614 h 89364"/>
+              <a:gd name="connsiteX2" fmla="*/ 1885950 w 3638550"/>
+              <a:gd name="connsiteY2" fmla="*/ 464 h 89364"/>
+              <a:gd name="connsiteX3" fmla="*/ 3638550 w 3638550"/>
+              <a:gd name="connsiteY3" fmla="*/ 83014 h 89364"/>
+              <a:gd name="connsiteX0" fmla="*/ 0 w 3625850"/>
+              <a:gd name="connsiteY0" fmla="*/ 108239 h 108239"/>
+              <a:gd name="connsiteX1" fmla="*/ 628650 w 3625850"/>
+              <a:gd name="connsiteY1" fmla="*/ 57439 h 108239"/>
+              <a:gd name="connsiteX2" fmla="*/ 1873250 w 3625850"/>
+              <a:gd name="connsiteY2" fmla="*/ 289 h 108239"/>
+              <a:gd name="connsiteX3" fmla="*/ 3625850 w 3625850"/>
+              <a:gd name="connsiteY3" fmla="*/ 82839 h 108239"/>
+              <a:gd name="connsiteX0" fmla="*/ 0 w 3625850"/>
+              <a:gd name="connsiteY0" fmla="*/ 108239 h 108239"/>
+              <a:gd name="connsiteX1" fmla="*/ 628650 w 3625850"/>
+              <a:gd name="connsiteY1" fmla="*/ 57439 h 108239"/>
+              <a:gd name="connsiteX2" fmla="*/ 1873250 w 3625850"/>
+              <a:gd name="connsiteY2" fmla="*/ 289 h 108239"/>
+              <a:gd name="connsiteX3" fmla="*/ 3625850 w 3625850"/>
+              <a:gd name="connsiteY3" fmla="*/ 82839 h 108239"/>
+              <a:gd name="connsiteX0" fmla="*/ 0 w 3625850"/>
+              <a:gd name="connsiteY0" fmla="*/ 108239 h 108239"/>
+              <a:gd name="connsiteX1" fmla="*/ 628650 w 3625850"/>
+              <a:gd name="connsiteY1" fmla="*/ 57439 h 108239"/>
+              <a:gd name="connsiteX2" fmla="*/ 1873250 w 3625850"/>
+              <a:gd name="connsiteY2" fmla="*/ 289 h 108239"/>
+              <a:gd name="connsiteX3" fmla="*/ 3625850 w 3625850"/>
+              <a:gd name="connsiteY3" fmla="*/ 82839 h 108239"/>
+              <a:gd name="connsiteX0" fmla="*/ 0 w 3625850"/>
+              <a:gd name="connsiteY0" fmla="*/ 108239 h 108239"/>
+              <a:gd name="connsiteX1" fmla="*/ 628650 w 3625850"/>
+              <a:gd name="connsiteY1" fmla="*/ 57439 h 108239"/>
+              <a:gd name="connsiteX2" fmla="*/ 1873250 w 3625850"/>
+              <a:gd name="connsiteY2" fmla="*/ 289 h 108239"/>
+              <a:gd name="connsiteX3" fmla="*/ 3625850 w 3625850"/>
+              <a:gd name="connsiteY3" fmla="*/ 82839 h 108239"/>
+            </a:gdLst>
+            <a:ahLst/>
+            <a:cxnLst>
+              <a:cxn ang="0">
+                <a:pos x="connsiteX0" y="connsiteY0"/>
+              </a:cxn>
+              <a:cxn ang="0">
+                <a:pos x="connsiteX1" y="connsiteY1"/>
+              </a:cxn>
+              <a:cxn ang="0">
+                <a:pos x="connsiteX2" y="connsiteY2"/>
+              </a:cxn>
+              <a:cxn ang="0">
+                <a:pos x="connsiteX3" y="connsiteY3"/>
+              </a:cxn>
+            </a:cxnLst>
+            <a:rect l="l" t="t" r="r" b="b"/>
+            <a:pathLst>
+              <a:path w="3625850" h="108239">
+                <a:moveTo>
+                  <a:pt x="0" y="108239"/>
+                </a:moveTo>
+                <a:cubicBezTo>
+                  <a:pt x="607483" y="61672"/>
+                  <a:pt x="316442" y="75431"/>
+                  <a:pt x="628650" y="57439"/>
+                </a:cubicBezTo>
+                <a:cubicBezTo>
+                  <a:pt x="940858" y="39447"/>
+                  <a:pt x="1297517" y="-3944"/>
+                  <a:pt x="1873250" y="289"/>
+                </a:cubicBezTo>
+                <a:cubicBezTo>
+                  <a:pt x="2448983" y="4522"/>
+                  <a:pt x="3020483" y="68022"/>
+                  <a:pt x="3625850" y="82839"/>
+                </a:cubicBezTo>
+              </a:path>
+            </a:pathLst>
+          </a:custGeom>
+          <a:noFill/>
+          <a:ln w="28575">
+            <a:solidFill>
+              <a:schemeClr val="tx1"/>
+            </a:solidFill>
+          </a:ln>
+        </p:spPr>
+        <p:txBody>
+          <a:bodyPr rtlCol="0" anchor="ctr"/>
+          <a:lstStyle/>
+          <a:p>
+            <a:pPr algn="ctr"/>
+            <a:endParaRPr lang="en-US"/>
+          </a:p>
+        </p:txBody>
+      </p:sp>
+      <p:sp>
+        <p:nvSpPr>
+          <p:cNvPr id="7" name="Freeform 6">
+            <a:extLst>
+              <a:ext uri="{FF2B5EF4-FFF2-40B4-BE49-F238E27FC236}">
+                <a16:creationId xmlns="" xmlns:a16="http://schemas.microsoft.com/office/drawing/2014/main" id="{7DEAB0CB-BBAD-8D4D-AE22-302C1BDB425F}"/>
+              </a:ext>
+            </a:extLst>
+          </p:cNvPr>
+          <p:cNvSpPr/>
+          <p:nvPr/>
+        </p:nvSpPr>
+        <p:spPr>
+          <a:xfrm>
+            <a:off x="7082614" y="3012611"/>
+            <a:ext cx="1431008" cy="66779"/>
+          </a:xfrm>
+          <a:custGeom>
+            <a:avLst/>
+            <a:gdLst>
+              <a:gd name="connsiteX0" fmla="*/ 61724 w 4925824"/>
+              <a:gd name="connsiteY0" fmla="*/ 592012 h 613793"/>
+              <a:gd name="connsiteX1" fmla="*/ 112524 w 4925824"/>
+              <a:gd name="connsiteY1" fmla="*/ 598362 h 613793"/>
+              <a:gd name="connsiteX2" fmla="*/ 2335024 w 4925824"/>
+              <a:gd name="connsiteY2" fmla="*/ 90362 h 613793"/>
+              <a:gd name="connsiteX3" fmla="*/ 3141474 w 4925824"/>
+              <a:gd name="connsiteY3" fmla="*/ 14162 h 613793"/>
+              <a:gd name="connsiteX4" fmla="*/ 3884424 w 4925824"/>
+              <a:gd name="connsiteY4" fmla="*/ 1462 h 613793"/>
+              <a:gd name="connsiteX5" fmla="*/ 4373374 w 4925824"/>
+              <a:gd name="connsiteY5" fmla="*/ 33212 h 613793"/>
+              <a:gd name="connsiteX6" fmla="*/ 4570224 w 4925824"/>
+              <a:gd name="connsiteY6" fmla="*/ 39562 h 613793"/>
+              <a:gd name="connsiteX7" fmla="*/ 4925824 w 4925824"/>
+              <a:gd name="connsiteY7" fmla="*/ 71312 h 613793"/>
+              <a:gd name="connsiteX0" fmla="*/ 97611 w 4961711"/>
+              <a:gd name="connsiteY0" fmla="*/ 607924 h 643532"/>
+              <a:gd name="connsiteX1" fmla="*/ 148411 w 4961711"/>
+              <a:gd name="connsiteY1" fmla="*/ 614274 h 643532"/>
+              <a:gd name="connsiteX2" fmla="*/ 1024711 w 4961711"/>
+              <a:gd name="connsiteY2" fmla="*/ 360274 h 643532"/>
+              <a:gd name="connsiteX3" fmla="*/ 3177361 w 4961711"/>
+              <a:gd name="connsiteY3" fmla="*/ 30074 h 643532"/>
+              <a:gd name="connsiteX4" fmla="*/ 3920311 w 4961711"/>
+              <a:gd name="connsiteY4" fmla="*/ 17374 h 643532"/>
+              <a:gd name="connsiteX5" fmla="*/ 4409261 w 4961711"/>
+              <a:gd name="connsiteY5" fmla="*/ 49124 h 643532"/>
+              <a:gd name="connsiteX6" fmla="*/ 4606111 w 4961711"/>
+              <a:gd name="connsiteY6" fmla="*/ 55474 h 643532"/>
+              <a:gd name="connsiteX7" fmla="*/ 4961711 w 4961711"/>
+              <a:gd name="connsiteY7" fmla="*/ 87224 h 643532"/>
+              <a:gd name="connsiteX0" fmla="*/ 97611 w 4961711"/>
+              <a:gd name="connsiteY0" fmla="*/ 607924 h 643532"/>
+              <a:gd name="connsiteX1" fmla="*/ 148411 w 4961711"/>
+              <a:gd name="connsiteY1" fmla="*/ 614274 h 643532"/>
+              <a:gd name="connsiteX2" fmla="*/ 1024711 w 4961711"/>
+              <a:gd name="connsiteY2" fmla="*/ 360274 h 643532"/>
+              <a:gd name="connsiteX3" fmla="*/ 3177361 w 4961711"/>
+              <a:gd name="connsiteY3" fmla="*/ 30074 h 643532"/>
+              <a:gd name="connsiteX4" fmla="*/ 3920311 w 4961711"/>
+              <a:gd name="connsiteY4" fmla="*/ 17374 h 643532"/>
+              <a:gd name="connsiteX5" fmla="*/ 4409261 w 4961711"/>
+              <a:gd name="connsiteY5" fmla="*/ 49124 h 643532"/>
+              <a:gd name="connsiteX6" fmla="*/ 4606111 w 4961711"/>
+              <a:gd name="connsiteY6" fmla="*/ 55474 h 643532"/>
+              <a:gd name="connsiteX7" fmla="*/ 4961711 w 4961711"/>
+              <a:gd name="connsiteY7" fmla="*/ 87224 h 643532"/>
+              <a:gd name="connsiteX0" fmla="*/ 97611 w 4961711"/>
+              <a:gd name="connsiteY0" fmla="*/ 593460 h 629068"/>
+              <a:gd name="connsiteX1" fmla="*/ 148411 w 4961711"/>
+              <a:gd name="connsiteY1" fmla="*/ 599810 h 629068"/>
+              <a:gd name="connsiteX2" fmla="*/ 1024711 w 4961711"/>
+              <a:gd name="connsiteY2" fmla="*/ 345810 h 629068"/>
+              <a:gd name="connsiteX3" fmla="*/ 2135961 w 4961711"/>
+              <a:gd name="connsiteY3" fmla="*/ 117210 h 629068"/>
+              <a:gd name="connsiteX4" fmla="*/ 3920311 w 4961711"/>
+              <a:gd name="connsiteY4" fmla="*/ 2910 h 629068"/>
+              <a:gd name="connsiteX5" fmla="*/ 4409261 w 4961711"/>
+              <a:gd name="connsiteY5" fmla="*/ 34660 h 629068"/>
+              <a:gd name="connsiteX6" fmla="*/ 4606111 w 4961711"/>
+              <a:gd name="connsiteY6" fmla="*/ 41010 h 629068"/>
+              <a:gd name="connsiteX7" fmla="*/ 4961711 w 4961711"/>
+              <a:gd name="connsiteY7" fmla="*/ 72760 h 629068"/>
+              <a:gd name="connsiteX0" fmla="*/ 97611 w 4961711"/>
+              <a:gd name="connsiteY0" fmla="*/ 593460 h 629068"/>
+              <a:gd name="connsiteX1" fmla="*/ 148411 w 4961711"/>
+              <a:gd name="connsiteY1" fmla="*/ 599810 h 629068"/>
+              <a:gd name="connsiteX2" fmla="*/ 1024711 w 4961711"/>
+              <a:gd name="connsiteY2" fmla="*/ 345810 h 629068"/>
+              <a:gd name="connsiteX3" fmla="*/ 2135961 w 4961711"/>
+              <a:gd name="connsiteY3" fmla="*/ 117210 h 629068"/>
+              <a:gd name="connsiteX4" fmla="*/ 3920311 w 4961711"/>
+              <a:gd name="connsiteY4" fmla="*/ 2910 h 629068"/>
+              <a:gd name="connsiteX5" fmla="*/ 4409261 w 4961711"/>
+              <a:gd name="connsiteY5" fmla="*/ 34660 h 629068"/>
+              <a:gd name="connsiteX6" fmla="*/ 4606111 w 4961711"/>
+              <a:gd name="connsiteY6" fmla="*/ 41010 h 629068"/>
+              <a:gd name="connsiteX7" fmla="*/ 4961711 w 4961711"/>
+              <a:gd name="connsiteY7" fmla="*/ 72760 h 629068"/>
+              <a:gd name="connsiteX0" fmla="*/ 97611 w 4961711"/>
+              <a:gd name="connsiteY0" fmla="*/ 581565 h 617173"/>
+              <a:gd name="connsiteX1" fmla="*/ 148411 w 4961711"/>
+              <a:gd name="connsiteY1" fmla="*/ 587915 h 617173"/>
+              <a:gd name="connsiteX2" fmla="*/ 1024711 w 4961711"/>
+              <a:gd name="connsiteY2" fmla="*/ 333915 h 617173"/>
+              <a:gd name="connsiteX3" fmla="*/ 2135961 w 4961711"/>
+              <a:gd name="connsiteY3" fmla="*/ 105315 h 617173"/>
+              <a:gd name="connsiteX4" fmla="*/ 3171011 w 4961711"/>
+              <a:gd name="connsiteY4" fmla="*/ 3715 h 617173"/>
+              <a:gd name="connsiteX5" fmla="*/ 4409261 w 4961711"/>
+              <a:gd name="connsiteY5" fmla="*/ 22765 h 617173"/>
+              <a:gd name="connsiteX6" fmla="*/ 4606111 w 4961711"/>
+              <a:gd name="connsiteY6" fmla="*/ 29115 h 617173"/>
+              <a:gd name="connsiteX7" fmla="*/ 4961711 w 4961711"/>
+              <a:gd name="connsiteY7" fmla="*/ 60865 h 617173"/>
+              <a:gd name="connsiteX0" fmla="*/ 97611 w 4961711"/>
+              <a:gd name="connsiteY0" fmla="*/ 577850 h 613458"/>
+              <a:gd name="connsiteX1" fmla="*/ 148411 w 4961711"/>
+              <a:gd name="connsiteY1" fmla="*/ 584200 h 613458"/>
+              <a:gd name="connsiteX2" fmla="*/ 1024711 w 4961711"/>
+              <a:gd name="connsiteY2" fmla="*/ 330200 h 613458"/>
+              <a:gd name="connsiteX3" fmla="*/ 2135961 w 4961711"/>
+              <a:gd name="connsiteY3" fmla="*/ 101600 h 613458"/>
+              <a:gd name="connsiteX4" fmla="*/ 3171011 w 4961711"/>
+              <a:gd name="connsiteY4" fmla="*/ 0 h 613458"/>
+              <a:gd name="connsiteX5" fmla="*/ 4409261 w 4961711"/>
+              <a:gd name="connsiteY5" fmla="*/ 19050 h 613458"/>
+              <a:gd name="connsiteX6" fmla="*/ 4606111 w 4961711"/>
+              <a:gd name="connsiteY6" fmla="*/ 25400 h 613458"/>
+              <a:gd name="connsiteX7" fmla="*/ 4961711 w 4961711"/>
+              <a:gd name="connsiteY7" fmla="*/ 57150 h 613458"/>
+              <a:gd name="connsiteX0" fmla="*/ 97611 w 4961711"/>
+              <a:gd name="connsiteY0" fmla="*/ 590550 h 626158"/>
+              <a:gd name="connsiteX1" fmla="*/ 148411 w 4961711"/>
+              <a:gd name="connsiteY1" fmla="*/ 596900 h 626158"/>
+              <a:gd name="connsiteX2" fmla="*/ 1024711 w 4961711"/>
+              <a:gd name="connsiteY2" fmla="*/ 342900 h 626158"/>
+              <a:gd name="connsiteX3" fmla="*/ 2135961 w 4961711"/>
+              <a:gd name="connsiteY3" fmla="*/ 114300 h 626158"/>
+              <a:gd name="connsiteX4" fmla="*/ 3171011 w 4961711"/>
+              <a:gd name="connsiteY4" fmla="*/ 12700 h 626158"/>
+              <a:gd name="connsiteX5" fmla="*/ 3806011 w 4961711"/>
+              <a:gd name="connsiteY5" fmla="*/ 0 h 626158"/>
+              <a:gd name="connsiteX6" fmla="*/ 4606111 w 4961711"/>
+              <a:gd name="connsiteY6" fmla="*/ 38100 h 626158"/>
+              <a:gd name="connsiteX7" fmla="*/ 4961711 w 4961711"/>
+              <a:gd name="connsiteY7" fmla="*/ 69850 h 626158"/>
+              <a:gd name="connsiteX0" fmla="*/ 97611 w 4961711"/>
+              <a:gd name="connsiteY0" fmla="*/ 592486 h 628094"/>
+              <a:gd name="connsiteX1" fmla="*/ 148411 w 4961711"/>
+              <a:gd name="connsiteY1" fmla="*/ 598836 h 628094"/>
+              <a:gd name="connsiteX2" fmla="*/ 1024711 w 4961711"/>
+              <a:gd name="connsiteY2" fmla="*/ 344836 h 628094"/>
+              <a:gd name="connsiteX3" fmla="*/ 2135961 w 4961711"/>
+              <a:gd name="connsiteY3" fmla="*/ 116236 h 628094"/>
+              <a:gd name="connsiteX4" fmla="*/ 3171011 w 4961711"/>
+              <a:gd name="connsiteY4" fmla="*/ 14636 h 628094"/>
+              <a:gd name="connsiteX5" fmla="*/ 3806011 w 4961711"/>
+              <a:gd name="connsiteY5" fmla="*/ 1936 h 628094"/>
+              <a:gd name="connsiteX6" fmla="*/ 4529911 w 4961711"/>
+              <a:gd name="connsiteY6" fmla="*/ 27336 h 628094"/>
+              <a:gd name="connsiteX7" fmla="*/ 4961711 w 4961711"/>
+              <a:gd name="connsiteY7" fmla="*/ 71786 h 628094"/>
+              <a:gd name="connsiteX0" fmla="*/ 97611 w 4955361"/>
+              <a:gd name="connsiteY0" fmla="*/ 592486 h 628094"/>
+              <a:gd name="connsiteX1" fmla="*/ 148411 w 4955361"/>
+              <a:gd name="connsiteY1" fmla="*/ 598836 h 628094"/>
+              <a:gd name="connsiteX2" fmla="*/ 1024711 w 4955361"/>
+              <a:gd name="connsiteY2" fmla="*/ 344836 h 628094"/>
+              <a:gd name="connsiteX3" fmla="*/ 2135961 w 4955361"/>
+              <a:gd name="connsiteY3" fmla="*/ 116236 h 628094"/>
+              <a:gd name="connsiteX4" fmla="*/ 3171011 w 4955361"/>
+              <a:gd name="connsiteY4" fmla="*/ 14636 h 628094"/>
+              <a:gd name="connsiteX5" fmla="*/ 3806011 w 4955361"/>
+              <a:gd name="connsiteY5" fmla="*/ 1936 h 628094"/>
+              <a:gd name="connsiteX6" fmla="*/ 4529911 w 4955361"/>
+              <a:gd name="connsiteY6" fmla="*/ 27336 h 628094"/>
+              <a:gd name="connsiteX7" fmla="*/ 4955361 w 4955361"/>
+              <a:gd name="connsiteY7" fmla="*/ 65436 h 628094"/>
+              <a:gd name="connsiteX0" fmla="*/ 0 w 4857750"/>
+              <a:gd name="connsiteY0" fmla="*/ 592486 h 592486"/>
+              <a:gd name="connsiteX1" fmla="*/ 565150 w 4857750"/>
+              <a:gd name="connsiteY1" fmla="*/ 433736 h 592486"/>
+              <a:gd name="connsiteX2" fmla="*/ 927100 w 4857750"/>
+              <a:gd name="connsiteY2" fmla="*/ 344836 h 592486"/>
+              <a:gd name="connsiteX3" fmla="*/ 2038350 w 4857750"/>
+              <a:gd name="connsiteY3" fmla="*/ 116236 h 592486"/>
+              <a:gd name="connsiteX4" fmla="*/ 3073400 w 4857750"/>
+              <a:gd name="connsiteY4" fmla="*/ 14636 h 592486"/>
+              <a:gd name="connsiteX5" fmla="*/ 3708400 w 4857750"/>
+              <a:gd name="connsiteY5" fmla="*/ 1936 h 592486"/>
+              <a:gd name="connsiteX6" fmla="*/ 4432300 w 4857750"/>
+              <a:gd name="connsiteY6" fmla="*/ 27336 h 592486"/>
+              <a:gd name="connsiteX7" fmla="*/ 4857750 w 4857750"/>
+              <a:gd name="connsiteY7" fmla="*/ 65436 h 592486"/>
+              <a:gd name="connsiteX0" fmla="*/ 0 w 4432572"/>
+              <a:gd name="connsiteY0" fmla="*/ 616459 h 622809"/>
+              <a:gd name="connsiteX1" fmla="*/ 565150 w 4432572"/>
+              <a:gd name="connsiteY1" fmla="*/ 457709 h 622809"/>
+              <a:gd name="connsiteX2" fmla="*/ 927100 w 4432572"/>
+              <a:gd name="connsiteY2" fmla="*/ 368809 h 622809"/>
+              <a:gd name="connsiteX3" fmla="*/ 2038350 w 4432572"/>
+              <a:gd name="connsiteY3" fmla="*/ 140209 h 622809"/>
+              <a:gd name="connsiteX4" fmla="*/ 3073400 w 4432572"/>
+              <a:gd name="connsiteY4" fmla="*/ 38609 h 622809"/>
+              <a:gd name="connsiteX5" fmla="*/ 3708400 w 4432572"/>
+              <a:gd name="connsiteY5" fmla="*/ 25909 h 622809"/>
+              <a:gd name="connsiteX6" fmla="*/ 4432300 w 4432572"/>
+              <a:gd name="connsiteY6" fmla="*/ 51309 h 622809"/>
+              <a:gd name="connsiteX7" fmla="*/ 3625850 w 4432572"/>
+              <a:gd name="connsiteY7" fmla="*/ 622809 h 622809"/>
+              <a:gd name="connsiteX0" fmla="*/ 0 w 3709346"/>
+              <a:gd name="connsiteY0" fmla="*/ 633827 h 672177"/>
+              <a:gd name="connsiteX1" fmla="*/ 565150 w 3709346"/>
+              <a:gd name="connsiteY1" fmla="*/ 475077 h 672177"/>
+              <a:gd name="connsiteX2" fmla="*/ 927100 w 3709346"/>
+              <a:gd name="connsiteY2" fmla="*/ 386177 h 672177"/>
+              <a:gd name="connsiteX3" fmla="*/ 2038350 w 3709346"/>
+              <a:gd name="connsiteY3" fmla="*/ 157577 h 672177"/>
+              <a:gd name="connsiteX4" fmla="*/ 3073400 w 3709346"/>
+              <a:gd name="connsiteY4" fmla="*/ 55977 h 672177"/>
+              <a:gd name="connsiteX5" fmla="*/ 3708400 w 3709346"/>
+              <a:gd name="connsiteY5" fmla="*/ 43277 h 672177"/>
+              <a:gd name="connsiteX6" fmla="*/ 3225800 w 3709346"/>
+              <a:gd name="connsiteY6" fmla="*/ 627477 h 672177"/>
+              <a:gd name="connsiteX7" fmla="*/ 3625850 w 3709346"/>
+              <a:gd name="connsiteY7" fmla="*/ 640177 h 672177"/>
+              <a:gd name="connsiteX0" fmla="*/ 0 w 3709033"/>
+              <a:gd name="connsiteY0" fmla="*/ 633827 h 640177"/>
+              <a:gd name="connsiteX1" fmla="*/ 565150 w 3709033"/>
+              <a:gd name="connsiteY1" fmla="*/ 475077 h 640177"/>
+              <a:gd name="connsiteX2" fmla="*/ 927100 w 3709033"/>
+              <a:gd name="connsiteY2" fmla="*/ 386177 h 640177"/>
+              <a:gd name="connsiteX3" fmla="*/ 2038350 w 3709033"/>
+              <a:gd name="connsiteY3" fmla="*/ 157577 h 640177"/>
+              <a:gd name="connsiteX4" fmla="*/ 3073400 w 3709033"/>
+              <a:gd name="connsiteY4" fmla="*/ 55977 h 640177"/>
+              <a:gd name="connsiteX5" fmla="*/ 3708400 w 3709033"/>
+              <a:gd name="connsiteY5" fmla="*/ 43277 h 640177"/>
+              <a:gd name="connsiteX6" fmla="*/ 3225800 w 3709033"/>
+              <a:gd name="connsiteY6" fmla="*/ 627477 h 640177"/>
+              <a:gd name="connsiteX7" fmla="*/ 3625850 w 3709033"/>
+              <a:gd name="connsiteY7" fmla="*/ 640177 h 640177"/>
+              <a:gd name="connsiteX0" fmla="*/ 0 w 3625850"/>
+              <a:gd name="connsiteY0" fmla="*/ 600394 h 608265"/>
+              <a:gd name="connsiteX1" fmla="*/ 565150 w 3625850"/>
+              <a:gd name="connsiteY1" fmla="*/ 441644 h 608265"/>
+              <a:gd name="connsiteX2" fmla="*/ 927100 w 3625850"/>
+              <a:gd name="connsiteY2" fmla="*/ 352744 h 608265"/>
+              <a:gd name="connsiteX3" fmla="*/ 2038350 w 3625850"/>
+              <a:gd name="connsiteY3" fmla="*/ 124144 h 608265"/>
+              <a:gd name="connsiteX4" fmla="*/ 3073400 w 3625850"/>
+              <a:gd name="connsiteY4" fmla="*/ 22544 h 608265"/>
+              <a:gd name="connsiteX5" fmla="*/ 2717800 w 3625850"/>
+              <a:gd name="connsiteY5" fmla="*/ 555944 h 608265"/>
+              <a:gd name="connsiteX6" fmla="*/ 3225800 w 3625850"/>
+              <a:gd name="connsiteY6" fmla="*/ 594044 h 608265"/>
+              <a:gd name="connsiteX7" fmla="*/ 3625850 w 3625850"/>
+              <a:gd name="connsiteY7" fmla="*/ 606744 h 608265"/>
+              <a:gd name="connsiteX0" fmla="*/ 0 w 3225800"/>
+              <a:gd name="connsiteY0" fmla="*/ 600394 h 608265"/>
+              <a:gd name="connsiteX1" fmla="*/ 565150 w 3225800"/>
+              <a:gd name="connsiteY1" fmla="*/ 441644 h 608265"/>
+              <a:gd name="connsiteX2" fmla="*/ 927100 w 3225800"/>
+              <a:gd name="connsiteY2" fmla="*/ 352744 h 608265"/>
+              <a:gd name="connsiteX3" fmla="*/ 2038350 w 3225800"/>
+              <a:gd name="connsiteY3" fmla="*/ 124144 h 608265"/>
+              <a:gd name="connsiteX4" fmla="*/ 3073400 w 3225800"/>
+              <a:gd name="connsiteY4" fmla="*/ 22544 h 608265"/>
+              <a:gd name="connsiteX5" fmla="*/ 2717800 w 3225800"/>
+              <a:gd name="connsiteY5" fmla="*/ 555944 h 608265"/>
+              <a:gd name="connsiteX6" fmla="*/ 3225800 w 3225800"/>
+              <a:gd name="connsiteY6" fmla="*/ 594044 h 608265"/>
+              <a:gd name="connsiteX0" fmla="*/ 0 w 3090289"/>
+              <a:gd name="connsiteY0" fmla="*/ 600394 h 600394"/>
+              <a:gd name="connsiteX1" fmla="*/ 565150 w 3090289"/>
+              <a:gd name="connsiteY1" fmla="*/ 441644 h 600394"/>
+              <a:gd name="connsiteX2" fmla="*/ 927100 w 3090289"/>
+              <a:gd name="connsiteY2" fmla="*/ 352744 h 600394"/>
+              <a:gd name="connsiteX3" fmla="*/ 2038350 w 3090289"/>
+              <a:gd name="connsiteY3" fmla="*/ 124144 h 600394"/>
+              <a:gd name="connsiteX4" fmla="*/ 3073400 w 3090289"/>
+              <a:gd name="connsiteY4" fmla="*/ 22544 h 600394"/>
+              <a:gd name="connsiteX5" fmla="*/ 2717800 w 3090289"/>
+              <a:gd name="connsiteY5" fmla="*/ 555944 h 600394"/>
+              <a:gd name="connsiteX0" fmla="*/ 0 w 3073400"/>
+              <a:gd name="connsiteY0" fmla="*/ 600394 h 600394"/>
+              <a:gd name="connsiteX1" fmla="*/ 565150 w 3073400"/>
+              <a:gd name="connsiteY1" fmla="*/ 441644 h 600394"/>
+              <a:gd name="connsiteX2" fmla="*/ 927100 w 3073400"/>
+              <a:gd name="connsiteY2" fmla="*/ 352744 h 600394"/>
+              <a:gd name="connsiteX3" fmla="*/ 2038350 w 3073400"/>
+              <a:gd name="connsiteY3" fmla="*/ 124144 h 600394"/>
+              <a:gd name="connsiteX4" fmla="*/ 3073400 w 3073400"/>
+              <a:gd name="connsiteY4" fmla="*/ 22544 h 600394"/>
+              <a:gd name="connsiteX0" fmla="*/ 0 w 2038350"/>
+              <a:gd name="connsiteY0" fmla="*/ 476250 h 476250"/>
+              <a:gd name="connsiteX1" fmla="*/ 565150 w 2038350"/>
+              <a:gd name="connsiteY1" fmla="*/ 317500 h 476250"/>
+              <a:gd name="connsiteX2" fmla="*/ 927100 w 2038350"/>
+              <a:gd name="connsiteY2" fmla="*/ 228600 h 476250"/>
+              <a:gd name="connsiteX3" fmla="*/ 2038350 w 2038350"/>
+              <a:gd name="connsiteY3" fmla="*/ 0 h 476250"/>
+              <a:gd name="connsiteX0" fmla="*/ 0 w 3638550"/>
+              <a:gd name="connsiteY0" fmla="*/ 252890 h 253897"/>
+              <a:gd name="connsiteX1" fmla="*/ 565150 w 3638550"/>
+              <a:gd name="connsiteY1" fmla="*/ 94140 h 253897"/>
+              <a:gd name="connsiteX2" fmla="*/ 927100 w 3638550"/>
+              <a:gd name="connsiteY2" fmla="*/ 5240 h 253897"/>
+              <a:gd name="connsiteX3" fmla="*/ 3638550 w 3638550"/>
+              <a:gd name="connsiteY3" fmla="*/ 246540 h 253897"/>
+              <a:gd name="connsiteX0" fmla="*/ 0 w 3638550"/>
+              <a:gd name="connsiteY0" fmla="*/ 252890 h 252890"/>
+              <a:gd name="connsiteX1" fmla="*/ 565150 w 3638550"/>
+              <a:gd name="connsiteY1" fmla="*/ 94140 h 252890"/>
+              <a:gd name="connsiteX2" fmla="*/ 927100 w 3638550"/>
+              <a:gd name="connsiteY2" fmla="*/ 5240 h 252890"/>
+              <a:gd name="connsiteX3" fmla="*/ 3638550 w 3638550"/>
+              <a:gd name="connsiteY3" fmla="*/ 246540 h 252890"/>
+              <a:gd name="connsiteX0" fmla="*/ 0 w 3638550"/>
+              <a:gd name="connsiteY0" fmla="*/ 158750 h 158750"/>
+              <a:gd name="connsiteX1" fmla="*/ 565150 w 3638550"/>
+              <a:gd name="connsiteY1" fmla="*/ 0 h 158750"/>
+              <a:gd name="connsiteX2" fmla="*/ 1885950 w 3638550"/>
+              <a:gd name="connsiteY2" fmla="*/ 69850 h 158750"/>
+              <a:gd name="connsiteX3" fmla="*/ 3638550 w 3638550"/>
+              <a:gd name="connsiteY3" fmla="*/ 152400 h 158750"/>
+              <a:gd name="connsiteX0" fmla="*/ 0 w 3638550"/>
+              <a:gd name="connsiteY0" fmla="*/ 89196 h 89196"/>
+              <a:gd name="connsiteX1" fmla="*/ 641350 w 3638550"/>
+              <a:gd name="connsiteY1" fmla="*/ 57446 h 89196"/>
+              <a:gd name="connsiteX2" fmla="*/ 1885950 w 3638550"/>
+              <a:gd name="connsiteY2" fmla="*/ 296 h 89196"/>
+              <a:gd name="connsiteX3" fmla="*/ 3638550 w 3638550"/>
+              <a:gd name="connsiteY3" fmla="*/ 82846 h 89196"/>
+              <a:gd name="connsiteX0" fmla="*/ 0 w 3638550"/>
+              <a:gd name="connsiteY0" fmla="*/ 89364 h 89364"/>
+              <a:gd name="connsiteX1" fmla="*/ 641350 w 3638550"/>
+              <a:gd name="connsiteY1" fmla="*/ 57614 h 89364"/>
+              <a:gd name="connsiteX2" fmla="*/ 1885950 w 3638550"/>
+              <a:gd name="connsiteY2" fmla="*/ 464 h 89364"/>
+              <a:gd name="connsiteX3" fmla="*/ 3638550 w 3638550"/>
+              <a:gd name="connsiteY3" fmla="*/ 83014 h 89364"/>
+              <a:gd name="connsiteX0" fmla="*/ 0 w 3625850"/>
+              <a:gd name="connsiteY0" fmla="*/ 108239 h 108239"/>
+              <a:gd name="connsiteX1" fmla="*/ 628650 w 3625850"/>
+              <a:gd name="connsiteY1" fmla="*/ 57439 h 108239"/>
+              <a:gd name="connsiteX2" fmla="*/ 1873250 w 3625850"/>
+              <a:gd name="connsiteY2" fmla="*/ 289 h 108239"/>
+              <a:gd name="connsiteX3" fmla="*/ 3625850 w 3625850"/>
+              <a:gd name="connsiteY3" fmla="*/ 82839 h 108239"/>
+              <a:gd name="connsiteX0" fmla="*/ 0 w 3625850"/>
+              <a:gd name="connsiteY0" fmla="*/ 108239 h 108239"/>
+              <a:gd name="connsiteX1" fmla="*/ 628650 w 3625850"/>
+              <a:gd name="connsiteY1" fmla="*/ 57439 h 108239"/>
+              <a:gd name="connsiteX2" fmla="*/ 1873250 w 3625850"/>
+              <a:gd name="connsiteY2" fmla="*/ 289 h 108239"/>
+              <a:gd name="connsiteX3" fmla="*/ 3625850 w 3625850"/>
+              <a:gd name="connsiteY3" fmla="*/ 82839 h 108239"/>
+              <a:gd name="connsiteX0" fmla="*/ 0 w 3625850"/>
+              <a:gd name="connsiteY0" fmla="*/ 108239 h 108239"/>
+              <a:gd name="connsiteX1" fmla="*/ 628650 w 3625850"/>
+              <a:gd name="connsiteY1" fmla="*/ 57439 h 108239"/>
+              <a:gd name="connsiteX2" fmla="*/ 1873250 w 3625850"/>
+              <a:gd name="connsiteY2" fmla="*/ 289 h 108239"/>
+              <a:gd name="connsiteX3" fmla="*/ 3625850 w 3625850"/>
+              <a:gd name="connsiteY3" fmla="*/ 82839 h 108239"/>
+              <a:gd name="connsiteX0" fmla="*/ 0 w 3625850"/>
+              <a:gd name="connsiteY0" fmla="*/ 108239 h 108239"/>
+              <a:gd name="connsiteX1" fmla="*/ 628650 w 3625850"/>
+              <a:gd name="connsiteY1" fmla="*/ 57439 h 108239"/>
+              <a:gd name="connsiteX2" fmla="*/ 1873250 w 3625850"/>
+              <a:gd name="connsiteY2" fmla="*/ 289 h 108239"/>
+              <a:gd name="connsiteX3" fmla="*/ 3625850 w 3625850"/>
+              <a:gd name="connsiteY3" fmla="*/ 82839 h 108239"/>
+              <a:gd name="connsiteX0" fmla="*/ 0 w 3625850"/>
+              <a:gd name="connsiteY0" fmla="*/ 50800 h 50800"/>
+              <a:gd name="connsiteX1" fmla="*/ 628650 w 3625850"/>
+              <a:gd name="connsiteY1" fmla="*/ 0 h 50800"/>
+              <a:gd name="connsiteX2" fmla="*/ 3625850 w 3625850"/>
+              <a:gd name="connsiteY2" fmla="*/ 25400 h 50800"/>
+              <a:gd name="connsiteX0" fmla="*/ 0 w 3625850"/>
+              <a:gd name="connsiteY0" fmla="*/ 63500 h 63500"/>
+              <a:gd name="connsiteX1" fmla="*/ 3105150 w 3625850"/>
+              <a:gd name="connsiteY1" fmla="*/ 0 h 63500"/>
+              <a:gd name="connsiteX2" fmla="*/ 3625850 w 3625850"/>
+              <a:gd name="connsiteY2" fmla="*/ 38100 h 63500"/>
+              <a:gd name="connsiteX0" fmla="*/ 0 w 3625850"/>
+              <a:gd name="connsiteY0" fmla="*/ 67175 h 67175"/>
+              <a:gd name="connsiteX1" fmla="*/ 3105150 w 3625850"/>
+              <a:gd name="connsiteY1" fmla="*/ 3675 h 67175"/>
+              <a:gd name="connsiteX2" fmla="*/ 3625850 w 3625850"/>
+              <a:gd name="connsiteY2" fmla="*/ 41775 h 67175"/>
+              <a:gd name="connsiteX0" fmla="*/ 0 w 1162050"/>
+              <a:gd name="connsiteY0" fmla="*/ 19400 h 70200"/>
+              <a:gd name="connsiteX1" fmla="*/ 641350 w 1162050"/>
+              <a:gd name="connsiteY1" fmla="*/ 32100 h 70200"/>
+              <a:gd name="connsiteX2" fmla="*/ 1162050 w 1162050"/>
+              <a:gd name="connsiteY2" fmla="*/ 70200 h 70200"/>
+              <a:gd name="connsiteX0" fmla="*/ 0 w 1162050"/>
+              <a:gd name="connsiteY0" fmla="*/ 411 h 51211"/>
+              <a:gd name="connsiteX1" fmla="*/ 641350 w 1162050"/>
+              <a:gd name="connsiteY1" fmla="*/ 13111 h 51211"/>
+              <a:gd name="connsiteX2" fmla="*/ 1162050 w 1162050"/>
+              <a:gd name="connsiteY2" fmla="*/ 51211 h 51211"/>
+            </a:gdLst>
+            <a:ahLst/>
+            <a:cxnLst>
+              <a:cxn ang="0">
+                <a:pos x="connsiteX0" y="connsiteY0"/>
+              </a:cxn>
+              <a:cxn ang="0">
+                <a:pos x="connsiteX1" y="connsiteY1"/>
+              </a:cxn>
+              <a:cxn ang="0">
+                <a:pos x="connsiteX2" y="connsiteY2"/>
+              </a:cxn>
+            </a:cxnLst>
+            <a:rect l="l" t="t" r="r" b="b"/>
+            <a:pathLst>
+              <a:path w="1162050" h="51211">
+                <a:moveTo>
+                  <a:pt x="0" y="411"/>
+                </a:moveTo>
+                <a:cubicBezTo>
+                  <a:pt x="486833" y="-1706"/>
+                  <a:pt x="447675" y="4644"/>
+                  <a:pt x="641350" y="13111"/>
+                </a:cubicBezTo>
+                <a:cubicBezTo>
+                  <a:pt x="835025" y="21578"/>
+                  <a:pt x="988483" y="38511"/>
+                  <a:pt x="1162050" y="51211"/>
+                </a:cubicBezTo>
+              </a:path>
+            </a:pathLst>
+          </a:custGeom>
+          <a:noFill/>
+          <a:ln w="28575">
+            <a:solidFill>
+              <a:schemeClr val="tx1"/>
+            </a:solidFill>
+          </a:ln>
+        </p:spPr>
+        <p:txBody>
+          <a:bodyPr rtlCol="0" anchor="ctr"/>
+          <a:lstStyle/>
+          <a:p>
+            <a:pPr algn="ctr"/>
+            <a:endParaRPr lang="en-US"/>
+          </a:p>
+        </p:txBody>
+      </p:sp>
+      <p:cxnSp>
+        <p:nvCxnSpPr>
+          <p:cNvPr id="8" name="Straight Connector 7">
+            <a:extLst>
+              <a:ext uri="{FF2B5EF4-FFF2-40B4-BE49-F238E27FC236}">
+                <a16:creationId xmlns="" xmlns:a16="http://schemas.microsoft.com/office/drawing/2014/main" id="{6E1AC79D-EA66-4440-AFFB-D58E30D57E06}"/>
+              </a:ext>
+            </a:extLst>
+          </p:cNvPr>
+          <p:cNvCxnSpPr/>
+          <p:nvPr/>
+        </p:nvCxnSpPr>
+        <p:spPr>
+          <a:xfrm>
+            <a:off x="7093476" y="2999359"/>
+            <a:ext cx="0" cy="804840"/>
+          </a:xfrm>
+          <a:prstGeom prst="line">
+            <a:avLst/>
+          </a:prstGeom>
+          <a:ln w="28575" cmpd="sng">
+            <a:solidFill>
+              <a:schemeClr val="tx1"/>
+            </a:solidFill>
+            <a:headEnd type="none" w="med" len="med"/>
+            <a:tailEnd type="none" w="med" len="med"/>
+          </a:ln>
+        </p:spPr>
+        <p:style>
+          <a:lnRef idx="1">
+            <a:schemeClr val="dk1"/>
+          </a:lnRef>
+          <a:fillRef idx="0">
+            <a:schemeClr val="dk1"/>
+          </a:fillRef>
+          <a:effectRef idx="0">
+            <a:schemeClr val="dk1"/>
+          </a:effectRef>
+          <a:fontRef idx="minor">
+            <a:schemeClr val="tx1"/>
+          </a:fontRef>
+        </p:style>
+      </p:cxnSp>
+      <p:sp>
+        <p:nvSpPr>
+          <p:cNvPr id="10" name="Freeform 9">
+            <a:extLst>
+              <a:ext uri="{FF2B5EF4-FFF2-40B4-BE49-F238E27FC236}">
+                <a16:creationId xmlns="" xmlns:a16="http://schemas.microsoft.com/office/drawing/2014/main" id="{A0B43607-0DF5-AF41-8B4C-4617D8A78A2E}"/>
+              </a:ext>
+            </a:extLst>
+          </p:cNvPr>
+          <p:cNvSpPr/>
+          <p:nvPr/>
+        </p:nvSpPr>
+        <p:spPr>
+          <a:xfrm>
+            <a:off x="5212047" y="2776820"/>
+            <a:ext cx="2108432" cy="636645"/>
+          </a:xfrm>
+          <a:custGeom>
+            <a:avLst/>
+            <a:gdLst>
+              <a:gd name="connsiteX0" fmla="*/ 0 w 1758950"/>
+              <a:gd name="connsiteY0" fmla="*/ 0 h 609600"/>
+              <a:gd name="connsiteX1" fmla="*/ 869950 w 1758950"/>
+              <a:gd name="connsiteY1" fmla="*/ 215900 h 609600"/>
+              <a:gd name="connsiteX2" fmla="*/ 1758950 w 1758950"/>
+              <a:gd name="connsiteY2" fmla="*/ 609600 h 609600"/>
+            </a:gdLst>
+            <a:ahLst/>
+            <a:cxnLst>
+              <a:cxn ang="0">
+                <a:pos x="connsiteX0" y="connsiteY0"/>
+              </a:cxn>
+              <a:cxn ang="0">
+                <a:pos x="connsiteX1" y="connsiteY1"/>
+              </a:cxn>
+              <a:cxn ang="0">
+                <a:pos x="connsiteX2" y="connsiteY2"/>
+              </a:cxn>
+            </a:cxnLst>
+            <a:rect l="l" t="t" r="r" b="b"/>
+            <a:pathLst>
+              <a:path w="1758950" h="609600">
+                <a:moveTo>
+                  <a:pt x="0" y="0"/>
+                </a:moveTo>
+                <a:cubicBezTo>
+                  <a:pt x="288396" y="57150"/>
+                  <a:pt x="576792" y="114300"/>
+                  <a:pt x="869950" y="215900"/>
+                </a:cubicBezTo>
+                <a:cubicBezTo>
+                  <a:pt x="1163108" y="317500"/>
+                  <a:pt x="1461029" y="463550"/>
+                  <a:pt x="1758950" y="609600"/>
+                </a:cubicBezTo>
+              </a:path>
+            </a:pathLst>
+          </a:custGeom>
+          <a:noFill/>
+          <a:ln w="28575">
+            <a:solidFill>
+              <a:srgbClr val="0070C0"/>
+            </a:solidFill>
+            <a:headEnd type="none" w="med" len="med"/>
+            <a:tailEnd type="triangle" w="med" len="med"/>
+          </a:ln>
+        </p:spPr>
+        <p:txBody>
+          <a:bodyPr rtlCol="0" anchor="ctr"/>
+          <a:lstStyle/>
+          <a:p>
+            <a:pPr algn="ctr"/>
+            <a:endParaRPr lang="en-US"/>
+          </a:p>
+        </p:txBody>
+      </p:sp>
+      <p:sp>
+        <p:nvSpPr>
+          <p:cNvPr id="11" name="Freeform 10">
+            <a:extLst>
+              <a:ext uri="{FF2B5EF4-FFF2-40B4-BE49-F238E27FC236}">
+                <a16:creationId xmlns="" xmlns:a16="http://schemas.microsoft.com/office/drawing/2014/main" id="{2399D775-DC2E-7440-A585-40CD24E7C314}"/>
+              </a:ext>
+            </a:extLst>
+          </p:cNvPr>
+          <p:cNvSpPr/>
+          <p:nvPr/>
+        </p:nvSpPr>
+        <p:spPr>
+          <a:xfrm>
+            <a:off x="5740896" y="2608736"/>
+            <a:ext cx="1579583" cy="753519"/>
+          </a:xfrm>
+          <a:custGeom>
+            <a:avLst/>
+            <a:gdLst>
+              <a:gd name="connsiteX0" fmla="*/ 0 w 1758950"/>
+              <a:gd name="connsiteY0" fmla="*/ 0 h 609600"/>
+              <a:gd name="connsiteX1" fmla="*/ 869950 w 1758950"/>
+              <a:gd name="connsiteY1" fmla="*/ 215900 h 609600"/>
+              <a:gd name="connsiteX2" fmla="*/ 1758950 w 1758950"/>
+              <a:gd name="connsiteY2" fmla="*/ 609600 h 609600"/>
+              <a:gd name="connsiteX0" fmla="*/ 0 w 1758950"/>
+              <a:gd name="connsiteY0" fmla="*/ 0 h 609600"/>
+              <a:gd name="connsiteX1" fmla="*/ 1162050 w 1758950"/>
+              <a:gd name="connsiteY1" fmla="*/ 279400 h 609600"/>
+              <a:gd name="connsiteX2" fmla="*/ 1758950 w 1758950"/>
+              <a:gd name="connsiteY2" fmla="*/ 609600 h 609600"/>
+              <a:gd name="connsiteX0" fmla="*/ 0 w 1282700"/>
+              <a:gd name="connsiteY0" fmla="*/ 0 h 577850"/>
+              <a:gd name="connsiteX1" fmla="*/ 685800 w 1282700"/>
+              <a:gd name="connsiteY1" fmla="*/ 247650 h 577850"/>
+              <a:gd name="connsiteX2" fmla="*/ 1282700 w 1282700"/>
+              <a:gd name="connsiteY2" fmla="*/ 577850 h 577850"/>
+              <a:gd name="connsiteX0" fmla="*/ 0 w 1282700"/>
+              <a:gd name="connsiteY0" fmla="*/ 0 h 577850"/>
+              <a:gd name="connsiteX1" fmla="*/ 685800 w 1282700"/>
+              <a:gd name="connsiteY1" fmla="*/ 247650 h 577850"/>
+              <a:gd name="connsiteX2" fmla="*/ 1282700 w 1282700"/>
+              <a:gd name="connsiteY2" fmla="*/ 577850 h 577850"/>
+              <a:gd name="connsiteX0" fmla="*/ 0 w 1282700"/>
+              <a:gd name="connsiteY0" fmla="*/ 0 h 577850"/>
+              <a:gd name="connsiteX1" fmla="*/ 685800 w 1282700"/>
+              <a:gd name="connsiteY1" fmla="*/ 247650 h 577850"/>
+              <a:gd name="connsiteX2" fmla="*/ 1282700 w 1282700"/>
+              <a:gd name="connsiteY2" fmla="*/ 577850 h 577850"/>
+              <a:gd name="connsiteX0" fmla="*/ 0 w 1282700"/>
+              <a:gd name="connsiteY0" fmla="*/ 0 h 577850"/>
+              <a:gd name="connsiteX1" fmla="*/ 685800 w 1282700"/>
+              <a:gd name="connsiteY1" fmla="*/ 247650 h 577850"/>
+              <a:gd name="connsiteX2" fmla="*/ 1282700 w 1282700"/>
+              <a:gd name="connsiteY2" fmla="*/ 577850 h 577850"/>
+              <a:gd name="connsiteX0" fmla="*/ 0 w 1282700"/>
+              <a:gd name="connsiteY0" fmla="*/ 0 h 577850"/>
+              <a:gd name="connsiteX1" fmla="*/ 685800 w 1282700"/>
+              <a:gd name="connsiteY1" fmla="*/ 247650 h 577850"/>
+              <a:gd name="connsiteX2" fmla="*/ 1282700 w 1282700"/>
+              <a:gd name="connsiteY2" fmla="*/ 577850 h 577850"/>
+            </a:gdLst>
+            <a:ahLst/>
+            <a:cxnLst>
+              <a:cxn ang="0">
+                <a:pos x="connsiteX0" y="connsiteY0"/>
+              </a:cxn>
+              <a:cxn ang="0">
+                <a:pos x="connsiteX1" y="connsiteY1"/>
+              </a:cxn>
+              <a:cxn ang="0">
+                <a:pos x="connsiteX2" y="connsiteY2"/>
+              </a:cxn>
+            </a:cxnLst>
+            <a:rect l="l" t="t" r="r" b="b"/>
+            <a:pathLst>
+              <a:path w="1282700" h="577850">
+                <a:moveTo>
+                  <a:pt x="0" y="0"/>
+                </a:moveTo>
+                <a:cubicBezTo>
+                  <a:pt x="339196" y="88900"/>
+                  <a:pt x="421217" y="132292"/>
+                  <a:pt x="685800" y="247650"/>
+                </a:cubicBezTo>
+                <a:cubicBezTo>
+                  <a:pt x="950383" y="363008"/>
+                  <a:pt x="984779" y="431800"/>
+                  <a:pt x="1282700" y="577850"/>
+                </a:cubicBezTo>
+              </a:path>
+            </a:pathLst>
+          </a:custGeom>
+          <a:noFill/>
+          <a:ln w="28575">
+            <a:solidFill>
+              <a:srgbClr val="0070C0"/>
+            </a:solidFill>
+            <a:headEnd type="none" w="med" len="med"/>
+            <a:tailEnd type="triangle" w="med" len="med"/>
+          </a:ln>
+        </p:spPr>
+        <p:txBody>
+          <a:bodyPr rtlCol="0" anchor="ctr"/>
+          <a:lstStyle/>
+          <a:p>
+            <a:pPr algn="ctr"/>
+            <a:endParaRPr lang="en-US"/>
+          </a:p>
+        </p:txBody>
+      </p:sp>
+      <p:sp>
+        <p:nvSpPr>
+          <p:cNvPr id="12" name="Freeform 11">
+            <a:extLst>
+              <a:ext uri="{FF2B5EF4-FFF2-40B4-BE49-F238E27FC236}">
+                <a16:creationId xmlns="" xmlns:a16="http://schemas.microsoft.com/office/drawing/2014/main" id="{199575AC-DE9E-AE4E-ABC3-C2B345BD7375}"/>
+              </a:ext>
+            </a:extLst>
+          </p:cNvPr>
+          <p:cNvSpPr/>
+          <p:nvPr/>
+        </p:nvSpPr>
+        <p:spPr>
+          <a:xfrm>
+            <a:off x="2980536" y="3228175"/>
+            <a:ext cx="4339943" cy="287128"/>
+          </a:xfrm>
+          <a:custGeom>
+            <a:avLst/>
+            <a:gdLst>
+              <a:gd name="connsiteX0" fmla="*/ 0 w 3594100"/>
+              <a:gd name="connsiteY0" fmla="*/ 1222 h 394922"/>
+              <a:gd name="connsiteX1" fmla="*/ 1028700 w 3594100"/>
+              <a:gd name="connsiteY1" fmla="*/ 20272 h 394922"/>
+              <a:gd name="connsiteX2" fmla="*/ 2298700 w 3594100"/>
+              <a:gd name="connsiteY2" fmla="*/ 140922 h 394922"/>
+              <a:gd name="connsiteX3" fmla="*/ 3155950 w 3594100"/>
+              <a:gd name="connsiteY3" fmla="*/ 286972 h 394922"/>
+              <a:gd name="connsiteX4" fmla="*/ 3594100 w 3594100"/>
+              <a:gd name="connsiteY4" fmla="*/ 394922 h 394922"/>
+            </a:gdLst>
+            <a:ahLst/>
+            <a:cxnLst>
+              <a:cxn ang="0">
+                <a:pos x="connsiteX0" y="connsiteY0"/>
+              </a:cxn>
+              <a:cxn ang="0">
+                <a:pos x="connsiteX1" y="connsiteY1"/>
+              </a:cxn>
+              <a:cxn ang="0">
+                <a:pos x="connsiteX2" y="connsiteY2"/>
+              </a:cxn>
+              <a:cxn ang="0">
+                <a:pos x="connsiteX3" y="connsiteY3"/>
+              </a:cxn>
+              <a:cxn ang="0">
+                <a:pos x="connsiteX4" y="connsiteY4"/>
+              </a:cxn>
+            </a:cxnLst>
+            <a:rect l="l" t="t" r="r" b="b"/>
+            <a:pathLst>
+              <a:path w="3594100" h="394922">
+                <a:moveTo>
+                  <a:pt x="0" y="1222"/>
+                </a:moveTo>
+                <a:cubicBezTo>
+                  <a:pt x="322791" y="-895"/>
+                  <a:pt x="645583" y="-3011"/>
+                  <a:pt x="1028700" y="20272"/>
+                </a:cubicBezTo>
+                <a:cubicBezTo>
+                  <a:pt x="1411817" y="43555"/>
+                  <a:pt x="1944158" y="96472"/>
+                  <a:pt x="2298700" y="140922"/>
+                </a:cubicBezTo>
+                <a:cubicBezTo>
+                  <a:pt x="2653242" y="185372"/>
+                  <a:pt x="2940050" y="244639"/>
+                  <a:pt x="3155950" y="286972"/>
+                </a:cubicBezTo>
+                <a:cubicBezTo>
+                  <a:pt x="3371850" y="329305"/>
+                  <a:pt x="3482975" y="362113"/>
+                  <a:pt x="3594100" y="394922"/>
+                </a:cubicBezTo>
+              </a:path>
+            </a:pathLst>
+          </a:custGeom>
+          <a:noFill/>
+          <a:ln w="28575">
+            <a:solidFill>
+              <a:srgbClr val="C00000"/>
+            </a:solidFill>
+            <a:headEnd type="none" w="med" len="med"/>
+            <a:tailEnd type="arrow" w="med" len="med"/>
+          </a:ln>
+        </p:spPr>
+        <p:txBody>
+          <a:bodyPr rtlCol="0" anchor="ctr"/>
+          <a:lstStyle/>
+          <a:p>
+            <a:pPr algn="ctr"/>
+            <a:endParaRPr lang="en-US">
+              <a:solidFill>
+                <a:srgbClr val="C00000"/>
+              </a:solidFill>
+            </a:endParaRPr>
+          </a:p>
+        </p:txBody>
+      </p:sp>
+      <p:sp>
+        <p:nvSpPr>
+          <p:cNvPr id="13" name="Oval 12">
+            <a:extLst>
+              <a:ext uri="{FF2B5EF4-FFF2-40B4-BE49-F238E27FC236}">
+                <a16:creationId xmlns="" xmlns:a16="http://schemas.microsoft.com/office/drawing/2014/main" id="{C309CBCD-9903-C041-9D59-EAA9D5821D89}"/>
+              </a:ext>
+            </a:extLst>
+          </p:cNvPr>
+          <p:cNvSpPr>
+            <a:spLocks noChangeAspect="1"/>
+          </p:cNvSpPr>
+          <p:nvPr/>
+        </p:nvSpPr>
+        <p:spPr>
+          <a:xfrm>
+            <a:off x="5443746" y="2385163"/>
+            <a:ext cx="304031" cy="321943"/>
+          </a:xfrm>
+          <a:prstGeom prst="ellipse">
+            <a:avLst/>
+          </a:prstGeom>
+          <a:solidFill>
+            <a:srgbClr val="0070C0"/>
+          </a:solidFill>
+          <a:ln w="28575">
+            <a:solidFill>
+              <a:srgbClr val="0070C0"/>
+            </a:solidFill>
+          </a:ln>
+        </p:spPr>
+        <p:txBody>
+          <a:bodyPr rtlCol="0" anchor="ctr">
+            <a:spAutoFit/>
+          </a:bodyPr>
+          <a:lstStyle/>
+          <a:p>
+            <a:pPr marL="342900" indent="-342900" algn="ctr">
+              <a:buFont typeface="Arial" charset="0"/>
+              <a:buChar char="•"/>
+            </a:pPr>
+            <a:endParaRPr lang="en-US" sz="2400" b="0" dirty="0">
+              <a:solidFill>
+                <a:schemeClr val="tx1"/>
+              </a:solidFill>
+            </a:endParaRPr>
+          </a:p>
+        </p:txBody>
+      </p:sp>
+      <p:sp>
+        <p:nvSpPr>
+          <p:cNvPr id="14" name="Oval 13">
+            <a:extLst>
+              <a:ext uri="{FF2B5EF4-FFF2-40B4-BE49-F238E27FC236}">
+                <a16:creationId xmlns="" xmlns:a16="http://schemas.microsoft.com/office/drawing/2014/main" id="{8FB92718-2E01-A64C-B967-41B09E7A3AD8}"/>
+              </a:ext>
+            </a:extLst>
+          </p:cNvPr>
+          <p:cNvSpPr>
+            <a:spLocks noChangeAspect="1"/>
+          </p:cNvSpPr>
+          <p:nvPr/>
+        </p:nvSpPr>
+        <p:spPr>
+          <a:xfrm>
+            <a:off x="4923977" y="2521194"/>
+            <a:ext cx="304031" cy="321943"/>
+          </a:xfrm>
+          <a:prstGeom prst="ellipse">
+            <a:avLst/>
+          </a:prstGeom>
+          <a:solidFill>
+            <a:srgbClr val="0070C0"/>
+          </a:solidFill>
+          <a:ln w="28575">
+            <a:solidFill>
+              <a:srgbClr val="0070C0"/>
+            </a:solidFill>
+          </a:ln>
+        </p:spPr>
+        <p:txBody>
+          <a:bodyPr rtlCol="0" anchor="ctr">
+            <a:spAutoFit/>
+          </a:bodyPr>
+          <a:lstStyle/>
+          <a:p>
+            <a:pPr marL="342900" indent="-342900" algn="ctr">
+              <a:buFont typeface="Arial" charset="0"/>
+              <a:buChar char="•"/>
+            </a:pPr>
+            <a:endParaRPr lang="en-US" sz="2400" b="0" dirty="0">
+              <a:solidFill>
+                <a:schemeClr val="tx1"/>
+              </a:solidFill>
+            </a:endParaRPr>
+          </a:p>
+        </p:txBody>
+      </p:sp>
+      <p:sp>
+        <p:nvSpPr>
+          <p:cNvPr id="15" name="Oval 14">
+            <a:extLst>
+              <a:ext uri="{FF2B5EF4-FFF2-40B4-BE49-F238E27FC236}">
+                <a16:creationId xmlns="" xmlns:a16="http://schemas.microsoft.com/office/drawing/2014/main" id="{B6DAC37C-F612-5242-8DC6-F3DF7B0DF498}"/>
+              </a:ext>
+            </a:extLst>
+          </p:cNvPr>
+          <p:cNvSpPr>
+            <a:spLocks noChangeAspect="1"/>
+          </p:cNvSpPr>
+          <p:nvPr/>
+        </p:nvSpPr>
+        <p:spPr>
+          <a:xfrm>
+            <a:off x="2696639" y="3032223"/>
+            <a:ext cx="304031" cy="321943"/>
+          </a:xfrm>
+          <a:prstGeom prst="ellipse">
+            <a:avLst/>
+          </a:prstGeom>
+          <a:solidFill>
+            <a:srgbClr val="C00000"/>
+          </a:solidFill>
+          <a:ln>
+            <a:solidFill>
+              <a:srgbClr val="C00000"/>
+            </a:solidFill>
+          </a:ln>
+        </p:spPr>
+        <p:txBody>
+          <a:bodyPr rtlCol="0" anchor="ctr">
+            <a:spAutoFit/>
+          </a:bodyPr>
+          <a:lstStyle/>
+          <a:p>
+            <a:pPr marL="342900" indent="-342900" algn="ctr">
+              <a:buFont typeface="Arial" charset="0"/>
+              <a:buChar char="•"/>
+            </a:pPr>
+            <a:endParaRPr lang="en-US" sz="2400" b="0" dirty="0">
+              <a:solidFill>
+                <a:schemeClr val="tx1"/>
+              </a:solidFill>
+            </a:endParaRPr>
+          </a:p>
+        </p:txBody>
+      </p:sp>
+      <p:cxnSp>
+        <p:nvCxnSpPr>
+          <p:cNvPr id="16" name="Straight Arrow Connector 15">
+            <a:extLst>
+              <a:ext uri="{FF2B5EF4-FFF2-40B4-BE49-F238E27FC236}">
+                <a16:creationId xmlns="" xmlns:a16="http://schemas.microsoft.com/office/drawing/2014/main" id="{B7857C29-BDD5-E94E-B31A-12882D811274}"/>
+              </a:ext>
+            </a:extLst>
+          </p:cNvPr>
+          <p:cNvCxnSpPr>
+            <a:cxnSpLocks/>
+          </p:cNvCxnSpPr>
+          <p:nvPr/>
+        </p:nvCxnSpPr>
+        <p:spPr>
+          <a:xfrm flipV="1">
+            <a:off x="2658778" y="2997122"/>
+            <a:ext cx="400775" cy="382483"/>
+          </a:xfrm>
+          <a:prstGeom prst="straightConnector1">
+            <a:avLst/>
+          </a:prstGeom>
+          <a:ln w="28575" cmpd="sng">
+            <a:solidFill>
+              <a:schemeClr val="tx1"/>
+            </a:solidFill>
+            <a:headEnd type="none"/>
+            <a:tailEnd type="triangle"/>
+          </a:ln>
+        </p:spPr>
+        <p:style>
+          <a:lnRef idx="1">
+            <a:schemeClr val="dk1"/>
+          </a:lnRef>
+          <a:fillRef idx="0">
+            <a:schemeClr val="dk1"/>
+          </a:fillRef>
+          <a:effectRef idx="0">
+            <a:schemeClr val="dk1"/>
+          </a:effectRef>
+          <a:fontRef idx="minor">
+            <a:schemeClr val="tx1"/>
+          </a:fontRef>
+        </p:style>
+      </p:cxnSp>
+      <p:cxnSp>
+        <p:nvCxnSpPr>
+          <p:cNvPr id="17" name="Straight Arrow Connector 16">
+            <a:extLst>
+              <a:ext uri="{FF2B5EF4-FFF2-40B4-BE49-F238E27FC236}">
+                <a16:creationId xmlns="" xmlns:a16="http://schemas.microsoft.com/office/drawing/2014/main" id="{5D34CE04-A950-384E-9969-4A33D4971331}"/>
+              </a:ext>
+            </a:extLst>
+          </p:cNvPr>
+          <p:cNvCxnSpPr>
+            <a:cxnSpLocks/>
+          </p:cNvCxnSpPr>
+          <p:nvPr/>
+        </p:nvCxnSpPr>
+        <p:spPr>
+          <a:xfrm flipV="1">
+            <a:off x="4769690" y="2662942"/>
+            <a:ext cx="607315" cy="38446"/>
+          </a:xfrm>
+          <a:prstGeom prst="straightConnector1">
+            <a:avLst/>
+          </a:prstGeom>
+          <a:ln w="28575" cmpd="sng">
+            <a:solidFill>
+              <a:schemeClr val="tx1"/>
+            </a:solidFill>
+            <a:headEnd type="none"/>
+            <a:tailEnd type="triangle"/>
+          </a:ln>
+        </p:spPr>
+        <p:style>
+          <a:lnRef idx="1">
+            <a:schemeClr val="dk1"/>
+          </a:lnRef>
+          <a:fillRef idx="0">
+            <a:schemeClr val="dk1"/>
+          </a:fillRef>
+          <a:effectRef idx="0">
+            <a:schemeClr val="dk1"/>
+          </a:effectRef>
+          <a:fontRef idx="minor">
+            <a:schemeClr val="tx1"/>
+          </a:fontRef>
+        </p:style>
+      </p:cxnSp>
+      <p:cxnSp>
+        <p:nvCxnSpPr>
+          <p:cNvPr id="18" name="Straight Arrow Connector 17">
+            <a:extLst>
+              <a:ext uri="{FF2B5EF4-FFF2-40B4-BE49-F238E27FC236}">
+                <a16:creationId xmlns="" xmlns:a16="http://schemas.microsoft.com/office/drawing/2014/main" id="{1D21ED6C-3811-DA4A-8786-98726449F052}"/>
+              </a:ext>
+            </a:extLst>
+          </p:cNvPr>
+          <p:cNvCxnSpPr>
+            <a:cxnSpLocks/>
+          </p:cNvCxnSpPr>
+          <p:nvPr/>
+        </p:nvCxnSpPr>
+        <p:spPr>
+          <a:xfrm flipV="1">
+            <a:off x="5288133" y="2545743"/>
+            <a:ext cx="607315" cy="38446"/>
+          </a:xfrm>
+          <a:prstGeom prst="straightConnector1">
+            <a:avLst/>
+          </a:prstGeom>
+          <a:ln w="28575" cmpd="sng">
+            <a:solidFill>
+              <a:schemeClr val="tx1"/>
+            </a:solidFill>
+            <a:headEnd type="none"/>
+            <a:tailEnd type="triangle"/>
+          </a:ln>
+        </p:spPr>
+        <p:style>
+          <a:lnRef idx="1">
+            <a:schemeClr val="dk1"/>
+          </a:lnRef>
+          <a:fillRef idx="0">
+            <a:schemeClr val="dk1"/>
+          </a:fillRef>
+          <a:effectRef idx="0">
+            <a:schemeClr val="dk1"/>
+          </a:effectRef>
+          <a:fontRef idx="minor">
+            <a:schemeClr val="tx1"/>
+          </a:fontRef>
+        </p:style>
+      </p:cxnSp>
+      <p:sp>
+        <p:nvSpPr>
+          <p:cNvPr id="19" name="TextBox 18">
+            <a:extLst>
+              <a:ext uri="{FF2B5EF4-FFF2-40B4-BE49-F238E27FC236}">
+                <a16:creationId xmlns="" xmlns:a16="http://schemas.microsoft.com/office/drawing/2014/main" id="{232A0FCB-44AB-9C44-9847-7785B68D6AEB}"/>
+              </a:ext>
+            </a:extLst>
+          </p:cNvPr>
+          <p:cNvSpPr txBox="1"/>
+          <p:nvPr/>
+        </p:nvSpPr>
+        <p:spPr>
+          <a:xfrm>
+            <a:off x="4789985" y="2152354"/>
+            <a:ext cx="587020" cy="369332"/>
+          </a:xfrm>
+          <a:prstGeom prst="rect">
+            <a:avLst/>
+          </a:prstGeom>
+          <a:noFill/>
+        </p:spPr>
+        <p:txBody>
+          <a:bodyPr wrap="none" rtlCol="0">
+            <a:spAutoFit/>
+          </a:bodyPr>
+          <a:lstStyle/>
+          <a:p>
+            <a:r>
+              <a:rPr lang="en-US" b="0" dirty="0"/>
+              <a:t>Spin</a:t>
+            </a:r>
+          </a:p>
+        </p:txBody>
+      </p:sp>
+      <p:sp>
+        <p:nvSpPr>
+          <p:cNvPr id="20" name="TextBox 19">
+            <a:extLst>
+              <a:ext uri="{FF2B5EF4-FFF2-40B4-BE49-F238E27FC236}">
+                <a16:creationId xmlns="" xmlns:a16="http://schemas.microsoft.com/office/drawing/2014/main" id="{8D2B14C9-79B0-2040-97B6-54AB683ECB8F}"/>
+              </a:ext>
+            </a:extLst>
+          </p:cNvPr>
+          <p:cNvSpPr txBox="1"/>
+          <p:nvPr/>
+        </p:nvSpPr>
+        <p:spPr>
+          <a:xfrm>
+            <a:off x="2819972" y="2643743"/>
+            <a:ext cx="587020" cy="369332"/>
+          </a:xfrm>
+          <a:prstGeom prst="rect">
+            <a:avLst/>
+          </a:prstGeom>
+          <a:noFill/>
+          <a:ln>
+            <a:noFill/>
+          </a:ln>
+        </p:spPr>
+        <p:txBody>
+          <a:bodyPr wrap="none" rtlCol="0">
+            <a:spAutoFit/>
+          </a:bodyPr>
+          <a:lstStyle/>
+          <a:p>
+            <a:r>
+              <a:rPr lang="en-US" b="0" dirty="0"/>
+              <a:t>Spin</a:t>
+            </a:r>
+          </a:p>
+        </p:txBody>
+      </p:sp>
+      <p:sp>
+        <p:nvSpPr>
+          <p:cNvPr id="21" name="TextBox 20">
+            <a:extLst>
+              <a:ext uri="{FF2B5EF4-FFF2-40B4-BE49-F238E27FC236}">
+                <a16:creationId xmlns="" xmlns:a16="http://schemas.microsoft.com/office/drawing/2014/main" id="{AE48D165-DFCC-0A46-91A2-83B67FF56A91}"/>
+              </a:ext>
+            </a:extLst>
+          </p:cNvPr>
+          <p:cNvSpPr txBox="1"/>
+          <p:nvPr/>
+        </p:nvSpPr>
+        <p:spPr>
+          <a:xfrm>
+            <a:off x="5903390" y="2346620"/>
+            <a:ext cx="1261371" cy="369332"/>
+          </a:xfrm>
+          <a:prstGeom prst="rect">
+            <a:avLst/>
+          </a:prstGeom>
+          <a:noFill/>
+        </p:spPr>
+        <p:txBody>
+          <a:bodyPr wrap="none" rtlCol="0">
+            <a:spAutoFit/>
+          </a:bodyPr>
+          <a:lstStyle/>
+          <a:p>
+            <a:r>
+              <a:rPr lang="en-US" b="0" dirty="0">
+                <a:solidFill>
+                  <a:srgbClr val="0070C0"/>
+                </a:solidFill>
+              </a:rPr>
+              <a:t>Low Energy</a:t>
+            </a:r>
+          </a:p>
+        </p:txBody>
+      </p:sp>
+      <p:sp>
+        <p:nvSpPr>
+          <p:cNvPr id="22" name="TextBox 21">
+            <a:extLst>
+              <a:ext uri="{FF2B5EF4-FFF2-40B4-BE49-F238E27FC236}">
+                <a16:creationId xmlns="" xmlns:a16="http://schemas.microsoft.com/office/drawing/2014/main" id="{CF727CA3-770F-3A4D-B8B7-13E51B197AC1}"/>
+              </a:ext>
+            </a:extLst>
+          </p:cNvPr>
+          <p:cNvSpPr txBox="1"/>
+          <p:nvPr/>
+        </p:nvSpPr>
+        <p:spPr>
+          <a:xfrm>
+            <a:off x="3027769" y="3246106"/>
+            <a:ext cx="1305357" cy="369332"/>
+          </a:xfrm>
+          <a:prstGeom prst="rect">
+            <a:avLst/>
+          </a:prstGeom>
+          <a:noFill/>
+        </p:spPr>
+        <p:txBody>
+          <a:bodyPr wrap="none" rtlCol="0">
+            <a:spAutoFit/>
+          </a:bodyPr>
+          <a:lstStyle/>
+          <a:p>
+            <a:r>
+              <a:rPr lang="en-US" b="0" dirty="0">
+                <a:solidFill>
+                  <a:srgbClr val="C00000"/>
+                </a:solidFill>
+              </a:rPr>
+              <a:t>High Energy</a:t>
+            </a:r>
+          </a:p>
+        </p:txBody>
+      </p:sp>
+      <p:sp>
+        <p:nvSpPr>
+          <p:cNvPr id="23" name="TextBox 22">
+            <a:extLst>
+              <a:ext uri="{FF2B5EF4-FFF2-40B4-BE49-F238E27FC236}">
+                <a16:creationId xmlns="" xmlns:a16="http://schemas.microsoft.com/office/drawing/2014/main" id="{D328EE14-F79F-454D-96AC-2982A9A76FD6}"/>
+              </a:ext>
+            </a:extLst>
+          </p:cNvPr>
+          <p:cNvSpPr txBox="1"/>
+          <p:nvPr/>
+        </p:nvSpPr>
+        <p:spPr>
+          <a:xfrm>
+            <a:off x="7711978" y="3260670"/>
+            <a:ext cx="593432" cy="369332"/>
+          </a:xfrm>
+          <a:prstGeom prst="rect">
+            <a:avLst/>
+          </a:prstGeom>
+          <a:noFill/>
+        </p:spPr>
+        <p:txBody>
+          <a:bodyPr wrap="none" rtlCol="0">
+            <a:spAutoFit/>
+          </a:bodyPr>
+          <a:lstStyle/>
+          <a:p>
+            <a:r>
+              <a:rPr lang="en-US" b="0" dirty="0" err="1">
+                <a:solidFill>
+                  <a:srgbClr val="000000"/>
+                </a:solidFill>
+              </a:rPr>
+              <a:t>Calo</a:t>
+            </a:r>
+            <a:endParaRPr lang="en-US" b="0" dirty="0">
+              <a:solidFill>
+                <a:srgbClr val="000000"/>
+              </a:solidFill>
+            </a:endParaRPr>
+          </a:p>
+        </p:txBody>
+      </p:sp>
+      <p:sp>
+        <p:nvSpPr>
+          <p:cNvPr id="25" name="Rectangle 24">
+            <a:extLst>
+              <a:ext uri="{FF2B5EF4-FFF2-40B4-BE49-F238E27FC236}">
+                <a16:creationId xmlns="" xmlns:a16="http://schemas.microsoft.com/office/drawing/2014/main" id="{E79FC1EC-4B2C-5D44-B698-E90892C2F5E3}"/>
+              </a:ext>
+            </a:extLst>
+          </p:cNvPr>
+          <p:cNvSpPr/>
+          <p:nvPr/>
+        </p:nvSpPr>
+        <p:spPr>
+          <a:xfrm>
+            <a:off x="7163338" y="3085930"/>
+            <a:ext cx="548640" cy="731520"/>
+          </a:xfrm>
+          <a:prstGeom prst="rect">
+            <a:avLst/>
+          </a:prstGeom>
+          <a:ln w="28575">
+            <a:solidFill>
+              <a:schemeClr val="tx1"/>
+            </a:solidFill>
+          </a:ln>
+        </p:spPr>
+        <p:txBody>
+          <a:bodyPr rtlCol="0" anchor="ctr">
+            <a:spAutoFit/>
+          </a:bodyPr>
+          <a:lstStyle/>
+          <a:p>
+            <a:pPr marL="342900" indent="-342900" algn="ctr">
+              <a:buFont typeface="Arial" charset="0"/>
+              <a:buChar char="•"/>
+            </a:pPr>
+            <a:endParaRPr lang="en-US" sz="2400" b="0">
+              <a:solidFill>
+                <a:schemeClr val="tx1"/>
+              </a:solidFill>
+            </a:endParaRPr>
+          </a:p>
+        </p:txBody>
+      </p:sp>
+    </p:spTree>
+    <p:extLst>
+      <p:ext uri="{BB962C8B-B14F-4D97-AF65-F5344CB8AC3E}">
+        <p14:creationId xmlns:p14="http://schemas.microsoft.com/office/powerpoint/2010/main" val="1594237010"/>
+      </p:ext>
+    </p:extLst>
+  </p:cSld>
+  <p:clrMapOvr>
+    <a:masterClrMapping/>
+  </p:clrMapOvr>
+</p:sld>
+</file>
+
 <file path=ppt/slides/slide2.xml><?xml version="1.0" encoding="utf-8"?>
 <p:sld xmlns:a="http://schemas.openxmlformats.org/drawingml/2006/main" xmlns:r="http://schemas.openxmlformats.org/officeDocument/2006/relationships" xmlns:p="http://schemas.openxmlformats.org/presentationml/2006/main">
   <p:cSld>
@@ -5812,7 +7863,7 @@
           <p:cNvPr id="23" name="Group 22">
             <a:extLst>
               <a:ext uri="{FF2B5EF4-FFF2-40B4-BE49-F238E27FC236}">
-                <a16:creationId xmlns="" xmlns:a16="http://schemas.microsoft.com/office/drawing/2014/main" id="{BCC420A2-DA9C-7942-B39C-D09C4F5EA55A}"/>
+                <a16:creationId xmlns:a16="http://schemas.microsoft.com/office/drawing/2014/main" xmlns="" id="{BCC420A2-DA9C-7942-B39C-D09C4F5EA55A}"/>
               </a:ext>
             </a:extLst>
           </p:cNvPr>
@@ -5832,7 +7883,7 @@
             <p:cNvPr id="5" name="Straight Connector 4">
               <a:extLst>
                 <a:ext uri="{FF2B5EF4-FFF2-40B4-BE49-F238E27FC236}">
-                  <a16:creationId xmlns="" xmlns:a16="http://schemas.microsoft.com/office/drawing/2014/main" id="{39360EB3-2F94-A44A-B39F-9DB160370D7A}"/>
+                  <a16:creationId xmlns:a16="http://schemas.microsoft.com/office/drawing/2014/main" xmlns="" id="{39360EB3-2F94-A44A-B39F-9DB160370D7A}"/>
                 </a:ext>
               </a:extLst>
             </p:cNvPr>
@@ -5875,7 +7926,7 @@
             <p:cNvPr id="6" name="Straight Connector 5">
               <a:extLst>
                 <a:ext uri="{FF2B5EF4-FFF2-40B4-BE49-F238E27FC236}">
-                  <a16:creationId xmlns="" xmlns:a16="http://schemas.microsoft.com/office/drawing/2014/main" id="{853E8DA6-DA6D-6C46-BFE7-416FBF17C8C7}"/>
+                  <a16:creationId xmlns:a16="http://schemas.microsoft.com/office/drawing/2014/main" xmlns="" id="{853E8DA6-DA6D-6C46-BFE7-416FBF17C8C7}"/>
                 </a:ext>
               </a:extLst>
             </p:cNvPr>
@@ -5919,7 +7970,7 @@
             <p:cNvPr id="9" name="Straight Arrow Connector 8">
               <a:extLst>
                 <a:ext uri="{FF2B5EF4-FFF2-40B4-BE49-F238E27FC236}">
-                  <a16:creationId xmlns="" xmlns:a16="http://schemas.microsoft.com/office/drawing/2014/main" id="{CF5C9E10-448B-F945-BDB2-68260461DD67}"/>
+                  <a16:creationId xmlns:a16="http://schemas.microsoft.com/office/drawing/2014/main" xmlns="" id="{CF5C9E10-448B-F945-BDB2-68260461DD67}"/>
                 </a:ext>
               </a:extLst>
             </p:cNvPr>
@@ -5961,7 +8012,7 @@
             <p:cNvPr id="10" name="TextBox 9">
               <a:extLst>
                 <a:ext uri="{FF2B5EF4-FFF2-40B4-BE49-F238E27FC236}">
-                  <a16:creationId xmlns="" xmlns:a16="http://schemas.microsoft.com/office/drawing/2014/main" id="{FFC39BBD-2C9F-A441-B982-D45EDEFFB0E5}"/>
+                  <a16:creationId xmlns:a16="http://schemas.microsoft.com/office/drawing/2014/main" xmlns="" id="{FFC39BBD-2C9F-A441-B982-D45EDEFFB0E5}"/>
                 </a:ext>
               </a:extLst>
             </p:cNvPr>
@@ -6000,7 +8051,7 @@
             <p:cNvPr id="11" name="TextBox 10">
               <a:extLst>
                 <a:ext uri="{FF2B5EF4-FFF2-40B4-BE49-F238E27FC236}">
-                  <a16:creationId xmlns="" xmlns:a16="http://schemas.microsoft.com/office/drawing/2014/main" id="{6E340A3D-9611-684E-B25B-F9AB12BDD1D4}"/>
+                  <a16:creationId xmlns:a16="http://schemas.microsoft.com/office/drawing/2014/main" xmlns="" id="{6E340A3D-9611-684E-B25B-F9AB12BDD1D4}"/>
                 </a:ext>
               </a:extLst>
             </p:cNvPr>
@@ -6039,7 +8090,7 @@
             <p:cNvPr id="12" name="Straight Arrow Connector 11">
               <a:extLst>
                 <a:ext uri="{FF2B5EF4-FFF2-40B4-BE49-F238E27FC236}">
-                  <a16:creationId xmlns="" xmlns:a16="http://schemas.microsoft.com/office/drawing/2014/main" id="{735FC0BE-6106-9543-A10D-686E0BE6FB36}"/>
+                  <a16:creationId xmlns:a16="http://schemas.microsoft.com/office/drawing/2014/main" xmlns="" id="{735FC0BE-6106-9543-A10D-686E0BE6FB36}"/>
                 </a:ext>
               </a:extLst>
             </p:cNvPr>
@@ -6084,7 +8135,7 @@
             <p:cNvPr id="15" name="Straight Arrow Connector 14">
               <a:extLst>
                 <a:ext uri="{FF2B5EF4-FFF2-40B4-BE49-F238E27FC236}">
-                  <a16:creationId xmlns="" xmlns:a16="http://schemas.microsoft.com/office/drawing/2014/main" id="{F8024A55-957A-0D40-B26F-ABA50E186F24}"/>
+                  <a16:creationId xmlns:a16="http://schemas.microsoft.com/office/drawing/2014/main" xmlns="" id="{F8024A55-957A-0D40-B26F-ABA50E186F24}"/>
                 </a:ext>
               </a:extLst>
             </p:cNvPr>
@@ -6129,7 +8180,7 @@
             <p:cNvPr id="17" name="TextBox 16">
               <a:extLst>
                 <a:ext uri="{FF2B5EF4-FFF2-40B4-BE49-F238E27FC236}">
-                  <a16:creationId xmlns="" xmlns:a16="http://schemas.microsoft.com/office/drawing/2014/main" id="{16D3F9D4-E5F7-6B4D-A03D-0AA606EE74AB}"/>
+                  <a16:creationId xmlns:a16="http://schemas.microsoft.com/office/drawing/2014/main" xmlns="" id="{16D3F9D4-E5F7-6B4D-A03D-0AA606EE74AB}"/>
                 </a:ext>
               </a:extLst>
             </p:cNvPr>
@@ -6168,7 +8219,7 @@
             <p:cNvPr id="18" name="TextBox 17">
               <a:extLst>
                 <a:ext uri="{FF2B5EF4-FFF2-40B4-BE49-F238E27FC236}">
-                  <a16:creationId xmlns="" xmlns:a16="http://schemas.microsoft.com/office/drawing/2014/main" id="{8B25EDDD-F275-834A-AA71-146F0B514D87}"/>
+                  <a16:creationId xmlns:a16="http://schemas.microsoft.com/office/drawing/2014/main" xmlns="" id="{8B25EDDD-F275-834A-AA71-146F0B514D87}"/>
                 </a:ext>
               </a:extLst>
             </p:cNvPr>
@@ -6203,7 +8254,7 @@
             <p:cNvPr id="19" name="TextBox 18">
               <a:extLst>
                 <a:ext uri="{FF2B5EF4-FFF2-40B4-BE49-F238E27FC236}">
-                  <a16:creationId xmlns="" xmlns:a16="http://schemas.microsoft.com/office/drawing/2014/main" id="{F447B65D-C5AF-DB48-A22C-6A80F0DBED91}"/>
+                  <a16:creationId xmlns:a16="http://schemas.microsoft.com/office/drawing/2014/main" xmlns="" id="{F447B65D-C5AF-DB48-A22C-6A80F0DBED91}"/>
                 </a:ext>
               </a:extLst>
             </p:cNvPr>
@@ -6238,7 +8289,7 @@
             <p:cNvPr id="20" name="Arc 19">
               <a:extLst>
                 <a:ext uri="{FF2B5EF4-FFF2-40B4-BE49-F238E27FC236}">
-                  <a16:creationId xmlns="" xmlns:a16="http://schemas.microsoft.com/office/drawing/2014/main" id="{2A1C4EA9-9F3E-6C4D-A9D7-CC767EFDC316}"/>
+                  <a16:creationId xmlns:a16="http://schemas.microsoft.com/office/drawing/2014/main" xmlns="" id="{2A1C4EA9-9F3E-6C4D-A9D7-CC767EFDC316}"/>
                 </a:ext>
               </a:extLst>
             </p:cNvPr>
@@ -6290,7 +8341,7 @@
             <p:cNvPr id="21" name="TextBox 20">
               <a:extLst>
                 <a:ext uri="{FF2B5EF4-FFF2-40B4-BE49-F238E27FC236}">
-                  <a16:creationId xmlns="" xmlns:a16="http://schemas.microsoft.com/office/drawing/2014/main" id="{6906D6A8-C6DC-7E42-B6AC-74F70CA0B1F4}"/>
+                  <a16:creationId xmlns:a16="http://schemas.microsoft.com/office/drawing/2014/main" xmlns="" id="{6906D6A8-C6DC-7E42-B6AC-74F70CA0B1F4}"/>
                 </a:ext>
               </a:extLst>
             </p:cNvPr>
@@ -6370,7 +8421,7 @@
             <p:cNvPr id="4" name="Picture 3">
               <a:extLst>
                 <a:ext uri="{FF2B5EF4-FFF2-40B4-BE49-F238E27FC236}">
-                  <a16:creationId xmlns="" xmlns:a16="http://schemas.microsoft.com/office/drawing/2014/main" id="{9594DC97-7FD9-6C4C-AA8C-A206E9FDE4B1}"/>
+                  <a16:creationId xmlns:a16="http://schemas.microsoft.com/office/drawing/2014/main" xmlns="" id="{9594DC97-7FD9-6C4C-AA8C-A206E9FDE4B1}"/>
                 </a:ext>
               </a:extLst>
             </p:cNvPr>
@@ -6790,7 +8841,7 @@
             <p:cNvPr id="4" name="Picture 3">
               <a:extLst>
                 <a:ext uri="{FF2B5EF4-FFF2-40B4-BE49-F238E27FC236}">
-                  <a16:creationId xmlns="" xmlns:a16="http://schemas.microsoft.com/office/drawing/2014/main" id="{2E17FE61-10C3-E64B-ABB3-5FFD96909365}"/>
+                  <a16:creationId xmlns:a16="http://schemas.microsoft.com/office/drawing/2014/main" xmlns="" id="{2E17FE61-10C3-E64B-ABB3-5FFD96909365}"/>
                 </a:ext>
               </a:extLst>
             </p:cNvPr>
@@ -6819,7 +8870,7 @@
             <p:cNvPr id="5" name="Donut 4">
               <a:extLst>
                 <a:ext uri="{FF2B5EF4-FFF2-40B4-BE49-F238E27FC236}">
-                  <a16:creationId xmlns="" xmlns:a16="http://schemas.microsoft.com/office/drawing/2014/main" id="{A05B1990-5D9B-6044-AC97-F08B64FB7307}"/>
+                  <a16:creationId xmlns:a16="http://schemas.microsoft.com/office/drawing/2014/main" xmlns="" id="{A05B1990-5D9B-6044-AC97-F08B64FB7307}"/>
                 </a:ext>
               </a:extLst>
             </p:cNvPr>
@@ -6879,7 +8930,7 @@
             <p:cNvPr id="6" name="Donut 5">
               <a:extLst>
                 <a:ext uri="{FF2B5EF4-FFF2-40B4-BE49-F238E27FC236}">
-                  <a16:creationId xmlns="" xmlns:a16="http://schemas.microsoft.com/office/drawing/2014/main" id="{E87D4265-32C9-8641-9224-27CBAEBBC555}"/>
+                  <a16:creationId xmlns:a16="http://schemas.microsoft.com/office/drawing/2014/main" xmlns="" id="{E87D4265-32C9-8641-9224-27CBAEBBC555}"/>
                 </a:ext>
               </a:extLst>
             </p:cNvPr>
@@ -6939,7 +8990,7 @@
             <p:cNvPr id="7" name="Donut 6">
               <a:extLst>
                 <a:ext uri="{FF2B5EF4-FFF2-40B4-BE49-F238E27FC236}">
-                  <a16:creationId xmlns="" xmlns:a16="http://schemas.microsoft.com/office/drawing/2014/main" id="{94E5F9FB-A235-5A4B-ACA8-09116E31D8B2}"/>
+                  <a16:creationId xmlns:a16="http://schemas.microsoft.com/office/drawing/2014/main" xmlns="" id="{94E5F9FB-A235-5A4B-ACA8-09116E31D8B2}"/>
                 </a:ext>
               </a:extLst>
             </p:cNvPr>
@@ -6999,7 +9050,7 @@
             <p:cNvPr id="8" name="Donut 7">
               <a:extLst>
                 <a:ext uri="{FF2B5EF4-FFF2-40B4-BE49-F238E27FC236}">
-                  <a16:creationId xmlns="" xmlns:a16="http://schemas.microsoft.com/office/drawing/2014/main" id="{A8505250-A9B4-8441-82AA-79C65E428040}"/>
+                  <a16:creationId xmlns:a16="http://schemas.microsoft.com/office/drawing/2014/main" xmlns="" id="{A8505250-A9B4-8441-82AA-79C65E428040}"/>
                 </a:ext>
               </a:extLst>
             </p:cNvPr>
@@ -7141,7 +9192,7 @@
             <p:cNvPr id="4" name="Content Placeholder 6">
               <a:extLst>
                 <a:ext uri="{FF2B5EF4-FFF2-40B4-BE49-F238E27FC236}">
-                  <a16:creationId xmlns="" xmlns:a16="http://schemas.microsoft.com/office/drawing/2014/main" id="{B5FBF01F-5A46-AE45-A386-1197E9C84285}"/>
+                  <a16:creationId xmlns:a16="http://schemas.microsoft.com/office/drawing/2014/main" xmlns="" id="{B5FBF01F-5A46-AE45-A386-1197E9C84285}"/>
                 </a:ext>
               </a:extLst>
             </p:cNvPr>
@@ -7170,7 +9221,7 @@
             <p:cNvPr id="13" name="TextBox 12">
               <a:extLst>
                 <a:ext uri="{FF2B5EF4-FFF2-40B4-BE49-F238E27FC236}">
-                  <a16:creationId xmlns="" xmlns:a16="http://schemas.microsoft.com/office/drawing/2014/main" id="{7C96A7DC-9E77-1440-A26F-E69E8E484244}"/>
+                  <a16:creationId xmlns:a16="http://schemas.microsoft.com/office/drawing/2014/main" xmlns="" id="{7C96A7DC-9E77-1440-A26F-E69E8E484244}"/>
                 </a:ext>
               </a:extLst>
             </p:cNvPr>
@@ -7205,7 +9256,7 @@
             <p:cNvPr id="17" name="TextBox 16">
               <a:extLst>
                 <a:ext uri="{FF2B5EF4-FFF2-40B4-BE49-F238E27FC236}">
-                  <a16:creationId xmlns="" xmlns:a16="http://schemas.microsoft.com/office/drawing/2014/main" id="{B35BD146-CF53-6741-A6CA-F9917A9B6AB2}"/>
+                  <a16:creationId xmlns:a16="http://schemas.microsoft.com/office/drawing/2014/main" xmlns="" id="{B35BD146-CF53-6741-A6CA-F9917A9B6AB2}"/>
                 </a:ext>
               </a:extLst>
             </p:cNvPr>
@@ -7349,7 +9400,7 @@
             <p:cNvPr id="5" name="Picture 4">
               <a:extLst>
                 <a:ext uri="{FF2B5EF4-FFF2-40B4-BE49-F238E27FC236}">
-                  <a16:creationId xmlns="" xmlns:a16="http://schemas.microsoft.com/office/drawing/2014/main" id="{E0BBAB1D-27A1-D444-B305-BB3992CA6764}"/>
+                  <a16:creationId xmlns:a16="http://schemas.microsoft.com/office/drawing/2014/main" xmlns="" id="{E0BBAB1D-27A1-D444-B305-BB3992CA6764}"/>
                 </a:ext>
               </a:extLst>
             </p:cNvPr>
@@ -7378,7 +9429,7 @@
             <p:cNvPr id="6" name="TextBox 5">
               <a:extLst>
                 <a:ext uri="{FF2B5EF4-FFF2-40B4-BE49-F238E27FC236}">
-                  <a16:creationId xmlns="" xmlns:a16="http://schemas.microsoft.com/office/drawing/2014/main" id="{7C96A7DC-9E77-1440-A26F-E69E8E484244}"/>
+                  <a16:creationId xmlns:a16="http://schemas.microsoft.com/office/drawing/2014/main" xmlns="" id="{7C96A7DC-9E77-1440-A26F-E69E8E484244}"/>
                 </a:ext>
               </a:extLst>
             </p:cNvPr>
@@ -7413,7 +9464,7 @@
             <p:cNvPr id="7" name="TextBox 6">
               <a:extLst>
                 <a:ext uri="{FF2B5EF4-FFF2-40B4-BE49-F238E27FC236}">
-                  <a16:creationId xmlns="" xmlns:a16="http://schemas.microsoft.com/office/drawing/2014/main" id="{B35BD146-CF53-6741-A6CA-F9917A9B6AB2}"/>
+                  <a16:creationId xmlns:a16="http://schemas.microsoft.com/office/drawing/2014/main" xmlns="" id="{B35BD146-CF53-6741-A6CA-F9917A9B6AB2}"/>
                 </a:ext>
               </a:extLst>
             </p:cNvPr>
@@ -8008,7 +10059,7 @@
           <p:cNvPr id="4" name="Straight Connector 3">
             <a:extLst>
               <a:ext uri="{FF2B5EF4-FFF2-40B4-BE49-F238E27FC236}">
-                <a16:creationId xmlns="" xmlns:a16="http://schemas.microsoft.com/office/drawing/2014/main" id="{FD28D3A8-529B-8C4E-8288-913CD864D634}"/>
+                <a16:creationId xmlns:a16="http://schemas.microsoft.com/office/drawing/2014/main" xmlns="" id="{FD28D3A8-529B-8C4E-8288-913CD864D634}"/>
               </a:ext>
             </a:extLst>
           </p:cNvPr>
@@ -8046,7 +10097,7 @@
           <p:cNvPr id="5" name="Straight Connector 4">
             <a:extLst>
               <a:ext uri="{FF2B5EF4-FFF2-40B4-BE49-F238E27FC236}">
-                <a16:creationId xmlns="" xmlns:a16="http://schemas.microsoft.com/office/drawing/2014/main" id="{13F75B51-BB9F-4D40-B3C1-F4810DBCAB70}"/>
+                <a16:creationId xmlns:a16="http://schemas.microsoft.com/office/drawing/2014/main" xmlns="" id="{13F75B51-BB9F-4D40-B3C1-F4810DBCAB70}"/>
               </a:ext>
             </a:extLst>
           </p:cNvPr>
@@ -8084,7 +10135,7 @@
           <p:cNvPr id="6" name="Straight Connector 5">
             <a:extLst>
               <a:ext uri="{FF2B5EF4-FFF2-40B4-BE49-F238E27FC236}">
-                <a16:creationId xmlns="" xmlns:a16="http://schemas.microsoft.com/office/drawing/2014/main" id="{245E092D-CE07-3742-B7F7-4E54FC78EB19}"/>
+                <a16:creationId xmlns:a16="http://schemas.microsoft.com/office/drawing/2014/main" xmlns="" id="{245E092D-CE07-3742-B7F7-4E54FC78EB19}"/>
               </a:ext>
             </a:extLst>
           </p:cNvPr>
@@ -8127,7 +10178,7 @@
           <p:cNvPr id="7" name="Straight Connector 6">
             <a:extLst>
               <a:ext uri="{FF2B5EF4-FFF2-40B4-BE49-F238E27FC236}">
-                <a16:creationId xmlns="" xmlns:a16="http://schemas.microsoft.com/office/drawing/2014/main" id="{D2CD578E-7069-EB4B-9FE1-E85E81F0B9FA}"/>
+                <a16:creationId xmlns:a16="http://schemas.microsoft.com/office/drawing/2014/main" xmlns="" id="{D2CD578E-7069-EB4B-9FE1-E85E81F0B9FA}"/>
               </a:ext>
             </a:extLst>
           </p:cNvPr>
@@ -8170,7 +10221,7 @@
           <p:cNvPr id="8" name="Straight Connector 7">
             <a:extLst>
               <a:ext uri="{FF2B5EF4-FFF2-40B4-BE49-F238E27FC236}">
-                <a16:creationId xmlns="" xmlns:a16="http://schemas.microsoft.com/office/drawing/2014/main" id="{4D82641A-CCD1-2443-94A3-1E08780A7290}"/>
+                <a16:creationId xmlns:a16="http://schemas.microsoft.com/office/drawing/2014/main" xmlns="" id="{4D82641A-CCD1-2443-94A3-1E08780A7290}"/>
               </a:ext>
             </a:extLst>
           </p:cNvPr>
@@ -8213,7 +10264,7 @@
           <p:cNvPr id="9" name="Straight Connector 8">
             <a:extLst>
               <a:ext uri="{FF2B5EF4-FFF2-40B4-BE49-F238E27FC236}">
-                <a16:creationId xmlns="" xmlns:a16="http://schemas.microsoft.com/office/drawing/2014/main" id="{EF7A0A7C-12A4-C642-A587-1C9DB2BC1299}"/>
+                <a16:creationId xmlns:a16="http://schemas.microsoft.com/office/drawing/2014/main" xmlns="" id="{EF7A0A7C-12A4-C642-A587-1C9DB2BC1299}"/>
               </a:ext>
             </a:extLst>
           </p:cNvPr>
@@ -8256,7 +10307,7 @@
           <p:cNvPr id="10" name="Straight Connector 9">
             <a:extLst>
               <a:ext uri="{FF2B5EF4-FFF2-40B4-BE49-F238E27FC236}">
-                <a16:creationId xmlns="" xmlns:a16="http://schemas.microsoft.com/office/drawing/2014/main" id="{8C75174E-D43B-4B4D-AB2D-C81870CE047B}"/>
+                <a16:creationId xmlns:a16="http://schemas.microsoft.com/office/drawing/2014/main" xmlns="" id="{8C75174E-D43B-4B4D-AB2D-C81870CE047B}"/>
               </a:ext>
             </a:extLst>
           </p:cNvPr>
@@ -8299,7 +10350,7 @@
           <p:cNvPr id="11" name="Straight Connector 10">
             <a:extLst>
               <a:ext uri="{FF2B5EF4-FFF2-40B4-BE49-F238E27FC236}">
-                <a16:creationId xmlns="" xmlns:a16="http://schemas.microsoft.com/office/drawing/2014/main" id="{F4C2AEBC-8FA0-0D44-9999-B462F527608F}"/>
+                <a16:creationId xmlns:a16="http://schemas.microsoft.com/office/drawing/2014/main" xmlns="" id="{F4C2AEBC-8FA0-0D44-9999-B462F527608F}"/>
               </a:ext>
             </a:extLst>
           </p:cNvPr>
@@ -8342,7 +10393,7 @@
           <p:cNvPr id="12" name="Straight Connector 11">
             <a:extLst>
               <a:ext uri="{FF2B5EF4-FFF2-40B4-BE49-F238E27FC236}">
-                <a16:creationId xmlns="" xmlns:a16="http://schemas.microsoft.com/office/drawing/2014/main" id="{B8FB4FD3-B69F-DB49-B230-E409721C041B}"/>
+                <a16:creationId xmlns:a16="http://schemas.microsoft.com/office/drawing/2014/main" xmlns="" id="{B8FB4FD3-B69F-DB49-B230-E409721C041B}"/>
               </a:ext>
             </a:extLst>
           </p:cNvPr>
@@ -8385,7 +10436,7 @@
           <p:cNvPr id="13" name="Straight Connector 12">
             <a:extLst>
               <a:ext uri="{FF2B5EF4-FFF2-40B4-BE49-F238E27FC236}">
-                <a16:creationId xmlns="" xmlns:a16="http://schemas.microsoft.com/office/drawing/2014/main" id="{8A42643D-E60D-9B4B-9419-AAA8CC97FD62}"/>
+                <a16:creationId xmlns:a16="http://schemas.microsoft.com/office/drawing/2014/main" xmlns="" id="{8A42643D-E60D-9B4B-9419-AAA8CC97FD62}"/>
               </a:ext>
             </a:extLst>
           </p:cNvPr>
@@ -8428,7 +10479,7 @@
           <p:cNvPr id="14" name="Right Triangle 13">
             <a:extLst>
               <a:ext uri="{FF2B5EF4-FFF2-40B4-BE49-F238E27FC236}">
-                <a16:creationId xmlns="" xmlns:a16="http://schemas.microsoft.com/office/drawing/2014/main" id="{49740E78-E748-7744-B0EF-C287ABFE1252}"/>
+                <a16:creationId xmlns:a16="http://schemas.microsoft.com/office/drawing/2014/main" xmlns="" id="{49740E78-E748-7744-B0EF-C287ABFE1252}"/>
               </a:ext>
             </a:extLst>
           </p:cNvPr>
@@ -8474,7 +10525,7 @@
           <p:cNvPr id="15" name="Right Triangle 14">
             <a:extLst>
               <a:ext uri="{FF2B5EF4-FFF2-40B4-BE49-F238E27FC236}">
-                <a16:creationId xmlns="" xmlns:a16="http://schemas.microsoft.com/office/drawing/2014/main" id="{8FE36568-9112-AE40-949C-3BCE5D915CA3}"/>
+                <a16:creationId xmlns:a16="http://schemas.microsoft.com/office/drawing/2014/main" xmlns="" id="{8FE36568-9112-AE40-949C-3BCE5D915CA3}"/>
               </a:ext>
             </a:extLst>
           </p:cNvPr>

</xml_diff>